<commit_message>
First split in methods
</commit_message>
<xml_diff>
--- a/sample-docs/pptx-copy.pptx
+++ b/sample-docs/pptx-copy.pptx
@@ -690,7 +690,7 @@
 </file>
 
 <file path=ppt/notesSlides/notesSlide1.xml><?xml version="1.0" encoding="utf-8"?>
-<p:notes xmlns:a="http://schemas.openxmlformats.org/drawingml/2006/main" xmlns:r="http://schemas.openxmlformats.org/officeDocument/2006/relationships" xmlns:p="http://schemas.openxmlformats.org/presentationml/2006/main">
+<p:notes xmlns:a="http://schemas.openxmlformats.org/drawingml/2006/main" xmlns:r="http://schemas.openxmlformats.org/officeDocument/2006/relationships" xmlns:p="http://schemas.openxmlformats.org/presentationml/2006/main" xmlns:mc="http://schemas.openxmlformats.org/markup-compatibility/2006" xmlns:c="http://schemas.openxmlformats.org/drawingml/2006/chart" xmlns:ns6="http://schemas.openxmlformats.org/drawingml/2006/chartDrawing" xmlns:dgm="http://schemas.openxmlformats.org/drawingml/2006/diagram" xmlns:pic="http://schemas.openxmlformats.org/drawingml/2006/picture" xmlns:wp="http://schemas.openxmlformats.org/drawingml/2006/wordprocessingDrawing" xmlns:wp14="http://schemas.microsoft.com/office/word/2010/wordprocessingDrawing" xmlns:xdr="http://schemas.openxmlformats.org/drawingml/2006/spreadsheetDrawing" xmlns:ns12="http://schemas.openxmlformats.org/drawingml/2006/compatibility" xmlns:ns13="http://schemas.openxmlformats.org/drawingml/2006/lockedCanvas">
   <p:cSld>
     <p:spTree>
       <p:nvGrpSpPr>
@@ -710,7 +710,7 @@
         <p:nvSpPr>
           <p:cNvPr id="2" name="Slide Image Placeholder 1"/>
           <p:cNvSpPr>
-            <a:spLocks noGrp="1" noRot="1" noChangeAspect="1"/>
+            <a:spLocks noGrp="true" noRot="true" noChangeAspect="true"/>
           </p:cNvSpPr>
           <p:nvPr>
             <p:ph type="sldImg"/>
@@ -722,7 +722,7 @@
         <p:nvSpPr>
           <p:cNvPr id="3" name="Notes Placeholder 2"/>
           <p:cNvSpPr>
-            <a:spLocks noGrp="1"/>
+            <a:spLocks noGrp="true"/>
           </p:cNvSpPr>
           <p:nvPr>
             <p:ph type="body" idx="1"/>
@@ -733,29 +733,29 @@
           <a:bodyPr/>
           <a:lstStyle/>
           <a:p>
-            <a:pPr eaLnBrk="1" hangingPunct="1"/>
-            <a:r>
-              <a:rPr lang="en-US" smtClean="0">
+            <a:pPr eaLnBrk="true" hangingPunct="true"/>
+            <a:r>
+              <a:rPr lang="en-US" smtClean="false">
                 <a:latin typeface="Arial"/>
                 <a:cs typeface="Arial"/>
               </a:rPr>
               <a:t>Commentaire</a:t>
             </a:r>
             <a:r>
-              <a:rPr lang="en-US" baseline="0" smtClean="0">
+              <a:rPr lang="en-US" baseline="0" smtClean="false">
                 <a:latin typeface="Arial"/>
                 <a:cs typeface="Arial"/>
               </a:rPr>
               <a:t> </a:t>
             </a:r>
             <a:r>
-              <a:rPr lang="en-US" baseline="0" dirty="0" smtClean="0">
+              <a:rPr lang="en-US" baseline="0" dirty="false" smtClean="false">
                 <a:latin typeface="Arial"/>
                 <a:cs typeface="Arial"/>
               </a:rPr>
               <a:t>de la version copy</a:t>
             </a:r>
-            <a:endParaRPr lang="en-US" dirty="0" smtClean="0">
+            <a:endParaRPr lang="en-US" dirty="false" smtClean="false">
               <a:latin typeface="Arial"/>
               <a:cs typeface="Arial"/>
             </a:endParaRPr>
@@ -776,7 +776,7 @@
 </file>
 
 <file path=ppt/notesSlides/notesSlide2.xml><?xml version="1.0" encoding="utf-8"?>
-<p:notes xmlns:a="http://schemas.openxmlformats.org/drawingml/2006/main" xmlns:r="http://schemas.openxmlformats.org/officeDocument/2006/relationships" xmlns:p="http://schemas.openxmlformats.org/presentationml/2006/main">
+<p:notes xmlns:a="http://schemas.openxmlformats.org/drawingml/2006/main" xmlns:r="http://schemas.openxmlformats.org/officeDocument/2006/relationships" xmlns:p="http://schemas.openxmlformats.org/presentationml/2006/main" xmlns:mc="http://schemas.openxmlformats.org/markup-compatibility/2006" xmlns:c="http://schemas.openxmlformats.org/drawingml/2006/chart" xmlns:ns6="http://schemas.openxmlformats.org/drawingml/2006/chartDrawing" xmlns:dgm="http://schemas.openxmlformats.org/drawingml/2006/diagram" xmlns:pic="http://schemas.openxmlformats.org/drawingml/2006/picture" xmlns:wp="http://schemas.openxmlformats.org/drawingml/2006/wordprocessingDrawing" xmlns:wp14="http://schemas.microsoft.com/office/word/2010/wordprocessingDrawing" xmlns:xdr="http://schemas.openxmlformats.org/drawingml/2006/spreadsheetDrawing" xmlns:ns12="http://schemas.openxmlformats.org/drawingml/2006/compatibility" xmlns:ns13="http://schemas.openxmlformats.org/drawingml/2006/lockedCanvas">
   <p:cSld>
     <p:spTree>
       <p:nvGrpSpPr>
@@ -796,7 +796,7 @@
         <p:nvSpPr>
           <p:cNvPr id="2" name="Slide Image Placeholder 1"/>
           <p:cNvSpPr>
-            <a:spLocks noGrp="1" noRot="1" noChangeAspect="1"/>
+            <a:spLocks noGrp="true" noRot="true" noChangeAspect="true"/>
           </p:cNvSpPr>
           <p:nvPr>
             <p:ph type="sldImg"/>
@@ -808,7 +808,7 @@
         <p:nvSpPr>
           <p:cNvPr id="3" name="Notes Placeholder 2"/>
           <p:cNvSpPr>
-            <a:spLocks noGrp="1"/>
+            <a:spLocks noGrp="true"/>
           </p:cNvSpPr>
           <p:nvPr>
             <p:ph type="body" idx="1"/>
@@ -819,7 +819,7 @@
           <a:bodyPr/>
           <a:lstStyle/>
           <a:p>
-            <a:pPr marL="0" marR="0" lvl="0" indent="0" algn="l" defTabSz="457200" rtl="0" eaLnBrk="1" fontAlgn="auto" latinLnBrk="0" hangingPunct="1">
+            <a:pPr marL="0" marR="0" lvl="0" indent="0" algn="l" defTabSz="457200" rtl="false" eaLnBrk="true" fontAlgn="auto" latinLnBrk="false" hangingPunct="true">
               <a:lnSpc>
                 <a:spcPct val="100000"/>
               </a:lnSpc>
@@ -837,26 +837,26 @@
               <a:defRPr/>
             </a:pPr>
             <a:r>
-              <a:rPr lang="en-US" dirty="0" err="1" smtClean="0">
+              <a:rPr lang="en-US" dirty="false" err="true" smtClean="false">
                 <a:latin typeface="Arial"/>
                 <a:cs typeface="Arial"/>
               </a:rPr>
               <a:t>Commentaire</a:t>
             </a:r>
             <a:r>
-              <a:rPr lang="en-US" baseline="0" dirty="0" smtClean="0">
+              <a:rPr lang="en-US" baseline="0" dirty="false" smtClean="false">
                 <a:latin typeface="Arial"/>
                 <a:cs typeface="Arial"/>
               </a:rPr>
               <a:t> de la version copy</a:t>
             </a:r>
-            <a:endParaRPr lang="en-US" dirty="0" smtClean="0">
+            <a:endParaRPr lang="en-US" dirty="false" smtClean="false">
               <a:latin typeface="Arial"/>
               <a:cs typeface="Arial"/>
             </a:endParaRPr>
           </a:p>
           <a:p>
-            <a:endParaRPr lang="en-US" dirty="0"/>
+            <a:endParaRPr lang="en-US" dirty="false"/>
           </a:p>
         </p:txBody>
       </p:sp>
@@ -2039,7 +2039,7 @@
 </file>
 
 <file path=ppt/slideLayouts/slideLayout4.xml><?xml version="1.0" encoding="utf-8"?>
-<p:sldLayout xmlns:a="http://schemas.openxmlformats.org/drawingml/2006/main" xmlns:r="http://schemas.openxmlformats.org/officeDocument/2006/relationships" xmlns:p="http://schemas.openxmlformats.org/presentationml/2006/main" preserve="1" userDrawn="1">
+<p:sldLayout xmlns:v="urn:schemas-microsoft-com:vml" xmlns:a="http://schemas.openxmlformats.org/drawingml/2006/main" xmlns:c="http://schemas.openxmlformats.org/drawingml/2006/chart" xmlns:xdr="http://schemas.openxmlformats.org/drawingml/2006/spreadsheetDrawing" xmlns:dgm="http://schemas.openxmlformats.org/drawingml/2006/diagram" xmlns:pic="http://schemas.openxmlformats.org/drawingml/2006/picture" xmlns:wp14="http://schemas.microsoft.com/office/word/2010/wordprocessingDrawing" xmlns:p="http://schemas.openxmlformats.org/presentationml/2006/main" xmlns:ns6="http://schemas.openxmlformats.org/drawingml/2006/chartDrawing" xmlns:r="http://schemas.openxmlformats.org/officeDocument/2006/relationships" xmlns:ns13="http://schemas.openxmlformats.org/drawingml/2006/lockedCanvas" xmlns:ns12="http://schemas.openxmlformats.org/drawingml/2006/compatibility" xmlns:mc="http://schemas.openxmlformats.org/markup-compatibility/2006" xmlns:wp="http://schemas.openxmlformats.org/drawingml/2006/wordprocessingDrawing" preserve="true" userDrawn="true">
   <p:cSld name="Module Header">
     <p:spTree>
       <p:nvGrpSpPr>
@@ -2059,10 +2059,10 @@
         <p:nvSpPr>
           <p:cNvPr id="2" name="Title 1"/>
           <p:cNvSpPr>
-            <a:spLocks noGrp="1"/>
+            <a:spLocks noGrp="true"/>
           </p:cNvSpPr>
           <p:nvPr>
-            <p:ph type="title" hasCustomPrompt="1"/>
+            <p:ph type="title" hasCustomPrompt="true"/>
           </p:nvPr>
         </p:nvSpPr>
         <p:spPr>
@@ -2077,7 +2077,7 @@
           </a:bodyPr>
           <a:lstStyle>
             <a:lvl1pPr algn="l">
-              <a:defRPr sz="2800" b="1" cap="none" baseline="0">
+              <a:defRPr sz="2800" b="true" cap="none" baseline="0">
                 <a:solidFill>
                   <a:schemeClr val="tx1"/>
                 </a:solidFill>
@@ -2086,10 +2086,10 @@
           </a:lstStyle>
           <a:p>
             <a:r>
-              <a:rPr lang="en-US" dirty="0" smtClean="0"/>
+              <a:rPr lang="en-US" dirty="false" smtClean="false"/>
               <a:t>Section Header</a:t>
             </a:r>
-            <a:endParaRPr lang="en-US" dirty="0"/>
+            <a:endParaRPr lang="en-US" dirty="false"/>
           </a:p>
         </p:txBody>
       </p:sp>
@@ -2097,15 +2097,15 @@
         <p:nvPicPr>
           <p:cNvPr id="4" name="Picture 3" descr="AWS-Intro-Series-Branding_01.png"/>
           <p:cNvPicPr>
-            <a:picLocks noChangeAspect="1"/>
+            <a:picLocks noChangeAspect="true"/>
           </p:cNvPicPr>
-          <p:nvPr userDrawn="1"/>
+          <p:nvPr userDrawn="true"/>
         </p:nvPicPr>
         <p:blipFill>
           <a:blip r:embed="rId2">
             <a:extLst>
               <a:ext uri="{28A0092B-C50C-407E-A947-70E740481C1C}">
-                <a14:useLocalDpi xmlns:a14="http://schemas.microsoft.com/office/drawing/2010/main" val="0"/>
+                <a14:useLocalDpi xmlns:a14="http://schemas.microsoft.com/office/drawing/2010/main" xmlns:v="urn:schemas-microsoft-com:vml" val="0"/>
               </a:ext>
             </a:extLst>
           </a:blip>
@@ -2127,7 +2127,7 @@
         <p:nvSpPr>
           <p:cNvPr id="6" name="Subtitle 2"/>
           <p:cNvSpPr>
-            <a:spLocks noGrp="1"/>
+            <a:spLocks noGrp="true"/>
           </p:cNvSpPr>
           <p:nvPr>
             <p:ph type="subTitle" idx="1"/>
@@ -2233,17 +2233,17 @@
           </a:lstStyle>
           <a:p>
             <a:r>
-              <a:rPr lang="en-US" smtClean="0"/>
+              <a:rPr lang="en-US" smtClean="false"/>
               <a:t>Click to edit Master subtitle style</a:t>
             </a:r>
-            <a:endParaRPr lang="en-US" dirty="0"/>
+            <a:endParaRPr lang="en-US" dirty="false"/>
           </a:p>
         </p:txBody>
       </p:sp>
     </p:spTree>
     <p:extLst>
       <p:ext uri="{BB962C8B-B14F-4D97-AF65-F5344CB8AC3E}">
-        <p14:creationId xmlns:p14="http://schemas.microsoft.com/office/powerpoint/2010/main" val="2124837561"/>
+        <p14:creationId xmlns:p14="http://schemas.microsoft.com/office/powerpoint/2010/main" xmlns:v="urn:schemas-microsoft-com:vml" val="2124837561"/>
       </p:ext>
     </p:extLst>
   </p:cSld>
@@ -3172,7 +3172,7 @@
 </file>
 
 <file path=ppt/slideLayouts/slideLayout7.xml><?xml version="1.0" encoding="utf-8"?>
-<p:sldLayout xmlns:a="http://schemas.openxmlformats.org/drawingml/2006/main" xmlns:r="http://schemas.openxmlformats.org/officeDocument/2006/relationships" xmlns:p="http://schemas.openxmlformats.org/presentationml/2006/main" preserve="1" userDrawn="1">
+<p:sldLayout xmlns:v="urn:schemas-microsoft-com:vml" xmlns:a="http://schemas.openxmlformats.org/drawingml/2006/main" xmlns:c="http://schemas.openxmlformats.org/drawingml/2006/chart" xmlns:xdr="http://schemas.openxmlformats.org/drawingml/2006/spreadsheetDrawing" xmlns:dgm="http://schemas.openxmlformats.org/drawingml/2006/diagram" xmlns:pic="http://schemas.openxmlformats.org/drawingml/2006/picture" xmlns:wp14="http://schemas.microsoft.com/office/word/2010/wordprocessingDrawing" xmlns:p="http://schemas.openxmlformats.org/presentationml/2006/main" xmlns:ns6="http://schemas.openxmlformats.org/drawingml/2006/chartDrawing" xmlns:r="http://schemas.openxmlformats.org/officeDocument/2006/relationships" xmlns:ns13="http://schemas.openxmlformats.org/drawingml/2006/lockedCanvas" xmlns:ns12="http://schemas.openxmlformats.org/drawingml/2006/compatibility" xmlns:mc="http://schemas.openxmlformats.org/markup-compatibility/2006" xmlns:wp="http://schemas.openxmlformats.org/drawingml/2006/wordprocessingDrawing" preserve="true" userDrawn="true">
   <p:cSld name="Title and Content">
     <p:spTree>
       <p:nvGrpSpPr>
@@ -3192,7 +3192,7 @@
         <p:nvSpPr>
           <p:cNvPr id="2" name="Title 1"/>
           <p:cNvSpPr>
-            <a:spLocks noGrp="1"/>
+            <a:spLocks noGrp="true"/>
           </p:cNvSpPr>
           <p:nvPr>
             <p:ph type="title"/>
@@ -3204,10 +3204,10 @@
           <a:lstStyle/>
           <a:p>
             <a:r>
-              <a:rPr lang="en-US" smtClean="0"/>
+              <a:rPr lang="en-US" smtClean="false"/>
               <a:t>Click to edit Master title style</a:t>
             </a:r>
-            <a:endParaRPr lang="en-US" dirty="0"/>
+            <a:endParaRPr lang="en-US" dirty="false"/>
           </a:p>
         </p:txBody>
       </p:sp>
@@ -3215,7 +3215,7 @@
         <p:nvCxnSpPr>
           <p:cNvPr id="6" name="Straight Connector 5"/>
           <p:cNvCxnSpPr/>
-          <p:nvPr userDrawn="1"/>
+          <p:nvPr userDrawn="true"/>
         </p:nvCxnSpPr>
         <p:spPr>
           <a:xfrm>
@@ -3251,7 +3251,7 @@
         <p:nvCxnSpPr>
           <p:cNvPr id="10" name="Straight Connector 9"/>
           <p:cNvCxnSpPr/>
-          <p:nvPr userDrawn="1"/>
+          <p:nvPr userDrawn="true"/>
         </p:nvCxnSpPr>
         <p:spPr>
           <a:xfrm>
@@ -3287,7 +3287,7 @@
         <p:nvSpPr>
           <p:cNvPr id="8" name="Content Placeholder 2"/>
           <p:cNvSpPr>
-            <a:spLocks noGrp="1"/>
+            <a:spLocks noGrp="true"/>
           </p:cNvSpPr>
           <p:nvPr>
             <p:ph idx="1"/>
@@ -3327,28 +3327,28 @@
           <a:p>
             <a:pPr lvl="0"/>
             <a:r>
-              <a:rPr lang="en-US" smtClean="0"/>
+              <a:rPr lang="en-US" smtClean="false"/>
               <a:t>Click to edit Master text styles</a:t>
             </a:r>
           </a:p>
           <a:p>
             <a:pPr lvl="1"/>
             <a:r>
-              <a:rPr lang="en-US" smtClean="0"/>
+              <a:rPr lang="en-US" smtClean="false"/>
               <a:t>Second level</a:t>
             </a:r>
           </a:p>
           <a:p>
             <a:pPr lvl="2"/>
             <a:r>
-              <a:rPr lang="en-US" smtClean="0"/>
+              <a:rPr lang="en-US" smtClean="false"/>
               <a:t>Third level</a:t>
             </a:r>
           </a:p>
           <a:p>
             <a:pPr lvl="3"/>
             <a:r>
-              <a:rPr lang="en-US" smtClean="0"/>
+              <a:rPr lang="en-US" smtClean="false"/>
               <a:t>Fourth level</a:t>
             </a:r>
           </a:p>
@@ -3357,7 +3357,7 @@
     </p:spTree>
     <p:extLst>
       <p:ext uri="{BB962C8B-B14F-4D97-AF65-F5344CB8AC3E}">
-        <p14:creationId xmlns:p14="http://schemas.microsoft.com/office/powerpoint/2010/main" val="3508459060"/>
+        <p14:creationId xmlns:p14="http://schemas.microsoft.com/office/powerpoint/2010/main" xmlns:v="urn:schemas-microsoft-com:vml" val="3508459060"/>
       </p:ext>
     </p:extLst>
   </p:cSld>
@@ -3662,7 +3662,7 @@
 </file>
 
 <file path=ppt/slideMasters/slideMaster1.xml><?xml version="1.0" encoding="utf-8"?>
-<p:sldMaster xmlns:a="http://schemas.openxmlformats.org/drawingml/2006/main" xmlns:r="http://schemas.openxmlformats.org/officeDocument/2006/relationships" xmlns:p="http://schemas.openxmlformats.org/presentationml/2006/main">
+<p:sldMaster xmlns:v="urn:schemas-microsoft-com:vml" xmlns:a="http://schemas.openxmlformats.org/drawingml/2006/main" xmlns:c="http://schemas.openxmlformats.org/drawingml/2006/chart" xmlns:xdr="http://schemas.openxmlformats.org/drawingml/2006/spreadsheetDrawing" xmlns:dgm="http://schemas.openxmlformats.org/drawingml/2006/diagram" xmlns:pic="http://schemas.openxmlformats.org/drawingml/2006/picture" xmlns:wp14="http://schemas.microsoft.com/office/word/2010/wordprocessingDrawing" xmlns:p="http://schemas.openxmlformats.org/presentationml/2006/main" xmlns:ns6="http://schemas.openxmlformats.org/drawingml/2006/chartDrawing" xmlns:r="http://schemas.openxmlformats.org/officeDocument/2006/relationships" xmlns:ns13="http://schemas.openxmlformats.org/drawingml/2006/lockedCanvas" xmlns:ns12="http://schemas.openxmlformats.org/drawingml/2006/compatibility" xmlns:mc="http://schemas.openxmlformats.org/markup-compatibility/2006" xmlns:wp="http://schemas.openxmlformats.org/drawingml/2006/wordprocessingDrawing">
   <p:cSld>
     <p:bg>
       <p:bgPr>
@@ -3690,7 +3690,7 @@
         <p:nvSpPr>
           <p:cNvPr id="2" name="Title Placeholder 1"/>
           <p:cNvSpPr>
-            <a:spLocks noGrp="1"/>
+            <a:spLocks noGrp="true"/>
           </p:cNvSpPr>
           <p:nvPr>
             <p:ph type="title"/>
@@ -3706,16 +3706,16 @@
           </a:prstGeom>
         </p:spPr>
         <p:txBody>
-          <a:bodyPr vert="horz" lIns="91440" tIns="45720" rIns="91440" bIns="45720" rtlCol="0" anchor="t">
+          <a:bodyPr vert="horz" lIns="91440" tIns="45720" rIns="91440" bIns="45720" rtlCol="false" anchor="t">
             <a:noAutofit/>
           </a:bodyPr>
           <a:lstStyle/>
           <a:p>
             <a:r>
-              <a:rPr lang="en-US" smtClean="0"/>
+              <a:rPr lang="en-US" smtClean="false"/>
               <a:t>Click to edit Master title style</a:t>
             </a:r>
-            <a:endParaRPr lang="en-US" dirty="0"/>
+            <a:endParaRPr lang="en-US" dirty="false"/>
           </a:p>
         </p:txBody>
       </p:sp>
@@ -3723,7 +3723,7 @@
         <p:nvSpPr>
           <p:cNvPr id="3" name="Text Placeholder 2"/>
           <p:cNvSpPr>
-            <a:spLocks noGrp="1"/>
+            <a:spLocks noGrp="true"/>
           </p:cNvSpPr>
           <p:nvPr>
             <p:ph type="body" idx="1"/>
@@ -3739,35 +3739,35 @@
           </a:prstGeom>
         </p:spPr>
         <p:txBody>
-          <a:bodyPr vert="horz" lIns="91440" tIns="45720" rIns="91440" bIns="45720" rtlCol="0">
+          <a:bodyPr vert="horz" lIns="91440" tIns="45720" rIns="91440" bIns="45720" rtlCol="false">
             <a:noAutofit/>
           </a:bodyPr>
           <a:lstStyle/>
           <a:p>
             <a:pPr lvl="0"/>
             <a:r>
-              <a:rPr lang="en-US" dirty="0" smtClean="0"/>
+              <a:rPr lang="en-US" dirty="false" smtClean="false"/>
               <a:t>Click to edit Master text styles</a:t>
             </a:r>
           </a:p>
           <a:p>
             <a:pPr lvl="1"/>
             <a:r>
-              <a:rPr lang="en-US" dirty="0" smtClean="0"/>
+              <a:rPr lang="en-US" dirty="false" smtClean="false"/>
               <a:t>Level 1</a:t>
             </a:r>
           </a:p>
           <a:p>
             <a:pPr lvl="2"/>
             <a:r>
-              <a:rPr lang="en-US" dirty="0" smtClean="0"/>
+              <a:rPr lang="en-US" dirty="false" smtClean="false"/>
               <a:t>Level 2</a:t>
             </a:r>
           </a:p>
           <a:p>
             <a:pPr lvl="3"/>
             <a:r>
-              <a:rPr lang="en-US" dirty="0" smtClean="0"/>
+              <a:rPr lang="en-US" dirty="false" smtClean="false"/>
               <a:t>Level 3</a:t>
             </a:r>
           </a:p>
@@ -3813,7 +3813,7 @@
         <p:nvPicPr>
           <p:cNvPr id="9" name="Picture 8"/>
           <p:cNvPicPr>
-            <a:picLocks noChangeAspect="1"/>
+            <a:picLocks noChangeAspect="true"/>
           </p:cNvPicPr>
           <p:nvPr/>
         </p:nvPicPr>
@@ -3821,7 +3821,7 @@
           <a:blip r:embed="rId12">
             <a:extLst>
               <a:ext uri="{28A0092B-C50C-407E-A947-70E740481C1C}">
-                <a14:useLocalDpi xmlns:a14="http://schemas.microsoft.com/office/drawing/2010/main" val="0"/>
+                <a14:useLocalDpi xmlns:a14="http://schemas.microsoft.com/office/drawing/2010/main" xmlns:v="urn:schemas-microsoft-com:vml" val="0"/>
               </a:ext>
             </a:extLst>
           </a:blip>
@@ -3878,10 +3878,10 @@
       <p:sp>
         <p:nvSpPr>
           <p:cNvPr id="13" name="Footer Placeholder 10"/>
-          <p:cNvSpPr txBox="1">
+          <p:cNvSpPr txBox="true">
             <a:spLocks/>
           </p:cNvSpPr>
-          <p:nvPr userDrawn="1"/>
+          <p:nvPr userDrawn="true"/>
         </p:nvSpPr>
         <p:spPr>
           <a:xfrm>
@@ -3893,12 +3893,12 @@
           </a:prstGeom>
         </p:spPr>
         <p:txBody>
-          <a:bodyPr vert="horz" lIns="91440" tIns="45720" rIns="91440" bIns="45720" rtlCol="0" anchor="ctr"/>
+          <a:bodyPr vert="horz" lIns="91440" tIns="45720" rIns="91440" bIns="45720" rtlCol="false" anchor="ctr"/>
           <a:lstStyle>
             <a:defPPr>
               <a:defRPr lang="en-US"/>
             </a:defPPr>
-            <a:lvl1pPr marL="0" algn="l" defTabSz="457200" rtl="0" eaLnBrk="1" latinLnBrk="0" hangingPunct="1">
+            <a:lvl1pPr marL="0" algn="l" defTabSz="457200" rtl="false" eaLnBrk="true" latinLnBrk="false" hangingPunct="true">
               <a:defRPr sz="800" kern="1200">
                 <a:solidFill>
                   <a:schemeClr val="tx1">
@@ -3910,7 +3910,7 @@
                 <a:cs typeface="+mn-cs"/>
               </a:defRPr>
             </a:lvl1pPr>
-            <a:lvl2pPr marL="457200" algn="l" defTabSz="457200" rtl="0" eaLnBrk="1" latinLnBrk="0" hangingPunct="1">
+            <a:lvl2pPr marL="457200" algn="l" defTabSz="457200" rtl="false" eaLnBrk="true" latinLnBrk="false" hangingPunct="true">
               <a:defRPr sz="1800" kern="1200">
                 <a:solidFill>
                   <a:schemeClr val="tx1"/>
@@ -3920,7 +3920,7 @@
                 <a:cs typeface="+mn-cs"/>
               </a:defRPr>
             </a:lvl2pPr>
-            <a:lvl3pPr marL="914400" algn="l" defTabSz="457200" rtl="0" eaLnBrk="1" latinLnBrk="0" hangingPunct="1">
+            <a:lvl3pPr marL="914400" algn="l" defTabSz="457200" rtl="false" eaLnBrk="true" latinLnBrk="false" hangingPunct="true">
               <a:defRPr sz="1800" kern="1200">
                 <a:solidFill>
                   <a:schemeClr val="tx1"/>
@@ -3930,7 +3930,7 @@
                 <a:cs typeface="+mn-cs"/>
               </a:defRPr>
             </a:lvl3pPr>
-            <a:lvl4pPr marL="1371600" algn="l" defTabSz="457200" rtl="0" eaLnBrk="1" latinLnBrk="0" hangingPunct="1">
+            <a:lvl4pPr marL="1371600" algn="l" defTabSz="457200" rtl="false" eaLnBrk="true" latinLnBrk="false" hangingPunct="true">
               <a:defRPr sz="1800" kern="1200">
                 <a:solidFill>
                   <a:schemeClr val="tx1"/>
@@ -3940,7 +3940,7 @@
                 <a:cs typeface="+mn-cs"/>
               </a:defRPr>
             </a:lvl4pPr>
-            <a:lvl5pPr marL="1828800" algn="l" defTabSz="457200" rtl="0" eaLnBrk="1" latinLnBrk="0" hangingPunct="1">
+            <a:lvl5pPr marL="1828800" algn="l" defTabSz="457200" rtl="false" eaLnBrk="true" latinLnBrk="false" hangingPunct="true">
               <a:defRPr sz="1800" kern="1200">
                 <a:solidFill>
                   <a:schemeClr val="tx1"/>
@@ -3950,7 +3950,7 @@
                 <a:cs typeface="+mn-cs"/>
               </a:defRPr>
             </a:lvl5pPr>
-            <a:lvl6pPr marL="2286000" algn="l" defTabSz="457200" rtl="0" eaLnBrk="1" latinLnBrk="0" hangingPunct="1">
+            <a:lvl6pPr marL="2286000" algn="l" defTabSz="457200" rtl="false" eaLnBrk="true" latinLnBrk="false" hangingPunct="true">
               <a:defRPr sz="1800" kern="1200">
                 <a:solidFill>
                   <a:schemeClr val="tx1"/>
@@ -3960,7 +3960,7 @@
                 <a:cs typeface="+mn-cs"/>
               </a:defRPr>
             </a:lvl6pPr>
-            <a:lvl7pPr marL="2743200" algn="l" defTabSz="457200" rtl="0" eaLnBrk="1" latinLnBrk="0" hangingPunct="1">
+            <a:lvl7pPr marL="2743200" algn="l" defTabSz="457200" rtl="false" eaLnBrk="true" latinLnBrk="false" hangingPunct="true">
               <a:defRPr sz="1800" kern="1200">
                 <a:solidFill>
                   <a:schemeClr val="tx1"/>
@@ -3970,7 +3970,7 @@
                 <a:cs typeface="+mn-cs"/>
               </a:defRPr>
             </a:lvl7pPr>
-            <a:lvl8pPr marL="3200400" algn="l" defTabSz="457200" rtl="0" eaLnBrk="1" latinLnBrk="0" hangingPunct="1">
+            <a:lvl8pPr marL="3200400" algn="l" defTabSz="457200" rtl="false" eaLnBrk="true" latinLnBrk="false" hangingPunct="true">
               <a:defRPr sz="1800" kern="1200">
                 <a:solidFill>
                   <a:schemeClr val="tx1"/>
@@ -3980,7 +3980,7 @@
                 <a:cs typeface="+mn-cs"/>
               </a:defRPr>
             </a:lvl8pPr>
-            <a:lvl9pPr marL="3657600" algn="l" defTabSz="457200" rtl="0" eaLnBrk="1" latinLnBrk="0" hangingPunct="1">
+            <a:lvl9pPr marL="3657600" algn="l" defTabSz="457200" rtl="false" eaLnBrk="true" latinLnBrk="false" hangingPunct="true">
               <a:defRPr sz="1800" kern="1200">
                 <a:solidFill>
                   <a:schemeClr val="tx1"/>
@@ -3994,14 +3994,14 @@
           <a:p>
             <a:pPr algn="r"/>
             <a:fld id="{78CCA2CA-1B45-4AF7-8183-FFFEE66DD4C1}" type="slidenum">
-              <a:rPr lang="en-US" b="1" smtClean="0">
+              <a:rPr lang="en-US" b="true" smtClean="false">
                 <a:solidFill>
                   <a:schemeClr val="tx1"/>
                 </a:solidFill>
               </a:rPr>
               <a:t>‹N°›</a:t>
             </a:fld>
-            <a:endParaRPr lang="en-US" b="1" dirty="0">
+            <a:endParaRPr lang="en-US" b="true" dirty="false">
               <a:solidFill>
                 <a:schemeClr val="tx1"/>
               </a:solidFill>
@@ -4012,8 +4012,8 @@
       <p:sp>
         <p:nvSpPr>
           <p:cNvPr id="4" name="TextBox 3"/>
-          <p:cNvSpPr txBox="1"/>
-          <p:nvPr userDrawn="1"/>
+          <p:cNvSpPr txBox="true"/>
+          <p:nvPr userDrawn="true"/>
         </p:nvSpPr>
         <p:spPr>
           <a:xfrm>
@@ -4026,12 +4026,12 @@
           <a:noFill/>
         </p:spPr>
         <p:txBody>
-          <a:bodyPr wrap="square" rtlCol="0">
+          <a:bodyPr wrap="square" rtlCol="false">
             <a:spAutoFit/>
           </a:bodyPr>
           <a:lstStyle/>
           <a:p>
-            <a:pPr marL="0" marR="0" indent="0" algn="l" defTabSz="457200" rtl="0" eaLnBrk="1" fontAlgn="auto" latinLnBrk="0" hangingPunct="1">
+            <a:pPr marL="0" marR="0" indent="0" algn="l" defTabSz="457200" rtl="false" eaLnBrk="true" fontAlgn="auto" latinLnBrk="false" hangingPunct="true">
               <a:lnSpc>
                 <a:spcPct val="100000"/>
               </a:lnSpc>
@@ -4049,7 +4049,7 @@
               <a:defRPr/>
             </a:pPr>
             <a:r>
-              <a:rPr lang="en-US" sz="800" dirty="0" smtClean="0"/>
+              <a:rPr lang="en-US" sz="800" dirty="false" smtClean="false"/>
               <a:t>© 2016 Amazon Web Services, Inc. and its affiliates. All rights reserved.</a:t>
             </a:r>
           </a:p>
@@ -4058,7 +4058,7 @@
     </p:spTree>
     <p:extLst>
       <p:ext uri="{BB962C8B-B14F-4D97-AF65-F5344CB8AC3E}">
-        <p14:creationId xmlns:p14="http://schemas.microsoft.com/office/powerpoint/2010/main" val="14311777"/>
+        <p14:creationId xmlns:p14="http://schemas.microsoft.com/office/powerpoint/2010/main" xmlns:v="urn:schemas-microsoft-com:vml" val="14311777"/>
       </p:ext>
     </p:extLst>
   </p:cSld>
@@ -4082,15 +4082,15 @@
       </p:par>
     </p:tnLst>
   </p:timing>
-  <p:hf sldNum="0" hdr="0" dt="0"/>
+  <p:hf sldNum="false" hdr="false" dt="false"/>
   <p:txStyles>
     <p:titleStyle>
-      <a:lvl1pPr algn="l" defTabSz="457200" rtl="0" eaLnBrk="1" latinLnBrk="0" hangingPunct="1">
+      <a:lvl1pPr algn="l" defTabSz="457200" rtl="false" eaLnBrk="true" latinLnBrk="false" hangingPunct="true">
         <a:spcBef>
           <a:spcPct val="0"/>
         </a:spcBef>
         <a:buNone/>
-        <a:defRPr sz="2400" b="1" i="0" kern="1200">
+        <a:defRPr sz="2400" b="true" i="false" kern="1200">
           <a:solidFill>
             <a:schemeClr val="tx1"/>
           </a:solidFill>
@@ -4101,13 +4101,13 @@
       </a:lvl1pPr>
     </p:titleStyle>
     <p:bodyStyle>
-      <a:lvl1pPr marL="0" indent="0" algn="l" defTabSz="457200" rtl="0" eaLnBrk="1" latinLnBrk="0" hangingPunct="1">
+      <a:lvl1pPr marL="0" indent="0" algn="l" defTabSz="457200" rtl="false" eaLnBrk="true" latinLnBrk="false" hangingPunct="true">
         <a:spcBef>
           <a:spcPct val="20000"/>
         </a:spcBef>
         <a:buFontTx/>
         <a:buNone/>
-        <a:defRPr sz="2400" b="0" i="0" kern="1200">
+        <a:defRPr sz="2400" b="false" i="false" kern="1200">
           <a:solidFill>
             <a:schemeClr val="tx1"/>
           </a:solidFill>
@@ -4116,7 +4116,7 @@
           <a:cs typeface="Arial"/>
         </a:defRPr>
       </a:lvl1pPr>
-      <a:lvl2pPr marL="344488" indent="-341313" algn="l" defTabSz="457200" rtl="0" eaLnBrk="1" latinLnBrk="0" hangingPunct="1">
+      <a:lvl2pPr marL="344488" indent="-341313" algn="l" defTabSz="457200" rtl="false" eaLnBrk="true" latinLnBrk="false" hangingPunct="true">
         <a:spcBef>
           <a:spcPct val="20000"/>
         </a:spcBef>
@@ -4128,7 +4128,7 @@
         <a:buBlip>
           <a:blip r:embed="rId13"/>
         </a:buBlip>
-        <a:defRPr sz="2200" b="0" i="0" kern="1200">
+        <a:defRPr sz="2200" b="false" i="false" kern="1200">
           <a:solidFill>
             <a:schemeClr val="tx1"/>
           </a:solidFill>
@@ -4137,7 +4137,7 @@
           <a:cs typeface="Arial"/>
         </a:defRPr>
       </a:lvl2pPr>
-      <a:lvl3pPr marL="625475" indent="-282575" algn="l" defTabSz="457200" rtl="0" eaLnBrk="1" latinLnBrk="0" hangingPunct="1">
+      <a:lvl3pPr marL="625475" indent="-282575" algn="l" defTabSz="457200" rtl="false" eaLnBrk="true" latinLnBrk="false" hangingPunct="true">
         <a:spcBef>
           <a:spcPct val="20000"/>
         </a:spcBef>
@@ -4146,7 +4146,7 @@
         </a:buClr>
         <a:buFont typeface="Wingdings" panose="05000000000000000000" pitchFamily="2" charset="2"/>
         <a:buChar char="Ø"/>
-        <a:defRPr sz="2000" b="0" i="0" kern="1200" baseline="0">
+        <a:defRPr sz="2000" b="false" i="false" kern="1200" baseline="0">
           <a:solidFill>
             <a:schemeClr val="tx1"/>
           </a:solidFill>
@@ -4155,7 +4155,7 @@
           <a:cs typeface="Arial"/>
         </a:defRPr>
       </a:lvl3pPr>
-      <a:lvl4pPr marL="914400" indent="-222250" algn="l" defTabSz="457200" rtl="0" eaLnBrk="1" latinLnBrk="0" hangingPunct="1">
+      <a:lvl4pPr marL="914400" indent="-222250" algn="l" defTabSz="457200" rtl="false" eaLnBrk="true" latinLnBrk="false" hangingPunct="true">
         <a:spcBef>
           <a:spcPct val="20000"/>
         </a:spcBef>
@@ -4164,7 +4164,7 @@
         </a:buClr>
         <a:buFont typeface="Arial" panose="020B0604020202020204" pitchFamily="34" charset="0"/>
         <a:buChar char="•"/>
-        <a:defRPr sz="1800" b="0" i="0" kern="1200">
+        <a:defRPr sz="1800" b="false" i="false" kern="1200">
           <a:solidFill>
             <a:schemeClr val="tx1"/>
           </a:solidFill>
@@ -4173,13 +4173,13 @@
           <a:cs typeface="Arial"/>
         </a:defRPr>
       </a:lvl4pPr>
-      <a:lvl5pPr marL="2057400" indent="-228600" algn="l" defTabSz="457200" rtl="0" eaLnBrk="1" latinLnBrk="0" hangingPunct="1">
+      <a:lvl5pPr marL="2057400" indent="-228600" algn="l" defTabSz="457200" rtl="false" eaLnBrk="true" latinLnBrk="false" hangingPunct="true">
         <a:spcBef>
           <a:spcPct val="20000"/>
         </a:spcBef>
         <a:buFont typeface="Arial"/>
         <a:buChar char="»"/>
-        <a:defRPr sz="1600" b="0" i="0" kern="1200">
+        <a:defRPr sz="1600" b="false" i="false" kern="1200">
           <a:solidFill>
             <a:srgbClr val="595A5D"/>
           </a:solidFill>
@@ -4188,7 +4188,7 @@
           <a:cs typeface="Arial"/>
         </a:defRPr>
       </a:lvl5pPr>
-      <a:lvl6pPr marL="2514600" indent="-228600" algn="l" defTabSz="457200" rtl="0" eaLnBrk="1" latinLnBrk="0" hangingPunct="1">
+      <a:lvl6pPr marL="2514600" indent="-228600" algn="l" defTabSz="457200" rtl="false" eaLnBrk="true" latinLnBrk="false" hangingPunct="true">
         <a:spcBef>
           <a:spcPct val="20000"/>
         </a:spcBef>
@@ -4203,7 +4203,7 @@
           <a:cs typeface="+mn-cs"/>
         </a:defRPr>
       </a:lvl6pPr>
-      <a:lvl7pPr marL="2971800" indent="-228600" algn="l" defTabSz="457200" rtl="0" eaLnBrk="1" latinLnBrk="0" hangingPunct="1">
+      <a:lvl7pPr marL="2971800" indent="-228600" algn="l" defTabSz="457200" rtl="false" eaLnBrk="true" latinLnBrk="false" hangingPunct="true">
         <a:spcBef>
           <a:spcPct val="20000"/>
         </a:spcBef>
@@ -4218,7 +4218,7 @@
           <a:cs typeface="+mn-cs"/>
         </a:defRPr>
       </a:lvl7pPr>
-      <a:lvl8pPr marL="3429000" indent="-228600" algn="l" defTabSz="457200" rtl="0" eaLnBrk="1" latinLnBrk="0" hangingPunct="1">
+      <a:lvl8pPr marL="3429000" indent="-228600" algn="l" defTabSz="457200" rtl="false" eaLnBrk="true" latinLnBrk="false" hangingPunct="true">
         <a:spcBef>
           <a:spcPct val="20000"/>
         </a:spcBef>
@@ -4233,7 +4233,7 @@
           <a:cs typeface="+mn-cs"/>
         </a:defRPr>
       </a:lvl8pPr>
-      <a:lvl9pPr marL="3886200" indent="-228600" algn="l" defTabSz="457200" rtl="0" eaLnBrk="1" latinLnBrk="0" hangingPunct="1">
+      <a:lvl9pPr marL="3886200" indent="-228600" algn="l" defTabSz="457200" rtl="false" eaLnBrk="true" latinLnBrk="false" hangingPunct="true">
         <a:spcBef>
           <a:spcPct val="20000"/>
         </a:spcBef>
@@ -4253,7 +4253,7 @@
       <a:defPPr>
         <a:defRPr lang="en-US"/>
       </a:defPPr>
-      <a:lvl1pPr marL="0" algn="l" defTabSz="457200" rtl="0" eaLnBrk="1" latinLnBrk="0" hangingPunct="1">
+      <a:lvl1pPr marL="0" algn="l" defTabSz="457200" rtl="false" eaLnBrk="true" latinLnBrk="false" hangingPunct="true">
         <a:defRPr sz="1800" kern="1200">
           <a:solidFill>
             <a:schemeClr val="tx1"/>
@@ -4263,7 +4263,7 @@
           <a:cs typeface="+mn-cs"/>
         </a:defRPr>
       </a:lvl1pPr>
-      <a:lvl2pPr marL="457200" algn="l" defTabSz="457200" rtl="0" eaLnBrk="1" latinLnBrk="0" hangingPunct="1">
+      <a:lvl2pPr marL="457200" algn="l" defTabSz="457200" rtl="false" eaLnBrk="true" latinLnBrk="false" hangingPunct="true">
         <a:defRPr sz="1800" kern="1200">
           <a:solidFill>
             <a:schemeClr val="tx1"/>
@@ -4273,7 +4273,7 @@
           <a:cs typeface="+mn-cs"/>
         </a:defRPr>
       </a:lvl2pPr>
-      <a:lvl3pPr marL="914400" algn="l" defTabSz="457200" rtl="0" eaLnBrk="1" latinLnBrk="0" hangingPunct="1">
+      <a:lvl3pPr marL="914400" algn="l" defTabSz="457200" rtl="false" eaLnBrk="true" latinLnBrk="false" hangingPunct="true">
         <a:defRPr sz="1800" kern="1200">
           <a:solidFill>
             <a:schemeClr val="tx1"/>
@@ -4283,7 +4283,7 @@
           <a:cs typeface="+mn-cs"/>
         </a:defRPr>
       </a:lvl3pPr>
-      <a:lvl4pPr marL="1371600" algn="l" defTabSz="457200" rtl="0" eaLnBrk="1" latinLnBrk="0" hangingPunct="1">
+      <a:lvl4pPr marL="1371600" algn="l" defTabSz="457200" rtl="false" eaLnBrk="true" latinLnBrk="false" hangingPunct="true">
         <a:defRPr sz="1800" kern="1200">
           <a:solidFill>
             <a:schemeClr val="tx1"/>
@@ -4293,7 +4293,7 @@
           <a:cs typeface="+mn-cs"/>
         </a:defRPr>
       </a:lvl4pPr>
-      <a:lvl5pPr marL="1828800" algn="l" defTabSz="457200" rtl="0" eaLnBrk="1" latinLnBrk="0" hangingPunct="1">
+      <a:lvl5pPr marL="1828800" algn="l" defTabSz="457200" rtl="false" eaLnBrk="true" latinLnBrk="false" hangingPunct="true">
         <a:defRPr sz="1800" kern="1200">
           <a:solidFill>
             <a:schemeClr val="tx1"/>
@@ -4303,7 +4303,7 @@
           <a:cs typeface="+mn-cs"/>
         </a:defRPr>
       </a:lvl5pPr>
-      <a:lvl6pPr marL="2286000" algn="l" defTabSz="457200" rtl="0" eaLnBrk="1" latinLnBrk="0" hangingPunct="1">
+      <a:lvl6pPr marL="2286000" algn="l" defTabSz="457200" rtl="false" eaLnBrk="true" latinLnBrk="false" hangingPunct="true">
         <a:defRPr sz="1800" kern="1200">
           <a:solidFill>
             <a:schemeClr val="tx1"/>
@@ -4313,7 +4313,7 @@
           <a:cs typeface="+mn-cs"/>
         </a:defRPr>
       </a:lvl6pPr>
-      <a:lvl7pPr marL="2743200" algn="l" defTabSz="457200" rtl="0" eaLnBrk="1" latinLnBrk="0" hangingPunct="1">
+      <a:lvl7pPr marL="2743200" algn="l" defTabSz="457200" rtl="false" eaLnBrk="true" latinLnBrk="false" hangingPunct="true">
         <a:defRPr sz="1800" kern="1200">
           <a:solidFill>
             <a:schemeClr val="tx1"/>
@@ -4323,7 +4323,7 @@
           <a:cs typeface="+mn-cs"/>
         </a:defRPr>
       </a:lvl7pPr>
-      <a:lvl8pPr marL="3200400" algn="l" defTabSz="457200" rtl="0" eaLnBrk="1" latinLnBrk="0" hangingPunct="1">
+      <a:lvl8pPr marL="3200400" algn="l" defTabSz="457200" rtl="false" eaLnBrk="true" latinLnBrk="false" hangingPunct="true">
         <a:defRPr sz="1800" kern="1200">
           <a:solidFill>
             <a:schemeClr val="tx1"/>
@@ -4333,7 +4333,7 @@
           <a:cs typeface="+mn-cs"/>
         </a:defRPr>
       </a:lvl8pPr>
-      <a:lvl9pPr marL="3657600" algn="l" defTabSz="457200" rtl="0" eaLnBrk="1" latinLnBrk="0" hangingPunct="1">
+      <a:lvl9pPr marL="3657600" algn="l" defTabSz="457200" rtl="false" eaLnBrk="true" latinLnBrk="false" hangingPunct="true">
         <a:defRPr sz="1800" kern="1200">
           <a:solidFill>
             <a:schemeClr val="tx1"/>
@@ -4345,9 +4345,9 @@
       </a:lvl9pPr>
     </p:otherStyle>
   </p:txStyles>
-  <p:extLst mod="1">
+  <p:extLst mod="true">
     <p:ext uri="{27BBF7A9-308A-43DC-89C8-2F10F3537804}">
-      <p15:sldGuideLst xmlns:p15="http://schemas.microsoft.com/office/powerpoint/2012/main">
+      <p15:sldGuideLst xmlns:p15="http://schemas.microsoft.com/office/powerpoint/2012/main" xmlns:v="urn:schemas-microsoft-com:vml">
         <p15:guide id="1" orient="horz" pos="1620" userDrawn="1">
           <p15:clr>
             <a:srgbClr val="F26B43"/>
@@ -4365,7 +4365,7 @@
 </file>
 
 <file path=ppt/slides/slide1.xml><?xml version="1.0" encoding="utf-8"?>
-<p:sld xmlns:a="http://schemas.openxmlformats.org/drawingml/2006/main" xmlns:r="http://schemas.openxmlformats.org/officeDocument/2006/relationships" xmlns:p="http://schemas.openxmlformats.org/presentationml/2006/main">
+<p:sld xmlns:a="http://schemas.openxmlformats.org/drawingml/2006/main" xmlns:r="http://schemas.openxmlformats.org/officeDocument/2006/relationships" xmlns:p="http://schemas.openxmlformats.org/presentationml/2006/main" xmlns:mc="http://schemas.openxmlformats.org/markup-compatibility/2006" xmlns:c="http://schemas.openxmlformats.org/drawingml/2006/chart" xmlns:ns6="http://schemas.openxmlformats.org/drawingml/2006/chartDrawing" xmlns:dgm="http://schemas.openxmlformats.org/drawingml/2006/diagram" xmlns:pic="http://schemas.openxmlformats.org/drawingml/2006/picture" xmlns:wp="http://schemas.openxmlformats.org/drawingml/2006/wordprocessingDrawing" xmlns:wp14="http://schemas.microsoft.com/office/word/2010/wordprocessingDrawing" xmlns:xdr="http://schemas.openxmlformats.org/drawingml/2006/spreadsheetDrawing" xmlns:ns12="http://schemas.openxmlformats.org/drawingml/2006/compatibility" xmlns:ns13="http://schemas.openxmlformats.org/drawingml/2006/lockedCanvas" xmlns:v="urn:schemas-microsoft-com:vml">
   <p:cSld>
     <p:spTree>
       <p:nvGrpSpPr>
@@ -4385,7 +4385,7 @@
         <p:nvSpPr>
           <p:cNvPr id="2" name="Title 1"/>
           <p:cNvSpPr>
-            <a:spLocks noGrp="1"/>
+            <a:spLocks noGrp="true"/>
           </p:cNvSpPr>
           <p:nvPr>
             <p:ph type="title"/>
@@ -4397,10 +4397,10 @@
           <a:lstStyle/>
           <a:p>
             <a:r>
-              <a:rPr lang="en-US" dirty="0" smtClean="0"/>
+              <a:rPr lang="en-US" dirty="false" smtClean="false"/>
               <a:t>Module 01: Core AWS Knowledge</a:t>
             </a:r>
-            <a:endParaRPr lang="en-US" dirty="0"/>
+            <a:endParaRPr lang="en-US" dirty="false"/>
           </a:p>
         </p:txBody>
       </p:sp>
@@ -4425,7 +4425,7 @@
 </file>
 
 <file path=ppt/slides/slide2.xml><?xml version="1.0" encoding="utf-8"?>
-<p:sld xmlns:a="http://schemas.openxmlformats.org/drawingml/2006/main" xmlns:r="http://schemas.openxmlformats.org/officeDocument/2006/relationships" xmlns:p="http://schemas.openxmlformats.org/presentationml/2006/main">
+<p:sld xmlns:a="http://schemas.openxmlformats.org/drawingml/2006/main" xmlns:r="http://schemas.openxmlformats.org/officeDocument/2006/relationships" xmlns:p="http://schemas.openxmlformats.org/presentationml/2006/main" xmlns:mc="http://schemas.openxmlformats.org/markup-compatibility/2006" xmlns:c="http://schemas.openxmlformats.org/drawingml/2006/chart" xmlns:ns6="http://schemas.openxmlformats.org/drawingml/2006/chartDrawing" xmlns:dgm="http://schemas.openxmlformats.org/drawingml/2006/diagram" xmlns:pic="http://schemas.openxmlformats.org/drawingml/2006/picture" xmlns:wp="http://schemas.openxmlformats.org/drawingml/2006/wordprocessingDrawing" xmlns:wp14="http://schemas.microsoft.com/office/word/2010/wordprocessingDrawing" xmlns:xdr="http://schemas.openxmlformats.org/drawingml/2006/spreadsheetDrawing" xmlns:ns12="http://schemas.openxmlformats.org/drawingml/2006/compatibility" xmlns:ns13="http://schemas.openxmlformats.org/drawingml/2006/lockedCanvas" xmlns:v="urn:schemas-microsoft-com:vml">
   <p:cSld>
     <p:spTree>
       <p:nvGrpSpPr>
@@ -4445,7 +4445,7 @@
         <p:nvSpPr>
           <p:cNvPr id="4" name="Title 3"/>
           <p:cNvSpPr>
-            <a:spLocks noGrp="1"/>
+            <a:spLocks noGrp="true"/>
           </p:cNvSpPr>
           <p:nvPr>
             <p:ph type="title"/>
@@ -4460,7 +4460,7 @@
               <a:rPr lang="en-US"/>
               <a:t>What Exactly Is Cloud Computing ?</a:t>
             </a:r>
-            <a:endParaRPr lang="en-US" dirty="0"/>
+            <a:endParaRPr lang="en-US" dirty="false"/>
           </a:p>
         </p:txBody>
       </p:sp>
@@ -4468,7 +4468,7 @@
         <p:nvSpPr>
           <p:cNvPr id="7" name="Content Placeholder 6"/>
           <p:cNvSpPr>
-            <a:spLocks noGrp="1"/>
+            <a:spLocks noGrp="true"/>
           </p:cNvSpPr>
           <p:nvPr>
             <p:ph idx="1"/>
@@ -4485,40 +4485,40 @@
           <a:lstStyle/>
           <a:p>
             <a:r>
-              <a:rPr lang="en-US" sz="2000" dirty="0" smtClean="0"/>
+              <a:rPr lang="en-US" sz="2000" dirty="false" smtClean="false"/>
               <a:t>"Cloud computing" is a term broadly used to define the </a:t>
             </a:r>
             <a:r>
-              <a:rPr lang="en-US" sz="2000" b="1" i="1" dirty="0" smtClean="0"/>
+              <a:rPr lang="en-US" sz="2000" b="true" i="true" dirty="false" smtClean="false"/>
               <a:t>on-demand</a:t>
             </a:r>
             <a:r>
-              <a:rPr lang="en-US" sz="2000" i="1" dirty="0" smtClean="0"/>
+              <a:rPr lang="en-US" sz="2000" i="true" dirty="false" smtClean="false"/>
               <a:t> </a:t>
             </a:r>
             <a:r>
-              <a:rPr lang="en-US" sz="2000" dirty="0" smtClean="0"/>
+              <a:rPr lang="en-US" sz="2000" dirty="false" smtClean="false"/>
               <a:t>delivery of IT resources and applications </a:t>
             </a:r>
             <a:r>
-              <a:rPr lang="en-US" sz="2000" b="1" i="1" dirty="0" smtClean="0"/>
+              <a:rPr lang="en-US" sz="2000" b="true" i="true" dirty="false" smtClean="false"/>
               <a:t>via the Internet</a:t>
             </a:r>
             <a:r>
-              <a:rPr lang="en-US" sz="2000" dirty="0" smtClean="0"/>
+              <a:rPr lang="en-US" sz="2000" dirty="false" smtClean="false"/>
               <a:t>, with </a:t>
             </a:r>
             <a:r>
-              <a:rPr lang="en-US" sz="2000" b="1" i="1" dirty="0" smtClean="0"/>
+              <a:rPr lang="en-US" sz="2000" b="true" i="true" dirty="false" smtClean="false"/>
               <a:t>pay-as-you-go</a:t>
             </a:r>
             <a:r>
-              <a:rPr lang="en-US" sz="2000" dirty="0" smtClean="0"/>
+              <a:rPr lang="en-US" sz="2000" dirty="false" smtClean="false"/>
               <a:t> pricing.</a:t>
             </a:r>
           </a:p>
           <a:p>
-            <a:endParaRPr lang="en-US" dirty="0"/>
+            <a:endParaRPr lang="en-US" dirty="false"/>
           </a:p>
         </p:txBody>
       </p:sp>
@@ -4526,7 +4526,7 @@
         <p:nvPicPr>
           <p:cNvPr id="3" name="Picture 5"/>
           <p:cNvPicPr>
-            <a:picLocks noChangeAspect="1"/>
+            <a:picLocks noChangeAspect="true"/>
           </p:cNvPicPr>
           <p:nvPr/>
         </p:nvPicPr>

</xml_diff>

<commit_message>
Comments are copy from doc to doc
</commit_message>
<xml_diff>
--- a/sample-docs/pptx-copy.pptx
+++ b/sample-docs/pptx-copy.pptx
@@ -362,7 +362,7 @@
           <a:p>
             <a:fld id="{2ED4DAAF-DBCD-4337-9277-0A528F50CD79}" type="datetimeFigureOut">
               <a:rPr lang="en-US" smtClean="0"/>
-              <a:t>12/30/2016</a:t>
+              <a:t>2/1/2017</a:t>
             </a:fld>
             <a:endParaRPr lang="en-US"/>
           </a:p>
@@ -735,25 +735,87 @@
           <a:p>
             <a:pPr eaLnBrk="true" hangingPunct="true"/>
             <a:r>
-              <a:rPr lang="en-US" smtClean="false">
-                <a:latin typeface="Arial"/>
-                <a:cs typeface="Arial"/>
-              </a:rPr>
-              <a:t>Commentaire</a:t>
-            </a:r>
-            <a:r>
-              <a:rPr lang="en-US" baseline="0" smtClean="false">
-                <a:latin typeface="Arial"/>
-                <a:cs typeface="Arial"/>
-              </a:rPr>
-              <a:t> </a:t>
-            </a:r>
-            <a:r>
-              <a:rPr lang="en-US" baseline="0" dirty="false" smtClean="false">
-                <a:latin typeface="Arial"/>
-                <a:cs typeface="Arial"/>
-              </a:rPr>
-              <a:t>de la version copy</a:t>
+              <a:t>C’est quoi le clou(d) ?</a:t>
+            </a:r>
+            <a:endParaRPr lang="en-US" dirty="false" smtClean="false">
+              <a:latin typeface="Arial"/>
+              <a:cs typeface="Arial"/>
+            </a:endParaRPr>
+          </a:p>
+          <a:p>
+            <a:pPr eaLnBrk="true" hangingPunct="true"/>
+            <a:r>
+              <a:t>=== Original comments from F:\users\mbojoly\Documents\MBO\Projets\copypptxnotes/sample-docs/pptx-copy.pptx===</a:t>
+            </a:r>
+            <a:endParaRPr lang="en-US" dirty="false" smtClean="false">
+              <a:latin typeface="Arial"/>
+              <a:cs typeface="Arial"/>
+            </a:endParaRPr>
+          </a:p>
+          <a:p>
+            <a:pPr eaLnBrk="true" hangingPunct="true"/>
+            <a:r>
+              <a:t>C’est quoi le clou(d) ?</a:t>
+            </a:r>
+            <a:endParaRPr lang="en-US" dirty="false" smtClean="false">
+              <a:latin typeface="Arial"/>
+              <a:cs typeface="Arial"/>
+            </a:endParaRPr>
+          </a:p>
+          <a:p>
+            <a:pPr eaLnBrk="true" hangingPunct="true"/>
+            <a:r>
+              <a:t>=== Original comments from F:\users\mbojoly\Documents\MBO\Projets\copypptxnotes/sample-docs/pptx-copy.pptx===</a:t>
+            </a:r>
+            <a:endParaRPr lang="en-US" dirty="false" smtClean="false">
+              <a:latin typeface="Arial"/>
+              <a:cs typeface="Arial"/>
+            </a:endParaRPr>
+          </a:p>
+          <a:p>
+            <a:pPr eaLnBrk="true" hangingPunct="true"/>
+            <a:r>
+              <a:t>C’est quoi le clou(d) ?</a:t>
+            </a:r>
+            <a:endParaRPr lang="en-US" dirty="false" smtClean="false">
+              <a:latin typeface="Arial"/>
+              <a:cs typeface="Arial"/>
+            </a:endParaRPr>
+          </a:p>
+          <a:p>
+            <a:pPr eaLnBrk="true" hangingPunct="true"/>
+            <a:r>
+              <a:t>=== Original comments from F:\users\mbojoly\Documents\MBO\Projets\copypptxnotes/sample-docs/pptx-copy.pptx===</a:t>
+            </a:r>
+            <a:endParaRPr lang="en-US" dirty="false" smtClean="false">
+              <a:latin typeface="Arial"/>
+              <a:cs typeface="Arial"/>
+            </a:endParaRPr>
+          </a:p>
+          <a:p>
+            <a:pPr eaLnBrk="true" hangingPunct="true"/>
+            <a:r>
+              <a:t>Paragraph1</a:t>
+            </a:r>
+            <a:endParaRPr lang="en-US" dirty="false" smtClean="false">
+              <a:latin typeface="Arial"/>
+              <a:cs typeface="Arial"/>
+            </a:endParaRPr>
+          </a:p>
+          <a:p>
+            <a:pPr eaLnBrk="true" hangingPunct="true"/>
+            <a:r>
+              <a:t>paragraph2</a:t>
+            </a:r>
+            <a:endParaRPr lang="en-US" dirty="false" smtClean="false">
+              <a:latin typeface="Arial"/>
+              <a:cs typeface="Arial"/>
+            </a:endParaRPr>
+          </a:p>
+          <a:p>
+            <a:pPr eaLnBrk="true" hangingPunct="true"/>
+            <a:r>
+              <a:t>paragraph3</a:t>
             </a:r>
             <a:endParaRPr lang="en-US" dirty="false" smtClean="false">
               <a:latin typeface="Arial"/>
@@ -819,44 +881,754 @@
           <a:bodyPr/>
           <a:lstStyle/>
           <a:p>
-            <a:pPr marL="0" marR="0" lvl="0" indent="0" algn="l" defTabSz="457200" rtl="false" eaLnBrk="true" fontAlgn="auto" latinLnBrk="false" hangingPunct="true">
-              <a:lnSpc>
-                <a:spcPct val="100000"/>
-              </a:lnSpc>
-              <a:spcBef>
-                <a:spcPts val="0"/>
-              </a:spcBef>
-              <a:spcAft>
-                <a:spcPts val="600"/>
-              </a:spcAft>
-              <a:buClrTx/>
-              <a:buSzTx/>
-              <a:buFontTx/>
-              <a:buNone/>
-              <a:tabLst/>
-              <a:defRPr/>
-            </a:pPr>
-            <a:r>
-              <a:rPr lang="en-US" dirty="false" err="true" smtClean="false">
-                <a:latin typeface="Arial"/>
-                <a:cs typeface="Arial"/>
-              </a:rPr>
-              <a:t>Commentaire</a:t>
-            </a:r>
-            <a:r>
-              <a:rPr lang="en-US" baseline="0" dirty="false" smtClean="false">
-                <a:latin typeface="Arial"/>
-                <a:cs typeface="Arial"/>
-              </a:rPr>
-              <a:t> de la version copy</a:t>
-            </a:r>
-            <a:endParaRPr lang="en-US" dirty="false" smtClean="false">
-              <a:latin typeface="Arial"/>
-              <a:cs typeface="Arial"/>
-            </a:endParaRPr>
-          </a:p>
-          <a:p>
-            <a:endParaRPr lang="en-US" dirty="false"/>
+            <a:pPr eaLnBrk="true" hangingPunct="true"/>
+            <a:r>
+              <a:t>Il faut construire un DC, un autre, …</a:t>
+            </a:r>
+            <a:endParaRPr lang="en-US" dirty="false" smtClean="false">
+              <a:latin typeface="Arial"/>
+              <a:cs typeface="Arial"/>
+            </a:endParaRPr>
+          </a:p>
+          <a:p>
+            <a:pPr eaLnBrk="true" hangingPunct="true"/>
+            <a:r>
+              <a:t>On parle de Capital Expense</a:t>
+            </a:r>
+            <a:endParaRPr lang="en-US" dirty="false" smtClean="false">
+              <a:latin typeface="Arial"/>
+              <a:cs typeface="Arial"/>
+            </a:endParaRPr>
+          </a:p>
+          <a:p>
+            <a:pPr eaLnBrk="true" hangingPunct="true"/>
+            <a:r>
+              <a:t/>
+            </a:r>
+            <a:endParaRPr lang="en-US" dirty="false" smtClean="false">
+              <a:latin typeface="Arial"/>
+              <a:cs typeface="Arial"/>
+            </a:endParaRPr>
+          </a:p>
+          <a:p>
+            <a:pPr eaLnBrk="true" hangingPunct="true"/>
+            <a:r>
+              <a:t>Le mode de financement du cloud c’est de l’operational expense</a:t>
+            </a:r>
+            <a:endParaRPr lang="en-US" dirty="false" smtClean="false">
+              <a:latin typeface="Arial"/>
+              <a:cs typeface="Arial"/>
+            </a:endParaRPr>
+          </a:p>
+          <a:p>
+            <a:pPr eaLnBrk="true" hangingPunct="true"/>
+            <a:r>
+              <a:t>On va payer à l’heure de consummation</a:t>
+            </a:r>
+            <a:endParaRPr lang="en-US" dirty="false" smtClean="false">
+              <a:latin typeface="Arial"/>
+              <a:cs typeface="Arial"/>
+            </a:endParaRPr>
+          </a:p>
+          <a:p>
+            <a:pPr eaLnBrk="true" hangingPunct="true"/>
+            <a:r>
+              <a:t>On peut faire le parallèle avec la téléphonie portable : lorsqu’il ne fonctionne plus je le jette et j’en rachète un autre</a:t>
+            </a:r>
+            <a:endParaRPr lang="en-US" dirty="false" smtClean="false">
+              <a:latin typeface="Arial"/>
+              <a:cs typeface="Arial"/>
+            </a:endParaRPr>
+          </a:p>
+          <a:p>
+            <a:pPr eaLnBrk="true" hangingPunct="true"/>
+            <a:r>
+              <a:t/>
+            </a:r>
+            <a:endParaRPr lang="en-US" dirty="false" smtClean="false">
+              <a:latin typeface="Arial"/>
+              <a:cs typeface="Arial"/>
+            </a:endParaRPr>
+          </a:p>
+          <a:p>
+            <a:pPr eaLnBrk="true" hangingPunct="true"/>
+            <a:r>
+              <a:t>Avec quelque chose d’automatiser derrière</a:t>
+            </a:r>
+            <a:endParaRPr lang="en-US" dirty="false" smtClean="false">
+              <a:latin typeface="Arial"/>
+              <a:cs typeface="Arial"/>
+            </a:endParaRPr>
+          </a:p>
+          <a:p>
+            <a:pPr eaLnBrk="true" hangingPunct="true"/>
+            <a:r>
+              <a:t>On va recréer le rack and stack par des instances</a:t>
+            </a:r>
+            <a:endParaRPr lang="en-US" dirty="false" smtClean="false">
+              <a:latin typeface="Arial"/>
+              <a:cs typeface="Arial"/>
+            </a:endParaRPr>
+          </a:p>
+          <a:p>
+            <a:pPr eaLnBrk="true" hangingPunct="true"/>
+            <a:r>
+              <a:t>On appellee cela des instances car on va instancier un materiel</a:t>
+            </a:r>
+            <a:endParaRPr lang="en-US" dirty="false" smtClean="false">
+              <a:latin typeface="Arial"/>
+              <a:cs typeface="Arial"/>
+            </a:endParaRPr>
+          </a:p>
+          <a:p>
+            <a:pPr eaLnBrk="true" hangingPunct="true"/>
+            <a:r>
+              <a:t/>
+            </a:r>
+            <a:endParaRPr lang="en-US" dirty="false" smtClean="false">
+              <a:latin typeface="Arial"/>
+              <a:cs typeface="Arial"/>
+            </a:endParaRPr>
+          </a:p>
+          <a:p>
+            <a:pPr eaLnBrk="true" hangingPunct="true"/>
+            <a:r>
+              <a:t>Quelques soit votre business. Des applications qui suivent vos besoins</a:t>
+            </a:r>
+            <a:endParaRPr lang="en-US" dirty="false" smtClean="false">
+              <a:latin typeface="Arial"/>
+              <a:cs typeface="Arial"/>
+            </a:endParaRPr>
+          </a:p>
+          <a:p>
+            <a:pPr eaLnBrk="true" hangingPunct="true"/>
+            <a:r>
+              <a:t>AWS =&gt; Compute, storage and database </a:t>
+            </a:r>
+            <a:endParaRPr lang="en-US" dirty="false" smtClean="false">
+              <a:latin typeface="Arial"/>
+              <a:cs typeface="Arial"/>
+            </a:endParaRPr>
+          </a:p>
+          <a:p>
+            <a:pPr eaLnBrk="true" hangingPunct="true"/>
+            <a:r>
+              <a:t>No upfront capital exchange</a:t>
+            </a:r>
+            <a:endParaRPr lang="en-US" dirty="false" smtClean="false">
+              <a:latin typeface="Arial"/>
+              <a:cs typeface="Arial"/>
+            </a:endParaRPr>
+          </a:p>
+          <a:p>
+            <a:pPr eaLnBrk="true" hangingPunct="true"/>
+            <a:r>
+              <a:t/>
+            </a:r>
+            <a:endParaRPr lang="en-US" dirty="false" smtClean="false">
+              <a:latin typeface="Arial"/>
+              <a:cs typeface="Arial"/>
+            </a:endParaRPr>
+          </a:p>
+          <a:p>
+            <a:pPr eaLnBrk="true" hangingPunct="true"/>
+            <a:r>
+              <a:t>Economy at scale</a:t>
+            </a:r>
+            <a:endParaRPr lang="en-US" dirty="false" smtClean="false">
+              <a:latin typeface="Arial"/>
+              <a:cs typeface="Arial"/>
+            </a:endParaRPr>
+          </a:p>
+          <a:p>
+            <a:pPr eaLnBrk="true" hangingPunct="true"/>
+            <a:r>
+              <a:t>Add and remove capacity dynamically</a:t>
+            </a:r>
+            <a:endParaRPr lang="en-US" dirty="false" smtClean="false">
+              <a:latin typeface="Arial"/>
+              <a:cs typeface="Arial"/>
+            </a:endParaRPr>
+          </a:p>
+          <a:p>
+            <a:pPr eaLnBrk="true" hangingPunct="true"/>
+            <a:r>
+              <a:t/>
+            </a:r>
+            <a:endParaRPr lang="en-US" dirty="false" smtClean="false">
+              <a:latin typeface="Arial"/>
+              <a:cs typeface="Arial"/>
+            </a:endParaRPr>
+          </a:p>
+          <a:p>
+            <a:pPr eaLnBrk="true" hangingPunct="true"/>
+            <a:r>
+              <a:t>====</a:t>
+            </a:r>
+            <a:endParaRPr lang="en-US" dirty="false" smtClean="false">
+              <a:latin typeface="Arial"/>
+              <a:cs typeface="Arial"/>
+            </a:endParaRPr>
+          </a:p>
+          <a:p>
+            <a:pPr eaLnBrk="true" hangingPunct="true"/>
+            <a:r>
+              <a:t/>
+            </a:r>
+            <a:endParaRPr lang="en-US" dirty="false" smtClean="false">
+              <a:latin typeface="Arial"/>
+              <a:cs typeface="Arial"/>
+            </a:endParaRPr>
+          </a:p>
+          <a:p>
+            <a:pPr eaLnBrk="true" hangingPunct="true"/>
+            <a:r>
+              <a:t>For more on this, see: https://aws.amazon.com/what-is-cloud-computing/</a:t>
+            </a:r>
+            <a:endParaRPr lang="en-US" dirty="false" smtClean="false">
+              <a:latin typeface="Arial"/>
+              <a:cs typeface="Arial"/>
+            </a:endParaRPr>
+          </a:p>
+          <a:p>
+            <a:pPr eaLnBrk="true" hangingPunct="true"/>
+            <a:r>
+              <a:t/>
+            </a:r>
+            <a:endParaRPr lang="en-US" dirty="false" smtClean="false">
+              <a:latin typeface="Arial"/>
+              <a:cs typeface="Arial"/>
+            </a:endParaRPr>
+          </a:p>
+          <a:p>
+            <a:pPr eaLnBrk="true" hangingPunct="true"/>
+            <a:r>
+              <a:t/>
+            </a:r>
+            <a:endParaRPr lang="en-US" dirty="false" smtClean="false">
+              <a:latin typeface="Arial"/>
+              <a:cs typeface="Arial"/>
+            </a:endParaRPr>
+          </a:p>
+          <a:p>
+            <a:pPr eaLnBrk="true" hangingPunct="true"/>
+            <a:r>
+              <a:t>=== Original comments from F:\users\mbojoly\Documents\MBO\Projets\copypptxnotes/sample-docs/pptx-copy.pptx===</a:t>
+            </a:r>
+            <a:endParaRPr lang="en-US" dirty="false" smtClean="false">
+              <a:latin typeface="Arial"/>
+              <a:cs typeface="Arial"/>
+            </a:endParaRPr>
+          </a:p>
+          <a:p>
+            <a:pPr eaLnBrk="true" hangingPunct="true"/>
+            <a:r>
+              <a:t>Il faut construire un DC, un autre, …</a:t>
+            </a:r>
+            <a:endParaRPr lang="en-US" dirty="false" smtClean="false">
+              <a:latin typeface="Arial"/>
+              <a:cs typeface="Arial"/>
+            </a:endParaRPr>
+          </a:p>
+          <a:p>
+            <a:pPr eaLnBrk="true" hangingPunct="true"/>
+            <a:r>
+              <a:t>On parle de Capital Expense</a:t>
+            </a:r>
+            <a:endParaRPr lang="en-US" dirty="false" smtClean="false">
+              <a:latin typeface="Arial"/>
+              <a:cs typeface="Arial"/>
+            </a:endParaRPr>
+          </a:p>
+          <a:p>
+            <a:pPr eaLnBrk="true" hangingPunct="true"/>
+            <a:r>
+              <a:t/>
+            </a:r>
+            <a:endParaRPr lang="en-US" dirty="false" smtClean="false">
+              <a:latin typeface="Arial"/>
+              <a:cs typeface="Arial"/>
+            </a:endParaRPr>
+          </a:p>
+          <a:p>
+            <a:pPr eaLnBrk="true" hangingPunct="true"/>
+            <a:r>
+              <a:t>Le mode de financement du cloud c’est de l’operational expense</a:t>
+            </a:r>
+            <a:endParaRPr lang="en-US" dirty="false" smtClean="false">
+              <a:latin typeface="Arial"/>
+              <a:cs typeface="Arial"/>
+            </a:endParaRPr>
+          </a:p>
+          <a:p>
+            <a:pPr eaLnBrk="true" hangingPunct="true"/>
+            <a:r>
+              <a:t>On va payer à l’heure de consummation</a:t>
+            </a:r>
+            <a:endParaRPr lang="en-US" dirty="false" smtClean="false">
+              <a:latin typeface="Arial"/>
+              <a:cs typeface="Arial"/>
+            </a:endParaRPr>
+          </a:p>
+          <a:p>
+            <a:pPr eaLnBrk="true" hangingPunct="true"/>
+            <a:r>
+              <a:t>On peut faire le parallèle avec la téléphonie portable : lorsqu’il ne fonctionne plus je le jette et j’en rachète un autre</a:t>
+            </a:r>
+            <a:endParaRPr lang="en-US" dirty="false" smtClean="false">
+              <a:latin typeface="Arial"/>
+              <a:cs typeface="Arial"/>
+            </a:endParaRPr>
+          </a:p>
+          <a:p>
+            <a:pPr eaLnBrk="true" hangingPunct="true"/>
+            <a:r>
+              <a:t/>
+            </a:r>
+            <a:endParaRPr lang="en-US" dirty="false" smtClean="false">
+              <a:latin typeface="Arial"/>
+              <a:cs typeface="Arial"/>
+            </a:endParaRPr>
+          </a:p>
+          <a:p>
+            <a:pPr eaLnBrk="true" hangingPunct="true"/>
+            <a:r>
+              <a:t>Avec quelque chose d’automatiser derrière</a:t>
+            </a:r>
+            <a:endParaRPr lang="en-US" dirty="false" smtClean="false">
+              <a:latin typeface="Arial"/>
+              <a:cs typeface="Arial"/>
+            </a:endParaRPr>
+          </a:p>
+          <a:p>
+            <a:pPr eaLnBrk="true" hangingPunct="true"/>
+            <a:r>
+              <a:t>On va recréer le rack and stack par des instances</a:t>
+            </a:r>
+            <a:endParaRPr lang="en-US" dirty="false" smtClean="false">
+              <a:latin typeface="Arial"/>
+              <a:cs typeface="Arial"/>
+            </a:endParaRPr>
+          </a:p>
+          <a:p>
+            <a:pPr eaLnBrk="true" hangingPunct="true"/>
+            <a:r>
+              <a:t>On appellee cela des instances car on va instancier un materiel</a:t>
+            </a:r>
+            <a:endParaRPr lang="en-US" dirty="false" smtClean="false">
+              <a:latin typeface="Arial"/>
+              <a:cs typeface="Arial"/>
+            </a:endParaRPr>
+          </a:p>
+          <a:p>
+            <a:pPr eaLnBrk="true" hangingPunct="true"/>
+            <a:r>
+              <a:t/>
+            </a:r>
+            <a:endParaRPr lang="en-US" dirty="false" smtClean="false">
+              <a:latin typeface="Arial"/>
+              <a:cs typeface="Arial"/>
+            </a:endParaRPr>
+          </a:p>
+          <a:p>
+            <a:pPr eaLnBrk="true" hangingPunct="true"/>
+            <a:r>
+              <a:t>Quelques soit votre business. Des applications qui suivent vos besoins</a:t>
+            </a:r>
+            <a:endParaRPr lang="en-US" dirty="false" smtClean="false">
+              <a:latin typeface="Arial"/>
+              <a:cs typeface="Arial"/>
+            </a:endParaRPr>
+          </a:p>
+          <a:p>
+            <a:pPr eaLnBrk="true" hangingPunct="true"/>
+            <a:r>
+              <a:t>AWS =&gt; Compute, storage and database </a:t>
+            </a:r>
+            <a:endParaRPr lang="en-US" dirty="false" smtClean="false">
+              <a:latin typeface="Arial"/>
+              <a:cs typeface="Arial"/>
+            </a:endParaRPr>
+          </a:p>
+          <a:p>
+            <a:pPr eaLnBrk="true" hangingPunct="true"/>
+            <a:r>
+              <a:t>No upfront capital exchange</a:t>
+            </a:r>
+            <a:endParaRPr lang="en-US" dirty="false" smtClean="false">
+              <a:latin typeface="Arial"/>
+              <a:cs typeface="Arial"/>
+            </a:endParaRPr>
+          </a:p>
+          <a:p>
+            <a:pPr eaLnBrk="true" hangingPunct="true"/>
+            <a:r>
+              <a:t/>
+            </a:r>
+            <a:endParaRPr lang="en-US" dirty="false" smtClean="false">
+              <a:latin typeface="Arial"/>
+              <a:cs typeface="Arial"/>
+            </a:endParaRPr>
+          </a:p>
+          <a:p>
+            <a:pPr eaLnBrk="true" hangingPunct="true"/>
+            <a:r>
+              <a:t>Economy at scale</a:t>
+            </a:r>
+            <a:endParaRPr lang="en-US" dirty="false" smtClean="false">
+              <a:latin typeface="Arial"/>
+              <a:cs typeface="Arial"/>
+            </a:endParaRPr>
+          </a:p>
+          <a:p>
+            <a:pPr eaLnBrk="true" hangingPunct="true"/>
+            <a:r>
+              <a:t>Add and remove capacity dynamically</a:t>
+            </a:r>
+            <a:endParaRPr lang="en-US" dirty="false" smtClean="false">
+              <a:latin typeface="Arial"/>
+              <a:cs typeface="Arial"/>
+            </a:endParaRPr>
+          </a:p>
+          <a:p>
+            <a:pPr eaLnBrk="true" hangingPunct="true"/>
+            <a:r>
+              <a:t/>
+            </a:r>
+            <a:endParaRPr lang="en-US" dirty="false" smtClean="false">
+              <a:latin typeface="Arial"/>
+              <a:cs typeface="Arial"/>
+            </a:endParaRPr>
+          </a:p>
+          <a:p>
+            <a:pPr eaLnBrk="true" hangingPunct="true"/>
+            <a:r>
+              <a:t>====</a:t>
+            </a:r>
+            <a:endParaRPr lang="en-US" dirty="false" smtClean="false">
+              <a:latin typeface="Arial"/>
+              <a:cs typeface="Arial"/>
+            </a:endParaRPr>
+          </a:p>
+          <a:p>
+            <a:pPr eaLnBrk="true" hangingPunct="true"/>
+            <a:r>
+              <a:t/>
+            </a:r>
+            <a:endParaRPr lang="en-US" dirty="false" smtClean="false">
+              <a:latin typeface="Arial"/>
+              <a:cs typeface="Arial"/>
+            </a:endParaRPr>
+          </a:p>
+          <a:p>
+            <a:pPr eaLnBrk="true" hangingPunct="true"/>
+            <a:r>
+              <a:t>For more on this, see: https://aws.amazon.com/what-is-cloud-computing/</a:t>
+            </a:r>
+            <a:endParaRPr lang="en-US" dirty="false" smtClean="false">
+              <a:latin typeface="Arial"/>
+              <a:cs typeface="Arial"/>
+            </a:endParaRPr>
+          </a:p>
+          <a:p>
+            <a:pPr eaLnBrk="true" hangingPunct="true"/>
+            <a:r>
+              <a:t/>
+            </a:r>
+            <a:endParaRPr lang="en-US" dirty="false" smtClean="false">
+              <a:latin typeface="Arial"/>
+              <a:cs typeface="Arial"/>
+            </a:endParaRPr>
+          </a:p>
+          <a:p>
+            <a:pPr eaLnBrk="true" hangingPunct="true"/>
+            <a:r>
+              <a:t/>
+            </a:r>
+            <a:endParaRPr lang="en-US" dirty="false" smtClean="false">
+              <a:latin typeface="Arial"/>
+              <a:cs typeface="Arial"/>
+            </a:endParaRPr>
+          </a:p>
+          <a:p>
+            <a:pPr eaLnBrk="true" hangingPunct="true"/>
+            <a:r>
+              <a:t>=== Original comments from F:\users\mbojoly\Documents\MBO\Projets\copypptxnotes/sample-docs/pptx-copy.pptx===</a:t>
+            </a:r>
+            <a:endParaRPr lang="en-US" dirty="false" smtClean="false">
+              <a:latin typeface="Arial"/>
+              <a:cs typeface="Arial"/>
+            </a:endParaRPr>
+          </a:p>
+          <a:p>
+            <a:pPr eaLnBrk="true" hangingPunct="true"/>
+            <a:r>
+              <a:t>Il faut construire un DC, un autre, …</a:t>
+            </a:r>
+            <a:endParaRPr lang="en-US" dirty="false" smtClean="false">
+              <a:latin typeface="Arial"/>
+              <a:cs typeface="Arial"/>
+            </a:endParaRPr>
+          </a:p>
+          <a:p>
+            <a:pPr eaLnBrk="true" hangingPunct="true"/>
+            <a:r>
+              <a:t>On parle de Capital Expense</a:t>
+            </a:r>
+            <a:endParaRPr lang="en-US" dirty="false" smtClean="false">
+              <a:latin typeface="Arial"/>
+              <a:cs typeface="Arial"/>
+            </a:endParaRPr>
+          </a:p>
+          <a:p>
+            <a:pPr eaLnBrk="true" hangingPunct="true"/>
+            <a:r>
+              <a:t/>
+            </a:r>
+            <a:endParaRPr lang="en-US" dirty="false" smtClean="false">
+              <a:latin typeface="Arial"/>
+              <a:cs typeface="Arial"/>
+            </a:endParaRPr>
+          </a:p>
+          <a:p>
+            <a:pPr eaLnBrk="true" hangingPunct="true"/>
+            <a:r>
+              <a:t>Le mode de financement du cloud c’est de l’operational expense</a:t>
+            </a:r>
+            <a:endParaRPr lang="en-US" dirty="false" smtClean="false">
+              <a:latin typeface="Arial"/>
+              <a:cs typeface="Arial"/>
+            </a:endParaRPr>
+          </a:p>
+          <a:p>
+            <a:pPr eaLnBrk="true" hangingPunct="true"/>
+            <a:r>
+              <a:t>On va payer à l’heure de consummation</a:t>
+            </a:r>
+            <a:endParaRPr lang="en-US" dirty="false" smtClean="false">
+              <a:latin typeface="Arial"/>
+              <a:cs typeface="Arial"/>
+            </a:endParaRPr>
+          </a:p>
+          <a:p>
+            <a:pPr eaLnBrk="true" hangingPunct="true"/>
+            <a:r>
+              <a:t>On peut faire le parallèle avec la téléphonie portable : lorsqu’il ne fonctionne plus je le jette et j’en rachète un autre</a:t>
+            </a:r>
+            <a:endParaRPr lang="en-US" dirty="false" smtClean="false">
+              <a:latin typeface="Arial"/>
+              <a:cs typeface="Arial"/>
+            </a:endParaRPr>
+          </a:p>
+          <a:p>
+            <a:pPr eaLnBrk="true" hangingPunct="true"/>
+            <a:r>
+              <a:t/>
+            </a:r>
+            <a:endParaRPr lang="en-US" dirty="false" smtClean="false">
+              <a:latin typeface="Arial"/>
+              <a:cs typeface="Arial"/>
+            </a:endParaRPr>
+          </a:p>
+          <a:p>
+            <a:pPr eaLnBrk="true" hangingPunct="true"/>
+            <a:r>
+              <a:t>Avec quelque chose d’automatiser derrière</a:t>
+            </a:r>
+            <a:endParaRPr lang="en-US" dirty="false" smtClean="false">
+              <a:latin typeface="Arial"/>
+              <a:cs typeface="Arial"/>
+            </a:endParaRPr>
+          </a:p>
+          <a:p>
+            <a:pPr eaLnBrk="true" hangingPunct="true"/>
+            <a:r>
+              <a:t>On va recréer le rack and stack par des instances</a:t>
+            </a:r>
+            <a:endParaRPr lang="en-US" dirty="false" smtClean="false">
+              <a:latin typeface="Arial"/>
+              <a:cs typeface="Arial"/>
+            </a:endParaRPr>
+          </a:p>
+          <a:p>
+            <a:pPr eaLnBrk="true" hangingPunct="true"/>
+            <a:r>
+              <a:t>On appellee cela des instances car on va instancier un materiel</a:t>
+            </a:r>
+            <a:endParaRPr lang="en-US" dirty="false" smtClean="false">
+              <a:latin typeface="Arial"/>
+              <a:cs typeface="Arial"/>
+            </a:endParaRPr>
+          </a:p>
+          <a:p>
+            <a:pPr eaLnBrk="true" hangingPunct="true"/>
+            <a:r>
+              <a:t/>
+            </a:r>
+            <a:endParaRPr lang="en-US" dirty="false" smtClean="false">
+              <a:latin typeface="Arial"/>
+              <a:cs typeface="Arial"/>
+            </a:endParaRPr>
+          </a:p>
+          <a:p>
+            <a:pPr eaLnBrk="true" hangingPunct="true"/>
+            <a:r>
+              <a:t>Quelques soit votre business. Des applications qui suivent vos besoins</a:t>
+            </a:r>
+            <a:endParaRPr lang="en-US" dirty="false" smtClean="false">
+              <a:latin typeface="Arial"/>
+              <a:cs typeface="Arial"/>
+            </a:endParaRPr>
+          </a:p>
+          <a:p>
+            <a:pPr eaLnBrk="true" hangingPunct="true"/>
+            <a:r>
+              <a:t>AWS =&gt; Compute, storage and database </a:t>
+            </a:r>
+            <a:endParaRPr lang="en-US" dirty="false" smtClean="false">
+              <a:latin typeface="Arial"/>
+              <a:cs typeface="Arial"/>
+            </a:endParaRPr>
+          </a:p>
+          <a:p>
+            <a:pPr eaLnBrk="true" hangingPunct="true"/>
+            <a:r>
+              <a:t>No upfront capital exchange</a:t>
+            </a:r>
+            <a:endParaRPr lang="en-US" dirty="false" smtClean="false">
+              <a:latin typeface="Arial"/>
+              <a:cs typeface="Arial"/>
+            </a:endParaRPr>
+          </a:p>
+          <a:p>
+            <a:pPr eaLnBrk="true" hangingPunct="true"/>
+            <a:r>
+              <a:t/>
+            </a:r>
+            <a:endParaRPr lang="en-US" dirty="false" smtClean="false">
+              <a:latin typeface="Arial"/>
+              <a:cs typeface="Arial"/>
+            </a:endParaRPr>
+          </a:p>
+          <a:p>
+            <a:pPr eaLnBrk="true" hangingPunct="true"/>
+            <a:r>
+              <a:t>Economy at scale</a:t>
+            </a:r>
+            <a:endParaRPr lang="en-US" dirty="false" smtClean="false">
+              <a:latin typeface="Arial"/>
+              <a:cs typeface="Arial"/>
+            </a:endParaRPr>
+          </a:p>
+          <a:p>
+            <a:pPr eaLnBrk="true" hangingPunct="true"/>
+            <a:r>
+              <a:t>Add and remove capacity dynamically</a:t>
+            </a:r>
+            <a:endParaRPr lang="en-US" dirty="false" smtClean="false">
+              <a:latin typeface="Arial"/>
+              <a:cs typeface="Arial"/>
+            </a:endParaRPr>
+          </a:p>
+          <a:p>
+            <a:pPr eaLnBrk="true" hangingPunct="true"/>
+            <a:r>
+              <a:t/>
+            </a:r>
+            <a:endParaRPr lang="en-US" dirty="false" smtClean="false">
+              <a:latin typeface="Arial"/>
+              <a:cs typeface="Arial"/>
+            </a:endParaRPr>
+          </a:p>
+          <a:p>
+            <a:pPr eaLnBrk="true" hangingPunct="true"/>
+            <a:r>
+              <a:t>====</a:t>
+            </a:r>
+            <a:endParaRPr lang="en-US" dirty="false" smtClean="false">
+              <a:latin typeface="Arial"/>
+              <a:cs typeface="Arial"/>
+            </a:endParaRPr>
+          </a:p>
+          <a:p>
+            <a:pPr eaLnBrk="true" hangingPunct="true"/>
+            <a:r>
+              <a:t/>
+            </a:r>
+            <a:endParaRPr lang="en-US" dirty="false" smtClean="false">
+              <a:latin typeface="Arial"/>
+              <a:cs typeface="Arial"/>
+            </a:endParaRPr>
+          </a:p>
+          <a:p>
+            <a:pPr eaLnBrk="true" hangingPunct="true"/>
+            <a:r>
+              <a:t>For more on this, see: https://aws.amazon.com/what-is-cloud-computing/</a:t>
+            </a:r>
+            <a:endParaRPr lang="en-US" dirty="false" smtClean="false">
+              <a:latin typeface="Arial"/>
+              <a:cs typeface="Arial"/>
+            </a:endParaRPr>
+          </a:p>
+          <a:p>
+            <a:pPr eaLnBrk="true" hangingPunct="true"/>
+            <a:r>
+              <a:t/>
+            </a:r>
+            <a:endParaRPr lang="en-US" dirty="false" smtClean="false">
+              <a:latin typeface="Arial"/>
+              <a:cs typeface="Arial"/>
+            </a:endParaRPr>
+          </a:p>
+          <a:p>
+            <a:pPr eaLnBrk="true" hangingPunct="true"/>
+            <a:r>
+              <a:t/>
+            </a:r>
+            <a:endParaRPr lang="en-US" dirty="false" smtClean="false">
+              <a:latin typeface="Arial"/>
+              <a:cs typeface="Arial"/>
+            </a:endParaRPr>
+          </a:p>
+          <a:p>
+            <a:pPr eaLnBrk="true" hangingPunct="true"/>
+            <a:r>
+              <a:t>=== Original comments from F:\users\mbojoly\Documents\MBO\Projets\copypptxnotes/sample-docs/pptx-copy.pptx===</a:t>
+            </a:r>
+            <a:endParaRPr lang="en-US" dirty="false" smtClean="false">
+              <a:latin typeface="Arial"/>
+              <a:cs typeface="Arial"/>
+            </a:endParaRPr>
+          </a:p>
+          <a:p>
+            <a:pPr eaLnBrk="true" hangingPunct="true"/>
+            <a:r>
+              <a:t>Paragraph1</a:t>
+            </a:r>
+            <a:endParaRPr lang="en-US" dirty="false" smtClean="false">
+              <a:latin typeface="Arial"/>
+              <a:cs typeface="Arial"/>
+            </a:endParaRPr>
+          </a:p>
+          <a:p>
+            <a:pPr eaLnBrk="true" hangingPunct="true"/>
+            <a:r>
+              <a:t>paragraph2</a:t>
+            </a:r>
+            <a:endParaRPr lang="en-US" dirty="false" smtClean="false">
+              <a:latin typeface="Arial"/>
+              <a:cs typeface="Arial"/>
+            </a:endParaRPr>
+          </a:p>
+          <a:p>
+            <a:pPr eaLnBrk="true" hangingPunct="true"/>
+            <a:r>
+              <a:t>paragraph3</a:t>
+            </a:r>
+            <a:endParaRPr lang="en-US" dirty="false" smtClean="false">
+              <a:latin typeface="Arial"/>
+              <a:cs typeface="Arial"/>
+            </a:endParaRPr>
           </a:p>
         </p:txBody>
       </p:sp>
@@ -5501,12 +6273,11 @@
 </file>
 
 <file path=customXml/item1.xml><?xml version="1.0" encoding="utf-8"?>
-<?mso-contentType ?>
-<FormTemplates xmlns="http://schemas.microsoft.com/sharepoint/v3/contenttype/forms">
-  <Display>DocumentLibraryForm</Display>
-  <Edit>DocumentLibraryForm</Edit>
-  <New>DocumentLibraryForm</New>
-</FormTemplates>
+<p:properties xmlns:p="http://schemas.microsoft.com/office/2006/metadata/properties" xmlns:xsi="http://www.w3.org/2001/XMLSchema-instance">
+  <documentManagement>
+    <Status xmlns="610c11cb-1be1-44ad-96bd-1936ba709450">Green</Status>
+  </documentManagement>
+</p:properties>
 </file>
 
 <file path=customXml/item2.xml><?xml version="1.0" encoding="utf-8"?>
@@ -5641,17 +6412,26 @@
 </file>
 
 <file path=customXml/item3.xml><?xml version="1.0" encoding="utf-8"?>
-<p:properties xmlns:p="http://schemas.microsoft.com/office/2006/metadata/properties" xmlns:xsi="http://www.w3.org/2001/XMLSchema-instance">
-  <documentManagement>
-    <Status xmlns="610c11cb-1be1-44ad-96bd-1936ba709450">Green</Status>
-  </documentManagement>
-</p:properties>
+<?mso-contentType ?>
+<FormTemplates xmlns="http://schemas.microsoft.com/sharepoint/v3/contenttype/forms">
+  <Display>DocumentLibraryForm</Display>
+  <Edit>DocumentLibraryForm</Edit>
+  <New>DocumentLibraryForm</New>
+</FormTemplates>
 </file>
 
 <file path=customXml/itemProps1.xml><?xml version="1.0" encoding="utf-8"?>
-<ds:datastoreItem xmlns:ds="http://schemas.openxmlformats.org/officeDocument/2006/customXml" ds:itemID="{705B35A6-8B52-46A5-AE45-B98C6459DC10}">
+<ds:datastoreItem xmlns:ds="http://schemas.openxmlformats.org/officeDocument/2006/customXml" ds:itemID="{C597C89A-FD0C-431E-81F6-90225B937683}">
   <ds:schemaRefs>
-    <ds:schemaRef ds:uri="http://schemas.microsoft.com/sharepoint/v3/contenttype/forms"/>
+    <ds:schemaRef ds:uri="http://schemas.microsoft.com/office/2006/documentManagement/types"/>
+    <ds:schemaRef ds:uri="http://schemas.microsoft.com/office/infopath/2007/PartnerControls"/>
+    <ds:schemaRef ds:uri="http://purl.org/dc/elements/1.1/"/>
+    <ds:schemaRef ds:uri="http://schemas.microsoft.com/office/2006/metadata/properties"/>
+    <ds:schemaRef ds:uri="http://purl.org/dc/terms/"/>
+    <ds:schemaRef ds:uri="http://schemas.openxmlformats.org/package/2006/metadata/core-properties"/>
+    <ds:schemaRef ds:uri="610c11cb-1be1-44ad-96bd-1936ba709450"/>
+    <ds:schemaRef ds:uri="http://www.w3.org/XML/1998/namespace"/>
+    <ds:schemaRef ds:uri="http://purl.org/dc/dcmitype/"/>
   </ds:schemaRefs>
 </ds:datastoreItem>
 </file>
@@ -5675,17 +6455,9 @@
 </file>
 
 <file path=customXml/itemProps3.xml><?xml version="1.0" encoding="utf-8"?>
-<ds:datastoreItem xmlns:ds="http://schemas.openxmlformats.org/officeDocument/2006/customXml" ds:itemID="{C597C89A-FD0C-431E-81F6-90225B937683}">
+<ds:datastoreItem xmlns:ds="http://schemas.openxmlformats.org/officeDocument/2006/customXml" ds:itemID="{705B35A6-8B52-46A5-AE45-B98C6459DC10}">
   <ds:schemaRefs>
-    <ds:schemaRef ds:uri="http://schemas.microsoft.com/office/2006/documentManagement/types"/>
-    <ds:schemaRef ds:uri="http://schemas.microsoft.com/office/infopath/2007/PartnerControls"/>
-    <ds:schemaRef ds:uri="http://purl.org/dc/elements/1.1/"/>
-    <ds:schemaRef ds:uri="http://schemas.microsoft.com/office/2006/metadata/properties"/>
-    <ds:schemaRef ds:uri="http://purl.org/dc/terms/"/>
-    <ds:schemaRef ds:uri="http://schemas.openxmlformats.org/package/2006/metadata/core-properties"/>
-    <ds:schemaRef ds:uri="610c11cb-1be1-44ad-96bd-1936ba709450"/>
-    <ds:schemaRef ds:uri="http://www.w3.org/XML/1998/namespace"/>
-    <ds:schemaRef ds:uri="http://purl.org/dc/dcmitype/"/>
+    <ds:schemaRef ds:uri="http://schemas.microsoft.com/sharepoint/v3/contenttype/forms"/>
   </ds:schemaRefs>
 </ds:datastoreItem>
 </file>
</xml_diff>

<commit_message>
Refactor by splitting the main method
</commit_message>
<xml_diff>
--- a/sample-docs/pptx-copy.pptx
+++ b/sample-docs/pptx-copy.pptx
@@ -745,6 +745,46 @@
           <a:p>
             <a:pPr eaLnBrk="true" hangingPunct="true"/>
             <a:r>
+              <a:t>=== Original comments from ./sample-docs/pptx-copy.pptx===</a:t>
+            </a:r>
+            <a:endParaRPr lang="en-US" dirty="false" smtClean="false">
+              <a:latin typeface="Arial"/>
+              <a:cs typeface="Arial"/>
+            </a:endParaRPr>
+          </a:p>
+          <a:p>
+            <a:pPr eaLnBrk="true" hangingPunct="true"/>
+            <a:r>
+              <a:t>C’est quoi le clou(d) ?</a:t>
+            </a:r>
+            <a:endParaRPr lang="en-US" dirty="false" smtClean="false">
+              <a:latin typeface="Arial"/>
+              <a:cs typeface="Arial"/>
+            </a:endParaRPr>
+          </a:p>
+          <a:p>
+            <a:pPr eaLnBrk="true" hangingPunct="true"/>
+            <a:r>
+              <a:t>=== Original comments from ./sample-docs/pptx-copy.pptx===</a:t>
+            </a:r>
+            <a:endParaRPr lang="en-US" dirty="false" smtClean="false">
+              <a:latin typeface="Arial"/>
+              <a:cs typeface="Arial"/>
+            </a:endParaRPr>
+          </a:p>
+          <a:p>
+            <a:pPr eaLnBrk="true" hangingPunct="true"/>
+            <a:r>
+              <a:t>C’est quoi le clou(d) ?</a:t>
+            </a:r>
+            <a:endParaRPr lang="en-US" dirty="false" smtClean="false">
+              <a:latin typeface="Arial"/>
+              <a:cs typeface="Arial"/>
+            </a:endParaRPr>
+          </a:p>
+          <a:p>
+            <a:pPr eaLnBrk="true" hangingPunct="true"/>
+            <a:r>
               <a:t>=== Original comments from F:\users\mbojoly\Documents\MBO\Projets\copypptxnotes/sample-docs/pptx-copy.pptx===</a:t>
             </a:r>
             <a:endParaRPr lang="en-US" dirty="false" smtClean="false">
@@ -880,6 +920,486 @@
         <p:txBody>
           <a:bodyPr/>
           <a:lstStyle/>
+          <a:p>
+            <a:pPr eaLnBrk="true" hangingPunct="true"/>
+            <a:r>
+              <a:t>Il faut construire un DC, un autre, …</a:t>
+            </a:r>
+            <a:endParaRPr lang="en-US" dirty="false" smtClean="false">
+              <a:latin typeface="Arial"/>
+              <a:cs typeface="Arial"/>
+            </a:endParaRPr>
+          </a:p>
+          <a:p>
+            <a:pPr eaLnBrk="true" hangingPunct="true"/>
+            <a:r>
+              <a:t>On parle de Capital Expense</a:t>
+            </a:r>
+            <a:endParaRPr lang="en-US" dirty="false" smtClean="false">
+              <a:latin typeface="Arial"/>
+              <a:cs typeface="Arial"/>
+            </a:endParaRPr>
+          </a:p>
+          <a:p>
+            <a:pPr eaLnBrk="true" hangingPunct="true"/>
+            <a:r>
+              <a:t/>
+            </a:r>
+            <a:endParaRPr lang="en-US" dirty="false" smtClean="false">
+              <a:latin typeface="Arial"/>
+              <a:cs typeface="Arial"/>
+            </a:endParaRPr>
+          </a:p>
+          <a:p>
+            <a:pPr eaLnBrk="true" hangingPunct="true"/>
+            <a:r>
+              <a:t>Le mode de financement du cloud c’est de l’operational expense</a:t>
+            </a:r>
+            <a:endParaRPr lang="en-US" dirty="false" smtClean="false">
+              <a:latin typeface="Arial"/>
+              <a:cs typeface="Arial"/>
+            </a:endParaRPr>
+          </a:p>
+          <a:p>
+            <a:pPr eaLnBrk="true" hangingPunct="true"/>
+            <a:r>
+              <a:t>On va payer à l’heure de consummation</a:t>
+            </a:r>
+            <a:endParaRPr lang="en-US" dirty="false" smtClean="false">
+              <a:latin typeface="Arial"/>
+              <a:cs typeface="Arial"/>
+            </a:endParaRPr>
+          </a:p>
+          <a:p>
+            <a:pPr eaLnBrk="true" hangingPunct="true"/>
+            <a:r>
+              <a:t>On peut faire le parallèle avec la téléphonie portable : lorsqu’il ne fonctionne plus je le jette et j’en rachète un autre</a:t>
+            </a:r>
+            <a:endParaRPr lang="en-US" dirty="false" smtClean="false">
+              <a:latin typeface="Arial"/>
+              <a:cs typeface="Arial"/>
+            </a:endParaRPr>
+          </a:p>
+          <a:p>
+            <a:pPr eaLnBrk="true" hangingPunct="true"/>
+            <a:r>
+              <a:t/>
+            </a:r>
+            <a:endParaRPr lang="en-US" dirty="false" smtClean="false">
+              <a:latin typeface="Arial"/>
+              <a:cs typeface="Arial"/>
+            </a:endParaRPr>
+          </a:p>
+          <a:p>
+            <a:pPr eaLnBrk="true" hangingPunct="true"/>
+            <a:r>
+              <a:t>Avec quelque chose d’automatiser derrière</a:t>
+            </a:r>
+            <a:endParaRPr lang="en-US" dirty="false" smtClean="false">
+              <a:latin typeface="Arial"/>
+              <a:cs typeface="Arial"/>
+            </a:endParaRPr>
+          </a:p>
+          <a:p>
+            <a:pPr eaLnBrk="true" hangingPunct="true"/>
+            <a:r>
+              <a:t>On va recréer le rack and stack par des instances</a:t>
+            </a:r>
+            <a:endParaRPr lang="en-US" dirty="false" smtClean="false">
+              <a:latin typeface="Arial"/>
+              <a:cs typeface="Arial"/>
+            </a:endParaRPr>
+          </a:p>
+          <a:p>
+            <a:pPr eaLnBrk="true" hangingPunct="true"/>
+            <a:r>
+              <a:t>On appellee cela des instances car on va instancier un materiel</a:t>
+            </a:r>
+            <a:endParaRPr lang="en-US" dirty="false" smtClean="false">
+              <a:latin typeface="Arial"/>
+              <a:cs typeface="Arial"/>
+            </a:endParaRPr>
+          </a:p>
+          <a:p>
+            <a:pPr eaLnBrk="true" hangingPunct="true"/>
+            <a:r>
+              <a:t/>
+            </a:r>
+            <a:endParaRPr lang="en-US" dirty="false" smtClean="false">
+              <a:latin typeface="Arial"/>
+              <a:cs typeface="Arial"/>
+            </a:endParaRPr>
+          </a:p>
+          <a:p>
+            <a:pPr eaLnBrk="true" hangingPunct="true"/>
+            <a:r>
+              <a:t>Quelques soit votre business. Des applications qui suivent vos besoins</a:t>
+            </a:r>
+            <a:endParaRPr lang="en-US" dirty="false" smtClean="false">
+              <a:latin typeface="Arial"/>
+              <a:cs typeface="Arial"/>
+            </a:endParaRPr>
+          </a:p>
+          <a:p>
+            <a:pPr eaLnBrk="true" hangingPunct="true"/>
+            <a:r>
+              <a:t>AWS =&gt; Compute, storage and database </a:t>
+            </a:r>
+            <a:endParaRPr lang="en-US" dirty="false" smtClean="false">
+              <a:latin typeface="Arial"/>
+              <a:cs typeface="Arial"/>
+            </a:endParaRPr>
+          </a:p>
+          <a:p>
+            <a:pPr eaLnBrk="true" hangingPunct="true"/>
+            <a:r>
+              <a:t>No upfront capital exchange</a:t>
+            </a:r>
+            <a:endParaRPr lang="en-US" dirty="false" smtClean="false">
+              <a:latin typeface="Arial"/>
+              <a:cs typeface="Arial"/>
+            </a:endParaRPr>
+          </a:p>
+          <a:p>
+            <a:pPr eaLnBrk="true" hangingPunct="true"/>
+            <a:r>
+              <a:t/>
+            </a:r>
+            <a:endParaRPr lang="en-US" dirty="false" smtClean="false">
+              <a:latin typeface="Arial"/>
+              <a:cs typeface="Arial"/>
+            </a:endParaRPr>
+          </a:p>
+          <a:p>
+            <a:pPr eaLnBrk="true" hangingPunct="true"/>
+            <a:r>
+              <a:t>Economy at scale</a:t>
+            </a:r>
+            <a:endParaRPr lang="en-US" dirty="false" smtClean="false">
+              <a:latin typeface="Arial"/>
+              <a:cs typeface="Arial"/>
+            </a:endParaRPr>
+          </a:p>
+          <a:p>
+            <a:pPr eaLnBrk="true" hangingPunct="true"/>
+            <a:r>
+              <a:t>Add and remove capacity dynamically</a:t>
+            </a:r>
+            <a:endParaRPr lang="en-US" dirty="false" smtClean="false">
+              <a:latin typeface="Arial"/>
+              <a:cs typeface="Arial"/>
+            </a:endParaRPr>
+          </a:p>
+          <a:p>
+            <a:pPr eaLnBrk="true" hangingPunct="true"/>
+            <a:r>
+              <a:t/>
+            </a:r>
+            <a:endParaRPr lang="en-US" dirty="false" smtClean="false">
+              <a:latin typeface="Arial"/>
+              <a:cs typeface="Arial"/>
+            </a:endParaRPr>
+          </a:p>
+          <a:p>
+            <a:pPr eaLnBrk="true" hangingPunct="true"/>
+            <a:r>
+              <a:t>====</a:t>
+            </a:r>
+            <a:endParaRPr lang="en-US" dirty="false" smtClean="false">
+              <a:latin typeface="Arial"/>
+              <a:cs typeface="Arial"/>
+            </a:endParaRPr>
+          </a:p>
+          <a:p>
+            <a:pPr eaLnBrk="true" hangingPunct="true"/>
+            <a:r>
+              <a:t/>
+            </a:r>
+            <a:endParaRPr lang="en-US" dirty="false" smtClean="false">
+              <a:latin typeface="Arial"/>
+              <a:cs typeface="Arial"/>
+            </a:endParaRPr>
+          </a:p>
+          <a:p>
+            <a:pPr eaLnBrk="true" hangingPunct="true"/>
+            <a:r>
+              <a:t>For more on this, see: https://aws.amazon.com/what-is-cloud-computing/</a:t>
+            </a:r>
+            <a:endParaRPr lang="en-US" dirty="false" smtClean="false">
+              <a:latin typeface="Arial"/>
+              <a:cs typeface="Arial"/>
+            </a:endParaRPr>
+          </a:p>
+          <a:p>
+            <a:pPr eaLnBrk="true" hangingPunct="true"/>
+            <a:r>
+              <a:t/>
+            </a:r>
+            <a:endParaRPr lang="en-US" dirty="false" smtClean="false">
+              <a:latin typeface="Arial"/>
+              <a:cs typeface="Arial"/>
+            </a:endParaRPr>
+          </a:p>
+          <a:p>
+            <a:pPr eaLnBrk="true" hangingPunct="true"/>
+            <a:r>
+              <a:t/>
+            </a:r>
+            <a:endParaRPr lang="en-US" dirty="false" smtClean="false">
+              <a:latin typeface="Arial"/>
+              <a:cs typeface="Arial"/>
+            </a:endParaRPr>
+          </a:p>
+          <a:p>
+            <a:pPr eaLnBrk="true" hangingPunct="true"/>
+            <a:r>
+              <a:t>=== Original comments from ./sample-docs/pptx-copy.pptx===</a:t>
+            </a:r>
+            <a:endParaRPr lang="en-US" dirty="false" smtClean="false">
+              <a:latin typeface="Arial"/>
+              <a:cs typeface="Arial"/>
+            </a:endParaRPr>
+          </a:p>
+          <a:p>
+            <a:pPr eaLnBrk="true" hangingPunct="true"/>
+            <a:r>
+              <a:t>Il faut construire un DC, un autre, …</a:t>
+            </a:r>
+            <a:endParaRPr lang="en-US" dirty="false" smtClean="false">
+              <a:latin typeface="Arial"/>
+              <a:cs typeface="Arial"/>
+            </a:endParaRPr>
+          </a:p>
+          <a:p>
+            <a:pPr eaLnBrk="true" hangingPunct="true"/>
+            <a:r>
+              <a:t>On parle de Capital Expense</a:t>
+            </a:r>
+            <a:endParaRPr lang="en-US" dirty="false" smtClean="false">
+              <a:latin typeface="Arial"/>
+              <a:cs typeface="Arial"/>
+            </a:endParaRPr>
+          </a:p>
+          <a:p>
+            <a:pPr eaLnBrk="true" hangingPunct="true"/>
+            <a:r>
+              <a:t/>
+            </a:r>
+            <a:endParaRPr lang="en-US" dirty="false" smtClean="false">
+              <a:latin typeface="Arial"/>
+              <a:cs typeface="Arial"/>
+            </a:endParaRPr>
+          </a:p>
+          <a:p>
+            <a:pPr eaLnBrk="true" hangingPunct="true"/>
+            <a:r>
+              <a:t>Le mode de financement du cloud c’est de l’operational expense</a:t>
+            </a:r>
+            <a:endParaRPr lang="en-US" dirty="false" smtClean="false">
+              <a:latin typeface="Arial"/>
+              <a:cs typeface="Arial"/>
+            </a:endParaRPr>
+          </a:p>
+          <a:p>
+            <a:pPr eaLnBrk="true" hangingPunct="true"/>
+            <a:r>
+              <a:t>On va payer à l’heure de consummation</a:t>
+            </a:r>
+            <a:endParaRPr lang="en-US" dirty="false" smtClean="false">
+              <a:latin typeface="Arial"/>
+              <a:cs typeface="Arial"/>
+            </a:endParaRPr>
+          </a:p>
+          <a:p>
+            <a:pPr eaLnBrk="true" hangingPunct="true"/>
+            <a:r>
+              <a:t>On peut faire le parallèle avec la téléphonie portable : lorsqu’il ne fonctionne plus je le jette et j’en rachète un autre</a:t>
+            </a:r>
+            <a:endParaRPr lang="en-US" dirty="false" smtClean="false">
+              <a:latin typeface="Arial"/>
+              <a:cs typeface="Arial"/>
+            </a:endParaRPr>
+          </a:p>
+          <a:p>
+            <a:pPr eaLnBrk="true" hangingPunct="true"/>
+            <a:r>
+              <a:t/>
+            </a:r>
+            <a:endParaRPr lang="en-US" dirty="false" smtClean="false">
+              <a:latin typeface="Arial"/>
+              <a:cs typeface="Arial"/>
+            </a:endParaRPr>
+          </a:p>
+          <a:p>
+            <a:pPr eaLnBrk="true" hangingPunct="true"/>
+            <a:r>
+              <a:t>Avec quelque chose d’automatiser derrière</a:t>
+            </a:r>
+            <a:endParaRPr lang="en-US" dirty="false" smtClean="false">
+              <a:latin typeface="Arial"/>
+              <a:cs typeface="Arial"/>
+            </a:endParaRPr>
+          </a:p>
+          <a:p>
+            <a:pPr eaLnBrk="true" hangingPunct="true"/>
+            <a:r>
+              <a:t>On va recréer le rack and stack par des instances</a:t>
+            </a:r>
+            <a:endParaRPr lang="en-US" dirty="false" smtClean="false">
+              <a:latin typeface="Arial"/>
+              <a:cs typeface="Arial"/>
+            </a:endParaRPr>
+          </a:p>
+          <a:p>
+            <a:pPr eaLnBrk="true" hangingPunct="true"/>
+            <a:r>
+              <a:t>On appellee cela des instances car on va instancier un materiel</a:t>
+            </a:r>
+            <a:endParaRPr lang="en-US" dirty="false" smtClean="false">
+              <a:latin typeface="Arial"/>
+              <a:cs typeface="Arial"/>
+            </a:endParaRPr>
+          </a:p>
+          <a:p>
+            <a:pPr eaLnBrk="true" hangingPunct="true"/>
+            <a:r>
+              <a:t/>
+            </a:r>
+            <a:endParaRPr lang="en-US" dirty="false" smtClean="false">
+              <a:latin typeface="Arial"/>
+              <a:cs typeface="Arial"/>
+            </a:endParaRPr>
+          </a:p>
+          <a:p>
+            <a:pPr eaLnBrk="true" hangingPunct="true"/>
+            <a:r>
+              <a:t>Quelques soit votre business. Des applications qui suivent vos besoins</a:t>
+            </a:r>
+            <a:endParaRPr lang="en-US" dirty="false" smtClean="false">
+              <a:latin typeface="Arial"/>
+              <a:cs typeface="Arial"/>
+            </a:endParaRPr>
+          </a:p>
+          <a:p>
+            <a:pPr eaLnBrk="true" hangingPunct="true"/>
+            <a:r>
+              <a:t>AWS =&gt; Compute, storage and database </a:t>
+            </a:r>
+            <a:endParaRPr lang="en-US" dirty="false" smtClean="false">
+              <a:latin typeface="Arial"/>
+              <a:cs typeface="Arial"/>
+            </a:endParaRPr>
+          </a:p>
+          <a:p>
+            <a:pPr eaLnBrk="true" hangingPunct="true"/>
+            <a:r>
+              <a:t>No upfront capital exchange</a:t>
+            </a:r>
+            <a:endParaRPr lang="en-US" dirty="false" smtClean="false">
+              <a:latin typeface="Arial"/>
+              <a:cs typeface="Arial"/>
+            </a:endParaRPr>
+          </a:p>
+          <a:p>
+            <a:pPr eaLnBrk="true" hangingPunct="true"/>
+            <a:r>
+              <a:t/>
+            </a:r>
+            <a:endParaRPr lang="en-US" dirty="false" smtClean="false">
+              <a:latin typeface="Arial"/>
+              <a:cs typeface="Arial"/>
+            </a:endParaRPr>
+          </a:p>
+          <a:p>
+            <a:pPr eaLnBrk="true" hangingPunct="true"/>
+            <a:r>
+              <a:t>Economy at scale</a:t>
+            </a:r>
+            <a:endParaRPr lang="en-US" dirty="false" smtClean="false">
+              <a:latin typeface="Arial"/>
+              <a:cs typeface="Arial"/>
+            </a:endParaRPr>
+          </a:p>
+          <a:p>
+            <a:pPr eaLnBrk="true" hangingPunct="true"/>
+            <a:r>
+              <a:t>Add and remove capacity dynamically</a:t>
+            </a:r>
+            <a:endParaRPr lang="en-US" dirty="false" smtClean="false">
+              <a:latin typeface="Arial"/>
+              <a:cs typeface="Arial"/>
+            </a:endParaRPr>
+          </a:p>
+          <a:p>
+            <a:pPr eaLnBrk="true" hangingPunct="true"/>
+            <a:r>
+              <a:t/>
+            </a:r>
+            <a:endParaRPr lang="en-US" dirty="false" smtClean="false">
+              <a:latin typeface="Arial"/>
+              <a:cs typeface="Arial"/>
+            </a:endParaRPr>
+          </a:p>
+          <a:p>
+            <a:pPr eaLnBrk="true" hangingPunct="true"/>
+            <a:r>
+              <a:t>====</a:t>
+            </a:r>
+            <a:endParaRPr lang="en-US" dirty="false" smtClean="false">
+              <a:latin typeface="Arial"/>
+              <a:cs typeface="Arial"/>
+            </a:endParaRPr>
+          </a:p>
+          <a:p>
+            <a:pPr eaLnBrk="true" hangingPunct="true"/>
+            <a:r>
+              <a:t/>
+            </a:r>
+            <a:endParaRPr lang="en-US" dirty="false" smtClean="false">
+              <a:latin typeface="Arial"/>
+              <a:cs typeface="Arial"/>
+            </a:endParaRPr>
+          </a:p>
+          <a:p>
+            <a:pPr eaLnBrk="true" hangingPunct="true"/>
+            <a:r>
+              <a:t>For more on this, see: https://aws.amazon.com/what-is-cloud-computing/</a:t>
+            </a:r>
+            <a:endParaRPr lang="en-US" dirty="false" smtClean="false">
+              <a:latin typeface="Arial"/>
+              <a:cs typeface="Arial"/>
+            </a:endParaRPr>
+          </a:p>
+          <a:p>
+            <a:pPr eaLnBrk="true" hangingPunct="true"/>
+            <a:r>
+              <a:t/>
+            </a:r>
+            <a:endParaRPr lang="en-US" dirty="false" smtClean="false">
+              <a:latin typeface="Arial"/>
+              <a:cs typeface="Arial"/>
+            </a:endParaRPr>
+          </a:p>
+          <a:p>
+            <a:pPr eaLnBrk="true" hangingPunct="true"/>
+            <a:r>
+              <a:t/>
+            </a:r>
+            <a:endParaRPr lang="en-US" dirty="false" smtClean="false">
+              <a:latin typeface="Arial"/>
+              <a:cs typeface="Arial"/>
+            </a:endParaRPr>
+          </a:p>
+          <a:p>
+            <a:pPr eaLnBrk="true" hangingPunct="true"/>
+            <a:r>
+              <a:t>=== Original comments from ./sample-docs/pptx-copy.pptx===</a:t>
+            </a:r>
+            <a:endParaRPr lang="en-US" dirty="false" smtClean="false">
+              <a:latin typeface="Arial"/>
+              <a:cs typeface="Arial"/>
+            </a:endParaRPr>
+          </a:p>
           <a:p>
             <a:pPr eaLnBrk="true" hangingPunct="true"/>
             <a:r>

</xml_diff>

<commit_message>
Unit test with 73% coverage
</commit_message>
<xml_diff>
--- a/sample-docs/pptx-copy.pptx
+++ b/sample-docs/pptx-copy.pptx
@@ -690,7 +690,7 @@
 </file>
 
 <file path=ppt/notesSlides/notesSlide1.xml><?xml version="1.0" encoding="utf-8"?>
-<p:notes xmlns:r="http://schemas.openxmlformats.org/officeDocument/2006/relationships" xmlns:p="http://schemas.openxmlformats.org/presentationml/2006/main" xmlns:a="http://schemas.openxmlformats.org/drawingml/2006/main" xmlns:mc="http://schemas.openxmlformats.org/markup-compatibility/2006" xmlns:c="http://schemas.openxmlformats.org/drawingml/2006/chart" xmlns:ns6="http://schemas.openxmlformats.org/drawingml/2006/chartDrawing" xmlns:dgm="http://schemas.openxmlformats.org/drawingml/2006/diagram" xmlns:pic="http://schemas.openxmlformats.org/drawingml/2006/picture" xmlns:wp="http://schemas.openxmlformats.org/drawingml/2006/wordprocessingDrawing" xmlns:wp14="http://schemas.microsoft.com/office/word/2010/wordprocessingDrawing" xmlns:xdr="http://schemas.openxmlformats.org/drawingml/2006/spreadsheetDrawing" xmlns:ns12="http://schemas.openxmlformats.org/drawingml/2006/compatibility" xmlns:ns13="http://schemas.openxmlformats.org/drawingml/2006/lockedCanvas">
+<p:notes xmlns:p="http://schemas.openxmlformats.org/presentationml/2006/main" xmlns:a="http://schemas.openxmlformats.org/drawingml/2006/main" xmlns:r="http://schemas.openxmlformats.org/officeDocument/2006/relationships" xmlns:mc="http://schemas.openxmlformats.org/markup-compatibility/2006" xmlns:c="http://schemas.openxmlformats.org/drawingml/2006/chart" xmlns:ns6="http://schemas.openxmlformats.org/drawingml/2006/chartDrawing" xmlns:dgm="http://schemas.openxmlformats.org/drawingml/2006/diagram" xmlns:pic="http://schemas.openxmlformats.org/drawingml/2006/picture" xmlns:wp="http://schemas.openxmlformats.org/drawingml/2006/wordprocessingDrawing" xmlns:wp14="http://schemas.microsoft.com/office/word/2010/wordprocessingDrawing" xmlns:xdr="http://schemas.openxmlformats.org/drawingml/2006/spreadsheetDrawing" xmlns:ns12="http://schemas.openxmlformats.org/drawingml/2006/compatibility" xmlns:ns13="http://schemas.openxmlformats.org/drawingml/2006/lockedCanvas">
   <p:cSld>
     <p:spTree>
       <p:nvGrpSpPr>
@@ -785,6 +785,46 @@
           <a:p>
             <a:pPr eaLnBrk="true" hangingPunct="true"/>
             <a:r>
+              <a:t>=== Original comments from ./sample-docs/pptx-copy.pptx===</a:t>
+            </a:r>
+            <a:endParaRPr lang="en-US" dirty="false" smtClean="false">
+              <a:latin typeface="Arial"/>
+              <a:cs typeface="Arial"/>
+            </a:endParaRPr>
+          </a:p>
+          <a:p>
+            <a:pPr eaLnBrk="true" hangingPunct="true"/>
+            <a:r>
+              <a:t>C’est quoi le clou(d) ?</a:t>
+            </a:r>
+            <a:endParaRPr lang="en-US" dirty="false" smtClean="false">
+              <a:latin typeface="Arial"/>
+              <a:cs typeface="Arial"/>
+            </a:endParaRPr>
+          </a:p>
+          <a:p>
+            <a:pPr eaLnBrk="true" hangingPunct="true"/>
+            <a:r>
+              <a:t>=== Original comments from ./sample-docs/pptx-copy.pptx===</a:t>
+            </a:r>
+            <a:endParaRPr lang="en-US" dirty="false" smtClean="false">
+              <a:latin typeface="Arial"/>
+              <a:cs typeface="Arial"/>
+            </a:endParaRPr>
+          </a:p>
+          <a:p>
+            <a:pPr eaLnBrk="true" hangingPunct="true"/>
+            <a:r>
+              <a:t>C’est quoi le clou(d) ?</a:t>
+            </a:r>
+            <a:endParaRPr lang="en-US" dirty="false" smtClean="false">
+              <a:latin typeface="Arial"/>
+              <a:cs typeface="Arial"/>
+            </a:endParaRPr>
+          </a:p>
+          <a:p>
+            <a:pPr eaLnBrk="true" hangingPunct="true"/>
+            <a:r>
               <a:t>=== Original comments from F:\users\mbojoly\Documents\MBO\Projets\copypptxnotes/sample-docs/pptx-copy.pptx===</a:t>
             </a:r>
             <a:endParaRPr lang="en-US" dirty="false" smtClean="false">
@@ -878,7 +918,7 @@
 </file>
 
 <file path=ppt/notesSlides/notesSlide2.xml><?xml version="1.0" encoding="utf-8"?>
-<p:notes xmlns:r="http://schemas.openxmlformats.org/officeDocument/2006/relationships" xmlns:p="http://schemas.openxmlformats.org/presentationml/2006/main" xmlns:a="http://schemas.openxmlformats.org/drawingml/2006/main" xmlns:mc="http://schemas.openxmlformats.org/markup-compatibility/2006" xmlns:c="http://schemas.openxmlformats.org/drawingml/2006/chart" xmlns:ns6="http://schemas.openxmlformats.org/drawingml/2006/chartDrawing" xmlns:dgm="http://schemas.openxmlformats.org/drawingml/2006/diagram" xmlns:pic="http://schemas.openxmlformats.org/drawingml/2006/picture" xmlns:wp="http://schemas.openxmlformats.org/drawingml/2006/wordprocessingDrawing" xmlns:wp14="http://schemas.microsoft.com/office/word/2010/wordprocessingDrawing" xmlns:xdr="http://schemas.openxmlformats.org/drawingml/2006/spreadsheetDrawing" xmlns:ns12="http://schemas.openxmlformats.org/drawingml/2006/compatibility" xmlns:ns13="http://schemas.openxmlformats.org/drawingml/2006/lockedCanvas">
+<p:notes xmlns:p="http://schemas.openxmlformats.org/presentationml/2006/main" xmlns:a="http://schemas.openxmlformats.org/drawingml/2006/main" xmlns:r="http://schemas.openxmlformats.org/officeDocument/2006/relationships" xmlns:mc="http://schemas.openxmlformats.org/markup-compatibility/2006" xmlns:c="http://schemas.openxmlformats.org/drawingml/2006/chart" xmlns:ns6="http://schemas.openxmlformats.org/drawingml/2006/chartDrawing" xmlns:dgm="http://schemas.openxmlformats.org/drawingml/2006/diagram" xmlns:pic="http://schemas.openxmlformats.org/drawingml/2006/picture" xmlns:wp="http://schemas.openxmlformats.org/drawingml/2006/wordprocessingDrawing" xmlns:wp14="http://schemas.microsoft.com/office/word/2010/wordprocessingDrawing" xmlns:xdr="http://schemas.openxmlformats.org/drawingml/2006/spreadsheetDrawing" xmlns:ns12="http://schemas.openxmlformats.org/drawingml/2006/compatibility" xmlns:ns13="http://schemas.openxmlformats.org/drawingml/2006/lockedCanvas">
   <p:cSld>
     <p:spTree>
       <p:nvGrpSpPr>
@@ -920,6 +960,486 @@
         <p:txBody>
           <a:bodyPr/>
           <a:lstStyle/>
+          <a:p>
+            <a:pPr eaLnBrk="true" hangingPunct="true"/>
+            <a:r>
+              <a:t>Il faut construire un DC, un autre, …</a:t>
+            </a:r>
+            <a:endParaRPr lang="en-US" dirty="false" smtClean="false">
+              <a:latin typeface="Arial"/>
+              <a:cs typeface="Arial"/>
+            </a:endParaRPr>
+          </a:p>
+          <a:p>
+            <a:pPr eaLnBrk="true" hangingPunct="true"/>
+            <a:r>
+              <a:t>On parle de Capital Expense</a:t>
+            </a:r>
+            <a:endParaRPr lang="en-US" dirty="false" smtClean="false">
+              <a:latin typeface="Arial"/>
+              <a:cs typeface="Arial"/>
+            </a:endParaRPr>
+          </a:p>
+          <a:p>
+            <a:pPr eaLnBrk="true" hangingPunct="true"/>
+            <a:r>
+              <a:t/>
+            </a:r>
+            <a:endParaRPr lang="en-US" dirty="false" smtClean="false">
+              <a:latin typeface="Arial"/>
+              <a:cs typeface="Arial"/>
+            </a:endParaRPr>
+          </a:p>
+          <a:p>
+            <a:pPr eaLnBrk="true" hangingPunct="true"/>
+            <a:r>
+              <a:t>Le mode de financement du cloud c’est de l’operational expense</a:t>
+            </a:r>
+            <a:endParaRPr lang="en-US" dirty="false" smtClean="false">
+              <a:latin typeface="Arial"/>
+              <a:cs typeface="Arial"/>
+            </a:endParaRPr>
+          </a:p>
+          <a:p>
+            <a:pPr eaLnBrk="true" hangingPunct="true"/>
+            <a:r>
+              <a:t>On va payer à l’heure de consummation</a:t>
+            </a:r>
+            <a:endParaRPr lang="en-US" dirty="false" smtClean="false">
+              <a:latin typeface="Arial"/>
+              <a:cs typeface="Arial"/>
+            </a:endParaRPr>
+          </a:p>
+          <a:p>
+            <a:pPr eaLnBrk="true" hangingPunct="true"/>
+            <a:r>
+              <a:t>On peut faire le parallèle avec la téléphonie portable : lorsqu’il ne fonctionne plus je le jette et j’en rachète un autre</a:t>
+            </a:r>
+            <a:endParaRPr lang="en-US" dirty="false" smtClean="false">
+              <a:latin typeface="Arial"/>
+              <a:cs typeface="Arial"/>
+            </a:endParaRPr>
+          </a:p>
+          <a:p>
+            <a:pPr eaLnBrk="true" hangingPunct="true"/>
+            <a:r>
+              <a:t/>
+            </a:r>
+            <a:endParaRPr lang="en-US" dirty="false" smtClean="false">
+              <a:latin typeface="Arial"/>
+              <a:cs typeface="Arial"/>
+            </a:endParaRPr>
+          </a:p>
+          <a:p>
+            <a:pPr eaLnBrk="true" hangingPunct="true"/>
+            <a:r>
+              <a:t>Avec quelque chose d’automatiser derrière</a:t>
+            </a:r>
+            <a:endParaRPr lang="en-US" dirty="false" smtClean="false">
+              <a:latin typeface="Arial"/>
+              <a:cs typeface="Arial"/>
+            </a:endParaRPr>
+          </a:p>
+          <a:p>
+            <a:pPr eaLnBrk="true" hangingPunct="true"/>
+            <a:r>
+              <a:t>On va recréer le rack and stack par des instances</a:t>
+            </a:r>
+            <a:endParaRPr lang="en-US" dirty="false" smtClean="false">
+              <a:latin typeface="Arial"/>
+              <a:cs typeface="Arial"/>
+            </a:endParaRPr>
+          </a:p>
+          <a:p>
+            <a:pPr eaLnBrk="true" hangingPunct="true"/>
+            <a:r>
+              <a:t>On appellee cela des instances car on va instancier un materiel</a:t>
+            </a:r>
+            <a:endParaRPr lang="en-US" dirty="false" smtClean="false">
+              <a:latin typeface="Arial"/>
+              <a:cs typeface="Arial"/>
+            </a:endParaRPr>
+          </a:p>
+          <a:p>
+            <a:pPr eaLnBrk="true" hangingPunct="true"/>
+            <a:r>
+              <a:t/>
+            </a:r>
+            <a:endParaRPr lang="en-US" dirty="false" smtClean="false">
+              <a:latin typeface="Arial"/>
+              <a:cs typeface="Arial"/>
+            </a:endParaRPr>
+          </a:p>
+          <a:p>
+            <a:pPr eaLnBrk="true" hangingPunct="true"/>
+            <a:r>
+              <a:t>Quelques soit votre business. Des applications qui suivent vos besoins</a:t>
+            </a:r>
+            <a:endParaRPr lang="en-US" dirty="false" smtClean="false">
+              <a:latin typeface="Arial"/>
+              <a:cs typeface="Arial"/>
+            </a:endParaRPr>
+          </a:p>
+          <a:p>
+            <a:pPr eaLnBrk="true" hangingPunct="true"/>
+            <a:r>
+              <a:t>AWS =&gt; Compute, storage and database </a:t>
+            </a:r>
+            <a:endParaRPr lang="en-US" dirty="false" smtClean="false">
+              <a:latin typeface="Arial"/>
+              <a:cs typeface="Arial"/>
+            </a:endParaRPr>
+          </a:p>
+          <a:p>
+            <a:pPr eaLnBrk="true" hangingPunct="true"/>
+            <a:r>
+              <a:t>No upfront capital exchange</a:t>
+            </a:r>
+            <a:endParaRPr lang="en-US" dirty="false" smtClean="false">
+              <a:latin typeface="Arial"/>
+              <a:cs typeface="Arial"/>
+            </a:endParaRPr>
+          </a:p>
+          <a:p>
+            <a:pPr eaLnBrk="true" hangingPunct="true"/>
+            <a:r>
+              <a:t/>
+            </a:r>
+            <a:endParaRPr lang="en-US" dirty="false" smtClean="false">
+              <a:latin typeface="Arial"/>
+              <a:cs typeface="Arial"/>
+            </a:endParaRPr>
+          </a:p>
+          <a:p>
+            <a:pPr eaLnBrk="true" hangingPunct="true"/>
+            <a:r>
+              <a:t>Economy at scale</a:t>
+            </a:r>
+            <a:endParaRPr lang="en-US" dirty="false" smtClean="false">
+              <a:latin typeface="Arial"/>
+              <a:cs typeface="Arial"/>
+            </a:endParaRPr>
+          </a:p>
+          <a:p>
+            <a:pPr eaLnBrk="true" hangingPunct="true"/>
+            <a:r>
+              <a:t>Add and remove capacity dynamically</a:t>
+            </a:r>
+            <a:endParaRPr lang="en-US" dirty="false" smtClean="false">
+              <a:latin typeface="Arial"/>
+              <a:cs typeface="Arial"/>
+            </a:endParaRPr>
+          </a:p>
+          <a:p>
+            <a:pPr eaLnBrk="true" hangingPunct="true"/>
+            <a:r>
+              <a:t/>
+            </a:r>
+            <a:endParaRPr lang="en-US" dirty="false" smtClean="false">
+              <a:latin typeface="Arial"/>
+              <a:cs typeface="Arial"/>
+            </a:endParaRPr>
+          </a:p>
+          <a:p>
+            <a:pPr eaLnBrk="true" hangingPunct="true"/>
+            <a:r>
+              <a:t>====</a:t>
+            </a:r>
+            <a:endParaRPr lang="en-US" dirty="false" smtClean="false">
+              <a:latin typeface="Arial"/>
+              <a:cs typeface="Arial"/>
+            </a:endParaRPr>
+          </a:p>
+          <a:p>
+            <a:pPr eaLnBrk="true" hangingPunct="true"/>
+            <a:r>
+              <a:t/>
+            </a:r>
+            <a:endParaRPr lang="en-US" dirty="false" smtClean="false">
+              <a:latin typeface="Arial"/>
+              <a:cs typeface="Arial"/>
+            </a:endParaRPr>
+          </a:p>
+          <a:p>
+            <a:pPr eaLnBrk="true" hangingPunct="true"/>
+            <a:r>
+              <a:t>For more on this, see: https://aws.amazon.com/what-is-cloud-computing/</a:t>
+            </a:r>
+            <a:endParaRPr lang="en-US" dirty="false" smtClean="false">
+              <a:latin typeface="Arial"/>
+              <a:cs typeface="Arial"/>
+            </a:endParaRPr>
+          </a:p>
+          <a:p>
+            <a:pPr eaLnBrk="true" hangingPunct="true"/>
+            <a:r>
+              <a:t/>
+            </a:r>
+            <a:endParaRPr lang="en-US" dirty="false" smtClean="false">
+              <a:latin typeface="Arial"/>
+              <a:cs typeface="Arial"/>
+            </a:endParaRPr>
+          </a:p>
+          <a:p>
+            <a:pPr eaLnBrk="true" hangingPunct="true"/>
+            <a:r>
+              <a:t/>
+            </a:r>
+            <a:endParaRPr lang="en-US" dirty="false" smtClean="false">
+              <a:latin typeface="Arial"/>
+              <a:cs typeface="Arial"/>
+            </a:endParaRPr>
+          </a:p>
+          <a:p>
+            <a:pPr eaLnBrk="true" hangingPunct="true"/>
+            <a:r>
+              <a:t>=== Original comments from ./sample-docs/pptx-copy.pptx===</a:t>
+            </a:r>
+            <a:endParaRPr lang="en-US" dirty="false" smtClean="false">
+              <a:latin typeface="Arial"/>
+              <a:cs typeface="Arial"/>
+            </a:endParaRPr>
+          </a:p>
+          <a:p>
+            <a:pPr eaLnBrk="true" hangingPunct="true"/>
+            <a:r>
+              <a:t>Il faut construire un DC, un autre, …</a:t>
+            </a:r>
+            <a:endParaRPr lang="en-US" dirty="false" smtClean="false">
+              <a:latin typeface="Arial"/>
+              <a:cs typeface="Arial"/>
+            </a:endParaRPr>
+          </a:p>
+          <a:p>
+            <a:pPr eaLnBrk="true" hangingPunct="true"/>
+            <a:r>
+              <a:t>On parle de Capital Expense</a:t>
+            </a:r>
+            <a:endParaRPr lang="en-US" dirty="false" smtClean="false">
+              <a:latin typeface="Arial"/>
+              <a:cs typeface="Arial"/>
+            </a:endParaRPr>
+          </a:p>
+          <a:p>
+            <a:pPr eaLnBrk="true" hangingPunct="true"/>
+            <a:r>
+              <a:t/>
+            </a:r>
+            <a:endParaRPr lang="en-US" dirty="false" smtClean="false">
+              <a:latin typeface="Arial"/>
+              <a:cs typeface="Arial"/>
+            </a:endParaRPr>
+          </a:p>
+          <a:p>
+            <a:pPr eaLnBrk="true" hangingPunct="true"/>
+            <a:r>
+              <a:t>Le mode de financement du cloud c’est de l’operational expense</a:t>
+            </a:r>
+            <a:endParaRPr lang="en-US" dirty="false" smtClean="false">
+              <a:latin typeface="Arial"/>
+              <a:cs typeface="Arial"/>
+            </a:endParaRPr>
+          </a:p>
+          <a:p>
+            <a:pPr eaLnBrk="true" hangingPunct="true"/>
+            <a:r>
+              <a:t>On va payer à l’heure de consummation</a:t>
+            </a:r>
+            <a:endParaRPr lang="en-US" dirty="false" smtClean="false">
+              <a:latin typeface="Arial"/>
+              <a:cs typeface="Arial"/>
+            </a:endParaRPr>
+          </a:p>
+          <a:p>
+            <a:pPr eaLnBrk="true" hangingPunct="true"/>
+            <a:r>
+              <a:t>On peut faire le parallèle avec la téléphonie portable : lorsqu’il ne fonctionne plus je le jette et j’en rachète un autre</a:t>
+            </a:r>
+            <a:endParaRPr lang="en-US" dirty="false" smtClean="false">
+              <a:latin typeface="Arial"/>
+              <a:cs typeface="Arial"/>
+            </a:endParaRPr>
+          </a:p>
+          <a:p>
+            <a:pPr eaLnBrk="true" hangingPunct="true"/>
+            <a:r>
+              <a:t/>
+            </a:r>
+            <a:endParaRPr lang="en-US" dirty="false" smtClean="false">
+              <a:latin typeface="Arial"/>
+              <a:cs typeface="Arial"/>
+            </a:endParaRPr>
+          </a:p>
+          <a:p>
+            <a:pPr eaLnBrk="true" hangingPunct="true"/>
+            <a:r>
+              <a:t>Avec quelque chose d’automatiser derrière</a:t>
+            </a:r>
+            <a:endParaRPr lang="en-US" dirty="false" smtClean="false">
+              <a:latin typeface="Arial"/>
+              <a:cs typeface="Arial"/>
+            </a:endParaRPr>
+          </a:p>
+          <a:p>
+            <a:pPr eaLnBrk="true" hangingPunct="true"/>
+            <a:r>
+              <a:t>On va recréer le rack and stack par des instances</a:t>
+            </a:r>
+            <a:endParaRPr lang="en-US" dirty="false" smtClean="false">
+              <a:latin typeface="Arial"/>
+              <a:cs typeface="Arial"/>
+            </a:endParaRPr>
+          </a:p>
+          <a:p>
+            <a:pPr eaLnBrk="true" hangingPunct="true"/>
+            <a:r>
+              <a:t>On appellee cela des instances car on va instancier un materiel</a:t>
+            </a:r>
+            <a:endParaRPr lang="en-US" dirty="false" smtClean="false">
+              <a:latin typeface="Arial"/>
+              <a:cs typeface="Arial"/>
+            </a:endParaRPr>
+          </a:p>
+          <a:p>
+            <a:pPr eaLnBrk="true" hangingPunct="true"/>
+            <a:r>
+              <a:t/>
+            </a:r>
+            <a:endParaRPr lang="en-US" dirty="false" smtClean="false">
+              <a:latin typeface="Arial"/>
+              <a:cs typeface="Arial"/>
+            </a:endParaRPr>
+          </a:p>
+          <a:p>
+            <a:pPr eaLnBrk="true" hangingPunct="true"/>
+            <a:r>
+              <a:t>Quelques soit votre business. Des applications qui suivent vos besoins</a:t>
+            </a:r>
+            <a:endParaRPr lang="en-US" dirty="false" smtClean="false">
+              <a:latin typeface="Arial"/>
+              <a:cs typeface="Arial"/>
+            </a:endParaRPr>
+          </a:p>
+          <a:p>
+            <a:pPr eaLnBrk="true" hangingPunct="true"/>
+            <a:r>
+              <a:t>AWS =&gt; Compute, storage and database </a:t>
+            </a:r>
+            <a:endParaRPr lang="en-US" dirty="false" smtClean="false">
+              <a:latin typeface="Arial"/>
+              <a:cs typeface="Arial"/>
+            </a:endParaRPr>
+          </a:p>
+          <a:p>
+            <a:pPr eaLnBrk="true" hangingPunct="true"/>
+            <a:r>
+              <a:t>No upfront capital exchange</a:t>
+            </a:r>
+            <a:endParaRPr lang="en-US" dirty="false" smtClean="false">
+              <a:latin typeface="Arial"/>
+              <a:cs typeface="Arial"/>
+            </a:endParaRPr>
+          </a:p>
+          <a:p>
+            <a:pPr eaLnBrk="true" hangingPunct="true"/>
+            <a:r>
+              <a:t/>
+            </a:r>
+            <a:endParaRPr lang="en-US" dirty="false" smtClean="false">
+              <a:latin typeface="Arial"/>
+              <a:cs typeface="Arial"/>
+            </a:endParaRPr>
+          </a:p>
+          <a:p>
+            <a:pPr eaLnBrk="true" hangingPunct="true"/>
+            <a:r>
+              <a:t>Economy at scale</a:t>
+            </a:r>
+            <a:endParaRPr lang="en-US" dirty="false" smtClean="false">
+              <a:latin typeface="Arial"/>
+              <a:cs typeface="Arial"/>
+            </a:endParaRPr>
+          </a:p>
+          <a:p>
+            <a:pPr eaLnBrk="true" hangingPunct="true"/>
+            <a:r>
+              <a:t>Add and remove capacity dynamically</a:t>
+            </a:r>
+            <a:endParaRPr lang="en-US" dirty="false" smtClean="false">
+              <a:latin typeface="Arial"/>
+              <a:cs typeface="Arial"/>
+            </a:endParaRPr>
+          </a:p>
+          <a:p>
+            <a:pPr eaLnBrk="true" hangingPunct="true"/>
+            <a:r>
+              <a:t/>
+            </a:r>
+            <a:endParaRPr lang="en-US" dirty="false" smtClean="false">
+              <a:latin typeface="Arial"/>
+              <a:cs typeface="Arial"/>
+            </a:endParaRPr>
+          </a:p>
+          <a:p>
+            <a:pPr eaLnBrk="true" hangingPunct="true"/>
+            <a:r>
+              <a:t>====</a:t>
+            </a:r>
+            <a:endParaRPr lang="en-US" dirty="false" smtClean="false">
+              <a:latin typeface="Arial"/>
+              <a:cs typeface="Arial"/>
+            </a:endParaRPr>
+          </a:p>
+          <a:p>
+            <a:pPr eaLnBrk="true" hangingPunct="true"/>
+            <a:r>
+              <a:t/>
+            </a:r>
+            <a:endParaRPr lang="en-US" dirty="false" smtClean="false">
+              <a:latin typeface="Arial"/>
+              <a:cs typeface="Arial"/>
+            </a:endParaRPr>
+          </a:p>
+          <a:p>
+            <a:pPr eaLnBrk="true" hangingPunct="true"/>
+            <a:r>
+              <a:t>For more on this, see: https://aws.amazon.com/what-is-cloud-computing/</a:t>
+            </a:r>
+            <a:endParaRPr lang="en-US" dirty="false" smtClean="false">
+              <a:latin typeface="Arial"/>
+              <a:cs typeface="Arial"/>
+            </a:endParaRPr>
+          </a:p>
+          <a:p>
+            <a:pPr eaLnBrk="true" hangingPunct="true"/>
+            <a:r>
+              <a:t/>
+            </a:r>
+            <a:endParaRPr lang="en-US" dirty="false" smtClean="false">
+              <a:latin typeface="Arial"/>
+              <a:cs typeface="Arial"/>
+            </a:endParaRPr>
+          </a:p>
+          <a:p>
+            <a:pPr eaLnBrk="true" hangingPunct="true"/>
+            <a:r>
+              <a:t/>
+            </a:r>
+            <a:endParaRPr lang="en-US" dirty="false" smtClean="false">
+              <a:latin typeface="Arial"/>
+              <a:cs typeface="Arial"/>
+            </a:endParaRPr>
+          </a:p>
+          <a:p>
+            <a:pPr eaLnBrk="true" hangingPunct="true"/>
+            <a:r>
+              <a:t>=== Original comments from ./sample-docs/pptx-copy.pptx===</a:t>
+            </a:r>
+            <a:endParaRPr lang="en-US" dirty="false" smtClean="false">
+              <a:latin typeface="Arial"/>
+              <a:cs typeface="Arial"/>
+            </a:endParaRPr>
+          </a:p>
           <a:p>
             <a:pPr eaLnBrk="true" hangingPunct="true"/>
             <a:r>
@@ -5657,7 +6177,7 @@
 </file>
 
 <file path=ppt/slides/slide1.xml><?xml version="1.0" encoding="utf-8"?>
-<p:sld xmlns:r="http://schemas.openxmlformats.org/officeDocument/2006/relationships" xmlns:p="http://schemas.openxmlformats.org/presentationml/2006/main" xmlns:a="http://schemas.openxmlformats.org/drawingml/2006/main" xmlns:mc="http://schemas.openxmlformats.org/markup-compatibility/2006" xmlns:c="http://schemas.openxmlformats.org/drawingml/2006/chart" xmlns:ns6="http://schemas.openxmlformats.org/drawingml/2006/chartDrawing" xmlns:dgm="http://schemas.openxmlformats.org/drawingml/2006/diagram" xmlns:pic="http://schemas.openxmlformats.org/drawingml/2006/picture" xmlns:wp="http://schemas.openxmlformats.org/drawingml/2006/wordprocessingDrawing" xmlns:wp14="http://schemas.microsoft.com/office/word/2010/wordprocessingDrawing" xmlns:xdr="http://schemas.openxmlformats.org/drawingml/2006/spreadsheetDrawing" xmlns:ns12="http://schemas.openxmlformats.org/drawingml/2006/compatibility" xmlns:ns13="http://schemas.openxmlformats.org/drawingml/2006/lockedCanvas" xmlns:v="urn:schemas-microsoft-com:vml">
+<p:sld xmlns:p="http://schemas.openxmlformats.org/presentationml/2006/main" xmlns:a="http://schemas.openxmlformats.org/drawingml/2006/main" xmlns:r="http://schemas.openxmlformats.org/officeDocument/2006/relationships" xmlns:mc="http://schemas.openxmlformats.org/markup-compatibility/2006" xmlns:c="http://schemas.openxmlformats.org/drawingml/2006/chart" xmlns:ns6="http://schemas.openxmlformats.org/drawingml/2006/chartDrawing" xmlns:dgm="http://schemas.openxmlformats.org/drawingml/2006/diagram" xmlns:pic="http://schemas.openxmlformats.org/drawingml/2006/picture" xmlns:wp="http://schemas.openxmlformats.org/drawingml/2006/wordprocessingDrawing" xmlns:wp14="http://schemas.microsoft.com/office/word/2010/wordprocessingDrawing" xmlns:xdr="http://schemas.openxmlformats.org/drawingml/2006/spreadsheetDrawing" xmlns:ns12="http://schemas.openxmlformats.org/drawingml/2006/compatibility" xmlns:ns13="http://schemas.openxmlformats.org/drawingml/2006/lockedCanvas" xmlns:v="urn:schemas-microsoft-com:vml">
   <p:cSld>
     <p:spTree>
       <p:nvGrpSpPr>
@@ -5717,7 +6237,7 @@
 </file>
 
 <file path=ppt/slides/slide2.xml><?xml version="1.0" encoding="utf-8"?>
-<p:sld xmlns:r="http://schemas.openxmlformats.org/officeDocument/2006/relationships" xmlns:p="http://schemas.openxmlformats.org/presentationml/2006/main" xmlns:a="http://schemas.openxmlformats.org/drawingml/2006/main" xmlns:mc="http://schemas.openxmlformats.org/markup-compatibility/2006" xmlns:c="http://schemas.openxmlformats.org/drawingml/2006/chart" xmlns:ns6="http://schemas.openxmlformats.org/drawingml/2006/chartDrawing" xmlns:dgm="http://schemas.openxmlformats.org/drawingml/2006/diagram" xmlns:pic="http://schemas.openxmlformats.org/drawingml/2006/picture" xmlns:wp="http://schemas.openxmlformats.org/drawingml/2006/wordprocessingDrawing" xmlns:wp14="http://schemas.microsoft.com/office/word/2010/wordprocessingDrawing" xmlns:xdr="http://schemas.openxmlformats.org/drawingml/2006/spreadsheetDrawing" xmlns:ns12="http://schemas.openxmlformats.org/drawingml/2006/compatibility" xmlns:ns13="http://schemas.openxmlformats.org/drawingml/2006/lockedCanvas" xmlns:v="urn:schemas-microsoft-com:vml">
+<p:sld xmlns:p="http://schemas.openxmlformats.org/presentationml/2006/main" xmlns:a="http://schemas.openxmlformats.org/drawingml/2006/main" xmlns:r="http://schemas.openxmlformats.org/officeDocument/2006/relationships" xmlns:mc="http://schemas.openxmlformats.org/markup-compatibility/2006" xmlns:c="http://schemas.openxmlformats.org/drawingml/2006/chart" xmlns:ns6="http://schemas.openxmlformats.org/drawingml/2006/chartDrawing" xmlns:dgm="http://schemas.openxmlformats.org/drawingml/2006/diagram" xmlns:pic="http://schemas.openxmlformats.org/drawingml/2006/picture" xmlns:wp="http://schemas.openxmlformats.org/drawingml/2006/wordprocessingDrawing" xmlns:wp14="http://schemas.microsoft.com/office/word/2010/wordprocessingDrawing" xmlns:xdr="http://schemas.openxmlformats.org/drawingml/2006/spreadsheetDrawing" xmlns:ns12="http://schemas.openxmlformats.org/drawingml/2006/compatibility" xmlns:ns13="http://schemas.openxmlformats.org/drawingml/2006/lockedCanvas" xmlns:v="urn:schemas-microsoft-com:vml">
   <p:cSld>
     <p:spTree>
       <p:nvGrpSpPr>

</xml_diff>

<commit_message>
Refactor + Unmarshall class
</commit_message>
<xml_diff>
--- a/sample-docs/pptx-copy.pptx
+++ b/sample-docs/pptx-copy.pptx
@@ -690,7 +690,7 @@
 </file>
 
 <file path=ppt/notesSlides/notesSlide1.xml><?xml version="1.0" encoding="utf-8"?>
-<p:notes xmlns:p="http://schemas.openxmlformats.org/presentationml/2006/main" xmlns:a="http://schemas.openxmlformats.org/drawingml/2006/main" xmlns:r="http://schemas.openxmlformats.org/officeDocument/2006/relationships" xmlns:mc="http://schemas.openxmlformats.org/markup-compatibility/2006" xmlns:c="http://schemas.openxmlformats.org/drawingml/2006/chart" xmlns:ns6="http://schemas.openxmlformats.org/drawingml/2006/chartDrawing" xmlns:dgm="http://schemas.openxmlformats.org/drawingml/2006/diagram" xmlns:pic="http://schemas.openxmlformats.org/drawingml/2006/picture" xmlns:wp="http://schemas.openxmlformats.org/drawingml/2006/wordprocessingDrawing" xmlns:wp14="http://schemas.microsoft.com/office/word/2010/wordprocessingDrawing" xmlns:xdr="http://schemas.openxmlformats.org/drawingml/2006/spreadsheetDrawing" xmlns:ns12="http://schemas.openxmlformats.org/drawingml/2006/compatibility" xmlns:ns13="http://schemas.openxmlformats.org/drawingml/2006/lockedCanvas">
+<p:notes xmlns:r="http://schemas.openxmlformats.org/officeDocument/2006/relationships" xmlns:a="http://schemas.openxmlformats.org/drawingml/2006/main" xmlns:p="http://schemas.openxmlformats.org/presentationml/2006/main" xmlns:mc="http://schemas.openxmlformats.org/markup-compatibility/2006" xmlns:c="http://schemas.openxmlformats.org/drawingml/2006/chart" xmlns:ns6="http://schemas.openxmlformats.org/drawingml/2006/chartDrawing" xmlns:dgm="http://schemas.openxmlformats.org/drawingml/2006/diagram" xmlns:pic="http://schemas.openxmlformats.org/drawingml/2006/picture" xmlns:wp="http://schemas.openxmlformats.org/drawingml/2006/wordprocessingDrawing" xmlns:wp14="http://schemas.microsoft.com/office/word/2010/wordprocessingDrawing" xmlns:xdr="http://schemas.openxmlformats.org/drawingml/2006/spreadsheetDrawing" xmlns:ns12="http://schemas.openxmlformats.org/drawingml/2006/compatibility" xmlns:ns13="http://schemas.openxmlformats.org/drawingml/2006/lockedCanvas">
   <p:cSld>
     <p:spTree>
       <p:nvGrpSpPr>
@@ -735,7 +735,7 @@
           <a:p>
             <a:pPr eaLnBrk="true" hangingPunct="true"/>
             <a:r>
-              <a:t>C’est quoi le clou(d) ?</a:t>
+              <a:t>=== Original comments from ./sample-docs/pptx-copy.pptx===</a:t>
             </a:r>
             <a:endParaRPr lang="en-US" dirty="false" smtClean="false">
               <a:latin typeface="Arial"/>
@@ -745,7 +745,7 @@
           <a:p>
             <a:pPr eaLnBrk="true" hangingPunct="true"/>
             <a:r>
-              <a:t>=== Original comments from ./sample-docs/pptx-copy.pptx===</a:t>
+              <a:t>C’est quoi le clou(d) ?</a:t>
             </a:r>
             <a:endParaRPr lang="en-US" dirty="false" smtClean="false">
               <a:latin typeface="Arial"/>
@@ -755,7 +755,7 @@
           <a:p>
             <a:pPr eaLnBrk="true" hangingPunct="true"/>
             <a:r>
-              <a:t>C’est quoi le clou(d) ?</a:t>
+              <a:t>=== Original comments from ./sample-docs/pptx-copy.pptx===</a:t>
             </a:r>
             <a:endParaRPr lang="en-US" dirty="false" smtClean="false">
               <a:latin typeface="Arial"/>
@@ -765,137 +765,7 @@
           <a:p>
             <a:pPr eaLnBrk="true" hangingPunct="true"/>
             <a:r>
-              <a:t>=== Original comments from ./sample-docs/pptx-copy.pptx===</a:t>
-            </a:r>
-            <a:endParaRPr lang="en-US" dirty="false" smtClean="false">
-              <a:latin typeface="Arial"/>
-              <a:cs typeface="Arial"/>
-            </a:endParaRPr>
-          </a:p>
-          <a:p>
-            <a:pPr eaLnBrk="true" hangingPunct="true"/>
-            <a:r>
               <a:t>C’est quoi le clou(d) ?</a:t>
-            </a:r>
-            <a:endParaRPr lang="en-US" dirty="false" smtClean="false">
-              <a:latin typeface="Arial"/>
-              <a:cs typeface="Arial"/>
-            </a:endParaRPr>
-          </a:p>
-          <a:p>
-            <a:pPr eaLnBrk="true" hangingPunct="true"/>
-            <a:r>
-              <a:t>=== Original comments from ./sample-docs/pptx-copy.pptx===</a:t>
-            </a:r>
-            <a:endParaRPr lang="en-US" dirty="false" smtClean="false">
-              <a:latin typeface="Arial"/>
-              <a:cs typeface="Arial"/>
-            </a:endParaRPr>
-          </a:p>
-          <a:p>
-            <a:pPr eaLnBrk="true" hangingPunct="true"/>
-            <a:r>
-              <a:t>C’est quoi le clou(d) ?</a:t>
-            </a:r>
-            <a:endParaRPr lang="en-US" dirty="false" smtClean="false">
-              <a:latin typeface="Arial"/>
-              <a:cs typeface="Arial"/>
-            </a:endParaRPr>
-          </a:p>
-          <a:p>
-            <a:pPr eaLnBrk="true" hangingPunct="true"/>
-            <a:r>
-              <a:t>=== Original comments from ./sample-docs/pptx-copy.pptx===</a:t>
-            </a:r>
-            <a:endParaRPr lang="en-US" dirty="false" smtClean="false">
-              <a:latin typeface="Arial"/>
-              <a:cs typeface="Arial"/>
-            </a:endParaRPr>
-          </a:p>
-          <a:p>
-            <a:pPr eaLnBrk="true" hangingPunct="true"/>
-            <a:r>
-              <a:t>C’est quoi le clou(d) ?</a:t>
-            </a:r>
-            <a:endParaRPr lang="en-US" dirty="false" smtClean="false">
-              <a:latin typeface="Arial"/>
-              <a:cs typeface="Arial"/>
-            </a:endParaRPr>
-          </a:p>
-          <a:p>
-            <a:pPr eaLnBrk="true" hangingPunct="true"/>
-            <a:r>
-              <a:t>=== Original comments from F:\users\mbojoly\Documents\MBO\Projets\copypptxnotes/sample-docs/pptx-copy.pptx===</a:t>
-            </a:r>
-            <a:endParaRPr lang="en-US" dirty="false" smtClean="false">
-              <a:latin typeface="Arial"/>
-              <a:cs typeface="Arial"/>
-            </a:endParaRPr>
-          </a:p>
-          <a:p>
-            <a:pPr eaLnBrk="true" hangingPunct="true"/>
-            <a:r>
-              <a:t>C’est quoi le clou(d) ?</a:t>
-            </a:r>
-            <a:endParaRPr lang="en-US" dirty="false" smtClean="false">
-              <a:latin typeface="Arial"/>
-              <a:cs typeface="Arial"/>
-            </a:endParaRPr>
-          </a:p>
-          <a:p>
-            <a:pPr eaLnBrk="true" hangingPunct="true"/>
-            <a:r>
-              <a:t>=== Original comments from F:\users\mbojoly\Documents\MBO\Projets\copypptxnotes/sample-docs/pptx-copy.pptx===</a:t>
-            </a:r>
-            <a:endParaRPr lang="en-US" dirty="false" smtClean="false">
-              <a:latin typeface="Arial"/>
-              <a:cs typeface="Arial"/>
-            </a:endParaRPr>
-          </a:p>
-          <a:p>
-            <a:pPr eaLnBrk="true" hangingPunct="true"/>
-            <a:r>
-              <a:t>C’est quoi le clou(d) ?</a:t>
-            </a:r>
-            <a:endParaRPr lang="en-US" dirty="false" smtClean="false">
-              <a:latin typeface="Arial"/>
-              <a:cs typeface="Arial"/>
-            </a:endParaRPr>
-          </a:p>
-          <a:p>
-            <a:pPr eaLnBrk="true" hangingPunct="true"/>
-            <a:r>
-              <a:t>=== Original comments from F:\users\mbojoly\Documents\MBO\Projets\copypptxnotes/sample-docs/pptx-copy.pptx===</a:t>
-            </a:r>
-            <a:endParaRPr lang="en-US" dirty="false" smtClean="false">
-              <a:latin typeface="Arial"/>
-              <a:cs typeface="Arial"/>
-            </a:endParaRPr>
-          </a:p>
-          <a:p>
-            <a:pPr eaLnBrk="true" hangingPunct="true"/>
-            <a:r>
-              <a:t>Paragraph1</a:t>
-            </a:r>
-            <a:endParaRPr lang="en-US" dirty="false" smtClean="false">
-              <a:latin typeface="Arial"/>
-              <a:cs typeface="Arial"/>
-            </a:endParaRPr>
-          </a:p>
-          <a:p>
-            <a:pPr eaLnBrk="true" hangingPunct="true"/>
-            <a:r>
-              <a:t>paragraph2</a:t>
-            </a:r>
-            <a:endParaRPr lang="en-US" dirty="false" smtClean="false">
-              <a:latin typeface="Arial"/>
-              <a:cs typeface="Arial"/>
-            </a:endParaRPr>
-          </a:p>
-          <a:p>
-            <a:pPr eaLnBrk="true" hangingPunct="true"/>
-            <a:r>
-              <a:t>paragraph3</a:t>
             </a:r>
             <a:endParaRPr lang="en-US" dirty="false" smtClean="false">
               <a:latin typeface="Arial"/>
@@ -918,7 +788,7 @@
 </file>
 
 <file path=ppt/notesSlides/notesSlide2.xml><?xml version="1.0" encoding="utf-8"?>
-<p:notes xmlns:p="http://schemas.openxmlformats.org/presentationml/2006/main" xmlns:a="http://schemas.openxmlformats.org/drawingml/2006/main" xmlns:r="http://schemas.openxmlformats.org/officeDocument/2006/relationships" xmlns:mc="http://schemas.openxmlformats.org/markup-compatibility/2006" xmlns:c="http://schemas.openxmlformats.org/drawingml/2006/chart" xmlns:ns6="http://schemas.openxmlformats.org/drawingml/2006/chartDrawing" xmlns:dgm="http://schemas.openxmlformats.org/drawingml/2006/diagram" xmlns:pic="http://schemas.openxmlformats.org/drawingml/2006/picture" xmlns:wp="http://schemas.openxmlformats.org/drawingml/2006/wordprocessingDrawing" xmlns:wp14="http://schemas.microsoft.com/office/word/2010/wordprocessingDrawing" xmlns:xdr="http://schemas.openxmlformats.org/drawingml/2006/spreadsheetDrawing" xmlns:ns12="http://schemas.openxmlformats.org/drawingml/2006/compatibility" xmlns:ns13="http://schemas.openxmlformats.org/drawingml/2006/lockedCanvas">
+<p:notes xmlns:r="http://schemas.openxmlformats.org/officeDocument/2006/relationships" xmlns:a="http://schemas.openxmlformats.org/drawingml/2006/main" xmlns:p="http://schemas.openxmlformats.org/presentationml/2006/main" xmlns:mc="http://schemas.openxmlformats.org/markup-compatibility/2006" xmlns:c="http://schemas.openxmlformats.org/drawingml/2006/chart" xmlns:ns6="http://schemas.openxmlformats.org/drawingml/2006/chartDrawing" xmlns:dgm="http://schemas.openxmlformats.org/drawingml/2006/diagram" xmlns:pic="http://schemas.openxmlformats.org/drawingml/2006/picture" xmlns:wp="http://schemas.openxmlformats.org/drawingml/2006/wordprocessingDrawing" xmlns:wp14="http://schemas.microsoft.com/office/word/2010/wordprocessingDrawing" xmlns:xdr="http://schemas.openxmlformats.org/drawingml/2006/spreadsheetDrawing" xmlns:ns12="http://schemas.openxmlformats.org/drawingml/2006/compatibility" xmlns:ns13="http://schemas.openxmlformats.org/drawingml/2006/lockedCanvas">
   <p:cSld>
     <p:spTree>
       <p:nvGrpSpPr>
@@ -963,7 +833,7 @@
           <a:p>
             <a:pPr eaLnBrk="true" hangingPunct="true"/>
             <a:r>
-              <a:t>Il faut construire un DC, un autre, …</a:t>
+              <a:t>=== Original comments from ./sample-docs/pptx-copy.pptx===</a:t>
             </a:r>
             <a:endParaRPr lang="en-US" dirty="false" smtClean="false">
               <a:latin typeface="Arial"/>
@@ -973,7 +843,7 @@
           <a:p>
             <a:pPr eaLnBrk="true" hangingPunct="true"/>
             <a:r>
-              <a:t>On parle de Capital Expense</a:t>
+              <a:t>Il faut construire un DC, un autre, …</a:t>
             </a:r>
             <a:endParaRPr lang="en-US" dirty="false" smtClean="false">
               <a:latin typeface="Arial"/>
@@ -983,7 +853,7 @@
           <a:p>
             <a:pPr eaLnBrk="true" hangingPunct="true"/>
             <a:r>
-              <a:t/>
+              <a:t>On parle de Capital Expense</a:t>
             </a:r>
             <a:endParaRPr lang="en-US" dirty="false" smtClean="false">
               <a:latin typeface="Arial"/>
@@ -993,7 +863,7 @@
           <a:p>
             <a:pPr eaLnBrk="true" hangingPunct="true"/>
             <a:r>
-              <a:t>Le mode de financement du cloud c’est de l’operational expense</a:t>
+              <a:t/>
             </a:r>
             <a:endParaRPr lang="en-US" dirty="false" smtClean="false">
               <a:latin typeface="Arial"/>
@@ -1003,7 +873,7 @@
           <a:p>
             <a:pPr eaLnBrk="true" hangingPunct="true"/>
             <a:r>
-              <a:t>On va payer à l’heure de consummation</a:t>
+              <a:t>Le mode de financement du cloud c’est de l’operational expense</a:t>
             </a:r>
             <a:endParaRPr lang="en-US" dirty="false" smtClean="false">
               <a:latin typeface="Arial"/>
@@ -1013,7 +883,7 @@
           <a:p>
             <a:pPr eaLnBrk="true" hangingPunct="true"/>
             <a:r>
-              <a:t>On peut faire le parallèle avec la téléphonie portable : lorsqu’il ne fonctionne plus je le jette et j’en rachète un autre</a:t>
+              <a:t>On va payer à l’heure de consummation</a:t>
             </a:r>
             <a:endParaRPr lang="en-US" dirty="false" smtClean="false">
               <a:latin typeface="Arial"/>
@@ -1023,7 +893,7 @@
           <a:p>
             <a:pPr eaLnBrk="true" hangingPunct="true"/>
             <a:r>
-              <a:t/>
+              <a:t>On peut faire le parallèle avec la téléphonie portable : lorsqu’il ne fonctionne plus je le jette et j’en rachète un autre</a:t>
             </a:r>
             <a:endParaRPr lang="en-US" dirty="false" smtClean="false">
               <a:latin typeface="Arial"/>
@@ -1033,7 +903,7 @@
           <a:p>
             <a:pPr eaLnBrk="true" hangingPunct="true"/>
             <a:r>
-              <a:t>Avec quelque chose d’automatiser derrière</a:t>
+              <a:t/>
             </a:r>
             <a:endParaRPr lang="en-US" dirty="false" smtClean="false">
               <a:latin typeface="Arial"/>
@@ -1043,7 +913,7 @@
           <a:p>
             <a:pPr eaLnBrk="true" hangingPunct="true"/>
             <a:r>
-              <a:t>On va recréer le rack and stack par des instances</a:t>
+              <a:t>Avec quelque chose d’automatiser derrière</a:t>
             </a:r>
             <a:endParaRPr lang="en-US" dirty="false" smtClean="false">
               <a:latin typeface="Arial"/>
@@ -1053,7 +923,7 @@
           <a:p>
             <a:pPr eaLnBrk="true" hangingPunct="true"/>
             <a:r>
-              <a:t>On appellee cela des instances car on va instancier un materiel</a:t>
+              <a:t>On va recréer le rack and stack par des instances</a:t>
             </a:r>
             <a:endParaRPr lang="en-US" dirty="false" smtClean="false">
               <a:latin typeface="Arial"/>
@@ -1063,7 +933,7 @@
           <a:p>
             <a:pPr eaLnBrk="true" hangingPunct="true"/>
             <a:r>
-              <a:t/>
+              <a:t>On appellee cela des instances car on va instancier un materiel</a:t>
             </a:r>
             <a:endParaRPr lang="en-US" dirty="false" smtClean="false">
               <a:latin typeface="Arial"/>
@@ -1073,7 +943,7 @@
           <a:p>
             <a:pPr eaLnBrk="true" hangingPunct="true"/>
             <a:r>
-              <a:t>Quelques soit votre business. Des applications qui suivent vos besoins</a:t>
+              <a:t/>
             </a:r>
             <a:endParaRPr lang="en-US" dirty="false" smtClean="false">
               <a:latin typeface="Arial"/>
@@ -1083,7 +953,7 @@
           <a:p>
             <a:pPr eaLnBrk="true" hangingPunct="true"/>
             <a:r>
-              <a:t>AWS =&gt; Compute, storage and database </a:t>
+              <a:t>Quelques soit votre business. Des applications qui suivent vos besoins</a:t>
             </a:r>
             <a:endParaRPr lang="en-US" dirty="false" smtClean="false">
               <a:latin typeface="Arial"/>
@@ -1093,7 +963,7 @@
           <a:p>
             <a:pPr eaLnBrk="true" hangingPunct="true"/>
             <a:r>
-              <a:t>No upfront capital exchange</a:t>
+              <a:t>AWS =&gt; Compute, storage and database </a:t>
             </a:r>
             <a:endParaRPr lang="en-US" dirty="false" smtClean="false">
               <a:latin typeface="Arial"/>
@@ -1103,7 +973,7 @@
           <a:p>
             <a:pPr eaLnBrk="true" hangingPunct="true"/>
             <a:r>
-              <a:t/>
+              <a:t>No upfront capital exchange</a:t>
             </a:r>
             <a:endParaRPr lang="en-US" dirty="false" smtClean="false">
               <a:latin typeface="Arial"/>
@@ -1113,7 +983,7 @@
           <a:p>
             <a:pPr eaLnBrk="true" hangingPunct="true"/>
             <a:r>
-              <a:t>Economy at scale</a:t>
+              <a:t/>
             </a:r>
             <a:endParaRPr lang="en-US" dirty="false" smtClean="false">
               <a:latin typeface="Arial"/>
@@ -1123,7 +993,7 @@
           <a:p>
             <a:pPr eaLnBrk="true" hangingPunct="true"/>
             <a:r>
-              <a:t>Add and remove capacity dynamically</a:t>
+              <a:t>Economy at scale</a:t>
             </a:r>
             <a:endParaRPr lang="en-US" dirty="false" smtClean="false">
               <a:latin typeface="Arial"/>
@@ -1133,7 +1003,7 @@
           <a:p>
             <a:pPr eaLnBrk="true" hangingPunct="true"/>
             <a:r>
-              <a:t/>
+              <a:t>Add and remove capacity dynamically</a:t>
             </a:r>
             <a:endParaRPr lang="en-US" dirty="false" smtClean="false">
               <a:latin typeface="Arial"/>
@@ -1143,7 +1013,7 @@
           <a:p>
             <a:pPr eaLnBrk="true" hangingPunct="true"/>
             <a:r>
-              <a:t>====</a:t>
+              <a:t/>
             </a:r>
             <a:endParaRPr lang="en-US" dirty="false" smtClean="false">
               <a:latin typeface="Arial"/>
@@ -1153,7 +1023,7 @@
           <a:p>
             <a:pPr eaLnBrk="true" hangingPunct="true"/>
             <a:r>
-              <a:t/>
+              <a:t>====</a:t>
             </a:r>
             <a:endParaRPr lang="en-US" dirty="false" smtClean="false">
               <a:latin typeface="Arial"/>
@@ -1163,7 +1033,7 @@
           <a:p>
             <a:pPr eaLnBrk="true" hangingPunct="true"/>
             <a:r>
-              <a:t>For more on this, see: https://aws.amazon.com/what-is-cloud-computing/</a:t>
+              <a:t/>
             </a:r>
             <a:endParaRPr lang="en-US" dirty="false" smtClean="false">
               <a:latin typeface="Arial"/>
@@ -1173,7 +1043,7 @@
           <a:p>
             <a:pPr eaLnBrk="true" hangingPunct="true"/>
             <a:r>
-              <a:t/>
+              <a:t>For more on this, see: https://aws.amazon.com/what-is-cloud-computing/</a:t>
             </a:r>
             <a:endParaRPr lang="en-US" dirty="false" smtClean="false">
               <a:latin typeface="Arial"/>
@@ -1193,7 +1063,7 @@
           <a:p>
             <a:pPr eaLnBrk="true" hangingPunct="true"/>
             <a:r>
-              <a:t>=== Original comments from ./sample-docs/pptx-copy.pptx===</a:t>
+              <a:t/>
             </a:r>
             <a:endParaRPr lang="en-US" dirty="false" smtClean="false">
               <a:latin typeface="Arial"/>
@@ -1203,7 +1073,7 @@
           <a:p>
             <a:pPr eaLnBrk="true" hangingPunct="true"/>
             <a:r>
-              <a:t>Il faut construire un DC, un autre, …</a:t>
+              <a:t>=== Original comments from ./sample-docs/pptx-copy.pptx===</a:t>
             </a:r>
             <a:endParaRPr lang="en-US" dirty="false" smtClean="false">
               <a:latin typeface="Arial"/>
@@ -1213,7 +1083,7 @@
           <a:p>
             <a:pPr eaLnBrk="true" hangingPunct="true"/>
             <a:r>
-              <a:t>On parle de Capital Expense</a:t>
+              <a:t>Il faut construire un DC, un autre, …</a:t>
             </a:r>
             <a:endParaRPr lang="en-US" dirty="false" smtClean="false">
               <a:latin typeface="Arial"/>
@@ -1223,7 +1093,7 @@
           <a:p>
             <a:pPr eaLnBrk="true" hangingPunct="true"/>
             <a:r>
-              <a:t/>
+              <a:t>On parle de Capital Expense</a:t>
             </a:r>
             <a:endParaRPr lang="en-US" dirty="false" smtClean="false">
               <a:latin typeface="Arial"/>
@@ -1233,7 +1103,7 @@
           <a:p>
             <a:pPr eaLnBrk="true" hangingPunct="true"/>
             <a:r>
-              <a:t>Le mode de financement du cloud c’est de l’operational expense</a:t>
+              <a:t/>
             </a:r>
             <a:endParaRPr lang="en-US" dirty="false" smtClean="false">
               <a:latin typeface="Arial"/>
@@ -1243,7 +1113,7 @@
           <a:p>
             <a:pPr eaLnBrk="true" hangingPunct="true"/>
             <a:r>
-              <a:t>On va payer à l’heure de consummation</a:t>
+              <a:t>Le mode de financement du cloud c’est de l’operational expense</a:t>
             </a:r>
             <a:endParaRPr lang="en-US" dirty="false" smtClean="false">
               <a:latin typeface="Arial"/>
@@ -1253,7 +1123,7 @@
           <a:p>
             <a:pPr eaLnBrk="true" hangingPunct="true"/>
             <a:r>
-              <a:t>On peut faire le parallèle avec la téléphonie portable : lorsqu’il ne fonctionne plus je le jette et j’en rachète un autre</a:t>
+              <a:t>On va payer à l’heure de consummation</a:t>
             </a:r>
             <a:endParaRPr lang="en-US" dirty="false" smtClean="false">
               <a:latin typeface="Arial"/>
@@ -1263,7 +1133,7 @@
           <a:p>
             <a:pPr eaLnBrk="true" hangingPunct="true"/>
             <a:r>
-              <a:t/>
+              <a:t>On peut faire le parallèle avec la téléphonie portable : lorsqu’il ne fonctionne plus je le jette et j’en rachète un autre</a:t>
             </a:r>
             <a:endParaRPr lang="en-US" dirty="false" smtClean="false">
               <a:latin typeface="Arial"/>
@@ -1273,7 +1143,7 @@
           <a:p>
             <a:pPr eaLnBrk="true" hangingPunct="true"/>
             <a:r>
-              <a:t>Avec quelque chose d’automatiser derrière</a:t>
+              <a:t/>
             </a:r>
             <a:endParaRPr lang="en-US" dirty="false" smtClean="false">
               <a:latin typeface="Arial"/>
@@ -1283,7 +1153,7 @@
           <a:p>
             <a:pPr eaLnBrk="true" hangingPunct="true"/>
             <a:r>
-              <a:t>On va recréer le rack and stack par des instances</a:t>
+              <a:t>Avec quelque chose d’automatiser derrière</a:t>
             </a:r>
             <a:endParaRPr lang="en-US" dirty="false" smtClean="false">
               <a:latin typeface="Arial"/>
@@ -1293,7 +1163,7 @@
           <a:p>
             <a:pPr eaLnBrk="true" hangingPunct="true"/>
             <a:r>
-              <a:t>On appellee cela des instances car on va instancier un materiel</a:t>
+              <a:t>On va recréer le rack and stack par des instances</a:t>
             </a:r>
             <a:endParaRPr lang="en-US" dirty="false" smtClean="false">
               <a:latin typeface="Arial"/>
@@ -1303,7 +1173,7 @@
           <a:p>
             <a:pPr eaLnBrk="true" hangingPunct="true"/>
             <a:r>
-              <a:t/>
+              <a:t>On appellee cela des instances car on va instancier un materiel</a:t>
             </a:r>
             <a:endParaRPr lang="en-US" dirty="false" smtClean="false">
               <a:latin typeface="Arial"/>
@@ -1313,7 +1183,7 @@
           <a:p>
             <a:pPr eaLnBrk="true" hangingPunct="true"/>
             <a:r>
-              <a:t>Quelques soit votre business. Des applications qui suivent vos besoins</a:t>
+              <a:t/>
             </a:r>
             <a:endParaRPr lang="en-US" dirty="false" smtClean="false">
               <a:latin typeface="Arial"/>
@@ -1323,7 +1193,7 @@
           <a:p>
             <a:pPr eaLnBrk="true" hangingPunct="true"/>
             <a:r>
-              <a:t>AWS =&gt; Compute, storage and database </a:t>
+              <a:t>Quelques soit votre business. Des applications qui suivent vos besoins</a:t>
             </a:r>
             <a:endParaRPr lang="en-US" dirty="false" smtClean="false">
               <a:latin typeface="Arial"/>
@@ -1333,7 +1203,7 @@
           <a:p>
             <a:pPr eaLnBrk="true" hangingPunct="true"/>
             <a:r>
-              <a:t>No upfront capital exchange</a:t>
+              <a:t>AWS =&gt; Compute, storage and database </a:t>
             </a:r>
             <a:endParaRPr lang="en-US" dirty="false" smtClean="false">
               <a:latin typeface="Arial"/>
@@ -1343,7 +1213,7 @@
           <a:p>
             <a:pPr eaLnBrk="true" hangingPunct="true"/>
             <a:r>
-              <a:t/>
+              <a:t>No upfront capital exchange</a:t>
             </a:r>
             <a:endParaRPr lang="en-US" dirty="false" smtClean="false">
               <a:latin typeface="Arial"/>
@@ -1353,7 +1223,7 @@
           <a:p>
             <a:pPr eaLnBrk="true" hangingPunct="true"/>
             <a:r>
-              <a:t>Economy at scale</a:t>
+              <a:t/>
             </a:r>
             <a:endParaRPr lang="en-US" dirty="false" smtClean="false">
               <a:latin typeface="Arial"/>
@@ -1363,7 +1233,7 @@
           <a:p>
             <a:pPr eaLnBrk="true" hangingPunct="true"/>
             <a:r>
-              <a:t>Add and remove capacity dynamically</a:t>
+              <a:t>Economy at scale</a:t>
             </a:r>
             <a:endParaRPr lang="en-US" dirty="false" smtClean="false">
               <a:latin typeface="Arial"/>
@@ -1373,7 +1243,7 @@
           <a:p>
             <a:pPr eaLnBrk="true" hangingPunct="true"/>
             <a:r>
-              <a:t/>
+              <a:t>Add and remove capacity dynamically</a:t>
             </a:r>
             <a:endParaRPr lang="en-US" dirty="false" smtClean="false">
               <a:latin typeface="Arial"/>
@@ -1383,7 +1253,7 @@
           <a:p>
             <a:pPr eaLnBrk="true" hangingPunct="true"/>
             <a:r>
-              <a:t>====</a:t>
+              <a:t/>
             </a:r>
             <a:endParaRPr lang="en-US" dirty="false" smtClean="false">
               <a:latin typeface="Arial"/>
@@ -1393,7 +1263,7 @@
           <a:p>
             <a:pPr eaLnBrk="true" hangingPunct="true"/>
             <a:r>
-              <a:t/>
+              <a:t>====</a:t>
             </a:r>
             <a:endParaRPr lang="en-US" dirty="false" smtClean="false">
               <a:latin typeface="Arial"/>
@@ -1403,7 +1273,7 @@
           <a:p>
             <a:pPr eaLnBrk="true" hangingPunct="true"/>
             <a:r>
-              <a:t>For more on this, see: https://aws.amazon.com/what-is-cloud-computing/</a:t>
+              <a:t/>
             </a:r>
             <a:endParaRPr lang="en-US" dirty="false" smtClean="false">
               <a:latin typeface="Arial"/>
@@ -1413,7 +1283,7 @@
           <a:p>
             <a:pPr eaLnBrk="true" hangingPunct="true"/>
             <a:r>
-              <a:t/>
+              <a:t>For more on this, see: https://aws.amazon.com/what-is-cloud-computing/</a:t>
             </a:r>
             <a:endParaRPr lang="en-US" dirty="false" smtClean="false">
               <a:latin typeface="Arial"/>
@@ -1433,1237 +1303,7 @@
           <a:p>
             <a:pPr eaLnBrk="true" hangingPunct="true"/>
             <a:r>
-              <a:t>=== Original comments from ./sample-docs/pptx-copy.pptx===</a:t>
-            </a:r>
-            <a:endParaRPr lang="en-US" dirty="false" smtClean="false">
-              <a:latin typeface="Arial"/>
-              <a:cs typeface="Arial"/>
-            </a:endParaRPr>
-          </a:p>
-          <a:p>
-            <a:pPr eaLnBrk="true" hangingPunct="true"/>
-            <a:r>
-              <a:t>Il faut construire un DC, un autre, …</a:t>
-            </a:r>
-            <a:endParaRPr lang="en-US" dirty="false" smtClean="false">
-              <a:latin typeface="Arial"/>
-              <a:cs typeface="Arial"/>
-            </a:endParaRPr>
-          </a:p>
-          <a:p>
-            <a:pPr eaLnBrk="true" hangingPunct="true"/>
-            <a:r>
-              <a:t>On parle de Capital Expense</a:t>
-            </a:r>
-            <a:endParaRPr lang="en-US" dirty="false" smtClean="false">
-              <a:latin typeface="Arial"/>
-              <a:cs typeface="Arial"/>
-            </a:endParaRPr>
-          </a:p>
-          <a:p>
-            <a:pPr eaLnBrk="true" hangingPunct="true"/>
-            <a:r>
               <a:t/>
-            </a:r>
-            <a:endParaRPr lang="en-US" dirty="false" smtClean="false">
-              <a:latin typeface="Arial"/>
-              <a:cs typeface="Arial"/>
-            </a:endParaRPr>
-          </a:p>
-          <a:p>
-            <a:pPr eaLnBrk="true" hangingPunct="true"/>
-            <a:r>
-              <a:t>Le mode de financement du cloud c’est de l’operational expense</a:t>
-            </a:r>
-            <a:endParaRPr lang="en-US" dirty="false" smtClean="false">
-              <a:latin typeface="Arial"/>
-              <a:cs typeface="Arial"/>
-            </a:endParaRPr>
-          </a:p>
-          <a:p>
-            <a:pPr eaLnBrk="true" hangingPunct="true"/>
-            <a:r>
-              <a:t>On va payer à l’heure de consummation</a:t>
-            </a:r>
-            <a:endParaRPr lang="en-US" dirty="false" smtClean="false">
-              <a:latin typeface="Arial"/>
-              <a:cs typeface="Arial"/>
-            </a:endParaRPr>
-          </a:p>
-          <a:p>
-            <a:pPr eaLnBrk="true" hangingPunct="true"/>
-            <a:r>
-              <a:t>On peut faire le parallèle avec la téléphonie portable : lorsqu’il ne fonctionne plus je le jette et j’en rachète un autre</a:t>
-            </a:r>
-            <a:endParaRPr lang="en-US" dirty="false" smtClean="false">
-              <a:latin typeface="Arial"/>
-              <a:cs typeface="Arial"/>
-            </a:endParaRPr>
-          </a:p>
-          <a:p>
-            <a:pPr eaLnBrk="true" hangingPunct="true"/>
-            <a:r>
-              <a:t/>
-            </a:r>
-            <a:endParaRPr lang="en-US" dirty="false" smtClean="false">
-              <a:latin typeface="Arial"/>
-              <a:cs typeface="Arial"/>
-            </a:endParaRPr>
-          </a:p>
-          <a:p>
-            <a:pPr eaLnBrk="true" hangingPunct="true"/>
-            <a:r>
-              <a:t>Avec quelque chose d’automatiser derrière</a:t>
-            </a:r>
-            <a:endParaRPr lang="en-US" dirty="false" smtClean="false">
-              <a:latin typeface="Arial"/>
-              <a:cs typeface="Arial"/>
-            </a:endParaRPr>
-          </a:p>
-          <a:p>
-            <a:pPr eaLnBrk="true" hangingPunct="true"/>
-            <a:r>
-              <a:t>On va recréer le rack and stack par des instances</a:t>
-            </a:r>
-            <a:endParaRPr lang="en-US" dirty="false" smtClean="false">
-              <a:latin typeface="Arial"/>
-              <a:cs typeface="Arial"/>
-            </a:endParaRPr>
-          </a:p>
-          <a:p>
-            <a:pPr eaLnBrk="true" hangingPunct="true"/>
-            <a:r>
-              <a:t>On appellee cela des instances car on va instancier un materiel</a:t>
-            </a:r>
-            <a:endParaRPr lang="en-US" dirty="false" smtClean="false">
-              <a:latin typeface="Arial"/>
-              <a:cs typeface="Arial"/>
-            </a:endParaRPr>
-          </a:p>
-          <a:p>
-            <a:pPr eaLnBrk="true" hangingPunct="true"/>
-            <a:r>
-              <a:t/>
-            </a:r>
-            <a:endParaRPr lang="en-US" dirty="false" smtClean="false">
-              <a:latin typeface="Arial"/>
-              <a:cs typeface="Arial"/>
-            </a:endParaRPr>
-          </a:p>
-          <a:p>
-            <a:pPr eaLnBrk="true" hangingPunct="true"/>
-            <a:r>
-              <a:t>Quelques soit votre business. Des applications qui suivent vos besoins</a:t>
-            </a:r>
-            <a:endParaRPr lang="en-US" dirty="false" smtClean="false">
-              <a:latin typeface="Arial"/>
-              <a:cs typeface="Arial"/>
-            </a:endParaRPr>
-          </a:p>
-          <a:p>
-            <a:pPr eaLnBrk="true" hangingPunct="true"/>
-            <a:r>
-              <a:t>AWS =&gt; Compute, storage and database </a:t>
-            </a:r>
-            <a:endParaRPr lang="en-US" dirty="false" smtClean="false">
-              <a:latin typeface="Arial"/>
-              <a:cs typeface="Arial"/>
-            </a:endParaRPr>
-          </a:p>
-          <a:p>
-            <a:pPr eaLnBrk="true" hangingPunct="true"/>
-            <a:r>
-              <a:t>No upfront capital exchange</a:t>
-            </a:r>
-            <a:endParaRPr lang="en-US" dirty="false" smtClean="false">
-              <a:latin typeface="Arial"/>
-              <a:cs typeface="Arial"/>
-            </a:endParaRPr>
-          </a:p>
-          <a:p>
-            <a:pPr eaLnBrk="true" hangingPunct="true"/>
-            <a:r>
-              <a:t/>
-            </a:r>
-            <a:endParaRPr lang="en-US" dirty="false" smtClean="false">
-              <a:latin typeface="Arial"/>
-              <a:cs typeface="Arial"/>
-            </a:endParaRPr>
-          </a:p>
-          <a:p>
-            <a:pPr eaLnBrk="true" hangingPunct="true"/>
-            <a:r>
-              <a:t>Economy at scale</a:t>
-            </a:r>
-            <a:endParaRPr lang="en-US" dirty="false" smtClean="false">
-              <a:latin typeface="Arial"/>
-              <a:cs typeface="Arial"/>
-            </a:endParaRPr>
-          </a:p>
-          <a:p>
-            <a:pPr eaLnBrk="true" hangingPunct="true"/>
-            <a:r>
-              <a:t>Add and remove capacity dynamically</a:t>
-            </a:r>
-            <a:endParaRPr lang="en-US" dirty="false" smtClean="false">
-              <a:latin typeface="Arial"/>
-              <a:cs typeface="Arial"/>
-            </a:endParaRPr>
-          </a:p>
-          <a:p>
-            <a:pPr eaLnBrk="true" hangingPunct="true"/>
-            <a:r>
-              <a:t/>
-            </a:r>
-            <a:endParaRPr lang="en-US" dirty="false" smtClean="false">
-              <a:latin typeface="Arial"/>
-              <a:cs typeface="Arial"/>
-            </a:endParaRPr>
-          </a:p>
-          <a:p>
-            <a:pPr eaLnBrk="true" hangingPunct="true"/>
-            <a:r>
-              <a:t>====</a:t>
-            </a:r>
-            <a:endParaRPr lang="en-US" dirty="false" smtClean="false">
-              <a:latin typeface="Arial"/>
-              <a:cs typeface="Arial"/>
-            </a:endParaRPr>
-          </a:p>
-          <a:p>
-            <a:pPr eaLnBrk="true" hangingPunct="true"/>
-            <a:r>
-              <a:t/>
-            </a:r>
-            <a:endParaRPr lang="en-US" dirty="false" smtClean="false">
-              <a:latin typeface="Arial"/>
-              <a:cs typeface="Arial"/>
-            </a:endParaRPr>
-          </a:p>
-          <a:p>
-            <a:pPr eaLnBrk="true" hangingPunct="true"/>
-            <a:r>
-              <a:t>For more on this, see: https://aws.amazon.com/what-is-cloud-computing/</a:t>
-            </a:r>
-            <a:endParaRPr lang="en-US" dirty="false" smtClean="false">
-              <a:latin typeface="Arial"/>
-              <a:cs typeface="Arial"/>
-            </a:endParaRPr>
-          </a:p>
-          <a:p>
-            <a:pPr eaLnBrk="true" hangingPunct="true"/>
-            <a:r>
-              <a:t/>
-            </a:r>
-            <a:endParaRPr lang="en-US" dirty="false" smtClean="false">
-              <a:latin typeface="Arial"/>
-              <a:cs typeface="Arial"/>
-            </a:endParaRPr>
-          </a:p>
-          <a:p>
-            <a:pPr eaLnBrk="true" hangingPunct="true"/>
-            <a:r>
-              <a:t/>
-            </a:r>
-            <a:endParaRPr lang="en-US" dirty="false" smtClean="false">
-              <a:latin typeface="Arial"/>
-              <a:cs typeface="Arial"/>
-            </a:endParaRPr>
-          </a:p>
-          <a:p>
-            <a:pPr eaLnBrk="true" hangingPunct="true"/>
-            <a:r>
-              <a:t>=== Original comments from ./sample-docs/pptx-copy.pptx===</a:t>
-            </a:r>
-            <a:endParaRPr lang="en-US" dirty="false" smtClean="false">
-              <a:latin typeface="Arial"/>
-              <a:cs typeface="Arial"/>
-            </a:endParaRPr>
-          </a:p>
-          <a:p>
-            <a:pPr eaLnBrk="true" hangingPunct="true"/>
-            <a:r>
-              <a:t>Il faut construire un DC, un autre, …</a:t>
-            </a:r>
-            <a:endParaRPr lang="en-US" dirty="false" smtClean="false">
-              <a:latin typeface="Arial"/>
-              <a:cs typeface="Arial"/>
-            </a:endParaRPr>
-          </a:p>
-          <a:p>
-            <a:pPr eaLnBrk="true" hangingPunct="true"/>
-            <a:r>
-              <a:t>On parle de Capital Expense</a:t>
-            </a:r>
-            <a:endParaRPr lang="en-US" dirty="false" smtClean="false">
-              <a:latin typeface="Arial"/>
-              <a:cs typeface="Arial"/>
-            </a:endParaRPr>
-          </a:p>
-          <a:p>
-            <a:pPr eaLnBrk="true" hangingPunct="true"/>
-            <a:r>
-              <a:t/>
-            </a:r>
-            <a:endParaRPr lang="en-US" dirty="false" smtClean="false">
-              <a:latin typeface="Arial"/>
-              <a:cs typeface="Arial"/>
-            </a:endParaRPr>
-          </a:p>
-          <a:p>
-            <a:pPr eaLnBrk="true" hangingPunct="true"/>
-            <a:r>
-              <a:t>Le mode de financement du cloud c’est de l’operational expense</a:t>
-            </a:r>
-            <a:endParaRPr lang="en-US" dirty="false" smtClean="false">
-              <a:latin typeface="Arial"/>
-              <a:cs typeface="Arial"/>
-            </a:endParaRPr>
-          </a:p>
-          <a:p>
-            <a:pPr eaLnBrk="true" hangingPunct="true"/>
-            <a:r>
-              <a:t>On va payer à l’heure de consummation</a:t>
-            </a:r>
-            <a:endParaRPr lang="en-US" dirty="false" smtClean="false">
-              <a:latin typeface="Arial"/>
-              <a:cs typeface="Arial"/>
-            </a:endParaRPr>
-          </a:p>
-          <a:p>
-            <a:pPr eaLnBrk="true" hangingPunct="true"/>
-            <a:r>
-              <a:t>On peut faire le parallèle avec la téléphonie portable : lorsqu’il ne fonctionne plus je le jette et j’en rachète un autre</a:t>
-            </a:r>
-            <a:endParaRPr lang="en-US" dirty="false" smtClean="false">
-              <a:latin typeface="Arial"/>
-              <a:cs typeface="Arial"/>
-            </a:endParaRPr>
-          </a:p>
-          <a:p>
-            <a:pPr eaLnBrk="true" hangingPunct="true"/>
-            <a:r>
-              <a:t/>
-            </a:r>
-            <a:endParaRPr lang="en-US" dirty="false" smtClean="false">
-              <a:latin typeface="Arial"/>
-              <a:cs typeface="Arial"/>
-            </a:endParaRPr>
-          </a:p>
-          <a:p>
-            <a:pPr eaLnBrk="true" hangingPunct="true"/>
-            <a:r>
-              <a:t>Avec quelque chose d’automatiser derrière</a:t>
-            </a:r>
-            <a:endParaRPr lang="en-US" dirty="false" smtClean="false">
-              <a:latin typeface="Arial"/>
-              <a:cs typeface="Arial"/>
-            </a:endParaRPr>
-          </a:p>
-          <a:p>
-            <a:pPr eaLnBrk="true" hangingPunct="true"/>
-            <a:r>
-              <a:t>On va recréer le rack and stack par des instances</a:t>
-            </a:r>
-            <a:endParaRPr lang="en-US" dirty="false" smtClean="false">
-              <a:latin typeface="Arial"/>
-              <a:cs typeface="Arial"/>
-            </a:endParaRPr>
-          </a:p>
-          <a:p>
-            <a:pPr eaLnBrk="true" hangingPunct="true"/>
-            <a:r>
-              <a:t>On appellee cela des instances car on va instancier un materiel</a:t>
-            </a:r>
-            <a:endParaRPr lang="en-US" dirty="false" smtClean="false">
-              <a:latin typeface="Arial"/>
-              <a:cs typeface="Arial"/>
-            </a:endParaRPr>
-          </a:p>
-          <a:p>
-            <a:pPr eaLnBrk="true" hangingPunct="true"/>
-            <a:r>
-              <a:t/>
-            </a:r>
-            <a:endParaRPr lang="en-US" dirty="false" smtClean="false">
-              <a:latin typeface="Arial"/>
-              <a:cs typeface="Arial"/>
-            </a:endParaRPr>
-          </a:p>
-          <a:p>
-            <a:pPr eaLnBrk="true" hangingPunct="true"/>
-            <a:r>
-              <a:t>Quelques soit votre business. Des applications qui suivent vos besoins</a:t>
-            </a:r>
-            <a:endParaRPr lang="en-US" dirty="false" smtClean="false">
-              <a:latin typeface="Arial"/>
-              <a:cs typeface="Arial"/>
-            </a:endParaRPr>
-          </a:p>
-          <a:p>
-            <a:pPr eaLnBrk="true" hangingPunct="true"/>
-            <a:r>
-              <a:t>AWS =&gt; Compute, storage and database </a:t>
-            </a:r>
-            <a:endParaRPr lang="en-US" dirty="false" smtClean="false">
-              <a:latin typeface="Arial"/>
-              <a:cs typeface="Arial"/>
-            </a:endParaRPr>
-          </a:p>
-          <a:p>
-            <a:pPr eaLnBrk="true" hangingPunct="true"/>
-            <a:r>
-              <a:t>No upfront capital exchange</a:t>
-            </a:r>
-            <a:endParaRPr lang="en-US" dirty="false" smtClean="false">
-              <a:latin typeface="Arial"/>
-              <a:cs typeface="Arial"/>
-            </a:endParaRPr>
-          </a:p>
-          <a:p>
-            <a:pPr eaLnBrk="true" hangingPunct="true"/>
-            <a:r>
-              <a:t/>
-            </a:r>
-            <a:endParaRPr lang="en-US" dirty="false" smtClean="false">
-              <a:latin typeface="Arial"/>
-              <a:cs typeface="Arial"/>
-            </a:endParaRPr>
-          </a:p>
-          <a:p>
-            <a:pPr eaLnBrk="true" hangingPunct="true"/>
-            <a:r>
-              <a:t>Economy at scale</a:t>
-            </a:r>
-            <a:endParaRPr lang="en-US" dirty="false" smtClean="false">
-              <a:latin typeface="Arial"/>
-              <a:cs typeface="Arial"/>
-            </a:endParaRPr>
-          </a:p>
-          <a:p>
-            <a:pPr eaLnBrk="true" hangingPunct="true"/>
-            <a:r>
-              <a:t>Add and remove capacity dynamically</a:t>
-            </a:r>
-            <a:endParaRPr lang="en-US" dirty="false" smtClean="false">
-              <a:latin typeface="Arial"/>
-              <a:cs typeface="Arial"/>
-            </a:endParaRPr>
-          </a:p>
-          <a:p>
-            <a:pPr eaLnBrk="true" hangingPunct="true"/>
-            <a:r>
-              <a:t/>
-            </a:r>
-            <a:endParaRPr lang="en-US" dirty="false" smtClean="false">
-              <a:latin typeface="Arial"/>
-              <a:cs typeface="Arial"/>
-            </a:endParaRPr>
-          </a:p>
-          <a:p>
-            <a:pPr eaLnBrk="true" hangingPunct="true"/>
-            <a:r>
-              <a:t>====</a:t>
-            </a:r>
-            <a:endParaRPr lang="en-US" dirty="false" smtClean="false">
-              <a:latin typeface="Arial"/>
-              <a:cs typeface="Arial"/>
-            </a:endParaRPr>
-          </a:p>
-          <a:p>
-            <a:pPr eaLnBrk="true" hangingPunct="true"/>
-            <a:r>
-              <a:t/>
-            </a:r>
-            <a:endParaRPr lang="en-US" dirty="false" smtClean="false">
-              <a:latin typeface="Arial"/>
-              <a:cs typeface="Arial"/>
-            </a:endParaRPr>
-          </a:p>
-          <a:p>
-            <a:pPr eaLnBrk="true" hangingPunct="true"/>
-            <a:r>
-              <a:t>For more on this, see: https://aws.amazon.com/what-is-cloud-computing/</a:t>
-            </a:r>
-            <a:endParaRPr lang="en-US" dirty="false" smtClean="false">
-              <a:latin typeface="Arial"/>
-              <a:cs typeface="Arial"/>
-            </a:endParaRPr>
-          </a:p>
-          <a:p>
-            <a:pPr eaLnBrk="true" hangingPunct="true"/>
-            <a:r>
-              <a:t/>
-            </a:r>
-            <a:endParaRPr lang="en-US" dirty="false" smtClean="false">
-              <a:latin typeface="Arial"/>
-              <a:cs typeface="Arial"/>
-            </a:endParaRPr>
-          </a:p>
-          <a:p>
-            <a:pPr eaLnBrk="true" hangingPunct="true"/>
-            <a:r>
-              <a:t/>
-            </a:r>
-            <a:endParaRPr lang="en-US" dirty="false" smtClean="false">
-              <a:latin typeface="Arial"/>
-              <a:cs typeface="Arial"/>
-            </a:endParaRPr>
-          </a:p>
-          <a:p>
-            <a:pPr eaLnBrk="true" hangingPunct="true"/>
-            <a:r>
-              <a:t>=== Original comments from ./sample-docs/pptx-copy.pptx===</a:t>
-            </a:r>
-            <a:endParaRPr lang="en-US" dirty="false" smtClean="false">
-              <a:latin typeface="Arial"/>
-              <a:cs typeface="Arial"/>
-            </a:endParaRPr>
-          </a:p>
-          <a:p>
-            <a:pPr eaLnBrk="true" hangingPunct="true"/>
-            <a:r>
-              <a:t>Il faut construire un DC, un autre, …</a:t>
-            </a:r>
-            <a:endParaRPr lang="en-US" dirty="false" smtClean="false">
-              <a:latin typeface="Arial"/>
-              <a:cs typeface="Arial"/>
-            </a:endParaRPr>
-          </a:p>
-          <a:p>
-            <a:pPr eaLnBrk="true" hangingPunct="true"/>
-            <a:r>
-              <a:t>On parle de Capital Expense</a:t>
-            </a:r>
-            <a:endParaRPr lang="en-US" dirty="false" smtClean="false">
-              <a:latin typeface="Arial"/>
-              <a:cs typeface="Arial"/>
-            </a:endParaRPr>
-          </a:p>
-          <a:p>
-            <a:pPr eaLnBrk="true" hangingPunct="true"/>
-            <a:r>
-              <a:t/>
-            </a:r>
-            <a:endParaRPr lang="en-US" dirty="false" smtClean="false">
-              <a:latin typeface="Arial"/>
-              <a:cs typeface="Arial"/>
-            </a:endParaRPr>
-          </a:p>
-          <a:p>
-            <a:pPr eaLnBrk="true" hangingPunct="true"/>
-            <a:r>
-              <a:t>Le mode de financement du cloud c’est de l’operational expense</a:t>
-            </a:r>
-            <a:endParaRPr lang="en-US" dirty="false" smtClean="false">
-              <a:latin typeface="Arial"/>
-              <a:cs typeface="Arial"/>
-            </a:endParaRPr>
-          </a:p>
-          <a:p>
-            <a:pPr eaLnBrk="true" hangingPunct="true"/>
-            <a:r>
-              <a:t>On va payer à l’heure de consummation</a:t>
-            </a:r>
-            <a:endParaRPr lang="en-US" dirty="false" smtClean="false">
-              <a:latin typeface="Arial"/>
-              <a:cs typeface="Arial"/>
-            </a:endParaRPr>
-          </a:p>
-          <a:p>
-            <a:pPr eaLnBrk="true" hangingPunct="true"/>
-            <a:r>
-              <a:t>On peut faire le parallèle avec la téléphonie portable : lorsqu’il ne fonctionne plus je le jette et j’en rachète un autre</a:t>
-            </a:r>
-            <a:endParaRPr lang="en-US" dirty="false" smtClean="false">
-              <a:latin typeface="Arial"/>
-              <a:cs typeface="Arial"/>
-            </a:endParaRPr>
-          </a:p>
-          <a:p>
-            <a:pPr eaLnBrk="true" hangingPunct="true"/>
-            <a:r>
-              <a:t/>
-            </a:r>
-            <a:endParaRPr lang="en-US" dirty="false" smtClean="false">
-              <a:latin typeface="Arial"/>
-              <a:cs typeface="Arial"/>
-            </a:endParaRPr>
-          </a:p>
-          <a:p>
-            <a:pPr eaLnBrk="true" hangingPunct="true"/>
-            <a:r>
-              <a:t>Avec quelque chose d’automatiser derrière</a:t>
-            </a:r>
-            <a:endParaRPr lang="en-US" dirty="false" smtClean="false">
-              <a:latin typeface="Arial"/>
-              <a:cs typeface="Arial"/>
-            </a:endParaRPr>
-          </a:p>
-          <a:p>
-            <a:pPr eaLnBrk="true" hangingPunct="true"/>
-            <a:r>
-              <a:t>On va recréer le rack and stack par des instances</a:t>
-            </a:r>
-            <a:endParaRPr lang="en-US" dirty="false" smtClean="false">
-              <a:latin typeface="Arial"/>
-              <a:cs typeface="Arial"/>
-            </a:endParaRPr>
-          </a:p>
-          <a:p>
-            <a:pPr eaLnBrk="true" hangingPunct="true"/>
-            <a:r>
-              <a:t>On appellee cela des instances car on va instancier un materiel</a:t>
-            </a:r>
-            <a:endParaRPr lang="en-US" dirty="false" smtClean="false">
-              <a:latin typeface="Arial"/>
-              <a:cs typeface="Arial"/>
-            </a:endParaRPr>
-          </a:p>
-          <a:p>
-            <a:pPr eaLnBrk="true" hangingPunct="true"/>
-            <a:r>
-              <a:t/>
-            </a:r>
-            <a:endParaRPr lang="en-US" dirty="false" smtClean="false">
-              <a:latin typeface="Arial"/>
-              <a:cs typeface="Arial"/>
-            </a:endParaRPr>
-          </a:p>
-          <a:p>
-            <a:pPr eaLnBrk="true" hangingPunct="true"/>
-            <a:r>
-              <a:t>Quelques soit votre business. Des applications qui suivent vos besoins</a:t>
-            </a:r>
-            <a:endParaRPr lang="en-US" dirty="false" smtClean="false">
-              <a:latin typeface="Arial"/>
-              <a:cs typeface="Arial"/>
-            </a:endParaRPr>
-          </a:p>
-          <a:p>
-            <a:pPr eaLnBrk="true" hangingPunct="true"/>
-            <a:r>
-              <a:t>AWS =&gt; Compute, storage and database </a:t>
-            </a:r>
-            <a:endParaRPr lang="en-US" dirty="false" smtClean="false">
-              <a:latin typeface="Arial"/>
-              <a:cs typeface="Arial"/>
-            </a:endParaRPr>
-          </a:p>
-          <a:p>
-            <a:pPr eaLnBrk="true" hangingPunct="true"/>
-            <a:r>
-              <a:t>No upfront capital exchange</a:t>
-            </a:r>
-            <a:endParaRPr lang="en-US" dirty="false" smtClean="false">
-              <a:latin typeface="Arial"/>
-              <a:cs typeface="Arial"/>
-            </a:endParaRPr>
-          </a:p>
-          <a:p>
-            <a:pPr eaLnBrk="true" hangingPunct="true"/>
-            <a:r>
-              <a:t/>
-            </a:r>
-            <a:endParaRPr lang="en-US" dirty="false" smtClean="false">
-              <a:latin typeface="Arial"/>
-              <a:cs typeface="Arial"/>
-            </a:endParaRPr>
-          </a:p>
-          <a:p>
-            <a:pPr eaLnBrk="true" hangingPunct="true"/>
-            <a:r>
-              <a:t>Economy at scale</a:t>
-            </a:r>
-            <a:endParaRPr lang="en-US" dirty="false" smtClean="false">
-              <a:latin typeface="Arial"/>
-              <a:cs typeface="Arial"/>
-            </a:endParaRPr>
-          </a:p>
-          <a:p>
-            <a:pPr eaLnBrk="true" hangingPunct="true"/>
-            <a:r>
-              <a:t>Add and remove capacity dynamically</a:t>
-            </a:r>
-            <a:endParaRPr lang="en-US" dirty="false" smtClean="false">
-              <a:latin typeface="Arial"/>
-              <a:cs typeface="Arial"/>
-            </a:endParaRPr>
-          </a:p>
-          <a:p>
-            <a:pPr eaLnBrk="true" hangingPunct="true"/>
-            <a:r>
-              <a:t/>
-            </a:r>
-            <a:endParaRPr lang="en-US" dirty="false" smtClean="false">
-              <a:latin typeface="Arial"/>
-              <a:cs typeface="Arial"/>
-            </a:endParaRPr>
-          </a:p>
-          <a:p>
-            <a:pPr eaLnBrk="true" hangingPunct="true"/>
-            <a:r>
-              <a:t>====</a:t>
-            </a:r>
-            <a:endParaRPr lang="en-US" dirty="false" smtClean="false">
-              <a:latin typeface="Arial"/>
-              <a:cs typeface="Arial"/>
-            </a:endParaRPr>
-          </a:p>
-          <a:p>
-            <a:pPr eaLnBrk="true" hangingPunct="true"/>
-            <a:r>
-              <a:t/>
-            </a:r>
-            <a:endParaRPr lang="en-US" dirty="false" smtClean="false">
-              <a:latin typeface="Arial"/>
-              <a:cs typeface="Arial"/>
-            </a:endParaRPr>
-          </a:p>
-          <a:p>
-            <a:pPr eaLnBrk="true" hangingPunct="true"/>
-            <a:r>
-              <a:t>For more on this, see: https://aws.amazon.com/what-is-cloud-computing/</a:t>
-            </a:r>
-            <a:endParaRPr lang="en-US" dirty="false" smtClean="false">
-              <a:latin typeface="Arial"/>
-              <a:cs typeface="Arial"/>
-            </a:endParaRPr>
-          </a:p>
-          <a:p>
-            <a:pPr eaLnBrk="true" hangingPunct="true"/>
-            <a:r>
-              <a:t/>
-            </a:r>
-            <a:endParaRPr lang="en-US" dirty="false" smtClean="false">
-              <a:latin typeface="Arial"/>
-              <a:cs typeface="Arial"/>
-            </a:endParaRPr>
-          </a:p>
-          <a:p>
-            <a:pPr eaLnBrk="true" hangingPunct="true"/>
-            <a:r>
-              <a:t/>
-            </a:r>
-            <a:endParaRPr lang="en-US" dirty="false" smtClean="false">
-              <a:latin typeface="Arial"/>
-              <a:cs typeface="Arial"/>
-            </a:endParaRPr>
-          </a:p>
-          <a:p>
-            <a:pPr eaLnBrk="true" hangingPunct="true"/>
-            <a:r>
-              <a:t>=== Original comments from F:\users\mbojoly\Documents\MBO\Projets\copypptxnotes/sample-docs/pptx-copy.pptx===</a:t>
-            </a:r>
-            <a:endParaRPr lang="en-US" dirty="false" smtClean="false">
-              <a:latin typeface="Arial"/>
-              <a:cs typeface="Arial"/>
-            </a:endParaRPr>
-          </a:p>
-          <a:p>
-            <a:pPr eaLnBrk="true" hangingPunct="true"/>
-            <a:r>
-              <a:t>Il faut construire un DC, un autre, …</a:t>
-            </a:r>
-            <a:endParaRPr lang="en-US" dirty="false" smtClean="false">
-              <a:latin typeface="Arial"/>
-              <a:cs typeface="Arial"/>
-            </a:endParaRPr>
-          </a:p>
-          <a:p>
-            <a:pPr eaLnBrk="true" hangingPunct="true"/>
-            <a:r>
-              <a:t>On parle de Capital Expense</a:t>
-            </a:r>
-            <a:endParaRPr lang="en-US" dirty="false" smtClean="false">
-              <a:latin typeface="Arial"/>
-              <a:cs typeface="Arial"/>
-            </a:endParaRPr>
-          </a:p>
-          <a:p>
-            <a:pPr eaLnBrk="true" hangingPunct="true"/>
-            <a:r>
-              <a:t/>
-            </a:r>
-            <a:endParaRPr lang="en-US" dirty="false" smtClean="false">
-              <a:latin typeface="Arial"/>
-              <a:cs typeface="Arial"/>
-            </a:endParaRPr>
-          </a:p>
-          <a:p>
-            <a:pPr eaLnBrk="true" hangingPunct="true"/>
-            <a:r>
-              <a:t>Le mode de financement du cloud c’est de l’operational expense</a:t>
-            </a:r>
-            <a:endParaRPr lang="en-US" dirty="false" smtClean="false">
-              <a:latin typeface="Arial"/>
-              <a:cs typeface="Arial"/>
-            </a:endParaRPr>
-          </a:p>
-          <a:p>
-            <a:pPr eaLnBrk="true" hangingPunct="true"/>
-            <a:r>
-              <a:t>On va payer à l’heure de consummation</a:t>
-            </a:r>
-            <a:endParaRPr lang="en-US" dirty="false" smtClean="false">
-              <a:latin typeface="Arial"/>
-              <a:cs typeface="Arial"/>
-            </a:endParaRPr>
-          </a:p>
-          <a:p>
-            <a:pPr eaLnBrk="true" hangingPunct="true"/>
-            <a:r>
-              <a:t>On peut faire le parallèle avec la téléphonie portable : lorsqu’il ne fonctionne plus je le jette et j’en rachète un autre</a:t>
-            </a:r>
-            <a:endParaRPr lang="en-US" dirty="false" smtClean="false">
-              <a:latin typeface="Arial"/>
-              <a:cs typeface="Arial"/>
-            </a:endParaRPr>
-          </a:p>
-          <a:p>
-            <a:pPr eaLnBrk="true" hangingPunct="true"/>
-            <a:r>
-              <a:t/>
-            </a:r>
-            <a:endParaRPr lang="en-US" dirty="false" smtClean="false">
-              <a:latin typeface="Arial"/>
-              <a:cs typeface="Arial"/>
-            </a:endParaRPr>
-          </a:p>
-          <a:p>
-            <a:pPr eaLnBrk="true" hangingPunct="true"/>
-            <a:r>
-              <a:t>Avec quelque chose d’automatiser derrière</a:t>
-            </a:r>
-            <a:endParaRPr lang="en-US" dirty="false" smtClean="false">
-              <a:latin typeface="Arial"/>
-              <a:cs typeface="Arial"/>
-            </a:endParaRPr>
-          </a:p>
-          <a:p>
-            <a:pPr eaLnBrk="true" hangingPunct="true"/>
-            <a:r>
-              <a:t>On va recréer le rack and stack par des instances</a:t>
-            </a:r>
-            <a:endParaRPr lang="en-US" dirty="false" smtClean="false">
-              <a:latin typeface="Arial"/>
-              <a:cs typeface="Arial"/>
-            </a:endParaRPr>
-          </a:p>
-          <a:p>
-            <a:pPr eaLnBrk="true" hangingPunct="true"/>
-            <a:r>
-              <a:t>On appellee cela des instances car on va instancier un materiel</a:t>
-            </a:r>
-            <a:endParaRPr lang="en-US" dirty="false" smtClean="false">
-              <a:latin typeface="Arial"/>
-              <a:cs typeface="Arial"/>
-            </a:endParaRPr>
-          </a:p>
-          <a:p>
-            <a:pPr eaLnBrk="true" hangingPunct="true"/>
-            <a:r>
-              <a:t/>
-            </a:r>
-            <a:endParaRPr lang="en-US" dirty="false" smtClean="false">
-              <a:latin typeface="Arial"/>
-              <a:cs typeface="Arial"/>
-            </a:endParaRPr>
-          </a:p>
-          <a:p>
-            <a:pPr eaLnBrk="true" hangingPunct="true"/>
-            <a:r>
-              <a:t>Quelques soit votre business. Des applications qui suivent vos besoins</a:t>
-            </a:r>
-            <a:endParaRPr lang="en-US" dirty="false" smtClean="false">
-              <a:latin typeface="Arial"/>
-              <a:cs typeface="Arial"/>
-            </a:endParaRPr>
-          </a:p>
-          <a:p>
-            <a:pPr eaLnBrk="true" hangingPunct="true"/>
-            <a:r>
-              <a:t>AWS =&gt; Compute, storage and database </a:t>
-            </a:r>
-            <a:endParaRPr lang="en-US" dirty="false" smtClean="false">
-              <a:latin typeface="Arial"/>
-              <a:cs typeface="Arial"/>
-            </a:endParaRPr>
-          </a:p>
-          <a:p>
-            <a:pPr eaLnBrk="true" hangingPunct="true"/>
-            <a:r>
-              <a:t>No upfront capital exchange</a:t>
-            </a:r>
-            <a:endParaRPr lang="en-US" dirty="false" smtClean="false">
-              <a:latin typeface="Arial"/>
-              <a:cs typeface="Arial"/>
-            </a:endParaRPr>
-          </a:p>
-          <a:p>
-            <a:pPr eaLnBrk="true" hangingPunct="true"/>
-            <a:r>
-              <a:t/>
-            </a:r>
-            <a:endParaRPr lang="en-US" dirty="false" smtClean="false">
-              <a:latin typeface="Arial"/>
-              <a:cs typeface="Arial"/>
-            </a:endParaRPr>
-          </a:p>
-          <a:p>
-            <a:pPr eaLnBrk="true" hangingPunct="true"/>
-            <a:r>
-              <a:t>Economy at scale</a:t>
-            </a:r>
-            <a:endParaRPr lang="en-US" dirty="false" smtClean="false">
-              <a:latin typeface="Arial"/>
-              <a:cs typeface="Arial"/>
-            </a:endParaRPr>
-          </a:p>
-          <a:p>
-            <a:pPr eaLnBrk="true" hangingPunct="true"/>
-            <a:r>
-              <a:t>Add and remove capacity dynamically</a:t>
-            </a:r>
-            <a:endParaRPr lang="en-US" dirty="false" smtClean="false">
-              <a:latin typeface="Arial"/>
-              <a:cs typeface="Arial"/>
-            </a:endParaRPr>
-          </a:p>
-          <a:p>
-            <a:pPr eaLnBrk="true" hangingPunct="true"/>
-            <a:r>
-              <a:t/>
-            </a:r>
-            <a:endParaRPr lang="en-US" dirty="false" smtClean="false">
-              <a:latin typeface="Arial"/>
-              <a:cs typeface="Arial"/>
-            </a:endParaRPr>
-          </a:p>
-          <a:p>
-            <a:pPr eaLnBrk="true" hangingPunct="true"/>
-            <a:r>
-              <a:t>====</a:t>
-            </a:r>
-            <a:endParaRPr lang="en-US" dirty="false" smtClean="false">
-              <a:latin typeface="Arial"/>
-              <a:cs typeface="Arial"/>
-            </a:endParaRPr>
-          </a:p>
-          <a:p>
-            <a:pPr eaLnBrk="true" hangingPunct="true"/>
-            <a:r>
-              <a:t/>
-            </a:r>
-            <a:endParaRPr lang="en-US" dirty="false" smtClean="false">
-              <a:latin typeface="Arial"/>
-              <a:cs typeface="Arial"/>
-            </a:endParaRPr>
-          </a:p>
-          <a:p>
-            <a:pPr eaLnBrk="true" hangingPunct="true"/>
-            <a:r>
-              <a:t>For more on this, see: https://aws.amazon.com/what-is-cloud-computing/</a:t>
-            </a:r>
-            <a:endParaRPr lang="en-US" dirty="false" smtClean="false">
-              <a:latin typeface="Arial"/>
-              <a:cs typeface="Arial"/>
-            </a:endParaRPr>
-          </a:p>
-          <a:p>
-            <a:pPr eaLnBrk="true" hangingPunct="true"/>
-            <a:r>
-              <a:t/>
-            </a:r>
-            <a:endParaRPr lang="en-US" dirty="false" smtClean="false">
-              <a:latin typeface="Arial"/>
-              <a:cs typeface="Arial"/>
-            </a:endParaRPr>
-          </a:p>
-          <a:p>
-            <a:pPr eaLnBrk="true" hangingPunct="true"/>
-            <a:r>
-              <a:t/>
-            </a:r>
-            <a:endParaRPr lang="en-US" dirty="false" smtClean="false">
-              <a:latin typeface="Arial"/>
-              <a:cs typeface="Arial"/>
-            </a:endParaRPr>
-          </a:p>
-          <a:p>
-            <a:pPr eaLnBrk="true" hangingPunct="true"/>
-            <a:r>
-              <a:t>=== Original comments from F:\users\mbojoly\Documents\MBO\Projets\copypptxnotes/sample-docs/pptx-copy.pptx===</a:t>
-            </a:r>
-            <a:endParaRPr lang="en-US" dirty="false" smtClean="false">
-              <a:latin typeface="Arial"/>
-              <a:cs typeface="Arial"/>
-            </a:endParaRPr>
-          </a:p>
-          <a:p>
-            <a:pPr eaLnBrk="true" hangingPunct="true"/>
-            <a:r>
-              <a:t>Il faut construire un DC, un autre, …</a:t>
-            </a:r>
-            <a:endParaRPr lang="en-US" dirty="false" smtClean="false">
-              <a:latin typeface="Arial"/>
-              <a:cs typeface="Arial"/>
-            </a:endParaRPr>
-          </a:p>
-          <a:p>
-            <a:pPr eaLnBrk="true" hangingPunct="true"/>
-            <a:r>
-              <a:t>On parle de Capital Expense</a:t>
-            </a:r>
-            <a:endParaRPr lang="en-US" dirty="false" smtClean="false">
-              <a:latin typeface="Arial"/>
-              <a:cs typeface="Arial"/>
-            </a:endParaRPr>
-          </a:p>
-          <a:p>
-            <a:pPr eaLnBrk="true" hangingPunct="true"/>
-            <a:r>
-              <a:t/>
-            </a:r>
-            <a:endParaRPr lang="en-US" dirty="false" smtClean="false">
-              <a:latin typeface="Arial"/>
-              <a:cs typeface="Arial"/>
-            </a:endParaRPr>
-          </a:p>
-          <a:p>
-            <a:pPr eaLnBrk="true" hangingPunct="true"/>
-            <a:r>
-              <a:t>Le mode de financement du cloud c’est de l’operational expense</a:t>
-            </a:r>
-            <a:endParaRPr lang="en-US" dirty="false" smtClean="false">
-              <a:latin typeface="Arial"/>
-              <a:cs typeface="Arial"/>
-            </a:endParaRPr>
-          </a:p>
-          <a:p>
-            <a:pPr eaLnBrk="true" hangingPunct="true"/>
-            <a:r>
-              <a:t>On va payer à l’heure de consummation</a:t>
-            </a:r>
-            <a:endParaRPr lang="en-US" dirty="false" smtClean="false">
-              <a:latin typeface="Arial"/>
-              <a:cs typeface="Arial"/>
-            </a:endParaRPr>
-          </a:p>
-          <a:p>
-            <a:pPr eaLnBrk="true" hangingPunct="true"/>
-            <a:r>
-              <a:t>On peut faire le parallèle avec la téléphonie portable : lorsqu’il ne fonctionne plus je le jette et j’en rachète un autre</a:t>
-            </a:r>
-            <a:endParaRPr lang="en-US" dirty="false" smtClean="false">
-              <a:latin typeface="Arial"/>
-              <a:cs typeface="Arial"/>
-            </a:endParaRPr>
-          </a:p>
-          <a:p>
-            <a:pPr eaLnBrk="true" hangingPunct="true"/>
-            <a:r>
-              <a:t/>
-            </a:r>
-            <a:endParaRPr lang="en-US" dirty="false" smtClean="false">
-              <a:latin typeface="Arial"/>
-              <a:cs typeface="Arial"/>
-            </a:endParaRPr>
-          </a:p>
-          <a:p>
-            <a:pPr eaLnBrk="true" hangingPunct="true"/>
-            <a:r>
-              <a:t>Avec quelque chose d’automatiser derrière</a:t>
-            </a:r>
-            <a:endParaRPr lang="en-US" dirty="false" smtClean="false">
-              <a:latin typeface="Arial"/>
-              <a:cs typeface="Arial"/>
-            </a:endParaRPr>
-          </a:p>
-          <a:p>
-            <a:pPr eaLnBrk="true" hangingPunct="true"/>
-            <a:r>
-              <a:t>On va recréer le rack and stack par des instances</a:t>
-            </a:r>
-            <a:endParaRPr lang="en-US" dirty="false" smtClean="false">
-              <a:latin typeface="Arial"/>
-              <a:cs typeface="Arial"/>
-            </a:endParaRPr>
-          </a:p>
-          <a:p>
-            <a:pPr eaLnBrk="true" hangingPunct="true"/>
-            <a:r>
-              <a:t>On appellee cela des instances car on va instancier un materiel</a:t>
-            </a:r>
-            <a:endParaRPr lang="en-US" dirty="false" smtClean="false">
-              <a:latin typeface="Arial"/>
-              <a:cs typeface="Arial"/>
-            </a:endParaRPr>
-          </a:p>
-          <a:p>
-            <a:pPr eaLnBrk="true" hangingPunct="true"/>
-            <a:r>
-              <a:t/>
-            </a:r>
-            <a:endParaRPr lang="en-US" dirty="false" smtClean="false">
-              <a:latin typeface="Arial"/>
-              <a:cs typeface="Arial"/>
-            </a:endParaRPr>
-          </a:p>
-          <a:p>
-            <a:pPr eaLnBrk="true" hangingPunct="true"/>
-            <a:r>
-              <a:t>Quelques soit votre business. Des applications qui suivent vos besoins</a:t>
-            </a:r>
-            <a:endParaRPr lang="en-US" dirty="false" smtClean="false">
-              <a:latin typeface="Arial"/>
-              <a:cs typeface="Arial"/>
-            </a:endParaRPr>
-          </a:p>
-          <a:p>
-            <a:pPr eaLnBrk="true" hangingPunct="true"/>
-            <a:r>
-              <a:t>AWS =&gt; Compute, storage and database </a:t>
-            </a:r>
-            <a:endParaRPr lang="en-US" dirty="false" smtClean="false">
-              <a:latin typeface="Arial"/>
-              <a:cs typeface="Arial"/>
-            </a:endParaRPr>
-          </a:p>
-          <a:p>
-            <a:pPr eaLnBrk="true" hangingPunct="true"/>
-            <a:r>
-              <a:t>No upfront capital exchange</a:t>
-            </a:r>
-            <a:endParaRPr lang="en-US" dirty="false" smtClean="false">
-              <a:latin typeface="Arial"/>
-              <a:cs typeface="Arial"/>
-            </a:endParaRPr>
-          </a:p>
-          <a:p>
-            <a:pPr eaLnBrk="true" hangingPunct="true"/>
-            <a:r>
-              <a:t/>
-            </a:r>
-            <a:endParaRPr lang="en-US" dirty="false" smtClean="false">
-              <a:latin typeface="Arial"/>
-              <a:cs typeface="Arial"/>
-            </a:endParaRPr>
-          </a:p>
-          <a:p>
-            <a:pPr eaLnBrk="true" hangingPunct="true"/>
-            <a:r>
-              <a:t>Economy at scale</a:t>
-            </a:r>
-            <a:endParaRPr lang="en-US" dirty="false" smtClean="false">
-              <a:latin typeface="Arial"/>
-              <a:cs typeface="Arial"/>
-            </a:endParaRPr>
-          </a:p>
-          <a:p>
-            <a:pPr eaLnBrk="true" hangingPunct="true"/>
-            <a:r>
-              <a:t>Add and remove capacity dynamically</a:t>
-            </a:r>
-            <a:endParaRPr lang="en-US" dirty="false" smtClean="false">
-              <a:latin typeface="Arial"/>
-              <a:cs typeface="Arial"/>
-            </a:endParaRPr>
-          </a:p>
-          <a:p>
-            <a:pPr eaLnBrk="true" hangingPunct="true"/>
-            <a:r>
-              <a:t/>
-            </a:r>
-            <a:endParaRPr lang="en-US" dirty="false" smtClean="false">
-              <a:latin typeface="Arial"/>
-              <a:cs typeface="Arial"/>
-            </a:endParaRPr>
-          </a:p>
-          <a:p>
-            <a:pPr eaLnBrk="true" hangingPunct="true"/>
-            <a:r>
-              <a:t>====</a:t>
-            </a:r>
-            <a:endParaRPr lang="en-US" dirty="false" smtClean="false">
-              <a:latin typeface="Arial"/>
-              <a:cs typeface="Arial"/>
-            </a:endParaRPr>
-          </a:p>
-          <a:p>
-            <a:pPr eaLnBrk="true" hangingPunct="true"/>
-            <a:r>
-              <a:t/>
-            </a:r>
-            <a:endParaRPr lang="en-US" dirty="false" smtClean="false">
-              <a:latin typeface="Arial"/>
-              <a:cs typeface="Arial"/>
-            </a:endParaRPr>
-          </a:p>
-          <a:p>
-            <a:pPr eaLnBrk="true" hangingPunct="true"/>
-            <a:r>
-              <a:t>For more on this, see: https://aws.amazon.com/what-is-cloud-computing/</a:t>
-            </a:r>
-            <a:endParaRPr lang="en-US" dirty="false" smtClean="false">
-              <a:latin typeface="Arial"/>
-              <a:cs typeface="Arial"/>
-            </a:endParaRPr>
-          </a:p>
-          <a:p>
-            <a:pPr eaLnBrk="true" hangingPunct="true"/>
-            <a:r>
-              <a:t/>
-            </a:r>
-            <a:endParaRPr lang="en-US" dirty="false" smtClean="false">
-              <a:latin typeface="Arial"/>
-              <a:cs typeface="Arial"/>
-            </a:endParaRPr>
-          </a:p>
-          <a:p>
-            <a:pPr eaLnBrk="true" hangingPunct="true"/>
-            <a:r>
-              <a:t/>
-            </a:r>
-            <a:endParaRPr lang="en-US" dirty="false" smtClean="false">
-              <a:latin typeface="Arial"/>
-              <a:cs typeface="Arial"/>
-            </a:endParaRPr>
-          </a:p>
-          <a:p>
-            <a:pPr eaLnBrk="true" hangingPunct="true"/>
-            <a:r>
-              <a:t>=== Original comments from F:\users\mbojoly\Documents\MBO\Projets\copypptxnotes/sample-docs/pptx-copy.pptx===</a:t>
-            </a:r>
-            <a:endParaRPr lang="en-US" dirty="false" smtClean="false">
-              <a:latin typeface="Arial"/>
-              <a:cs typeface="Arial"/>
-            </a:endParaRPr>
-          </a:p>
-          <a:p>
-            <a:pPr eaLnBrk="true" hangingPunct="true"/>
-            <a:r>
-              <a:t>Paragraph1</a:t>
-            </a:r>
-            <a:endParaRPr lang="en-US" dirty="false" smtClean="false">
-              <a:latin typeface="Arial"/>
-              <a:cs typeface="Arial"/>
-            </a:endParaRPr>
-          </a:p>
-          <a:p>
-            <a:pPr eaLnBrk="true" hangingPunct="true"/>
-            <a:r>
-              <a:t>paragraph2</a:t>
-            </a:r>
-            <a:endParaRPr lang="en-US" dirty="false" smtClean="false">
-              <a:latin typeface="Arial"/>
-              <a:cs typeface="Arial"/>
-            </a:endParaRPr>
-          </a:p>
-          <a:p>
-            <a:pPr eaLnBrk="true" hangingPunct="true"/>
-            <a:r>
-              <a:t>paragraph3</a:t>
             </a:r>
             <a:endParaRPr lang="en-US" dirty="false" smtClean="false">
               <a:latin typeface="Arial"/>
@@ -6177,7 +4817,7 @@
 </file>
 
 <file path=ppt/slides/slide1.xml><?xml version="1.0" encoding="utf-8"?>
-<p:sld xmlns:p="http://schemas.openxmlformats.org/presentationml/2006/main" xmlns:a="http://schemas.openxmlformats.org/drawingml/2006/main" xmlns:r="http://schemas.openxmlformats.org/officeDocument/2006/relationships" xmlns:mc="http://schemas.openxmlformats.org/markup-compatibility/2006" xmlns:c="http://schemas.openxmlformats.org/drawingml/2006/chart" xmlns:ns6="http://schemas.openxmlformats.org/drawingml/2006/chartDrawing" xmlns:dgm="http://schemas.openxmlformats.org/drawingml/2006/diagram" xmlns:pic="http://schemas.openxmlformats.org/drawingml/2006/picture" xmlns:wp="http://schemas.openxmlformats.org/drawingml/2006/wordprocessingDrawing" xmlns:wp14="http://schemas.microsoft.com/office/word/2010/wordprocessingDrawing" xmlns:xdr="http://schemas.openxmlformats.org/drawingml/2006/spreadsheetDrawing" xmlns:ns12="http://schemas.openxmlformats.org/drawingml/2006/compatibility" xmlns:ns13="http://schemas.openxmlformats.org/drawingml/2006/lockedCanvas" xmlns:v="urn:schemas-microsoft-com:vml">
+<p:sld xmlns:r="http://schemas.openxmlformats.org/officeDocument/2006/relationships" xmlns:a="http://schemas.openxmlformats.org/drawingml/2006/main" xmlns:p="http://schemas.openxmlformats.org/presentationml/2006/main" xmlns:mc="http://schemas.openxmlformats.org/markup-compatibility/2006" xmlns:c="http://schemas.openxmlformats.org/drawingml/2006/chart" xmlns:ns6="http://schemas.openxmlformats.org/drawingml/2006/chartDrawing" xmlns:dgm="http://schemas.openxmlformats.org/drawingml/2006/diagram" xmlns:pic="http://schemas.openxmlformats.org/drawingml/2006/picture" xmlns:wp="http://schemas.openxmlformats.org/drawingml/2006/wordprocessingDrawing" xmlns:wp14="http://schemas.microsoft.com/office/word/2010/wordprocessingDrawing" xmlns:xdr="http://schemas.openxmlformats.org/drawingml/2006/spreadsheetDrawing" xmlns:ns12="http://schemas.openxmlformats.org/drawingml/2006/compatibility" xmlns:ns13="http://schemas.openxmlformats.org/drawingml/2006/lockedCanvas" xmlns:v="urn:schemas-microsoft-com:vml">
   <p:cSld>
     <p:spTree>
       <p:nvGrpSpPr>
@@ -6237,7 +4877,7 @@
 </file>
 
 <file path=ppt/slides/slide2.xml><?xml version="1.0" encoding="utf-8"?>
-<p:sld xmlns:p="http://schemas.openxmlformats.org/presentationml/2006/main" xmlns:a="http://schemas.openxmlformats.org/drawingml/2006/main" xmlns:r="http://schemas.openxmlformats.org/officeDocument/2006/relationships" xmlns:mc="http://schemas.openxmlformats.org/markup-compatibility/2006" xmlns:c="http://schemas.openxmlformats.org/drawingml/2006/chart" xmlns:ns6="http://schemas.openxmlformats.org/drawingml/2006/chartDrawing" xmlns:dgm="http://schemas.openxmlformats.org/drawingml/2006/diagram" xmlns:pic="http://schemas.openxmlformats.org/drawingml/2006/picture" xmlns:wp="http://schemas.openxmlformats.org/drawingml/2006/wordprocessingDrawing" xmlns:wp14="http://schemas.microsoft.com/office/word/2010/wordprocessingDrawing" xmlns:xdr="http://schemas.openxmlformats.org/drawingml/2006/spreadsheetDrawing" xmlns:ns12="http://schemas.openxmlformats.org/drawingml/2006/compatibility" xmlns:ns13="http://schemas.openxmlformats.org/drawingml/2006/lockedCanvas" xmlns:v="urn:schemas-microsoft-com:vml">
+<p:sld xmlns:r="http://schemas.openxmlformats.org/officeDocument/2006/relationships" xmlns:a="http://schemas.openxmlformats.org/drawingml/2006/main" xmlns:p="http://schemas.openxmlformats.org/presentationml/2006/main" xmlns:mc="http://schemas.openxmlformats.org/markup-compatibility/2006" xmlns:c="http://schemas.openxmlformats.org/drawingml/2006/chart" xmlns:ns6="http://schemas.openxmlformats.org/drawingml/2006/chartDrawing" xmlns:dgm="http://schemas.openxmlformats.org/drawingml/2006/diagram" xmlns:pic="http://schemas.openxmlformats.org/drawingml/2006/picture" xmlns:wp="http://schemas.openxmlformats.org/drawingml/2006/wordprocessingDrawing" xmlns:wp14="http://schemas.microsoft.com/office/word/2010/wordprocessingDrawing" xmlns:xdr="http://schemas.openxmlformats.org/drawingml/2006/spreadsheetDrawing" xmlns:ns12="http://schemas.openxmlformats.org/drawingml/2006/compatibility" xmlns:ns13="http://schemas.openxmlformats.org/drawingml/2006/lockedCanvas" xmlns:v="urn:schemas-microsoft-com:vml">
   <p:cSld>
     <p:spTree>
       <p:nvGrpSpPr>

</xml_diff>

<commit_message>
Package Jar with dependencies, add Apache 2.0 license and deploy on travis
</commit_message>
<xml_diff>
--- a/sample-docs/pptx-copy.pptx
+++ b/sample-docs/pptx-copy.pptx
@@ -690,7 +690,7 @@
 </file>
 
 <file path=ppt/notesSlides/notesSlide1.xml><?xml version="1.0" encoding="utf-8"?>
-<p:notes xmlns:a="http://schemas.openxmlformats.org/drawingml/2006/main" xmlns:r="http://schemas.openxmlformats.org/officeDocument/2006/relationships" xmlns:p="http://schemas.openxmlformats.org/presentationml/2006/main">
+<p:notes xmlns:r="http://schemas.openxmlformats.org/officeDocument/2006/relationships" xmlns:a="http://schemas.openxmlformats.org/drawingml/2006/main" xmlns:p="http://schemas.openxmlformats.org/presentationml/2006/main" xmlns:mc="http://schemas.openxmlformats.org/markup-compatibility/2006" xmlns:c="http://schemas.openxmlformats.org/drawingml/2006/chart" xmlns:ns6="http://schemas.openxmlformats.org/drawingml/2006/chartDrawing" xmlns:dgm="http://schemas.openxmlformats.org/drawingml/2006/diagram" xmlns:pic="http://schemas.openxmlformats.org/drawingml/2006/picture" xmlns:wp="http://schemas.openxmlformats.org/drawingml/2006/wordprocessingDrawing" xmlns:wp14="http://schemas.microsoft.com/office/word/2010/wordprocessingDrawing" xmlns:xdr="http://schemas.openxmlformats.org/drawingml/2006/spreadsheetDrawing" xmlns:ns12="http://schemas.openxmlformats.org/drawingml/2006/compatibility" xmlns:ns13="http://schemas.openxmlformats.org/drawingml/2006/lockedCanvas">
   <p:cSld>
     <p:spTree>
       <p:nvGrpSpPr>
@@ -710,7 +710,7 @@
         <p:nvSpPr>
           <p:cNvPr id="2" name="Slide Image Placeholder 1"/>
           <p:cNvSpPr>
-            <a:spLocks noGrp="1" noRot="1" noChangeAspect="1"/>
+            <a:spLocks noGrp="true" noRot="true" noChangeAspect="true"/>
           </p:cNvSpPr>
           <p:nvPr>
             <p:ph type="sldImg"/>
@@ -722,7 +722,7 @@
         <p:nvSpPr>
           <p:cNvPr id="3" name="Notes Placeholder 2"/>
           <p:cNvSpPr>
-            <a:spLocks noGrp="1"/>
+            <a:spLocks noGrp="true"/>
           </p:cNvSpPr>
           <p:nvPr>
             <p:ph type="body" idx="1"/>
@@ -733,22 +733,41 @@
           <a:bodyPr/>
           <a:lstStyle/>
           <a:p>
-            <a:pPr eaLnBrk="1" hangingPunct="1"/>
-            <a:r>
-              <a:rPr lang="en-US" dirty="0" err="1" smtClean="0">
-                <a:latin typeface="Arial"/>
-                <a:cs typeface="Arial"/>
-              </a:rPr>
-              <a:t>Commentaire</a:t>
-            </a:r>
-            <a:r>
-              <a:rPr lang="en-US" dirty="0" smtClean="0">
-                <a:latin typeface="Arial"/>
-                <a:cs typeface="Arial"/>
-              </a:rPr>
-              <a:t> de copy</a:t>
-            </a:r>
-            <a:endParaRPr lang="en-US" dirty="0" smtClean="0">
+            <a:pPr eaLnBrk="true" hangingPunct="true"/>
+            <a:r>
+              <a:t>=== Original comments from ./sample-docs/pptx-copy.pptx===</a:t>
+            </a:r>
+            <a:endParaRPr lang="en-US" dirty="false" smtClean="false">
+              <a:latin typeface="Arial"/>
+              <a:cs typeface="Arial"/>
+            </a:endParaRPr>
+          </a:p>
+          <a:p>
+            <a:pPr eaLnBrk="true" hangingPunct="true"/>
+            <a:r>
+              <a:t>C’est quoi le clou(d) ?</a:t>
+            </a:r>
+            <a:endParaRPr lang="en-US" dirty="false" smtClean="false">
+              <a:latin typeface="Arial"/>
+              <a:cs typeface="Arial"/>
+            </a:endParaRPr>
+          </a:p>
+          <a:p>
+            <a:pPr eaLnBrk="true" hangingPunct="true"/>
+            <a:r>
+              <a:t>=== Original comments from ./sample-docs/pptx-copy.pptx===</a:t>
+            </a:r>
+            <a:endParaRPr lang="en-US" dirty="false" smtClean="false">
+              <a:latin typeface="Arial"/>
+              <a:cs typeface="Arial"/>
+            </a:endParaRPr>
+          </a:p>
+          <a:p>
+            <a:pPr eaLnBrk="true" hangingPunct="true"/>
+            <a:r>
+              <a:t>C’est quoi le clou(d) ?</a:t>
+            </a:r>
+            <a:endParaRPr lang="en-US" dirty="false" smtClean="false">
               <a:latin typeface="Arial"/>
               <a:cs typeface="Arial"/>
             </a:endParaRPr>
@@ -769,7 +788,7 @@
 </file>
 
 <file path=ppt/notesSlides/notesSlide2.xml><?xml version="1.0" encoding="utf-8"?>
-<p:notes xmlns:a="http://schemas.openxmlformats.org/drawingml/2006/main" xmlns:r="http://schemas.openxmlformats.org/officeDocument/2006/relationships" xmlns:p="http://schemas.openxmlformats.org/presentationml/2006/main">
+<p:notes xmlns:r="http://schemas.openxmlformats.org/officeDocument/2006/relationships" xmlns:a="http://schemas.openxmlformats.org/drawingml/2006/main" xmlns:p="http://schemas.openxmlformats.org/presentationml/2006/main" xmlns:mc="http://schemas.openxmlformats.org/markup-compatibility/2006" xmlns:c="http://schemas.openxmlformats.org/drawingml/2006/chart" xmlns:ns6="http://schemas.openxmlformats.org/drawingml/2006/chartDrawing" xmlns:dgm="http://schemas.openxmlformats.org/drawingml/2006/diagram" xmlns:pic="http://schemas.openxmlformats.org/drawingml/2006/picture" xmlns:wp="http://schemas.openxmlformats.org/drawingml/2006/wordprocessingDrawing" xmlns:wp14="http://schemas.microsoft.com/office/word/2010/wordprocessingDrawing" xmlns:xdr="http://schemas.openxmlformats.org/drawingml/2006/spreadsheetDrawing" xmlns:ns12="http://schemas.openxmlformats.org/drawingml/2006/compatibility" xmlns:ns13="http://schemas.openxmlformats.org/drawingml/2006/lockedCanvas">
   <p:cSld>
     <p:spTree>
       <p:nvGrpSpPr>
@@ -789,7 +808,7 @@
         <p:nvSpPr>
           <p:cNvPr id="2" name="Slide Image Placeholder 1"/>
           <p:cNvSpPr>
-            <a:spLocks noGrp="1" noRot="1" noChangeAspect="1"/>
+            <a:spLocks noGrp="true" noRot="true" noChangeAspect="true"/>
           </p:cNvSpPr>
           <p:nvPr>
             <p:ph type="sldImg"/>
@@ -801,7 +820,7 @@
         <p:nvSpPr>
           <p:cNvPr id="3" name="Notes Placeholder 2"/>
           <p:cNvSpPr>
-            <a:spLocks noGrp="1"/>
+            <a:spLocks noGrp="true"/>
           </p:cNvSpPr>
           <p:nvPr>
             <p:ph type="body" idx="1"/>
@@ -813,14 +832,291 @@
           <a:lstStyle/>
           <a:p>
             <a:r>
-              <a:rPr lang="en-US" dirty="0" err="1" smtClean="0"/>
-              <a:t>Commentaire</a:t>
-            </a:r>
-            <a:r>
-              <a:rPr lang="en-US" smtClean="0"/>
-              <a:t> de copy 2</a:t>
-            </a:r>
-            <a:endParaRPr lang="en-US" dirty="0"/>
+              <a:t>=== Original comments from ./sample-docs/pptx-copy.pptx===</a:t>
+            </a:r>
+            <a:endParaRPr lang="en-US" dirty="false"/>
+          </a:p>
+          <a:p>
+            <a:r>
+              <a:t>Il faut construire un DC, un autre, …</a:t>
+            </a:r>
+            <a:endParaRPr lang="en-US" dirty="false"/>
+          </a:p>
+          <a:p>
+            <a:r>
+              <a:t>On parle de Capital Expense</a:t>
+            </a:r>
+            <a:endParaRPr lang="en-US" dirty="false"/>
+          </a:p>
+          <a:p>
+            <a:r>
+              <a:t/>
+            </a:r>
+            <a:endParaRPr lang="en-US" dirty="false"/>
+          </a:p>
+          <a:p>
+            <a:r>
+              <a:t>Le mode de financement du cloud c’est de l’operational expense</a:t>
+            </a:r>
+            <a:endParaRPr lang="en-US" dirty="false"/>
+          </a:p>
+          <a:p>
+            <a:r>
+              <a:t>On va payer à l’heure de consummation</a:t>
+            </a:r>
+            <a:endParaRPr lang="en-US" dirty="false"/>
+          </a:p>
+          <a:p>
+            <a:r>
+              <a:t>On peut faire le parallèle avec la téléphonie portable : lorsqu’il ne fonctionne plus je le jette et j’en rachète un autre</a:t>
+            </a:r>
+            <a:endParaRPr lang="en-US" dirty="false"/>
+          </a:p>
+          <a:p>
+            <a:r>
+              <a:t/>
+            </a:r>
+            <a:endParaRPr lang="en-US" dirty="false"/>
+          </a:p>
+          <a:p>
+            <a:r>
+              <a:t>Avec quelque chose d’automatiser derrière</a:t>
+            </a:r>
+            <a:endParaRPr lang="en-US" dirty="false"/>
+          </a:p>
+          <a:p>
+            <a:r>
+              <a:t>On va recréer le rack and stack par des instances</a:t>
+            </a:r>
+            <a:endParaRPr lang="en-US" dirty="false"/>
+          </a:p>
+          <a:p>
+            <a:r>
+              <a:t>On appellee cela des instances car on va instancier un materiel</a:t>
+            </a:r>
+            <a:endParaRPr lang="en-US" dirty="false"/>
+          </a:p>
+          <a:p>
+            <a:r>
+              <a:t/>
+            </a:r>
+            <a:endParaRPr lang="en-US" dirty="false"/>
+          </a:p>
+          <a:p>
+            <a:r>
+              <a:t>Quelques soit votre business. Des applications qui suivent vos besoins</a:t>
+            </a:r>
+            <a:endParaRPr lang="en-US" dirty="false"/>
+          </a:p>
+          <a:p>
+            <a:r>
+              <a:t>AWS =&gt; Compute, storage and database </a:t>
+            </a:r>
+            <a:endParaRPr lang="en-US" dirty="false"/>
+          </a:p>
+          <a:p>
+            <a:r>
+              <a:t>No upfront capital exchange</a:t>
+            </a:r>
+            <a:endParaRPr lang="en-US" dirty="false"/>
+          </a:p>
+          <a:p>
+            <a:r>
+              <a:t/>
+            </a:r>
+            <a:endParaRPr lang="en-US" dirty="false"/>
+          </a:p>
+          <a:p>
+            <a:r>
+              <a:t>Economy at scale</a:t>
+            </a:r>
+            <a:endParaRPr lang="en-US" dirty="false"/>
+          </a:p>
+          <a:p>
+            <a:r>
+              <a:t>Add and remove capacity dynamically</a:t>
+            </a:r>
+            <a:endParaRPr lang="en-US" dirty="false"/>
+          </a:p>
+          <a:p>
+            <a:r>
+              <a:t/>
+            </a:r>
+            <a:endParaRPr lang="en-US" dirty="false"/>
+          </a:p>
+          <a:p>
+            <a:r>
+              <a:t>====</a:t>
+            </a:r>
+            <a:endParaRPr lang="en-US" dirty="false"/>
+          </a:p>
+          <a:p>
+            <a:r>
+              <a:t/>
+            </a:r>
+            <a:endParaRPr lang="en-US" dirty="false"/>
+          </a:p>
+          <a:p>
+            <a:r>
+              <a:t>For more on this, see: https://aws.amazon.com/what-is-cloud-computing/</a:t>
+            </a:r>
+            <a:endParaRPr lang="en-US" dirty="false"/>
+          </a:p>
+          <a:p>
+            <a:r>
+              <a:t/>
+            </a:r>
+            <a:endParaRPr lang="en-US" dirty="false"/>
+          </a:p>
+          <a:p>
+            <a:r>
+              <a:t/>
+            </a:r>
+            <a:endParaRPr lang="en-US" dirty="false"/>
+          </a:p>
+          <a:p>
+            <a:r>
+              <a:t>=== Original comments from ./sample-docs/pptx-copy.pptx===</a:t>
+            </a:r>
+            <a:endParaRPr lang="en-US" dirty="false"/>
+          </a:p>
+          <a:p>
+            <a:r>
+              <a:t>Il faut construire un DC, un autre, …</a:t>
+            </a:r>
+            <a:endParaRPr lang="en-US" dirty="false"/>
+          </a:p>
+          <a:p>
+            <a:r>
+              <a:t>On parle de Capital Expense</a:t>
+            </a:r>
+            <a:endParaRPr lang="en-US" dirty="false"/>
+          </a:p>
+          <a:p>
+            <a:r>
+              <a:t/>
+            </a:r>
+            <a:endParaRPr lang="en-US" dirty="false"/>
+          </a:p>
+          <a:p>
+            <a:r>
+              <a:t>Le mode de financement du cloud c’est de l’operational expense</a:t>
+            </a:r>
+            <a:endParaRPr lang="en-US" dirty="false"/>
+          </a:p>
+          <a:p>
+            <a:r>
+              <a:t>On va payer à l’heure de consummation</a:t>
+            </a:r>
+            <a:endParaRPr lang="en-US" dirty="false"/>
+          </a:p>
+          <a:p>
+            <a:r>
+              <a:t>On peut faire le parallèle avec la téléphonie portable : lorsqu’il ne fonctionne plus je le jette et j’en rachète un autre</a:t>
+            </a:r>
+            <a:endParaRPr lang="en-US" dirty="false"/>
+          </a:p>
+          <a:p>
+            <a:r>
+              <a:t/>
+            </a:r>
+            <a:endParaRPr lang="en-US" dirty="false"/>
+          </a:p>
+          <a:p>
+            <a:r>
+              <a:t>Avec quelque chose d’automatiser derrière</a:t>
+            </a:r>
+            <a:endParaRPr lang="en-US" dirty="false"/>
+          </a:p>
+          <a:p>
+            <a:r>
+              <a:t>On va recréer le rack and stack par des instances</a:t>
+            </a:r>
+            <a:endParaRPr lang="en-US" dirty="false"/>
+          </a:p>
+          <a:p>
+            <a:r>
+              <a:t>On appellee cela des instances car on va instancier un materiel</a:t>
+            </a:r>
+            <a:endParaRPr lang="en-US" dirty="false"/>
+          </a:p>
+          <a:p>
+            <a:r>
+              <a:t/>
+            </a:r>
+            <a:endParaRPr lang="en-US" dirty="false"/>
+          </a:p>
+          <a:p>
+            <a:r>
+              <a:t>Quelques soit votre business. Des applications qui suivent vos besoins</a:t>
+            </a:r>
+            <a:endParaRPr lang="en-US" dirty="false"/>
+          </a:p>
+          <a:p>
+            <a:r>
+              <a:t>AWS =&gt; Compute, storage and database </a:t>
+            </a:r>
+            <a:endParaRPr lang="en-US" dirty="false"/>
+          </a:p>
+          <a:p>
+            <a:r>
+              <a:t>No upfront capital exchange</a:t>
+            </a:r>
+            <a:endParaRPr lang="en-US" dirty="false"/>
+          </a:p>
+          <a:p>
+            <a:r>
+              <a:t/>
+            </a:r>
+            <a:endParaRPr lang="en-US" dirty="false"/>
+          </a:p>
+          <a:p>
+            <a:r>
+              <a:t>Economy at scale</a:t>
+            </a:r>
+            <a:endParaRPr lang="en-US" dirty="false"/>
+          </a:p>
+          <a:p>
+            <a:r>
+              <a:t>Add and remove capacity dynamically</a:t>
+            </a:r>
+            <a:endParaRPr lang="en-US" dirty="false"/>
+          </a:p>
+          <a:p>
+            <a:r>
+              <a:t/>
+            </a:r>
+            <a:endParaRPr lang="en-US" dirty="false"/>
+          </a:p>
+          <a:p>
+            <a:r>
+              <a:t>====</a:t>
+            </a:r>
+            <a:endParaRPr lang="en-US" dirty="false"/>
+          </a:p>
+          <a:p>
+            <a:r>
+              <a:t/>
+            </a:r>
+            <a:endParaRPr lang="en-US" dirty="false"/>
+          </a:p>
+          <a:p>
+            <a:r>
+              <a:t>For more on this, see: https://aws.amazon.com/what-is-cloud-computing/</a:t>
+            </a:r>
+            <a:endParaRPr lang="en-US" dirty="false"/>
+          </a:p>
+          <a:p>
+            <a:r>
+              <a:t/>
+            </a:r>
+            <a:endParaRPr lang="en-US" dirty="false"/>
+          </a:p>
+          <a:p>
+            <a:r>
+              <a:t/>
+            </a:r>
+            <a:endParaRPr lang="en-US" dirty="false"/>
           </a:p>
         </p:txBody>
       </p:sp>
@@ -2003,7 +2299,7 @@
 </file>
 
 <file path=ppt/slideLayouts/slideLayout4.xml><?xml version="1.0" encoding="utf-8"?>
-<p:sldLayout xmlns:a="http://schemas.openxmlformats.org/drawingml/2006/main" xmlns:r="http://schemas.openxmlformats.org/officeDocument/2006/relationships" xmlns:p="http://schemas.openxmlformats.org/presentationml/2006/main" preserve="1" userDrawn="1">
+<p:sldLayout xmlns:v="urn:schemas-microsoft-com:vml" xmlns:a="http://schemas.openxmlformats.org/drawingml/2006/main" xmlns:c="http://schemas.openxmlformats.org/drawingml/2006/chart" xmlns:xdr="http://schemas.openxmlformats.org/drawingml/2006/spreadsheetDrawing" xmlns:dgm="http://schemas.openxmlformats.org/drawingml/2006/diagram" xmlns:pic="http://schemas.openxmlformats.org/drawingml/2006/picture" xmlns:wp14="http://schemas.microsoft.com/office/word/2010/wordprocessingDrawing" xmlns:p="http://schemas.openxmlformats.org/presentationml/2006/main" xmlns:ns6="http://schemas.openxmlformats.org/drawingml/2006/chartDrawing" xmlns:r="http://schemas.openxmlformats.org/officeDocument/2006/relationships" xmlns:ns13="http://schemas.openxmlformats.org/drawingml/2006/lockedCanvas" xmlns:ns12="http://schemas.openxmlformats.org/drawingml/2006/compatibility" xmlns:mc="http://schemas.openxmlformats.org/markup-compatibility/2006" xmlns:wp="http://schemas.openxmlformats.org/drawingml/2006/wordprocessingDrawing" preserve="true" userDrawn="true">
   <p:cSld name="Module Header">
     <p:spTree>
       <p:nvGrpSpPr>
@@ -2023,10 +2319,10 @@
         <p:nvSpPr>
           <p:cNvPr id="2" name="Title 1"/>
           <p:cNvSpPr>
-            <a:spLocks noGrp="1"/>
+            <a:spLocks noGrp="true"/>
           </p:cNvSpPr>
           <p:nvPr>
-            <p:ph type="title" hasCustomPrompt="1"/>
+            <p:ph type="title" hasCustomPrompt="true"/>
           </p:nvPr>
         </p:nvSpPr>
         <p:spPr>
@@ -2041,7 +2337,7 @@
           </a:bodyPr>
           <a:lstStyle>
             <a:lvl1pPr algn="l">
-              <a:defRPr sz="2800" b="1" cap="none" baseline="0">
+              <a:defRPr sz="2800" b="true" cap="none" baseline="0">
                 <a:solidFill>
                   <a:schemeClr val="tx1"/>
                 </a:solidFill>
@@ -2050,10 +2346,10 @@
           </a:lstStyle>
           <a:p>
             <a:r>
-              <a:rPr lang="en-US" dirty="0" smtClean="0"/>
+              <a:rPr lang="en-US" dirty="false" smtClean="false"/>
               <a:t>Section Header</a:t>
             </a:r>
-            <a:endParaRPr lang="en-US" dirty="0"/>
+            <a:endParaRPr lang="en-US" dirty="false"/>
           </a:p>
         </p:txBody>
       </p:sp>
@@ -2061,9 +2357,9 @@
         <p:nvPicPr>
           <p:cNvPr id="4" name="Picture 3" descr="AWS-Intro-Series-Branding_01.png"/>
           <p:cNvPicPr>
-            <a:picLocks noChangeAspect="1"/>
+            <a:picLocks noChangeAspect="true"/>
           </p:cNvPicPr>
-          <p:nvPr userDrawn="1"/>
+          <p:nvPr userDrawn="true"/>
         </p:nvPicPr>
         <p:blipFill>
           <a:blip r:embed="rId2">
@@ -2091,7 +2387,7 @@
         <p:nvSpPr>
           <p:cNvPr id="6" name="Subtitle 2"/>
           <p:cNvSpPr>
-            <a:spLocks noGrp="1"/>
+            <a:spLocks noGrp="true"/>
           </p:cNvSpPr>
           <p:nvPr>
             <p:ph type="subTitle" idx="1"/>
@@ -2197,10 +2493,10 @@
           </a:lstStyle>
           <a:p>
             <a:r>
-              <a:rPr lang="en-US" smtClean="0"/>
+              <a:rPr lang="en-US" smtClean="false"/>
               <a:t>Click to edit Master subtitle style</a:t>
             </a:r>
-            <a:endParaRPr lang="en-US" dirty="0"/>
+            <a:endParaRPr lang="en-US" dirty="false"/>
           </a:p>
         </p:txBody>
       </p:sp>
@@ -3136,7 +3432,7 @@
 </file>
 
 <file path=ppt/slideLayouts/slideLayout7.xml><?xml version="1.0" encoding="utf-8"?>
-<p:sldLayout xmlns:a="http://schemas.openxmlformats.org/drawingml/2006/main" xmlns:r="http://schemas.openxmlformats.org/officeDocument/2006/relationships" xmlns:p="http://schemas.openxmlformats.org/presentationml/2006/main" preserve="1" userDrawn="1">
+<p:sldLayout xmlns:v="urn:schemas-microsoft-com:vml" xmlns:a="http://schemas.openxmlformats.org/drawingml/2006/main" xmlns:c="http://schemas.openxmlformats.org/drawingml/2006/chart" xmlns:xdr="http://schemas.openxmlformats.org/drawingml/2006/spreadsheetDrawing" xmlns:dgm="http://schemas.openxmlformats.org/drawingml/2006/diagram" xmlns:pic="http://schemas.openxmlformats.org/drawingml/2006/picture" xmlns:wp14="http://schemas.microsoft.com/office/word/2010/wordprocessingDrawing" xmlns:p="http://schemas.openxmlformats.org/presentationml/2006/main" xmlns:ns6="http://schemas.openxmlformats.org/drawingml/2006/chartDrawing" xmlns:r="http://schemas.openxmlformats.org/officeDocument/2006/relationships" xmlns:ns13="http://schemas.openxmlformats.org/drawingml/2006/lockedCanvas" xmlns:ns12="http://schemas.openxmlformats.org/drawingml/2006/compatibility" xmlns:mc="http://schemas.openxmlformats.org/markup-compatibility/2006" xmlns:wp="http://schemas.openxmlformats.org/drawingml/2006/wordprocessingDrawing" preserve="true" userDrawn="true">
   <p:cSld name="Title and Content">
     <p:spTree>
       <p:nvGrpSpPr>
@@ -3156,7 +3452,7 @@
         <p:nvSpPr>
           <p:cNvPr id="2" name="Title 1"/>
           <p:cNvSpPr>
-            <a:spLocks noGrp="1"/>
+            <a:spLocks noGrp="true"/>
           </p:cNvSpPr>
           <p:nvPr>
             <p:ph type="title"/>
@@ -3168,10 +3464,10 @@
           <a:lstStyle/>
           <a:p>
             <a:r>
-              <a:rPr lang="en-US" smtClean="0"/>
+              <a:rPr lang="en-US" smtClean="false"/>
               <a:t>Click to edit Master title style</a:t>
             </a:r>
-            <a:endParaRPr lang="en-US" dirty="0"/>
+            <a:endParaRPr lang="en-US" dirty="false"/>
           </a:p>
         </p:txBody>
       </p:sp>
@@ -3179,7 +3475,7 @@
         <p:nvCxnSpPr>
           <p:cNvPr id="6" name="Straight Connector 5"/>
           <p:cNvCxnSpPr/>
-          <p:nvPr userDrawn="1"/>
+          <p:nvPr userDrawn="true"/>
         </p:nvCxnSpPr>
         <p:spPr>
           <a:xfrm>
@@ -3215,7 +3511,7 @@
         <p:nvCxnSpPr>
           <p:cNvPr id="10" name="Straight Connector 9"/>
           <p:cNvCxnSpPr/>
-          <p:nvPr userDrawn="1"/>
+          <p:nvPr userDrawn="true"/>
         </p:nvCxnSpPr>
         <p:spPr>
           <a:xfrm>
@@ -3251,7 +3547,7 @@
         <p:nvSpPr>
           <p:cNvPr id="8" name="Content Placeholder 2"/>
           <p:cNvSpPr>
-            <a:spLocks noGrp="1"/>
+            <a:spLocks noGrp="true"/>
           </p:cNvSpPr>
           <p:nvPr>
             <p:ph idx="1"/>
@@ -3291,28 +3587,28 @@
           <a:p>
             <a:pPr lvl="0"/>
             <a:r>
-              <a:rPr lang="en-US" smtClean="0"/>
+              <a:rPr lang="en-US" smtClean="false"/>
               <a:t>Click to edit Master text styles</a:t>
             </a:r>
           </a:p>
           <a:p>
             <a:pPr lvl="1"/>
             <a:r>
-              <a:rPr lang="en-US" smtClean="0"/>
+              <a:rPr lang="en-US" smtClean="false"/>
               <a:t>Second level</a:t>
             </a:r>
           </a:p>
           <a:p>
             <a:pPr lvl="2"/>
             <a:r>
-              <a:rPr lang="en-US" smtClean="0"/>
+              <a:rPr lang="en-US" smtClean="false"/>
               <a:t>Third level</a:t>
             </a:r>
           </a:p>
           <a:p>
             <a:pPr lvl="3"/>
             <a:r>
-              <a:rPr lang="en-US" smtClean="0"/>
+              <a:rPr lang="en-US" smtClean="false"/>
               <a:t>Fourth level</a:t>
             </a:r>
           </a:p>
@@ -3626,7 +3922,7 @@
 </file>
 
 <file path=ppt/slideMasters/slideMaster1.xml><?xml version="1.0" encoding="utf-8"?>
-<p:sldMaster xmlns:a="http://schemas.openxmlformats.org/drawingml/2006/main" xmlns:r="http://schemas.openxmlformats.org/officeDocument/2006/relationships" xmlns:p="http://schemas.openxmlformats.org/presentationml/2006/main">
+<p:sldMaster xmlns:v="urn:schemas-microsoft-com:vml" xmlns:a="http://schemas.openxmlformats.org/drawingml/2006/main" xmlns:c="http://schemas.openxmlformats.org/drawingml/2006/chart" xmlns:xdr="http://schemas.openxmlformats.org/drawingml/2006/spreadsheetDrawing" xmlns:dgm="http://schemas.openxmlformats.org/drawingml/2006/diagram" xmlns:pic="http://schemas.openxmlformats.org/drawingml/2006/picture" xmlns:wp14="http://schemas.microsoft.com/office/word/2010/wordprocessingDrawing" xmlns:p="http://schemas.openxmlformats.org/presentationml/2006/main" xmlns:ns6="http://schemas.openxmlformats.org/drawingml/2006/chartDrawing" xmlns:r="http://schemas.openxmlformats.org/officeDocument/2006/relationships" xmlns:ns13="http://schemas.openxmlformats.org/drawingml/2006/lockedCanvas" xmlns:ns12="http://schemas.openxmlformats.org/drawingml/2006/compatibility" xmlns:mc="http://schemas.openxmlformats.org/markup-compatibility/2006" xmlns:wp="http://schemas.openxmlformats.org/drawingml/2006/wordprocessingDrawing">
   <p:cSld>
     <p:bg>
       <p:bgPr>
@@ -3654,7 +3950,7 @@
         <p:nvSpPr>
           <p:cNvPr id="2" name="Title Placeholder 1"/>
           <p:cNvSpPr>
-            <a:spLocks noGrp="1"/>
+            <a:spLocks noGrp="true"/>
           </p:cNvSpPr>
           <p:nvPr>
             <p:ph type="title"/>
@@ -3670,16 +3966,16 @@
           </a:prstGeom>
         </p:spPr>
         <p:txBody>
-          <a:bodyPr vert="horz" lIns="91440" tIns="45720" rIns="91440" bIns="45720" rtlCol="0" anchor="t">
+          <a:bodyPr vert="horz" lIns="91440" tIns="45720" rIns="91440" bIns="45720" rtlCol="false" anchor="t">
             <a:noAutofit/>
           </a:bodyPr>
           <a:lstStyle/>
           <a:p>
             <a:r>
-              <a:rPr lang="en-US" smtClean="0"/>
+              <a:rPr lang="en-US" smtClean="false"/>
               <a:t>Click to edit Master title style</a:t>
             </a:r>
-            <a:endParaRPr lang="en-US" dirty="0"/>
+            <a:endParaRPr lang="en-US" dirty="false"/>
           </a:p>
         </p:txBody>
       </p:sp>
@@ -3687,7 +3983,7 @@
         <p:nvSpPr>
           <p:cNvPr id="3" name="Text Placeholder 2"/>
           <p:cNvSpPr>
-            <a:spLocks noGrp="1"/>
+            <a:spLocks noGrp="true"/>
           </p:cNvSpPr>
           <p:nvPr>
             <p:ph type="body" idx="1"/>
@@ -3703,35 +3999,35 @@
           </a:prstGeom>
         </p:spPr>
         <p:txBody>
-          <a:bodyPr vert="horz" lIns="91440" tIns="45720" rIns="91440" bIns="45720" rtlCol="0">
+          <a:bodyPr vert="horz" lIns="91440" tIns="45720" rIns="91440" bIns="45720" rtlCol="false">
             <a:noAutofit/>
           </a:bodyPr>
           <a:lstStyle/>
           <a:p>
             <a:pPr lvl="0"/>
             <a:r>
-              <a:rPr lang="en-US" dirty="0" smtClean="0"/>
+              <a:rPr lang="en-US" dirty="false" smtClean="false"/>
               <a:t>Click to edit Master text styles</a:t>
             </a:r>
           </a:p>
           <a:p>
             <a:pPr lvl="1"/>
             <a:r>
-              <a:rPr lang="en-US" dirty="0" smtClean="0"/>
+              <a:rPr lang="en-US" dirty="false" smtClean="false"/>
               <a:t>Level 1</a:t>
             </a:r>
           </a:p>
           <a:p>
             <a:pPr lvl="2"/>
             <a:r>
-              <a:rPr lang="en-US" dirty="0" smtClean="0"/>
+              <a:rPr lang="en-US" dirty="false" smtClean="false"/>
               <a:t>Level 2</a:t>
             </a:r>
           </a:p>
           <a:p>
             <a:pPr lvl="3"/>
             <a:r>
-              <a:rPr lang="en-US" dirty="0" smtClean="0"/>
+              <a:rPr lang="en-US" dirty="false" smtClean="false"/>
               <a:t>Level 3</a:t>
             </a:r>
           </a:p>
@@ -3777,7 +4073,7 @@
         <p:nvPicPr>
           <p:cNvPr id="9" name="Picture 8"/>
           <p:cNvPicPr>
-            <a:picLocks noChangeAspect="1"/>
+            <a:picLocks noChangeAspect="true"/>
           </p:cNvPicPr>
           <p:nvPr/>
         </p:nvPicPr>
@@ -3842,10 +4138,10 @@
       <p:sp>
         <p:nvSpPr>
           <p:cNvPr id="13" name="Footer Placeholder 10"/>
-          <p:cNvSpPr txBox="1">
+          <p:cNvSpPr txBox="true">
             <a:spLocks/>
           </p:cNvSpPr>
-          <p:nvPr userDrawn="1"/>
+          <p:nvPr userDrawn="true"/>
         </p:nvSpPr>
         <p:spPr>
           <a:xfrm>
@@ -3857,12 +4153,12 @@
           </a:prstGeom>
         </p:spPr>
         <p:txBody>
-          <a:bodyPr vert="horz" lIns="91440" tIns="45720" rIns="91440" bIns="45720" rtlCol="0" anchor="ctr"/>
+          <a:bodyPr vert="horz" lIns="91440" tIns="45720" rIns="91440" bIns="45720" rtlCol="false" anchor="ctr"/>
           <a:lstStyle>
             <a:defPPr>
               <a:defRPr lang="en-US"/>
             </a:defPPr>
-            <a:lvl1pPr marL="0" algn="l" defTabSz="457200" rtl="0" eaLnBrk="1" latinLnBrk="0" hangingPunct="1">
+            <a:lvl1pPr marL="0" algn="l" defTabSz="457200" rtl="false" eaLnBrk="true" latinLnBrk="false" hangingPunct="true">
               <a:defRPr sz="800" kern="1200">
                 <a:solidFill>
                   <a:schemeClr val="tx1">
@@ -3874,7 +4170,7 @@
                 <a:cs typeface="+mn-cs"/>
               </a:defRPr>
             </a:lvl1pPr>
-            <a:lvl2pPr marL="457200" algn="l" defTabSz="457200" rtl="0" eaLnBrk="1" latinLnBrk="0" hangingPunct="1">
+            <a:lvl2pPr marL="457200" algn="l" defTabSz="457200" rtl="false" eaLnBrk="true" latinLnBrk="false" hangingPunct="true">
               <a:defRPr sz="1800" kern="1200">
                 <a:solidFill>
                   <a:schemeClr val="tx1"/>
@@ -3884,7 +4180,7 @@
                 <a:cs typeface="+mn-cs"/>
               </a:defRPr>
             </a:lvl2pPr>
-            <a:lvl3pPr marL="914400" algn="l" defTabSz="457200" rtl="0" eaLnBrk="1" latinLnBrk="0" hangingPunct="1">
+            <a:lvl3pPr marL="914400" algn="l" defTabSz="457200" rtl="false" eaLnBrk="true" latinLnBrk="false" hangingPunct="true">
               <a:defRPr sz="1800" kern="1200">
                 <a:solidFill>
                   <a:schemeClr val="tx1"/>
@@ -3894,7 +4190,7 @@
                 <a:cs typeface="+mn-cs"/>
               </a:defRPr>
             </a:lvl3pPr>
-            <a:lvl4pPr marL="1371600" algn="l" defTabSz="457200" rtl="0" eaLnBrk="1" latinLnBrk="0" hangingPunct="1">
+            <a:lvl4pPr marL="1371600" algn="l" defTabSz="457200" rtl="false" eaLnBrk="true" latinLnBrk="false" hangingPunct="true">
               <a:defRPr sz="1800" kern="1200">
                 <a:solidFill>
                   <a:schemeClr val="tx1"/>
@@ -3904,7 +4200,7 @@
                 <a:cs typeface="+mn-cs"/>
               </a:defRPr>
             </a:lvl4pPr>
-            <a:lvl5pPr marL="1828800" algn="l" defTabSz="457200" rtl="0" eaLnBrk="1" latinLnBrk="0" hangingPunct="1">
+            <a:lvl5pPr marL="1828800" algn="l" defTabSz="457200" rtl="false" eaLnBrk="true" latinLnBrk="false" hangingPunct="true">
               <a:defRPr sz="1800" kern="1200">
                 <a:solidFill>
                   <a:schemeClr val="tx1"/>
@@ -3914,7 +4210,7 @@
                 <a:cs typeface="+mn-cs"/>
               </a:defRPr>
             </a:lvl5pPr>
-            <a:lvl6pPr marL="2286000" algn="l" defTabSz="457200" rtl="0" eaLnBrk="1" latinLnBrk="0" hangingPunct="1">
+            <a:lvl6pPr marL="2286000" algn="l" defTabSz="457200" rtl="false" eaLnBrk="true" latinLnBrk="false" hangingPunct="true">
               <a:defRPr sz="1800" kern="1200">
                 <a:solidFill>
                   <a:schemeClr val="tx1"/>
@@ -3924,7 +4220,7 @@
                 <a:cs typeface="+mn-cs"/>
               </a:defRPr>
             </a:lvl6pPr>
-            <a:lvl7pPr marL="2743200" algn="l" defTabSz="457200" rtl="0" eaLnBrk="1" latinLnBrk="0" hangingPunct="1">
+            <a:lvl7pPr marL="2743200" algn="l" defTabSz="457200" rtl="false" eaLnBrk="true" latinLnBrk="false" hangingPunct="true">
               <a:defRPr sz="1800" kern="1200">
                 <a:solidFill>
                   <a:schemeClr val="tx1"/>
@@ -3934,7 +4230,7 @@
                 <a:cs typeface="+mn-cs"/>
               </a:defRPr>
             </a:lvl7pPr>
-            <a:lvl8pPr marL="3200400" algn="l" defTabSz="457200" rtl="0" eaLnBrk="1" latinLnBrk="0" hangingPunct="1">
+            <a:lvl8pPr marL="3200400" algn="l" defTabSz="457200" rtl="false" eaLnBrk="true" latinLnBrk="false" hangingPunct="true">
               <a:defRPr sz="1800" kern="1200">
                 <a:solidFill>
                   <a:schemeClr val="tx1"/>
@@ -3944,7 +4240,7 @@
                 <a:cs typeface="+mn-cs"/>
               </a:defRPr>
             </a:lvl8pPr>
-            <a:lvl9pPr marL="3657600" algn="l" defTabSz="457200" rtl="0" eaLnBrk="1" latinLnBrk="0" hangingPunct="1">
+            <a:lvl9pPr marL="3657600" algn="l" defTabSz="457200" rtl="false" eaLnBrk="true" latinLnBrk="false" hangingPunct="true">
               <a:defRPr sz="1800" kern="1200">
                 <a:solidFill>
                   <a:schemeClr val="tx1"/>
@@ -3958,14 +4254,14 @@
           <a:p>
             <a:pPr algn="r"/>
             <a:fld id="{78CCA2CA-1B45-4AF7-8183-FFFEE66DD4C1}" type="slidenum">
-              <a:rPr lang="en-US" b="1" smtClean="0">
+              <a:rPr lang="en-US" b="true" smtClean="false">
                 <a:solidFill>
                   <a:schemeClr val="tx1"/>
                 </a:solidFill>
               </a:rPr>
               <a:t>‹N°›</a:t>
             </a:fld>
-            <a:endParaRPr lang="en-US" b="1" dirty="0">
+            <a:endParaRPr lang="en-US" b="true" dirty="false">
               <a:solidFill>
                 <a:schemeClr val="tx1"/>
               </a:solidFill>
@@ -3976,8 +4272,8 @@
       <p:sp>
         <p:nvSpPr>
           <p:cNvPr id="4" name="TextBox 3"/>
-          <p:cNvSpPr txBox="1"/>
-          <p:nvPr userDrawn="1"/>
+          <p:cNvSpPr txBox="true"/>
+          <p:nvPr userDrawn="true"/>
         </p:nvSpPr>
         <p:spPr>
           <a:xfrm>
@@ -3990,12 +4286,12 @@
           <a:noFill/>
         </p:spPr>
         <p:txBody>
-          <a:bodyPr wrap="square" rtlCol="0">
+          <a:bodyPr wrap="square" rtlCol="false">
             <a:spAutoFit/>
           </a:bodyPr>
           <a:lstStyle/>
           <a:p>
-            <a:pPr marL="0" marR="0" indent="0" algn="l" defTabSz="457200" rtl="0" eaLnBrk="1" fontAlgn="auto" latinLnBrk="0" hangingPunct="1">
+            <a:pPr marL="0" marR="0" indent="0" algn="l" defTabSz="457200" rtl="false" eaLnBrk="true" fontAlgn="auto" latinLnBrk="false" hangingPunct="true">
               <a:lnSpc>
                 <a:spcPct val="100000"/>
               </a:lnSpc>
@@ -4013,7 +4309,7 @@
               <a:defRPr/>
             </a:pPr>
             <a:r>
-              <a:rPr lang="en-US" sz="800" dirty="0" smtClean="0"/>
+              <a:rPr lang="en-US" sz="800" dirty="false" smtClean="false"/>
               <a:t>© 2016 Amazon Web Services, Inc. and its affiliates. All rights reserved.</a:t>
             </a:r>
           </a:p>
@@ -4046,15 +4342,15 @@
       </p:par>
     </p:tnLst>
   </p:timing>
-  <p:hf sldNum="0" hdr="0" dt="0"/>
+  <p:hf sldNum="false" hdr="false" dt="false"/>
   <p:txStyles>
     <p:titleStyle>
-      <a:lvl1pPr algn="l" defTabSz="457200" rtl="0" eaLnBrk="1" latinLnBrk="0" hangingPunct="1">
+      <a:lvl1pPr algn="l" defTabSz="457200" rtl="false" eaLnBrk="true" latinLnBrk="false" hangingPunct="true">
         <a:spcBef>
           <a:spcPct val="0"/>
         </a:spcBef>
         <a:buNone/>
-        <a:defRPr sz="2400" b="1" i="0" kern="1200">
+        <a:defRPr sz="2400" b="true" i="false" kern="1200">
           <a:solidFill>
             <a:schemeClr val="tx1"/>
           </a:solidFill>
@@ -4065,13 +4361,13 @@
       </a:lvl1pPr>
     </p:titleStyle>
     <p:bodyStyle>
-      <a:lvl1pPr marL="0" indent="0" algn="l" defTabSz="457200" rtl="0" eaLnBrk="1" latinLnBrk="0" hangingPunct="1">
+      <a:lvl1pPr marL="0" indent="0" algn="l" defTabSz="457200" rtl="false" eaLnBrk="true" latinLnBrk="false" hangingPunct="true">
         <a:spcBef>
           <a:spcPct val="20000"/>
         </a:spcBef>
         <a:buFontTx/>
         <a:buNone/>
-        <a:defRPr sz="2400" b="0" i="0" kern="1200">
+        <a:defRPr sz="2400" b="false" i="false" kern="1200">
           <a:solidFill>
             <a:schemeClr val="tx1"/>
           </a:solidFill>
@@ -4080,7 +4376,7 @@
           <a:cs typeface="Arial"/>
         </a:defRPr>
       </a:lvl1pPr>
-      <a:lvl2pPr marL="344488" indent="-341313" algn="l" defTabSz="457200" rtl="0" eaLnBrk="1" latinLnBrk="0" hangingPunct="1">
+      <a:lvl2pPr marL="344488" indent="-341313" algn="l" defTabSz="457200" rtl="false" eaLnBrk="true" latinLnBrk="false" hangingPunct="true">
         <a:spcBef>
           <a:spcPct val="20000"/>
         </a:spcBef>
@@ -4092,7 +4388,7 @@
         <a:buBlip>
           <a:blip r:embed="rId13"/>
         </a:buBlip>
-        <a:defRPr sz="2200" b="0" i="0" kern="1200">
+        <a:defRPr sz="2200" b="false" i="false" kern="1200">
           <a:solidFill>
             <a:schemeClr val="tx1"/>
           </a:solidFill>
@@ -4101,7 +4397,7 @@
           <a:cs typeface="Arial"/>
         </a:defRPr>
       </a:lvl2pPr>
-      <a:lvl3pPr marL="625475" indent="-282575" algn="l" defTabSz="457200" rtl="0" eaLnBrk="1" latinLnBrk="0" hangingPunct="1">
+      <a:lvl3pPr marL="625475" indent="-282575" algn="l" defTabSz="457200" rtl="false" eaLnBrk="true" latinLnBrk="false" hangingPunct="true">
         <a:spcBef>
           <a:spcPct val="20000"/>
         </a:spcBef>
@@ -4110,7 +4406,7 @@
         </a:buClr>
         <a:buFont typeface="Wingdings" panose="05000000000000000000" pitchFamily="2" charset="2"/>
         <a:buChar char="Ø"/>
-        <a:defRPr sz="2000" b="0" i="0" kern="1200" baseline="0">
+        <a:defRPr sz="2000" b="false" i="false" kern="1200" baseline="0">
           <a:solidFill>
             <a:schemeClr val="tx1"/>
           </a:solidFill>
@@ -4119,7 +4415,7 @@
           <a:cs typeface="Arial"/>
         </a:defRPr>
       </a:lvl3pPr>
-      <a:lvl4pPr marL="914400" indent="-222250" algn="l" defTabSz="457200" rtl="0" eaLnBrk="1" latinLnBrk="0" hangingPunct="1">
+      <a:lvl4pPr marL="914400" indent="-222250" algn="l" defTabSz="457200" rtl="false" eaLnBrk="true" latinLnBrk="false" hangingPunct="true">
         <a:spcBef>
           <a:spcPct val="20000"/>
         </a:spcBef>
@@ -4128,7 +4424,7 @@
         </a:buClr>
         <a:buFont typeface="Arial" panose="020B0604020202020204" pitchFamily="34" charset="0"/>
         <a:buChar char="•"/>
-        <a:defRPr sz="1800" b="0" i="0" kern="1200">
+        <a:defRPr sz="1800" b="false" i="false" kern="1200">
           <a:solidFill>
             <a:schemeClr val="tx1"/>
           </a:solidFill>
@@ -4137,13 +4433,13 @@
           <a:cs typeface="Arial"/>
         </a:defRPr>
       </a:lvl4pPr>
-      <a:lvl5pPr marL="2057400" indent="-228600" algn="l" defTabSz="457200" rtl="0" eaLnBrk="1" latinLnBrk="0" hangingPunct="1">
+      <a:lvl5pPr marL="2057400" indent="-228600" algn="l" defTabSz="457200" rtl="false" eaLnBrk="true" latinLnBrk="false" hangingPunct="true">
         <a:spcBef>
           <a:spcPct val="20000"/>
         </a:spcBef>
         <a:buFont typeface="Arial"/>
         <a:buChar char="»"/>
-        <a:defRPr sz="1600" b="0" i="0" kern="1200">
+        <a:defRPr sz="1600" b="false" i="false" kern="1200">
           <a:solidFill>
             <a:srgbClr val="595A5D"/>
           </a:solidFill>
@@ -4152,7 +4448,7 @@
           <a:cs typeface="Arial"/>
         </a:defRPr>
       </a:lvl5pPr>
-      <a:lvl6pPr marL="2514600" indent="-228600" algn="l" defTabSz="457200" rtl="0" eaLnBrk="1" latinLnBrk="0" hangingPunct="1">
+      <a:lvl6pPr marL="2514600" indent="-228600" algn="l" defTabSz="457200" rtl="false" eaLnBrk="true" latinLnBrk="false" hangingPunct="true">
         <a:spcBef>
           <a:spcPct val="20000"/>
         </a:spcBef>
@@ -4167,7 +4463,7 @@
           <a:cs typeface="+mn-cs"/>
         </a:defRPr>
       </a:lvl6pPr>
-      <a:lvl7pPr marL="2971800" indent="-228600" algn="l" defTabSz="457200" rtl="0" eaLnBrk="1" latinLnBrk="0" hangingPunct="1">
+      <a:lvl7pPr marL="2971800" indent="-228600" algn="l" defTabSz="457200" rtl="false" eaLnBrk="true" latinLnBrk="false" hangingPunct="true">
         <a:spcBef>
           <a:spcPct val="20000"/>
         </a:spcBef>
@@ -4182,7 +4478,7 @@
           <a:cs typeface="+mn-cs"/>
         </a:defRPr>
       </a:lvl7pPr>
-      <a:lvl8pPr marL="3429000" indent="-228600" algn="l" defTabSz="457200" rtl="0" eaLnBrk="1" latinLnBrk="0" hangingPunct="1">
+      <a:lvl8pPr marL="3429000" indent="-228600" algn="l" defTabSz="457200" rtl="false" eaLnBrk="true" latinLnBrk="false" hangingPunct="true">
         <a:spcBef>
           <a:spcPct val="20000"/>
         </a:spcBef>
@@ -4197,7 +4493,7 @@
           <a:cs typeface="+mn-cs"/>
         </a:defRPr>
       </a:lvl8pPr>
-      <a:lvl9pPr marL="3886200" indent="-228600" algn="l" defTabSz="457200" rtl="0" eaLnBrk="1" latinLnBrk="0" hangingPunct="1">
+      <a:lvl9pPr marL="3886200" indent="-228600" algn="l" defTabSz="457200" rtl="false" eaLnBrk="true" latinLnBrk="false" hangingPunct="true">
         <a:spcBef>
           <a:spcPct val="20000"/>
         </a:spcBef>
@@ -4217,7 +4513,7 @@
       <a:defPPr>
         <a:defRPr lang="en-US"/>
       </a:defPPr>
-      <a:lvl1pPr marL="0" algn="l" defTabSz="457200" rtl="0" eaLnBrk="1" latinLnBrk="0" hangingPunct="1">
+      <a:lvl1pPr marL="0" algn="l" defTabSz="457200" rtl="false" eaLnBrk="true" latinLnBrk="false" hangingPunct="true">
         <a:defRPr sz="1800" kern="1200">
           <a:solidFill>
             <a:schemeClr val="tx1"/>
@@ -4227,7 +4523,7 @@
           <a:cs typeface="+mn-cs"/>
         </a:defRPr>
       </a:lvl1pPr>
-      <a:lvl2pPr marL="457200" algn="l" defTabSz="457200" rtl="0" eaLnBrk="1" latinLnBrk="0" hangingPunct="1">
+      <a:lvl2pPr marL="457200" algn="l" defTabSz="457200" rtl="false" eaLnBrk="true" latinLnBrk="false" hangingPunct="true">
         <a:defRPr sz="1800" kern="1200">
           <a:solidFill>
             <a:schemeClr val="tx1"/>
@@ -4237,7 +4533,7 @@
           <a:cs typeface="+mn-cs"/>
         </a:defRPr>
       </a:lvl2pPr>
-      <a:lvl3pPr marL="914400" algn="l" defTabSz="457200" rtl="0" eaLnBrk="1" latinLnBrk="0" hangingPunct="1">
+      <a:lvl3pPr marL="914400" algn="l" defTabSz="457200" rtl="false" eaLnBrk="true" latinLnBrk="false" hangingPunct="true">
         <a:defRPr sz="1800" kern="1200">
           <a:solidFill>
             <a:schemeClr val="tx1"/>
@@ -4247,7 +4543,7 @@
           <a:cs typeface="+mn-cs"/>
         </a:defRPr>
       </a:lvl3pPr>
-      <a:lvl4pPr marL="1371600" algn="l" defTabSz="457200" rtl="0" eaLnBrk="1" latinLnBrk="0" hangingPunct="1">
+      <a:lvl4pPr marL="1371600" algn="l" defTabSz="457200" rtl="false" eaLnBrk="true" latinLnBrk="false" hangingPunct="true">
         <a:defRPr sz="1800" kern="1200">
           <a:solidFill>
             <a:schemeClr val="tx1"/>
@@ -4257,7 +4553,7 @@
           <a:cs typeface="+mn-cs"/>
         </a:defRPr>
       </a:lvl4pPr>
-      <a:lvl5pPr marL="1828800" algn="l" defTabSz="457200" rtl="0" eaLnBrk="1" latinLnBrk="0" hangingPunct="1">
+      <a:lvl5pPr marL="1828800" algn="l" defTabSz="457200" rtl="false" eaLnBrk="true" latinLnBrk="false" hangingPunct="true">
         <a:defRPr sz="1800" kern="1200">
           <a:solidFill>
             <a:schemeClr val="tx1"/>
@@ -4267,7 +4563,7 @@
           <a:cs typeface="+mn-cs"/>
         </a:defRPr>
       </a:lvl5pPr>
-      <a:lvl6pPr marL="2286000" algn="l" defTabSz="457200" rtl="0" eaLnBrk="1" latinLnBrk="0" hangingPunct="1">
+      <a:lvl6pPr marL="2286000" algn="l" defTabSz="457200" rtl="false" eaLnBrk="true" latinLnBrk="false" hangingPunct="true">
         <a:defRPr sz="1800" kern="1200">
           <a:solidFill>
             <a:schemeClr val="tx1"/>
@@ -4277,7 +4573,7 @@
           <a:cs typeface="+mn-cs"/>
         </a:defRPr>
       </a:lvl6pPr>
-      <a:lvl7pPr marL="2743200" algn="l" defTabSz="457200" rtl="0" eaLnBrk="1" latinLnBrk="0" hangingPunct="1">
+      <a:lvl7pPr marL="2743200" algn="l" defTabSz="457200" rtl="false" eaLnBrk="true" latinLnBrk="false" hangingPunct="true">
         <a:defRPr sz="1800" kern="1200">
           <a:solidFill>
             <a:schemeClr val="tx1"/>
@@ -4287,7 +4583,7 @@
           <a:cs typeface="+mn-cs"/>
         </a:defRPr>
       </a:lvl7pPr>
-      <a:lvl8pPr marL="3200400" algn="l" defTabSz="457200" rtl="0" eaLnBrk="1" latinLnBrk="0" hangingPunct="1">
+      <a:lvl8pPr marL="3200400" algn="l" defTabSz="457200" rtl="false" eaLnBrk="true" latinLnBrk="false" hangingPunct="true">
         <a:defRPr sz="1800" kern="1200">
           <a:solidFill>
             <a:schemeClr val="tx1"/>
@@ -4297,7 +4593,7 @@
           <a:cs typeface="+mn-cs"/>
         </a:defRPr>
       </a:lvl8pPr>
-      <a:lvl9pPr marL="3657600" algn="l" defTabSz="457200" rtl="0" eaLnBrk="1" latinLnBrk="0" hangingPunct="1">
+      <a:lvl9pPr marL="3657600" algn="l" defTabSz="457200" rtl="false" eaLnBrk="true" latinLnBrk="false" hangingPunct="true">
         <a:defRPr sz="1800" kern="1200">
           <a:solidFill>
             <a:schemeClr val="tx1"/>
@@ -4309,7 +4605,7 @@
       </a:lvl9pPr>
     </p:otherStyle>
   </p:txStyles>
-  <p:extLst mod="1">
+  <p:extLst mod="true">
     <p:ext uri="{27BBF7A9-308A-43DC-89C8-2F10F3537804}">
       <p15:sldGuideLst xmlns:p15="http://schemas.microsoft.com/office/powerpoint/2012/main">
         <p15:guide id="1" orient="horz" pos="1620" userDrawn="1">
@@ -4329,7 +4625,7 @@
 </file>
 
 <file path=ppt/slides/slide1.xml><?xml version="1.0" encoding="utf-8"?>
-<p:sld xmlns:a="http://schemas.openxmlformats.org/drawingml/2006/main" xmlns:r="http://schemas.openxmlformats.org/officeDocument/2006/relationships" xmlns:p="http://schemas.openxmlformats.org/presentationml/2006/main">
+<p:sld xmlns:r="http://schemas.openxmlformats.org/officeDocument/2006/relationships" xmlns:a="http://schemas.openxmlformats.org/drawingml/2006/main" xmlns:p="http://schemas.openxmlformats.org/presentationml/2006/main" xmlns:mc="http://schemas.openxmlformats.org/markup-compatibility/2006" xmlns:c="http://schemas.openxmlformats.org/drawingml/2006/chart" xmlns:ns6="http://schemas.openxmlformats.org/drawingml/2006/chartDrawing" xmlns:dgm="http://schemas.openxmlformats.org/drawingml/2006/diagram" xmlns:pic="http://schemas.openxmlformats.org/drawingml/2006/picture" xmlns:wp="http://schemas.openxmlformats.org/drawingml/2006/wordprocessingDrawing" xmlns:wp14="http://schemas.microsoft.com/office/word/2010/wordprocessingDrawing" xmlns:xdr="http://schemas.openxmlformats.org/drawingml/2006/spreadsheetDrawing" xmlns:ns12="http://schemas.openxmlformats.org/drawingml/2006/compatibility" xmlns:ns13="http://schemas.openxmlformats.org/drawingml/2006/lockedCanvas" xmlns:v="urn:schemas-microsoft-com:vml">
   <p:cSld>
     <p:spTree>
       <p:nvGrpSpPr>
@@ -4349,7 +4645,7 @@
         <p:nvSpPr>
           <p:cNvPr id="2" name="Title 1"/>
           <p:cNvSpPr>
-            <a:spLocks noGrp="1"/>
+            <a:spLocks noGrp="true"/>
           </p:cNvSpPr>
           <p:nvPr>
             <p:ph type="title"/>
@@ -4361,10 +4657,10 @@
           <a:lstStyle/>
           <a:p>
             <a:r>
-              <a:rPr lang="en-US" dirty="0" smtClean="0"/>
+              <a:rPr lang="en-US" dirty="false" smtClean="false"/>
               <a:t>Module 01: Core AWS Knowledge</a:t>
             </a:r>
-            <a:endParaRPr lang="en-US" dirty="0"/>
+            <a:endParaRPr lang="en-US" dirty="false"/>
           </a:p>
         </p:txBody>
       </p:sp>
@@ -4389,7 +4685,7 @@
 </file>
 
 <file path=ppt/slides/slide2.xml><?xml version="1.0" encoding="utf-8"?>
-<p:sld xmlns:a="http://schemas.openxmlformats.org/drawingml/2006/main" xmlns:r="http://schemas.openxmlformats.org/officeDocument/2006/relationships" xmlns:p="http://schemas.openxmlformats.org/presentationml/2006/main">
+<p:sld xmlns:r="http://schemas.openxmlformats.org/officeDocument/2006/relationships" xmlns:a="http://schemas.openxmlformats.org/drawingml/2006/main" xmlns:p="http://schemas.openxmlformats.org/presentationml/2006/main" xmlns:mc="http://schemas.openxmlformats.org/markup-compatibility/2006" xmlns:c="http://schemas.openxmlformats.org/drawingml/2006/chart" xmlns:ns6="http://schemas.openxmlformats.org/drawingml/2006/chartDrawing" xmlns:dgm="http://schemas.openxmlformats.org/drawingml/2006/diagram" xmlns:pic="http://schemas.openxmlformats.org/drawingml/2006/picture" xmlns:wp="http://schemas.openxmlformats.org/drawingml/2006/wordprocessingDrawing" xmlns:wp14="http://schemas.microsoft.com/office/word/2010/wordprocessingDrawing" xmlns:xdr="http://schemas.openxmlformats.org/drawingml/2006/spreadsheetDrawing" xmlns:ns12="http://schemas.openxmlformats.org/drawingml/2006/compatibility" xmlns:ns13="http://schemas.openxmlformats.org/drawingml/2006/lockedCanvas" xmlns:v="urn:schemas-microsoft-com:vml">
   <p:cSld>
     <p:spTree>
       <p:nvGrpSpPr>
@@ -4409,7 +4705,7 @@
         <p:nvSpPr>
           <p:cNvPr id="4" name="Title 3"/>
           <p:cNvSpPr>
-            <a:spLocks noGrp="1"/>
+            <a:spLocks noGrp="true"/>
           </p:cNvSpPr>
           <p:nvPr>
             <p:ph type="title"/>
@@ -4424,7 +4720,7 @@
               <a:rPr lang="en-US"/>
               <a:t>What Exactly Is Cloud Computing ?</a:t>
             </a:r>
-            <a:endParaRPr lang="en-US" dirty="0"/>
+            <a:endParaRPr lang="en-US" dirty="false"/>
           </a:p>
         </p:txBody>
       </p:sp>
@@ -4432,7 +4728,7 @@
         <p:nvSpPr>
           <p:cNvPr id="7" name="Content Placeholder 6"/>
           <p:cNvSpPr>
-            <a:spLocks noGrp="1"/>
+            <a:spLocks noGrp="true"/>
           </p:cNvSpPr>
           <p:nvPr>
             <p:ph idx="1"/>
@@ -4449,40 +4745,40 @@
           <a:lstStyle/>
           <a:p>
             <a:r>
-              <a:rPr lang="en-US" sz="2000" dirty="0" smtClean="0"/>
+              <a:rPr lang="en-US" sz="2000" dirty="false" smtClean="false"/>
               <a:t>"Cloud computing" is a term broadly used to define the </a:t>
             </a:r>
             <a:r>
-              <a:rPr lang="en-US" sz="2000" b="1" i="1" dirty="0" smtClean="0"/>
+              <a:rPr lang="en-US" sz="2000" b="true" i="true" dirty="false" smtClean="false"/>
               <a:t>on-demand</a:t>
             </a:r>
             <a:r>
-              <a:rPr lang="en-US" sz="2000" i="1" dirty="0" smtClean="0"/>
+              <a:rPr lang="en-US" sz="2000" i="true" dirty="false" smtClean="false"/>
               <a:t> </a:t>
             </a:r>
             <a:r>
-              <a:rPr lang="en-US" sz="2000" dirty="0" smtClean="0"/>
+              <a:rPr lang="en-US" sz="2000" dirty="false" smtClean="false"/>
               <a:t>delivery of IT resources and applications </a:t>
             </a:r>
             <a:r>
-              <a:rPr lang="en-US" sz="2000" b="1" i="1" dirty="0" smtClean="0"/>
+              <a:rPr lang="en-US" sz="2000" b="true" i="true" dirty="false" smtClean="false"/>
               <a:t>via the Internet</a:t>
             </a:r>
             <a:r>
-              <a:rPr lang="en-US" sz="2000" dirty="0" smtClean="0"/>
+              <a:rPr lang="en-US" sz="2000" dirty="false" smtClean="false"/>
               <a:t>, with </a:t>
             </a:r>
             <a:r>
-              <a:rPr lang="en-US" sz="2000" b="1" i="1" dirty="0" smtClean="0"/>
+              <a:rPr lang="en-US" sz="2000" b="true" i="true" dirty="false" smtClean="false"/>
               <a:t>pay-as-you-go</a:t>
             </a:r>
             <a:r>
-              <a:rPr lang="en-US" sz="2000" dirty="0" smtClean="0"/>
+              <a:rPr lang="en-US" sz="2000" dirty="false" smtClean="false"/>
               <a:t> pricing.</a:t>
             </a:r>
           </a:p>
           <a:p>
-            <a:endParaRPr lang="en-US" dirty="0"/>
+            <a:endParaRPr lang="en-US" dirty="false"/>
           </a:p>
         </p:txBody>
       </p:sp>
@@ -4490,7 +4786,7 @@
         <p:nvPicPr>
           <p:cNvPr id="3" name="Picture 5"/>
           <p:cNvPicPr>
-            <a:picLocks noChangeAspect="1"/>
+            <a:picLocks noChangeAspect="true"/>
           </p:cNvPicPr>
           <p:nvPr/>
         </p:nvPicPr>

</xml_diff>

<commit_message>
FIX Refactor to packages and for sonarlint errorsÃ
</commit_message>
<xml_diff>
--- a/sample-docs/pptx-copy.pptx
+++ b/sample-docs/pptx-copy.pptx
@@ -462,7 +462,7 @@
 </file>
 
 <file path=ppt/notesSlides/notesSlide1.xml><?xml version="1.0" encoding="utf-8"?>
-<p:notes xmlns:a="http://schemas.openxmlformats.org/drawingml/2006/main" xmlns:r="http://schemas.openxmlformats.org/officeDocument/2006/relationships" xmlns:p="http://schemas.openxmlformats.org/presentationml/2006/main">
+<p:notes xmlns:a="http://schemas.openxmlformats.org/drawingml/2006/main" xmlns:r="http://schemas.openxmlformats.org/officeDocument/2006/relationships" xmlns:p="http://schemas.openxmlformats.org/presentationml/2006/main" xmlns:mc="http://schemas.openxmlformats.org/markup-compatibility/2006" xmlns:c="http://schemas.openxmlformats.org/drawingml/2006/chart" xmlns:ns6="http://schemas.openxmlformats.org/drawingml/2006/chartDrawing" xmlns:dgm="http://schemas.openxmlformats.org/drawingml/2006/diagram" xmlns:pic="http://schemas.openxmlformats.org/drawingml/2006/picture" xmlns:wp="http://schemas.openxmlformats.org/drawingml/2006/wordprocessingDrawing" xmlns:wp14="http://schemas.microsoft.com/office/word/2010/wordprocessingDrawing" xmlns:xdr="http://schemas.openxmlformats.org/drawingml/2006/spreadsheetDrawing" xmlns:ns12="http://schemas.openxmlformats.org/drawingml/2006/compatibility" xmlns:ns13="http://schemas.openxmlformats.org/drawingml/2006/lockedCanvas">
   <p:cSld>
     <p:spTree>
       <p:nvGrpSpPr>
@@ -482,7 +482,7 @@
         <p:nvSpPr>
           <p:cNvPr id="2" name="Espace réservé de l'image des diapositives 1"/>
           <p:cNvSpPr>
-            <a:spLocks noGrp="1" noRot="1" noChangeAspect="1"/>
+            <a:spLocks noGrp="true" noRot="true" noChangeAspect="true"/>
           </p:cNvSpPr>
           <p:nvPr>
             <p:ph type="sldImg"/>
@@ -494,7 +494,7 @@
         <p:nvSpPr>
           <p:cNvPr id="3" name="Espace réservé des commentaires 2"/>
           <p:cNvSpPr>
-            <a:spLocks noGrp="1"/>
+            <a:spLocks noGrp="true"/>
           </p:cNvSpPr>
           <p:nvPr>
             <p:ph type="body" idx="1"/>
@@ -506,192 +506,53 @@
           <a:lstStyle/>
           <a:p>
             <a:r>
-              <a:rPr lang="fr-FR" dirty="0" smtClean="0"/>
-              <a:t>Begin of comment </a:t>
-            </a:r>
-            <a:r>
-              <a:rPr lang="fr-FR" dirty="0" err="1" smtClean="0"/>
-              <a:t>from</a:t>
-            </a:r>
-            <a:r>
-              <a:rPr lang="fr-FR" dirty="0" smtClean="0"/>
-              <a:t> slide 1</a:t>
-            </a:r>
-          </a:p>
-          <a:p>
-            <a:r>
-              <a:rPr lang="fr-FR" dirty="0" smtClean="0"/>
-              <a:t>Copy </a:t>
-            </a:r>
-            <a:r>
-              <a:rPr lang="fr-FR" dirty="0" err="1" smtClean="0"/>
-              <a:t>copy</a:t>
-            </a:r>
-            <a:r>
-              <a:rPr lang="fr-FR" dirty="0" smtClean="0"/>
-              <a:t> </a:t>
-            </a:r>
-            <a:r>
-              <a:rPr lang="fr-FR" dirty="0" err="1" smtClean="0"/>
-              <a:t>copy</a:t>
-            </a:r>
-            <a:r>
-              <a:rPr lang="fr-FR" dirty="0" smtClean="0"/>
-              <a:t> </a:t>
-            </a:r>
-            <a:r>
-              <a:rPr lang="fr-FR" dirty="0" err="1" smtClean="0"/>
-              <a:t>copy</a:t>
-            </a:r>
-            <a:r>
-              <a:rPr lang="fr-FR" dirty="0" smtClean="0"/>
-              <a:t> </a:t>
-            </a:r>
-            <a:r>
-              <a:rPr lang="fr-FR" dirty="0" err="1" smtClean="0"/>
-              <a:t>copy</a:t>
-            </a:r>
-            <a:r>
-              <a:rPr lang="fr-FR" dirty="0" smtClean="0"/>
-              <a:t> </a:t>
-            </a:r>
-            <a:r>
-              <a:rPr lang="fr-FR" dirty="0" err="1" smtClean="0"/>
-              <a:t>Copy</a:t>
-            </a:r>
-            <a:r>
-              <a:rPr lang="fr-FR" dirty="0" smtClean="0"/>
-              <a:t> </a:t>
-            </a:r>
-            <a:r>
-              <a:rPr lang="fr-FR" dirty="0" err="1" smtClean="0"/>
-              <a:t>copy</a:t>
-            </a:r>
-            <a:r>
-              <a:rPr lang="fr-FR" dirty="0" smtClean="0"/>
-              <a:t> </a:t>
-            </a:r>
-            <a:r>
-              <a:rPr lang="fr-FR" dirty="0" err="1" smtClean="0"/>
-              <a:t>copy</a:t>
-            </a:r>
-            <a:r>
-              <a:rPr lang="fr-FR" dirty="0" smtClean="0"/>
-              <a:t> </a:t>
-            </a:r>
-            <a:r>
-              <a:rPr lang="fr-FR" dirty="0" err="1" smtClean="0"/>
-              <a:t>copy</a:t>
-            </a:r>
-            <a:r>
-              <a:rPr lang="fr-FR" dirty="0" smtClean="0"/>
-              <a:t> </a:t>
-            </a:r>
-            <a:r>
-              <a:rPr lang="fr-FR" dirty="0" err="1" smtClean="0"/>
-              <a:t>copy</a:t>
-            </a:r>
-            <a:r>
-              <a:rPr lang="fr-FR" dirty="0" smtClean="0"/>
-              <a:t> </a:t>
-            </a:r>
-            <a:r>
-              <a:rPr lang="fr-FR" dirty="0" err="1" smtClean="0"/>
-              <a:t>Copy</a:t>
-            </a:r>
-            <a:r>
-              <a:rPr lang="fr-FR" dirty="0" smtClean="0"/>
-              <a:t> </a:t>
-            </a:r>
-            <a:r>
-              <a:rPr lang="fr-FR" dirty="0" err="1" smtClean="0"/>
-              <a:t>copy</a:t>
-            </a:r>
-            <a:r>
-              <a:rPr lang="fr-FR" dirty="0" smtClean="0"/>
-              <a:t> </a:t>
-            </a:r>
-            <a:r>
-              <a:rPr lang="fr-FR" dirty="0" err="1" smtClean="0"/>
-              <a:t>copy</a:t>
-            </a:r>
-            <a:r>
-              <a:rPr lang="fr-FR" dirty="0" smtClean="0"/>
-              <a:t> </a:t>
-            </a:r>
-            <a:r>
-              <a:rPr lang="fr-FR" dirty="0" err="1" smtClean="0"/>
-              <a:t>copy</a:t>
-            </a:r>
-            <a:r>
-              <a:rPr lang="fr-FR" dirty="0" smtClean="0"/>
-              <a:t> </a:t>
-            </a:r>
-            <a:r>
-              <a:rPr lang="fr-FR" dirty="0" err="1" smtClean="0"/>
-              <a:t>copy</a:t>
-            </a:r>
-            <a:r>
-              <a:rPr lang="fr-FR" dirty="0" smtClean="0"/>
-              <a:t> </a:t>
-            </a:r>
-            <a:r>
-              <a:rPr lang="fr-FR" dirty="0" err="1" smtClean="0"/>
-              <a:t>Copy</a:t>
-            </a:r>
-            <a:r>
-              <a:rPr lang="fr-FR" dirty="0" smtClean="0"/>
-              <a:t> </a:t>
-            </a:r>
-            <a:r>
-              <a:rPr lang="fr-FR" dirty="0" err="1" smtClean="0"/>
-              <a:t>copy</a:t>
-            </a:r>
-            <a:r>
-              <a:rPr lang="fr-FR" dirty="0" smtClean="0"/>
-              <a:t> </a:t>
-            </a:r>
-            <a:r>
-              <a:rPr lang="fr-FR" dirty="0" err="1" smtClean="0"/>
-              <a:t>copy</a:t>
-            </a:r>
-            <a:r>
-              <a:rPr lang="fr-FR" dirty="0" smtClean="0"/>
-              <a:t> </a:t>
-            </a:r>
-            <a:r>
-              <a:rPr lang="fr-FR" dirty="0" err="1" smtClean="0"/>
-              <a:t>copy</a:t>
-            </a:r>
-            <a:r>
-              <a:rPr lang="fr-FR" dirty="0" smtClean="0"/>
-              <a:t> </a:t>
-            </a:r>
-            <a:r>
-              <a:rPr lang="fr-FR" dirty="0" err="1" smtClean="0"/>
-              <a:t>copy</a:t>
-            </a:r>
-            <a:r>
-              <a:rPr lang="fr-FR" dirty="0" smtClean="0"/>
-              <a:t> </a:t>
-            </a:r>
-          </a:p>
-          <a:p>
-            <a:r>
-              <a:rPr lang="fr-FR" dirty="0" smtClean="0"/>
-              <a:t>End of comment </a:t>
-            </a:r>
-            <a:r>
-              <a:rPr lang="fr-FR" dirty="0" err="1" smtClean="0"/>
-              <a:t>from</a:t>
-            </a:r>
-            <a:r>
-              <a:rPr lang="fr-FR" dirty="0" smtClean="0"/>
-              <a:t> slide 1</a:t>
-            </a:r>
-          </a:p>
-          <a:p>
-            <a:endParaRPr lang="fr-FR" dirty="0"/>
+              <a:t>Begin of comment from slide 1</a:t>
+            </a:r>
+          </a:p>
+          <a:p>
+            <a:r>
+              <a:t>Lorem ipsum dolor sit amet, consectetur adipiscing elit. Pellentesque porta sed tellus volutpat sed.</a:t>
+            </a:r>
+          </a:p>
+          <a:p>
+            <a:r>
+              <a:t>End of comment from slide 1</a:t>
+            </a:r>
+          </a:p>
+          <a:p>
+            <a:r>
+              <a:t/>
+            </a:r>
+          </a:p>
+          <a:p>
+            <a:r>
+              <a:t>=== Original comments from ./sample-docs/pptx-copy.pptx===</a:t>
+            </a:r>
+          </a:p>
+          <a:p>
+            <a:r>
+              <a:t>Begin of comment from slide 1</a:t>
+            </a:r>
+          </a:p>
+          <a:p>
+            <a:r>
+              <a:t>Copy copy copy copy copy Copy copy copy copy copy Copy copy copy copy copy Copy copy copy copy copy </a:t>
+            </a:r>
+          </a:p>
+          <a:p>
+            <a:r>
+              <a:t>End of comment from slide 1</a:t>
+            </a:r>
+          </a:p>
+          <a:p>
+            <a:r>
+              <a:t/>
+            </a:r>
+          </a:p>
+          <a:p>
+            <a:r>
+              <a:t/>
+            </a:r>
           </a:p>
         </p:txBody>
       </p:sp>
@@ -699,7 +560,7 @@
         <p:nvSpPr>
           <p:cNvPr id="4" name="Espace réservé du numéro de diapositive 3"/>
           <p:cNvSpPr>
-            <a:spLocks noGrp="1"/>
+            <a:spLocks noGrp="true"/>
           </p:cNvSpPr>
           <p:nvPr>
             <p:ph type="sldNum" sz="quarter" idx="10"/>
@@ -710,10 +571,63 @@
           <a:bodyPr/>
           <a:lstStyle/>
           <a:p>
-            <a:fld id="{D087CDC4-FBA2-44CE-A15A-CFDDF7DA6987}" type="slidenum">
-              <a:rPr lang="fr-FR" smtClean="0"/>
-              <a:t>1</a:t>
-            </a:fld>
+            <a:r>
+              <a:t>Begin of comment from slide 1</a:t>
+            </a:r>
+            <a:endParaRPr lang="fr-FR"/>
+          </a:p>
+          <a:p>
+            <a:r>
+              <a:t>Lorem ipsum dolor sit amet, consectetur adipiscing elit. Pellentesque porta sed tellus volutpat sed.</a:t>
+            </a:r>
+            <a:endParaRPr lang="fr-FR"/>
+          </a:p>
+          <a:p>
+            <a:r>
+              <a:t>End of comment from slide 1</a:t>
+            </a:r>
+            <a:endParaRPr lang="fr-FR"/>
+          </a:p>
+          <a:p>
+            <a:r>
+              <a:t/>
+            </a:r>
+            <a:endParaRPr lang="fr-FR"/>
+          </a:p>
+          <a:p>
+            <a:r>
+              <a:t>=== Original comments from ./sample-docs/pptx-copy.pptx===</a:t>
+            </a:r>
+            <a:endParaRPr lang="fr-FR"/>
+          </a:p>
+          <a:p>
+            <a:r>
+              <a:t>Begin of comment from slide 1</a:t>
+            </a:r>
+            <a:endParaRPr lang="fr-FR"/>
+          </a:p>
+          <a:p>
+            <a:r>
+              <a:t>Copy copy copy copy copy Copy copy copy copy copy Copy copy copy copy copy Copy copy copy copy copy </a:t>
+            </a:r>
+            <a:endParaRPr lang="fr-FR"/>
+          </a:p>
+          <a:p>
+            <a:r>
+              <a:t>End of comment from slide 1</a:t>
+            </a:r>
+            <a:endParaRPr lang="fr-FR"/>
+          </a:p>
+          <a:p>
+            <a:r>
+              <a:t/>
+            </a:r>
+            <a:endParaRPr lang="fr-FR"/>
+          </a:p>
+          <a:p>
+            <a:r>
+              <a:t/>
+            </a:r>
             <a:endParaRPr lang="fr-FR"/>
           </a:p>
         </p:txBody>
@@ -732,7 +646,7 @@
 </file>
 
 <file path=ppt/notesSlides/notesSlide2.xml><?xml version="1.0" encoding="utf-8"?>
-<p:notes xmlns:a="http://schemas.openxmlformats.org/drawingml/2006/main" xmlns:r="http://schemas.openxmlformats.org/officeDocument/2006/relationships" xmlns:p="http://schemas.openxmlformats.org/presentationml/2006/main">
+<p:notes xmlns:a="http://schemas.openxmlformats.org/drawingml/2006/main" xmlns:r="http://schemas.openxmlformats.org/officeDocument/2006/relationships" xmlns:p="http://schemas.openxmlformats.org/presentationml/2006/main" xmlns:mc="http://schemas.openxmlformats.org/markup-compatibility/2006" xmlns:c="http://schemas.openxmlformats.org/drawingml/2006/chart" xmlns:ns6="http://schemas.openxmlformats.org/drawingml/2006/chartDrawing" xmlns:dgm="http://schemas.openxmlformats.org/drawingml/2006/diagram" xmlns:pic="http://schemas.openxmlformats.org/drawingml/2006/picture" xmlns:wp="http://schemas.openxmlformats.org/drawingml/2006/wordprocessingDrawing" xmlns:wp14="http://schemas.microsoft.com/office/word/2010/wordprocessingDrawing" xmlns:xdr="http://schemas.openxmlformats.org/drawingml/2006/spreadsheetDrawing" xmlns:ns12="http://schemas.openxmlformats.org/drawingml/2006/compatibility" xmlns:ns13="http://schemas.openxmlformats.org/drawingml/2006/lockedCanvas">
   <p:cSld>
     <p:spTree>
       <p:nvGrpSpPr>
@@ -752,7 +666,7 @@
         <p:nvSpPr>
           <p:cNvPr id="2" name="Espace réservé de l'image des diapositives 1"/>
           <p:cNvSpPr>
-            <a:spLocks noGrp="1" noRot="1" noChangeAspect="1"/>
+            <a:spLocks noGrp="true" noRot="true" noChangeAspect="true"/>
           </p:cNvSpPr>
           <p:nvPr>
             <p:ph type="sldImg"/>
@@ -764,7 +678,7 @@
         <p:nvSpPr>
           <p:cNvPr id="3" name="Espace réservé des commentaires 2"/>
           <p:cNvSpPr>
-            <a:spLocks noGrp="1"/>
+            <a:spLocks noGrp="true"/>
           </p:cNvSpPr>
           <p:nvPr>
             <p:ph type="body" idx="1"/>
@@ -776,176 +690,53 @@
           <a:lstStyle/>
           <a:p>
             <a:r>
-              <a:rPr lang="fr-FR" dirty="0" smtClean="0"/>
               <a:t>Begin of comment slide 2</a:t>
             </a:r>
           </a:p>
           <a:p>
             <a:r>
-              <a:rPr lang="fr-FR" dirty="0" smtClean="0"/>
-              <a:t>Copy </a:t>
-            </a:r>
-            <a:r>
-              <a:rPr lang="fr-FR" dirty="0" err="1" smtClean="0"/>
-              <a:t>copy</a:t>
-            </a:r>
-            <a:r>
-              <a:rPr lang="fr-FR" dirty="0" smtClean="0"/>
-              <a:t> </a:t>
-            </a:r>
-            <a:r>
-              <a:rPr lang="fr-FR" dirty="0" err="1" smtClean="0"/>
-              <a:t>copy</a:t>
-            </a:r>
-            <a:r>
-              <a:rPr lang="fr-FR" dirty="0" smtClean="0"/>
-              <a:t> </a:t>
-            </a:r>
-            <a:r>
-              <a:rPr lang="fr-FR" dirty="0" err="1" smtClean="0"/>
-              <a:t>copy</a:t>
-            </a:r>
-            <a:r>
-              <a:rPr lang="fr-FR" dirty="0" smtClean="0"/>
-              <a:t> </a:t>
-            </a:r>
-            <a:r>
-              <a:rPr lang="fr-FR" dirty="0" err="1" smtClean="0"/>
-              <a:t>copy</a:t>
-            </a:r>
-            <a:r>
-              <a:rPr lang="fr-FR" dirty="0" smtClean="0"/>
-              <a:t> </a:t>
-            </a:r>
-            <a:r>
-              <a:rPr lang="fr-FR" dirty="0" err="1" smtClean="0"/>
-              <a:t>Copy</a:t>
-            </a:r>
-            <a:r>
-              <a:rPr lang="fr-FR" dirty="0" smtClean="0"/>
-              <a:t> </a:t>
-            </a:r>
-            <a:r>
-              <a:rPr lang="fr-FR" dirty="0" err="1" smtClean="0"/>
-              <a:t>copy</a:t>
-            </a:r>
-            <a:r>
-              <a:rPr lang="fr-FR" dirty="0" smtClean="0"/>
-              <a:t> </a:t>
-            </a:r>
-            <a:r>
-              <a:rPr lang="fr-FR" dirty="0" err="1" smtClean="0"/>
-              <a:t>copy</a:t>
-            </a:r>
-            <a:r>
-              <a:rPr lang="fr-FR" dirty="0" smtClean="0"/>
-              <a:t> </a:t>
-            </a:r>
-            <a:r>
-              <a:rPr lang="fr-FR" dirty="0" err="1" smtClean="0"/>
-              <a:t>copy</a:t>
-            </a:r>
-            <a:r>
-              <a:rPr lang="fr-FR" dirty="0" smtClean="0"/>
-              <a:t> </a:t>
-            </a:r>
-            <a:r>
-              <a:rPr lang="fr-FR" dirty="0" err="1" smtClean="0"/>
-              <a:t>copy</a:t>
-            </a:r>
-            <a:r>
-              <a:rPr lang="fr-FR" dirty="0" smtClean="0"/>
-              <a:t> </a:t>
-            </a:r>
-            <a:r>
-              <a:rPr lang="fr-FR" dirty="0" err="1" smtClean="0"/>
-              <a:t>Copy</a:t>
-            </a:r>
-            <a:r>
-              <a:rPr lang="fr-FR" dirty="0" smtClean="0"/>
-              <a:t> </a:t>
-            </a:r>
-            <a:r>
-              <a:rPr lang="fr-FR" dirty="0" err="1" smtClean="0"/>
-              <a:t>copy</a:t>
-            </a:r>
-            <a:r>
-              <a:rPr lang="fr-FR" dirty="0" smtClean="0"/>
-              <a:t> </a:t>
-            </a:r>
-            <a:r>
-              <a:rPr lang="fr-FR" dirty="0" err="1" smtClean="0"/>
-              <a:t>copy</a:t>
-            </a:r>
-            <a:r>
-              <a:rPr lang="fr-FR" dirty="0" smtClean="0"/>
-              <a:t> </a:t>
-            </a:r>
-            <a:r>
-              <a:rPr lang="fr-FR" dirty="0" err="1" smtClean="0"/>
-              <a:t>copy</a:t>
-            </a:r>
-            <a:r>
-              <a:rPr lang="fr-FR" dirty="0" smtClean="0"/>
-              <a:t> </a:t>
-            </a:r>
-            <a:r>
-              <a:rPr lang="fr-FR" dirty="0" err="1" smtClean="0"/>
-              <a:t>copy</a:t>
-            </a:r>
-            <a:r>
-              <a:rPr lang="fr-FR" dirty="0" smtClean="0"/>
-              <a:t> </a:t>
-            </a:r>
-            <a:r>
-              <a:rPr lang="fr-FR" dirty="0" err="1" smtClean="0"/>
-              <a:t>Copy</a:t>
-            </a:r>
-            <a:r>
-              <a:rPr lang="fr-FR" dirty="0" smtClean="0"/>
-              <a:t> </a:t>
-            </a:r>
-            <a:r>
-              <a:rPr lang="fr-FR" dirty="0" err="1" smtClean="0"/>
-              <a:t>copy</a:t>
-            </a:r>
-            <a:r>
-              <a:rPr lang="fr-FR" dirty="0" smtClean="0"/>
-              <a:t> </a:t>
-            </a:r>
-            <a:r>
-              <a:rPr lang="fr-FR" dirty="0" err="1" smtClean="0"/>
-              <a:t>copy</a:t>
-            </a:r>
-            <a:r>
-              <a:rPr lang="fr-FR" dirty="0" smtClean="0"/>
-              <a:t> </a:t>
-            </a:r>
-            <a:r>
-              <a:rPr lang="fr-FR" dirty="0" err="1" smtClean="0"/>
-              <a:t>copy</a:t>
-            </a:r>
-            <a:r>
-              <a:rPr lang="fr-FR" dirty="0" smtClean="0"/>
-              <a:t> </a:t>
-            </a:r>
-            <a:r>
-              <a:rPr lang="fr-FR" dirty="0" err="1" smtClean="0"/>
-              <a:t>copy</a:t>
-            </a:r>
-            <a:r>
-              <a:rPr lang="fr-FR" dirty="0" smtClean="0"/>
-              <a:t> </a:t>
-            </a:r>
-          </a:p>
-          <a:p>
-            <a:r>
-              <a:rPr lang="fr-FR" smtClean="0"/>
+              <a:t>Lorem ipsum dolor sit amet, consectetur adipiscing elit. Pellentesque porta sed tellus volutpat sed.</a:t>
+            </a:r>
+          </a:p>
+          <a:p>
+            <a:r>
               <a:t>End of comment slide 2</a:t>
             </a:r>
           </a:p>
           <a:p>
-            <a:endParaRPr lang="fr-FR"/>
+            <a:r>
+              <a:t/>
+            </a:r>
+          </a:p>
+          <a:p>
+            <a:r>
+              <a:t>=== Original comments from ./sample-docs/pptx-copy.pptx===</a:t>
+            </a:r>
+          </a:p>
+          <a:p>
+            <a:r>
+              <a:t>Begin of comment slide 2</a:t>
+            </a:r>
+          </a:p>
+          <a:p>
+            <a:r>
+              <a:t>Copy copy copy copy copy Copy copy copy copy copy Copy copy copy copy copy Copy copy copy copy copy </a:t>
+            </a:r>
+          </a:p>
+          <a:p>
+            <a:r>
+              <a:t>End of comment slide 2</a:t>
+            </a:r>
+          </a:p>
+          <a:p>
+            <a:r>
+              <a:t/>
+            </a:r>
+          </a:p>
+          <a:p>
+            <a:r>
+              <a:t/>
+            </a:r>
           </a:p>
         </p:txBody>
       </p:sp>
@@ -953,7 +744,7 @@
         <p:nvSpPr>
           <p:cNvPr id="4" name="Espace réservé du numéro de diapositive 3"/>
           <p:cNvSpPr>
-            <a:spLocks noGrp="1"/>
+            <a:spLocks noGrp="true"/>
           </p:cNvSpPr>
           <p:nvPr>
             <p:ph type="sldNum" sz="quarter" idx="10"/>
@@ -964,10 +755,63 @@
           <a:bodyPr/>
           <a:lstStyle/>
           <a:p>
-            <a:fld id="{D087CDC4-FBA2-44CE-A15A-CFDDF7DA6987}" type="slidenum">
-              <a:rPr lang="fr-FR" smtClean="0"/>
-              <a:t>2</a:t>
-            </a:fld>
+            <a:r>
+              <a:t>Begin of comment slide 2</a:t>
+            </a:r>
+            <a:endParaRPr lang="fr-FR"/>
+          </a:p>
+          <a:p>
+            <a:r>
+              <a:t>Lorem ipsum dolor sit amet, consectetur adipiscing elit. Pellentesque porta sed tellus volutpat sed.</a:t>
+            </a:r>
+            <a:endParaRPr lang="fr-FR"/>
+          </a:p>
+          <a:p>
+            <a:r>
+              <a:t>End of comment slide 2</a:t>
+            </a:r>
+            <a:endParaRPr lang="fr-FR"/>
+          </a:p>
+          <a:p>
+            <a:r>
+              <a:t/>
+            </a:r>
+            <a:endParaRPr lang="fr-FR"/>
+          </a:p>
+          <a:p>
+            <a:r>
+              <a:t>=== Original comments from ./sample-docs/pptx-copy.pptx===</a:t>
+            </a:r>
+            <a:endParaRPr lang="fr-FR"/>
+          </a:p>
+          <a:p>
+            <a:r>
+              <a:t>Begin of comment slide 2</a:t>
+            </a:r>
+            <a:endParaRPr lang="fr-FR"/>
+          </a:p>
+          <a:p>
+            <a:r>
+              <a:t>Copy copy copy copy copy Copy copy copy copy copy Copy copy copy copy copy Copy copy copy copy copy </a:t>
+            </a:r>
+            <a:endParaRPr lang="fr-FR"/>
+          </a:p>
+          <a:p>
+            <a:r>
+              <a:t>End of comment slide 2</a:t>
+            </a:r>
+            <a:endParaRPr lang="fr-FR"/>
+          </a:p>
+          <a:p>
+            <a:r>
+              <a:t/>
+            </a:r>
+            <a:endParaRPr lang="fr-FR"/>
+          </a:p>
+          <a:p>
+            <a:r>
+              <a:t/>
+            </a:r>
             <a:endParaRPr lang="fr-FR"/>
           </a:p>
         </p:txBody>
@@ -986,7 +830,7 @@
 </file>
 
 <file path=ppt/slideLayouts/slideLayout1.xml><?xml version="1.0" encoding="utf-8"?>
-<p:sldLayout xmlns:a="http://schemas.openxmlformats.org/drawingml/2006/main" xmlns:r="http://schemas.openxmlformats.org/officeDocument/2006/relationships" xmlns:p="http://schemas.openxmlformats.org/presentationml/2006/main" type="title" preserve="1">
+<p:sldLayout xmlns:v="urn:schemas-microsoft-com:vml" xmlns:a="http://schemas.openxmlformats.org/drawingml/2006/main" xmlns:c="http://schemas.openxmlformats.org/drawingml/2006/chart" xmlns:xdr="http://schemas.openxmlformats.org/drawingml/2006/spreadsheetDrawing" xmlns:dgm="http://schemas.openxmlformats.org/drawingml/2006/diagram" xmlns:pic="http://schemas.openxmlformats.org/drawingml/2006/picture" xmlns:wp14="http://schemas.microsoft.com/office/word/2010/wordprocessingDrawing" xmlns:p="http://schemas.openxmlformats.org/presentationml/2006/main" xmlns:ns6="http://schemas.openxmlformats.org/drawingml/2006/chartDrawing" xmlns:r="http://schemas.openxmlformats.org/officeDocument/2006/relationships" xmlns:ns13="http://schemas.openxmlformats.org/drawingml/2006/lockedCanvas" xmlns:ns12="http://schemas.openxmlformats.org/drawingml/2006/compatibility" xmlns:mc="http://schemas.openxmlformats.org/markup-compatibility/2006" xmlns:wp="http://schemas.openxmlformats.org/drawingml/2006/wordprocessingDrawing" type="title" preserve="true">
   <p:cSld name="Diapositive de titre">
     <p:spTree>
       <p:nvGrpSpPr>
@@ -1006,7 +850,7 @@
         <p:nvSpPr>
           <p:cNvPr id="2" name="Titre 1"/>
           <p:cNvSpPr>
-            <a:spLocks noGrp="1"/>
+            <a:spLocks noGrp="true"/>
           </p:cNvSpPr>
           <p:nvPr>
             <p:ph type="ctrTitle"/>
@@ -1027,7 +871,7 @@
           </a:lstStyle>
           <a:p>
             <a:r>
-              <a:rPr lang="fr-FR" smtClean="0"/>
+              <a:rPr lang="fr-FR" smtClean="false"/>
               <a:t>Modifiez le style du titre</a:t>
             </a:r>
             <a:endParaRPr lang="fr-FR"/>
@@ -1038,7 +882,7 @@
         <p:nvSpPr>
           <p:cNvPr id="3" name="Sous-titre 2"/>
           <p:cNvSpPr>
-            <a:spLocks noGrp="1"/>
+            <a:spLocks noGrp="true"/>
           </p:cNvSpPr>
           <p:nvPr>
             <p:ph type="subTitle" idx="1"/>
@@ -1092,7 +936,7 @@
           </a:lstStyle>
           <a:p>
             <a:r>
-              <a:rPr lang="fr-FR" smtClean="0"/>
+              <a:rPr lang="fr-FR" smtClean="false"/>
               <a:t>Modifiez le style des sous-titres du masque</a:t>
             </a:r>
             <a:endParaRPr lang="fr-FR"/>
@@ -1103,7 +947,7 @@
         <p:nvSpPr>
           <p:cNvPr id="4" name="Espace réservé de la date 3"/>
           <p:cNvSpPr>
-            <a:spLocks noGrp="1"/>
+            <a:spLocks noGrp="true"/>
           </p:cNvSpPr>
           <p:nvPr>
             <p:ph type="dt" sz="half" idx="10"/>
@@ -1115,7 +959,7 @@
           <a:lstStyle/>
           <a:p>
             <a:fld id="{E7E4853E-ECDD-443A-840C-1FE284273B35}" type="datetimeFigureOut">
-              <a:rPr lang="fr-FR" smtClean="0"/>
+              <a:rPr lang="fr-FR" smtClean="false"/>
               <a:t>14/02/2017</a:t>
             </a:fld>
             <a:endParaRPr lang="fr-FR"/>
@@ -1126,7 +970,7 @@
         <p:nvSpPr>
           <p:cNvPr id="5" name="Espace réservé du pied de page 4"/>
           <p:cNvSpPr>
-            <a:spLocks noGrp="1"/>
+            <a:spLocks noGrp="true"/>
           </p:cNvSpPr>
           <p:nvPr>
             <p:ph type="ftr" sz="quarter" idx="11"/>
@@ -1145,7 +989,7 @@
         <p:nvSpPr>
           <p:cNvPr id="6" name="Espace réservé du numéro de diapositive 5"/>
           <p:cNvSpPr>
-            <a:spLocks noGrp="1"/>
+            <a:spLocks noGrp="true"/>
           </p:cNvSpPr>
           <p:nvPr>
             <p:ph type="sldNum" sz="quarter" idx="12"/>
@@ -1157,7 +1001,7 @@
           <a:lstStyle/>
           <a:p>
             <a:fld id="{E3811F5C-F6AB-470B-8321-08F27CD4598A}" type="slidenum">
-              <a:rPr lang="fr-FR" smtClean="0"/>
+              <a:rPr lang="fr-FR" smtClean="false"/>
               <a:t>‹N°›</a:t>
             </a:fld>
             <a:endParaRPr lang="fr-FR"/>
@@ -1528,7 +1372,7 @@
 </file>
 
 <file path=ppt/slideLayouts/slideLayout2.xml><?xml version="1.0" encoding="utf-8"?>
-<p:sldLayout xmlns:a="http://schemas.openxmlformats.org/drawingml/2006/main" xmlns:r="http://schemas.openxmlformats.org/officeDocument/2006/relationships" xmlns:p="http://schemas.openxmlformats.org/presentationml/2006/main" type="obj" preserve="1">
+<p:sldLayout xmlns:v="urn:schemas-microsoft-com:vml" xmlns:a="http://schemas.openxmlformats.org/drawingml/2006/main" xmlns:c="http://schemas.openxmlformats.org/drawingml/2006/chart" xmlns:xdr="http://schemas.openxmlformats.org/drawingml/2006/spreadsheetDrawing" xmlns:dgm="http://schemas.openxmlformats.org/drawingml/2006/diagram" xmlns:pic="http://schemas.openxmlformats.org/drawingml/2006/picture" xmlns:wp14="http://schemas.microsoft.com/office/word/2010/wordprocessingDrawing" xmlns:p="http://schemas.openxmlformats.org/presentationml/2006/main" xmlns:ns6="http://schemas.openxmlformats.org/drawingml/2006/chartDrawing" xmlns:r="http://schemas.openxmlformats.org/officeDocument/2006/relationships" xmlns:ns13="http://schemas.openxmlformats.org/drawingml/2006/lockedCanvas" xmlns:ns12="http://schemas.openxmlformats.org/drawingml/2006/compatibility" xmlns:mc="http://schemas.openxmlformats.org/markup-compatibility/2006" xmlns:wp="http://schemas.openxmlformats.org/drawingml/2006/wordprocessingDrawing" type="obj" preserve="true">
   <p:cSld name="Titre et contenu">
     <p:spTree>
       <p:nvGrpSpPr>
@@ -1548,7 +1392,7 @@
         <p:nvSpPr>
           <p:cNvPr id="2" name="Titre 1"/>
           <p:cNvSpPr>
-            <a:spLocks noGrp="1"/>
+            <a:spLocks noGrp="true"/>
           </p:cNvSpPr>
           <p:nvPr>
             <p:ph type="title"/>
@@ -1560,7 +1404,7 @@
           <a:lstStyle/>
           <a:p>
             <a:r>
-              <a:rPr lang="fr-FR" smtClean="0"/>
+              <a:rPr lang="fr-FR" smtClean="false"/>
               <a:t>Modifiez le style du titre</a:t>
             </a:r>
             <a:endParaRPr lang="fr-FR"/>
@@ -1571,7 +1415,7 @@
         <p:nvSpPr>
           <p:cNvPr id="3" name="Espace réservé du contenu 2"/>
           <p:cNvSpPr>
-            <a:spLocks noGrp="1"/>
+            <a:spLocks noGrp="true"/>
           </p:cNvSpPr>
           <p:nvPr>
             <p:ph idx="1"/>
@@ -1584,35 +1428,35 @@
           <a:p>
             <a:pPr lvl="0"/>
             <a:r>
-              <a:rPr lang="fr-FR" smtClean="0"/>
+              <a:rPr lang="fr-FR" smtClean="false"/>
               <a:t>Modifiez les styles du texte du masque</a:t>
             </a:r>
           </a:p>
           <a:p>
             <a:pPr lvl="1"/>
             <a:r>
-              <a:rPr lang="fr-FR" smtClean="0"/>
+              <a:rPr lang="fr-FR" smtClean="false"/>
               <a:t>Deuxième niveau</a:t>
             </a:r>
           </a:p>
           <a:p>
             <a:pPr lvl="2"/>
             <a:r>
-              <a:rPr lang="fr-FR" smtClean="0"/>
+              <a:rPr lang="fr-FR" smtClean="false"/>
               <a:t>Troisième niveau</a:t>
             </a:r>
           </a:p>
           <a:p>
             <a:pPr lvl="3"/>
             <a:r>
-              <a:rPr lang="fr-FR" smtClean="0"/>
+              <a:rPr lang="fr-FR" smtClean="false"/>
               <a:t>Quatrième niveau</a:t>
             </a:r>
           </a:p>
           <a:p>
             <a:pPr lvl="4"/>
             <a:r>
-              <a:rPr lang="fr-FR" smtClean="0"/>
+              <a:rPr lang="fr-FR" smtClean="false"/>
               <a:t>Cinquième niveau</a:t>
             </a:r>
             <a:endParaRPr lang="fr-FR"/>
@@ -1623,7 +1467,7 @@
         <p:nvSpPr>
           <p:cNvPr id="4" name="Espace réservé de la date 3"/>
           <p:cNvSpPr>
-            <a:spLocks noGrp="1"/>
+            <a:spLocks noGrp="true"/>
           </p:cNvSpPr>
           <p:nvPr>
             <p:ph type="dt" sz="half" idx="10"/>
@@ -1635,7 +1479,7 @@
           <a:lstStyle/>
           <a:p>
             <a:fld id="{E7E4853E-ECDD-443A-840C-1FE284273B35}" type="datetimeFigureOut">
-              <a:rPr lang="fr-FR" smtClean="0"/>
+              <a:rPr lang="fr-FR" smtClean="false"/>
               <a:t>14/02/2017</a:t>
             </a:fld>
             <a:endParaRPr lang="fr-FR"/>
@@ -1646,7 +1490,7 @@
         <p:nvSpPr>
           <p:cNvPr id="5" name="Espace réservé du pied de page 4"/>
           <p:cNvSpPr>
-            <a:spLocks noGrp="1"/>
+            <a:spLocks noGrp="true"/>
           </p:cNvSpPr>
           <p:nvPr>
             <p:ph type="ftr" sz="quarter" idx="11"/>
@@ -1665,7 +1509,7 @@
         <p:nvSpPr>
           <p:cNvPr id="6" name="Espace réservé du numéro de diapositive 5"/>
           <p:cNvSpPr>
-            <a:spLocks noGrp="1"/>
+            <a:spLocks noGrp="true"/>
           </p:cNvSpPr>
           <p:nvPr>
             <p:ph type="sldNum" sz="quarter" idx="12"/>
@@ -1677,7 +1521,7 @@
           <a:lstStyle/>
           <a:p>
             <a:fld id="{E3811F5C-F6AB-470B-8321-08F27CD4598A}" type="slidenum">
-              <a:rPr lang="fr-FR" smtClean="0"/>
+              <a:rPr lang="fr-FR" smtClean="false"/>
               <a:t>‹N°›</a:t>
             </a:fld>
             <a:endParaRPr lang="fr-FR"/>
@@ -3286,7 +3130,7 @@
 </file>
 
 <file path=ppt/slideMasters/slideMaster1.xml><?xml version="1.0" encoding="utf-8"?>
-<p:sldMaster xmlns:a="http://schemas.openxmlformats.org/drawingml/2006/main" xmlns:r="http://schemas.openxmlformats.org/officeDocument/2006/relationships" xmlns:p="http://schemas.openxmlformats.org/presentationml/2006/main">
+<p:sldMaster xmlns:v="urn:schemas-microsoft-com:vml" xmlns:a="http://schemas.openxmlformats.org/drawingml/2006/main" xmlns:c="http://schemas.openxmlformats.org/drawingml/2006/chart" xmlns:xdr="http://schemas.openxmlformats.org/drawingml/2006/spreadsheetDrawing" xmlns:dgm="http://schemas.openxmlformats.org/drawingml/2006/diagram" xmlns:pic="http://schemas.openxmlformats.org/drawingml/2006/picture" xmlns:wp14="http://schemas.microsoft.com/office/word/2010/wordprocessingDrawing" xmlns:p="http://schemas.openxmlformats.org/presentationml/2006/main" xmlns:ns6="http://schemas.openxmlformats.org/drawingml/2006/chartDrawing" xmlns:r="http://schemas.openxmlformats.org/officeDocument/2006/relationships" xmlns:ns13="http://schemas.openxmlformats.org/drawingml/2006/lockedCanvas" xmlns:ns12="http://schemas.openxmlformats.org/drawingml/2006/compatibility" xmlns:mc="http://schemas.openxmlformats.org/markup-compatibility/2006" xmlns:wp="http://schemas.openxmlformats.org/drawingml/2006/wordprocessingDrawing">
   <p:cSld>
     <p:bg>
       <p:bgRef idx="1001">
@@ -3311,7 +3155,7 @@
         <p:nvSpPr>
           <p:cNvPr id="2" name="Espace réservé du titre 1"/>
           <p:cNvSpPr>
-            <a:spLocks noGrp="1"/>
+            <a:spLocks noGrp="true"/>
           </p:cNvSpPr>
           <p:nvPr>
             <p:ph type="title"/>
@@ -3327,13 +3171,13 @@
           </a:prstGeom>
         </p:spPr>
         <p:txBody>
-          <a:bodyPr vert="horz" lIns="91440" tIns="45720" rIns="91440" bIns="45720" rtlCol="0" anchor="ctr">
+          <a:bodyPr vert="horz" lIns="91440" tIns="45720" rIns="91440" bIns="45720" rtlCol="false" anchor="ctr">
             <a:normAutofit/>
           </a:bodyPr>
           <a:lstStyle/>
           <a:p>
             <a:r>
-              <a:rPr lang="fr-FR" smtClean="0"/>
+              <a:rPr lang="fr-FR" smtClean="false"/>
               <a:t>Modifiez le style du titre</a:t>
             </a:r>
             <a:endParaRPr lang="fr-FR"/>
@@ -3344,7 +3188,7 @@
         <p:nvSpPr>
           <p:cNvPr id="3" name="Espace réservé du texte 2"/>
           <p:cNvSpPr>
-            <a:spLocks noGrp="1"/>
+            <a:spLocks noGrp="true"/>
           </p:cNvSpPr>
           <p:nvPr>
             <p:ph type="body" idx="1"/>
@@ -3360,42 +3204,42 @@
           </a:prstGeom>
         </p:spPr>
         <p:txBody>
-          <a:bodyPr vert="horz" lIns="91440" tIns="45720" rIns="91440" bIns="45720" rtlCol="0">
+          <a:bodyPr vert="horz" lIns="91440" tIns="45720" rIns="91440" bIns="45720" rtlCol="false">
             <a:normAutofit/>
           </a:bodyPr>
           <a:lstStyle/>
           <a:p>
             <a:pPr lvl="0"/>
             <a:r>
-              <a:rPr lang="fr-FR" smtClean="0"/>
+              <a:rPr lang="fr-FR" smtClean="false"/>
               <a:t>Modifiez les styles du texte du masque</a:t>
             </a:r>
           </a:p>
           <a:p>
             <a:pPr lvl="1"/>
             <a:r>
-              <a:rPr lang="fr-FR" smtClean="0"/>
+              <a:rPr lang="fr-FR" smtClean="false"/>
               <a:t>Deuxième niveau</a:t>
             </a:r>
           </a:p>
           <a:p>
             <a:pPr lvl="2"/>
             <a:r>
-              <a:rPr lang="fr-FR" smtClean="0"/>
+              <a:rPr lang="fr-FR" smtClean="false"/>
               <a:t>Troisième niveau</a:t>
             </a:r>
           </a:p>
           <a:p>
             <a:pPr lvl="3"/>
             <a:r>
-              <a:rPr lang="fr-FR" smtClean="0"/>
+              <a:rPr lang="fr-FR" smtClean="false"/>
               <a:t>Quatrième niveau</a:t>
             </a:r>
           </a:p>
           <a:p>
             <a:pPr lvl="4"/>
             <a:r>
-              <a:rPr lang="fr-FR" smtClean="0"/>
+              <a:rPr lang="fr-FR" smtClean="false"/>
               <a:t>Cinquième niveau</a:t>
             </a:r>
             <a:endParaRPr lang="fr-FR"/>
@@ -3406,7 +3250,7 @@
         <p:nvSpPr>
           <p:cNvPr id="4" name="Espace réservé de la date 3"/>
           <p:cNvSpPr>
-            <a:spLocks noGrp="1"/>
+            <a:spLocks noGrp="true"/>
           </p:cNvSpPr>
           <p:nvPr>
             <p:ph type="dt" sz="half" idx="2"/>
@@ -3422,7 +3266,7 @@
           </a:prstGeom>
         </p:spPr>
         <p:txBody>
-          <a:bodyPr vert="horz" lIns="91440" tIns="45720" rIns="91440" bIns="45720" rtlCol="0" anchor="ctr"/>
+          <a:bodyPr vert="horz" lIns="91440" tIns="45720" rIns="91440" bIns="45720" rtlCol="false" anchor="ctr"/>
           <a:lstStyle>
             <a:lvl1pPr algn="l">
               <a:defRPr sz="1200">
@@ -3436,7 +3280,7 @@
           </a:lstStyle>
           <a:p>
             <a:fld id="{E7E4853E-ECDD-443A-840C-1FE284273B35}" type="datetimeFigureOut">
-              <a:rPr lang="fr-FR" smtClean="0"/>
+              <a:rPr lang="fr-FR" smtClean="false"/>
               <a:t>14/02/2017</a:t>
             </a:fld>
             <a:endParaRPr lang="fr-FR"/>
@@ -3447,7 +3291,7 @@
         <p:nvSpPr>
           <p:cNvPr id="5" name="Espace réservé du pied de page 4"/>
           <p:cNvSpPr>
-            <a:spLocks noGrp="1"/>
+            <a:spLocks noGrp="true"/>
           </p:cNvSpPr>
           <p:nvPr>
             <p:ph type="ftr" sz="quarter" idx="3"/>
@@ -3463,7 +3307,7 @@
           </a:prstGeom>
         </p:spPr>
         <p:txBody>
-          <a:bodyPr vert="horz" lIns="91440" tIns="45720" rIns="91440" bIns="45720" rtlCol="0" anchor="ctr"/>
+          <a:bodyPr vert="horz" lIns="91440" tIns="45720" rIns="91440" bIns="45720" rtlCol="false" anchor="ctr"/>
           <a:lstStyle>
             <a:lvl1pPr algn="ctr">
               <a:defRPr sz="1200">
@@ -3484,7 +3328,7 @@
         <p:nvSpPr>
           <p:cNvPr id="6" name="Espace réservé du numéro de diapositive 5"/>
           <p:cNvSpPr>
-            <a:spLocks noGrp="1"/>
+            <a:spLocks noGrp="true"/>
           </p:cNvSpPr>
           <p:nvPr>
             <p:ph type="sldNum" sz="quarter" idx="4"/>
@@ -3500,7 +3344,7 @@
           </a:prstGeom>
         </p:spPr>
         <p:txBody>
-          <a:bodyPr vert="horz" lIns="91440" tIns="45720" rIns="91440" bIns="45720" rtlCol="0" anchor="ctr"/>
+          <a:bodyPr vert="horz" lIns="91440" tIns="45720" rIns="91440" bIns="45720" rtlCol="false" anchor="ctr"/>
           <a:lstStyle>
             <a:lvl1pPr algn="r">
               <a:defRPr sz="1200">
@@ -3514,7 +3358,7 @@
           </a:lstStyle>
           <a:p>
             <a:fld id="{E3811F5C-F6AB-470B-8321-08F27CD4598A}" type="slidenum">
-              <a:rPr lang="fr-FR" smtClean="0"/>
+              <a:rPr lang="fr-FR" smtClean="false"/>
               <a:t>‹N°›</a:t>
             </a:fld>
             <a:endParaRPr lang="fr-FR"/>
@@ -3544,7 +3388,7 @@
   </p:sldLayoutIdLst>
   <p:txStyles>
     <p:titleStyle>
-      <a:lvl1pPr algn="l" defTabSz="914400" rtl="0" eaLnBrk="1" latinLnBrk="0" hangingPunct="1">
+      <a:lvl1pPr algn="l" defTabSz="914400" rtl="false" eaLnBrk="true" latinLnBrk="false" hangingPunct="true">
         <a:lnSpc>
           <a:spcPct val="90000"/>
         </a:lnSpc>
@@ -3563,7 +3407,7 @@
       </a:lvl1pPr>
     </p:titleStyle>
     <p:bodyStyle>
-      <a:lvl1pPr marL="228600" indent="-228600" algn="l" defTabSz="914400" rtl="0" eaLnBrk="1" latinLnBrk="0" hangingPunct="1">
+      <a:lvl1pPr marL="228600" indent="-228600" algn="l" defTabSz="914400" rtl="false" eaLnBrk="true" latinLnBrk="false" hangingPunct="true">
         <a:lnSpc>
           <a:spcPct val="90000"/>
         </a:lnSpc>
@@ -3581,7 +3425,7 @@
           <a:cs typeface="+mn-cs"/>
         </a:defRPr>
       </a:lvl1pPr>
-      <a:lvl2pPr marL="685800" indent="-228600" algn="l" defTabSz="914400" rtl="0" eaLnBrk="1" latinLnBrk="0" hangingPunct="1">
+      <a:lvl2pPr marL="685800" indent="-228600" algn="l" defTabSz="914400" rtl="false" eaLnBrk="true" latinLnBrk="false" hangingPunct="true">
         <a:lnSpc>
           <a:spcPct val="90000"/>
         </a:lnSpc>
@@ -3599,7 +3443,7 @@
           <a:cs typeface="+mn-cs"/>
         </a:defRPr>
       </a:lvl2pPr>
-      <a:lvl3pPr marL="1143000" indent="-228600" algn="l" defTabSz="914400" rtl="0" eaLnBrk="1" latinLnBrk="0" hangingPunct="1">
+      <a:lvl3pPr marL="1143000" indent="-228600" algn="l" defTabSz="914400" rtl="false" eaLnBrk="true" latinLnBrk="false" hangingPunct="true">
         <a:lnSpc>
           <a:spcPct val="90000"/>
         </a:lnSpc>
@@ -3617,7 +3461,7 @@
           <a:cs typeface="+mn-cs"/>
         </a:defRPr>
       </a:lvl3pPr>
-      <a:lvl4pPr marL="1600200" indent="-228600" algn="l" defTabSz="914400" rtl="0" eaLnBrk="1" latinLnBrk="0" hangingPunct="1">
+      <a:lvl4pPr marL="1600200" indent="-228600" algn="l" defTabSz="914400" rtl="false" eaLnBrk="true" latinLnBrk="false" hangingPunct="true">
         <a:lnSpc>
           <a:spcPct val="90000"/>
         </a:lnSpc>
@@ -3635,7 +3479,7 @@
           <a:cs typeface="+mn-cs"/>
         </a:defRPr>
       </a:lvl4pPr>
-      <a:lvl5pPr marL="2057400" indent="-228600" algn="l" defTabSz="914400" rtl="0" eaLnBrk="1" latinLnBrk="0" hangingPunct="1">
+      <a:lvl5pPr marL="2057400" indent="-228600" algn="l" defTabSz="914400" rtl="false" eaLnBrk="true" latinLnBrk="false" hangingPunct="true">
         <a:lnSpc>
           <a:spcPct val="90000"/>
         </a:lnSpc>
@@ -3653,7 +3497,7 @@
           <a:cs typeface="+mn-cs"/>
         </a:defRPr>
       </a:lvl5pPr>
-      <a:lvl6pPr marL="2514600" indent="-228600" algn="l" defTabSz="914400" rtl="0" eaLnBrk="1" latinLnBrk="0" hangingPunct="1">
+      <a:lvl6pPr marL="2514600" indent="-228600" algn="l" defTabSz="914400" rtl="false" eaLnBrk="true" latinLnBrk="false" hangingPunct="true">
         <a:lnSpc>
           <a:spcPct val="90000"/>
         </a:lnSpc>
@@ -3671,7 +3515,7 @@
           <a:cs typeface="+mn-cs"/>
         </a:defRPr>
       </a:lvl6pPr>
-      <a:lvl7pPr marL="2971800" indent="-228600" algn="l" defTabSz="914400" rtl="0" eaLnBrk="1" latinLnBrk="0" hangingPunct="1">
+      <a:lvl7pPr marL="2971800" indent="-228600" algn="l" defTabSz="914400" rtl="false" eaLnBrk="true" latinLnBrk="false" hangingPunct="true">
         <a:lnSpc>
           <a:spcPct val="90000"/>
         </a:lnSpc>
@@ -3689,7 +3533,7 @@
           <a:cs typeface="+mn-cs"/>
         </a:defRPr>
       </a:lvl7pPr>
-      <a:lvl8pPr marL="3429000" indent="-228600" algn="l" defTabSz="914400" rtl="0" eaLnBrk="1" latinLnBrk="0" hangingPunct="1">
+      <a:lvl8pPr marL="3429000" indent="-228600" algn="l" defTabSz="914400" rtl="false" eaLnBrk="true" latinLnBrk="false" hangingPunct="true">
         <a:lnSpc>
           <a:spcPct val="90000"/>
         </a:lnSpc>
@@ -3707,7 +3551,7 @@
           <a:cs typeface="+mn-cs"/>
         </a:defRPr>
       </a:lvl8pPr>
-      <a:lvl9pPr marL="3886200" indent="-228600" algn="l" defTabSz="914400" rtl="0" eaLnBrk="1" latinLnBrk="0" hangingPunct="1">
+      <a:lvl9pPr marL="3886200" indent="-228600" algn="l" defTabSz="914400" rtl="false" eaLnBrk="true" latinLnBrk="false" hangingPunct="true">
         <a:lnSpc>
           <a:spcPct val="90000"/>
         </a:lnSpc>
@@ -3730,7 +3574,7 @@
       <a:defPPr>
         <a:defRPr lang="fr-FR"/>
       </a:defPPr>
-      <a:lvl1pPr marL="0" algn="l" defTabSz="914400" rtl="0" eaLnBrk="1" latinLnBrk="0" hangingPunct="1">
+      <a:lvl1pPr marL="0" algn="l" defTabSz="914400" rtl="false" eaLnBrk="true" latinLnBrk="false" hangingPunct="true">
         <a:defRPr sz="1800" kern="1200">
           <a:solidFill>
             <a:schemeClr val="tx1"/>
@@ -3740,7 +3584,7 @@
           <a:cs typeface="+mn-cs"/>
         </a:defRPr>
       </a:lvl1pPr>
-      <a:lvl2pPr marL="457200" algn="l" defTabSz="914400" rtl="0" eaLnBrk="1" latinLnBrk="0" hangingPunct="1">
+      <a:lvl2pPr marL="457200" algn="l" defTabSz="914400" rtl="false" eaLnBrk="true" latinLnBrk="false" hangingPunct="true">
         <a:defRPr sz="1800" kern="1200">
           <a:solidFill>
             <a:schemeClr val="tx1"/>
@@ -3750,7 +3594,7 @@
           <a:cs typeface="+mn-cs"/>
         </a:defRPr>
       </a:lvl2pPr>
-      <a:lvl3pPr marL="914400" algn="l" defTabSz="914400" rtl="0" eaLnBrk="1" latinLnBrk="0" hangingPunct="1">
+      <a:lvl3pPr marL="914400" algn="l" defTabSz="914400" rtl="false" eaLnBrk="true" latinLnBrk="false" hangingPunct="true">
         <a:defRPr sz="1800" kern="1200">
           <a:solidFill>
             <a:schemeClr val="tx1"/>
@@ -3760,7 +3604,7 @@
           <a:cs typeface="+mn-cs"/>
         </a:defRPr>
       </a:lvl3pPr>
-      <a:lvl4pPr marL="1371600" algn="l" defTabSz="914400" rtl="0" eaLnBrk="1" latinLnBrk="0" hangingPunct="1">
+      <a:lvl4pPr marL="1371600" algn="l" defTabSz="914400" rtl="false" eaLnBrk="true" latinLnBrk="false" hangingPunct="true">
         <a:defRPr sz="1800" kern="1200">
           <a:solidFill>
             <a:schemeClr val="tx1"/>
@@ -3770,7 +3614,7 @@
           <a:cs typeface="+mn-cs"/>
         </a:defRPr>
       </a:lvl4pPr>
-      <a:lvl5pPr marL="1828800" algn="l" defTabSz="914400" rtl="0" eaLnBrk="1" latinLnBrk="0" hangingPunct="1">
+      <a:lvl5pPr marL="1828800" algn="l" defTabSz="914400" rtl="false" eaLnBrk="true" latinLnBrk="false" hangingPunct="true">
         <a:defRPr sz="1800" kern="1200">
           <a:solidFill>
             <a:schemeClr val="tx1"/>
@@ -3780,7 +3624,7 @@
           <a:cs typeface="+mn-cs"/>
         </a:defRPr>
       </a:lvl5pPr>
-      <a:lvl6pPr marL="2286000" algn="l" defTabSz="914400" rtl="0" eaLnBrk="1" latinLnBrk="0" hangingPunct="1">
+      <a:lvl6pPr marL="2286000" algn="l" defTabSz="914400" rtl="false" eaLnBrk="true" latinLnBrk="false" hangingPunct="true">
         <a:defRPr sz="1800" kern="1200">
           <a:solidFill>
             <a:schemeClr val="tx1"/>
@@ -3790,7 +3634,7 @@
           <a:cs typeface="+mn-cs"/>
         </a:defRPr>
       </a:lvl6pPr>
-      <a:lvl7pPr marL="2743200" algn="l" defTabSz="914400" rtl="0" eaLnBrk="1" latinLnBrk="0" hangingPunct="1">
+      <a:lvl7pPr marL="2743200" algn="l" defTabSz="914400" rtl="false" eaLnBrk="true" latinLnBrk="false" hangingPunct="true">
         <a:defRPr sz="1800" kern="1200">
           <a:solidFill>
             <a:schemeClr val="tx1"/>
@@ -3800,7 +3644,7 @@
           <a:cs typeface="+mn-cs"/>
         </a:defRPr>
       </a:lvl7pPr>
-      <a:lvl8pPr marL="3200400" algn="l" defTabSz="914400" rtl="0" eaLnBrk="1" latinLnBrk="0" hangingPunct="1">
+      <a:lvl8pPr marL="3200400" algn="l" defTabSz="914400" rtl="false" eaLnBrk="true" latinLnBrk="false" hangingPunct="true">
         <a:defRPr sz="1800" kern="1200">
           <a:solidFill>
             <a:schemeClr val="tx1"/>
@@ -3810,7 +3654,7 @@
           <a:cs typeface="+mn-cs"/>
         </a:defRPr>
       </a:lvl8pPr>
-      <a:lvl9pPr marL="3657600" algn="l" defTabSz="914400" rtl="0" eaLnBrk="1" latinLnBrk="0" hangingPunct="1">
+      <a:lvl9pPr marL="3657600" algn="l" defTabSz="914400" rtl="false" eaLnBrk="true" latinLnBrk="false" hangingPunct="true">
         <a:defRPr sz="1800" kern="1200">
           <a:solidFill>
             <a:schemeClr val="tx1"/>
@@ -3826,7 +3670,7 @@
 </file>
 
 <file path=ppt/slides/slide1.xml><?xml version="1.0" encoding="utf-8"?>
-<p:sld xmlns:a="http://schemas.openxmlformats.org/drawingml/2006/main" xmlns:r="http://schemas.openxmlformats.org/officeDocument/2006/relationships" xmlns:p="http://schemas.openxmlformats.org/presentationml/2006/main">
+<p:sld xmlns:a="http://schemas.openxmlformats.org/drawingml/2006/main" xmlns:r="http://schemas.openxmlformats.org/officeDocument/2006/relationships" xmlns:p="http://schemas.openxmlformats.org/presentationml/2006/main" xmlns:mc="http://schemas.openxmlformats.org/markup-compatibility/2006" xmlns:c="http://schemas.openxmlformats.org/drawingml/2006/chart" xmlns:ns6="http://schemas.openxmlformats.org/drawingml/2006/chartDrawing" xmlns:dgm="http://schemas.openxmlformats.org/drawingml/2006/diagram" xmlns:pic="http://schemas.openxmlformats.org/drawingml/2006/picture" xmlns:wp="http://schemas.openxmlformats.org/drawingml/2006/wordprocessingDrawing" xmlns:wp14="http://schemas.microsoft.com/office/word/2010/wordprocessingDrawing" xmlns:xdr="http://schemas.openxmlformats.org/drawingml/2006/spreadsheetDrawing" xmlns:ns12="http://schemas.openxmlformats.org/drawingml/2006/compatibility" xmlns:ns13="http://schemas.openxmlformats.org/drawingml/2006/lockedCanvas" xmlns:v="urn:schemas-microsoft-com:vml">
   <p:cSld>
     <p:spTree>
       <p:nvGrpSpPr>
@@ -3846,7 +3690,7 @@
         <p:nvSpPr>
           <p:cNvPr id="2" name="Titre 1"/>
           <p:cNvSpPr>
-            <a:spLocks noGrp="1"/>
+            <a:spLocks noGrp="true"/>
           </p:cNvSpPr>
           <p:nvPr>
             <p:ph type="ctrTitle"/>
@@ -3858,14 +3702,14 @@
           <a:lstStyle/>
           <a:p>
             <a:r>
-              <a:rPr lang="fr-FR" dirty="0" err="1" smtClean="0"/>
+              <a:rPr lang="fr-FR" dirty="false" err="true" smtClean="false"/>
               <a:t>Title</a:t>
             </a:r>
             <a:r>
-              <a:rPr lang="fr-FR" dirty="0" smtClean="0"/>
+              <a:rPr lang="fr-FR" dirty="false" smtClean="false"/>
               <a:t> 1</a:t>
             </a:r>
-            <a:endParaRPr lang="fr-FR" dirty="0"/>
+            <a:endParaRPr lang="fr-FR" dirty="false"/>
           </a:p>
         </p:txBody>
       </p:sp>
@@ -3873,7 +3717,7 @@
         <p:nvSpPr>
           <p:cNvPr id="3" name="Sous-titre 2"/>
           <p:cNvSpPr>
-            <a:spLocks noGrp="1"/>
+            <a:spLocks noGrp="true"/>
           </p:cNvSpPr>
           <p:nvPr>
             <p:ph type="subTitle" idx="1"/>
@@ -3885,14 +3729,14 @@
           <a:lstStyle/>
           <a:p>
             <a:r>
-              <a:rPr lang="fr-FR" dirty="0" err="1" smtClean="0"/>
+              <a:rPr lang="fr-FR" dirty="false" err="true" smtClean="false"/>
               <a:t>Sub-title</a:t>
             </a:r>
             <a:r>
-              <a:rPr lang="fr-FR" dirty="0" smtClean="0"/>
+              <a:rPr lang="fr-FR" dirty="false" smtClean="false"/>
               <a:t> 1</a:t>
             </a:r>
-            <a:endParaRPr lang="fr-FR" dirty="0"/>
+            <a:endParaRPr lang="fr-FR" dirty="false"/>
           </a:p>
         </p:txBody>
       </p:sp>
@@ -3910,7 +3754,7 @@
 </file>
 
 <file path=ppt/slides/slide2.xml><?xml version="1.0" encoding="utf-8"?>
-<p:sld xmlns:a="http://schemas.openxmlformats.org/drawingml/2006/main" xmlns:r="http://schemas.openxmlformats.org/officeDocument/2006/relationships" xmlns:p="http://schemas.openxmlformats.org/presentationml/2006/main">
+<p:sld xmlns:a="http://schemas.openxmlformats.org/drawingml/2006/main" xmlns:r="http://schemas.openxmlformats.org/officeDocument/2006/relationships" xmlns:p="http://schemas.openxmlformats.org/presentationml/2006/main" xmlns:mc="http://schemas.openxmlformats.org/markup-compatibility/2006" xmlns:c="http://schemas.openxmlformats.org/drawingml/2006/chart" xmlns:ns6="http://schemas.openxmlformats.org/drawingml/2006/chartDrawing" xmlns:dgm="http://schemas.openxmlformats.org/drawingml/2006/diagram" xmlns:pic="http://schemas.openxmlformats.org/drawingml/2006/picture" xmlns:wp="http://schemas.openxmlformats.org/drawingml/2006/wordprocessingDrawing" xmlns:wp14="http://schemas.microsoft.com/office/word/2010/wordprocessingDrawing" xmlns:xdr="http://schemas.openxmlformats.org/drawingml/2006/spreadsheetDrawing" xmlns:ns12="http://schemas.openxmlformats.org/drawingml/2006/compatibility" xmlns:ns13="http://schemas.openxmlformats.org/drawingml/2006/lockedCanvas" xmlns:v="urn:schemas-microsoft-com:vml">
   <p:cSld>
     <p:spTree>
       <p:nvGrpSpPr>
@@ -3930,7 +3774,7 @@
         <p:nvSpPr>
           <p:cNvPr id="2" name="Titre 1"/>
           <p:cNvSpPr>
-            <a:spLocks noGrp="1"/>
+            <a:spLocks noGrp="true"/>
           </p:cNvSpPr>
           <p:nvPr>
             <p:ph type="title"/>
@@ -3942,14 +3786,14 @@
           <a:lstStyle/>
           <a:p>
             <a:r>
-              <a:rPr lang="fr-FR" dirty="0" err="1" smtClean="0"/>
+              <a:rPr lang="fr-FR" dirty="false" err="true" smtClean="false"/>
               <a:t>Title</a:t>
             </a:r>
             <a:r>
-              <a:rPr lang="fr-FR" dirty="0" smtClean="0"/>
+              <a:rPr lang="fr-FR" dirty="false" smtClean="false"/>
               <a:t> 2</a:t>
             </a:r>
-            <a:endParaRPr lang="fr-FR" dirty="0"/>
+            <a:endParaRPr lang="fr-FR" dirty="false"/>
           </a:p>
         </p:txBody>
       </p:sp>
@@ -3957,7 +3801,7 @@
         <p:nvSpPr>
           <p:cNvPr id="3" name="Espace réservé du contenu 2"/>
           <p:cNvSpPr>
-            <a:spLocks noGrp="1"/>
+            <a:spLocks noGrp="true"/>
           </p:cNvSpPr>
           <p:nvPr>
             <p:ph idx="1"/>
@@ -3971,1112 +3815,1112 @@
           <a:lstStyle/>
           <a:p>
             <a:r>
-              <a:rPr lang="fr-FR" dirty="0" err="1" smtClean="0"/>
+              <a:rPr lang="fr-FR" dirty="false" err="true" smtClean="false"/>
               <a:t>Lorem</a:t>
             </a:r>
             <a:r>
-              <a:rPr lang="fr-FR" dirty="0" smtClean="0"/>
-              <a:t> </a:t>
-            </a:r>
-            <a:r>
-              <a:rPr lang="fr-FR" dirty="0" err="1" smtClean="0"/>
+              <a:rPr lang="fr-FR" dirty="false" smtClean="false"/>
+              <a:t> </a:t>
+            </a:r>
+            <a:r>
+              <a:rPr lang="fr-FR" dirty="false" err="true" smtClean="false"/>
               <a:t>ipsum</a:t>
             </a:r>
             <a:r>
-              <a:rPr lang="fr-FR" dirty="0" smtClean="0"/>
-              <a:t> </a:t>
-            </a:r>
-            <a:r>
-              <a:rPr lang="fr-FR" dirty="0" err="1" smtClean="0"/>
+              <a:rPr lang="fr-FR" dirty="false" smtClean="false"/>
+              <a:t> </a:t>
+            </a:r>
+            <a:r>
+              <a:rPr lang="fr-FR" dirty="false" err="true" smtClean="false"/>
               <a:t>dolor</a:t>
             </a:r>
             <a:r>
-              <a:rPr lang="fr-FR" dirty="0" smtClean="0"/>
-              <a:t> </a:t>
-            </a:r>
-            <a:r>
-              <a:rPr lang="fr-FR" dirty="0" err="1" smtClean="0"/>
+              <a:rPr lang="fr-FR" dirty="false" smtClean="false"/>
+              <a:t> </a:t>
+            </a:r>
+            <a:r>
+              <a:rPr lang="fr-FR" dirty="false" err="true" smtClean="false"/>
               <a:t>sit</a:t>
             </a:r>
             <a:r>
-              <a:rPr lang="fr-FR" dirty="0" smtClean="0"/>
-              <a:t> </a:t>
-            </a:r>
-            <a:r>
-              <a:rPr lang="fr-FR" dirty="0" err="1" smtClean="0"/>
+              <a:rPr lang="fr-FR" dirty="false" smtClean="false"/>
+              <a:t> </a:t>
+            </a:r>
+            <a:r>
+              <a:rPr lang="fr-FR" dirty="false" err="true" smtClean="false"/>
               <a:t>amet</a:t>
             </a:r>
             <a:r>
-              <a:rPr lang="fr-FR" dirty="0" smtClean="0"/>
+              <a:rPr lang="fr-FR" dirty="false" smtClean="false"/>
               <a:t>, </a:t>
             </a:r>
             <a:r>
-              <a:rPr lang="fr-FR" dirty="0" err="1" smtClean="0"/>
+              <a:rPr lang="fr-FR" dirty="false" err="true" smtClean="false"/>
               <a:t>consectetur</a:t>
             </a:r>
             <a:r>
-              <a:rPr lang="fr-FR" dirty="0" smtClean="0"/>
-              <a:t> </a:t>
-            </a:r>
-            <a:r>
-              <a:rPr lang="fr-FR" dirty="0" err="1" smtClean="0"/>
+              <a:rPr lang="fr-FR" dirty="false" smtClean="false"/>
+              <a:t> </a:t>
+            </a:r>
+            <a:r>
+              <a:rPr lang="fr-FR" dirty="false" err="true" smtClean="false"/>
               <a:t>adipiscing</a:t>
             </a:r>
             <a:r>
-              <a:rPr lang="fr-FR" dirty="0" smtClean="0"/>
-              <a:t> </a:t>
-            </a:r>
-            <a:r>
-              <a:rPr lang="fr-FR" dirty="0" err="1" smtClean="0"/>
+              <a:rPr lang="fr-FR" dirty="false" smtClean="false"/>
+              <a:t> </a:t>
+            </a:r>
+            <a:r>
+              <a:rPr lang="fr-FR" dirty="false" err="true" smtClean="false"/>
               <a:t>elit</a:t>
             </a:r>
             <a:r>
-              <a:rPr lang="fr-FR" dirty="0" smtClean="0"/>
+              <a:rPr lang="fr-FR" dirty="false" smtClean="false"/>
               <a:t>. Nunc </a:t>
             </a:r>
             <a:r>
-              <a:rPr lang="fr-FR" dirty="0" err="1" smtClean="0"/>
+              <a:rPr lang="fr-FR" dirty="false" err="true" smtClean="false"/>
               <a:t>sed</a:t>
             </a:r>
             <a:r>
-              <a:rPr lang="fr-FR" dirty="0" smtClean="0"/>
+              <a:rPr lang="fr-FR" dirty="false" smtClean="false"/>
               <a:t> est </a:t>
             </a:r>
             <a:r>
-              <a:rPr lang="fr-FR" dirty="0" err="1" smtClean="0"/>
+              <a:rPr lang="fr-FR" dirty="false" err="true" smtClean="false"/>
               <a:t>orci</a:t>
             </a:r>
             <a:r>
-              <a:rPr lang="fr-FR" dirty="0" smtClean="0"/>
+              <a:rPr lang="fr-FR" dirty="false" smtClean="false"/>
               <a:t>. </a:t>
             </a:r>
             <a:r>
-              <a:rPr lang="fr-FR" dirty="0" err="1" smtClean="0"/>
+              <a:rPr lang="fr-FR" dirty="false" err="true" smtClean="false"/>
               <a:t>Vivamus</a:t>
             </a:r>
             <a:r>
-              <a:rPr lang="fr-FR" dirty="0" smtClean="0"/>
-              <a:t> </a:t>
-            </a:r>
-            <a:r>
-              <a:rPr lang="fr-FR" dirty="0" err="1" smtClean="0"/>
+              <a:rPr lang="fr-FR" dirty="false" smtClean="false"/>
+              <a:t> </a:t>
+            </a:r>
+            <a:r>
+              <a:rPr lang="fr-FR" dirty="false" err="true" smtClean="false"/>
               <a:t>neque</a:t>
             </a:r>
             <a:r>
-              <a:rPr lang="fr-FR" dirty="0" smtClean="0"/>
-              <a:t> </a:t>
-            </a:r>
-            <a:r>
-              <a:rPr lang="fr-FR" dirty="0" err="1" smtClean="0"/>
+              <a:rPr lang="fr-FR" dirty="false" smtClean="false"/>
+              <a:t> </a:t>
+            </a:r>
+            <a:r>
+              <a:rPr lang="fr-FR" dirty="false" err="true" smtClean="false"/>
               <a:t>tellus</a:t>
             </a:r>
             <a:r>
-              <a:rPr lang="fr-FR" dirty="0" smtClean="0"/>
+              <a:rPr lang="fr-FR" dirty="false" smtClean="false"/>
               <a:t>, </a:t>
             </a:r>
             <a:r>
-              <a:rPr lang="fr-FR" dirty="0" err="1" smtClean="0"/>
+              <a:rPr lang="fr-FR" dirty="false" err="true" smtClean="false"/>
               <a:t>commodo</a:t>
             </a:r>
             <a:r>
-              <a:rPr lang="fr-FR" dirty="0" smtClean="0"/>
-              <a:t> </a:t>
-            </a:r>
-            <a:r>
-              <a:rPr lang="fr-FR" dirty="0" err="1" smtClean="0"/>
+              <a:rPr lang="fr-FR" dirty="false" smtClean="false"/>
+              <a:t> </a:t>
+            </a:r>
+            <a:r>
+              <a:rPr lang="fr-FR" dirty="false" err="true" smtClean="false"/>
               <a:t>sed</a:t>
             </a:r>
             <a:r>
-              <a:rPr lang="fr-FR" dirty="0" smtClean="0"/>
-              <a:t> </a:t>
-            </a:r>
-            <a:r>
-              <a:rPr lang="fr-FR" dirty="0" err="1" smtClean="0"/>
+              <a:rPr lang="fr-FR" dirty="false" smtClean="false"/>
+              <a:t> </a:t>
+            </a:r>
+            <a:r>
+              <a:rPr lang="fr-FR" dirty="false" err="true" smtClean="false"/>
               <a:t>auctor</a:t>
             </a:r>
             <a:r>
-              <a:rPr lang="fr-FR" dirty="0" smtClean="0"/>
+              <a:rPr lang="fr-FR" dirty="false" smtClean="false"/>
               <a:t> non, semper </a:t>
             </a:r>
             <a:r>
-              <a:rPr lang="fr-FR" dirty="0" err="1" smtClean="0"/>
+              <a:rPr lang="fr-FR" dirty="false" err="true" smtClean="false"/>
               <a:t>vel</a:t>
             </a:r>
             <a:r>
-              <a:rPr lang="fr-FR" dirty="0" smtClean="0"/>
+              <a:rPr lang="fr-FR" dirty="false" smtClean="false"/>
               <a:t> massa. </a:t>
             </a:r>
             <a:r>
-              <a:rPr lang="fr-FR" dirty="0" err="1" smtClean="0"/>
+              <a:rPr lang="fr-FR" dirty="false" err="true" smtClean="false"/>
               <a:t>Morbi</a:t>
             </a:r>
             <a:r>
-              <a:rPr lang="fr-FR" dirty="0" smtClean="0"/>
+              <a:rPr lang="fr-FR" dirty="false" smtClean="false"/>
               <a:t> et </a:t>
             </a:r>
             <a:r>
-              <a:rPr lang="fr-FR" dirty="0" err="1" smtClean="0"/>
+              <a:rPr lang="fr-FR" dirty="false" err="true" smtClean="false"/>
               <a:t>scelerisque</a:t>
             </a:r>
             <a:r>
-              <a:rPr lang="fr-FR" dirty="0" smtClean="0"/>
-              <a:t> </a:t>
-            </a:r>
-            <a:r>
-              <a:rPr lang="fr-FR" dirty="0" err="1" smtClean="0"/>
+              <a:rPr lang="fr-FR" dirty="false" smtClean="false"/>
+              <a:t> </a:t>
+            </a:r>
+            <a:r>
+              <a:rPr lang="fr-FR" dirty="false" err="true" smtClean="false"/>
               <a:t>mauris</a:t>
             </a:r>
             <a:r>
-              <a:rPr lang="fr-FR" dirty="0" smtClean="0"/>
+              <a:rPr lang="fr-FR" dirty="false" smtClean="false"/>
               <a:t>. </a:t>
             </a:r>
             <a:r>
-              <a:rPr lang="fr-FR" dirty="0" err="1" smtClean="0"/>
+              <a:rPr lang="fr-FR" dirty="false" err="true" smtClean="false"/>
               <a:t>Nulla</a:t>
             </a:r>
             <a:r>
-              <a:rPr lang="fr-FR" dirty="0" smtClean="0"/>
-              <a:t> </a:t>
-            </a:r>
-            <a:r>
-              <a:rPr lang="fr-FR" dirty="0" err="1" smtClean="0"/>
+              <a:rPr lang="fr-FR" dirty="false" smtClean="false"/>
+              <a:t> </a:t>
+            </a:r>
+            <a:r>
+              <a:rPr lang="fr-FR" dirty="false" err="true" smtClean="false"/>
               <a:t>odio</a:t>
             </a:r>
             <a:r>
-              <a:rPr lang="fr-FR" dirty="0" smtClean="0"/>
-              <a:t> </a:t>
-            </a:r>
-            <a:r>
-              <a:rPr lang="fr-FR" dirty="0" err="1" smtClean="0"/>
+              <a:rPr lang="fr-FR" dirty="false" smtClean="false"/>
+              <a:t> </a:t>
+            </a:r>
+            <a:r>
+              <a:rPr lang="fr-FR" dirty="false" err="true" smtClean="false"/>
               <a:t>nisi</a:t>
             </a:r>
             <a:r>
-              <a:rPr lang="fr-FR" dirty="0" smtClean="0"/>
+              <a:rPr lang="fr-FR" dirty="false" smtClean="false"/>
               <a:t>, </a:t>
             </a:r>
             <a:r>
-              <a:rPr lang="fr-FR" dirty="0" err="1" smtClean="0"/>
+              <a:rPr lang="fr-FR" dirty="false" err="true" smtClean="false"/>
               <a:t>dapibus</a:t>
             </a:r>
             <a:r>
-              <a:rPr lang="fr-FR" dirty="0" smtClean="0"/>
-              <a:t> </a:t>
-            </a:r>
-            <a:r>
-              <a:rPr lang="fr-FR" dirty="0" err="1" smtClean="0"/>
+              <a:rPr lang="fr-FR" dirty="false" smtClean="false"/>
+              <a:t> </a:t>
+            </a:r>
+            <a:r>
+              <a:rPr lang="fr-FR" dirty="false" err="true" smtClean="false"/>
               <a:t>sed</a:t>
             </a:r>
             <a:r>
-              <a:rPr lang="fr-FR" dirty="0" smtClean="0"/>
-              <a:t> </a:t>
-            </a:r>
-            <a:r>
-              <a:rPr lang="fr-FR" dirty="0" err="1" smtClean="0"/>
+              <a:rPr lang="fr-FR" dirty="false" smtClean="false"/>
+              <a:t> </a:t>
+            </a:r>
+            <a:r>
+              <a:rPr lang="fr-FR" dirty="false" err="true" smtClean="false"/>
               <a:t>felis</a:t>
             </a:r>
             <a:r>
-              <a:rPr lang="fr-FR" dirty="0" smtClean="0"/>
+              <a:rPr lang="fr-FR" dirty="false" smtClean="false"/>
               <a:t> ut, </a:t>
             </a:r>
             <a:r>
-              <a:rPr lang="fr-FR" dirty="0" err="1" smtClean="0"/>
+              <a:rPr lang="fr-FR" dirty="false" err="true" smtClean="false"/>
               <a:t>fermentum</a:t>
             </a:r>
             <a:r>
-              <a:rPr lang="fr-FR" dirty="0" smtClean="0"/>
-              <a:t> </a:t>
-            </a:r>
-            <a:r>
-              <a:rPr lang="fr-FR" dirty="0" err="1" smtClean="0"/>
+              <a:rPr lang="fr-FR" dirty="false" smtClean="false"/>
+              <a:t> </a:t>
+            </a:r>
+            <a:r>
+              <a:rPr lang="fr-FR" dirty="false" err="true" smtClean="false"/>
               <a:t>commodo</a:t>
             </a:r>
             <a:r>
-              <a:rPr lang="fr-FR" dirty="0" smtClean="0"/>
+              <a:rPr lang="fr-FR" dirty="false" smtClean="false"/>
               <a:t> massa. </a:t>
             </a:r>
             <a:r>
-              <a:rPr lang="fr-FR" dirty="0" err="1" smtClean="0"/>
+              <a:rPr lang="fr-FR" dirty="false" err="true" smtClean="false"/>
               <a:t>Praesent</a:t>
             </a:r>
             <a:r>
-              <a:rPr lang="fr-FR" dirty="0" smtClean="0"/>
-              <a:t> </a:t>
-            </a:r>
-            <a:r>
-              <a:rPr lang="fr-FR" dirty="0" err="1" smtClean="0"/>
+              <a:rPr lang="fr-FR" dirty="false" smtClean="false"/>
+              <a:t> </a:t>
+            </a:r>
+            <a:r>
+              <a:rPr lang="fr-FR" dirty="false" err="true" smtClean="false"/>
               <a:t>lorem</a:t>
             </a:r>
             <a:r>
-              <a:rPr lang="fr-FR" dirty="0" smtClean="0"/>
-              <a:t> </a:t>
-            </a:r>
-            <a:r>
-              <a:rPr lang="fr-FR" dirty="0" err="1" smtClean="0"/>
+              <a:rPr lang="fr-FR" dirty="false" smtClean="false"/>
+              <a:t> </a:t>
+            </a:r>
+            <a:r>
+              <a:rPr lang="fr-FR" dirty="false" err="true" smtClean="false"/>
               <a:t>ligula</a:t>
             </a:r>
             <a:r>
-              <a:rPr lang="fr-FR" dirty="0" smtClean="0"/>
+              <a:rPr lang="fr-FR" dirty="false" smtClean="false"/>
               <a:t>, </a:t>
             </a:r>
             <a:r>
-              <a:rPr lang="fr-FR" dirty="0" err="1" smtClean="0"/>
+              <a:rPr lang="fr-FR" dirty="false" err="true" smtClean="false"/>
               <a:t>lobortis</a:t>
             </a:r>
             <a:r>
-              <a:rPr lang="fr-FR" dirty="0" smtClean="0"/>
-              <a:t> </a:t>
-            </a:r>
-            <a:r>
-              <a:rPr lang="fr-FR" dirty="0" err="1" smtClean="0"/>
+              <a:rPr lang="fr-FR" dirty="false" smtClean="false"/>
+              <a:t> </a:t>
+            </a:r>
+            <a:r>
+              <a:rPr lang="fr-FR" dirty="false" err="true" smtClean="false"/>
               <a:t>vel</a:t>
             </a:r>
             <a:r>
-              <a:rPr lang="fr-FR" dirty="0" smtClean="0"/>
-              <a:t> </a:t>
-            </a:r>
-            <a:r>
-              <a:rPr lang="fr-FR" dirty="0" err="1" smtClean="0"/>
+              <a:rPr lang="fr-FR" dirty="false" smtClean="false"/>
+              <a:t> </a:t>
+            </a:r>
+            <a:r>
+              <a:rPr lang="fr-FR" dirty="false" err="true" smtClean="false"/>
               <a:t>nisi</a:t>
             </a:r>
             <a:r>
-              <a:rPr lang="fr-FR" dirty="0" smtClean="0"/>
+              <a:rPr lang="fr-FR" dirty="false" smtClean="false"/>
               <a:t> id, </a:t>
             </a:r>
             <a:r>
-              <a:rPr lang="fr-FR" dirty="0" err="1" smtClean="0"/>
+              <a:rPr lang="fr-FR" dirty="false" err="true" smtClean="false"/>
               <a:t>laoreet</a:t>
             </a:r>
             <a:r>
-              <a:rPr lang="fr-FR" dirty="0" smtClean="0"/>
-              <a:t> </a:t>
-            </a:r>
-            <a:r>
-              <a:rPr lang="fr-FR" dirty="0" err="1" smtClean="0"/>
+              <a:rPr lang="fr-FR" dirty="false" smtClean="false"/>
+              <a:t> </a:t>
+            </a:r>
+            <a:r>
+              <a:rPr lang="fr-FR" dirty="false" err="true" smtClean="false"/>
               <a:t>mattis</a:t>
             </a:r>
             <a:r>
-              <a:rPr lang="fr-FR" dirty="0" smtClean="0"/>
-              <a:t> </a:t>
-            </a:r>
-            <a:r>
-              <a:rPr lang="fr-FR" dirty="0" err="1" smtClean="0"/>
+              <a:rPr lang="fr-FR" dirty="false" smtClean="false"/>
+              <a:t> </a:t>
+            </a:r>
+            <a:r>
+              <a:rPr lang="fr-FR" dirty="false" err="true" smtClean="false"/>
               <a:t>nibh</a:t>
             </a:r>
             <a:r>
-              <a:rPr lang="fr-FR" dirty="0" smtClean="0"/>
+              <a:rPr lang="fr-FR" dirty="false" smtClean="false"/>
               <a:t>. Suspendisse </a:t>
             </a:r>
             <a:r>
-              <a:rPr lang="fr-FR" dirty="0" err="1" smtClean="0"/>
+              <a:rPr lang="fr-FR" dirty="false" err="true" smtClean="false"/>
               <a:t>auctor</a:t>
             </a:r>
             <a:r>
-              <a:rPr lang="fr-FR" dirty="0" smtClean="0"/>
-              <a:t> </a:t>
-            </a:r>
-            <a:r>
-              <a:rPr lang="fr-FR" dirty="0" err="1" smtClean="0"/>
+              <a:rPr lang="fr-FR" dirty="false" smtClean="false"/>
+              <a:t> </a:t>
+            </a:r>
+            <a:r>
+              <a:rPr lang="fr-FR" dirty="false" err="true" smtClean="false"/>
               <a:t>quam</a:t>
             </a:r>
             <a:r>
-              <a:rPr lang="fr-FR" dirty="0" smtClean="0"/>
-              <a:t> </a:t>
-            </a:r>
-            <a:r>
-              <a:rPr lang="fr-FR" dirty="0" err="1" smtClean="0"/>
+              <a:rPr lang="fr-FR" dirty="false" smtClean="false"/>
+              <a:t> </a:t>
+            </a:r>
+            <a:r>
+              <a:rPr lang="fr-FR" dirty="false" err="true" smtClean="false"/>
               <a:t>quis</a:t>
             </a:r>
             <a:r>
-              <a:rPr lang="fr-FR" dirty="0" smtClean="0"/>
+              <a:rPr lang="fr-FR" dirty="false" smtClean="false"/>
               <a:t> diam </a:t>
             </a:r>
             <a:r>
-              <a:rPr lang="fr-FR" dirty="0" err="1" smtClean="0"/>
+              <a:rPr lang="fr-FR" dirty="false" err="true" smtClean="false"/>
               <a:t>sodales</a:t>
             </a:r>
             <a:r>
-              <a:rPr lang="fr-FR" dirty="0" smtClean="0"/>
+              <a:rPr lang="fr-FR" dirty="false" smtClean="false"/>
               <a:t>, in porta </a:t>
             </a:r>
             <a:r>
-              <a:rPr lang="fr-FR" dirty="0" err="1" smtClean="0"/>
+              <a:rPr lang="fr-FR" dirty="false" err="true" smtClean="false"/>
               <a:t>turpis</a:t>
             </a:r>
             <a:r>
-              <a:rPr lang="fr-FR" dirty="0" smtClean="0"/>
+              <a:rPr lang="fr-FR" dirty="false" smtClean="false"/>
               <a:t> tristique. </a:t>
             </a:r>
             <a:r>
-              <a:rPr lang="fr-FR" dirty="0" err="1" smtClean="0"/>
+              <a:rPr lang="fr-FR" dirty="false" err="true" smtClean="false"/>
               <a:t>Proin</a:t>
             </a:r>
             <a:r>
-              <a:rPr lang="fr-FR" dirty="0" smtClean="0"/>
-              <a:t> </a:t>
-            </a:r>
-            <a:r>
-              <a:rPr lang="fr-FR" dirty="0" err="1" smtClean="0"/>
+              <a:rPr lang="fr-FR" dirty="false" smtClean="false"/>
+              <a:t> </a:t>
+            </a:r>
+            <a:r>
+              <a:rPr lang="fr-FR" dirty="false" err="true" smtClean="false"/>
               <a:t>consequat</a:t>
             </a:r>
             <a:r>
-              <a:rPr lang="fr-FR" dirty="0" smtClean="0"/>
-              <a:t> </a:t>
-            </a:r>
-            <a:r>
-              <a:rPr lang="fr-FR" dirty="0" err="1" smtClean="0"/>
+              <a:rPr lang="fr-FR" dirty="false" smtClean="false"/>
+              <a:t> </a:t>
+            </a:r>
+            <a:r>
+              <a:rPr lang="fr-FR" dirty="false" err="true" smtClean="false"/>
               <a:t>luctus</a:t>
             </a:r>
             <a:r>
-              <a:rPr lang="fr-FR" dirty="0" smtClean="0"/>
-              <a:t> </a:t>
-            </a:r>
-            <a:r>
-              <a:rPr lang="fr-FR" dirty="0" err="1" smtClean="0"/>
+              <a:rPr lang="fr-FR" dirty="false" smtClean="false"/>
+              <a:t> </a:t>
+            </a:r>
+            <a:r>
+              <a:rPr lang="fr-FR" dirty="false" err="true" smtClean="false"/>
               <a:t>aliquet</a:t>
             </a:r>
             <a:r>
-              <a:rPr lang="fr-FR" dirty="0" smtClean="0"/>
+              <a:rPr lang="fr-FR" dirty="false" smtClean="false"/>
               <a:t>. </a:t>
             </a:r>
             <a:r>
-              <a:rPr lang="fr-FR" dirty="0" err="1" smtClean="0"/>
+              <a:rPr lang="fr-FR" dirty="false" err="true" smtClean="false"/>
               <a:t>Proin</a:t>
             </a:r>
             <a:r>
-              <a:rPr lang="fr-FR" dirty="0" smtClean="0"/>
+              <a:rPr lang="fr-FR" dirty="false" smtClean="false"/>
               <a:t> bibendum </a:t>
             </a:r>
             <a:r>
-              <a:rPr lang="fr-FR" dirty="0" err="1" smtClean="0"/>
+              <a:rPr lang="fr-FR" dirty="false" err="true" smtClean="false"/>
               <a:t>tortor</a:t>
             </a:r>
             <a:r>
-              <a:rPr lang="fr-FR" dirty="0" smtClean="0"/>
-              <a:t> </a:t>
-            </a:r>
-            <a:r>
-              <a:rPr lang="fr-FR" dirty="0" err="1" smtClean="0"/>
+              <a:rPr lang="fr-FR" dirty="false" smtClean="false"/>
+              <a:t> </a:t>
+            </a:r>
+            <a:r>
+              <a:rPr lang="fr-FR" dirty="false" err="true" smtClean="false"/>
               <a:t>lectus</a:t>
             </a:r>
             <a:r>
-              <a:rPr lang="fr-FR" dirty="0" smtClean="0"/>
+              <a:rPr lang="fr-FR" dirty="false" smtClean="false"/>
               <a:t>, </a:t>
             </a:r>
             <a:r>
-              <a:rPr lang="fr-FR" dirty="0" err="1" smtClean="0"/>
+              <a:rPr lang="fr-FR" dirty="false" err="true" smtClean="false"/>
               <a:t>sagittis</a:t>
             </a:r>
             <a:r>
-              <a:rPr lang="fr-FR" dirty="0" smtClean="0"/>
-              <a:t> </a:t>
-            </a:r>
-            <a:r>
-              <a:rPr lang="fr-FR" dirty="0" err="1" smtClean="0"/>
+              <a:rPr lang="fr-FR" dirty="false" smtClean="false"/>
+              <a:t> </a:t>
+            </a:r>
+            <a:r>
+              <a:rPr lang="fr-FR" dirty="false" err="true" smtClean="false"/>
               <a:t>suscipit</a:t>
             </a:r>
             <a:r>
-              <a:rPr lang="fr-FR" dirty="0" smtClean="0"/>
+              <a:rPr lang="fr-FR" dirty="false" smtClean="false"/>
               <a:t> ante </a:t>
             </a:r>
             <a:r>
-              <a:rPr lang="fr-FR" dirty="0" err="1" smtClean="0"/>
+              <a:rPr lang="fr-FR" dirty="false" err="true" smtClean="false"/>
               <a:t>scelerisque</a:t>
             </a:r>
             <a:r>
-              <a:rPr lang="fr-FR" dirty="0" smtClean="0"/>
-              <a:t> </a:t>
-            </a:r>
-            <a:r>
-              <a:rPr lang="fr-FR" dirty="0" err="1" smtClean="0"/>
+              <a:rPr lang="fr-FR" dirty="false" smtClean="false"/>
+              <a:t> </a:t>
+            </a:r>
+            <a:r>
+              <a:rPr lang="fr-FR" dirty="false" err="true" smtClean="false"/>
               <a:t>sit</a:t>
             </a:r>
             <a:r>
-              <a:rPr lang="fr-FR" dirty="0" smtClean="0"/>
-              <a:t> </a:t>
-            </a:r>
-            <a:r>
-              <a:rPr lang="fr-FR" dirty="0" err="1" smtClean="0"/>
+              <a:rPr lang="fr-FR" dirty="false" smtClean="false"/>
+              <a:t> </a:t>
+            </a:r>
+            <a:r>
+              <a:rPr lang="fr-FR" dirty="false" err="true" smtClean="false"/>
               <a:t>amet</a:t>
             </a:r>
             <a:r>
-              <a:rPr lang="fr-FR" dirty="0" smtClean="0"/>
+              <a:rPr lang="fr-FR" dirty="false" smtClean="false"/>
               <a:t>. </a:t>
             </a:r>
             <a:r>
-              <a:rPr lang="fr-FR" dirty="0" err="1" smtClean="0"/>
+              <a:rPr lang="fr-FR" dirty="false" err="true" smtClean="false"/>
               <a:t>Integer</a:t>
             </a:r>
             <a:r>
-              <a:rPr lang="fr-FR" dirty="0" smtClean="0"/>
-              <a:t> </a:t>
-            </a:r>
-            <a:r>
-              <a:rPr lang="fr-FR" dirty="0" err="1" smtClean="0"/>
+              <a:rPr lang="fr-FR" dirty="false" smtClean="false"/>
+              <a:t> </a:t>
+            </a:r>
+            <a:r>
+              <a:rPr lang="fr-FR" dirty="false" err="true" smtClean="false"/>
               <a:t>sed</a:t>
             </a:r>
             <a:r>
-              <a:rPr lang="fr-FR" dirty="0" smtClean="0"/>
+              <a:rPr lang="fr-FR" dirty="false" smtClean="false"/>
               <a:t> cursus </a:t>
             </a:r>
             <a:r>
-              <a:rPr lang="fr-FR" dirty="0" err="1" smtClean="0"/>
+              <a:rPr lang="fr-FR" dirty="false" err="true" smtClean="false"/>
               <a:t>metus</a:t>
             </a:r>
             <a:r>
-              <a:rPr lang="fr-FR" dirty="0" smtClean="0"/>
+              <a:rPr lang="fr-FR" dirty="false" smtClean="false"/>
               <a:t>. Ut id </a:t>
             </a:r>
             <a:r>
-              <a:rPr lang="fr-FR" dirty="0" err="1" smtClean="0"/>
+              <a:rPr lang="fr-FR" dirty="false" err="true" smtClean="false"/>
               <a:t>dapibus</a:t>
             </a:r>
             <a:r>
-              <a:rPr lang="fr-FR" dirty="0" smtClean="0"/>
-              <a:t> </a:t>
-            </a:r>
-            <a:r>
-              <a:rPr lang="fr-FR" dirty="0" err="1" smtClean="0"/>
+              <a:rPr lang="fr-FR" dirty="false" smtClean="false"/>
+              <a:t> </a:t>
+            </a:r>
+            <a:r>
+              <a:rPr lang="fr-FR" dirty="false" err="true" smtClean="false"/>
               <a:t>mauris</a:t>
             </a:r>
             <a:r>
-              <a:rPr lang="fr-FR" dirty="0" smtClean="0"/>
+              <a:rPr lang="fr-FR" dirty="false" smtClean="false"/>
               <a:t>. Nunc in </a:t>
             </a:r>
             <a:r>
-              <a:rPr lang="fr-FR" dirty="0" err="1" smtClean="0"/>
+              <a:rPr lang="fr-FR" dirty="false" err="true" smtClean="false"/>
               <a:t>risus</a:t>
             </a:r>
             <a:r>
-              <a:rPr lang="fr-FR" dirty="0" smtClean="0"/>
-              <a:t> </a:t>
-            </a:r>
-            <a:r>
-              <a:rPr lang="fr-FR" dirty="0" err="1" smtClean="0"/>
+              <a:rPr lang="fr-FR" dirty="false" smtClean="false"/>
+              <a:t> </a:t>
+            </a:r>
+            <a:r>
+              <a:rPr lang="fr-FR" dirty="false" err="true" smtClean="false"/>
               <a:t>leo</a:t>
             </a:r>
             <a:r>
-              <a:rPr lang="fr-FR" dirty="0" smtClean="0"/>
+              <a:rPr lang="fr-FR" dirty="false" smtClean="false"/>
               <a:t>. </a:t>
             </a:r>
             <a:r>
-              <a:rPr lang="fr-FR" dirty="0" err="1" smtClean="0"/>
+              <a:rPr lang="fr-FR" dirty="false" err="true" smtClean="false"/>
               <a:t>Mauris</a:t>
             </a:r>
             <a:r>
-              <a:rPr lang="fr-FR" dirty="0" smtClean="0"/>
+              <a:rPr lang="fr-FR" dirty="false" smtClean="false"/>
               <a:t> eu </a:t>
             </a:r>
             <a:r>
-              <a:rPr lang="fr-FR" dirty="0" err="1" smtClean="0"/>
+              <a:rPr lang="fr-FR" dirty="false" err="true" smtClean="false"/>
               <a:t>dictum</a:t>
             </a:r>
             <a:r>
-              <a:rPr lang="fr-FR" dirty="0" smtClean="0"/>
+              <a:rPr lang="fr-FR" dirty="false" smtClean="false"/>
               <a:t> nunc, </a:t>
             </a:r>
             <a:r>
-              <a:rPr lang="fr-FR" dirty="0" err="1" smtClean="0"/>
+              <a:rPr lang="fr-FR" dirty="false" err="true" smtClean="false"/>
               <a:t>posuere</a:t>
             </a:r>
             <a:r>
-              <a:rPr lang="fr-FR" dirty="0" smtClean="0"/>
-              <a:t> </a:t>
-            </a:r>
-            <a:r>
-              <a:rPr lang="fr-FR" dirty="0" err="1" smtClean="0"/>
+              <a:rPr lang="fr-FR" dirty="false" smtClean="false"/>
+              <a:t> </a:t>
+            </a:r>
+            <a:r>
+              <a:rPr lang="fr-FR" dirty="false" err="true" smtClean="false"/>
               <a:t>volutpat</a:t>
             </a:r>
             <a:r>
-              <a:rPr lang="fr-FR" dirty="0" smtClean="0"/>
-              <a:t> </a:t>
-            </a:r>
-            <a:r>
-              <a:rPr lang="fr-FR" dirty="0" err="1" smtClean="0"/>
+              <a:rPr lang="fr-FR" dirty="false" smtClean="false"/>
+              <a:t> </a:t>
+            </a:r>
+            <a:r>
+              <a:rPr lang="fr-FR" dirty="false" err="true" smtClean="false"/>
               <a:t>urna</a:t>
             </a:r>
             <a:r>
-              <a:rPr lang="fr-FR" dirty="0" smtClean="0"/>
+              <a:rPr lang="fr-FR" dirty="false" smtClean="false"/>
               <a:t>. </a:t>
             </a:r>
             <a:r>
-              <a:rPr lang="fr-FR" dirty="0" err="1" smtClean="0"/>
+              <a:rPr lang="fr-FR" dirty="false" err="true" smtClean="false"/>
               <a:t>Pellentesque</a:t>
             </a:r>
             <a:r>
-              <a:rPr lang="fr-FR" dirty="0" smtClean="0"/>
+              <a:rPr lang="fr-FR" dirty="false" smtClean="false"/>
               <a:t> at </a:t>
             </a:r>
             <a:r>
-              <a:rPr lang="fr-FR" dirty="0" err="1" smtClean="0"/>
+              <a:rPr lang="fr-FR" dirty="false" err="true" smtClean="false"/>
               <a:t>nisl</a:t>
             </a:r>
             <a:r>
-              <a:rPr lang="fr-FR" dirty="0" smtClean="0"/>
-              <a:t> </a:t>
-            </a:r>
-            <a:r>
-              <a:rPr lang="fr-FR" dirty="0" err="1" smtClean="0"/>
+              <a:rPr lang="fr-FR" dirty="false" smtClean="false"/>
+              <a:t> </a:t>
+            </a:r>
+            <a:r>
+              <a:rPr lang="fr-FR" dirty="false" err="true" smtClean="false"/>
               <a:t>sodales</a:t>
             </a:r>
             <a:r>
-              <a:rPr lang="fr-FR" dirty="0" smtClean="0"/>
+              <a:rPr lang="fr-FR" dirty="false" smtClean="false"/>
               <a:t>, </a:t>
             </a:r>
             <a:r>
-              <a:rPr lang="fr-FR" dirty="0" err="1" smtClean="0"/>
+              <a:rPr lang="fr-FR" dirty="false" err="true" smtClean="false"/>
               <a:t>tempus</a:t>
             </a:r>
             <a:r>
-              <a:rPr lang="fr-FR" dirty="0" smtClean="0"/>
-              <a:t> </a:t>
-            </a:r>
-            <a:r>
-              <a:rPr lang="fr-FR" dirty="0" err="1" smtClean="0"/>
+              <a:rPr lang="fr-FR" dirty="false" smtClean="false"/>
+              <a:t> </a:t>
+            </a:r>
+            <a:r>
+              <a:rPr lang="fr-FR" dirty="false" err="true" smtClean="false"/>
               <a:t>lacus</a:t>
             </a:r>
             <a:r>
-              <a:rPr lang="fr-FR" dirty="0" smtClean="0"/>
-              <a:t> </a:t>
-            </a:r>
-            <a:r>
-              <a:rPr lang="fr-FR" dirty="0" err="1" smtClean="0"/>
+              <a:rPr lang="fr-FR" dirty="false" smtClean="false"/>
+              <a:t> </a:t>
+            </a:r>
+            <a:r>
+              <a:rPr lang="fr-FR" dirty="false" err="true" smtClean="false"/>
               <a:t>ac</a:t>
             </a:r>
             <a:r>
-              <a:rPr lang="fr-FR" dirty="0" smtClean="0"/>
+              <a:rPr lang="fr-FR" dirty="false" smtClean="false"/>
               <a:t>, </a:t>
             </a:r>
             <a:r>
-              <a:rPr lang="fr-FR" dirty="0" err="1" smtClean="0"/>
+              <a:rPr lang="fr-FR" dirty="false" err="true" smtClean="false"/>
               <a:t>consectetur</a:t>
             </a:r>
             <a:r>
-              <a:rPr lang="fr-FR" dirty="0" smtClean="0"/>
-              <a:t> </a:t>
-            </a:r>
-            <a:r>
-              <a:rPr lang="fr-FR" dirty="0" err="1" smtClean="0"/>
+              <a:rPr lang="fr-FR" dirty="false" smtClean="false"/>
+              <a:t> </a:t>
+            </a:r>
+            <a:r>
+              <a:rPr lang="fr-FR" dirty="false" err="true" smtClean="false"/>
               <a:t>nibh</a:t>
             </a:r>
             <a:r>
-              <a:rPr lang="fr-FR" dirty="0" smtClean="0"/>
+              <a:rPr lang="fr-FR" dirty="false" smtClean="false"/>
               <a:t>.</a:t>
             </a:r>
           </a:p>
           <a:p>
             <a:r>
-              <a:rPr lang="fr-FR" dirty="0" err="1" smtClean="0"/>
+              <a:rPr lang="fr-FR" dirty="false" err="true" smtClean="false"/>
               <a:t>Aenean</a:t>
             </a:r>
             <a:r>
-              <a:rPr lang="fr-FR" dirty="0" smtClean="0"/>
-              <a:t> </a:t>
-            </a:r>
-            <a:r>
-              <a:rPr lang="fr-FR" dirty="0" err="1" smtClean="0"/>
+              <a:rPr lang="fr-FR" dirty="false" smtClean="false"/>
+              <a:t> </a:t>
+            </a:r>
+            <a:r>
+              <a:rPr lang="fr-FR" dirty="false" err="true" smtClean="false"/>
               <a:t>convallis</a:t>
             </a:r>
             <a:r>
-              <a:rPr lang="fr-FR" dirty="0" smtClean="0"/>
-              <a:t> </a:t>
-            </a:r>
-            <a:r>
-              <a:rPr lang="fr-FR" dirty="0" err="1" smtClean="0"/>
+              <a:rPr lang="fr-FR" dirty="false" smtClean="false"/>
+              <a:t> </a:t>
+            </a:r>
+            <a:r>
+              <a:rPr lang="fr-FR" dirty="false" err="true" smtClean="false"/>
               <a:t>lacus</a:t>
             </a:r>
             <a:r>
-              <a:rPr lang="fr-FR" dirty="0" smtClean="0"/>
+              <a:rPr lang="fr-FR" dirty="false" smtClean="false"/>
               <a:t> at </a:t>
             </a:r>
             <a:r>
-              <a:rPr lang="fr-FR" dirty="0" err="1" smtClean="0"/>
+              <a:rPr lang="fr-FR" dirty="false" err="true" smtClean="false"/>
               <a:t>velit</a:t>
             </a:r>
             <a:r>
-              <a:rPr lang="fr-FR" dirty="0" smtClean="0"/>
-              <a:t> </a:t>
-            </a:r>
-            <a:r>
-              <a:rPr lang="fr-FR" dirty="0" err="1" smtClean="0"/>
+              <a:rPr lang="fr-FR" dirty="false" smtClean="false"/>
+              <a:t> </a:t>
+            </a:r>
+            <a:r>
+              <a:rPr lang="fr-FR" dirty="false" err="true" smtClean="false"/>
               <a:t>rhoncus</a:t>
             </a:r>
             <a:r>
-              <a:rPr lang="fr-FR" dirty="0" smtClean="0"/>
+              <a:rPr lang="fr-FR" dirty="false" smtClean="false"/>
               <a:t>, non </a:t>
             </a:r>
             <a:r>
-              <a:rPr lang="fr-FR" dirty="0" err="1" smtClean="0"/>
+              <a:rPr lang="fr-FR" dirty="false" err="true" smtClean="false"/>
               <a:t>rhoncus</a:t>
             </a:r>
             <a:r>
-              <a:rPr lang="fr-FR" dirty="0" smtClean="0"/>
-              <a:t> </a:t>
-            </a:r>
-            <a:r>
-              <a:rPr lang="fr-FR" dirty="0" err="1" smtClean="0"/>
+              <a:rPr lang="fr-FR" dirty="false" smtClean="false"/>
+              <a:t> </a:t>
+            </a:r>
+            <a:r>
+              <a:rPr lang="fr-FR" dirty="false" err="true" smtClean="false"/>
               <a:t>metus</a:t>
             </a:r>
             <a:r>
-              <a:rPr lang="fr-FR" dirty="0" smtClean="0"/>
-              <a:t> </a:t>
-            </a:r>
-            <a:r>
-              <a:rPr lang="fr-FR" dirty="0" err="1" smtClean="0"/>
+              <a:rPr lang="fr-FR" dirty="false" smtClean="false"/>
+              <a:t> </a:t>
+            </a:r>
+            <a:r>
+              <a:rPr lang="fr-FR" dirty="false" err="true" smtClean="false"/>
               <a:t>finibus</a:t>
             </a:r>
             <a:r>
-              <a:rPr lang="fr-FR" dirty="0" smtClean="0"/>
+              <a:rPr lang="fr-FR" dirty="false" smtClean="false"/>
               <a:t>. Sed est magna, </a:t>
             </a:r>
             <a:r>
-              <a:rPr lang="fr-FR" dirty="0" err="1" smtClean="0"/>
+              <a:rPr lang="fr-FR" dirty="false" err="true" smtClean="false"/>
               <a:t>porttitor</a:t>
             </a:r>
             <a:r>
-              <a:rPr lang="fr-FR" dirty="0" smtClean="0"/>
-              <a:t> </a:t>
-            </a:r>
-            <a:r>
-              <a:rPr lang="fr-FR" dirty="0" err="1" smtClean="0"/>
+              <a:rPr lang="fr-FR" dirty="false" smtClean="false"/>
+              <a:t> </a:t>
+            </a:r>
+            <a:r>
+              <a:rPr lang="fr-FR" dirty="false" err="true" smtClean="false"/>
               <a:t>quis</a:t>
             </a:r>
             <a:r>
-              <a:rPr lang="fr-FR" dirty="0" smtClean="0"/>
-              <a:t> </a:t>
-            </a:r>
-            <a:r>
-              <a:rPr lang="fr-FR" dirty="0" err="1" smtClean="0"/>
+              <a:rPr lang="fr-FR" dirty="false" smtClean="false"/>
+              <a:t> </a:t>
+            </a:r>
+            <a:r>
+              <a:rPr lang="fr-FR" dirty="false" err="true" smtClean="false"/>
               <a:t>condimentum</a:t>
             </a:r>
             <a:r>
-              <a:rPr lang="fr-FR" dirty="0" smtClean="0"/>
-              <a:t> </a:t>
-            </a:r>
-            <a:r>
-              <a:rPr lang="fr-FR" dirty="0" err="1" smtClean="0"/>
+              <a:rPr lang="fr-FR" dirty="false" smtClean="false"/>
+              <a:t> </a:t>
+            </a:r>
+            <a:r>
+              <a:rPr lang="fr-FR" dirty="false" err="true" smtClean="false"/>
               <a:t>quis</a:t>
             </a:r>
             <a:r>
-              <a:rPr lang="fr-FR" dirty="0" smtClean="0"/>
+              <a:rPr lang="fr-FR" dirty="false" smtClean="false"/>
               <a:t>, </a:t>
             </a:r>
             <a:r>
-              <a:rPr lang="fr-FR" dirty="0" err="1" smtClean="0"/>
+              <a:rPr lang="fr-FR" dirty="false" err="true" smtClean="false"/>
               <a:t>luctus</a:t>
             </a:r>
             <a:r>
-              <a:rPr lang="fr-FR" dirty="0" smtClean="0"/>
-              <a:t> </a:t>
-            </a:r>
-            <a:r>
-              <a:rPr lang="fr-FR" dirty="0" err="1" smtClean="0"/>
+              <a:rPr lang="fr-FR" dirty="false" smtClean="false"/>
+              <a:t> </a:t>
+            </a:r>
+            <a:r>
+              <a:rPr lang="fr-FR" dirty="false" err="true" smtClean="false"/>
               <a:t>sed</a:t>
             </a:r>
             <a:r>
-              <a:rPr lang="fr-FR" dirty="0" smtClean="0"/>
+              <a:rPr lang="fr-FR" dirty="false" smtClean="false"/>
               <a:t> mi. </a:t>
             </a:r>
             <a:r>
-              <a:rPr lang="fr-FR" dirty="0" err="1" smtClean="0"/>
+              <a:rPr lang="fr-FR" dirty="false" err="true" smtClean="false"/>
               <a:t>Nulla</a:t>
             </a:r>
             <a:r>
-              <a:rPr lang="fr-FR" dirty="0" smtClean="0"/>
+              <a:rPr lang="fr-FR" dirty="false" smtClean="false"/>
               <a:t> eu </a:t>
             </a:r>
             <a:r>
-              <a:rPr lang="fr-FR" dirty="0" err="1" smtClean="0"/>
+              <a:rPr lang="fr-FR" dirty="false" err="true" smtClean="false"/>
               <a:t>ullamcorper</a:t>
             </a:r>
             <a:r>
-              <a:rPr lang="fr-FR" dirty="0" smtClean="0"/>
+              <a:rPr lang="fr-FR" dirty="false" smtClean="false"/>
               <a:t> mi. Suspendisse </a:t>
             </a:r>
             <a:r>
-              <a:rPr lang="fr-FR" dirty="0" err="1" smtClean="0"/>
+              <a:rPr lang="fr-FR" dirty="false" err="true" smtClean="false"/>
               <a:t>sagittis</a:t>
             </a:r>
             <a:r>
-              <a:rPr lang="fr-FR" dirty="0" smtClean="0"/>
+              <a:rPr lang="fr-FR" dirty="false" smtClean="false"/>
               <a:t>, </a:t>
             </a:r>
             <a:r>
-              <a:rPr lang="fr-FR" dirty="0" err="1" smtClean="0"/>
+              <a:rPr lang="fr-FR" dirty="false" err="true" smtClean="false"/>
               <a:t>quam</a:t>
             </a:r>
             <a:r>
-              <a:rPr lang="fr-FR" dirty="0" smtClean="0"/>
+              <a:rPr lang="fr-FR" dirty="false" smtClean="false"/>
               <a:t> id </a:t>
             </a:r>
             <a:r>
-              <a:rPr lang="fr-FR" dirty="0" err="1" smtClean="0"/>
+              <a:rPr lang="fr-FR" dirty="false" err="true" smtClean="false"/>
               <a:t>elementum</a:t>
             </a:r>
             <a:r>
-              <a:rPr lang="fr-FR" dirty="0" smtClean="0"/>
-              <a:t> </a:t>
-            </a:r>
-            <a:r>
-              <a:rPr lang="fr-FR" dirty="0" err="1" smtClean="0"/>
+              <a:rPr lang="fr-FR" dirty="false" smtClean="false"/>
+              <a:t> </a:t>
+            </a:r>
+            <a:r>
+              <a:rPr lang="fr-FR" dirty="false" err="true" smtClean="false"/>
               <a:t>feugiat</a:t>
             </a:r>
             <a:r>
-              <a:rPr lang="fr-FR" dirty="0" smtClean="0"/>
+              <a:rPr lang="fr-FR" dirty="false" smtClean="false"/>
               <a:t>, diam </a:t>
             </a:r>
             <a:r>
-              <a:rPr lang="fr-FR" dirty="0" err="1" smtClean="0"/>
+              <a:rPr lang="fr-FR" dirty="false" err="true" smtClean="false"/>
               <a:t>arcu</a:t>
             </a:r>
             <a:r>
-              <a:rPr lang="fr-FR" dirty="0" smtClean="0"/>
-              <a:t> </a:t>
-            </a:r>
-            <a:r>
-              <a:rPr lang="fr-FR" dirty="0" err="1" smtClean="0"/>
+              <a:rPr lang="fr-FR" dirty="false" smtClean="false"/>
+              <a:t> </a:t>
+            </a:r>
+            <a:r>
+              <a:rPr lang="fr-FR" dirty="false" err="true" smtClean="false"/>
               <a:t>fringilla</a:t>
             </a:r>
             <a:r>
-              <a:rPr lang="fr-FR" dirty="0" smtClean="0"/>
-              <a:t> </a:t>
-            </a:r>
-            <a:r>
-              <a:rPr lang="fr-FR" dirty="0" err="1" smtClean="0"/>
+              <a:rPr lang="fr-FR" dirty="false" smtClean="false"/>
+              <a:t> </a:t>
+            </a:r>
+            <a:r>
+              <a:rPr lang="fr-FR" dirty="false" err="true" smtClean="false"/>
               <a:t>dui</a:t>
             </a:r>
             <a:r>
-              <a:rPr lang="fr-FR" dirty="0" smtClean="0"/>
+              <a:rPr lang="fr-FR" dirty="false" smtClean="false"/>
               <a:t>, eu </a:t>
             </a:r>
             <a:r>
-              <a:rPr lang="fr-FR" dirty="0" err="1" smtClean="0"/>
+              <a:rPr lang="fr-FR" dirty="false" err="true" smtClean="false"/>
               <a:t>finibus</a:t>
             </a:r>
             <a:r>
-              <a:rPr lang="fr-FR" dirty="0" smtClean="0"/>
-              <a:t> </a:t>
-            </a:r>
-            <a:r>
-              <a:rPr lang="fr-FR" dirty="0" err="1" smtClean="0"/>
+              <a:rPr lang="fr-FR" dirty="false" smtClean="false"/>
+              <a:t> </a:t>
+            </a:r>
+            <a:r>
+              <a:rPr lang="fr-FR" dirty="false" err="true" smtClean="false"/>
               <a:t>dolor</a:t>
             </a:r>
             <a:r>
-              <a:rPr lang="fr-FR" dirty="0" smtClean="0"/>
-              <a:t> </a:t>
-            </a:r>
-            <a:r>
-              <a:rPr lang="fr-FR" dirty="0" err="1" smtClean="0"/>
+              <a:rPr lang="fr-FR" dirty="false" smtClean="false"/>
+              <a:t> </a:t>
+            </a:r>
+            <a:r>
+              <a:rPr lang="fr-FR" dirty="false" err="true" smtClean="false"/>
               <a:t>tellus</a:t>
             </a:r>
             <a:r>
-              <a:rPr lang="fr-FR" dirty="0" smtClean="0"/>
+              <a:rPr lang="fr-FR" dirty="false" smtClean="false"/>
               <a:t> in </a:t>
             </a:r>
             <a:r>
-              <a:rPr lang="fr-FR" dirty="0" err="1" smtClean="0"/>
+              <a:rPr lang="fr-FR" dirty="false" err="true" smtClean="false"/>
               <a:t>augue</a:t>
             </a:r>
             <a:r>
-              <a:rPr lang="fr-FR" dirty="0" smtClean="0"/>
+              <a:rPr lang="fr-FR" dirty="false" smtClean="false"/>
               <a:t>. Nam </a:t>
             </a:r>
             <a:r>
-              <a:rPr lang="fr-FR" dirty="0" err="1" smtClean="0"/>
+              <a:rPr lang="fr-FR" dirty="false" err="true" smtClean="false"/>
               <a:t>consectetur</a:t>
             </a:r>
             <a:r>
-              <a:rPr lang="fr-FR" dirty="0" smtClean="0"/>
-              <a:t> </a:t>
-            </a:r>
-            <a:r>
-              <a:rPr lang="fr-FR" dirty="0" err="1" smtClean="0"/>
+              <a:rPr lang="fr-FR" dirty="false" smtClean="false"/>
+              <a:t> </a:t>
+            </a:r>
+            <a:r>
+              <a:rPr lang="fr-FR" dirty="false" err="true" smtClean="false"/>
               <a:t>luctus</a:t>
             </a:r>
             <a:r>
-              <a:rPr lang="fr-FR" dirty="0" smtClean="0"/>
-              <a:t> </a:t>
-            </a:r>
-            <a:r>
-              <a:rPr lang="fr-FR" dirty="0" err="1" smtClean="0"/>
+              <a:rPr lang="fr-FR" dirty="false" smtClean="false"/>
+              <a:t> </a:t>
+            </a:r>
+            <a:r>
+              <a:rPr lang="fr-FR" dirty="false" err="true" smtClean="false"/>
               <a:t>lectus</a:t>
             </a:r>
             <a:r>
-              <a:rPr lang="fr-FR" dirty="0" smtClean="0"/>
-              <a:t> </a:t>
-            </a:r>
-            <a:r>
-              <a:rPr lang="fr-FR" dirty="0" err="1" smtClean="0"/>
+              <a:rPr lang="fr-FR" dirty="false" smtClean="false"/>
+              <a:t> </a:t>
+            </a:r>
+            <a:r>
+              <a:rPr lang="fr-FR" dirty="false" err="true" smtClean="false"/>
               <a:t>eget</a:t>
             </a:r>
             <a:r>
-              <a:rPr lang="fr-FR" dirty="0" smtClean="0"/>
-              <a:t> </a:t>
-            </a:r>
-            <a:r>
-              <a:rPr lang="fr-FR" dirty="0" err="1" smtClean="0"/>
+              <a:rPr lang="fr-FR" dirty="false" smtClean="false"/>
+              <a:t> </a:t>
+            </a:r>
+            <a:r>
+              <a:rPr lang="fr-FR" dirty="false" err="true" smtClean="false"/>
               <a:t>congue</a:t>
             </a:r>
             <a:r>
-              <a:rPr lang="fr-FR" dirty="0" smtClean="0"/>
+              <a:rPr lang="fr-FR" dirty="false" smtClean="false"/>
               <a:t>. Sed </a:t>
             </a:r>
             <a:r>
-              <a:rPr lang="fr-FR" dirty="0" err="1" smtClean="0"/>
+              <a:rPr lang="fr-FR" dirty="false" err="true" smtClean="false"/>
               <a:t>fringilla</a:t>
             </a:r>
             <a:r>
-              <a:rPr lang="fr-FR" dirty="0" smtClean="0"/>
+              <a:rPr lang="fr-FR" dirty="false" smtClean="false"/>
               <a:t> non ex </a:t>
             </a:r>
             <a:r>
-              <a:rPr lang="fr-FR" dirty="0" err="1" smtClean="0"/>
+              <a:rPr lang="fr-FR" dirty="false" err="true" smtClean="false"/>
               <a:t>sollicitudin</a:t>
             </a:r>
             <a:r>
-              <a:rPr lang="fr-FR" dirty="0" smtClean="0"/>
-              <a:t> </a:t>
-            </a:r>
-            <a:r>
-              <a:rPr lang="fr-FR" dirty="0" err="1" smtClean="0"/>
+              <a:rPr lang="fr-FR" dirty="false" smtClean="false"/>
+              <a:t> </a:t>
+            </a:r>
+            <a:r>
+              <a:rPr lang="fr-FR" dirty="false" err="true" smtClean="false"/>
               <a:t>ultricies</a:t>
             </a:r>
             <a:r>
-              <a:rPr lang="fr-FR" dirty="0" smtClean="0"/>
+              <a:rPr lang="fr-FR" dirty="false" smtClean="false"/>
               <a:t>. </a:t>
             </a:r>
             <a:r>
-              <a:rPr lang="fr-FR" dirty="0" err="1" smtClean="0"/>
+              <a:rPr lang="fr-FR" dirty="false" err="true" smtClean="false"/>
               <a:t>Integer</a:t>
             </a:r>
             <a:r>
-              <a:rPr lang="fr-FR" dirty="0" smtClean="0"/>
-              <a:t> </a:t>
-            </a:r>
-            <a:r>
-              <a:rPr lang="fr-FR" dirty="0" err="1" smtClean="0"/>
+              <a:rPr lang="fr-FR" dirty="false" smtClean="false"/>
+              <a:t> </a:t>
+            </a:r>
+            <a:r>
+              <a:rPr lang="fr-FR" dirty="false" err="true" smtClean="false"/>
               <a:t>ligula</a:t>
             </a:r>
             <a:r>
-              <a:rPr lang="fr-FR" dirty="0" smtClean="0"/>
-              <a:t> </a:t>
-            </a:r>
-            <a:r>
-              <a:rPr lang="fr-FR" dirty="0" err="1" smtClean="0"/>
+              <a:rPr lang="fr-FR" dirty="false" smtClean="false"/>
+              <a:t> </a:t>
+            </a:r>
+            <a:r>
+              <a:rPr lang="fr-FR" dirty="false" err="true" smtClean="false"/>
               <a:t>quam</a:t>
             </a:r>
             <a:r>
-              <a:rPr lang="fr-FR" dirty="0" smtClean="0"/>
+              <a:rPr lang="fr-FR" dirty="false" smtClean="false"/>
               <a:t>, </a:t>
             </a:r>
             <a:r>
-              <a:rPr lang="fr-FR" dirty="0" err="1" smtClean="0"/>
+              <a:rPr lang="fr-FR" dirty="false" err="true" smtClean="false"/>
               <a:t>sodales</a:t>
             </a:r>
             <a:r>
-              <a:rPr lang="fr-FR" dirty="0" smtClean="0"/>
+              <a:rPr lang="fr-FR" dirty="false" smtClean="false"/>
               <a:t> nec </a:t>
             </a:r>
             <a:r>
-              <a:rPr lang="fr-FR" dirty="0" err="1" smtClean="0"/>
+              <a:rPr lang="fr-FR" dirty="false" err="true" smtClean="false"/>
               <a:t>nulla</a:t>
             </a:r>
             <a:r>
-              <a:rPr lang="fr-FR" dirty="0" smtClean="0"/>
+              <a:rPr lang="fr-FR" dirty="false" smtClean="false"/>
               <a:t> at, </a:t>
             </a:r>
             <a:r>
-              <a:rPr lang="fr-FR" dirty="0" err="1" smtClean="0"/>
+              <a:rPr lang="fr-FR" dirty="false" err="true" smtClean="false"/>
               <a:t>rutrum</a:t>
             </a:r>
             <a:r>
-              <a:rPr lang="fr-FR" dirty="0" smtClean="0"/>
-              <a:t> </a:t>
-            </a:r>
-            <a:r>
-              <a:rPr lang="fr-FR" dirty="0" err="1" smtClean="0"/>
+              <a:rPr lang="fr-FR" dirty="false" smtClean="false"/>
+              <a:t> </a:t>
+            </a:r>
+            <a:r>
+              <a:rPr lang="fr-FR" dirty="false" err="true" smtClean="false"/>
               <a:t>suscipit</a:t>
             </a:r>
             <a:r>
-              <a:rPr lang="fr-FR" dirty="0" smtClean="0"/>
-              <a:t> </a:t>
-            </a:r>
-            <a:r>
-              <a:rPr lang="fr-FR" dirty="0" err="1" smtClean="0"/>
+              <a:rPr lang="fr-FR" dirty="false" smtClean="false"/>
+              <a:t> </a:t>
+            </a:r>
+            <a:r>
+              <a:rPr lang="fr-FR" dirty="false" err="true" smtClean="false"/>
               <a:t>nisl</a:t>
             </a:r>
             <a:r>
-              <a:rPr lang="fr-FR" dirty="0" smtClean="0"/>
+              <a:rPr lang="fr-FR" dirty="false" smtClean="false"/>
               <a:t>. </a:t>
             </a:r>
             <a:r>
-              <a:rPr lang="fr-FR" dirty="0" err="1" smtClean="0"/>
+              <a:rPr lang="fr-FR" dirty="false" err="true" smtClean="false"/>
               <a:t>Cras</a:t>
             </a:r>
             <a:r>
-              <a:rPr lang="fr-FR" dirty="0" smtClean="0"/>
-              <a:t> </a:t>
-            </a:r>
-            <a:r>
-              <a:rPr lang="fr-FR" dirty="0" err="1" smtClean="0"/>
+              <a:rPr lang="fr-FR" dirty="false" smtClean="false"/>
+              <a:t> </a:t>
+            </a:r>
+            <a:r>
+              <a:rPr lang="fr-FR" dirty="false" err="true" smtClean="false"/>
               <a:t>ullamcorper</a:t>
             </a:r>
             <a:r>
-              <a:rPr lang="fr-FR" dirty="0" smtClean="0"/>
+              <a:rPr lang="fr-FR" dirty="false" smtClean="false"/>
               <a:t> magna </a:t>
             </a:r>
             <a:r>
-              <a:rPr lang="fr-FR" dirty="0" err="1" smtClean="0"/>
+              <a:rPr lang="fr-FR" dirty="false" err="true" smtClean="false"/>
               <a:t>eros</a:t>
             </a:r>
             <a:r>
-              <a:rPr lang="fr-FR" dirty="0" smtClean="0"/>
+              <a:rPr lang="fr-FR" dirty="false" smtClean="false"/>
               <a:t>, </a:t>
             </a:r>
             <a:r>
-              <a:rPr lang="fr-FR" dirty="0" err="1" smtClean="0"/>
+              <a:rPr lang="fr-FR" dirty="false" err="true" smtClean="false"/>
               <a:t>eget</a:t>
             </a:r>
             <a:r>
-              <a:rPr lang="fr-FR" dirty="0" smtClean="0"/>
-              <a:t> </a:t>
-            </a:r>
-            <a:r>
-              <a:rPr lang="fr-FR" dirty="0" err="1" smtClean="0"/>
+              <a:rPr lang="fr-FR" dirty="false" smtClean="false"/>
+              <a:t> </a:t>
+            </a:r>
+            <a:r>
+              <a:rPr lang="fr-FR" dirty="false" err="true" smtClean="false"/>
               <a:t>aliquet</a:t>
             </a:r>
             <a:r>
-              <a:rPr lang="fr-FR" dirty="0" smtClean="0"/>
-              <a:t> </a:t>
-            </a:r>
-            <a:r>
-              <a:rPr lang="fr-FR" dirty="0" err="1" smtClean="0"/>
+              <a:rPr lang="fr-FR" dirty="false" smtClean="false"/>
+              <a:t> </a:t>
+            </a:r>
+            <a:r>
+              <a:rPr lang="fr-FR" dirty="false" err="true" smtClean="false"/>
               <a:t>odio</a:t>
             </a:r>
             <a:r>
-              <a:rPr lang="fr-FR" dirty="0" smtClean="0"/>
-              <a:t> </a:t>
-            </a:r>
-            <a:r>
-              <a:rPr lang="fr-FR" dirty="0" err="1" smtClean="0"/>
+              <a:rPr lang="fr-FR" dirty="false" smtClean="false"/>
+              <a:t> </a:t>
+            </a:r>
+            <a:r>
+              <a:rPr lang="fr-FR" dirty="false" err="true" smtClean="false"/>
               <a:t>consequat</a:t>
             </a:r>
             <a:r>
-              <a:rPr lang="fr-FR" dirty="0" smtClean="0"/>
-              <a:t> </a:t>
-            </a:r>
-            <a:r>
-              <a:rPr lang="fr-FR" dirty="0" err="1" smtClean="0"/>
+              <a:rPr lang="fr-FR" dirty="false" smtClean="false"/>
+              <a:t> </a:t>
+            </a:r>
+            <a:r>
+              <a:rPr lang="fr-FR" dirty="false" err="true" smtClean="false"/>
               <a:t>rhoncus</a:t>
             </a:r>
             <a:r>
-              <a:rPr lang="fr-FR" dirty="0" smtClean="0"/>
+              <a:rPr lang="fr-FR" dirty="false" smtClean="false"/>
               <a:t>. </a:t>
             </a:r>
             <a:r>
-              <a:rPr lang="fr-FR" dirty="0" err="1" smtClean="0"/>
+              <a:rPr lang="fr-FR" dirty="false" err="true" smtClean="false"/>
               <a:t>Proin</a:t>
             </a:r>
             <a:r>
-              <a:rPr lang="fr-FR" dirty="0" smtClean="0"/>
+              <a:rPr lang="fr-FR" dirty="false" smtClean="false"/>
               <a:t> at </a:t>
             </a:r>
             <a:r>
-              <a:rPr lang="fr-FR" dirty="0" err="1" smtClean="0"/>
+              <a:rPr lang="fr-FR" dirty="false" err="true" smtClean="false"/>
               <a:t>nisl</a:t>
             </a:r>
             <a:r>
-              <a:rPr lang="fr-FR" dirty="0" smtClean="0"/>
+              <a:rPr lang="fr-FR" dirty="false" smtClean="false"/>
               <a:t> mollis, </a:t>
             </a:r>
             <a:r>
-              <a:rPr lang="fr-FR" dirty="0" err="1" smtClean="0"/>
+              <a:rPr lang="fr-FR" dirty="false" err="true" smtClean="false"/>
               <a:t>congue</a:t>
             </a:r>
             <a:r>
-              <a:rPr lang="fr-FR" dirty="0" smtClean="0"/>
-              <a:t> </a:t>
-            </a:r>
-            <a:r>
-              <a:rPr lang="fr-FR" dirty="0" err="1" smtClean="0"/>
+              <a:rPr lang="fr-FR" dirty="false" smtClean="false"/>
+              <a:t> </a:t>
+            </a:r>
+            <a:r>
+              <a:rPr lang="fr-FR" dirty="false" err="true" smtClean="false"/>
               <a:t>quam</a:t>
             </a:r>
             <a:r>
-              <a:rPr lang="fr-FR" dirty="0" smtClean="0"/>
+              <a:rPr lang="fr-FR" dirty="false" smtClean="false"/>
               <a:t> id, </a:t>
             </a:r>
             <a:r>
-              <a:rPr lang="fr-FR" dirty="0" err="1" smtClean="0"/>
+              <a:rPr lang="fr-FR" dirty="false" err="true" smtClean="false"/>
               <a:t>malesuada</a:t>
             </a:r>
             <a:r>
-              <a:rPr lang="fr-FR" dirty="0" smtClean="0"/>
-              <a:t> </a:t>
-            </a:r>
-            <a:r>
-              <a:rPr lang="fr-FR" dirty="0" err="1" smtClean="0"/>
+              <a:rPr lang="fr-FR" dirty="false" smtClean="false"/>
+              <a:t> </a:t>
+            </a:r>
+            <a:r>
+              <a:rPr lang="fr-FR" dirty="false" err="true" smtClean="false"/>
               <a:t>felis</a:t>
             </a:r>
             <a:r>
-              <a:rPr lang="fr-FR" dirty="0" smtClean="0"/>
+              <a:rPr lang="fr-FR" dirty="false" smtClean="false"/>
               <a:t>. Suspendisse </a:t>
             </a:r>
             <a:r>
-              <a:rPr lang="fr-FR" dirty="0" err="1" smtClean="0"/>
+              <a:rPr lang="fr-FR" dirty="false" err="true" smtClean="false"/>
               <a:t>rutrum</a:t>
             </a:r>
             <a:r>
-              <a:rPr lang="fr-FR" dirty="0" smtClean="0"/>
-              <a:t> </a:t>
-            </a:r>
-            <a:r>
-              <a:rPr lang="fr-FR" dirty="0" err="1" smtClean="0"/>
+              <a:rPr lang="fr-FR" dirty="false" smtClean="false"/>
+              <a:t> </a:t>
+            </a:r>
+            <a:r>
+              <a:rPr lang="fr-FR" dirty="false" err="true" smtClean="false"/>
               <a:t>finibus</a:t>
             </a:r>
             <a:r>
-              <a:rPr lang="fr-FR" dirty="0" smtClean="0"/>
-              <a:t> </a:t>
-            </a:r>
-            <a:r>
-              <a:rPr lang="fr-FR" dirty="0" err="1" smtClean="0"/>
+              <a:rPr lang="fr-FR" dirty="false" smtClean="false"/>
+              <a:t> </a:t>
+            </a:r>
+            <a:r>
+              <a:rPr lang="fr-FR" dirty="false" err="true" smtClean="false"/>
               <a:t>velit</a:t>
             </a:r>
             <a:r>
-              <a:rPr lang="fr-FR" dirty="0" smtClean="0"/>
+              <a:rPr lang="fr-FR" dirty="false" smtClean="false"/>
               <a:t>, </a:t>
             </a:r>
             <a:r>
-              <a:rPr lang="fr-FR" dirty="0" err="1" smtClean="0"/>
+              <a:rPr lang="fr-FR" dirty="false" err="true" smtClean="false"/>
               <a:t>quis</a:t>
             </a:r>
             <a:r>
-              <a:rPr lang="fr-FR" dirty="0" smtClean="0"/>
-              <a:t> </a:t>
-            </a:r>
-            <a:r>
-              <a:rPr lang="fr-FR" dirty="0" err="1" smtClean="0"/>
+              <a:rPr lang="fr-FR" dirty="false" smtClean="false"/>
+              <a:t> </a:t>
+            </a:r>
+            <a:r>
+              <a:rPr lang="fr-FR" dirty="false" err="true" smtClean="false"/>
               <a:t>aliquet</a:t>
             </a:r>
             <a:r>
-              <a:rPr lang="fr-FR" dirty="0" smtClean="0"/>
-              <a:t> </a:t>
-            </a:r>
-            <a:r>
-              <a:rPr lang="fr-FR" dirty="0" err="1" smtClean="0"/>
+              <a:rPr lang="fr-FR" dirty="false" smtClean="false"/>
+              <a:t> </a:t>
+            </a:r>
+            <a:r>
+              <a:rPr lang="fr-FR" dirty="false" err="true" smtClean="false"/>
               <a:t>augue</a:t>
             </a:r>
             <a:r>
-              <a:rPr lang="fr-FR" dirty="0" smtClean="0"/>
-              <a:t> </a:t>
-            </a:r>
-            <a:r>
-              <a:rPr lang="fr-FR" dirty="0" err="1" smtClean="0"/>
+              <a:rPr lang="fr-FR" dirty="false" smtClean="false"/>
+              <a:t> </a:t>
+            </a:r>
+            <a:r>
+              <a:rPr lang="fr-FR" dirty="false" err="true" smtClean="false"/>
               <a:t>rhoncus</a:t>
             </a:r>
             <a:r>
-              <a:rPr lang="fr-FR" dirty="0" smtClean="0"/>
+              <a:rPr lang="fr-FR" dirty="false" smtClean="false"/>
               <a:t> ut</a:t>
             </a:r>
-            <a:endParaRPr lang="fr-FR" dirty="0"/>
+            <a:endParaRPr lang="fr-FR" dirty="false"/>
           </a:p>
         </p:txBody>
       </p:sp>

</xml_diff>

<commit_message>
REFACTOR Extract pptx load and save in a class in order to change to XML saving
</commit_message>
<xml_diff>
--- a/sample-docs/pptx-copy.pptx
+++ b/sample-docs/pptx-copy.pptx
@@ -462,7 +462,7 @@
 </file>
 
 <file path=ppt/notesSlides/notesSlide1.xml><?xml version="1.0" encoding="utf-8"?>
-<p:notes xmlns:a="http://schemas.openxmlformats.org/drawingml/2006/main" xmlns:r="http://schemas.openxmlformats.org/officeDocument/2006/relationships" xmlns:p="http://schemas.openxmlformats.org/presentationml/2006/main" xmlns:mc="http://schemas.openxmlformats.org/markup-compatibility/2006" xmlns:c="http://schemas.openxmlformats.org/drawingml/2006/chart" xmlns:ns6="http://schemas.openxmlformats.org/drawingml/2006/chartDrawing" xmlns:dgm="http://schemas.openxmlformats.org/drawingml/2006/diagram" xmlns:pic="http://schemas.openxmlformats.org/drawingml/2006/picture" xmlns:wp="http://schemas.openxmlformats.org/drawingml/2006/wordprocessingDrawing" xmlns:wp14="http://schemas.microsoft.com/office/word/2010/wordprocessingDrawing" xmlns:xdr="http://schemas.openxmlformats.org/drawingml/2006/spreadsheetDrawing" xmlns:ns12="http://schemas.openxmlformats.org/drawingml/2006/compatibility" xmlns:ns13="http://schemas.openxmlformats.org/drawingml/2006/lockedCanvas">
+<p:notes xmlns:a="http://schemas.openxmlformats.org/drawingml/2006/main" xmlns:r="http://schemas.openxmlformats.org/officeDocument/2006/relationships" xmlns:p="http://schemas.openxmlformats.org/presentationml/2006/main">
   <p:cSld>
     <p:spTree>
       <p:nvGrpSpPr>
@@ -482,7 +482,7 @@
         <p:nvSpPr>
           <p:cNvPr id="2" name="Espace réservé de l'image des diapositives 1"/>
           <p:cNvSpPr>
-            <a:spLocks noGrp="true" noRot="true" noChangeAspect="true"/>
+            <a:spLocks noGrp="1" noRot="1" noChangeAspect="1"/>
           </p:cNvSpPr>
           <p:nvPr>
             <p:ph type="sldImg"/>
@@ -494,7 +494,7 @@
         <p:nvSpPr>
           <p:cNvPr id="3" name="Espace réservé des commentaires 2"/>
           <p:cNvSpPr>
-            <a:spLocks noGrp="true"/>
+            <a:spLocks noGrp="1"/>
           </p:cNvSpPr>
           <p:nvPr>
             <p:ph type="body" idx="1"/>
@@ -506,53 +506,192 @@
           <a:lstStyle/>
           <a:p>
             <a:r>
-              <a:t>Begin of comment from slide 1</a:t>
-            </a:r>
-          </a:p>
-          <a:p>
-            <a:r>
-              <a:t>Lorem ipsum dolor sit amet, consectetur adipiscing elit. Pellentesque porta sed tellus volutpat sed.</a:t>
-            </a:r>
-          </a:p>
-          <a:p>
-            <a:r>
-              <a:t>End of comment from slide 1</a:t>
-            </a:r>
-          </a:p>
-          <a:p>
-            <a:r>
-              <a:t/>
-            </a:r>
-          </a:p>
-          <a:p>
-            <a:r>
-              <a:t>=== Original comments from ./sample-docs/pptx-copy.pptx===</a:t>
-            </a:r>
-          </a:p>
-          <a:p>
-            <a:r>
-              <a:t>Begin of comment from slide 1</a:t>
-            </a:r>
-          </a:p>
-          <a:p>
-            <a:r>
-              <a:t>Copy copy copy copy copy Copy copy copy copy copy Copy copy copy copy copy Copy copy copy copy copy </a:t>
-            </a:r>
-          </a:p>
-          <a:p>
-            <a:r>
-              <a:t>End of comment from slide 1</a:t>
-            </a:r>
-          </a:p>
-          <a:p>
-            <a:r>
-              <a:t/>
-            </a:r>
-          </a:p>
-          <a:p>
-            <a:r>
-              <a:t/>
-            </a:r>
+              <a:rPr lang="fr-FR" dirty="0" smtClean="0"/>
+              <a:t>Begin of comment </a:t>
+            </a:r>
+            <a:r>
+              <a:rPr lang="fr-FR" dirty="0" err="1" smtClean="0"/>
+              <a:t>from</a:t>
+            </a:r>
+            <a:r>
+              <a:rPr lang="fr-FR" dirty="0" smtClean="0"/>
+              <a:t> slide 1</a:t>
+            </a:r>
+          </a:p>
+          <a:p>
+            <a:r>
+              <a:rPr lang="fr-FR" dirty="0" smtClean="0"/>
+              <a:t>Copy </a:t>
+            </a:r>
+            <a:r>
+              <a:rPr lang="fr-FR" dirty="0" err="1" smtClean="0"/>
+              <a:t>copy</a:t>
+            </a:r>
+            <a:r>
+              <a:rPr lang="fr-FR" dirty="0" smtClean="0"/>
+              <a:t> </a:t>
+            </a:r>
+            <a:r>
+              <a:rPr lang="fr-FR" dirty="0" err="1" smtClean="0"/>
+              <a:t>copy</a:t>
+            </a:r>
+            <a:r>
+              <a:rPr lang="fr-FR" dirty="0" smtClean="0"/>
+              <a:t> </a:t>
+            </a:r>
+            <a:r>
+              <a:rPr lang="fr-FR" dirty="0" err="1" smtClean="0"/>
+              <a:t>copy</a:t>
+            </a:r>
+            <a:r>
+              <a:rPr lang="fr-FR" dirty="0" smtClean="0"/>
+              <a:t> </a:t>
+            </a:r>
+            <a:r>
+              <a:rPr lang="fr-FR" dirty="0" err="1" smtClean="0"/>
+              <a:t>copy</a:t>
+            </a:r>
+            <a:r>
+              <a:rPr lang="fr-FR" dirty="0" smtClean="0"/>
+              <a:t> </a:t>
+            </a:r>
+            <a:r>
+              <a:rPr lang="fr-FR" dirty="0" err="1" smtClean="0"/>
+              <a:t>Copy</a:t>
+            </a:r>
+            <a:r>
+              <a:rPr lang="fr-FR" dirty="0" smtClean="0"/>
+              <a:t> </a:t>
+            </a:r>
+            <a:r>
+              <a:rPr lang="fr-FR" dirty="0" err="1" smtClean="0"/>
+              <a:t>copy</a:t>
+            </a:r>
+            <a:r>
+              <a:rPr lang="fr-FR" dirty="0" smtClean="0"/>
+              <a:t> </a:t>
+            </a:r>
+            <a:r>
+              <a:rPr lang="fr-FR" dirty="0" err="1" smtClean="0"/>
+              <a:t>copy</a:t>
+            </a:r>
+            <a:r>
+              <a:rPr lang="fr-FR" dirty="0" smtClean="0"/>
+              <a:t> </a:t>
+            </a:r>
+            <a:r>
+              <a:rPr lang="fr-FR" dirty="0" err="1" smtClean="0"/>
+              <a:t>copy</a:t>
+            </a:r>
+            <a:r>
+              <a:rPr lang="fr-FR" dirty="0" smtClean="0"/>
+              <a:t> </a:t>
+            </a:r>
+            <a:r>
+              <a:rPr lang="fr-FR" dirty="0" err="1" smtClean="0"/>
+              <a:t>copy</a:t>
+            </a:r>
+            <a:r>
+              <a:rPr lang="fr-FR" dirty="0" smtClean="0"/>
+              <a:t> </a:t>
+            </a:r>
+            <a:r>
+              <a:rPr lang="fr-FR" dirty="0" err="1" smtClean="0"/>
+              <a:t>Copy</a:t>
+            </a:r>
+            <a:r>
+              <a:rPr lang="fr-FR" dirty="0" smtClean="0"/>
+              <a:t> </a:t>
+            </a:r>
+            <a:r>
+              <a:rPr lang="fr-FR" dirty="0" err="1" smtClean="0"/>
+              <a:t>copy</a:t>
+            </a:r>
+            <a:r>
+              <a:rPr lang="fr-FR" dirty="0" smtClean="0"/>
+              <a:t> </a:t>
+            </a:r>
+            <a:r>
+              <a:rPr lang="fr-FR" dirty="0" err="1" smtClean="0"/>
+              <a:t>copy</a:t>
+            </a:r>
+            <a:r>
+              <a:rPr lang="fr-FR" dirty="0" smtClean="0"/>
+              <a:t> </a:t>
+            </a:r>
+            <a:r>
+              <a:rPr lang="fr-FR" dirty="0" err="1" smtClean="0"/>
+              <a:t>copy</a:t>
+            </a:r>
+            <a:r>
+              <a:rPr lang="fr-FR" dirty="0" smtClean="0"/>
+              <a:t> </a:t>
+            </a:r>
+            <a:r>
+              <a:rPr lang="fr-FR" dirty="0" err="1" smtClean="0"/>
+              <a:t>copy</a:t>
+            </a:r>
+            <a:r>
+              <a:rPr lang="fr-FR" dirty="0" smtClean="0"/>
+              <a:t> </a:t>
+            </a:r>
+            <a:r>
+              <a:rPr lang="fr-FR" dirty="0" err="1" smtClean="0"/>
+              <a:t>Copy</a:t>
+            </a:r>
+            <a:r>
+              <a:rPr lang="fr-FR" dirty="0" smtClean="0"/>
+              <a:t> </a:t>
+            </a:r>
+            <a:r>
+              <a:rPr lang="fr-FR" dirty="0" err="1" smtClean="0"/>
+              <a:t>copy</a:t>
+            </a:r>
+            <a:r>
+              <a:rPr lang="fr-FR" dirty="0" smtClean="0"/>
+              <a:t> </a:t>
+            </a:r>
+            <a:r>
+              <a:rPr lang="fr-FR" dirty="0" err="1" smtClean="0"/>
+              <a:t>copy</a:t>
+            </a:r>
+            <a:r>
+              <a:rPr lang="fr-FR" dirty="0" smtClean="0"/>
+              <a:t> </a:t>
+            </a:r>
+            <a:r>
+              <a:rPr lang="fr-FR" dirty="0" err="1" smtClean="0"/>
+              <a:t>copy</a:t>
+            </a:r>
+            <a:r>
+              <a:rPr lang="fr-FR" dirty="0" smtClean="0"/>
+              <a:t> </a:t>
+            </a:r>
+            <a:r>
+              <a:rPr lang="fr-FR" dirty="0" err="1" smtClean="0"/>
+              <a:t>copy</a:t>
+            </a:r>
+            <a:r>
+              <a:rPr lang="fr-FR" dirty="0" smtClean="0"/>
+              <a:t> </a:t>
+            </a:r>
+          </a:p>
+          <a:p>
+            <a:r>
+              <a:rPr lang="fr-FR" dirty="0" smtClean="0"/>
+              <a:t>End of comment </a:t>
+            </a:r>
+            <a:r>
+              <a:rPr lang="fr-FR" dirty="0" err="1" smtClean="0"/>
+              <a:t>from</a:t>
+            </a:r>
+            <a:r>
+              <a:rPr lang="fr-FR" dirty="0" smtClean="0"/>
+              <a:t> slide 1</a:t>
+            </a:r>
+          </a:p>
+          <a:p>
+            <a:endParaRPr lang="fr-FR" dirty="0"/>
           </a:p>
         </p:txBody>
       </p:sp>
@@ -560,7 +699,7 @@
         <p:nvSpPr>
           <p:cNvPr id="4" name="Espace réservé du numéro de diapositive 3"/>
           <p:cNvSpPr>
-            <a:spLocks noGrp="true"/>
+            <a:spLocks noGrp="1"/>
           </p:cNvSpPr>
           <p:nvPr>
             <p:ph type="sldNum" sz="quarter" idx="10"/>
@@ -571,63 +710,10 @@
           <a:bodyPr/>
           <a:lstStyle/>
           <a:p>
-            <a:r>
-              <a:t>Begin of comment from slide 1</a:t>
-            </a:r>
-            <a:endParaRPr lang="fr-FR"/>
-          </a:p>
-          <a:p>
-            <a:r>
-              <a:t>Lorem ipsum dolor sit amet, consectetur adipiscing elit. Pellentesque porta sed tellus volutpat sed.</a:t>
-            </a:r>
-            <a:endParaRPr lang="fr-FR"/>
-          </a:p>
-          <a:p>
-            <a:r>
-              <a:t>End of comment from slide 1</a:t>
-            </a:r>
-            <a:endParaRPr lang="fr-FR"/>
-          </a:p>
-          <a:p>
-            <a:r>
-              <a:t/>
-            </a:r>
-            <a:endParaRPr lang="fr-FR"/>
-          </a:p>
-          <a:p>
-            <a:r>
-              <a:t>=== Original comments from ./sample-docs/pptx-copy.pptx===</a:t>
-            </a:r>
-            <a:endParaRPr lang="fr-FR"/>
-          </a:p>
-          <a:p>
-            <a:r>
-              <a:t>Begin of comment from slide 1</a:t>
-            </a:r>
-            <a:endParaRPr lang="fr-FR"/>
-          </a:p>
-          <a:p>
-            <a:r>
-              <a:t>Copy copy copy copy copy Copy copy copy copy copy Copy copy copy copy copy Copy copy copy copy copy </a:t>
-            </a:r>
-            <a:endParaRPr lang="fr-FR"/>
-          </a:p>
-          <a:p>
-            <a:r>
-              <a:t>End of comment from slide 1</a:t>
-            </a:r>
-            <a:endParaRPr lang="fr-FR"/>
-          </a:p>
-          <a:p>
-            <a:r>
-              <a:t/>
-            </a:r>
-            <a:endParaRPr lang="fr-FR"/>
-          </a:p>
-          <a:p>
-            <a:r>
-              <a:t/>
-            </a:r>
+            <a:fld id="{D087CDC4-FBA2-44CE-A15A-CFDDF7DA6987}" type="slidenum">
+              <a:rPr lang="fr-FR" smtClean="0"/>
+              <a:t>1</a:t>
+            </a:fld>
             <a:endParaRPr lang="fr-FR"/>
           </a:p>
         </p:txBody>
@@ -646,7 +732,7 @@
 </file>
 
 <file path=ppt/notesSlides/notesSlide2.xml><?xml version="1.0" encoding="utf-8"?>
-<p:notes xmlns:a="http://schemas.openxmlformats.org/drawingml/2006/main" xmlns:r="http://schemas.openxmlformats.org/officeDocument/2006/relationships" xmlns:p="http://schemas.openxmlformats.org/presentationml/2006/main" xmlns:mc="http://schemas.openxmlformats.org/markup-compatibility/2006" xmlns:c="http://schemas.openxmlformats.org/drawingml/2006/chart" xmlns:ns6="http://schemas.openxmlformats.org/drawingml/2006/chartDrawing" xmlns:dgm="http://schemas.openxmlformats.org/drawingml/2006/diagram" xmlns:pic="http://schemas.openxmlformats.org/drawingml/2006/picture" xmlns:wp="http://schemas.openxmlformats.org/drawingml/2006/wordprocessingDrawing" xmlns:wp14="http://schemas.microsoft.com/office/word/2010/wordprocessingDrawing" xmlns:xdr="http://schemas.openxmlformats.org/drawingml/2006/spreadsheetDrawing" xmlns:ns12="http://schemas.openxmlformats.org/drawingml/2006/compatibility" xmlns:ns13="http://schemas.openxmlformats.org/drawingml/2006/lockedCanvas">
+<p:notes xmlns:a="http://schemas.openxmlformats.org/drawingml/2006/main" xmlns:r="http://schemas.openxmlformats.org/officeDocument/2006/relationships" xmlns:p="http://schemas.openxmlformats.org/presentationml/2006/main">
   <p:cSld>
     <p:spTree>
       <p:nvGrpSpPr>
@@ -666,7 +752,7 @@
         <p:nvSpPr>
           <p:cNvPr id="2" name="Espace réservé de l'image des diapositives 1"/>
           <p:cNvSpPr>
-            <a:spLocks noGrp="true" noRot="true" noChangeAspect="true"/>
+            <a:spLocks noGrp="1" noRot="1" noChangeAspect="1"/>
           </p:cNvSpPr>
           <p:nvPr>
             <p:ph type="sldImg"/>
@@ -678,7 +764,7 @@
         <p:nvSpPr>
           <p:cNvPr id="3" name="Espace réservé des commentaires 2"/>
           <p:cNvSpPr>
-            <a:spLocks noGrp="true"/>
+            <a:spLocks noGrp="1"/>
           </p:cNvSpPr>
           <p:nvPr>
             <p:ph type="body" idx="1"/>
@@ -690,53 +776,176 @@
           <a:lstStyle/>
           <a:p>
             <a:r>
+              <a:rPr lang="fr-FR" dirty="0" smtClean="0"/>
               <a:t>Begin of comment slide 2</a:t>
             </a:r>
           </a:p>
           <a:p>
             <a:r>
-              <a:t>Lorem ipsum dolor sit amet, consectetur adipiscing elit. Pellentesque porta sed tellus volutpat sed.</a:t>
-            </a:r>
-          </a:p>
-          <a:p>
-            <a:r>
+              <a:rPr lang="fr-FR" dirty="0" smtClean="0"/>
+              <a:t>Copy </a:t>
+            </a:r>
+            <a:r>
+              <a:rPr lang="fr-FR" dirty="0" err="1" smtClean="0"/>
+              <a:t>copy</a:t>
+            </a:r>
+            <a:r>
+              <a:rPr lang="fr-FR" dirty="0" smtClean="0"/>
+              <a:t> </a:t>
+            </a:r>
+            <a:r>
+              <a:rPr lang="fr-FR" dirty="0" err="1" smtClean="0"/>
+              <a:t>copy</a:t>
+            </a:r>
+            <a:r>
+              <a:rPr lang="fr-FR" dirty="0" smtClean="0"/>
+              <a:t> </a:t>
+            </a:r>
+            <a:r>
+              <a:rPr lang="fr-FR" dirty="0" err="1" smtClean="0"/>
+              <a:t>copy</a:t>
+            </a:r>
+            <a:r>
+              <a:rPr lang="fr-FR" dirty="0" smtClean="0"/>
+              <a:t> </a:t>
+            </a:r>
+            <a:r>
+              <a:rPr lang="fr-FR" dirty="0" err="1" smtClean="0"/>
+              <a:t>copy</a:t>
+            </a:r>
+            <a:r>
+              <a:rPr lang="fr-FR" dirty="0" smtClean="0"/>
+              <a:t> </a:t>
+            </a:r>
+            <a:r>
+              <a:rPr lang="fr-FR" dirty="0" err="1" smtClean="0"/>
+              <a:t>Copy</a:t>
+            </a:r>
+            <a:r>
+              <a:rPr lang="fr-FR" dirty="0" smtClean="0"/>
+              <a:t> </a:t>
+            </a:r>
+            <a:r>
+              <a:rPr lang="fr-FR" dirty="0" err="1" smtClean="0"/>
+              <a:t>copy</a:t>
+            </a:r>
+            <a:r>
+              <a:rPr lang="fr-FR" dirty="0" smtClean="0"/>
+              <a:t> </a:t>
+            </a:r>
+            <a:r>
+              <a:rPr lang="fr-FR" dirty="0" err="1" smtClean="0"/>
+              <a:t>copy</a:t>
+            </a:r>
+            <a:r>
+              <a:rPr lang="fr-FR" dirty="0" smtClean="0"/>
+              <a:t> </a:t>
+            </a:r>
+            <a:r>
+              <a:rPr lang="fr-FR" dirty="0" err="1" smtClean="0"/>
+              <a:t>copy</a:t>
+            </a:r>
+            <a:r>
+              <a:rPr lang="fr-FR" dirty="0" smtClean="0"/>
+              <a:t> </a:t>
+            </a:r>
+            <a:r>
+              <a:rPr lang="fr-FR" dirty="0" err="1" smtClean="0"/>
+              <a:t>copy</a:t>
+            </a:r>
+            <a:r>
+              <a:rPr lang="fr-FR" dirty="0" smtClean="0"/>
+              <a:t> </a:t>
+            </a:r>
+            <a:r>
+              <a:rPr lang="fr-FR" dirty="0" err="1" smtClean="0"/>
+              <a:t>Copy</a:t>
+            </a:r>
+            <a:r>
+              <a:rPr lang="fr-FR" dirty="0" smtClean="0"/>
+              <a:t> </a:t>
+            </a:r>
+            <a:r>
+              <a:rPr lang="fr-FR" dirty="0" err="1" smtClean="0"/>
+              <a:t>copy</a:t>
+            </a:r>
+            <a:r>
+              <a:rPr lang="fr-FR" dirty="0" smtClean="0"/>
+              <a:t> </a:t>
+            </a:r>
+            <a:r>
+              <a:rPr lang="fr-FR" dirty="0" err="1" smtClean="0"/>
+              <a:t>copy</a:t>
+            </a:r>
+            <a:r>
+              <a:rPr lang="fr-FR" dirty="0" smtClean="0"/>
+              <a:t> </a:t>
+            </a:r>
+            <a:r>
+              <a:rPr lang="fr-FR" dirty="0" err="1" smtClean="0"/>
+              <a:t>copy</a:t>
+            </a:r>
+            <a:r>
+              <a:rPr lang="fr-FR" dirty="0" smtClean="0"/>
+              <a:t> </a:t>
+            </a:r>
+            <a:r>
+              <a:rPr lang="fr-FR" dirty="0" err="1" smtClean="0"/>
+              <a:t>copy</a:t>
+            </a:r>
+            <a:r>
+              <a:rPr lang="fr-FR" dirty="0" smtClean="0"/>
+              <a:t> </a:t>
+            </a:r>
+            <a:r>
+              <a:rPr lang="fr-FR" dirty="0" err="1" smtClean="0"/>
+              <a:t>Copy</a:t>
+            </a:r>
+            <a:r>
+              <a:rPr lang="fr-FR" dirty="0" smtClean="0"/>
+              <a:t> </a:t>
+            </a:r>
+            <a:r>
+              <a:rPr lang="fr-FR" dirty="0" err="1" smtClean="0"/>
+              <a:t>copy</a:t>
+            </a:r>
+            <a:r>
+              <a:rPr lang="fr-FR" dirty="0" smtClean="0"/>
+              <a:t> </a:t>
+            </a:r>
+            <a:r>
+              <a:rPr lang="fr-FR" dirty="0" err="1" smtClean="0"/>
+              <a:t>copy</a:t>
+            </a:r>
+            <a:r>
+              <a:rPr lang="fr-FR" dirty="0" smtClean="0"/>
+              <a:t> </a:t>
+            </a:r>
+            <a:r>
+              <a:rPr lang="fr-FR" dirty="0" err="1" smtClean="0"/>
+              <a:t>copy</a:t>
+            </a:r>
+            <a:r>
+              <a:rPr lang="fr-FR" dirty="0" smtClean="0"/>
+              <a:t> </a:t>
+            </a:r>
+            <a:r>
+              <a:rPr lang="fr-FR" dirty="0" err="1" smtClean="0"/>
+              <a:t>copy</a:t>
+            </a:r>
+            <a:r>
+              <a:rPr lang="fr-FR" dirty="0" smtClean="0"/>
+              <a:t> </a:t>
+            </a:r>
+          </a:p>
+          <a:p>
+            <a:r>
+              <a:rPr lang="fr-FR" smtClean="0"/>
               <a:t>End of comment slide 2</a:t>
             </a:r>
           </a:p>
           <a:p>
-            <a:r>
-              <a:t/>
-            </a:r>
-          </a:p>
-          <a:p>
-            <a:r>
-              <a:t>=== Original comments from ./sample-docs/pptx-copy.pptx===</a:t>
-            </a:r>
-          </a:p>
-          <a:p>
-            <a:r>
-              <a:t>Begin of comment slide 2</a:t>
-            </a:r>
-          </a:p>
-          <a:p>
-            <a:r>
-              <a:t>Copy copy copy copy copy Copy copy copy copy copy Copy copy copy copy copy Copy copy copy copy copy </a:t>
-            </a:r>
-          </a:p>
-          <a:p>
-            <a:r>
-              <a:t>End of comment slide 2</a:t>
-            </a:r>
-          </a:p>
-          <a:p>
-            <a:r>
-              <a:t/>
-            </a:r>
-          </a:p>
-          <a:p>
-            <a:r>
-              <a:t/>
-            </a:r>
+            <a:endParaRPr lang="fr-FR"/>
           </a:p>
         </p:txBody>
       </p:sp>
@@ -744,7 +953,7 @@
         <p:nvSpPr>
           <p:cNvPr id="4" name="Espace réservé du numéro de diapositive 3"/>
           <p:cNvSpPr>
-            <a:spLocks noGrp="true"/>
+            <a:spLocks noGrp="1"/>
           </p:cNvSpPr>
           <p:nvPr>
             <p:ph type="sldNum" sz="quarter" idx="10"/>
@@ -755,63 +964,10 @@
           <a:bodyPr/>
           <a:lstStyle/>
           <a:p>
-            <a:r>
-              <a:t>Begin of comment slide 2</a:t>
-            </a:r>
-            <a:endParaRPr lang="fr-FR"/>
-          </a:p>
-          <a:p>
-            <a:r>
-              <a:t>Lorem ipsum dolor sit amet, consectetur adipiscing elit. Pellentesque porta sed tellus volutpat sed.</a:t>
-            </a:r>
-            <a:endParaRPr lang="fr-FR"/>
-          </a:p>
-          <a:p>
-            <a:r>
-              <a:t>End of comment slide 2</a:t>
-            </a:r>
-            <a:endParaRPr lang="fr-FR"/>
-          </a:p>
-          <a:p>
-            <a:r>
-              <a:t/>
-            </a:r>
-            <a:endParaRPr lang="fr-FR"/>
-          </a:p>
-          <a:p>
-            <a:r>
-              <a:t>=== Original comments from ./sample-docs/pptx-copy.pptx===</a:t>
-            </a:r>
-            <a:endParaRPr lang="fr-FR"/>
-          </a:p>
-          <a:p>
-            <a:r>
-              <a:t>Begin of comment slide 2</a:t>
-            </a:r>
-            <a:endParaRPr lang="fr-FR"/>
-          </a:p>
-          <a:p>
-            <a:r>
-              <a:t>Copy copy copy copy copy Copy copy copy copy copy Copy copy copy copy copy Copy copy copy copy copy </a:t>
-            </a:r>
-            <a:endParaRPr lang="fr-FR"/>
-          </a:p>
-          <a:p>
-            <a:r>
-              <a:t>End of comment slide 2</a:t>
-            </a:r>
-            <a:endParaRPr lang="fr-FR"/>
-          </a:p>
-          <a:p>
-            <a:r>
-              <a:t/>
-            </a:r>
-            <a:endParaRPr lang="fr-FR"/>
-          </a:p>
-          <a:p>
-            <a:r>
-              <a:t/>
-            </a:r>
+            <a:fld id="{D087CDC4-FBA2-44CE-A15A-CFDDF7DA6987}" type="slidenum">
+              <a:rPr lang="fr-FR" smtClean="0"/>
+              <a:t>2</a:t>
+            </a:fld>
             <a:endParaRPr lang="fr-FR"/>
           </a:p>
         </p:txBody>
@@ -830,7 +986,7 @@
 </file>
 
 <file path=ppt/slideLayouts/slideLayout1.xml><?xml version="1.0" encoding="utf-8"?>
-<p:sldLayout xmlns:v="urn:schemas-microsoft-com:vml" xmlns:a="http://schemas.openxmlformats.org/drawingml/2006/main" xmlns:c="http://schemas.openxmlformats.org/drawingml/2006/chart" xmlns:xdr="http://schemas.openxmlformats.org/drawingml/2006/spreadsheetDrawing" xmlns:dgm="http://schemas.openxmlformats.org/drawingml/2006/diagram" xmlns:pic="http://schemas.openxmlformats.org/drawingml/2006/picture" xmlns:wp14="http://schemas.microsoft.com/office/word/2010/wordprocessingDrawing" xmlns:p="http://schemas.openxmlformats.org/presentationml/2006/main" xmlns:ns6="http://schemas.openxmlformats.org/drawingml/2006/chartDrawing" xmlns:r="http://schemas.openxmlformats.org/officeDocument/2006/relationships" xmlns:ns13="http://schemas.openxmlformats.org/drawingml/2006/lockedCanvas" xmlns:ns12="http://schemas.openxmlformats.org/drawingml/2006/compatibility" xmlns:mc="http://schemas.openxmlformats.org/markup-compatibility/2006" xmlns:wp="http://schemas.openxmlformats.org/drawingml/2006/wordprocessingDrawing" type="title" preserve="true">
+<p:sldLayout xmlns:a="http://schemas.openxmlformats.org/drawingml/2006/main" xmlns:r="http://schemas.openxmlformats.org/officeDocument/2006/relationships" xmlns:p="http://schemas.openxmlformats.org/presentationml/2006/main" type="title" preserve="1">
   <p:cSld name="Diapositive de titre">
     <p:spTree>
       <p:nvGrpSpPr>
@@ -850,7 +1006,7 @@
         <p:nvSpPr>
           <p:cNvPr id="2" name="Titre 1"/>
           <p:cNvSpPr>
-            <a:spLocks noGrp="true"/>
+            <a:spLocks noGrp="1"/>
           </p:cNvSpPr>
           <p:nvPr>
             <p:ph type="ctrTitle"/>
@@ -871,7 +1027,7 @@
           </a:lstStyle>
           <a:p>
             <a:r>
-              <a:rPr lang="fr-FR" smtClean="false"/>
+              <a:rPr lang="fr-FR" smtClean="0"/>
               <a:t>Modifiez le style du titre</a:t>
             </a:r>
             <a:endParaRPr lang="fr-FR"/>
@@ -882,7 +1038,7 @@
         <p:nvSpPr>
           <p:cNvPr id="3" name="Sous-titre 2"/>
           <p:cNvSpPr>
-            <a:spLocks noGrp="true"/>
+            <a:spLocks noGrp="1"/>
           </p:cNvSpPr>
           <p:nvPr>
             <p:ph type="subTitle" idx="1"/>
@@ -936,7 +1092,7 @@
           </a:lstStyle>
           <a:p>
             <a:r>
-              <a:rPr lang="fr-FR" smtClean="false"/>
+              <a:rPr lang="fr-FR" smtClean="0"/>
               <a:t>Modifiez le style des sous-titres du masque</a:t>
             </a:r>
             <a:endParaRPr lang="fr-FR"/>
@@ -947,7 +1103,7 @@
         <p:nvSpPr>
           <p:cNvPr id="4" name="Espace réservé de la date 3"/>
           <p:cNvSpPr>
-            <a:spLocks noGrp="true"/>
+            <a:spLocks noGrp="1"/>
           </p:cNvSpPr>
           <p:nvPr>
             <p:ph type="dt" sz="half" idx="10"/>
@@ -959,7 +1115,7 @@
           <a:lstStyle/>
           <a:p>
             <a:fld id="{E7E4853E-ECDD-443A-840C-1FE284273B35}" type="datetimeFigureOut">
-              <a:rPr lang="fr-FR" smtClean="false"/>
+              <a:rPr lang="fr-FR" smtClean="0"/>
               <a:t>14/02/2017</a:t>
             </a:fld>
             <a:endParaRPr lang="fr-FR"/>
@@ -970,7 +1126,7 @@
         <p:nvSpPr>
           <p:cNvPr id="5" name="Espace réservé du pied de page 4"/>
           <p:cNvSpPr>
-            <a:spLocks noGrp="true"/>
+            <a:spLocks noGrp="1"/>
           </p:cNvSpPr>
           <p:nvPr>
             <p:ph type="ftr" sz="quarter" idx="11"/>
@@ -989,7 +1145,7 @@
         <p:nvSpPr>
           <p:cNvPr id="6" name="Espace réservé du numéro de diapositive 5"/>
           <p:cNvSpPr>
-            <a:spLocks noGrp="true"/>
+            <a:spLocks noGrp="1"/>
           </p:cNvSpPr>
           <p:nvPr>
             <p:ph type="sldNum" sz="quarter" idx="12"/>
@@ -1001,7 +1157,7 @@
           <a:lstStyle/>
           <a:p>
             <a:fld id="{E3811F5C-F6AB-470B-8321-08F27CD4598A}" type="slidenum">
-              <a:rPr lang="fr-FR" smtClean="false"/>
+              <a:rPr lang="fr-FR" smtClean="0"/>
               <a:t>‹N°›</a:t>
             </a:fld>
             <a:endParaRPr lang="fr-FR"/>
@@ -1372,7 +1528,7 @@
 </file>
 
 <file path=ppt/slideLayouts/slideLayout2.xml><?xml version="1.0" encoding="utf-8"?>
-<p:sldLayout xmlns:v="urn:schemas-microsoft-com:vml" xmlns:a="http://schemas.openxmlformats.org/drawingml/2006/main" xmlns:c="http://schemas.openxmlformats.org/drawingml/2006/chart" xmlns:xdr="http://schemas.openxmlformats.org/drawingml/2006/spreadsheetDrawing" xmlns:dgm="http://schemas.openxmlformats.org/drawingml/2006/diagram" xmlns:pic="http://schemas.openxmlformats.org/drawingml/2006/picture" xmlns:wp14="http://schemas.microsoft.com/office/word/2010/wordprocessingDrawing" xmlns:p="http://schemas.openxmlformats.org/presentationml/2006/main" xmlns:ns6="http://schemas.openxmlformats.org/drawingml/2006/chartDrawing" xmlns:r="http://schemas.openxmlformats.org/officeDocument/2006/relationships" xmlns:ns13="http://schemas.openxmlformats.org/drawingml/2006/lockedCanvas" xmlns:ns12="http://schemas.openxmlformats.org/drawingml/2006/compatibility" xmlns:mc="http://schemas.openxmlformats.org/markup-compatibility/2006" xmlns:wp="http://schemas.openxmlformats.org/drawingml/2006/wordprocessingDrawing" type="obj" preserve="true">
+<p:sldLayout xmlns:a="http://schemas.openxmlformats.org/drawingml/2006/main" xmlns:r="http://schemas.openxmlformats.org/officeDocument/2006/relationships" xmlns:p="http://schemas.openxmlformats.org/presentationml/2006/main" type="obj" preserve="1">
   <p:cSld name="Titre et contenu">
     <p:spTree>
       <p:nvGrpSpPr>
@@ -1392,7 +1548,7 @@
         <p:nvSpPr>
           <p:cNvPr id="2" name="Titre 1"/>
           <p:cNvSpPr>
-            <a:spLocks noGrp="true"/>
+            <a:spLocks noGrp="1"/>
           </p:cNvSpPr>
           <p:nvPr>
             <p:ph type="title"/>
@@ -1404,7 +1560,7 @@
           <a:lstStyle/>
           <a:p>
             <a:r>
-              <a:rPr lang="fr-FR" smtClean="false"/>
+              <a:rPr lang="fr-FR" smtClean="0"/>
               <a:t>Modifiez le style du titre</a:t>
             </a:r>
             <a:endParaRPr lang="fr-FR"/>
@@ -1415,7 +1571,7 @@
         <p:nvSpPr>
           <p:cNvPr id="3" name="Espace réservé du contenu 2"/>
           <p:cNvSpPr>
-            <a:spLocks noGrp="true"/>
+            <a:spLocks noGrp="1"/>
           </p:cNvSpPr>
           <p:nvPr>
             <p:ph idx="1"/>
@@ -1428,35 +1584,35 @@
           <a:p>
             <a:pPr lvl="0"/>
             <a:r>
-              <a:rPr lang="fr-FR" smtClean="false"/>
+              <a:rPr lang="fr-FR" smtClean="0"/>
               <a:t>Modifiez les styles du texte du masque</a:t>
             </a:r>
           </a:p>
           <a:p>
             <a:pPr lvl="1"/>
             <a:r>
-              <a:rPr lang="fr-FR" smtClean="false"/>
+              <a:rPr lang="fr-FR" smtClean="0"/>
               <a:t>Deuxième niveau</a:t>
             </a:r>
           </a:p>
           <a:p>
             <a:pPr lvl="2"/>
             <a:r>
-              <a:rPr lang="fr-FR" smtClean="false"/>
+              <a:rPr lang="fr-FR" smtClean="0"/>
               <a:t>Troisième niveau</a:t>
             </a:r>
           </a:p>
           <a:p>
             <a:pPr lvl="3"/>
             <a:r>
-              <a:rPr lang="fr-FR" smtClean="false"/>
+              <a:rPr lang="fr-FR" smtClean="0"/>
               <a:t>Quatrième niveau</a:t>
             </a:r>
           </a:p>
           <a:p>
             <a:pPr lvl="4"/>
             <a:r>
-              <a:rPr lang="fr-FR" smtClean="false"/>
+              <a:rPr lang="fr-FR" smtClean="0"/>
               <a:t>Cinquième niveau</a:t>
             </a:r>
             <a:endParaRPr lang="fr-FR"/>
@@ -1467,7 +1623,7 @@
         <p:nvSpPr>
           <p:cNvPr id="4" name="Espace réservé de la date 3"/>
           <p:cNvSpPr>
-            <a:spLocks noGrp="true"/>
+            <a:spLocks noGrp="1"/>
           </p:cNvSpPr>
           <p:nvPr>
             <p:ph type="dt" sz="half" idx="10"/>
@@ -1479,7 +1635,7 @@
           <a:lstStyle/>
           <a:p>
             <a:fld id="{E7E4853E-ECDD-443A-840C-1FE284273B35}" type="datetimeFigureOut">
-              <a:rPr lang="fr-FR" smtClean="false"/>
+              <a:rPr lang="fr-FR" smtClean="0"/>
               <a:t>14/02/2017</a:t>
             </a:fld>
             <a:endParaRPr lang="fr-FR"/>
@@ -1490,7 +1646,7 @@
         <p:nvSpPr>
           <p:cNvPr id="5" name="Espace réservé du pied de page 4"/>
           <p:cNvSpPr>
-            <a:spLocks noGrp="true"/>
+            <a:spLocks noGrp="1"/>
           </p:cNvSpPr>
           <p:nvPr>
             <p:ph type="ftr" sz="quarter" idx="11"/>
@@ -1509,7 +1665,7 @@
         <p:nvSpPr>
           <p:cNvPr id="6" name="Espace réservé du numéro de diapositive 5"/>
           <p:cNvSpPr>
-            <a:spLocks noGrp="true"/>
+            <a:spLocks noGrp="1"/>
           </p:cNvSpPr>
           <p:nvPr>
             <p:ph type="sldNum" sz="quarter" idx="12"/>
@@ -1521,7 +1677,7 @@
           <a:lstStyle/>
           <a:p>
             <a:fld id="{E3811F5C-F6AB-470B-8321-08F27CD4598A}" type="slidenum">
-              <a:rPr lang="fr-FR" smtClean="false"/>
+              <a:rPr lang="fr-FR" smtClean="0"/>
               <a:t>‹N°›</a:t>
             </a:fld>
             <a:endParaRPr lang="fr-FR"/>
@@ -3130,7 +3286,7 @@
 </file>
 
 <file path=ppt/slideMasters/slideMaster1.xml><?xml version="1.0" encoding="utf-8"?>
-<p:sldMaster xmlns:v="urn:schemas-microsoft-com:vml" xmlns:a="http://schemas.openxmlformats.org/drawingml/2006/main" xmlns:c="http://schemas.openxmlformats.org/drawingml/2006/chart" xmlns:xdr="http://schemas.openxmlformats.org/drawingml/2006/spreadsheetDrawing" xmlns:dgm="http://schemas.openxmlformats.org/drawingml/2006/diagram" xmlns:pic="http://schemas.openxmlformats.org/drawingml/2006/picture" xmlns:wp14="http://schemas.microsoft.com/office/word/2010/wordprocessingDrawing" xmlns:p="http://schemas.openxmlformats.org/presentationml/2006/main" xmlns:ns6="http://schemas.openxmlformats.org/drawingml/2006/chartDrawing" xmlns:r="http://schemas.openxmlformats.org/officeDocument/2006/relationships" xmlns:ns13="http://schemas.openxmlformats.org/drawingml/2006/lockedCanvas" xmlns:ns12="http://schemas.openxmlformats.org/drawingml/2006/compatibility" xmlns:mc="http://schemas.openxmlformats.org/markup-compatibility/2006" xmlns:wp="http://schemas.openxmlformats.org/drawingml/2006/wordprocessingDrawing">
+<p:sldMaster xmlns:a="http://schemas.openxmlformats.org/drawingml/2006/main" xmlns:r="http://schemas.openxmlformats.org/officeDocument/2006/relationships" xmlns:p="http://schemas.openxmlformats.org/presentationml/2006/main">
   <p:cSld>
     <p:bg>
       <p:bgRef idx="1001">
@@ -3155,7 +3311,7 @@
         <p:nvSpPr>
           <p:cNvPr id="2" name="Espace réservé du titre 1"/>
           <p:cNvSpPr>
-            <a:spLocks noGrp="true"/>
+            <a:spLocks noGrp="1"/>
           </p:cNvSpPr>
           <p:nvPr>
             <p:ph type="title"/>
@@ -3171,13 +3327,13 @@
           </a:prstGeom>
         </p:spPr>
         <p:txBody>
-          <a:bodyPr vert="horz" lIns="91440" tIns="45720" rIns="91440" bIns="45720" rtlCol="false" anchor="ctr">
+          <a:bodyPr vert="horz" lIns="91440" tIns="45720" rIns="91440" bIns="45720" rtlCol="0" anchor="ctr">
             <a:normAutofit/>
           </a:bodyPr>
           <a:lstStyle/>
           <a:p>
             <a:r>
-              <a:rPr lang="fr-FR" smtClean="false"/>
+              <a:rPr lang="fr-FR" smtClean="0"/>
               <a:t>Modifiez le style du titre</a:t>
             </a:r>
             <a:endParaRPr lang="fr-FR"/>
@@ -3188,7 +3344,7 @@
         <p:nvSpPr>
           <p:cNvPr id="3" name="Espace réservé du texte 2"/>
           <p:cNvSpPr>
-            <a:spLocks noGrp="true"/>
+            <a:spLocks noGrp="1"/>
           </p:cNvSpPr>
           <p:nvPr>
             <p:ph type="body" idx="1"/>
@@ -3204,42 +3360,42 @@
           </a:prstGeom>
         </p:spPr>
         <p:txBody>
-          <a:bodyPr vert="horz" lIns="91440" tIns="45720" rIns="91440" bIns="45720" rtlCol="false">
+          <a:bodyPr vert="horz" lIns="91440" tIns="45720" rIns="91440" bIns="45720" rtlCol="0">
             <a:normAutofit/>
           </a:bodyPr>
           <a:lstStyle/>
           <a:p>
             <a:pPr lvl="0"/>
             <a:r>
-              <a:rPr lang="fr-FR" smtClean="false"/>
+              <a:rPr lang="fr-FR" smtClean="0"/>
               <a:t>Modifiez les styles du texte du masque</a:t>
             </a:r>
           </a:p>
           <a:p>
             <a:pPr lvl="1"/>
             <a:r>
-              <a:rPr lang="fr-FR" smtClean="false"/>
+              <a:rPr lang="fr-FR" smtClean="0"/>
               <a:t>Deuxième niveau</a:t>
             </a:r>
           </a:p>
           <a:p>
             <a:pPr lvl="2"/>
             <a:r>
-              <a:rPr lang="fr-FR" smtClean="false"/>
+              <a:rPr lang="fr-FR" smtClean="0"/>
               <a:t>Troisième niveau</a:t>
             </a:r>
           </a:p>
           <a:p>
             <a:pPr lvl="3"/>
             <a:r>
-              <a:rPr lang="fr-FR" smtClean="false"/>
+              <a:rPr lang="fr-FR" smtClean="0"/>
               <a:t>Quatrième niveau</a:t>
             </a:r>
           </a:p>
           <a:p>
             <a:pPr lvl="4"/>
             <a:r>
-              <a:rPr lang="fr-FR" smtClean="false"/>
+              <a:rPr lang="fr-FR" smtClean="0"/>
               <a:t>Cinquième niveau</a:t>
             </a:r>
             <a:endParaRPr lang="fr-FR"/>
@@ -3250,7 +3406,7 @@
         <p:nvSpPr>
           <p:cNvPr id="4" name="Espace réservé de la date 3"/>
           <p:cNvSpPr>
-            <a:spLocks noGrp="true"/>
+            <a:spLocks noGrp="1"/>
           </p:cNvSpPr>
           <p:nvPr>
             <p:ph type="dt" sz="half" idx="2"/>
@@ -3266,7 +3422,7 @@
           </a:prstGeom>
         </p:spPr>
         <p:txBody>
-          <a:bodyPr vert="horz" lIns="91440" tIns="45720" rIns="91440" bIns="45720" rtlCol="false" anchor="ctr"/>
+          <a:bodyPr vert="horz" lIns="91440" tIns="45720" rIns="91440" bIns="45720" rtlCol="0" anchor="ctr"/>
           <a:lstStyle>
             <a:lvl1pPr algn="l">
               <a:defRPr sz="1200">
@@ -3280,7 +3436,7 @@
           </a:lstStyle>
           <a:p>
             <a:fld id="{E7E4853E-ECDD-443A-840C-1FE284273B35}" type="datetimeFigureOut">
-              <a:rPr lang="fr-FR" smtClean="false"/>
+              <a:rPr lang="fr-FR" smtClean="0"/>
               <a:t>14/02/2017</a:t>
             </a:fld>
             <a:endParaRPr lang="fr-FR"/>
@@ -3291,7 +3447,7 @@
         <p:nvSpPr>
           <p:cNvPr id="5" name="Espace réservé du pied de page 4"/>
           <p:cNvSpPr>
-            <a:spLocks noGrp="true"/>
+            <a:spLocks noGrp="1"/>
           </p:cNvSpPr>
           <p:nvPr>
             <p:ph type="ftr" sz="quarter" idx="3"/>
@@ -3307,7 +3463,7 @@
           </a:prstGeom>
         </p:spPr>
         <p:txBody>
-          <a:bodyPr vert="horz" lIns="91440" tIns="45720" rIns="91440" bIns="45720" rtlCol="false" anchor="ctr"/>
+          <a:bodyPr vert="horz" lIns="91440" tIns="45720" rIns="91440" bIns="45720" rtlCol="0" anchor="ctr"/>
           <a:lstStyle>
             <a:lvl1pPr algn="ctr">
               <a:defRPr sz="1200">
@@ -3328,7 +3484,7 @@
         <p:nvSpPr>
           <p:cNvPr id="6" name="Espace réservé du numéro de diapositive 5"/>
           <p:cNvSpPr>
-            <a:spLocks noGrp="true"/>
+            <a:spLocks noGrp="1"/>
           </p:cNvSpPr>
           <p:nvPr>
             <p:ph type="sldNum" sz="quarter" idx="4"/>
@@ -3344,7 +3500,7 @@
           </a:prstGeom>
         </p:spPr>
         <p:txBody>
-          <a:bodyPr vert="horz" lIns="91440" tIns="45720" rIns="91440" bIns="45720" rtlCol="false" anchor="ctr"/>
+          <a:bodyPr vert="horz" lIns="91440" tIns="45720" rIns="91440" bIns="45720" rtlCol="0" anchor="ctr"/>
           <a:lstStyle>
             <a:lvl1pPr algn="r">
               <a:defRPr sz="1200">
@@ -3358,7 +3514,7 @@
           </a:lstStyle>
           <a:p>
             <a:fld id="{E3811F5C-F6AB-470B-8321-08F27CD4598A}" type="slidenum">
-              <a:rPr lang="fr-FR" smtClean="false"/>
+              <a:rPr lang="fr-FR" smtClean="0"/>
               <a:t>‹N°›</a:t>
             </a:fld>
             <a:endParaRPr lang="fr-FR"/>
@@ -3388,7 +3544,7 @@
   </p:sldLayoutIdLst>
   <p:txStyles>
     <p:titleStyle>
-      <a:lvl1pPr algn="l" defTabSz="914400" rtl="false" eaLnBrk="true" latinLnBrk="false" hangingPunct="true">
+      <a:lvl1pPr algn="l" defTabSz="914400" rtl="0" eaLnBrk="1" latinLnBrk="0" hangingPunct="1">
         <a:lnSpc>
           <a:spcPct val="90000"/>
         </a:lnSpc>
@@ -3407,7 +3563,7 @@
       </a:lvl1pPr>
     </p:titleStyle>
     <p:bodyStyle>
-      <a:lvl1pPr marL="228600" indent="-228600" algn="l" defTabSz="914400" rtl="false" eaLnBrk="true" latinLnBrk="false" hangingPunct="true">
+      <a:lvl1pPr marL="228600" indent="-228600" algn="l" defTabSz="914400" rtl="0" eaLnBrk="1" latinLnBrk="0" hangingPunct="1">
         <a:lnSpc>
           <a:spcPct val="90000"/>
         </a:lnSpc>
@@ -3425,7 +3581,7 @@
           <a:cs typeface="+mn-cs"/>
         </a:defRPr>
       </a:lvl1pPr>
-      <a:lvl2pPr marL="685800" indent="-228600" algn="l" defTabSz="914400" rtl="false" eaLnBrk="true" latinLnBrk="false" hangingPunct="true">
+      <a:lvl2pPr marL="685800" indent="-228600" algn="l" defTabSz="914400" rtl="0" eaLnBrk="1" latinLnBrk="0" hangingPunct="1">
         <a:lnSpc>
           <a:spcPct val="90000"/>
         </a:lnSpc>
@@ -3443,7 +3599,7 @@
           <a:cs typeface="+mn-cs"/>
         </a:defRPr>
       </a:lvl2pPr>
-      <a:lvl3pPr marL="1143000" indent="-228600" algn="l" defTabSz="914400" rtl="false" eaLnBrk="true" latinLnBrk="false" hangingPunct="true">
+      <a:lvl3pPr marL="1143000" indent="-228600" algn="l" defTabSz="914400" rtl="0" eaLnBrk="1" latinLnBrk="0" hangingPunct="1">
         <a:lnSpc>
           <a:spcPct val="90000"/>
         </a:lnSpc>
@@ -3461,7 +3617,7 @@
           <a:cs typeface="+mn-cs"/>
         </a:defRPr>
       </a:lvl3pPr>
-      <a:lvl4pPr marL="1600200" indent="-228600" algn="l" defTabSz="914400" rtl="false" eaLnBrk="true" latinLnBrk="false" hangingPunct="true">
+      <a:lvl4pPr marL="1600200" indent="-228600" algn="l" defTabSz="914400" rtl="0" eaLnBrk="1" latinLnBrk="0" hangingPunct="1">
         <a:lnSpc>
           <a:spcPct val="90000"/>
         </a:lnSpc>
@@ -3479,7 +3635,7 @@
           <a:cs typeface="+mn-cs"/>
         </a:defRPr>
       </a:lvl4pPr>
-      <a:lvl5pPr marL="2057400" indent="-228600" algn="l" defTabSz="914400" rtl="false" eaLnBrk="true" latinLnBrk="false" hangingPunct="true">
+      <a:lvl5pPr marL="2057400" indent="-228600" algn="l" defTabSz="914400" rtl="0" eaLnBrk="1" latinLnBrk="0" hangingPunct="1">
         <a:lnSpc>
           <a:spcPct val="90000"/>
         </a:lnSpc>
@@ -3497,7 +3653,7 @@
           <a:cs typeface="+mn-cs"/>
         </a:defRPr>
       </a:lvl5pPr>
-      <a:lvl6pPr marL="2514600" indent="-228600" algn="l" defTabSz="914400" rtl="false" eaLnBrk="true" latinLnBrk="false" hangingPunct="true">
+      <a:lvl6pPr marL="2514600" indent="-228600" algn="l" defTabSz="914400" rtl="0" eaLnBrk="1" latinLnBrk="0" hangingPunct="1">
         <a:lnSpc>
           <a:spcPct val="90000"/>
         </a:lnSpc>
@@ -3515,7 +3671,7 @@
           <a:cs typeface="+mn-cs"/>
         </a:defRPr>
       </a:lvl6pPr>
-      <a:lvl7pPr marL="2971800" indent="-228600" algn="l" defTabSz="914400" rtl="false" eaLnBrk="true" latinLnBrk="false" hangingPunct="true">
+      <a:lvl7pPr marL="2971800" indent="-228600" algn="l" defTabSz="914400" rtl="0" eaLnBrk="1" latinLnBrk="0" hangingPunct="1">
         <a:lnSpc>
           <a:spcPct val="90000"/>
         </a:lnSpc>
@@ -3533,7 +3689,7 @@
           <a:cs typeface="+mn-cs"/>
         </a:defRPr>
       </a:lvl7pPr>
-      <a:lvl8pPr marL="3429000" indent="-228600" algn="l" defTabSz="914400" rtl="false" eaLnBrk="true" latinLnBrk="false" hangingPunct="true">
+      <a:lvl8pPr marL="3429000" indent="-228600" algn="l" defTabSz="914400" rtl="0" eaLnBrk="1" latinLnBrk="0" hangingPunct="1">
         <a:lnSpc>
           <a:spcPct val="90000"/>
         </a:lnSpc>
@@ -3551,7 +3707,7 @@
           <a:cs typeface="+mn-cs"/>
         </a:defRPr>
       </a:lvl8pPr>
-      <a:lvl9pPr marL="3886200" indent="-228600" algn="l" defTabSz="914400" rtl="false" eaLnBrk="true" latinLnBrk="false" hangingPunct="true">
+      <a:lvl9pPr marL="3886200" indent="-228600" algn="l" defTabSz="914400" rtl="0" eaLnBrk="1" latinLnBrk="0" hangingPunct="1">
         <a:lnSpc>
           <a:spcPct val="90000"/>
         </a:lnSpc>
@@ -3574,7 +3730,7 @@
       <a:defPPr>
         <a:defRPr lang="fr-FR"/>
       </a:defPPr>
-      <a:lvl1pPr marL="0" algn="l" defTabSz="914400" rtl="false" eaLnBrk="true" latinLnBrk="false" hangingPunct="true">
+      <a:lvl1pPr marL="0" algn="l" defTabSz="914400" rtl="0" eaLnBrk="1" latinLnBrk="0" hangingPunct="1">
         <a:defRPr sz="1800" kern="1200">
           <a:solidFill>
             <a:schemeClr val="tx1"/>
@@ -3584,7 +3740,7 @@
           <a:cs typeface="+mn-cs"/>
         </a:defRPr>
       </a:lvl1pPr>
-      <a:lvl2pPr marL="457200" algn="l" defTabSz="914400" rtl="false" eaLnBrk="true" latinLnBrk="false" hangingPunct="true">
+      <a:lvl2pPr marL="457200" algn="l" defTabSz="914400" rtl="0" eaLnBrk="1" latinLnBrk="0" hangingPunct="1">
         <a:defRPr sz="1800" kern="1200">
           <a:solidFill>
             <a:schemeClr val="tx1"/>
@@ -3594,7 +3750,7 @@
           <a:cs typeface="+mn-cs"/>
         </a:defRPr>
       </a:lvl2pPr>
-      <a:lvl3pPr marL="914400" algn="l" defTabSz="914400" rtl="false" eaLnBrk="true" latinLnBrk="false" hangingPunct="true">
+      <a:lvl3pPr marL="914400" algn="l" defTabSz="914400" rtl="0" eaLnBrk="1" latinLnBrk="0" hangingPunct="1">
         <a:defRPr sz="1800" kern="1200">
           <a:solidFill>
             <a:schemeClr val="tx1"/>
@@ -3604,7 +3760,7 @@
           <a:cs typeface="+mn-cs"/>
         </a:defRPr>
       </a:lvl3pPr>
-      <a:lvl4pPr marL="1371600" algn="l" defTabSz="914400" rtl="false" eaLnBrk="true" latinLnBrk="false" hangingPunct="true">
+      <a:lvl4pPr marL="1371600" algn="l" defTabSz="914400" rtl="0" eaLnBrk="1" latinLnBrk="0" hangingPunct="1">
         <a:defRPr sz="1800" kern="1200">
           <a:solidFill>
             <a:schemeClr val="tx1"/>
@@ -3614,7 +3770,7 @@
           <a:cs typeface="+mn-cs"/>
         </a:defRPr>
       </a:lvl4pPr>
-      <a:lvl5pPr marL="1828800" algn="l" defTabSz="914400" rtl="false" eaLnBrk="true" latinLnBrk="false" hangingPunct="true">
+      <a:lvl5pPr marL="1828800" algn="l" defTabSz="914400" rtl="0" eaLnBrk="1" latinLnBrk="0" hangingPunct="1">
         <a:defRPr sz="1800" kern="1200">
           <a:solidFill>
             <a:schemeClr val="tx1"/>
@@ -3624,7 +3780,7 @@
           <a:cs typeface="+mn-cs"/>
         </a:defRPr>
       </a:lvl5pPr>
-      <a:lvl6pPr marL="2286000" algn="l" defTabSz="914400" rtl="false" eaLnBrk="true" latinLnBrk="false" hangingPunct="true">
+      <a:lvl6pPr marL="2286000" algn="l" defTabSz="914400" rtl="0" eaLnBrk="1" latinLnBrk="0" hangingPunct="1">
         <a:defRPr sz="1800" kern="1200">
           <a:solidFill>
             <a:schemeClr val="tx1"/>
@@ -3634,7 +3790,7 @@
           <a:cs typeface="+mn-cs"/>
         </a:defRPr>
       </a:lvl6pPr>
-      <a:lvl7pPr marL="2743200" algn="l" defTabSz="914400" rtl="false" eaLnBrk="true" latinLnBrk="false" hangingPunct="true">
+      <a:lvl7pPr marL="2743200" algn="l" defTabSz="914400" rtl="0" eaLnBrk="1" latinLnBrk="0" hangingPunct="1">
         <a:defRPr sz="1800" kern="1200">
           <a:solidFill>
             <a:schemeClr val="tx1"/>
@@ -3644,7 +3800,7 @@
           <a:cs typeface="+mn-cs"/>
         </a:defRPr>
       </a:lvl7pPr>
-      <a:lvl8pPr marL="3200400" algn="l" defTabSz="914400" rtl="false" eaLnBrk="true" latinLnBrk="false" hangingPunct="true">
+      <a:lvl8pPr marL="3200400" algn="l" defTabSz="914400" rtl="0" eaLnBrk="1" latinLnBrk="0" hangingPunct="1">
         <a:defRPr sz="1800" kern="1200">
           <a:solidFill>
             <a:schemeClr val="tx1"/>
@@ -3654,7 +3810,7 @@
           <a:cs typeface="+mn-cs"/>
         </a:defRPr>
       </a:lvl8pPr>
-      <a:lvl9pPr marL="3657600" algn="l" defTabSz="914400" rtl="false" eaLnBrk="true" latinLnBrk="false" hangingPunct="true">
+      <a:lvl9pPr marL="3657600" algn="l" defTabSz="914400" rtl="0" eaLnBrk="1" latinLnBrk="0" hangingPunct="1">
         <a:defRPr sz="1800" kern="1200">
           <a:solidFill>
             <a:schemeClr val="tx1"/>
@@ -3670,7 +3826,7 @@
 </file>
 
 <file path=ppt/slides/slide1.xml><?xml version="1.0" encoding="utf-8"?>
-<p:sld xmlns:a="http://schemas.openxmlformats.org/drawingml/2006/main" xmlns:r="http://schemas.openxmlformats.org/officeDocument/2006/relationships" xmlns:p="http://schemas.openxmlformats.org/presentationml/2006/main" xmlns:mc="http://schemas.openxmlformats.org/markup-compatibility/2006" xmlns:c="http://schemas.openxmlformats.org/drawingml/2006/chart" xmlns:ns6="http://schemas.openxmlformats.org/drawingml/2006/chartDrawing" xmlns:dgm="http://schemas.openxmlformats.org/drawingml/2006/diagram" xmlns:pic="http://schemas.openxmlformats.org/drawingml/2006/picture" xmlns:wp="http://schemas.openxmlformats.org/drawingml/2006/wordprocessingDrawing" xmlns:wp14="http://schemas.microsoft.com/office/word/2010/wordprocessingDrawing" xmlns:xdr="http://schemas.openxmlformats.org/drawingml/2006/spreadsheetDrawing" xmlns:ns12="http://schemas.openxmlformats.org/drawingml/2006/compatibility" xmlns:ns13="http://schemas.openxmlformats.org/drawingml/2006/lockedCanvas" xmlns:v="urn:schemas-microsoft-com:vml">
+<p:sld xmlns:a="http://schemas.openxmlformats.org/drawingml/2006/main" xmlns:r="http://schemas.openxmlformats.org/officeDocument/2006/relationships" xmlns:p="http://schemas.openxmlformats.org/presentationml/2006/main">
   <p:cSld>
     <p:spTree>
       <p:nvGrpSpPr>
@@ -3690,7 +3846,7 @@
         <p:nvSpPr>
           <p:cNvPr id="2" name="Titre 1"/>
           <p:cNvSpPr>
-            <a:spLocks noGrp="true"/>
+            <a:spLocks noGrp="1"/>
           </p:cNvSpPr>
           <p:nvPr>
             <p:ph type="ctrTitle"/>
@@ -3702,14 +3858,14 @@
           <a:lstStyle/>
           <a:p>
             <a:r>
-              <a:rPr lang="fr-FR" dirty="false" err="true" smtClean="false"/>
+              <a:rPr lang="fr-FR" dirty="0" err="1" smtClean="0"/>
               <a:t>Title</a:t>
             </a:r>
             <a:r>
-              <a:rPr lang="fr-FR" dirty="false" smtClean="false"/>
+              <a:rPr lang="fr-FR" dirty="0" smtClean="0"/>
               <a:t> 1</a:t>
             </a:r>
-            <a:endParaRPr lang="fr-FR" dirty="false"/>
+            <a:endParaRPr lang="fr-FR" dirty="0"/>
           </a:p>
         </p:txBody>
       </p:sp>
@@ -3717,7 +3873,7 @@
         <p:nvSpPr>
           <p:cNvPr id="3" name="Sous-titre 2"/>
           <p:cNvSpPr>
-            <a:spLocks noGrp="true"/>
+            <a:spLocks noGrp="1"/>
           </p:cNvSpPr>
           <p:nvPr>
             <p:ph type="subTitle" idx="1"/>
@@ -3729,14 +3885,14 @@
           <a:lstStyle/>
           <a:p>
             <a:r>
-              <a:rPr lang="fr-FR" dirty="false" err="true" smtClean="false"/>
+              <a:rPr lang="fr-FR" dirty="0" err="1" smtClean="0"/>
               <a:t>Sub-title</a:t>
             </a:r>
             <a:r>
-              <a:rPr lang="fr-FR" dirty="false" smtClean="false"/>
+              <a:rPr lang="fr-FR" dirty="0" smtClean="0"/>
               <a:t> 1</a:t>
             </a:r>
-            <a:endParaRPr lang="fr-FR" dirty="false"/>
+            <a:endParaRPr lang="fr-FR" dirty="0"/>
           </a:p>
         </p:txBody>
       </p:sp>
@@ -3754,7 +3910,7 @@
 </file>
 
 <file path=ppt/slides/slide2.xml><?xml version="1.0" encoding="utf-8"?>
-<p:sld xmlns:a="http://schemas.openxmlformats.org/drawingml/2006/main" xmlns:r="http://schemas.openxmlformats.org/officeDocument/2006/relationships" xmlns:p="http://schemas.openxmlformats.org/presentationml/2006/main" xmlns:mc="http://schemas.openxmlformats.org/markup-compatibility/2006" xmlns:c="http://schemas.openxmlformats.org/drawingml/2006/chart" xmlns:ns6="http://schemas.openxmlformats.org/drawingml/2006/chartDrawing" xmlns:dgm="http://schemas.openxmlformats.org/drawingml/2006/diagram" xmlns:pic="http://schemas.openxmlformats.org/drawingml/2006/picture" xmlns:wp="http://schemas.openxmlformats.org/drawingml/2006/wordprocessingDrawing" xmlns:wp14="http://schemas.microsoft.com/office/word/2010/wordprocessingDrawing" xmlns:xdr="http://schemas.openxmlformats.org/drawingml/2006/spreadsheetDrawing" xmlns:ns12="http://schemas.openxmlformats.org/drawingml/2006/compatibility" xmlns:ns13="http://schemas.openxmlformats.org/drawingml/2006/lockedCanvas" xmlns:v="urn:schemas-microsoft-com:vml">
+<p:sld xmlns:a="http://schemas.openxmlformats.org/drawingml/2006/main" xmlns:r="http://schemas.openxmlformats.org/officeDocument/2006/relationships" xmlns:p="http://schemas.openxmlformats.org/presentationml/2006/main">
   <p:cSld>
     <p:spTree>
       <p:nvGrpSpPr>
@@ -3774,7 +3930,7 @@
         <p:nvSpPr>
           <p:cNvPr id="2" name="Titre 1"/>
           <p:cNvSpPr>
-            <a:spLocks noGrp="true"/>
+            <a:spLocks noGrp="1"/>
           </p:cNvSpPr>
           <p:nvPr>
             <p:ph type="title"/>
@@ -3786,14 +3942,14 @@
           <a:lstStyle/>
           <a:p>
             <a:r>
-              <a:rPr lang="fr-FR" dirty="false" err="true" smtClean="false"/>
+              <a:rPr lang="fr-FR" dirty="0" err="1" smtClean="0"/>
               <a:t>Title</a:t>
             </a:r>
             <a:r>
-              <a:rPr lang="fr-FR" dirty="false" smtClean="false"/>
+              <a:rPr lang="fr-FR" dirty="0" smtClean="0"/>
               <a:t> 2</a:t>
             </a:r>
-            <a:endParaRPr lang="fr-FR" dirty="false"/>
+            <a:endParaRPr lang="fr-FR" dirty="0"/>
           </a:p>
         </p:txBody>
       </p:sp>
@@ -3801,7 +3957,7 @@
         <p:nvSpPr>
           <p:cNvPr id="3" name="Espace réservé du contenu 2"/>
           <p:cNvSpPr>
-            <a:spLocks noGrp="true"/>
+            <a:spLocks noGrp="1"/>
           </p:cNvSpPr>
           <p:nvPr>
             <p:ph idx="1"/>
@@ -3815,1112 +3971,1112 @@
           <a:lstStyle/>
           <a:p>
             <a:r>
-              <a:rPr lang="fr-FR" dirty="false" err="true" smtClean="false"/>
+              <a:rPr lang="fr-FR" dirty="0" err="1" smtClean="0"/>
               <a:t>Lorem</a:t>
             </a:r>
             <a:r>
-              <a:rPr lang="fr-FR" dirty="false" smtClean="false"/>
-              <a:t> </a:t>
-            </a:r>
-            <a:r>
-              <a:rPr lang="fr-FR" dirty="false" err="true" smtClean="false"/>
+              <a:rPr lang="fr-FR" dirty="0" smtClean="0"/>
+              <a:t> </a:t>
+            </a:r>
+            <a:r>
+              <a:rPr lang="fr-FR" dirty="0" err="1" smtClean="0"/>
               <a:t>ipsum</a:t>
             </a:r>
             <a:r>
-              <a:rPr lang="fr-FR" dirty="false" smtClean="false"/>
-              <a:t> </a:t>
-            </a:r>
-            <a:r>
-              <a:rPr lang="fr-FR" dirty="false" err="true" smtClean="false"/>
+              <a:rPr lang="fr-FR" dirty="0" smtClean="0"/>
+              <a:t> </a:t>
+            </a:r>
+            <a:r>
+              <a:rPr lang="fr-FR" dirty="0" err="1" smtClean="0"/>
               <a:t>dolor</a:t>
             </a:r>
             <a:r>
-              <a:rPr lang="fr-FR" dirty="false" smtClean="false"/>
-              <a:t> </a:t>
-            </a:r>
-            <a:r>
-              <a:rPr lang="fr-FR" dirty="false" err="true" smtClean="false"/>
+              <a:rPr lang="fr-FR" dirty="0" smtClean="0"/>
+              <a:t> </a:t>
+            </a:r>
+            <a:r>
+              <a:rPr lang="fr-FR" dirty="0" err="1" smtClean="0"/>
               <a:t>sit</a:t>
             </a:r>
             <a:r>
-              <a:rPr lang="fr-FR" dirty="false" smtClean="false"/>
-              <a:t> </a:t>
-            </a:r>
-            <a:r>
-              <a:rPr lang="fr-FR" dirty="false" err="true" smtClean="false"/>
+              <a:rPr lang="fr-FR" dirty="0" smtClean="0"/>
+              <a:t> </a:t>
+            </a:r>
+            <a:r>
+              <a:rPr lang="fr-FR" dirty="0" err="1" smtClean="0"/>
               <a:t>amet</a:t>
             </a:r>
             <a:r>
-              <a:rPr lang="fr-FR" dirty="false" smtClean="false"/>
+              <a:rPr lang="fr-FR" dirty="0" smtClean="0"/>
               <a:t>, </a:t>
             </a:r>
             <a:r>
-              <a:rPr lang="fr-FR" dirty="false" err="true" smtClean="false"/>
+              <a:rPr lang="fr-FR" dirty="0" err="1" smtClean="0"/>
               <a:t>consectetur</a:t>
             </a:r>
             <a:r>
-              <a:rPr lang="fr-FR" dirty="false" smtClean="false"/>
-              <a:t> </a:t>
-            </a:r>
-            <a:r>
-              <a:rPr lang="fr-FR" dirty="false" err="true" smtClean="false"/>
+              <a:rPr lang="fr-FR" dirty="0" smtClean="0"/>
+              <a:t> </a:t>
+            </a:r>
+            <a:r>
+              <a:rPr lang="fr-FR" dirty="0" err="1" smtClean="0"/>
               <a:t>adipiscing</a:t>
             </a:r>
             <a:r>
-              <a:rPr lang="fr-FR" dirty="false" smtClean="false"/>
-              <a:t> </a:t>
-            </a:r>
-            <a:r>
-              <a:rPr lang="fr-FR" dirty="false" err="true" smtClean="false"/>
+              <a:rPr lang="fr-FR" dirty="0" smtClean="0"/>
+              <a:t> </a:t>
+            </a:r>
+            <a:r>
+              <a:rPr lang="fr-FR" dirty="0" err="1" smtClean="0"/>
               <a:t>elit</a:t>
             </a:r>
             <a:r>
-              <a:rPr lang="fr-FR" dirty="false" smtClean="false"/>
+              <a:rPr lang="fr-FR" dirty="0" smtClean="0"/>
               <a:t>. Nunc </a:t>
             </a:r>
             <a:r>
-              <a:rPr lang="fr-FR" dirty="false" err="true" smtClean="false"/>
+              <a:rPr lang="fr-FR" dirty="0" err="1" smtClean="0"/>
               <a:t>sed</a:t>
             </a:r>
             <a:r>
-              <a:rPr lang="fr-FR" dirty="false" smtClean="false"/>
+              <a:rPr lang="fr-FR" dirty="0" smtClean="0"/>
               <a:t> est </a:t>
             </a:r>
             <a:r>
-              <a:rPr lang="fr-FR" dirty="false" err="true" smtClean="false"/>
+              <a:rPr lang="fr-FR" dirty="0" err="1" smtClean="0"/>
               <a:t>orci</a:t>
             </a:r>
             <a:r>
-              <a:rPr lang="fr-FR" dirty="false" smtClean="false"/>
+              <a:rPr lang="fr-FR" dirty="0" smtClean="0"/>
               <a:t>. </a:t>
             </a:r>
             <a:r>
-              <a:rPr lang="fr-FR" dirty="false" err="true" smtClean="false"/>
+              <a:rPr lang="fr-FR" dirty="0" err="1" smtClean="0"/>
               <a:t>Vivamus</a:t>
             </a:r>
             <a:r>
-              <a:rPr lang="fr-FR" dirty="false" smtClean="false"/>
-              <a:t> </a:t>
-            </a:r>
-            <a:r>
-              <a:rPr lang="fr-FR" dirty="false" err="true" smtClean="false"/>
+              <a:rPr lang="fr-FR" dirty="0" smtClean="0"/>
+              <a:t> </a:t>
+            </a:r>
+            <a:r>
+              <a:rPr lang="fr-FR" dirty="0" err="1" smtClean="0"/>
               <a:t>neque</a:t>
             </a:r>
             <a:r>
-              <a:rPr lang="fr-FR" dirty="false" smtClean="false"/>
-              <a:t> </a:t>
-            </a:r>
-            <a:r>
-              <a:rPr lang="fr-FR" dirty="false" err="true" smtClean="false"/>
+              <a:rPr lang="fr-FR" dirty="0" smtClean="0"/>
+              <a:t> </a:t>
+            </a:r>
+            <a:r>
+              <a:rPr lang="fr-FR" dirty="0" err="1" smtClean="0"/>
               <a:t>tellus</a:t>
             </a:r>
             <a:r>
-              <a:rPr lang="fr-FR" dirty="false" smtClean="false"/>
+              <a:rPr lang="fr-FR" dirty="0" smtClean="0"/>
               <a:t>, </a:t>
             </a:r>
             <a:r>
-              <a:rPr lang="fr-FR" dirty="false" err="true" smtClean="false"/>
+              <a:rPr lang="fr-FR" dirty="0" err="1" smtClean="0"/>
               <a:t>commodo</a:t>
             </a:r>
             <a:r>
-              <a:rPr lang="fr-FR" dirty="false" smtClean="false"/>
-              <a:t> </a:t>
-            </a:r>
-            <a:r>
-              <a:rPr lang="fr-FR" dirty="false" err="true" smtClean="false"/>
+              <a:rPr lang="fr-FR" dirty="0" smtClean="0"/>
+              <a:t> </a:t>
+            </a:r>
+            <a:r>
+              <a:rPr lang="fr-FR" dirty="0" err="1" smtClean="0"/>
               <a:t>sed</a:t>
             </a:r>
             <a:r>
-              <a:rPr lang="fr-FR" dirty="false" smtClean="false"/>
-              <a:t> </a:t>
-            </a:r>
-            <a:r>
-              <a:rPr lang="fr-FR" dirty="false" err="true" smtClean="false"/>
+              <a:rPr lang="fr-FR" dirty="0" smtClean="0"/>
+              <a:t> </a:t>
+            </a:r>
+            <a:r>
+              <a:rPr lang="fr-FR" dirty="0" err="1" smtClean="0"/>
               <a:t>auctor</a:t>
             </a:r>
             <a:r>
-              <a:rPr lang="fr-FR" dirty="false" smtClean="false"/>
+              <a:rPr lang="fr-FR" dirty="0" smtClean="0"/>
               <a:t> non, semper </a:t>
             </a:r>
             <a:r>
-              <a:rPr lang="fr-FR" dirty="false" err="true" smtClean="false"/>
+              <a:rPr lang="fr-FR" dirty="0" err="1" smtClean="0"/>
               <a:t>vel</a:t>
             </a:r>
             <a:r>
-              <a:rPr lang="fr-FR" dirty="false" smtClean="false"/>
+              <a:rPr lang="fr-FR" dirty="0" smtClean="0"/>
               <a:t> massa. </a:t>
             </a:r>
             <a:r>
-              <a:rPr lang="fr-FR" dirty="false" err="true" smtClean="false"/>
+              <a:rPr lang="fr-FR" dirty="0" err="1" smtClean="0"/>
               <a:t>Morbi</a:t>
             </a:r>
             <a:r>
-              <a:rPr lang="fr-FR" dirty="false" smtClean="false"/>
+              <a:rPr lang="fr-FR" dirty="0" smtClean="0"/>
               <a:t> et </a:t>
             </a:r>
             <a:r>
-              <a:rPr lang="fr-FR" dirty="false" err="true" smtClean="false"/>
+              <a:rPr lang="fr-FR" dirty="0" err="1" smtClean="0"/>
               <a:t>scelerisque</a:t>
             </a:r>
             <a:r>
-              <a:rPr lang="fr-FR" dirty="false" smtClean="false"/>
-              <a:t> </a:t>
-            </a:r>
-            <a:r>
-              <a:rPr lang="fr-FR" dirty="false" err="true" smtClean="false"/>
+              <a:rPr lang="fr-FR" dirty="0" smtClean="0"/>
+              <a:t> </a:t>
+            </a:r>
+            <a:r>
+              <a:rPr lang="fr-FR" dirty="0" err="1" smtClean="0"/>
               <a:t>mauris</a:t>
             </a:r>
             <a:r>
-              <a:rPr lang="fr-FR" dirty="false" smtClean="false"/>
+              <a:rPr lang="fr-FR" dirty="0" smtClean="0"/>
               <a:t>. </a:t>
             </a:r>
             <a:r>
-              <a:rPr lang="fr-FR" dirty="false" err="true" smtClean="false"/>
+              <a:rPr lang="fr-FR" dirty="0" err="1" smtClean="0"/>
               <a:t>Nulla</a:t>
             </a:r>
             <a:r>
-              <a:rPr lang="fr-FR" dirty="false" smtClean="false"/>
-              <a:t> </a:t>
-            </a:r>
-            <a:r>
-              <a:rPr lang="fr-FR" dirty="false" err="true" smtClean="false"/>
+              <a:rPr lang="fr-FR" dirty="0" smtClean="0"/>
+              <a:t> </a:t>
+            </a:r>
+            <a:r>
+              <a:rPr lang="fr-FR" dirty="0" err="1" smtClean="0"/>
               <a:t>odio</a:t>
             </a:r>
             <a:r>
-              <a:rPr lang="fr-FR" dirty="false" smtClean="false"/>
-              <a:t> </a:t>
-            </a:r>
-            <a:r>
-              <a:rPr lang="fr-FR" dirty="false" err="true" smtClean="false"/>
+              <a:rPr lang="fr-FR" dirty="0" smtClean="0"/>
+              <a:t> </a:t>
+            </a:r>
+            <a:r>
+              <a:rPr lang="fr-FR" dirty="0" err="1" smtClean="0"/>
               <a:t>nisi</a:t>
             </a:r>
             <a:r>
-              <a:rPr lang="fr-FR" dirty="false" smtClean="false"/>
+              <a:rPr lang="fr-FR" dirty="0" smtClean="0"/>
               <a:t>, </a:t>
             </a:r>
             <a:r>
-              <a:rPr lang="fr-FR" dirty="false" err="true" smtClean="false"/>
+              <a:rPr lang="fr-FR" dirty="0" err="1" smtClean="0"/>
               <a:t>dapibus</a:t>
             </a:r>
             <a:r>
-              <a:rPr lang="fr-FR" dirty="false" smtClean="false"/>
-              <a:t> </a:t>
-            </a:r>
-            <a:r>
-              <a:rPr lang="fr-FR" dirty="false" err="true" smtClean="false"/>
+              <a:rPr lang="fr-FR" dirty="0" smtClean="0"/>
+              <a:t> </a:t>
+            </a:r>
+            <a:r>
+              <a:rPr lang="fr-FR" dirty="0" err="1" smtClean="0"/>
               <a:t>sed</a:t>
             </a:r>
             <a:r>
-              <a:rPr lang="fr-FR" dirty="false" smtClean="false"/>
-              <a:t> </a:t>
-            </a:r>
-            <a:r>
-              <a:rPr lang="fr-FR" dirty="false" err="true" smtClean="false"/>
+              <a:rPr lang="fr-FR" dirty="0" smtClean="0"/>
+              <a:t> </a:t>
+            </a:r>
+            <a:r>
+              <a:rPr lang="fr-FR" dirty="0" err="1" smtClean="0"/>
               <a:t>felis</a:t>
             </a:r>
             <a:r>
-              <a:rPr lang="fr-FR" dirty="false" smtClean="false"/>
+              <a:rPr lang="fr-FR" dirty="0" smtClean="0"/>
               <a:t> ut, </a:t>
             </a:r>
             <a:r>
-              <a:rPr lang="fr-FR" dirty="false" err="true" smtClean="false"/>
+              <a:rPr lang="fr-FR" dirty="0" err="1" smtClean="0"/>
               <a:t>fermentum</a:t>
             </a:r>
             <a:r>
-              <a:rPr lang="fr-FR" dirty="false" smtClean="false"/>
-              <a:t> </a:t>
-            </a:r>
-            <a:r>
-              <a:rPr lang="fr-FR" dirty="false" err="true" smtClean="false"/>
+              <a:rPr lang="fr-FR" dirty="0" smtClean="0"/>
+              <a:t> </a:t>
+            </a:r>
+            <a:r>
+              <a:rPr lang="fr-FR" dirty="0" err="1" smtClean="0"/>
               <a:t>commodo</a:t>
             </a:r>
             <a:r>
-              <a:rPr lang="fr-FR" dirty="false" smtClean="false"/>
+              <a:rPr lang="fr-FR" dirty="0" smtClean="0"/>
               <a:t> massa. </a:t>
             </a:r>
             <a:r>
-              <a:rPr lang="fr-FR" dirty="false" err="true" smtClean="false"/>
+              <a:rPr lang="fr-FR" dirty="0" err="1" smtClean="0"/>
               <a:t>Praesent</a:t>
             </a:r>
             <a:r>
-              <a:rPr lang="fr-FR" dirty="false" smtClean="false"/>
-              <a:t> </a:t>
-            </a:r>
-            <a:r>
-              <a:rPr lang="fr-FR" dirty="false" err="true" smtClean="false"/>
+              <a:rPr lang="fr-FR" dirty="0" smtClean="0"/>
+              <a:t> </a:t>
+            </a:r>
+            <a:r>
+              <a:rPr lang="fr-FR" dirty="0" err="1" smtClean="0"/>
               <a:t>lorem</a:t>
             </a:r>
             <a:r>
-              <a:rPr lang="fr-FR" dirty="false" smtClean="false"/>
-              <a:t> </a:t>
-            </a:r>
-            <a:r>
-              <a:rPr lang="fr-FR" dirty="false" err="true" smtClean="false"/>
+              <a:rPr lang="fr-FR" dirty="0" smtClean="0"/>
+              <a:t> </a:t>
+            </a:r>
+            <a:r>
+              <a:rPr lang="fr-FR" dirty="0" err="1" smtClean="0"/>
               <a:t>ligula</a:t>
             </a:r>
             <a:r>
-              <a:rPr lang="fr-FR" dirty="false" smtClean="false"/>
+              <a:rPr lang="fr-FR" dirty="0" smtClean="0"/>
               <a:t>, </a:t>
             </a:r>
             <a:r>
-              <a:rPr lang="fr-FR" dirty="false" err="true" smtClean="false"/>
+              <a:rPr lang="fr-FR" dirty="0" err="1" smtClean="0"/>
               <a:t>lobortis</a:t>
             </a:r>
             <a:r>
-              <a:rPr lang="fr-FR" dirty="false" smtClean="false"/>
-              <a:t> </a:t>
-            </a:r>
-            <a:r>
-              <a:rPr lang="fr-FR" dirty="false" err="true" smtClean="false"/>
+              <a:rPr lang="fr-FR" dirty="0" smtClean="0"/>
+              <a:t> </a:t>
+            </a:r>
+            <a:r>
+              <a:rPr lang="fr-FR" dirty="0" err="1" smtClean="0"/>
               <a:t>vel</a:t>
             </a:r>
             <a:r>
-              <a:rPr lang="fr-FR" dirty="false" smtClean="false"/>
-              <a:t> </a:t>
-            </a:r>
-            <a:r>
-              <a:rPr lang="fr-FR" dirty="false" err="true" smtClean="false"/>
+              <a:rPr lang="fr-FR" dirty="0" smtClean="0"/>
+              <a:t> </a:t>
+            </a:r>
+            <a:r>
+              <a:rPr lang="fr-FR" dirty="0" err="1" smtClean="0"/>
               <a:t>nisi</a:t>
             </a:r>
             <a:r>
-              <a:rPr lang="fr-FR" dirty="false" smtClean="false"/>
+              <a:rPr lang="fr-FR" dirty="0" smtClean="0"/>
               <a:t> id, </a:t>
             </a:r>
             <a:r>
-              <a:rPr lang="fr-FR" dirty="false" err="true" smtClean="false"/>
+              <a:rPr lang="fr-FR" dirty="0" err="1" smtClean="0"/>
               <a:t>laoreet</a:t>
             </a:r>
             <a:r>
-              <a:rPr lang="fr-FR" dirty="false" smtClean="false"/>
-              <a:t> </a:t>
-            </a:r>
-            <a:r>
-              <a:rPr lang="fr-FR" dirty="false" err="true" smtClean="false"/>
+              <a:rPr lang="fr-FR" dirty="0" smtClean="0"/>
+              <a:t> </a:t>
+            </a:r>
+            <a:r>
+              <a:rPr lang="fr-FR" dirty="0" err="1" smtClean="0"/>
               <a:t>mattis</a:t>
             </a:r>
             <a:r>
-              <a:rPr lang="fr-FR" dirty="false" smtClean="false"/>
-              <a:t> </a:t>
-            </a:r>
-            <a:r>
-              <a:rPr lang="fr-FR" dirty="false" err="true" smtClean="false"/>
+              <a:rPr lang="fr-FR" dirty="0" smtClean="0"/>
+              <a:t> </a:t>
+            </a:r>
+            <a:r>
+              <a:rPr lang="fr-FR" dirty="0" err="1" smtClean="0"/>
               <a:t>nibh</a:t>
             </a:r>
             <a:r>
-              <a:rPr lang="fr-FR" dirty="false" smtClean="false"/>
+              <a:rPr lang="fr-FR" dirty="0" smtClean="0"/>
               <a:t>. Suspendisse </a:t>
             </a:r>
             <a:r>
-              <a:rPr lang="fr-FR" dirty="false" err="true" smtClean="false"/>
+              <a:rPr lang="fr-FR" dirty="0" err="1" smtClean="0"/>
               <a:t>auctor</a:t>
             </a:r>
             <a:r>
-              <a:rPr lang="fr-FR" dirty="false" smtClean="false"/>
-              <a:t> </a:t>
-            </a:r>
-            <a:r>
-              <a:rPr lang="fr-FR" dirty="false" err="true" smtClean="false"/>
+              <a:rPr lang="fr-FR" dirty="0" smtClean="0"/>
+              <a:t> </a:t>
+            </a:r>
+            <a:r>
+              <a:rPr lang="fr-FR" dirty="0" err="1" smtClean="0"/>
               <a:t>quam</a:t>
             </a:r>
             <a:r>
-              <a:rPr lang="fr-FR" dirty="false" smtClean="false"/>
-              <a:t> </a:t>
-            </a:r>
-            <a:r>
-              <a:rPr lang="fr-FR" dirty="false" err="true" smtClean="false"/>
+              <a:rPr lang="fr-FR" dirty="0" smtClean="0"/>
+              <a:t> </a:t>
+            </a:r>
+            <a:r>
+              <a:rPr lang="fr-FR" dirty="0" err="1" smtClean="0"/>
               <a:t>quis</a:t>
             </a:r>
             <a:r>
-              <a:rPr lang="fr-FR" dirty="false" smtClean="false"/>
+              <a:rPr lang="fr-FR" dirty="0" smtClean="0"/>
               <a:t> diam </a:t>
             </a:r>
             <a:r>
-              <a:rPr lang="fr-FR" dirty="false" err="true" smtClean="false"/>
+              <a:rPr lang="fr-FR" dirty="0" err="1" smtClean="0"/>
               <a:t>sodales</a:t>
             </a:r>
             <a:r>
-              <a:rPr lang="fr-FR" dirty="false" smtClean="false"/>
+              <a:rPr lang="fr-FR" dirty="0" smtClean="0"/>
               <a:t>, in porta </a:t>
             </a:r>
             <a:r>
-              <a:rPr lang="fr-FR" dirty="false" err="true" smtClean="false"/>
+              <a:rPr lang="fr-FR" dirty="0" err="1" smtClean="0"/>
               <a:t>turpis</a:t>
             </a:r>
             <a:r>
-              <a:rPr lang="fr-FR" dirty="false" smtClean="false"/>
+              <a:rPr lang="fr-FR" dirty="0" smtClean="0"/>
               <a:t> tristique. </a:t>
             </a:r>
             <a:r>
-              <a:rPr lang="fr-FR" dirty="false" err="true" smtClean="false"/>
+              <a:rPr lang="fr-FR" dirty="0" err="1" smtClean="0"/>
               <a:t>Proin</a:t>
             </a:r>
             <a:r>
-              <a:rPr lang="fr-FR" dirty="false" smtClean="false"/>
-              <a:t> </a:t>
-            </a:r>
-            <a:r>
-              <a:rPr lang="fr-FR" dirty="false" err="true" smtClean="false"/>
+              <a:rPr lang="fr-FR" dirty="0" smtClean="0"/>
+              <a:t> </a:t>
+            </a:r>
+            <a:r>
+              <a:rPr lang="fr-FR" dirty="0" err="1" smtClean="0"/>
               <a:t>consequat</a:t>
             </a:r>
             <a:r>
-              <a:rPr lang="fr-FR" dirty="false" smtClean="false"/>
-              <a:t> </a:t>
-            </a:r>
-            <a:r>
-              <a:rPr lang="fr-FR" dirty="false" err="true" smtClean="false"/>
+              <a:rPr lang="fr-FR" dirty="0" smtClean="0"/>
+              <a:t> </a:t>
+            </a:r>
+            <a:r>
+              <a:rPr lang="fr-FR" dirty="0" err="1" smtClean="0"/>
               <a:t>luctus</a:t>
             </a:r>
             <a:r>
-              <a:rPr lang="fr-FR" dirty="false" smtClean="false"/>
-              <a:t> </a:t>
-            </a:r>
-            <a:r>
-              <a:rPr lang="fr-FR" dirty="false" err="true" smtClean="false"/>
+              <a:rPr lang="fr-FR" dirty="0" smtClean="0"/>
+              <a:t> </a:t>
+            </a:r>
+            <a:r>
+              <a:rPr lang="fr-FR" dirty="0" err="1" smtClean="0"/>
               <a:t>aliquet</a:t>
             </a:r>
             <a:r>
-              <a:rPr lang="fr-FR" dirty="false" smtClean="false"/>
+              <a:rPr lang="fr-FR" dirty="0" smtClean="0"/>
               <a:t>. </a:t>
             </a:r>
             <a:r>
-              <a:rPr lang="fr-FR" dirty="false" err="true" smtClean="false"/>
+              <a:rPr lang="fr-FR" dirty="0" err="1" smtClean="0"/>
               <a:t>Proin</a:t>
             </a:r>
             <a:r>
-              <a:rPr lang="fr-FR" dirty="false" smtClean="false"/>
+              <a:rPr lang="fr-FR" dirty="0" smtClean="0"/>
               <a:t> bibendum </a:t>
             </a:r>
             <a:r>
-              <a:rPr lang="fr-FR" dirty="false" err="true" smtClean="false"/>
+              <a:rPr lang="fr-FR" dirty="0" err="1" smtClean="0"/>
               <a:t>tortor</a:t>
             </a:r>
             <a:r>
-              <a:rPr lang="fr-FR" dirty="false" smtClean="false"/>
-              <a:t> </a:t>
-            </a:r>
-            <a:r>
-              <a:rPr lang="fr-FR" dirty="false" err="true" smtClean="false"/>
+              <a:rPr lang="fr-FR" dirty="0" smtClean="0"/>
+              <a:t> </a:t>
+            </a:r>
+            <a:r>
+              <a:rPr lang="fr-FR" dirty="0" err="1" smtClean="0"/>
               <a:t>lectus</a:t>
             </a:r>
             <a:r>
-              <a:rPr lang="fr-FR" dirty="false" smtClean="false"/>
+              <a:rPr lang="fr-FR" dirty="0" smtClean="0"/>
               <a:t>, </a:t>
             </a:r>
             <a:r>
-              <a:rPr lang="fr-FR" dirty="false" err="true" smtClean="false"/>
+              <a:rPr lang="fr-FR" dirty="0" err="1" smtClean="0"/>
               <a:t>sagittis</a:t>
             </a:r>
             <a:r>
-              <a:rPr lang="fr-FR" dirty="false" smtClean="false"/>
-              <a:t> </a:t>
-            </a:r>
-            <a:r>
-              <a:rPr lang="fr-FR" dirty="false" err="true" smtClean="false"/>
+              <a:rPr lang="fr-FR" dirty="0" smtClean="0"/>
+              <a:t> </a:t>
+            </a:r>
+            <a:r>
+              <a:rPr lang="fr-FR" dirty="0" err="1" smtClean="0"/>
               <a:t>suscipit</a:t>
             </a:r>
             <a:r>
-              <a:rPr lang="fr-FR" dirty="false" smtClean="false"/>
+              <a:rPr lang="fr-FR" dirty="0" smtClean="0"/>
               <a:t> ante </a:t>
             </a:r>
             <a:r>
-              <a:rPr lang="fr-FR" dirty="false" err="true" smtClean="false"/>
+              <a:rPr lang="fr-FR" dirty="0" err="1" smtClean="0"/>
               <a:t>scelerisque</a:t>
             </a:r>
             <a:r>
-              <a:rPr lang="fr-FR" dirty="false" smtClean="false"/>
-              <a:t> </a:t>
-            </a:r>
-            <a:r>
-              <a:rPr lang="fr-FR" dirty="false" err="true" smtClean="false"/>
+              <a:rPr lang="fr-FR" dirty="0" smtClean="0"/>
+              <a:t> </a:t>
+            </a:r>
+            <a:r>
+              <a:rPr lang="fr-FR" dirty="0" err="1" smtClean="0"/>
               <a:t>sit</a:t>
             </a:r>
             <a:r>
-              <a:rPr lang="fr-FR" dirty="false" smtClean="false"/>
-              <a:t> </a:t>
-            </a:r>
-            <a:r>
-              <a:rPr lang="fr-FR" dirty="false" err="true" smtClean="false"/>
+              <a:rPr lang="fr-FR" dirty="0" smtClean="0"/>
+              <a:t> </a:t>
+            </a:r>
+            <a:r>
+              <a:rPr lang="fr-FR" dirty="0" err="1" smtClean="0"/>
               <a:t>amet</a:t>
             </a:r>
             <a:r>
-              <a:rPr lang="fr-FR" dirty="false" smtClean="false"/>
+              <a:rPr lang="fr-FR" dirty="0" smtClean="0"/>
               <a:t>. </a:t>
             </a:r>
             <a:r>
-              <a:rPr lang="fr-FR" dirty="false" err="true" smtClean="false"/>
+              <a:rPr lang="fr-FR" dirty="0" err="1" smtClean="0"/>
               <a:t>Integer</a:t>
             </a:r>
             <a:r>
-              <a:rPr lang="fr-FR" dirty="false" smtClean="false"/>
-              <a:t> </a:t>
-            </a:r>
-            <a:r>
-              <a:rPr lang="fr-FR" dirty="false" err="true" smtClean="false"/>
+              <a:rPr lang="fr-FR" dirty="0" smtClean="0"/>
+              <a:t> </a:t>
+            </a:r>
+            <a:r>
+              <a:rPr lang="fr-FR" dirty="0" err="1" smtClean="0"/>
               <a:t>sed</a:t>
             </a:r>
             <a:r>
-              <a:rPr lang="fr-FR" dirty="false" smtClean="false"/>
+              <a:rPr lang="fr-FR" dirty="0" smtClean="0"/>
               <a:t> cursus </a:t>
             </a:r>
             <a:r>
-              <a:rPr lang="fr-FR" dirty="false" err="true" smtClean="false"/>
+              <a:rPr lang="fr-FR" dirty="0" err="1" smtClean="0"/>
               <a:t>metus</a:t>
             </a:r>
             <a:r>
-              <a:rPr lang="fr-FR" dirty="false" smtClean="false"/>
+              <a:rPr lang="fr-FR" dirty="0" smtClean="0"/>
               <a:t>. Ut id </a:t>
             </a:r>
             <a:r>
-              <a:rPr lang="fr-FR" dirty="false" err="true" smtClean="false"/>
+              <a:rPr lang="fr-FR" dirty="0" err="1" smtClean="0"/>
               <a:t>dapibus</a:t>
             </a:r>
             <a:r>
-              <a:rPr lang="fr-FR" dirty="false" smtClean="false"/>
-              <a:t> </a:t>
-            </a:r>
-            <a:r>
-              <a:rPr lang="fr-FR" dirty="false" err="true" smtClean="false"/>
+              <a:rPr lang="fr-FR" dirty="0" smtClean="0"/>
+              <a:t> </a:t>
+            </a:r>
+            <a:r>
+              <a:rPr lang="fr-FR" dirty="0" err="1" smtClean="0"/>
               <a:t>mauris</a:t>
             </a:r>
             <a:r>
-              <a:rPr lang="fr-FR" dirty="false" smtClean="false"/>
+              <a:rPr lang="fr-FR" dirty="0" smtClean="0"/>
               <a:t>. Nunc in </a:t>
             </a:r>
             <a:r>
-              <a:rPr lang="fr-FR" dirty="false" err="true" smtClean="false"/>
+              <a:rPr lang="fr-FR" dirty="0" err="1" smtClean="0"/>
               <a:t>risus</a:t>
             </a:r>
             <a:r>
-              <a:rPr lang="fr-FR" dirty="false" smtClean="false"/>
-              <a:t> </a:t>
-            </a:r>
-            <a:r>
-              <a:rPr lang="fr-FR" dirty="false" err="true" smtClean="false"/>
+              <a:rPr lang="fr-FR" dirty="0" smtClean="0"/>
+              <a:t> </a:t>
+            </a:r>
+            <a:r>
+              <a:rPr lang="fr-FR" dirty="0" err="1" smtClean="0"/>
               <a:t>leo</a:t>
             </a:r>
             <a:r>
-              <a:rPr lang="fr-FR" dirty="false" smtClean="false"/>
+              <a:rPr lang="fr-FR" dirty="0" smtClean="0"/>
               <a:t>. </a:t>
             </a:r>
             <a:r>
-              <a:rPr lang="fr-FR" dirty="false" err="true" smtClean="false"/>
+              <a:rPr lang="fr-FR" dirty="0" err="1" smtClean="0"/>
               <a:t>Mauris</a:t>
             </a:r>
             <a:r>
-              <a:rPr lang="fr-FR" dirty="false" smtClean="false"/>
+              <a:rPr lang="fr-FR" dirty="0" smtClean="0"/>
               <a:t> eu </a:t>
             </a:r>
             <a:r>
-              <a:rPr lang="fr-FR" dirty="false" err="true" smtClean="false"/>
+              <a:rPr lang="fr-FR" dirty="0" err="1" smtClean="0"/>
               <a:t>dictum</a:t>
             </a:r>
             <a:r>
-              <a:rPr lang="fr-FR" dirty="false" smtClean="false"/>
+              <a:rPr lang="fr-FR" dirty="0" smtClean="0"/>
               <a:t> nunc, </a:t>
             </a:r>
             <a:r>
-              <a:rPr lang="fr-FR" dirty="false" err="true" smtClean="false"/>
+              <a:rPr lang="fr-FR" dirty="0" err="1" smtClean="0"/>
               <a:t>posuere</a:t>
             </a:r>
             <a:r>
-              <a:rPr lang="fr-FR" dirty="false" smtClean="false"/>
-              <a:t> </a:t>
-            </a:r>
-            <a:r>
-              <a:rPr lang="fr-FR" dirty="false" err="true" smtClean="false"/>
+              <a:rPr lang="fr-FR" dirty="0" smtClean="0"/>
+              <a:t> </a:t>
+            </a:r>
+            <a:r>
+              <a:rPr lang="fr-FR" dirty="0" err="1" smtClean="0"/>
               <a:t>volutpat</a:t>
             </a:r>
             <a:r>
-              <a:rPr lang="fr-FR" dirty="false" smtClean="false"/>
-              <a:t> </a:t>
-            </a:r>
-            <a:r>
-              <a:rPr lang="fr-FR" dirty="false" err="true" smtClean="false"/>
+              <a:rPr lang="fr-FR" dirty="0" smtClean="0"/>
+              <a:t> </a:t>
+            </a:r>
+            <a:r>
+              <a:rPr lang="fr-FR" dirty="0" err="1" smtClean="0"/>
               <a:t>urna</a:t>
             </a:r>
             <a:r>
-              <a:rPr lang="fr-FR" dirty="false" smtClean="false"/>
+              <a:rPr lang="fr-FR" dirty="0" smtClean="0"/>
               <a:t>. </a:t>
             </a:r>
             <a:r>
-              <a:rPr lang="fr-FR" dirty="false" err="true" smtClean="false"/>
+              <a:rPr lang="fr-FR" dirty="0" err="1" smtClean="0"/>
               <a:t>Pellentesque</a:t>
             </a:r>
             <a:r>
-              <a:rPr lang="fr-FR" dirty="false" smtClean="false"/>
+              <a:rPr lang="fr-FR" dirty="0" smtClean="0"/>
               <a:t> at </a:t>
             </a:r>
             <a:r>
-              <a:rPr lang="fr-FR" dirty="false" err="true" smtClean="false"/>
+              <a:rPr lang="fr-FR" dirty="0" err="1" smtClean="0"/>
               <a:t>nisl</a:t>
             </a:r>
             <a:r>
-              <a:rPr lang="fr-FR" dirty="false" smtClean="false"/>
-              <a:t> </a:t>
-            </a:r>
-            <a:r>
-              <a:rPr lang="fr-FR" dirty="false" err="true" smtClean="false"/>
+              <a:rPr lang="fr-FR" dirty="0" smtClean="0"/>
+              <a:t> </a:t>
+            </a:r>
+            <a:r>
+              <a:rPr lang="fr-FR" dirty="0" err="1" smtClean="0"/>
               <a:t>sodales</a:t>
             </a:r>
             <a:r>
-              <a:rPr lang="fr-FR" dirty="false" smtClean="false"/>
+              <a:rPr lang="fr-FR" dirty="0" smtClean="0"/>
               <a:t>, </a:t>
             </a:r>
             <a:r>
-              <a:rPr lang="fr-FR" dirty="false" err="true" smtClean="false"/>
+              <a:rPr lang="fr-FR" dirty="0" err="1" smtClean="0"/>
               <a:t>tempus</a:t>
             </a:r>
             <a:r>
-              <a:rPr lang="fr-FR" dirty="false" smtClean="false"/>
-              <a:t> </a:t>
-            </a:r>
-            <a:r>
-              <a:rPr lang="fr-FR" dirty="false" err="true" smtClean="false"/>
+              <a:rPr lang="fr-FR" dirty="0" smtClean="0"/>
+              <a:t> </a:t>
+            </a:r>
+            <a:r>
+              <a:rPr lang="fr-FR" dirty="0" err="1" smtClean="0"/>
               <a:t>lacus</a:t>
             </a:r>
             <a:r>
-              <a:rPr lang="fr-FR" dirty="false" smtClean="false"/>
-              <a:t> </a:t>
-            </a:r>
-            <a:r>
-              <a:rPr lang="fr-FR" dirty="false" err="true" smtClean="false"/>
+              <a:rPr lang="fr-FR" dirty="0" smtClean="0"/>
+              <a:t> </a:t>
+            </a:r>
+            <a:r>
+              <a:rPr lang="fr-FR" dirty="0" err="1" smtClean="0"/>
               <a:t>ac</a:t>
             </a:r>
             <a:r>
-              <a:rPr lang="fr-FR" dirty="false" smtClean="false"/>
+              <a:rPr lang="fr-FR" dirty="0" smtClean="0"/>
               <a:t>, </a:t>
             </a:r>
             <a:r>
-              <a:rPr lang="fr-FR" dirty="false" err="true" smtClean="false"/>
+              <a:rPr lang="fr-FR" dirty="0" err="1" smtClean="0"/>
               <a:t>consectetur</a:t>
             </a:r>
             <a:r>
-              <a:rPr lang="fr-FR" dirty="false" smtClean="false"/>
-              <a:t> </a:t>
-            </a:r>
-            <a:r>
-              <a:rPr lang="fr-FR" dirty="false" err="true" smtClean="false"/>
+              <a:rPr lang="fr-FR" dirty="0" smtClean="0"/>
+              <a:t> </a:t>
+            </a:r>
+            <a:r>
+              <a:rPr lang="fr-FR" dirty="0" err="1" smtClean="0"/>
               <a:t>nibh</a:t>
             </a:r>
             <a:r>
-              <a:rPr lang="fr-FR" dirty="false" smtClean="false"/>
+              <a:rPr lang="fr-FR" dirty="0" smtClean="0"/>
               <a:t>.</a:t>
             </a:r>
           </a:p>
           <a:p>
             <a:r>
-              <a:rPr lang="fr-FR" dirty="false" err="true" smtClean="false"/>
+              <a:rPr lang="fr-FR" dirty="0" err="1" smtClean="0"/>
               <a:t>Aenean</a:t>
             </a:r>
             <a:r>
-              <a:rPr lang="fr-FR" dirty="false" smtClean="false"/>
-              <a:t> </a:t>
-            </a:r>
-            <a:r>
-              <a:rPr lang="fr-FR" dirty="false" err="true" smtClean="false"/>
+              <a:rPr lang="fr-FR" dirty="0" smtClean="0"/>
+              <a:t> </a:t>
+            </a:r>
+            <a:r>
+              <a:rPr lang="fr-FR" dirty="0" err="1" smtClean="0"/>
               <a:t>convallis</a:t>
             </a:r>
             <a:r>
-              <a:rPr lang="fr-FR" dirty="false" smtClean="false"/>
-              <a:t> </a:t>
-            </a:r>
-            <a:r>
-              <a:rPr lang="fr-FR" dirty="false" err="true" smtClean="false"/>
+              <a:rPr lang="fr-FR" dirty="0" smtClean="0"/>
+              <a:t> </a:t>
+            </a:r>
+            <a:r>
+              <a:rPr lang="fr-FR" dirty="0" err="1" smtClean="0"/>
               <a:t>lacus</a:t>
             </a:r>
             <a:r>
-              <a:rPr lang="fr-FR" dirty="false" smtClean="false"/>
+              <a:rPr lang="fr-FR" dirty="0" smtClean="0"/>
               <a:t> at </a:t>
             </a:r>
             <a:r>
-              <a:rPr lang="fr-FR" dirty="false" err="true" smtClean="false"/>
+              <a:rPr lang="fr-FR" dirty="0" err="1" smtClean="0"/>
               <a:t>velit</a:t>
             </a:r>
             <a:r>
-              <a:rPr lang="fr-FR" dirty="false" smtClean="false"/>
-              <a:t> </a:t>
-            </a:r>
-            <a:r>
-              <a:rPr lang="fr-FR" dirty="false" err="true" smtClean="false"/>
+              <a:rPr lang="fr-FR" dirty="0" smtClean="0"/>
+              <a:t> </a:t>
+            </a:r>
+            <a:r>
+              <a:rPr lang="fr-FR" dirty="0" err="1" smtClean="0"/>
               <a:t>rhoncus</a:t>
             </a:r>
             <a:r>
-              <a:rPr lang="fr-FR" dirty="false" smtClean="false"/>
+              <a:rPr lang="fr-FR" dirty="0" smtClean="0"/>
               <a:t>, non </a:t>
             </a:r>
             <a:r>
-              <a:rPr lang="fr-FR" dirty="false" err="true" smtClean="false"/>
+              <a:rPr lang="fr-FR" dirty="0" err="1" smtClean="0"/>
               <a:t>rhoncus</a:t>
             </a:r>
             <a:r>
-              <a:rPr lang="fr-FR" dirty="false" smtClean="false"/>
-              <a:t> </a:t>
-            </a:r>
-            <a:r>
-              <a:rPr lang="fr-FR" dirty="false" err="true" smtClean="false"/>
+              <a:rPr lang="fr-FR" dirty="0" smtClean="0"/>
+              <a:t> </a:t>
+            </a:r>
+            <a:r>
+              <a:rPr lang="fr-FR" dirty="0" err="1" smtClean="0"/>
               <a:t>metus</a:t>
             </a:r>
             <a:r>
-              <a:rPr lang="fr-FR" dirty="false" smtClean="false"/>
-              <a:t> </a:t>
-            </a:r>
-            <a:r>
-              <a:rPr lang="fr-FR" dirty="false" err="true" smtClean="false"/>
+              <a:rPr lang="fr-FR" dirty="0" smtClean="0"/>
+              <a:t> </a:t>
+            </a:r>
+            <a:r>
+              <a:rPr lang="fr-FR" dirty="0" err="1" smtClean="0"/>
               <a:t>finibus</a:t>
             </a:r>
             <a:r>
-              <a:rPr lang="fr-FR" dirty="false" smtClean="false"/>
+              <a:rPr lang="fr-FR" dirty="0" smtClean="0"/>
               <a:t>. Sed est magna, </a:t>
             </a:r>
             <a:r>
-              <a:rPr lang="fr-FR" dirty="false" err="true" smtClean="false"/>
+              <a:rPr lang="fr-FR" dirty="0" err="1" smtClean="0"/>
               <a:t>porttitor</a:t>
             </a:r>
             <a:r>
-              <a:rPr lang="fr-FR" dirty="false" smtClean="false"/>
-              <a:t> </a:t>
-            </a:r>
-            <a:r>
-              <a:rPr lang="fr-FR" dirty="false" err="true" smtClean="false"/>
+              <a:rPr lang="fr-FR" dirty="0" smtClean="0"/>
+              <a:t> </a:t>
+            </a:r>
+            <a:r>
+              <a:rPr lang="fr-FR" dirty="0" err="1" smtClean="0"/>
               <a:t>quis</a:t>
             </a:r>
             <a:r>
-              <a:rPr lang="fr-FR" dirty="false" smtClean="false"/>
-              <a:t> </a:t>
-            </a:r>
-            <a:r>
-              <a:rPr lang="fr-FR" dirty="false" err="true" smtClean="false"/>
+              <a:rPr lang="fr-FR" dirty="0" smtClean="0"/>
+              <a:t> </a:t>
+            </a:r>
+            <a:r>
+              <a:rPr lang="fr-FR" dirty="0" err="1" smtClean="0"/>
               <a:t>condimentum</a:t>
             </a:r>
             <a:r>
-              <a:rPr lang="fr-FR" dirty="false" smtClean="false"/>
-              <a:t> </a:t>
-            </a:r>
-            <a:r>
-              <a:rPr lang="fr-FR" dirty="false" err="true" smtClean="false"/>
+              <a:rPr lang="fr-FR" dirty="0" smtClean="0"/>
+              <a:t> </a:t>
+            </a:r>
+            <a:r>
+              <a:rPr lang="fr-FR" dirty="0" err="1" smtClean="0"/>
               <a:t>quis</a:t>
             </a:r>
             <a:r>
-              <a:rPr lang="fr-FR" dirty="false" smtClean="false"/>
+              <a:rPr lang="fr-FR" dirty="0" smtClean="0"/>
               <a:t>, </a:t>
             </a:r>
             <a:r>
-              <a:rPr lang="fr-FR" dirty="false" err="true" smtClean="false"/>
+              <a:rPr lang="fr-FR" dirty="0" err="1" smtClean="0"/>
               <a:t>luctus</a:t>
             </a:r>
             <a:r>
-              <a:rPr lang="fr-FR" dirty="false" smtClean="false"/>
-              <a:t> </a:t>
-            </a:r>
-            <a:r>
-              <a:rPr lang="fr-FR" dirty="false" err="true" smtClean="false"/>
+              <a:rPr lang="fr-FR" dirty="0" smtClean="0"/>
+              <a:t> </a:t>
+            </a:r>
+            <a:r>
+              <a:rPr lang="fr-FR" dirty="0" err="1" smtClean="0"/>
               <a:t>sed</a:t>
             </a:r>
             <a:r>
-              <a:rPr lang="fr-FR" dirty="false" smtClean="false"/>
+              <a:rPr lang="fr-FR" dirty="0" smtClean="0"/>
               <a:t> mi. </a:t>
             </a:r>
             <a:r>
-              <a:rPr lang="fr-FR" dirty="false" err="true" smtClean="false"/>
+              <a:rPr lang="fr-FR" dirty="0" err="1" smtClean="0"/>
               <a:t>Nulla</a:t>
             </a:r>
             <a:r>
-              <a:rPr lang="fr-FR" dirty="false" smtClean="false"/>
+              <a:rPr lang="fr-FR" dirty="0" smtClean="0"/>
               <a:t> eu </a:t>
             </a:r>
             <a:r>
-              <a:rPr lang="fr-FR" dirty="false" err="true" smtClean="false"/>
+              <a:rPr lang="fr-FR" dirty="0" err="1" smtClean="0"/>
               <a:t>ullamcorper</a:t>
             </a:r>
             <a:r>
-              <a:rPr lang="fr-FR" dirty="false" smtClean="false"/>
+              <a:rPr lang="fr-FR" dirty="0" smtClean="0"/>
               <a:t> mi. Suspendisse </a:t>
             </a:r>
             <a:r>
-              <a:rPr lang="fr-FR" dirty="false" err="true" smtClean="false"/>
+              <a:rPr lang="fr-FR" dirty="0" err="1" smtClean="0"/>
               <a:t>sagittis</a:t>
             </a:r>
             <a:r>
-              <a:rPr lang="fr-FR" dirty="false" smtClean="false"/>
+              <a:rPr lang="fr-FR" dirty="0" smtClean="0"/>
               <a:t>, </a:t>
             </a:r>
             <a:r>
-              <a:rPr lang="fr-FR" dirty="false" err="true" smtClean="false"/>
+              <a:rPr lang="fr-FR" dirty="0" err="1" smtClean="0"/>
               <a:t>quam</a:t>
             </a:r>
             <a:r>
-              <a:rPr lang="fr-FR" dirty="false" smtClean="false"/>
+              <a:rPr lang="fr-FR" dirty="0" smtClean="0"/>
               <a:t> id </a:t>
             </a:r>
             <a:r>
-              <a:rPr lang="fr-FR" dirty="false" err="true" smtClean="false"/>
+              <a:rPr lang="fr-FR" dirty="0" err="1" smtClean="0"/>
               <a:t>elementum</a:t>
             </a:r>
             <a:r>
-              <a:rPr lang="fr-FR" dirty="false" smtClean="false"/>
-              <a:t> </a:t>
-            </a:r>
-            <a:r>
-              <a:rPr lang="fr-FR" dirty="false" err="true" smtClean="false"/>
+              <a:rPr lang="fr-FR" dirty="0" smtClean="0"/>
+              <a:t> </a:t>
+            </a:r>
+            <a:r>
+              <a:rPr lang="fr-FR" dirty="0" err="1" smtClean="0"/>
               <a:t>feugiat</a:t>
             </a:r>
             <a:r>
-              <a:rPr lang="fr-FR" dirty="false" smtClean="false"/>
+              <a:rPr lang="fr-FR" dirty="0" smtClean="0"/>
               <a:t>, diam </a:t>
             </a:r>
             <a:r>
-              <a:rPr lang="fr-FR" dirty="false" err="true" smtClean="false"/>
+              <a:rPr lang="fr-FR" dirty="0" err="1" smtClean="0"/>
               <a:t>arcu</a:t>
             </a:r>
             <a:r>
-              <a:rPr lang="fr-FR" dirty="false" smtClean="false"/>
-              <a:t> </a:t>
-            </a:r>
-            <a:r>
-              <a:rPr lang="fr-FR" dirty="false" err="true" smtClean="false"/>
+              <a:rPr lang="fr-FR" dirty="0" smtClean="0"/>
+              <a:t> </a:t>
+            </a:r>
+            <a:r>
+              <a:rPr lang="fr-FR" dirty="0" err="1" smtClean="0"/>
               <a:t>fringilla</a:t>
             </a:r>
             <a:r>
-              <a:rPr lang="fr-FR" dirty="false" smtClean="false"/>
-              <a:t> </a:t>
-            </a:r>
-            <a:r>
-              <a:rPr lang="fr-FR" dirty="false" err="true" smtClean="false"/>
+              <a:rPr lang="fr-FR" dirty="0" smtClean="0"/>
+              <a:t> </a:t>
+            </a:r>
+            <a:r>
+              <a:rPr lang="fr-FR" dirty="0" err="1" smtClean="0"/>
               <a:t>dui</a:t>
             </a:r>
             <a:r>
-              <a:rPr lang="fr-FR" dirty="false" smtClean="false"/>
+              <a:rPr lang="fr-FR" dirty="0" smtClean="0"/>
               <a:t>, eu </a:t>
             </a:r>
             <a:r>
-              <a:rPr lang="fr-FR" dirty="false" err="true" smtClean="false"/>
+              <a:rPr lang="fr-FR" dirty="0" err="1" smtClean="0"/>
               <a:t>finibus</a:t>
             </a:r>
             <a:r>
-              <a:rPr lang="fr-FR" dirty="false" smtClean="false"/>
-              <a:t> </a:t>
-            </a:r>
-            <a:r>
-              <a:rPr lang="fr-FR" dirty="false" err="true" smtClean="false"/>
+              <a:rPr lang="fr-FR" dirty="0" smtClean="0"/>
+              <a:t> </a:t>
+            </a:r>
+            <a:r>
+              <a:rPr lang="fr-FR" dirty="0" err="1" smtClean="0"/>
               <a:t>dolor</a:t>
             </a:r>
             <a:r>
-              <a:rPr lang="fr-FR" dirty="false" smtClean="false"/>
-              <a:t> </a:t>
-            </a:r>
-            <a:r>
-              <a:rPr lang="fr-FR" dirty="false" err="true" smtClean="false"/>
+              <a:rPr lang="fr-FR" dirty="0" smtClean="0"/>
+              <a:t> </a:t>
+            </a:r>
+            <a:r>
+              <a:rPr lang="fr-FR" dirty="0" err="1" smtClean="0"/>
               <a:t>tellus</a:t>
             </a:r>
             <a:r>
-              <a:rPr lang="fr-FR" dirty="false" smtClean="false"/>
+              <a:rPr lang="fr-FR" dirty="0" smtClean="0"/>
               <a:t> in </a:t>
             </a:r>
             <a:r>
-              <a:rPr lang="fr-FR" dirty="false" err="true" smtClean="false"/>
+              <a:rPr lang="fr-FR" dirty="0" err="1" smtClean="0"/>
               <a:t>augue</a:t>
             </a:r>
             <a:r>
-              <a:rPr lang="fr-FR" dirty="false" smtClean="false"/>
+              <a:rPr lang="fr-FR" dirty="0" smtClean="0"/>
               <a:t>. Nam </a:t>
             </a:r>
             <a:r>
-              <a:rPr lang="fr-FR" dirty="false" err="true" smtClean="false"/>
+              <a:rPr lang="fr-FR" dirty="0" err="1" smtClean="0"/>
               <a:t>consectetur</a:t>
             </a:r>
             <a:r>
-              <a:rPr lang="fr-FR" dirty="false" smtClean="false"/>
-              <a:t> </a:t>
-            </a:r>
-            <a:r>
-              <a:rPr lang="fr-FR" dirty="false" err="true" smtClean="false"/>
+              <a:rPr lang="fr-FR" dirty="0" smtClean="0"/>
+              <a:t> </a:t>
+            </a:r>
+            <a:r>
+              <a:rPr lang="fr-FR" dirty="0" err="1" smtClean="0"/>
               <a:t>luctus</a:t>
             </a:r>
             <a:r>
-              <a:rPr lang="fr-FR" dirty="false" smtClean="false"/>
-              <a:t> </a:t>
-            </a:r>
-            <a:r>
-              <a:rPr lang="fr-FR" dirty="false" err="true" smtClean="false"/>
+              <a:rPr lang="fr-FR" dirty="0" smtClean="0"/>
+              <a:t> </a:t>
+            </a:r>
+            <a:r>
+              <a:rPr lang="fr-FR" dirty="0" err="1" smtClean="0"/>
               <a:t>lectus</a:t>
             </a:r>
             <a:r>
-              <a:rPr lang="fr-FR" dirty="false" smtClean="false"/>
-              <a:t> </a:t>
-            </a:r>
-            <a:r>
-              <a:rPr lang="fr-FR" dirty="false" err="true" smtClean="false"/>
+              <a:rPr lang="fr-FR" dirty="0" smtClean="0"/>
+              <a:t> </a:t>
+            </a:r>
+            <a:r>
+              <a:rPr lang="fr-FR" dirty="0" err="1" smtClean="0"/>
               <a:t>eget</a:t>
             </a:r>
             <a:r>
-              <a:rPr lang="fr-FR" dirty="false" smtClean="false"/>
-              <a:t> </a:t>
-            </a:r>
-            <a:r>
-              <a:rPr lang="fr-FR" dirty="false" err="true" smtClean="false"/>
+              <a:rPr lang="fr-FR" dirty="0" smtClean="0"/>
+              <a:t> </a:t>
+            </a:r>
+            <a:r>
+              <a:rPr lang="fr-FR" dirty="0" err="1" smtClean="0"/>
               <a:t>congue</a:t>
             </a:r>
             <a:r>
-              <a:rPr lang="fr-FR" dirty="false" smtClean="false"/>
+              <a:rPr lang="fr-FR" dirty="0" smtClean="0"/>
               <a:t>. Sed </a:t>
             </a:r>
             <a:r>
-              <a:rPr lang="fr-FR" dirty="false" err="true" smtClean="false"/>
+              <a:rPr lang="fr-FR" dirty="0" err="1" smtClean="0"/>
               <a:t>fringilla</a:t>
             </a:r>
             <a:r>
-              <a:rPr lang="fr-FR" dirty="false" smtClean="false"/>
+              <a:rPr lang="fr-FR" dirty="0" smtClean="0"/>
               <a:t> non ex </a:t>
             </a:r>
             <a:r>
-              <a:rPr lang="fr-FR" dirty="false" err="true" smtClean="false"/>
+              <a:rPr lang="fr-FR" dirty="0" err="1" smtClean="0"/>
               <a:t>sollicitudin</a:t>
             </a:r>
             <a:r>
-              <a:rPr lang="fr-FR" dirty="false" smtClean="false"/>
-              <a:t> </a:t>
-            </a:r>
-            <a:r>
-              <a:rPr lang="fr-FR" dirty="false" err="true" smtClean="false"/>
+              <a:rPr lang="fr-FR" dirty="0" smtClean="0"/>
+              <a:t> </a:t>
+            </a:r>
+            <a:r>
+              <a:rPr lang="fr-FR" dirty="0" err="1" smtClean="0"/>
               <a:t>ultricies</a:t>
             </a:r>
             <a:r>
-              <a:rPr lang="fr-FR" dirty="false" smtClean="false"/>
+              <a:rPr lang="fr-FR" dirty="0" smtClean="0"/>
               <a:t>. </a:t>
             </a:r>
             <a:r>
-              <a:rPr lang="fr-FR" dirty="false" err="true" smtClean="false"/>
+              <a:rPr lang="fr-FR" dirty="0" err="1" smtClean="0"/>
               <a:t>Integer</a:t>
             </a:r>
             <a:r>
-              <a:rPr lang="fr-FR" dirty="false" smtClean="false"/>
-              <a:t> </a:t>
-            </a:r>
-            <a:r>
-              <a:rPr lang="fr-FR" dirty="false" err="true" smtClean="false"/>
+              <a:rPr lang="fr-FR" dirty="0" smtClean="0"/>
+              <a:t> </a:t>
+            </a:r>
+            <a:r>
+              <a:rPr lang="fr-FR" dirty="0" err="1" smtClean="0"/>
               <a:t>ligula</a:t>
             </a:r>
             <a:r>
-              <a:rPr lang="fr-FR" dirty="false" smtClean="false"/>
-              <a:t> </a:t>
-            </a:r>
-            <a:r>
-              <a:rPr lang="fr-FR" dirty="false" err="true" smtClean="false"/>
+              <a:rPr lang="fr-FR" dirty="0" smtClean="0"/>
+              <a:t> </a:t>
+            </a:r>
+            <a:r>
+              <a:rPr lang="fr-FR" dirty="0" err="1" smtClean="0"/>
               <a:t>quam</a:t>
             </a:r>
             <a:r>
-              <a:rPr lang="fr-FR" dirty="false" smtClean="false"/>
+              <a:rPr lang="fr-FR" dirty="0" smtClean="0"/>
               <a:t>, </a:t>
             </a:r>
             <a:r>
-              <a:rPr lang="fr-FR" dirty="false" err="true" smtClean="false"/>
+              <a:rPr lang="fr-FR" dirty="0" err="1" smtClean="0"/>
               <a:t>sodales</a:t>
             </a:r>
             <a:r>
-              <a:rPr lang="fr-FR" dirty="false" smtClean="false"/>
+              <a:rPr lang="fr-FR" dirty="0" smtClean="0"/>
               <a:t> nec </a:t>
             </a:r>
             <a:r>
-              <a:rPr lang="fr-FR" dirty="false" err="true" smtClean="false"/>
+              <a:rPr lang="fr-FR" dirty="0" err="1" smtClean="0"/>
               <a:t>nulla</a:t>
             </a:r>
             <a:r>
-              <a:rPr lang="fr-FR" dirty="false" smtClean="false"/>
+              <a:rPr lang="fr-FR" dirty="0" smtClean="0"/>
               <a:t> at, </a:t>
             </a:r>
             <a:r>
-              <a:rPr lang="fr-FR" dirty="false" err="true" smtClean="false"/>
+              <a:rPr lang="fr-FR" dirty="0" err="1" smtClean="0"/>
               <a:t>rutrum</a:t>
             </a:r>
             <a:r>
-              <a:rPr lang="fr-FR" dirty="false" smtClean="false"/>
-              <a:t> </a:t>
-            </a:r>
-            <a:r>
-              <a:rPr lang="fr-FR" dirty="false" err="true" smtClean="false"/>
+              <a:rPr lang="fr-FR" dirty="0" smtClean="0"/>
+              <a:t> </a:t>
+            </a:r>
+            <a:r>
+              <a:rPr lang="fr-FR" dirty="0" err="1" smtClean="0"/>
               <a:t>suscipit</a:t>
             </a:r>
             <a:r>
-              <a:rPr lang="fr-FR" dirty="false" smtClean="false"/>
-              <a:t> </a:t>
-            </a:r>
-            <a:r>
-              <a:rPr lang="fr-FR" dirty="false" err="true" smtClean="false"/>
+              <a:rPr lang="fr-FR" dirty="0" smtClean="0"/>
+              <a:t> </a:t>
+            </a:r>
+            <a:r>
+              <a:rPr lang="fr-FR" dirty="0" err="1" smtClean="0"/>
               <a:t>nisl</a:t>
             </a:r>
             <a:r>
-              <a:rPr lang="fr-FR" dirty="false" smtClean="false"/>
+              <a:rPr lang="fr-FR" dirty="0" smtClean="0"/>
               <a:t>. </a:t>
             </a:r>
             <a:r>
-              <a:rPr lang="fr-FR" dirty="false" err="true" smtClean="false"/>
+              <a:rPr lang="fr-FR" dirty="0" err="1" smtClean="0"/>
               <a:t>Cras</a:t>
             </a:r>
             <a:r>
-              <a:rPr lang="fr-FR" dirty="false" smtClean="false"/>
-              <a:t> </a:t>
-            </a:r>
-            <a:r>
-              <a:rPr lang="fr-FR" dirty="false" err="true" smtClean="false"/>
+              <a:rPr lang="fr-FR" dirty="0" smtClean="0"/>
+              <a:t> </a:t>
+            </a:r>
+            <a:r>
+              <a:rPr lang="fr-FR" dirty="0" err="1" smtClean="0"/>
               <a:t>ullamcorper</a:t>
             </a:r>
             <a:r>
-              <a:rPr lang="fr-FR" dirty="false" smtClean="false"/>
+              <a:rPr lang="fr-FR" dirty="0" smtClean="0"/>
               <a:t> magna </a:t>
             </a:r>
             <a:r>
-              <a:rPr lang="fr-FR" dirty="false" err="true" smtClean="false"/>
+              <a:rPr lang="fr-FR" dirty="0" err="1" smtClean="0"/>
               <a:t>eros</a:t>
             </a:r>
             <a:r>
-              <a:rPr lang="fr-FR" dirty="false" smtClean="false"/>
+              <a:rPr lang="fr-FR" dirty="0" smtClean="0"/>
               <a:t>, </a:t>
             </a:r>
             <a:r>
-              <a:rPr lang="fr-FR" dirty="false" err="true" smtClean="false"/>
+              <a:rPr lang="fr-FR" dirty="0" err="1" smtClean="0"/>
               <a:t>eget</a:t>
             </a:r>
             <a:r>
-              <a:rPr lang="fr-FR" dirty="false" smtClean="false"/>
-              <a:t> </a:t>
-            </a:r>
-            <a:r>
-              <a:rPr lang="fr-FR" dirty="false" err="true" smtClean="false"/>
+              <a:rPr lang="fr-FR" dirty="0" smtClean="0"/>
+              <a:t> </a:t>
+            </a:r>
+            <a:r>
+              <a:rPr lang="fr-FR" dirty="0" err="1" smtClean="0"/>
               <a:t>aliquet</a:t>
             </a:r>
             <a:r>
-              <a:rPr lang="fr-FR" dirty="false" smtClean="false"/>
-              <a:t> </a:t>
-            </a:r>
-            <a:r>
-              <a:rPr lang="fr-FR" dirty="false" err="true" smtClean="false"/>
+              <a:rPr lang="fr-FR" dirty="0" smtClean="0"/>
+              <a:t> </a:t>
+            </a:r>
+            <a:r>
+              <a:rPr lang="fr-FR" dirty="0" err="1" smtClean="0"/>
               <a:t>odio</a:t>
             </a:r>
             <a:r>
-              <a:rPr lang="fr-FR" dirty="false" smtClean="false"/>
-              <a:t> </a:t>
-            </a:r>
-            <a:r>
-              <a:rPr lang="fr-FR" dirty="false" err="true" smtClean="false"/>
+              <a:rPr lang="fr-FR" dirty="0" smtClean="0"/>
+              <a:t> </a:t>
+            </a:r>
+            <a:r>
+              <a:rPr lang="fr-FR" dirty="0" err="1" smtClean="0"/>
               <a:t>consequat</a:t>
             </a:r>
             <a:r>
-              <a:rPr lang="fr-FR" dirty="false" smtClean="false"/>
-              <a:t> </a:t>
-            </a:r>
-            <a:r>
-              <a:rPr lang="fr-FR" dirty="false" err="true" smtClean="false"/>
+              <a:rPr lang="fr-FR" dirty="0" smtClean="0"/>
+              <a:t> </a:t>
+            </a:r>
+            <a:r>
+              <a:rPr lang="fr-FR" dirty="0" err="1" smtClean="0"/>
               <a:t>rhoncus</a:t>
             </a:r>
             <a:r>
-              <a:rPr lang="fr-FR" dirty="false" smtClean="false"/>
+              <a:rPr lang="fr-FR" dirty="0" smtClean="0"/>
               <a:t>. </a:t>
             </a:r>
             <a:r>
-              <a:rPr lang="fr-FR" dirty="false" err="true" smtClean="false"/>
+              <a:rPr lang="fr-FR" dirty="0" err="1" smtClean="0"/>
               <a:t>Proin</a:t>
             </a:r>
             <a:r>
-              <a:rPr lang="fr-FR" dirty="false" smtClean="false"/>
+              <a:rPr lang="fr-FR" dirty="0" smtClean="0"/>
               <a:t> at </a:t>
             </a:r>
             <a:r>
-              <a:rPr lang="fr-FR" dirty="false" err="true" smtClean="false"/>
+              <a:rPr lang="fr-FR" dirty="0" err="1" smtClean="0"/>
               <a:t>nisl</a:t>
             </a:r>
             <a:r>
-              <a:rPr lang="fr-FR" dirty="false" smtClean="false"/>
+              <a:rPr lang="fr-FR" dirty="0" smtClean="0"/>
               <a:t> mollis, </a:t>
             </a:r>
             <a:r>
-              <a:rPr lang="fr-FR" dirty="false" err="true" smtClean="false"/>
+              <a:rPr lang="fr-FR" dirty="0" err="1" smtClean="0"/>
               <a:t>congue</a:t>
             </a:r>
             <a:r>
-              <a:rPr lang="fr-FR" dirty="false" smtClean="false"/>
-              <a:t> </a:t>
-            </a:r>
-            <a:r>
-              <a:rPr lang="fr-FR" dirty="false" err="true" smtClean="false"/>
+              <a:rPr lang="fr-FR" dirty="0" smtClean="0"/>
+              <a:t> </a:t>
+            </a:r>
+            <a:r>
+              <a:rPr lang="fr-FR" dirty="0" err="1" smtClean="0"/>
               <a:t>quam</a:t>
             </a:r>
             <a:r>
-              <a:rPr lang="fr-FR" dirty="false" smtClean="false"/>
+              <a:rPr lang="fr-FR" dirty="0" smtClean="0"/>
               <a:t> id, </a:t>
             </a:r>
             <a:r>
-              <a:rPr lang="fr-FR" dirty="false" err="true" smtClean="false"/>
+              <a:rPr lang="fr-FR" dirty="0" err="1" smtClean="0"/>
               <a:t>malesuada</a:t>
             </a:r>
             <a:r>
-              <a:rPr lang="fr-FR" dirty="false" smtClean="false"/>
-              <a:t> </a:t>
-            </a:r>
-            <a:r>
-              <a:rPr lang="fr-FR" dirty="false" err="true" smtClean="false"/>
+              <a:rPr lang="fr-FR" dirty="0" smtClean="0"/>
+              <a:t> </a:t>
+            </a:r>
+            <a:r>
+              <a:rPr lang="fr-FR" dirty="0" err="1" smtClean="0"/>
               <a:t>felis</a:t>
             </a:r>
             <a:r>
-              <a:rPr lang="fr-FR" dirty="false" smtClean="false"/>
+              <a:rPr lang="fr-FR" dirty="0" smtClean="0"/>
               <a:t>. Suspendisse </a:t>
             </a:r>
             <a:r>
-              <a:rPr lang="fr-FR" dirty="false" err="true" smtClean="false"/>
+              <a:rPr lang="fr-FR" dirty="0" err="1" smtClean="0"/>
               <a:t>rutrum</a:t>
             </a:r>
             <a:r>
-              <a:rPr lang="fr-FR" dirty="false" smtClean="false"/>
-              <a:t> </a:t>
-            </a:r>
-            <a:r>
-              <a:rPr lang="fr-FR" dirty="false" err="true" smtClean="false"/>
+              <a:rPr lang="fr-FR" dirty="0" smtClean="0"/>
+              <a:t> </a:t>
+            </a:r>
+            <a:r>
+              <a:rPr lang="fr-FR" dirty="0" err="1" smtClean="0"/>
               <a:t>finibus</a:t>
             </a:r>
             <a:r>
-              <a:rPr lang="fr-FR" dirty="false" smtClean="false"/>
-              <a:t> </a:t>
-            </a:r>
-            <a:r>
-              <a:rPr lang="fr-FR" dirty="false" err="true" smtClean="false"/>
+              <a:rPr lang="fr-FR" dirty="0" smtClean="0"/>
+              <a:t> </a:t>
+            </a:r>
+            <a:r>
+              <a:rPr lang="fr-FR" dirty="0" err="1" smtClean="0"/>
               <a:t>velit</a:t>
             </a:r>
             <a:r>
-              <a:rPr lang="fr-FR" dirty="false" smtClean="false"/>
+              <a:rPr lang="fr-FR" dirty="0" smtClean="0"/>
               <a:t>, </a:t>
             </a:r>
             <a:r>
-              <a:rPr lang="fr-FR" dirty="false" err="true" smtClean="false"/>
+              <a:rPr lang="fr-FR" dirty="0" err="1" smtClean="0"/>
               <a:t>quis</a:t>
             </a:r>
             <a:r>
-              <a:rPr lang="fr-FR" dirty="false" smtClean="false"/>
-              <a:t> </a:t>
-            </a:r>
-            <a:r>
-              <a:rPr lang="fr-FR" dirty="false" err="true" smtClean="false"/>
+              <a:rPr lang="fr-FR" dirty="0" smtClean="0"/>
+              <a:t> </a:t>
+            </a:r>
+            <a:r>
+              <a:rPr lang="fr-FR" dirty="0" err="1" smtClean="0"/>
               <a:t>aliquet</a:t>
             </a:r>
             <a:r>
-              <a:rPr lang="fr-FR" dirty="false" smtClean="false"/>
-              <a:t> </a:t>
-            </a:r>
-            <a:r>
-              <a:rPr lang="fr-FR" dirty="false" err="true" smtClean="false"/>
+              <a:rPr lang="fr-FR" dirty="0" smtClean="0"/>
+              <a:t> </a:t>
+            </a:r>
+            <a:r>
+              <a:rPr lang="fr-FR" dirty="0" err="1" smtClean="0"/>
               <a:t>augue</a:t>
             </a:r>
             <a:r>
-              <a:rPr lang="fr-FR" dirty="false" smtClean="false"/>
-              <a:t> </a:t>
-            </a:r>
-            <a:r>
-              <a:rPr lang="fr-FR" dirty="false" err="true" smtClean="false"/>
+              <a:rPr lang="fr-FR" dirty="0" smtClean="0"/>
+              <a:t> </a:t>
+            </a:r>
+            <a:r>
+              <a:rPr lang="fr-FR" dirty="0" err="1" smtClean="0"/>
               <a:t>rhoncus</a:t>
             </a:r>
             <a:r>
-              <a:rPr lang="fr-FR" dirty="false" smtClean="false"/>
+              <a:rPr lang="fr-FR" dirty="0" smtClean="0"/>
               <a:t> ut</a:t>
             </a:r>
-            <a:endParaRPr lang="fr-FR" dirty="false"/>
+            <a:endParaRPr lang="fr-FR" dirty="0"/>
           </a:p>
         </p:txBody>
       </p:sp>

</xml_diff>

<commit_message>
Refactor and add unit tests
</commit_message>
<xml_diff>
--- a/sample-docs/pptx-copy.pptx
+++ b/sample-docs/pptx-copy.pptx
@@ -462,7 +462,7 @@
 </file>
 
 <file path=ppt/notesSlides/notesSlide1.xml><?xml version="1.0" encoding="utf-8"?>
-<p:notes xmlns:a="http://schemas.openxmlformats.org/drawingml/2006/main" xmlns:r="http://schemas.openxmlformats.org/officeDocument/2006/relationships" xmlns:p="http://schemas.openxmlformats.org/presentationml/2006/main">
+<p:notes xmlns:p="http://schemas.openxmlformats.org/presentationml/2006/main" xmlns:r="http://schemas.openxmlformats.org/officeDocument/2006/relationships" xmlns:a="http://schemas.openxmlformats.org/drawingml/2006/main" xmlns:mc="http://schemas.openxmlformats.org/markup-compatibility/2006" xmlns:c="http://schemas.openxmlformats.org/drawingml/2006/chart" xmlns:ns6="http://schemas.openxmlformats.org/drawingml/2006/chartDrawing" xmlns:dgm="http://schemas.openxmlformats.org/drawingml/2006/diagram" xmlns:pic="http://schemas.openxmlformats.org/drawingml/2006/picture" xmlns:wp="http://schemas.openxmlformats.org/drawingml/2006/wordprocessingDrawing" xmlns:wp14="http://schemas.microsoft.com/office/word/2010/wordprocessingDrawing" xmlns:xdr="http://schemas.openxmlformats.org/drawingml/2006/spreadsheetDrawing" xmlns:ns12="http://schemas.openxmlformats.org/drawingml/2006/compatibility" xmlns:ns13="http://schemas.openxmlformats.org/drawingml/2006/lockedCanvas">
   <p:cSld>
     <p:spTree>
       <p:nvGrpSpPr>
@@ -482,7 +482,7 @@
         <p:nvSpPr>
           <p:cNvPr id="2" name="Espace réservé de l'image des diapositives 1"/>
           <p:cNvSpPr>
-            <a:spLocks noGrp="1" noRot="1" noChangeAspect="1"/>
+            <a:spLocks noGrp="true" noRot="true" noChangeAspect="true"/>
           </p:cNvSpPr>
           <p:nvPr>
             <p:ph type="sldImg"/>
@@ -494,7 +494,7 @@
         <p:nvSpPr>
           <p:cNvPr id="3" name="Espace réservé des commentaires 2"/>
           <p:cNvSpPr>
-            <a:spLocks noGrp="1"/>
+            <a:spLocks noGrp="true"/>
           </p:cNvSpPr>
           <p:nvPr>
             <p:ph type="body" idx="1"/>
@@ -506,192 +506,53 @@
           <a:lstStyle/>
           <a:p>
             <a:r>
-              <a:rPr lang="fr-FR" dirty="0" smtClean="0"/>
-              <a:t>Begin of comment </a:t>
-            </a:r>
-            <a:r>
-              <a:rPr lang="fr-FR" dirty="0" err="1" smtClean="0"/>
-              <a:t>from</a:t>
-            </a:r>
-            <a:r>
-              <a:rPr lang="fr-FR" dirty="0" smtClean="0"/>
-              <a:t> slide 1</a:t>
-            </a:r>
-          </a:p>
-          <a:p>
-            <a:r>
-              <a:rPr lang="fr-FR" dirty="0" smtClean="0"/>
-              <a:t>Copy </a:t>
-            </a:r>
-            <a:r>
-              <a:rPr lang="fr-FR" dirty="0" err="1" smtClean="0"/>
-              <a:t>copy</a:t>
-            </a:r>
-            <a:r>
-              <a:rPr lang="fr-FR" dirty="0" smtClean="0"/>
-              <a:t> </a:t>
-            </a:r>
-            <a:r>
-              <a:rPr lang="fr-FR" dirty="0" err="1" smtClean="0"/>
-              <a:t>copy</a:t>
-            </a:r>
-            <a:r>
-              <a:rPr lang="fr-FR" dirty="0" smtClean="0"/>
-              <a:t> </a:t>
-            </a:r>
-            <a:r>
-              <a:rPr lang="fr-FR" dirty="0" err="1" smtClean="0"/>
-              <a:t>copy</a:t>
-            </a:r>
-            <a:r>
-              <a:rPr lang="fr-FR" dirty="0" smtClean="0"/>
-              <a:t> </a:t>
-            </a:r>
-            <a:r>
-              <a:rPr lang="fr-FR" dirty="0" err="1" smtClean="0"/>
-              <a:t>copy</a:t>
-            </a:r>
-            <a:r>
-              <a:rPr lang="fr-FR" dirty="0" smtClean="0"/>
-              <a:t> </a:t>
-            </a:r>
-            <a:r>
-              <a:rPr lang="fr-FR" dirty="0" err="1" smtClean="0"/>
-              <a:t>Copy</a:t>
-            </a:r>
-            <a:r>
-              <a:rPr lang="fr-FR" dirty="0" smtClean="0"/>
-              <a:t> </a:t>
-            </a:r>
-            <a:r>
-              <a:rPr lang="fr-FR" dirty="0" err="1" smtClean="0"/>
-              <a:t>copy</a:t>
-            </a:r>
-            <a:r>
-              <a:rPr lang="fr-FR" dirty="0" smtClean="0"/>
-              <a:t> </a:t>
-            </a:r>
-            <a:r>
-              <a:rPr lang="fr-FR" dirty="0" err="1" smtClean="0"/>
-              <a:t>copy</a:t>
-            </a:r>
-            <a:r>
-              <a:rPr lang="fr-FR" dirty="0" smtClean="0"/>
-              <a:t> </a:t>
-            </a:r>
-            <a:r>
-              <a:rPr lang="fr-FR" dirty="0" err="1" smtClean="0"/>
-              <a:t>copy</a:t>
-            </a:r>
-            <a:r>
-              <a:rPr lang="fr-FR" dirty="0" smtClean="0"/>
-              <a:t> </a:t>
-            </a:r>
-            <a:r>
-              <a:rPr lang="fr-FR" dirty="0" err="1" smtClean="0"/>
-              <a:t>copy</a:t>
-            </a:r>
-            <a:r>
-              <a:rPr lang="fr-FR" dirty="0" smtClean="0"/>
-              <a:t> </a:t>
-            </a:r>
-            <a:r>
-              <a:rPr lang="fr-FR" dirty="0" err="1" smtClean="0"/>
-              <a:t>Copy</a:t>
-            </a:r>
-            <a:r>
-              <a:rPr lang="fr-FR" dirty="0" smtClean="0"/>
-              <a:t> </a:t>
-            </a:r>
-            <a:r>
-              <a:rPr lang="fr-FR" dirty="0" err="1" smtClean="0"/>
-              <a:t>copy</a:t>
-            </a:r>
-            <a:r>
-              <a:rPr lang="fr-FR" dirty="0" smtClean="0"/>
-              <a:t> </a:t>
-            </a:r>
-            <a:r>
-              <a:rPr lang="fr-FR" dirty="0" err="1" smtClean="0"/>
-              <a:t>copy</a:t>
-            </a:r>
-            <a:r>
-              <a:rPr lang="fr-FR" dirty="0" smtClean="0"/>
-              <a:t> </a:t>
-            </a:r>
-            <a:r>
-              <a:rPr lang="fr-FR" dirty="0" err="1" smtClean="0"/>
-              <a:t>copy</a:t>
-            </a:r>
-            <a:r>
-              <a:rPr lang="fr-FR" dirty="0" smtClean="0"/>
-              <a:t> </a:t>
-            </a:r>
-            <a:r>
-              <a:rPr lang="fr-FR" dirty="0" err="1" smtClean="0"/>
-              <a:t>copy</a:t>
-            </a:r>
-            <a:r>
-              <a:rPr lang="fr-FR" dirty="0" smtClean="0"/>
-              <a:t> </a:t>
-            </a:r>
-            <a:r>
-              <a:rPr lang="fr-FR" dirty="0" err="1" smtClean="0"/>
-              <a:t>Copy</a:t>
-            </a:r>
-            <a:r>
-              <a:rPr lang="fr-FR" dirty="0" smtClean="0"/>
-              <a:t> </a:t>
-            </a:r>
-            <a:r>
-              <a:rPr lang="fr-FR" dirty="0" err="1" smtClean="0"/>
-              <a:t>copy</a:t>
-            </a:r>
-            <a:r>
-              <a:rPr lang="fr-FR" dirty="0" smtClean="0"/>
-              <a:t> </a:t>
-            </a:r>
-            <a:r>
-              <a:rPr lang="fr-FR" dirty="0" err="1" smtClean="0"/>
-              <a:t>copy</a:t>
-            </a:r>
-            <a:r>
-              <a:rPr lang="fr-FR" dirty="0" smtClean="0"/>
-              <a:t> </a:t>
-            </a:r>
-            <a:r>
-              <a:rPr lang="fr-FR" dirty="0" err="1" smtClean="0"/>
-              <a:t>copy</a:t>
-            </a:r>
-            <a:r>
-              <a:rPr lang="fr-FR" dirty="0" smtClean="0"/>
-              <a:t> </a:t>
-            </a:r>
-            <a:r>
-              <a:rPr lang="fr-FR" dirty="0" err="1" smtClean="0"/>
-              <a:t>copy</a:t>
-            </a:r>
-            <a:r>
-              <a:rPr lang="fr-FR" dirty="0" smtClean="0"/>
-              <a:t> </a:t>
-            </a:r>
-          </a:p>
-          <a:p>
-            <a:r>
-              <a:rPr lang="fr-FR" dirty="0" smtClean="0"/>
-              <a:t>End of comment </a:t>
-            </a:r>
-            <a:r>
-              <a:rPr lang="fr-FR" dirty="0" err="1" smtClean="0"/>
-              <a:t>from</a:t>
-            </a:r>
-            <a:r>
-              <a:rPr lang="fr-FR" dirty="0" smtClean="0"/>
-              <a:t> slide 1</a:t>
-            </a:r>
-          </a:p>
-          <a:p>
-            <a:endParaRPr lang="fr-FR" dirty="0"/>
+              <a:t>Begin of comment from slide 1</a:t>
+            </a:r>
+          </a:p>
+          <a:p>
+            <a:r>
+              <a:t>Lorem ipsum dolor sit amet, consectetur adipiscing elit. Pellentesque porta sed tellus volutpat sed.</a:t>
+            </a:r>
+          </a:p>
+          <a:p>
+            <a:r>
+              <a:t>End of comment from slide 1</a:t>
+            </a:r>
+          </a:p>
+          <a:p>
+            <a:r>
+              <a:t/>
+            </a:r>
+          </a:p>
+          <a:p>
+            <a:r>
+              <a:t>=== Original comments from sample-docs/pptx-copy.pptx===</a:t>
+            </a:r>
+          </a:p>
+          <a:p>
+            <a:r>
+              <a:t>Begin of comment from slide 1</a:t>
+            </a:r>
+          </a:p>
+          <a:p>
+            <a:r>
+              <a:t>Copy copy copy copy copy Copy copy copy copy copy Copy copy copy copy copy Copy copy copy copy copy </a:t>
+            </a:r>
+          </a:p>
+          <a:p>
+            <a:r>
+              <a:t>End of comment from slide 1</a:t>
+            </a:r>
+          </a:p>
+          <a:p>
+            <a:r>
+              <a:t/>
+            </a:r>
+          </a:p>
+          <a:p>
+            <a:r>
+              <a:t/>
+            </a:r>
           </a:p>
         </p:txBody>
       </p:sp>
@@ -699,7 +560,7 @@
         <p:nvSpPr>
           <p:cNvPr id="4" name="Espace réservé du numéro de diapositive 3"/>
           <p:cNvSpPr>
-            <a:spLocks noGrp="1"/>
+            <a:spLocks noGrp="true"/>
           </p:cNvSpPr>
           <p:nvPr>
             <p:ph type="sldNum" sz="quarter" idx="10"/>
@@ -710,10 +571,63 @@
           <a:bodyPr/>
           <a:lstStyle/>
           <a:p>
-            <a:fld id="{D087CDC4-FBA2-44CE-A15A-CFDDF7DA6987}" type="slidenum">
-              <a:rPr lang="fr-FR" smtClean="0"/>
-              <a:t>1</a:t>
-            </a:fld>
+            <a:r>
+              <a:t>Begin of comment from slide 1</a:t>
+            </a:r>
+            <a:endParaRPr lang="fr-FR"/>
+          </a:p>
+          <a:p>
+            <a:r>
+              <a:t>Lorem ipsum dolor sit amet, consectetur adipiscing elit. Pellentesque porta sed tellus volutpat sed.</a:t>
+            </a:r>
+            <a:endParaRPr lang="fr-FR"/>
+          </a:p>
+          <a:p>
+            <a:r>
+              <a:t>End of comment from slide 1</a:t>
+            </a:r>
+            <a:endParaRPr lang="fr-FR"/>
+          </a:p>
+          <a:p>
+            <a:r>
+              <a:t/>
+            </a:r>
+            <a:endParaRPr lang="fr-FR"/>
+          </a:p>
+          <a:p>
+            <a:r>
+              <a:t>=== Original comments from sample-docs/pptx-copy.pptx===</a:t>
+            </a:r>
+            <a:endParaRPr lang="fr-FR"/>
+          </a:p>
+          <a:p>
+            <a:r>
+              <a:t>Begin of comment from slide 1</a:t>
+            </a:r>
+            <a:endParaRPr lang="fr-FR"/>
+          </a:p>
+          <a:p>
+            <a:r>
+              <a:t>Copy copy copy copy copy Copy copy copy copy copy Copy copy copy copy copy Copy copy copy copy copy </a:t>
+            </a:r>
+            <a:endParaRPr lang="fr-FR"/>
+          </a:p>
+          <a:p>
+            <a:r>
+              <a:t>End of comment from slide 1</a:t>
+            </a:r>
+            <a:endParaRPr lang="fr-FR"/>
+          </a:p>
+          <a:p>
+            <a:r>
+              <a:t/>
+            </a:r>
+            <a:endParaRPr lang="fr-FR"/>
+          </a:p>
+          <a:p>
+            <a:r>
+              <a:t/>
+            </a:r>
             <a:endParaRPr lang="fr-FR"/>
           </a:p>
         </p:txBody>
@@ -732,7 +646,7 @@
 </file>
 
 <file path=ppt/notesSlides/notesSlide2.xml><?xml version="1.0" encoding="utf-8"?>
-<p:notes xmlns:a="http://schemas.openxmlformats.org/drawingml/2006/main" xmlns:r="http://schemas.openxmlformats.org/officeDocument/2006/relationships" xmlns:p="http://schemas.openxmlformats.org/presentationml/2006/main">
+<p:notes xmlns:p="http://schemas.openxmlformats.org/presentationml/2006/main" xmlns:r="http://schemas.openxmlformats.org/officeDocument/2006/relationships" xmlns:a="http://schemas.openxmlformats.org/drawingml/2006/main" xmlns:mc="http://schemas.openxmlformats.org/markup-compatibility/2006" xmlns:c="http://schemas.openxmlformats.org/drawingml/2006/chart" xmlns:ns6="http://schemas.openxmlformats.org/drawingml/2006/chartDrawing" xmlns:dgm="http://schemas.openxmlformats.org/drawingml/2006/diagram" xmlns:pic="http://schemas.openxmlformats.org/drawingml/2006/picture" xmlns:wp="http://schemas.openxmlformats.org/drawingml/2006/wordprocessingDrawing" xmlns:wp14="http://schemas.microsoft.com/office/word/2010/wordprocessingDrawing" xmlns:xdr="http://schemas.openxmlformats.org/drawingml/2006/spreadsheetDrawing" xmlns:ns12="http://schemas.openxmlformats.org/drawingml/2006/compatibility" xmlns:ns13="http://schemas.openxmlformats.org/drawingml/2006/lockedCanvas">
   <p:cSld>
     <p:spTree>
       <p:nvGrpSpPr>
@@ -752,7 +666,7 @@
         <p:nvSpPr>
           <p:cNvPr id="2" name="Espace réservé de l'image des diapositives 1"/>
           <p:cNvSpPr>
-            <a:spLocks noGrp="1" noRot="1" noChangeAspect="1"/>
+            <a:spLocks noGrp="true" noRot="true" noChangeAspect="true"/>
           </p:cNvSpPr>
           <p:nvPr>
             <p:ph type="sldImg"/>
@@ -764,7 +678,7 @@
         <p:nvSpPr>
           <p:cNvPr id="3" name="Espace réservé des commentaires 2"/>
           <p:cNvSpPr>
-            <a:spLocks noGrp="1"/>
+            <a:spLocks noGrp="true"/>
           </p:cNvSpPr>
           <p:nvPr>
             <p:ph type="body" idx="1"/>
@@ -776,176 +690,53 @@
           <a:lstStyle/>
           <a:p>
             <a:r>
-              <a:rPr lang="fr-FR" dirty="0" smtClean="0"/>
               <a:t>Begin of comment slide 2</a:t>
             </a:r>
           </a:p>
           <a:p>
             <a:r>
-              <a:rPr lang="fr-FR" dirty="0" smtClean="0"/>
-              <a:t>Copy </a:t>
-            </a:r>
-            <a:r>
-              <a:rPr lang="fr-FR" dirty="0" err="1" smtClean="0"/>
-              <a:t>copy</a:t>
-            </a:r>
-            <a:r>
-              <a:rPr lang="fr-FR" dirty="0" smtClean="0"/>
-              <a:t> </a:t>
-            </a:r>
-            <a:r>
-              <a:rPr lang="fr-FR" dirty="0" err="1" smtClean="0"/>
-              <a:t>copy</a:t>
-            </a:r>
-            <a:r>
-              <a:rPr lang="fr-FR" dirty="0" smtClean="0"/>
-              <a:t> </a:t>
-            </a:r>
-            <a:r>
-              <a:rPr lang="fr-FR" dirty="0" err="1" smtClean="0"/>
-              <a:t>copy</a:t>
-            </a:r>
-            <a:r>
-              <a:rPr lang="fr-FR" dirty="0" smtClean="0"/>
-              <a:t> </a:t>
-            </a:r>
-            <a:r>
-              <a:rPr lang="fr-FR" dirty="0" err="1" smtClean="0"/>
-              <a:t>copy</a:t>
-            </a:r>
-            <a:r>
-              <a:rPr lang="fr-FR" dirty="0" smtClean="0"/>
-              <a:t> </a:t>
-            </a:r>
-            <a:r>
-              <a:rPr lang="fr-FR" dirty="0" err="1" smtClean="0"/>
-              <a:t>Copy</a:t>
-            </a:r>
-            <a:r>
-              <a:rPr lang="fr-FR" dirty="0" smtClean="0"/>
-              <a:t> </a:t>
-            </a:r>
-            <a:r>
-              <a:rPr lang="fr-FR" dirty="0" err="1" smtClean="0"/>
-              <a:t>copy</a:t>
-            </a:r>
-            <a:r>
-              <a:rPr lang="fr-FR" dirty="0" smtClean="0"/>
-              <a:t> </a:t>
-            </a:r>
-            <a:r>
-              <a:rPr lang="fr-FR" dirty="0" err="1" smtClean="0"/>
-              <a:t>copy</a:t>
-            </a:r>
-            <a:r>
-              <a:rPr lang="fr-FR" dirty="0" smtClean="0"/>
-              <a:t> </a:t>
-            </a:r>
-            <a:r>
-              <a:rPr lang="fr-FR" dirty="0" err="1" smtClean="0"/>
-              <a:t>copy</a:t>
-            </a:r>
-            <a:r>
-              <a:rPr lang="fr-FR" dirty="0" smtClean="0"/>
-              <a:t> </a:t>
-            </a:r>
-            <a:r>
-              <a:rPr lang="fr-FR" dirty="0" err="1" smtClean="0"/>
-              <a:t>copy</a:t>
-            </a:r>
-            <a:r>
-              <a:rPr lang="fr-FR" dirty="0" smtClean="0"/>
-              <a:t> </a:t>
-            </a:r>
-            <a:r>
-              <a:rPr lang="fr-FR" dirty="0" err="1" smtClean="0"/>
-              <a:t>Copy</a:t>
-            </a:r>
-            <a:r>
-              <a:rPr lang="fr-FR" dirty="0" smtClean="0"/>
-              <a:t> </a:t>
-            </a:r>
-            <a:r>
-              <a:rPr lang="fr-FR" dirty="0" err="1" smtClean="0"/>
-              <a:t>copy</a:t>
-            </a:r>
-            <a:r>
-              <a:rPr lang="fr-FR" dirty="0" smtClean="0"/>
-              <a:t> </a:t>
-            </a:r>
-            <a:r>
-              <a:rPr lang="fr-FR" dirty="0" err="1" smtClean="0"/>
-              <a:t>copy</a:t>
-            </a:r>
-            <a:r>
-              <a:rPr lang="fr-FR" dirty="0" smtClean="0"/>
-              <a:t> </a:t>
-            </a:r>
-            <a:r>
-              <a:rPr lang="fr-FR" dirty="0" err="1" smtClean="0"/>
-              <a:t>copy</a:t>
-            </a:r>
-            <a:r>
-              <a:rPr lang="fr-FR" dirty="0" smtClean="0"/>
-              <a:t> </a:t>
-            </a:r>
-            <a:r>
-              <a:rPr lang="fr-FR" dirty="0" err="1" smtClean="0"/>
-              <a:t>copy</a:t>
-            </a:r>
-            <a:r>
-              <a:rPr lang="fr-FR" dirty="0" smtClean="0"/>
-              <a:t> </a:t>
-            </a:r>
-            <a:r>
-              <a:rPr lang="fr-FR" dirty="0" err="1" smtClean="0"/>
-              <a:t>Copy</a:t>
-            </a:r>
-            <a:r>
-              <a:rPr lang="fr-FR" dirty="0" smtClean="0"/>
-              <a:t> </a:t>
-            </a:r>
-            <a:r>
-              <a:rPr lang="fr-FR" dirty="0" err="1" smtClean="0"/>
-              <a:t>copy</a:t>
-            </a:r>
-            <a:r>
-              <a:rPr lang="fr-FR" dirty="0" smtClean="0"/>
-              <a:t> </a:t>
-            </a:r>
-            <a:r>
-              <a:rPr lang="fr-FR" dirty="0" err="1" smtClean="0"/>
-              <a:t>copy</a:t>
-            </a:r>
-            <a:r>
-              <a:rPr lang="fr-FR" dirty="0" smtClean="0"/>
-              <a:t> </a:t>
-            </a:r>
-            <a:r>
-              <a:rPr lang="fr-FR" dirty="0" err="1" smtClean="0"/>
-              <a:t>copy</a:t>
-            </a:r>
-            <a:r>
-              <a:rPr lang="fr-FR" dirty="0" smtClean="0"/>
-              <a:t> </a:t>
-            </a:r>
-            <a:r>
-              <a:rPr lang="fr-FR" dirty="0" err="1" smtClean="0"/>
-              <a:t>copy</a:t>
-            </a:r>
-            <a:r>
-              <a:rPr lang="fr-FR" dirty="0" smtClean="0"/>
-              <a:t> </a:t>
-            </a:r>
-          </a:p>
-          <a:p>
-            <a:r>
-              <a:rPr lang="fr-FR" smtClean="0"/>
+              <a:t>Lorem ipsum dolor sit amet, consectetur adipiscing elit. Pellentesque porta sed tellus volutpat sed.</a:t>
+            </a:r>
+          </a:p>
+          <a:p>
+            <a:r>
               <a:t>End of comment slide 2</a:t>
             </a:r>
           </a:p>
           <a:p>
-            <a:endParaRPr lang="fr-FR"/>
+            <a:r>
+              <a:t/>
+            </a:r>
+          </a:p>
+          <a:p>
+            <a:r>
+              <a:t>=== Original comments from sample-docs/pptx-copy.pptx===</a:t>
+            </a:r>
+          </a:p>
+          <a:p>
+            <a:r>
+              <a:t>Begin of comment slide 2</a:t>
+            </a:r>
+          </a:p>
+          <a:p>
+            <a:r>
+              <a:t>Copy copy copy copy copy Copy copy copy copy copy Copy copy copy copy copy Copy copy copy copy copy </a:t>
+            </a:r>
+          </a:p>
+          <a:p>
+            <a:r>
+              <a:t>End of comment slide 2</a:t>
+            </a:r>
+          </a:p>
+          <a:p>
+            <a:r>
+              <a:t/>
+            </a:r>
+          </a:p>
+          <a:p>
+            <a:r>
+              <a:t/>
+            </a:r>
           </a:p>
         </p:txBody>
       </p:sp>
@@ -953,7 +744,7 @@
         <p:nvSpPr>
           <p:cNvPr id="4" name="Espace réservé du numéro de diapositive 3"/>
           <p:cNvSpPr>
-            <a:spLocks noGrp="1"/>
+            <a:spLocks noGrp="true"/>
           </p:cNvSpPr>
           <p:nvPr>
             <p:ph type="sldNum" sz="quarter" idx="10"/>
@@ -964,10 +755,63 @@
           <a:bodyPr/>
           <a:lstStyle/>
           <a:p>
-            <a:fld id="{D087CDC4-FBA2-44CE-A15A-CFDDF7DA6987}" type="slidenum">
-              <a:rPr lang="fr-FR" smtClean="0"/>
-              <a:t>2</a:t>
-            </a:fld>
+            <a:r>
+              <a:t>Begin of comment slide 2</a:t>
+            </a:r>
+            <a:endParaRPr lang="fr-FR"/>
+          </a:p>
+          <a:p>
+            <a:r>
+              <a:t>Lorem ipsum dolor sit amet, consectetur adipiscing elit. Pellentesque porta sed tellus volutpat sed.</a:t>
+            </a:r>
+            <a:endParaRPr lang="fr-FR"/>
+          </a:p>
+          <a:p>
+            <a:r>
+              <a:t>End of comment slide 2</a:t>
+            </a:r>
+            <a:endParaRPr lang="fr-FR"/>
+          </a:p>
+          <a:p>
+            <a:r>
+              <a:t/>
+            </a:r>
+            <a:endParaRPr lang="fr-FR"/>
+          </a:p>
+          <a:p>
+            <a:r>
+              <a:t>=== Original comments from sample-docs/pptx-copy.pptx===</a:t>
+            </a:r>
+            <a:endParaRPr lang="fr-FR"/>
+          </a:p>
+          <a:p>
+            <a:r>
+              <a:t>Begin of comment slide 2</a:t>
+            </a:r>
+            <a:endParaRPr lang="fr-FR"/>
+          </a:p>
+          <a:p>
+            <a:r>
+              <a:t>Copy copy copy copy copy Copy copy copy copy copy Copy copy copy copy copy Copy copy copy copy copy </a:t>
+            </a:r>
+            <a:endParaRPr lang="fr-FR"/>
+          </a:p>
+          <a:p>
+            <a:r>
+              <a:t>End of comment slide 2</a:t>
+            </a:r>
+            <a:endParaRPr lang="fr-FR"/>
+          </a:p>
+          <a:p>
+            <a:r>
+              <a:t/>
+            </a:r>
+            <a:endParaRPr lang="fr-FR"/>
+          </a:p>
+          <a:p>
+            <a:r>
+              <a:t/>
+            </a:r>
             <a:endParaRPr lang="fr-FR"/>
           </a:p>
         </p:txBody>
@@ -986,7 +830,7 @@
 </file>
 
 <file path=ppt/slideLayouts/slideLayout1.xml><?xml version="1.0" encoding="utf-8"?>
-<p:sldLayout xmlns:a="http://schemas.openxmlformats.org/drawingml/2006/main" xmlns:r="http://schemas.openxmlformats.org/officeDocument/2006/relationships" xmlns:p="http://schemas.openxmlformats.org/presentationml/2006/main" type="title" preserve="1">
+<p:sldLayout xmlns:v="urn:schemas-microsoft-com:vml" xmlns:a="http://schemas.openxmlformats.org/drawingml/2006/main" xmlns:c="http://schemas.openxmlformats.org/drawingml/2006/chart" xmlns:xdr="http://schemas.openxmlformats.org/drawingml/2006/spreadsheetDrawing" xmlns:dgm="http://schemas.openxmlformats.org/drawingml/2006/diagram" xmlns:pic="http://schemas.openxmlformats.org/drawingml/2006/picture" xmlns:wp14="http://schemas.microsoft.com/office/word/2010/wordprocessingDrawing" xmlns:p="http://schemas.openxmlformats.org/presentationml/2006/main" xmlns:ns6="http://schemas.openxmlformats.org/drawingml/2006/chartDrawing" xmlns:r="http://schemas.openxmlformats.org/officeDocument/2006/relationships" xmlns:ns13="http://schemas.openxmlformats.org/drawingml/2006/lockedCanvas" xmlns:ns12="http://schemas.openxmlformats.org/drawingml/2006/compatibility" xmlns:mc="http://schemas.openxmlformats.org/markup-compatibility/2006" xmlns:wp="http://schemas.openxmlformats.org/drawingml/2006/wordprocessingDrawing" type="title" preserve="true">
   <p:cSld name="Diapositive de titre">
     <p:spTree>
       <p:nvGrpSpPr>
@@ -1006,7 +850,7 @@
         <p:nvSpPr>
           <p:cNvPr id="2" name="Titre 1"/>
           <p:cNvSpPr>
-            <a:spLocks noGrp="1"/>
+            <a:spLocks noGrp="true"/>
           </p:cNvSpPr>
           <p:nvPr>
             <p:ph type="ctrTitle"/>
@@ -1027,7 +871,7 @@
           </a:lstStyle>
           <a:p>
             <a:r>
-              <a:rPr lang="fr-FR" smtClean="0"/>
+              <a:rPr lang="fr-FR" smtClean="false"/>
               <a:t>Modifiez le style du titre</a:t>
             </a:r>
             <a:endParaRPr lang="fr-FR"/>
@@ -1038,7 +882,7 @@
         <p:nvSpPr>
           <p:cNvPr id="3" name="Sous-titre 2"/>
           <p:cNvSpPr>
-            <a:spLocks noGrp="1"/>
+            <a:spLocks noGrp="true"/>
           </p:cNvSpPr>
           <p:nvPr>
             <p:ph type="subTitle" idx="1"/>
@@ -1092,7 +936,7 @@
           </a:lstStyle>
           <a:p>
             <a:r>
-              <a:rPr lang="fr-FR" smtClean="0"/>
+              <a:rPr lang="fr-FR" smtClean="false"/>
               <a:t>Modifiez le style des sous-titres du masque</a:t>
             </a:r>
             <a:endParaRPr lang="fr-FR"/>
@@ -1103,7 +947,7 @@
         <p:nvSpPr>
           <p:cNvPr id="4" name="Espace réservé de la date 3"/>
           <p:cNvSpPr>
-            <a:spLocks noGrp="1"/>
+            <a:spLocks noGrp="true"/>
           </p:cNvSpPr>
           <p:nvPr>
             <p:ph type="dt" sz="half" idx="10"/>
@@ -1115,7 +959,7 @@
           <a:lstStyle/>
           <a:p>
             <a:fld id="{E7E4853E-ECDD-443A-840C-1FE284273B35}" type="datetimeFigureOut">
-              <a:rPr lang="fr-FR" smtClean="0"/>
+              <a:rPr lang="fr-FR" smtClean="false"/>
               <a:t>14/02/2017</a:t>
             </a:fld>
             <a:endParaRPr lang="fr-FR"/>
@@ -1126,7 +970,7 @@
         <p:nvSpPr>
           <p:cNvPr id="5" name="Espace réservé du pied de page 4"/>
           <p:cNvSpPr>
-            <a:spLocks noGrp="1"/>
+            <a:spLocks noGrp="true"/>
           </p:cNvSpPr>
           <p:nvPr>
             <p:ph type="ftr" sz="quarter" idx="11"/>
@@ -1145,7 +989,7 @@
         <p:nvSpPr>
           <p:cNvPr id="6" name="Espace réservé du numéro de diapositive 5"/>
           <p:cNvSpPr>
-            <a:spLocks noGrp="1"/>
+            <a:spLocks noGrp="true"/>
           </p:cNvSpPr>
           <p:nvPr>
             <p:ph type="sldNum" sz="quarter" idx="12"/>
@@ -1157,7 +1001,7 @@
           <a:lstStyle/>
           <a:p>
             <a:fld id="{E3811F5C-F6AB-470B-8321-08F27CD4598A}" type="slidenum">
-              <a:rPr lang="fr-FR" smtClean="0"/>
+              <a:rPr lang="fr-FR" smtClean="false"/>
               <a:t>‹N°›</a:t>
             </a:fld>
             <a:endParaRPr lang="fr-FR"/>
@@ -1528,7 +1372,7 @@
 </file>
 
 <file path=ppt/slideLayouts/slideLayout2.xml><?xml version="1.0" encoding="utf-8"?>
-<p:sldLayout xmlns:a="http://schemas.openxmlformats.org/drawingml/2006/main" xmlns:r="http://schemas.openxmlformats.org/officeDocument/2006/relationships" xmlns:p="http://schemas.openxmlformats.org/presentationml/2006/main" type="obj" preserve="1">
+<p:sldLayout xmlns:v="urn:schemas-microsoft-com:vml" xmlns:a="http://schemas.openxmlformats.org/drawingml/2006/main" xmlns:c="http://schemas.openxmlformats.org/drawingml/2006/chart" xmlns:xdr="http://schemas.openxmlformats.org/drawingml/2006/spreadsheetDrawing" xmlns:dgm="http://schemas.openxmlformats.org/drawingml/2006/diagram" xmlns:pic="http://schemas.openxmlformats.org/drawingml/2006/picture" xmlns:wp14="http://schemas.microsoft.com/office/word/2010/wordprocessingDrawing" xmlns:p="http://schemas.openxmlformats.org/presentationml/2006/main" xmlns:ns6="http://schemas.openxmlformats.org/drawingml/2006/chartDrawing" xmlns:r="http://schemas.openxmlformats.org/officeDocument/2006/relationships" xmlns:ns13="http://schemas.openxmlformats.org/drawingml/2006/lockedCanvas" xmlns:ns12="http://schemas.openxmlformats.org/drawingml/2006/compatibility" xmlns:mc="http://schemas.openxmlformats.org/markup-compatibility/2006" xmlns:wp="http://schemas.openxmlformats.org/drawingml/2006/wordprocessingDrawing" type="obj" preserve="true">
   <p:cSld name="Titre et contenu">
     <p:spTree>
       <p:nvGrpSpPr>
@@ -1548,7 +1392,7 @@
         <p:nvSpPr>
           <p:cNvPr id="2" name="Titre 1"/>
           <p:cNvSpPr>
-            <a:spLocks noGrp="1"/>
+            <a:spLocks noGrp="true"/>
           </p:cNvSpPr>
           <p:nvPr>
             <p:ph type="title"/>
@@ -1560,7 +1404,7 @@
           <a:lstStyle/>
           <a:p>
             <a:r>
-              <a:rPr lang="fr-FR" smtClean="0"/>
+              <a:rPr lang="fr-FR" smtClean="false"/>
               <a:t>Modifiez le style du titre</a:t>
             </a:r>
             <a:endParaRPr lang="fr-FR"/>
@@ -1571,7 +1415,7 @@
         <p:nvSpPr>
           <p:cNvPr id="3" name="Espace réservé du contenu 2"/>
           <p:cNvSpPr>
-            <a:spLocks noGrp="1"/>
+            <a:spLocks noGrp="true"/>
           </p:cNvSpPr>
           <p:nvPr>
             <p:ph idx="1"/>
@@ -1584,35 +1428,35 @@
           <a:p>
             <a:pPr lvl="0"/>
             <a:r>
-              <a:rPr lang="fr-FR" smtClean="0"/>
+              <a:rPr lang="fr-FR" smtClean="false"/>
               <a:t>Modifiez les styles du texte du masque</a:t>
             </a:r>
           </a:p>
           <a:p>
             <a:pPr lvl="1"/>
             <a:r>
-              <a:rPr lang="fr-FR" smtClean="0"/>
+              <a:rPr lang="fr-FR" smtClean="false"/>
               <a:t>Deuxième niveau</a:t>
             </a:r>
           </a:p>
           <a:p>
             <a:pPr lvl="2"/>
             <a:r>
-              <a:rPr lang="fr-FR" smtClean="0"/>
+              <a:rPr lang="fr-FR" smtClean="false"/>
               <a:t>Troisième niveau</a:t>
             </a:r>
           </a:p>
           <a:p>
             <a:pPr lvl="3"/>
             <a:r>
-              <a:rPr lang="fr-FR" smtClean="0"/>
+              <a:rPr lang="fr-FR" smtClean="false"/>
               <a:t>Quatrième niveau</a:t>
             </a:r>
           </a:p>
           <a:p>
             <a:pPr lvl="4"/>
             <a:r>
-              <a:rPr lang="fr-FR" smtClean="0"/>
+              <a:rPr lang="fr-FR" smtClean="false"/>
               <a:t>Cinquième niveau</a:t>
             </a:r>
             <a:endParaRPr lang="fr-FR"/>
@@ -1623,7 +1467,7 @@
         <p:nvSpPr>
           <p:cNvPr id="4" name="Espace réservé de la date 3"/>
           <p:cNvSpPr>
-            <a:spLocks noGrp="1"/>
+            <a:spLocks noGrp="true"/>
           </p:cNvSpPr>
           <p:nvPr>
             <p:ph type="dt" sz="half" idx="10"/>
@@ -1635,7 +1479,7 @@
           <a:lstStyle/>
           <a:p>
             <a:fld id="{E7E4853E-ECDD-443A-840C-1FE284273B35}" type="datetimeFigureOut">
-              <a:rPr lang="fr-FR" smtClean="0"/>
+              <a:rPr lang="fr-FR" smtClean="false"/>
               <a:t>14/02/2017</a:t>
             </a:fld>
             <a:endParaRPr lang="fr-FR"/>
@@ -1646,7 +1490,7 @@
         <p:nvSpPr>
           <p:cNvPr id="5" name="Espace réservé du pied de page 4"/>
           <p:cNvSpPr>
-            <a:spLocks noGrp="1"/>
+            <a:spLocks noGrp="true"/>
           </p:cNvSpPr>
           <p:nvPr>
             <p:ph type="ftr" sz="quarter" idx="11"/>
@@ -1665,7 +1509,7 @@
         <p:nvSpPr>
           <p:cNvPr id="6" name="Espace réservé du numéro de diapositive 5"/>
           <p:cNvSpPr>
-            <a:spLocks noGrp="1"/>
+            <a:spLocks noGrp="true"/>
           </p:cNvSpPr>
           <p:nvPr>
             <p:ph type="sldNum" sz="quarter" idx="12"/>
@@ -1677,7 +1521,7 @@
           <a:lstStyle/>
           <a:p>
             <a:fld id="{E3811F5C-F6AB-470B-8321-08F27CD4598A}" type="slidenum">
-              <a:rPr lang="fr-FR" smtClean="0"/>
+              <a:rPr lang="fr-FR" smtClean="false"/>
               <a:t>‹N°›</a:t>
             </a:fld>
             <a:endParaRPr lang="fr-FR"/>
@@ -3286,7 +3130,7 @@
 </file>
 
 <file path=ppt/slideMasters/slideMaster1.xml><?xml version="1.0" encoding="utf-8"?>
-<p:sldMaster xmlns:a="http://schemas.openxmlformats.org/drawingml/2006/main" xmlns:r="http://schemas.openxmlformats.org/officeDocument/2006/relationships" xmlns:p="http://schemas.openxmlformats.org/presentationml/2006/main">
+<p:sldMaster xmlns:v="urn:schemas-microsoft-com:vml" xmlns:a="http://schemas.openxmlformats.org/drawingml/2006/main" xmlns:c="http://schemas.openxmlformats.org/drawingml/2006/chart" xmlns:xdr="http://schemas.openxmlformats.org/drawingml/2006/spreadsheetDrawing" xmlns:dgm="http://schemas.openxmlformats.org/drawingml/2006/diagram" xmlns:pic="http://schemas.openxmlformats.org/drawingml/2006/picture" xmlns:wp14="http://schemas.microsoft.com/office/word/2010/wordprocessingDrawing" xmlns:p="http://schemas.openxmlformats.org/presentationml/2006/main" xmlns:ns6="http://schemas.openxmlformats.org/drawingml/2006/chartDrawing" xmlns:r="http://schemas.openxmlformats.org/officeDocument/2006/relationships" xmlns:ns13="http://schemas.openxmlformats.org/drawingml/2006/lockedCanvas" xmlns:ns12="http://schemas.openxmlformats.org/drawingml/2006/compatibility" xmlns:mc="http://schemas.openxmlformats.org/markup-compatibility/2006" xmlns:wp="http://schemas.openxmlformats.org/drawingml/2006/wordprocessingDrawing">
   <p:cSld>
     <p:bg>
       <p:bgRef idx="1001">
@@ -3311,7 +3155,7 @@
         <p:nvSpPr>
           <p:cNvPr id="2" name="Espace réservé du titre 1"/>
           <p:cNvSpPr>
-            <a:spLocks noGrp="1"/>
+            <a:spLocks noGrp="true"/>
           </p:cNvSpPr>
           <p:nvPr>
             <p:ph type="title"/>
@@ -3327,13 +3171,13 @@
           </a:prstGeom>
         </p:spPr>
         <p:txBody>
-          <a:bodyPr vert="horz" lIns="91440" tIns="45720" rIns="91440" bIns="45720" rtlCol="0" anchor="ctr">
+          <a:bodyPr vert="horz" lIns="91440" tIns="45720" rIns="91440" bIns="45720" rtlCol="false" anchor="ctr">
             <a:normAutofit/>
           </a:bodyPr>
           <a:lstStyle/>
           <a:p>
             <a:r>
-              <a:rPr lang="fr-FR" smtClean="0"/>
+              <a:rPr lang="fr-FR" smtClean="false"/>
               <a:t>Modifiez le style du titre</a:t>
             </a:r>
             <a:endParaRPr lang="fr-FR"/>
@@ -3344,7 +3188,7 @@
         <p:nvSpPr>
           <p:cNvPr id="3" name="Espace réservé du texte 2"/>
           <p:cNvSpPr>
-            <a:spLocks noGrp="1"/>
+            <a:spLocks noGrp="true"/>
           </p:cNvSpPr>
           <p:nvPr>
             <p:ph type="body" idx="1"/>
@@ -3360,42 +3204,42 @@
           </a:prstGeom>
         </p:spPr>
         <p:txBody>
-          <a:bodyPr vert="horz" lIns="91440" tIns="45720" rIns="91440" bIns="45720" rtlCol="0">
+          <a:bodyPr vert="horz" lIns="91440" tIns="45720" rIns="91440" bIns="45720" rtlCol="false">
             <a:normAutofit/>
           </a:bodyPr>
           <a:lstStyle/>
           <a:p>
             <a:pPr lvl="0"/>
             <a:r>
-              <a:rPr lang="fr-FR" smtClean="0"/>
+              <a:rPr lang="fr-FR" smtClean="false"/>
               <a:t>Modifiez les styles du texte du masque</a:t>
             </a:r>
           </a:p>
           <a:p>
             <a:pPr lvl="1"/>
             <a:r>
-              <a:rPr lang="fr-FR" smtClean="0"/>
+              <a:rPr lang="fr-FR" smtClean="false"/>
               <a:t>Deuxième niveau</a:t>
             </a:r>
           </a:p>
           <a:p>
             <a:pPr lvl="2"/>
             <a:r>
-              <a:rPr lang="fr-FR" smtClean="0"/>
+              <a:rPr lang="fr-FR" smtClean="false"/>
               <a:t>Troisième niveau</a:t>
             </a:r>
           </a:p>
           <a:p>
             <a:pPr lvl="3"/>
             <a:r>
-              <a:rPr lang="fr-FR" smtClean="0"/>
+              <a:rPr lang="fr-FR" smtClean="false"/>
               <a:t>Quatrième niveau</a:t>
             </a:r>
           </a:p>
           <a:p>
             <a:pPr lvl="4"/>
             <a:r>
-              <a:rPr lang="fr-FR" smtClean="0"/>
+              <a:rPr lang="fr-FR" smtClean="false"/>
               <a:t>Cinquième niveau</a:t>
             </a:r>
             <a:endParaRPr lang="fr-FR"/>
@@ -3406,7 +3250,7 @@
         <p:nvSpPr>
           <p:cNvPr id="4" name="Espace réservé de la date 3"/>
           <p:cNvSpPr>
-            <a:spLocks noGrp="1"/>
+            <a:spLocks noGrp="true"/>
           </p:cNvSpPr>
           <p:nvPr>
             <p:ph type="dt" sz="half" idx="2"/>
@@ -3422,7 +3266,7 @@
           </a:prstGeom>
         </p:spPr>
         <p:txBody>
-          <a:bodyPr vert="horz" lIns="91440" tIns="45720" rIns="91440" bIns="45720" rtlCol="0" anchor="ctr"/>
+          <a:bodyPr vert="horz" lIns="91440" tIns="45720" rIns="91440" bIns="45720" rtlCol="false" anchor="ctr"/>
           <a:lstStyle>
             <a:lvl1pPr algn="l">
               <a:defRPr sz="1200">
@@ -3436,7 +3280,7 @@
           </a:lstStyle>
           <a:p>
             <a:fld id="{E7E4853E-ECDD-443A-840C-1FE284273B35}" type="datetimeFigureOut">
-              <a:rPr lang="fr-FR" smtClean="0"/>
+              <a:rPr lang="fr-FR" smtClean="false"/>
               <a:t>14/02/2017</a:t>
             </a:fld>
             <a:endParaRPr lang="fr-FR"/>
@@ -3447,7 +3291,7 @@
         <p:nvSpPr>
           <p:cNvPr id="5" name="Espace réservé du pied de page 4"/>
           <p:cNvSpPr>
-            <a:spLocks noGrp="1"/>
+            <a:spLocks noGrp="true"/>
           </p:cNvSpPr>
           <p:nvPr>
             <p:ph type="ftr" sz="quarter" idx="3"/>
@@ -3463,7 +3307,7 @@
           </a:prstGeom>
         </p:spPr>
         <p:txBody>
-          <a:bodyPr vert="horz" lIns="91440" tIns="45720" rIns="91440" bIns="45720" rtlCol="0" anchor="ctr"/>
+          <a:bodyPr vert="horz" lIns="91440" tIns="45720" rIns="91440" bIns="45720" rtlCol="false" anchor="ctr"/>
           <a:lstStyle>
             <a:lvl1pPr algn="ctr">
               <a:defRPr sz="1200">
@@ -3484,7 +3328,7 @@
         <p:nvSpPr>
           <p:cNvPr id="6" name="Espace réservé du numéro de diapositive 5"/>
           <p:cNvSpPr>
-            <a:spLocks noGrp="1"/>
+            <a:spLocks noGrp="true"/>
           </p:cNvSpPr>
           <p:nvPr>
             <p:ph type="sldNum" sz="quarter" idx="4"/>
@@ -3500,7 +3344,7 @@
           </a:prstGeom>
         </p:spPr>
         <p:txBody>
-          <a:bodyPr vert="horz" lIns="91440" tIns="45720" rIns="91440" bIns="45720" rtlCol="0" anchor="ctr"/>
+          <a:bodyPr vert="horz" lIns="91440" tIns="45720" rIns="91440" bIns="45720" rtlCol="false" anchor="ctr"/>
           <a:lstStyle>
             <a:lvl1pPr algn="r">
               <a:defRPr sz="1200">
@@ -3514,7 +3358,7 @@
           </a:lstStyle>
           <a:p>
             <a:fld id="{E3811F5C-F6AB-470B-8321-08F27CD4598A}" type="slidenum">
-              <a:rPr lang="fr-FR" smtClean="0"/>
+              <a:rPr lang="fr-FR" smtClean="false"/>
               <a:t>‹N°›</a:t>
             </a:fld>
             <a:endParaRPr lang="fr-FR"/>
@@ -3544,7 +3388,7 @@
   </p:sldLayoutIdLst>
   <p:txStyles>
     <p:titleStyle>
-      <a:lvl1pPr algn="l" defTabSz="914400" rtl="0" eaLnBrk="1" latinLnBrk="0" hangingPunct="1">
+      <a:lvl1pPr algn="l" defTabSz="914400" rtl="false" eaLnBrk="true" latinLnBrk="false" hangingPunct="true">
         <a:lnSpc>
           <a:spcPct val="90000"/>
         </a:lnSpc>
@@ -3563,7 +3407,7 @@
       </a:lvl1pPr>
     </p:titleStyle>
     <p:bodyStyle>
-      <a:lvl1pPr marL="228600" indent="-228600" algn="l" defTabSz="914400" rtl="0" eaLnBrk="1" latinLnBrk="0" hangingPunct="1">
+      <a:lvl1pPr marL="228600" indent="-228600" algn="l" defTabSz="914400" rtl="false" eaLnBrk="true" latinLnBrk="false" hangingPunct="true">
         <a:lnSpc>
           <a:spcPct val="90000"/>
         </a:lnSpc>
@@ -3581,7 +3425,7 @@
           <a:cs typeface="+mn-cs"/>
         </a:defRPr>
       </a:lvl1pPr>
-      <a:lvl2pPr marL="685800" indent="-228600" algn="l" defTabSz="914400" rtl="0" eaLnBrk="1" latinLnBrk="0" hangingPunct="1">
+      <a:lvl2pPr marL="685800" indent="-228600" algn="l" defTabSz="914400" rtl="false" eaLnBrk="true" latinLnBrk="false" hangingPunct="true">
         <a:lnSpc>
           <a:spcPct val="90000"/>
         </a:lnSpc>
@@ -3599,7 +3443,7 @@
           <a:cs typeface="+mn-cs"/>
         </a:defRPr>
       </a:lvl2pPr>
-      <a:lvl3pPr marL="1143000" indent="-228600" algn="l" defTabSz="914400" rtl="0" eaLnBrk="1" latinLnBrk="0" hangingPunct="1">
+      <a:lvl3pPr marL="1143000" indent="-228600" algn="l" defTabSz="914400" rtl="false" eaLnBrk="true" latinLnBrk="false" hangingPunct="true">
         <a:lnSpc>
           <a:spcPct val="90000"/>
         </a:lnSpc>
@@ -3617,7 +3461,7 @@
           <a:cs typeface="+mn-cs"/>
         </a:defRPr>
       </a:lvl3pPr>
-      <a:lvl4pPr marL="1600200" indent="-228600" algn="l" defTabSz="914400" rtl="0" eaLnBrk="1" latinLnBrk="0" hangingPunct="1">
+      <a:lvl4pPr marL="1600200" indent="-228600" algn="l" defTabSz="914400" rtl="false" eaLnBrk="true" latinLnBrk="false" hangingPunct="true">
         <a:lnSpc>
           <a:spcPct val="90000"/>
         </a:lnSpc>
@@ -3635,7 +3479,7 @@
           <a:cs typeface="+mn-cs"/>
         </a:defRPr>
       </a:lvl4pPr>
-      <a:lvl5pPr marL="2057400" indent="-228600" algn="l" defTabSz="914400" rtl="0" eaLnBrk="1" latinLnBrk="0" hangingPunct="1">
+      <a:lvl5pPr marL="2057400" indent="-228600" algn="l" defTabSz="914400" rtl="false" eaLnBrk="true" latinLnBrk="false" hangingPunct="true">
         <a:lnSpc>
           <a:spcPct val="90000"/>
         </a:lnSpc>
@@ -3653,7 +3497,7 @@
           <a:cs typeface="+mn-cs"/>
         </a:defRPr>
       </a:lvl5pPr>
-      <a:lvl6pPr marL="2514600" indent="-228600" algn="l" defTabSz="914400" rtl="0" eaLnBrk="1" latinLnBrk="0" hangingPunct="1">
+      <a:lvl6pPr marL="2514600" indent="-228600" algn="l" defTabSz="914400" rtl="false" eaLnBrk="true" latinLnBrk="false" hangingPunct="true">
         <a:lnSpc>
           <a:spcPct val="90000"/>
         </a:lnSpc>
@@ -3671,7 +3515,7 @@
           <a:cs typeface="+mn-cs"/>
         </a:defRPr>
       </a:lvl6pPr>
-      <a:lvl7pPr marL="2971800" indent="-228600" algn="l" defTabSz="914400" rtl="0" eaLnBrk="1" latinLnBrk="0" hangingPunct="1">
+      <a:lvl7pPr marL="2971800" indent="-228600" algn="l" defTabSz="914400" rtl="false" eaLnBrk="true" latinLnBrk="false" hangingPunct="true">
         <a:lnSpc>
           <a:spcPct val="90000"/>
         </a:lnSpc>
@@ -3689,7 +3533,7 @@
           <a:cs typeface="+mn-cs"/>
         </a:defRPr>
       </a:lvl7pPr>
-      <a:lvl8pPr marL="3429000" indent="-228600" algn="l" defTabSz="914400" rtl="0" eaLnBrk="1" latinLnBrk="0" hangingPunct="1">
+      <a:lvl8pPr marL="3429000" indent="-228600" algn="l" defTabSz="914400" rtl="false" eaLnBrk="true" latinLnBrk="false" hangingPunct="true">
         <a:lnSpc>
           <a:spcPct val="90000"/>
         </a:lnSpc>
@@ -3707,7 +3551,7 @@
           <a:cs typeface="+mn-cs"/>
         </a:defRPr>
       </a:lvl8pPr>
-      <a:lvl9pPr marL="3886200" indent="-228600" algn="l" defTabSz="914400" rtl="0" eaLnBrk="1" latinLnBrk="0" hangingPunct="1">
+      <a:lvl9pPr marL="3886200" indent="-228600" algn="l" defTabSz="914400" rtl="false" eaLnBrk="true" latinLnBrk="false" hangingPunct="true">
         <a:lnSpc>
           <a:spcPct val="90000"/>
         </a:lnSpc>
@@ -3730,7 +3574,7 @@
       <a:defPPr>
         <a:defRPr lang="fr-FR"/>
       </a:defPPr>
-      <a:lvl1pPr marL="0" algn="l" defTabSz="914400" rtl="0" eaLnBrk="1" latinLnBrk="0" hangingPunct="1">
+      <a:lvl1pPr marL="0" algn="l" defTabSz="914400" rtl="false" eaLnBrk="true" latinLnBrk="false" hangingPunct="true">
         <a:defRPr sz="1800" kern="1200">
           <a:solidFill>
             <a:schemeClr val="tx1"/>
@@ -3740,7 +3584,7 @@
           <a:cs typeface="+mn-cs"/>
         </a:defRPr>
       </a:lvl1pPr>
-      <a:lvl2pPr marL="457200" algn="l" defTabSz="914400" rtl="0" eaLnBrk="1" latinLnBrk="0" hangingPunct="1">
+      <a:lvl2pPr marL="457200" algn="l" defTabSz="914400" rtl="false" eaLnBrk="true" latinLnBrk="false" hangingPunct="true">
         <a:defRPr sz="1800" kern="1200">
           <a:solidFill>
             <a:schemeClr val="tx1"/>
@@ -3750,7 +3594,7 @@
           <a:cs typeface="+mn-cs"/>
         </a:defRPr>
       </a:lvl2pPr>
-      <a:lvl3pPr marL="914400" algn="l" defTabSz="914400" rtl="0" eaLnBrk="1" latinLnBrk="0" hangingPunct="1">
+      <a:lvl3pPr marL="914400" algn="l" defTabSz="914400" rtl="false" eaLnBrk="true" latinLnBrk="false" hangingPunct="true">
         <a:defRPr sz="1800" kern="1200">
           <a:solidFill>
             <a:schemeClr val="tx1"/>
@@ -3760,7 +3604,7 @@
           <a:cs typeface="+mn-cs"/>
         </a:defRPr>
       </a:lvl3pPr>
-      <a:lvl4pPr marL="1371600" algn="l" defTabSz="914400" rtl="0" eaLnBrk="1" latinLnBrk="0" hangingPunct="1">
+      <a:lvl4pPr marL="1371600" algn="l" defTabSz="914400" rtl="false" eaLnBrk="true" latinLnBrk="false" hangingPunct="true">
         <a:defRPr sz="1800" kern="1200">
           <a:solidFill>
             <a:schemeClr val="tx1"/>
@@ -3770,7 +3614,7 @@
           <a:cs typeface="+mn-cs"/>
         </a:defRPr>
       </a:lvl4pPr>
-      <a:lvl5pPr marL="1828800" algn="l" defTabSz="914400" rtl="0" eaLnBrk="1" latinLnBrk="0" hangingPunct="1">
+      <a:lvl5pPr marL="1828800" algn="l" defTabSz="914400" rtl="false" eaLnBrk="true" latinLnBrk="false" hangingPunct="true">
         <a:defRPr sz="1800" kern="1200">
           <a:solidFill>
             <a:schemeClr val="tx1"/>
@@ -3780,7 +3624,7 @@
           <a:cs typeface="+mn-cs"/>
         </a:defRPr>
       </a:lvl5pPr>
-      <a:lvl6pPr marL="2286000" algn="l" defTabSz="914400" rtl="0" eaLnBrk="1" latinLnBrk="0" hangingPunct="1">
+      <a:lvl6pPr marL="2286000" algn="l" defTabSz="914400" rtl="false" eaLnBrk="true" latinLnBrk="false" hangingPunct="true">
         <a:defRPr sz="1800" kern="1200">
           <a:solidFill>
             <a:schemeClr val="tx1"/>
@@ -3790,7 +3634,7 @@
           <a:cs typeface="+mn-cs"/>
         </a:defRPr>
       </a:lvl6pPr>
-      <a:lvl7pPr marL="2743200" algn="l" defTabSz="914400" rtl="0" eaLnBrk="1" latinLnBrk="0" hangingPunct="1">
+      <a:lvl7pPr marL="2743200" algn="l" defTabSz="914400" rtl="false" eaLnBrk="true" latinLnBrk="false" hangingPunct="true">
         <a:defRPr sz="1800" kern="1200">
           <a:solidFill>
             <a:schemeClr val="tx1"/>
@@ -3800,7 +3644,7 @@
           <a:cs typeface="+mn-cs"/>
         </a:defRPr>
       </a:lvl7pPr>
-      <a:lvl8pPr marL="3200400" algn="l" defTabSz="914400" rtl="0" eaLnBrk="1" latinLnBrk="0" hangingPunct="1">
+      <a:lvl8pPr marL="3200400" algn="l" defTabSz="914400" rtl="false" eaLnBrk="true" latinLnBrk="false" hangingPunct="true">
         <a:defRPr sz="1800" kern="1200">
           <a:solidFill>
             <a:schemeClr val="tx1"/>
@@ -3810,7 +3654,7 @@
           <a:cs typeface="+mn-cs"/>
         </a:defRPr>
       </a:lvl8pPr>
-      <a:lvl9pPr marL="3657600" algn="l" defTabSz="914400" rtl="0" eaLnBrk="1" latinLnBrk="0" hangingPunct="1">
+      <a:lvl9pPr marL="3657600" algn="l" defTabSz="914400" rtl="false" eaLnBrk="true" latinLnBrk="false" hangingPunct="true">
         <a:defRPr sz="1800" kern="1200">
           <a:solidFill>
             <a:schemeClr val="tx1"/>
@@ -3826,7 +3670,7 @@
 </file>
 
 <file path=ppt/slides/slide1.xml><?xml version="1.0" encoding="utf-8"?>
-<p:sld xmlns:a="http://schemas.openxmlformats.org/drawingml/2006/main" xmlns:r="http://schemas.openxmlformats.org/officeDocument/2006/relationships" xmlns:p="http://schemas.openxmlformats.org/presentationml/2006/main">
+<p:sld xmlns:p="http://schemas.openxmlformats.org/presentationml/2006/main" xmlns:r="http://schemas.openxmlformats.org/officeDocument/2006/relationships" xmlns:a="http://schemas.openxmlformats.org/drawingml/2006/main" xmlns:mc="http://schemas.openxmlformats.org/markup-compatibility/2006" xmlns:c="http://schemas.openxmlformats.org/drawingml/2006/chart" xmlns:ns6="http://schemas.openxmlformats.org/drawingml/2006/chartDrawing" xmlns:dgm="http://schemas.openxmlformats.org/drawingml/2006/diagram" xmlns:pic="http://schemas.openxmlformats.org/drawingml/2006/picture" xmlns:wp="http://schemas.openxmlformats.org/drawingml/2006/wordprocessingDrawing" xmlns:wp14="http://schemas.microsoft.com/office/word/2010/wordprocessingDrawing" xmlns:xdr="http://schemas.openxmlformats.org/drawingml/2006/spreadsheetDrawing" xmlns:ns12="http://schemas.openxmlformats.org/drawingml/2006/compatibility" xmlns:ns13="http://schemas.openxmlformats.org/drawingml/2006/lockedCanvas" xmlns:v="urn:schemas-microsoft-com:vml">
   <p:cSld>
     <p:spTree>
       <p:nvGrpSpPr>
@@ -3846,7 +3690,7 @@
         <p:nvSpPr>
           <p:cNvPr id="2" name="Titre 1"/>
           <p:cNvSpPr>
-            <a:spLocks noGrp="1"/>
+            <a:spLocks noGrp="true"/>
           </p:cNvSpPr>
           <p:nvPr>
             <p:ph type="ctrTitle"/>
@@ -3858,14 +3702,14 @@
           <a:lstStyle/>
           <a:p>
             <a:r>
-              <a:rPr lang="fr-FR" dirty="0" err="1" smtClean="0"/>
+              <a:rPr lang="fr-FR" dirty="false" err="true" smtClean="false"/>
               <a:t>Title</a:t>
             </a:r>
             <a:r>
-              <a:rPr lang="fr-FR" dirty="0" smtClean="0"/>
+              <a:rPr lang="fr-FR" dirty="false" smtClean="false"/>
               <a:t> 1</a:t>
             </a:r>
-            <a:endParaRPr lang="fr-FR" dirty="0"/>
+            <a:endParaRPr lang="fr-FR" dirty="false"/>
           </a:p>
         </p:txBody>
       </p:sp>
@@ -3873,7 +3717,7 @@
         <p:nvSpPr>
           <p:cNvPr id="3" name="Sous-titre 2"/>
           <p:cNvSpPr>
-            <a:spLocks noGrp="1"/>
+            <a:spLocks noGrp="true"/>
           </p:cNvSpPr>
           <p:nvPr>
             <p:ph type="subTitle" idx="1"/>
@@ -3885,14 +3729,14 @@
           <a:lstStyle/>
           <a:p>
             <a:r>
-              <a:rPr lang="fr-FR" dirty="0" err="1" smtClean="0"/>
+              <a:rPr lang="fr-FR" dirty="false" err="true" smtClean="false"/>
               <a:t>Sub-title</a:t>
             </a:r>
             <a:r>
-              <a:rPr lang="fr-FR" dirty="0" smtClean="0"/>
+              <a:rPr lang="fr-FR" dirty="false" smtClean="false"/>
               <a:t> 1</a:t>
             </a:r>
-            <a:endParaRPr lang="fr-FR" dirty="0"/>
+            <a:endParaRPr lang="fr-FR" dirty="false"/>
           </a:p>
         </p:txBody>
       </p:sp>
@@ -3910,7 +3754,7 @@
 </file>
 
 <file path=ppt/slides/slide2.xml><?xml version="1.0" encoding="utf-8"?>
-<p:sld xmlns:a="http://schemas.openxmlformats.org/drawingml/2006/main" xmlns:r="http://schemas.openxmlformats.org/officeDocument/2006/relationships" xmlns:p="http://schemas.openxmlformats.org/presentationml/2006/main">
+<p:sld xmlns:p="http://schemas.openxmlformats.org/presentationml/2006/main" xmlns:r="http://schemas.openxmlformats.org/officeDocument/2006/relationships" xmlns:a="http://schemas.openxmlformats.org/drawingml/2006/main" xmlns:mc="http://schemas.openxmlformats.org/markup-compatibility/2006" xmlns:c="http://schemas.openxmlformats.org/drawingml/2006/chart" xmlns:ns6="http://schemas.openxmlformats.org/drawingml/2006/chartDrawing" xmlns:dgm="http://schemas.openxmlformats.org/drawingml/2006/diagram" xmlns:pic="http://schemas.openxmlformats.org/drawingml/2006/picture" xmlns:wp="http://schemas.openxmlformats.org/drawingml/2006/wordprocessingDrawing" xmlns:wp14="http://schemas.microsoft.com/office/word/2010/wordprocessingDrawing" xmlns:xdr="http://schemas.openxmlformats.org/drawingml/2006/spreadsheetDrawing" xmlns:ns12="http://schemas.openxmlformats.org/drawingml/2006/compatibility" xmlns:ns13="http://schemas.openxmlformats.org/drawingml/2006/lockedCanvas" xmlns:v="urn:schemas-microsoft-com:vml">
   <p:cSld>
     <p:spTree>
       <p:nvGrpSpPr>
@@ -3930,7 +3774,7 @@
         <p:nvSpPr>
           <p:cNvPr id="2" name="Titre 1"/>
           <p:cNvSpPr>
-            <a:spLocks noGrp="1"/>
+            <a:spLocks noGrp="true"/>
           </p:cNvSpPr>
           <p:nvPr>
             <p:ph type="title"/>
@@ -3942,14 +3786,14 @@
           <a:lstStyle/>
           <a:p>
             <a:r>
-              <a:rPr lang="fr-FR" dirty="0" err="1" smtClean="0"/>
+              <a:rPr lang="fr-FR" dirty="false" err="true" smtClean="false"/>
               <a:t>Title</a:t>
             </a:r>
             <a:r>
-              <a:rPr lang="fr-FR" dirty="0" smtClean="0"/>
+              <a:rPr lang="fr-FR" dirty="false" smtClean="false"/>
               <a:t> 2</a:t>
             </a:r>
-            <a:endParaRPr lang="fr-FR" dirty="0"/>
+            <a:endParaRPr lang="fr-FR" dirty="false"/>
           </a:p>
         </p:txBody>
       </p:sp>
@@ -3957,7 +3801,7 @@
         <p:nvSpPr>
           <p:cNvPr id="3" name="Espace réservé du contenu 2"/>
           <p:cNvSpPr>
-            <a:spLocks noGrp="1"/>
+            <a:spLocks noGrp="true"/>
           </p:cNvSpPr>
           <p:nvPr>
             <p:ph idx="1"/>
@@ -3971,1112 +3815,1112 @@
           <a:lstStyle/>
           <a:p>
             <a:r>
-              <a:rPr lang="fr-FR" dirty="0" err="1" smtClean="0"/>
+              <a:rPr lang="fr-FR" dirty="false" err="true" smtClean="false"/>
               <a:t>Lorem</a:t>
             </a:r>
             <a:r>
-              <a:rPr lang="fr-FR" dirty="0" smtClean="0"/>
-              <a:t> </a:t>
-            </a:r>
-            <a:r>
-              <a:rPr lang="fr-FR" dirty="0" err="1" smtClean="0"/>
+              <a:rPr lang="fr-FR" dirty="false" smtClean="false"/>
+              <a:t> </a:t>
+            </a:r>
+            <a:r>
+              <a:rPr lang="fr-FR" dirty="false" err="true" smtClean="false"/>
               <a:t>ipsum</a:t>
             </a:r>
             <a:r>
-              <a:rPr lang="fr-FR" dirty="0" smtClean="0"/>
-              <a:t> </a:t>
-            </a:r>
-            <a:r>
-              <a:rPr lang="fr-FR" dirty="0" err="1" smtClean="0"/>
+              <a:rPr lang="fr-FR" dirty="false" smtClean="false"/>
+              <a:t> </a:t>
+            </a:r>
+            <a:r>
+              <a:rPr lang="fr-FR" dirty="false" err="true" smtClean="false"/>
               <a:t>dolor</a:t>
             </a:r>
             <a:r>
-              <a:rPr lang="fr-FR" dirty="0" smtClean="0"/>
-              <a:t> </a:t>
-            </a:r>
-            <a:r>
-              <a:rPr lang="fr-FR" dirty="0" err="1" smtClean="0"/>
+              <a:rPr lang="fr-FR" dirty="false" smtClean="false"/>
+              <a:t> </a:t>
+            </a:r>
+            <a:r>
+              <a:rPr lang="fr-FR" dirty="false" err="true" smtClean="false"/>
               <a:t>sit</a:t>
             </a:r>
             <a:r>
-              <a:rPr lang="fr-FR" dirty="0" smtClean="0"/>
-              <a:t> </a:t>
-            </a:r>
-            <a:r>
-              <a:rPr lang="fr-FR" dirty="0" err="1" smtClean="0"/>
+              <a:rPr lang="fr-FR" dirty="false" smtClean="false"/>
+              <a:t> </a:t>
+            </a:r>
+            <a:r>
+              <a:rPr lang="fr-FR" dirty="false" err="true" smtClean="false"/>
               <a:t>amet</a:t>
             </a:r>
             <a:r>
-              <a:rPr lang="fr-FR" dirty="0" smtClean="0"/>
+              <a:rPr lang="fr-FR" dirty="false" smtClean="false"/>
               <a:t>, </a:t>
             </a:r>
             <a:r>
-              <a:rPr lang="fr-FR" dirty="0" err="1" smtClean="0"/>
+              <a:rPr lang="fr-FR" dirty="false" err="true" smtClean="false"/>
               <a:t>consectetur</a:t>
             </a:r>
             <a:r>
-              <a:rPr lang="fr-FR" dirty="0" smtClean="0"/>
-              <a:t> </a:t>
-            </a:r>
-            <a:r>
-              <a:rPr lang="fr-FR" dirty="0" err="1" smtClean="0"/>
+              <a:rPr lang="fr-FR" dirty="false" smtClean="false"/>
+              <a:t> </a:t>
+            </a:r>
+            <a:r>
+              <a:rPr lang="fr-FR" dirty="false" err="true" smtClean="false"/>
               <a:t>adipiscing</a:t>
             </a:r>
             <a:r>
-              <a:rPr lang="fr-FR" dirty="0" smtClean="0"/>
-              <a:t> </a:t>
-            </a:r>
-            <a:r>
-              <a:rPr lang="fr-FR" dirty="0" err="1" smtClean="0"/>
+              <a:rPr lang="fr-FR" dirty="false" smtClean="false"/>
+              <a:t> </a:t>
+            </a:r>
+            <a:r>
+              <a:rPr lang="fr-FR" dirty="false" err="true" smtClean="false"/>
               <a:t>elit</a:t>
             </a:r>
             <a:r>
-              <a:rPr lang="fr-FR" dirty="0" smtClean="0"/>
+              <a:rPr lang="fr-FR" dirty="false" smtClean="false"/>
               <a:t>. Nunc </a:t>
             </a:r>
             <a:r>
-              <a:rPr lang="fr-FR" dirty="0" err="1" smtClean="0"/>
+              <a:rPr lang="fr-FR" dirty="false" err="true" smtClean="false"/>
               <a:t>sed</a:t>
             </a:r>
             <a:r>
-              <a:rPr lang="fr-FR" dirty="0" smtClean="0"/>
+              <a:rPr lang="fr-FR" dirty="false" smtClean="false"/>
               <a:t> est </a:t>
             </a:r>
             <a:r>
-              <a:rPr lang="fr-FR" dirty="0" err="1" smtClean="0"/>
+              <a:rPr lang="fr-FR" dirty="false" err="true" smtClean="false"/>
               <a:t>orci</a:t>
             </a:r>
             <a:r>
-              <a:rPr lang="fr-FR" dirty="0" smtClean="0"/>
+              <a:rPr lang="fr-FR" dirty="false" smtClean="false"/>
               <a:t>. </a:t>
             </a:r>
             <a:r>
-              <a:rPr lang="fr-FR" dirty="0" err="1" smtClean="0"/>
+              <a:rPr lang="fr-FR" dirty="false" err="true" smtClean="false"/>
               <a:t>Vivamus</a:t>
             </a:r>
             <a:r>
-              <a:rPr lang="fr-FR" dirty="0" smtClean="0"/>
-              <a:t> </a:t>
-            </a:r>
-            <a:r>
-              <a:rPr lang="fr-FR" dirty="0" err="1" smtClean="0"/>
+              <a:rPr lang="fr-FR" dirty="false" smtClean="false"/>
+              <a:t> </a:t>
+            </a:r>
+            <a:r>
+              <a:rPr lang="fr-FR" dirty="false" err="true" smtClean="false"/>
               <a:t>neque</a:t>
             </a:r>
             <a:r>
-              <a:rPr lang="fr-FR" dirty="0" smtClean="0"/>
-              <a:t> </a:t>
-            </a:r>
-            <a:r>
-              <a:rPr lang="fr-FR" dirty="0" err="1" smtClean="0"/>
+              <a:rPr lang="fr-FR" dirty="false" smtClean="false"/>
+              <a:t> </a:t>
+            </a:r>
+            <a:r>
+              <a:rPr lang="fr-FR" dirty="false" err="true" smtClean="false"/>
               <a:t>tellus</a:t>
             </a:r>
             <a:r>
-              <a:rPr lang="fr-FR" dirty="0" smtClean="0"/>
+              <a:rPr lang="fr-FR" dirty="false" smtClean="false"/>
               <a:t>, </a:t>
             </a:r>
             <a:r>
-              <a:rPr lang="fr-FR" dirty="0" err="1" smtClean="0"/>
+              <a:rPr lang="fr-FR" dirty="false" err="true" smtClean="false"/>
               <a:t>commodo</a:t>
             </a:r>
             <a:r>
-              <a:rPr lang="fr-FR" dirty="0" smtClean="0"/>
-              <a:t> </a:t>
-            </a:r>
-            <a:r>
-              <a:rPr lang="fr-FR" dirty="0" err="1" smtClean="0"/>
+              <a:rPr lang="fr-FR" dirty="false" smtClean="false"/>
+              <a:t> </a:t>
+            </a:r>
+            <a:r>
+              <a:rPr lang="fr-FR" dirty="false" err="true" smtClean="false"/>
               <a:t>sed</a:t>
             </a:r>
             <a:r>
-              <a:rPr lang="fr-FR" dirty="0" smtClean="0"/>
-              <a:t> </a:t>
-            </a:r>
-            <a:r>
-              <a:rPr lang="fr-FR" dirty="0" err="1" smtClean="0"/>
+              <a:rPr lang="fr-FR" dirty="false" smtClean="false"/>
+              <a:t> </a:t>
+            </a:r>
+            <a:r>
+              <a:rPr lang="fr-FR" dirty="false" err="true" smtClean="false"/>
               <a:t>auctor</a:t>
             </a:r>
             <a:r>
-              <a:rPr lang="fr-FR" dirty="0" smtClean="0"/>
+              <a:rPr lang="fr-FR" dirty="false" smtClean="false"/>
               <a:t> non, semper </a:t>
             </a:r>
             <a:r>
-              <a:rPr lang="fr-FR" dirty="0" err="1" smtClean="0"/>
+              <a:rPr lang="fr-FR" dirty="false" err="true" smtClean="false"/>
               <a:t>vel</a:t>
             </a:r>
             <a:r>
-              <a:rPr lang="fr-FR" dirty="0" smtClean="0"/>
+              <a:rPr lang="fr-FR" dirty="false" smtClean="false"/>
               <a:t> massa. </a:t>
             </a:r>
             <a:r>
-              <a:rPr lang="fr-FR" dirty="0" err="1" smtClean="0"/>
+              <a:rPr lang="fr-FR" dirty="false" err="true" smtClean="false"/>
               <a:t>Morbi</a:t>
             </a:r>
             <a:r>
-              <a:rPr lang="fr-FR" dirty="0" smtClean="0"/>
+              <a:rPr lang="fr-FR" dirty="false" smtClean="false"/>
               <a:t> et </a:t>
             </a:r>
             <a:r>
-              <a:rPr lang="fr-FR" dirty="0" err="1" smtClean="0"/>
+              <a:rPr lang="fr-FR" dirty="false" err="true" smtClean="false"/>
               <a:t>scelerisque</a:t>
             </a:r>
             <a:r>
-              <a:rPr lang="fr-FR" dirty="0" smtClean="0"/>
-              <a:t> </a:t>
-            </a:r>
-            <a:r>
-              <a:rPr lang="fr-FR" dirty="0" err="1" smtClean="0"/>
+              <a:rPr lang="fr-FR" dirty="false" smtClean="false"/>
+              <a:t> </a:t>
+            </a:r>
+            <a:r>
+              <a:rPr lang="fr-FR" dirty="false" err="true" smtClean="false"/>
               <a:t>mauris</a:t>
             </a:r>
             <a:r>
-              <a:rPr lang="fr-FR" dirty="0" smtClean="0"/>
+              <a:rPr lang="fr-FR" dirty="false" smtClean="false"/>
               <a:t>. </a:t>
             </a:r>
             <a:r>
-              <a:rPr lang="fr-FR" dirty="0" err="1" smtClean="0"/>
+              <a:rPr lang="fr-FR" dirty="false" err="true" smtClean="false"/>
               <a:t>Nulla</a:t>
             </a:r>
             <a:r>
-              <a:rPr lang="fr-FR" dirty="0" smtClean="0"/>
-              <a:t> </a:t>
-            </a:r>
-            <a:r>
-              <a:rPr lang="fr-FR" dirty="0" err="1" smtClean="0"/>
+              <a:rPr lang="fr-FR" dirty="false" smtClean="false"/>
+              <a:t> </a:t>
+            </a:r>
+            <a:r>
+              <a:rPr lang="fr-FR" dirty="false" err="true" smtClean="false"/>
               <a:t>odio</a:t>
             </a:r>
             <a:r>
-              <a:rPr lang="fr-FR" dirty="0" smtClean="0"/>
-              <a:t> </a:t>
-            </a:r>
-            <a:r>
-              <a:rPr lang="fr-FR" dirty="0" err="1" smtClean="0"/>
+              <a:rPr lang="fr-FR" dirty="false" smtClean="false"/>
+              <a:t> </a:t>
+            </a:r>
+            <a:r>
+              <a:rPr lang="fr-FR" dirty="false" err="true" smtClean="false"/>
               <a:t>nisi</a:t>
             </a:r>
             <a:r>
-              <a:rPr lang="fr-FR" dirty="0" smtClean="0"/>
+              <a:rPr lang="fr-FR" dirty="false" smtClean="false"/>
               <a:t>, </a:t>
             </a:r>
             <a:r>
-              <a:rPr lang="fr-FR" dirty="0" err="1" smtClean="0"/>
+              <a:rPr lang="fr-FR" dirty="false" err="true" smtClean="false"/>
               <a:t>dapibus</a:t>
             </a:r>
             <a:r>
-              <a:rPr lang="fr-FR" dirty="0" smtClean="0"/>
-              <a:t> </a:t>
-            </a:r>
-            <a:r>
-              <a:rPr lang="fr-FR" dirty="0" err="1" smtClean="0"/>
+              <a:rPr lang="fr-FR" dirty="false" smtClean="false"/>
+              <a:t> </a:t>
+            </a:r>
+            <a:r>
+              <a:rPr lang="fr-FR" dirty="false" err="true" smtClean="false"/>
               <a:t>sed</a:t>
             </a:r>
             <a:r>
-              <a:rPr lang="fr-FR" dirty="0" smtClean="0"/>
-              <a:t> </a:t>
-            </a:r>
-            <a:r>
-              <a:rPr lang="fr-FR" dirty="0" err="1" smtClean="0"/>
+              <a:rPr lang="fr-FR" dirty="false" smtClean="false"/>
+              <a:t> </a:t>
+            </a:r>
+            <a:r>
+              <a:rPr lang="fr-FR" dirty="false" err="true" smtClean="false"/>
               <a:t>felis</a:t>
             </a:r>
             <a:r>
-              <a:rPr lang="fr-FR" dirty="0" smtClean="0"/>
+              <a:rPr lang="fr-FR" dirty="false" smtClean="false"/>
               <a:t> ut, </a:t>
             </a:r>
             <a:r>
-              <a:rPr lang="fr-FR" dirty="0" err="1" smtClean="0"/>
+              <a:rPr lang="fr-FR" dirty="false" err="true" smtClean="false"/>
               <a:t>fermentum</a:t>
             </a:r>
             <a:r>
-              <a:rPr lang="fr-FR" dirty="0" smtClean="0"/>
-              <a:t> </a:t>
-            </a:r>
-            <a:r>
-              <a:rPr lang="fr-FR" dirty="0" err="1" smtClean="0"/>
+              <a:rPr lang="fr-FR" dirty="false" smtClean="false"/>
+              <a:t> </a:t>
+            </a:r>
+            <a:r>
+              <a:rPr lang="fr-FR" dirty="false" err="true" smtClean="false"/>
               <a:t>commodo</a:t>
             </a:r>
             <a:r>
-              <a:rPr lang="fr-FR" dirty="0" smtClean="0"/>
+              <a:rPr lang="fr-FR" dirty="false" smtClean="false"/>
               <a:t> massa. </a:t>
             </a:r>
             <a:r>
-              <a:rPr lang="fr-FR" dirty="0" err="1" smtClean="0"/>
+              <a:rPr lang="fr-FR" dirty="false" err="true" smtClean="false"/>
               <a:t>Praesent</a:t>
             </a:r>
             <a:r>
-              <a:rPr lang="fr-FR" dirty="0" smtClean="0"/>
-              <a:t> </a:t>
-            </a:r>
-            <a:r>
-              <a:rPr lang="fr-FR" dirty="0" err="1" smtClean="0"/>
+              <a:rPr lang="fr-FR" dirty="false" smtClean="false"/>
+              <a:t> </a:t>
+            </a:r>
+            <a:r>
+              <a:rPr lang="fr-FR" dirty="false" err="true" smtClean="false"/>
               <a:t>lorem</a:t>
             </a:r>
             <a:r>
-              <a:rPr lang="fr-FR" dirty="0" smtClean="0"/>
-              <a:t> </a:t>
-            </a:r>
-            <a:r>
-              <a:rPr lang="fr-FR" dirty="0" err="1" smtClean="0"/>
+              <a:rPr lang="fr-FR" dirty="false" smtClean="false"/>
+              <a:t> </a:t>
+            </a:r>
+            <a:r>
+              <a:rPr lang="fr-FR" dirty="false" err="true" smtClean="false"/>
               <a:t>ligula</a:t>
             </a:r>
             <a:r>
-              <a:rPr lang="fr-FR" dirty="0" smtClean="0"/>
+              <a:rPr lang="fr-FR" dirty="false" smtClean="false"/>
               <a:t>, </a:t>
             </a:r>
             <a:r>
-              <a:rPr lang="fr-FR" dirty="0" err="1" smtClean="0"/>
+              <a:rPr lang="fr-FR" dirty="false" err="true" smtClean="false"/>
               <a:t>lobortis</a:t>
             </a:r>
             <a:r>
-              <a:rPr lang="fr-FR" dirty="0" smtClean="0"/>
-              <a:t> </a:t>
-            </a:r>
-            <a:r>
-              <a:rPr lang="fr-FR" dirty="0" err="1" smtClean="0"/>
+              <a:rPr lang="fr-FR" dirty="false" smtClean="false"/>
+              <a:t> </a:t>
+            </a:r>
+            <a:r>
+              <a:rPr lang="fr-FR" dirty="false" err="true" smtClean="false"/>
               <a:t>vel</a:t>
             </a:r>
             <a:r>
-              <a:rPr lang="fr-FR" dirty="0" smtClean="0"/>
-              <a:t> </a:t>
-            </a:r>
-            <a:r>
-              <a:rPr lang="fr-FR" dirty="0" err="1" smtClean="0"/>
+              <a:rPr lang="fr-FR" dirty="false" smtClean="false"/>
+              <a:t> </a:t>
+            </a:r>
+            <a:r>
+              <a:rPr lang="fr-FR" dirty="false" err="true" smtClean="false"/>
               <a:t>nisi</a:t>
             </a:r>
             <a:r>
-              <a:rPr lang="fr-FR" dirty="0" smtClean="0"/>
+              <a:rPr lang="fr-FR" dirty="false" smtClean="false"/>
               <a:t> id, </a:t>
             </a:r>
             <a:r>
-              <a:rPr lang="fr-FR" dirty="0" err="1" smtClean="0"/>
+              <a:rPr lang="fr-FR" dirty="false" err="true" smtClean="false"/>
               <a:t>laoreet</a:t>
             </a:r>
             <a:r>
-              <a:rPr lang="fr-FR" dirty="0" smtClean="0"/>
-              <a:t> </a:t>
-            </a:r>
-            <a:r>
-              <a:rPr lang="fr-FR" dirty="0" err="1" smtClean="0"/>
+              <a:rPr lang="fr-FR" dirty="false" smtClean="false"/>
+              <a:t> </a:t>
+            </a:r>
+            <a:r>
+              <a:rPr lang="fr-FR" dirty="false" err="true" smtClean="false"/>
               <a:t>mattis</a:t>
             </a:r>
             <a:r>
-              <a:rPr lang="fr-FR" dirty="0" smtClean="0"/>
-              <a:t> </a:t>
-            </a:r>
-            <a:r>
-              <a:rPr lang="fr-FR" dirty="0" err="1" smtClean="0"/>
+              <a:rPr lang="fr-FR" dirty="false" smtClean="false"/>
+              <a:t> </a:t>
+            </a:r>
+            <a:r>
+              <a:rPr lang="fr-FR" dirty="false" err="true" smtClean="false"/>
               <a:t>nibh</a:t>
             </a:r>
             <a:r>
-              <a:rPr lang="fr-FR" dirty="0" smtClean="0"/>
+              <a:rPr lang="fr-FR" dirty="false" smtClean="false"/>
               <a:t>. Suspendisse </a:t>
             </a:r>
             <a:r>
-              <a:rPr lang="fr-FR" dirty="0" err="1" smtClean="0"/>
+              <a:rPr lang="fr-FR" dirty="false" err="true" smtClean="false"/>
               <a:t>auctor</a:t>
             </a:r>
             <a:r>
-              <a:rPr lang="fr-FR" dirty="0" smtClean="0"/>
-              <a:t> </a:t>
-            </a:r>
-            <a:r>
-              <a:rPr lang="fr-FR" dirty="0" err="1" smtClean="0"/>
+              <a:rPr lang="fr-FR" dirty="false" smtClean="false"/>
+              <a:t> </a:t>
+            </a:r>
+            <a:r>
+              <a:rPr lang="fr-FR" dirty="false" err="true" smtClean="false"/>
               <a:t>quam</a:t>
             </a:r>
             <a:r>
-              <a:rPr lang="fr-FR" dirty="0" smtClean="0"/>
-              <a:t> </a:t>
-            </a:r>
-            <a:r>
-              <a:rPr lang="fr-FR" dirty="0" err="1" smtClean="0"/>
+              <a:rPr lang="fr-FR" dirty="false" smtClean="false"/>
+              <a:t> </a:t>
+            </a:r>
+            <a:r>
+              <a:rPr lang="fr-FR" dirty="false" err="true" smtClean="false"/>
               <a:t>quis</a:t>
             </a:r>
             <a:r>
-              <a:rPr lang="fr-FR" dirty="0" smtClean="0"/>
+              <a:rPr lang="fr-FR" dirty="false" smtClean="false"/>
               <a:t> diam </a:t>
             </a:r>
             <a:r>
-              <a:rPr lang="fr-FR" dirty="0" err="1" smtClean="0"/>
+              <a:rPr lang="fr-FR" dirty="false" err="true" smtClean="false"/>
               <a:t>sodales</a:t>
             </a:r>
             <a:r>
-              <a:rPr lang="fr-FR" dirty="0" smtClean="0"/>
+              <a:rPr lang="fr-FR" dirty="false" smtClean="false"/>
               <a:t>, in porta </a:t>
             </a:r>
             <a:r>
-              <a:rPr lang="fr-FR" dirty="0" err="1" smtClean="0"/>
+              <a:rPr lang="fr-FR" dirty="false" err="true" smtClean="false"/>
               <a:t>turpis</a:t>
             </a:r>
             <a:r>
-              <a:rPr lang="fr-FR" dirty="0" smtClean="0"/>
+              <a:rPr lang="fr-FR" dirty="false" smtClean="false"/>
               <a:t> tristique. </a:t>
             </a:r>
             <a:r>
-              <a:rPr lang="fr-FR" dirty="0" err="1" smtClean="0"/>
+              <a:rPr lang="fr-FR" dirty="false" err="true" smtClean="false"/>
               <a:t>Proin</a:t>
             </a:r>
             <a:r>
-              <a:rPr lang="fr-FR" dirty="0" smtClean="0"/>
-              <a:t> </a:t>
-            </a:r>
-            <a:r>
-              <a:rPr lang="fr-FR" dirty="0" err="1" smtClean="0"/>
+              <a:rPr lang="fr-FR" dirty="false" smtClean="false"/>
+              <a:t> </a:t>
+            </a:r>
+            <a:r>
+              <a:rPr lang="fr-FR" dirty="false" err="true" smtClean="false"/>
               <a:t>consequat</a:t>
             </a:r>
             <a:r>
-              <a:rPr lang="fr-FR" dirty="0" smtClean="0"/>
-              <a:t> </a:t>
-            </a:r>
-            <a:r>
-              <a:rPr lang="fr-FR" dirty="0" err="1" smtClean="0"/>
+              <a:rPr lang="fr-FR" dirty="false" smtClean="false"/>
+              <a:t> </a:t>
+            </a:r>
+            <a:r>
+              <a:rPr lang="fr-FR" dirty="false" err="true" smtClean="false"/>
               <a:t>luctus</a:t>
             </a:r>
             <a:r>
-              <a:rPr lang="fr-FR" dirty="0" smtClean="0"/>
-              <a:t> </a:t>
-            </a:r>
-            <a:r>
-              <a:rPr lang="fr-FR" dirty="0" err="1" smtClean="0"/>
+              <a:rPr lang="fr-FR" dirty="false" smtClean="false"/>
+              <a:t> </a:t>
+            </a:r>
+            <a:r>
+              <a:rPr lang="fr-FR" dirty="false" err="true" smtClean="false"/>
               <a:t>aliquet</a:t>
             </a:r>
             <a:r>
-              <a:rPr lang="fr-FR" dirty="0" smtClean="0"/>
+              <a:rPr lang="fr-FR" dirty="false" smtClean="false"/>
               <a:t>. </a:t>
             </a:r>
             <a:r>
-              <a:rPr lang="fr-FR" dirty="0" err="1" smtClean="0"/>
+              <a:rPr lang="fr-FR" dirty="false" err="true" smtClean="false"/>
               <a:t>Proin</a:t>
             </a:r>
             <a:r>
-              <a:rPr lang="fr-FR" dirty="0" smtClean="0"/>
+              <a:rPr lang="fr-FR" dirty="false" smtClean="false"/>
               <a:t> bibendum </a:t>
             </a:r>
             <a:r>
-              <a:rPr lang="fr-FR" dirty="0" err="1" smtClean="0"/>
+              <a:rPr lang="fr-FR" dirty="false" err="true" smtClean="false"/>
               <a:t>tortor</a:t>
             </a:r>
             <a:r>
-              <a:rPr lang="fr-FR" dirty="0" smtClean="0"/>
-              <a:t> </a:t>
-            </a:r>
-            <a:r>
-              <a:rPr lang="fr-FR" dirty="0" err="1" smtClean="0"/>
+              <a:rPr lang="fr-FR" dirty="false" smtClean="false"/>
+              <a:t> </a:t>
+            </a:r>
+            <a:r>
+              <a:rPr lang="fr-FR" dirty="false" err="true" smtClean="false"/>
               <a:t>lectus</a:t>
             </a:r>
             <a:r>
-              <a:rPr lang="fr-FR" dirty="0" smtClean="0"/>
+              <a:rPr lang="fr-FR" dirty="false" smtClean="false"/>
               <a:t>, </a:t>
             </a:r>
             <a:r>
-              <a:rPr lang="fr-FR" dirty="0" err="1" smtClean="0"/>
+              <a:rPr lang="fr-FR" dirty="false" err="true" smtClean="false"/>
               <a:t>sagittis</a:t>
             </a:r>
             <a:r>
-              <a:rPr lang="fr-FR" dirty="0" smtClean="0"/>
-              <a:t> </a:t>
-            </a:r>
-            <a:r>
-              <a:rPr lang="fr-FR" dirty="0" err="1" smtClean="0"/>
+              <a:rPr lang="fr-FR" dirty="false" smtClean="false"/>
+              <a:t> </a:t>
+            </a:r>
+            <a:r>
+              <a:rPr lang="fr-FR" dirty="false" err="true" smtClean="false"/>
               <a:t>suscipit</a:t>
             </a:r>
             <a:r>
-              <a:rPr lang="fr-FR" dirty="0" smtClean="0"/>
+              <a:rPr lang="fr-FR" dirty="false" smtClean="false"/>
               <a:t> ante </a:t>
             </a:r>
             <a:r>
-              <a:rPr lang="fr-FR" dirty="0" err="1" smtClean="0"/>
+              <a:rPr lang="fr-FR" dirty="false" err="true" smtClean="false"/>
               <a:t>scelerisque</a:t>
             </a:r>
             <a:r>
-              <a:rPr lang="fr-FR" dirty="0" smtClean="0"/>
-              <a:t> </a:t>
-            </a:r>
-            <a:r>
-              <a:rPr lang="fr-FR" dirty="0" err="1" smtClean="0"/>
+              <a:rPr lang="fr-FR" dirty="false" smtClean="false"/>
+              <a:t> </a:t>
+            </a:r>
+            <a:r>
+              <a:rPr lang="fr-FR" dirty="false" err="true" smtClean="false"/>
               <a:t>sit</a:t>
             </a:r>
             <a:r>
-              <a:rPr lang="fr-FR" dirty="0" smtClean="0"/>
-              <a:t> </a:t>
-            </a:r>
-            <a:r>
-              <a:rPr lang="fr-FR" dirty="0" err="1" smtClean="0"/>
+              <a:rPr lang="fr-FR" dirty="false" smtClean="false"/>
+              <a:t> </a:t>
+            </a:r>
+            <a:r>
+              <a:rPr lang="fr-FR" dirty="false" err="true" smtClean="false"/>
               <a:t>amet</a:t>
             </a:r>
             <a:r>
-              <a:rPr lang="fr-FR" dirty="0" smtClean="0"/>
+              <a:rPr lang="fr-FR" dirty="false" smtClean="false"/>
               <a:t>. </a:t>
             </a:r>
             <a:r>
-              <a:rPr lang="fr-FR" dirty="0" err="1" smtClean="0"/>
+              <a:rPr lang="fr-FR" dirty="false" err="true" smtClean="false"/>
               <a:t>Integer</a:t>
             </a:r>
             <a:r>
-              <a:rPr lang="fr-FR" dirty="0" smtClean="0"/>
-              <a:t> </a:t>
-            </a:r>
-            <a:r>
-              <a:rPr lang="fr-FR" dirty="0" err="1" smtClean="0"/>
+              <a:rPr lang="fr-FR" dirty="false" smtClean="false"/>
+              <a:t> </a:t>
+            </a:r>
+            <a:r>
+              <a:rPr lang="fr-FR" dirty="false" err="true" smtClean="false"/>
               <a:t>sed</a:t>
             </a:r>
             <a:r>
-              <a:rPr lang="fr-FR" dirty="0" smtClean="0"/>
+              <a:rPr lang="fr-FR" dirty="false" smtClean="false"/>
               <a:t> cursus </a:t>
             </a:r>
             <a:r>
-              <a:rPr lang="fr-FR" dirty="0" err="1" smtClean="0"/>
+              <a:rPr lang="fr-FR" dirty="false" err="true" smtClean="false"/>
               <a:t>metus</a:t>
             </a:r>
             <a:r>
-              <a:rPr lang="fr-FR" dirty="0" smtClean="0"/>
+              <a:rPr lang="fr-FR" dirty="false" smtClean="false"/>
               <a:t>. Ut id </a:t>
             </a:r>
             <a:r>
-              <a:rPr lang="fr-FR" dirty="0" err="1" smtClean="0"/>
+              <a:rPr lang="fr-FR" dirty="false" err="true" smtClean="false"/>
               <a:t>dapibus</a:t>
             </a:r>
             <a:r>
-              <a:rPr lang="fr-FR" dirty="0" smtClean="0"/>
-              <a:t> </a:t>
-            </a:r>
-            <a:r>
-              <a:rPr lang="fr-FR" dirty="0" err="1" smtClean="0"/>
+              <a:rPr lang="fr-FR" dirty="false" smtClean="false"/>
+              <a:t> </a:t>
+            </a:r>
+            <a:r>
+              <a:rPr lang="fr-FR" dirty="false" err="true" smtClean="false"/>
               <a:t>mauris</a:t>
             </a:r>
             <a:r>
-              <a:rPr lang="fr-FR" dirty="0" smtClean="0"/>
+              <a:rPr lang="fr-FR" dirty="false" smtClean="false"/>
               <a:t>. Nunc in </a:t>
             </a:r>
             <a:r>
-              <a:rPr lang="fr-FR" dirty="0" err="1" smtClean="0"/>
+              <a:rPr lang="fr-FR" dirty="false" err="true" smtClean="false"/>
               <a:t>risus</a:t>
             </a:r>
             <a:r>
-              <a:rPr lang="fr-FR" dirty="0" smtClean="0"/>
-              <a:t> </a:t>
-            </a:r>
-            <a:r>
-              <a:rPr lang="fr-FR" dirty="0" err="1" smtClean="0"/>
+              <a:rPr lang="fr-FR" dirty="false" smtClean="false"/>
+              <a:t> </a:t>
+            </a:r>
+            <a:r>
+              <a:rPr lang="fr-FR" dirty="false" err="true" smtClean="false"/>
               <a:t>leo</a:t>
             </a:r>
             <a:r>
-              <a:rPr lang="fr-FR" dirty="0" smtClean="0"/>
+              <a:rPr lang="fr-FR" dirty="false" smtClean="false"/>
               <a:t>. </a:t>
             </a:r>
             <a:r>
-              <a:rPr lang="fr-FR" dirty="0" err="1" smtClean="0"/>
+              <a:rPr lang="fr-FR" dirty="false" err="true" smtClean="false"/>
               <a:t>Mauris</a:t>
             </a:r>
             <a:r>
-              <a:rPr lang="fr-FR" dirty="0" smtClean="0"/>
+              <a:rPr lang="fr-FR" dirty="false" smtClean="false"/>
               <a:t> eu </a:t>
             </a:r>
             <a:r>
-              <a:rPr lang="fr-FR" dirty="0" err="1" smtClean="0"/>
+              <a:rPr lang="fr-FR" dirty="false" err="true" smtClean="false"/>
               <a:t>dictum</a:t>
             </a:r>
             <a:r>
-              <a:rPr lang="fr-FR" dirty="0" smtClean="0"/>
+              <a:rPr lang="fr-FR" dirty="false" smtClean="false"/>
               <a:t> nunc, </a:t>
             </a:r>
             <a:r>
-              <a:rPr lang="fr-FR" dirty="0" err="1" smtClean="0"/>
+              <a:rPr lang="fr-FR" dirty="false" err="true" smtClean="false"/>
               <a:t>posuere</a:t>
             </a:r>
             <a:r>
-              <a:rPr lang="fr-FR" dirty="0" smtClean="0"/>
-              <a:t> </a:t>
-            </a:r>
-            <a:r>
-              <a:rPr lang="fr-FR" dirty="0" err="1" smtClean="0"/>
+              <a:rPr lang="fr-FR" dirty="false" smtClean="false"/>
+              <a:t> </a:t>
+            </a:r>
+            <a:r>
+              <a:rPr lang="fr-FR" dirty="false" err="true" smtClean="false"/>
               <a:t>volutpat</a:t>
             </a:r>
             <a:r>
-              <a:rPr lang="fr-FR" dirty="0" smtClean="0"/>
-              <a:t> </a:t>
-            </a:r>
-            <a:r>
-              <a:rPr lang="fr-FR" dirty="0" err="1" smtClean="0"/>
+              <a:rPr lang="fr-FR" dirty="false" smtClean="false"/>
+              <a:t> </a:t>
+            </a:r>
+            <a:r>
+              <a:rPr lang="fr-FR" dirty="false" err="true" smtClean="false"/>
               <a:t>urna</a:t>
             </a:r>
             <a:r>
-              <a:rPr lang="fr-FR" dirty="0" smtClean="0"/>
+              <a:rPr lang="fr-FR" dirty="false" smtClean="false"/>
               <a:t>. </a:t>
             </a:r>
             <a:r>
-              <a:rPr lang="fr-FR" dirty="0" err="1" smtClean="0"/>
+              <a:rPr lang="fr-FR" dirty="false" err="true" smtClean="false"/>
               <a:t>Pellentesque</a:t>
             </a:r>
             <a:r>
-              <a:rPr lang="fr-FR" dirty="0" smtClean="0"/>
+              <a:rPr lang="fr-FR" dirty="false" smtClean="false"/>
               <a:t> at </a:t>
             </a:r>
             <a:r>
-              <a:rPr lang="fr-FR" dirty="0" err="1" smtClean="0"/>
+              <a:rPr lang="fr-FR" dirty="false" err="true" smtClean="false"/>
               <a:t>nisl</a:t>
             </a:r>
             <a:r>
-              <a:rPr lang="fr-FR" dirty="0" smtClean="0"/>
-              <a:t> </a:t>
-            </a:r>
-            <a:r>
-              <a:rPr lang="fr-FR" dirty="0" err="1" smtClean="0"/>
+              <a:rPr lang="fr-FR" dirty="false" smtClean="false"/>
+              <a:t> </a:t>
+            </a:r>
+            <a:r>
+              <a:rPr lang="fr-FR" dirty="false" err="true" smtClean="false"/>
               <a:t>sodales</a:t>
             </a:r>
             <a:r>
-              <a:rPr lang="fr-FR" dirty="0" smtClean="0"/>
+              <a:rPr lang="fr-FR" dirty="false" smtClean="false"/>
               <a:t>, </a:t>
             </a:r>
             <a:r>
-              <a:rPr lang="fr-FR" dirty="0" err="1" smtClean="0"/>
+              <a:rPr lang="fr-FR" dirty="false" err="true" smtClean="false"/>
               <a:t>tempus</a:t>
             </a:r>
             <a:r>
-              <a:rPr lang="fr-FR" dirty="0" smtClean="0"/>
-              <a:t> </a:t>
-            </a:r>
-            <a:r>
-              <a:rPr lang="fr-FR" dirty="0" err="1" smtClean="0"/>
+              <a:rPr lang="fr-FR" dirty="false" smtClean="false"/>
+              <a:t> </a:t>
+            </a:r>
+            <a:r>
+              <a:rPr lang="fr-FR" dirty="false" err="true" smtClean="false"/>
               <a:t>lacus</a:t>
             </a:r>
             <a:r>
-              <a:rPr lang="fr-FR" dirty="0" smtClean="0"/>
-              <a:t> </a:t>
-            </a:r>
-            <a:r>
-              <a:rPr lang="fr-FR" dirty="0" err="1" smtClean="0"/>
+              <a:rPr lang="fr-FR" dirty="false" smtClean="false"/>
+              <a:t> </a:t>
+            </a:r>
+            <a:r>
+              <a:rPr lang="fr-FR" dirty="false" err="true" smtClean="false"/>
               <a:t>ac</a:t>
             </a:r>
             <a:r>
-              <a:rPr lang="fr-FR" dirty="0" smtClean="0"/>
+              <a:rPr lang="fr-FR" dirty="false" smtClean="false"/>
               <a:t>, </a:t>
             </a:r>
             <a:r>
-              <a:rPr lang="fr-FR" dirty="0" err="1" smtClean="0"/>
+              <a:rPr lang="fr-FR" dirty="false" err="true" smtClean="false"/>
               <a:t>consectetur</a:t>
             </a:r>
             <a:r>
-              <a:rPr lang="fr-FR" dirty="0" smtClean="0"/>
-              <a:t> </a:t>
-            </a:r>
-            <a:r>
-              <a:rPr lang="fr-FR" dirty="0" err="1" smtClean="0"/>
+              <a:rPr lang="fr-FR" dirty="false" smtClean="false"/>
+              <a:t> </a:t>
+            </a:r>
+            <a:r>
+              <a:rPr lang="fr-FR" dirty="false" err="true" smtClean="false"/>
               <a:t>nibh</a:t>
             </a:r>
             <a:r>
-              <a:rPr lang="fr-FR" dirty="0" smtClean="0"/>
+              <a:rPr lang="fr-FR" dirty="false" smtClean="false"/>
               <a:t>.</a:t>
             </a:r>
           </a:p>
           <a:p>
             <a:r>
-              <a:rPr lang="fr-FR" dirty="0" err="1" smtClean="0"/>
+              <a:rPr lang="fr-FR" dirty="false" err="true" smtClean="false"/>
               <a:t>Aenean</a:t>
             </a:r>
             <a:r>
-              <a:rPr lang="fr-FR" dirty="0" smtClean="0"/>
-              <a:t> </a:t>
-            </a:r>
-            <a:r>
-              <a:rPr lang="fr-FR" dirty="0" err="1" smtClean="0"/>
+              <a:rPr lang="fr-FR" dirty="false" smtClean="false"/>
+              <a:t> </a:t>
+            </a:r>
+            <a:r>
+              <a:rPr lang="fr-FR" dirty="false" err="true" smtClean="false"/>
               <a:t>convallis</a:t>
             </a:r>
             <a:r>
-              <a:rPr lang="fr-FR" dirty="0" smtClean="0"/>
-              <a:t> </a:t>
-            </a:r>
-            <a:r>
-              <a:rPr lang="fr-FR" dirty="0" err="1" smtClean="0"/>
+              <a:rPr lang="fr-FR" dirty="false" smtClean="false"/>
+              <a:t> </a:t>
+            </a:r>
+            <a:r>
+              <a:rPr lang="fr-FR" dirty="false" err="true" smtClean="false"/>
               <a:t>lacus</a:t>
             </a:r>
             <a:r>
-              <a:rPr lang="fr-FR" dirty="0" smtClean="0"/>
+              <a:rPr lang="fr-FR" dirty="false" smtClean="false"/>
               <a:t> at </a:t>
             </a:r>
             <a:r>
-              <a:rPr lang="fr-FR" dirty="0" err="1" smtClean="0"/>
+              <a:rPr lang="fr-FR" dirty="false" err="true" smtClean="false"/>
               <a:t>velit</a:t>
             </a:r>
             <a:r>
-              <a:rPr lang="fr-FR" dirty="0" smtClean="0"/>
-              <a:t> </a:t>
-            </a:r>
-            <a:r>
-              <a:rPr lang="fr-FR" dirty="0" err="1" smtClean="0"/>
+              <a:rPr lang="fr-FR" dirty="false" smtClean="false"/>
+              <a:t> </a:t>
+            </a:r>
+            <a:r>
+              <a:rPr lang="fr-FR" dirty="false" err="true" smtClean="false"/>
               <a:t>rhoncus</a:t>
             </a:r>
             <a:r>
-              <a:rPr lang="fr-FR" dirty="0" smtClean="0"/>
+              <a:rPr lang="fr-FR" dirty="false" smtClean="false"/>
               <a:t>, non </a:t>
             </a:r>
             <a:r>
-              <a:rPr lang="fr-FR" dirty="0" err="1" smtClean="0"/>
+              <a:rPr lang="fr-FR" dirty="false" err="true" smtClean="false"/>
               <a:t>rhoncus</a:t>
             </a:r>
             <a:r>
-              <a:rPr lang="fr-FR" dirty="0" smtClean="0"/>
-              <a:t> </a:t>
-            </a:r>
-            <a:r>
-              <a:rPr lang="fr-FR" dirty="0" err="1" smtClean="0"/>
+              <a:rPr lang="fr-FR" dirty="false" smtClean="false"/>
+              <a:t> </a:t>
+            </a:r>
+            <a:r>
+              <a:rPr lang="fr-FR" dirty="false" err="true" smtClean="false"/>
               <a:t>metus</a:t>
             </a:r>
             <a:r>
-              <a:rPr lang="fr-FR" dirty="0" smtClean="0"/>
-              <a:t> </a:t>
-            </a:r>
-            <a:r>
-              <a:rPr lang="fr-FR" dirty="0" err="1" smtClean="0"/>
+              <a:rPr lang="fr-FR" dirty="false" smtClean="false"/>
+              <a:t> </a:t>
+            </a:r>
+            <a:r>
+              <a:rPr lang="fr-FR" dirty="false" err="true" smtClean="false"/>
               <a:t>finibus</a:t>
             </a:r>
             <a:r>
-              <a:rPr lang="fr-FR" dirty="0" smtClean="0"/>
+              <a:rPr lang="fr-FR" dirty="false" smtClean="false"/>
               <a:t>. Sed est magna, </a:t>
             </a:r>
             <a:r>
-              <a:rPr lang="fr-FR" dirty="0" err="1" smtClean="0"/>
+              <a:rPr lang="fr-FR" dirty="false" err="true" smtClean="false"/>
               <a:t>porttitor</a:t>
             </a:r>
             <a:r>
-              <a:rPr lang="fr-FR" dirty="0" smtClean="0"/>
-              <a:t> </a:t>
-            </a:r>
-            <a:r>
-              <a:rPr lang="fr-FR" dirty="0" err="1" smtClean="0"/>
+              <a:rPr lang="fr-FR" dirty="false" smtClean="false"/>
+              <a:t> </a:t>
+            </a:r>
+            <a:r>
+              <a:rPr lang="fr-FR" dirty="false" err="true" smtClean="false"/>
               <a:t>quis</a:t>
             </a:r>
             <a:r>
-              <a:rPr lang="fr-FR" dirty="0" smtClean="0"/>
-              <a:t> </a:t>
-            </a:r>
-            <a:r>
-              <a:rPr lang="fr-FR" dirty="0" err="1" smtClean="0"/>
+              <a:rPr lang="fr-FR" dirty="false" smtClean="false"/>
+              <a:t> </a:t>
+            </a:r>
+            <a:r>
+              <a:rPr lang="fr-FR" dirty="false" err="true" smtClean="false"/>
               <a:t>condimentum</a:t>
             </a:r>
             <a:r>
-              <a:rPr lang="fr-FR" dirty="0" smtClean="0"/>
-              <a:t> </a:t>
-            </a:r>
-            <a:r>
-              <a:rPr lang="fr-FR" dirty="0" err="1" smtClean="0"/>
+              <a:rPr lang="fr-FR" dirty="false" smtClean="false"/>
+              <a:t> </a:t>
+            </a:r>
+            <a:r>
+              <a:rPr lang="fr-FR" dirty="false" err="true" smtClean="false"/>
               <a:t>quis</a:t>
             </a:r>
             <a:r>
-              <a:rPr lang="fr-FR" dirty="0" smtClean="0"/>
+              <a:rPr lang="fr-FR" dirty="false" smtClean="false"/>
               <a:t>, </a:t>
             </a:r>
             <a:r>
-              <a:rPr lang="fr-FR" dirty="0" err="1" smtClean="0"/>
+              <a:rPr lang="fr-FR" dirty="false" err="true" smtClean="false"/>
               <a:t>luctus</a:t>
             </a:r>
             <a:r>
-              <a:rPr lang="fr-FR" dirty="0" smtClean="0"/>
-              <a:t> </a:t>
-            </a:r>
-            <a:r>
-              <a:rPr lang="fr-FR" dirty="0" err="1" smtClean="0"/>
+              <a:rPr lang="fr-FR" dirty="false" smtClean="false"/>
+              <a:t> </a:t>
+            </a:r>
+            <a:r>
+              <a:rPr lang="fr-FR" dirty="false" err="true" smtClean="false"/>
               <a:t>sed</a:t>
             </a:r>
             <a:r>
-              <a:rPr lang="fr-FR" dirty="0" smtClean="0"/>
+              <a:rPr lang="fr-FR" dirty="false" smtClean="false"/>
               <a:t> mi. </a:t>
             </a:r>
             <a:r>
-              <a:rPr lang="fr-FR" dirty="0" err="1" smtClean="0"/>
+              <a:rPr lang="fr-FR" dirty="false" err="true" smtClean="false"/>
               <a:t>Nulla</a:t>
             </a:r>
             <a:r>
-              <a:rPr lang="fr-FR" dirty="0" smtClean="0"/>
+              <a:rPr lang="fr-FR" dirty="false" smtClean="false"/>
               <a:t> eu </a:t>
             </a:r>
             <a:r>
-              <a:rPr lang="fr-FR" dirty="0" err="1" smtClean="0"/>
+              <a:rPr lang="fr-FR" dirty="false" err="true" smtClean="false"/>
               <a:t>ullamcorper</a:t>
             </a:r>
             <a:r>
-              <a:rPr lang="fr-FR" dirty="0" smtClean="0"/>
+              <a:rPr lang="fr-FR" dirty="false" smtClean="false"/>
               <a:t> mi. Suspendisse </a:t>
             </a:r>
             <a:r>
-              <a:rPr lang="fr-FR" dirty="0" err="1" smtClean="0"/>
+              <a:rPr lang="fr-FR" dirty="false" err="true" smtClean="false"/>
               <a:t>sagittis</a:t>
             </a:r>
             <a:r>
-              <a:rPr lang="fr-FR" dirty="0" smtClean="0"/>
+              <a:rPr lang="fr-FR" dirty="false" smtClean="false"/>
               <a:t>, </a:t>
             </a:r>
             <a:r>
-              <a:rPr lang="fr-FR" dirty="0" err="1" smtClean="0"/>
+              <a:rPr lang="fr-FR" dirty="false" err="true" smtClean="false"/>
               <a:t>quam</a:t>
             </a:r>
             <a:r>
-              <a:rPr lang="fr-FR" dirty="0" smtClean="0"/>
+              <a:rPr lang="fr-FR" dirty="false" smtClean="false"/>
               <a:t> id </a:t>
             </a:r>
             <a:r>
-              <a:rPr lang="fr-FR" dirty="0" err="1" smtClean="0"/>
+              <a:rPr lang="fr-FR" dirty="false" err="true" smtClean="false"/>
               <a:t>elementum</a:t>
             </a:r>
             <a:r>
-              <a:rPr lang="fr-FR" dirty="0" smtClean="0"/>
-              <a:t> </a:t>
-            </a:r>
-            <a:r>
-              <a:rPr lang="fr-FR" dirty="0" err="1" smtClean="0"/>
+              <a:rPr lang="fr-FR" dirty="false" smtClean="false"/>
+              <a:t> </a:t>
+            </a:r>
+            <a:r>
+              <a:rPr lang="fr-FR" dirty="false" err="true" smtClean="false"/>
               <a:t>feugiat</a:t>
             </a:r>
             <a:r>
-              <a:rPr lang="fr-FR" dirty="0" smtClean="0"/>
+              <a:rPr lang="fr-FR" dirty="false" smtClean="false"/>
               <a:t>, diam </a:t>
             </a:r>
             <a:r>
-              <a:rPr lang="fr-FR" dirty="0" err="1" smtClean="0"/>
+              <a:rPr lang="fr-FR" dirty="false" err="true" smtClean="false"/>
               <a:t>arcu</a:t>
             </a:r>
             <a:r>
-              <a:rPr lang="fr-FR" dirty="0" smtClean="0"/>
-              <a:t> </a:t>
-            </a:r>
-            <a:r>
-              <a:rPr lang="fr-FR" dirty="0" err="1" smtClean="0"/>
+              <a:rPr lang="fr-FR" dirty="false" smtClean="false"/>
+              <a:t> </a:t>
+            </a:r>
+            <a:r>
+              <a:rPr lang="fr-FR" dirty="false" err="true" smtClean="false"/>
               <a:t>fringilla</a:t>
             </a:r>
             <a:r>
-              <a:rPr lang="fr-FR" dirty="0" smtClean="0"/>
-              <a:t> </a:t>
-            </a:r>
-            <a:r>
-              <a:rPr lang="fr-FR" dirty="0" err="1" smtClean="0"/>
+              <a:rPr lang="fr-FR" dirty="false" smtClean="false"/>
+              <a:t> </a:t>
+            </a:r>
+            <a:r>
+              <a:rPr lang="fr-FR" dirty="false" err="true" smtClean="false"/>
               <a:t>dui</a:t>
             </a:r>
             <a:r>
-              <a:rPr lang="fr-FR" dirty="0" smtClean="0"/>
+              <a:rPr lang="fr-FR" dirty="false" smtClean="false"/>
               <a:t>, eu </a:t>
             </a:r>
             <a:r>
-              <a:rPr lang="fr-FR" dirty="0" err="1" smtClean="0"/>
+              <a:rPr lang="fr-FR" dirty="false" err="true" smtClean="false"/>
               <a:t>finibus</a:t>
             </a:r>
             <a:r>
-              <a:rPr lang="fr-FR" dirty="0" smtClean="0"/>
-              <a:t> </a:t>
-            </a:r>
-            <a:r>
-              <a:rPr lang="fr-FR" dirty="0" err="1" smtClean="0"/>
+              <a:rPr lang="fr-FR" dirty="false" smtClean="false"/>
+              <a:t> </a:t>
+            </a:r>
+            <a:r>
+              <a:rPr lang="fr-FR" dirty="false" err="true" smtClean="false"/>
               <a:t>dolor</a:t>
             </a:r>
             <a:r>
-              <a:rPr lang="fr-FR" dirty="0" smtClean="0"/>
-              <a:t> </a:t>
-            </a:r>
-            <a:r>
-              <a:rPr lang="fr-FR" dirty="0" err="1" smtClean="0"/>
+              <a:rPr lang="fr-FR" dirty="false" smtClean="false"/>
+              <a:t> </a:t>
+            </a:r>
+            <a:r>
+              <a:rPr lang="fr-FR" dirty="false" err="true" smtClean="false"/>
               <a:t>tellus</a:t>
             </a:r>
             <a:r>
-              <a:rPr lang="fr-FR" dirty="0" smtClean="0"/>
+              <a:rPr lang="fr-FR" dirty="false" smtClean="false"/>
               <a:t> in </a:t>
             </a:r>
             <a:r>
-              <a:rPr lang="fr-FR" dirty="0" err="1" smtClean="0"/>
+              <a:rPr lang="fr-FR" dirty="false" err="true" smtClean="false"/>
               <a:t>augue</a:t>
             </a:r>
             <a:r>
-              <a:rPr lang="fr-FR" dirty="0" smtClean="0"/>
+              <a:rPr lang="fr-FR" dirty="false" smtClean="false"/>
               <a:t>. Nam </a:t>
             </a:r>
             <a:r>
-              <a:rPr lang="fr-FR" dirty="0" err="1" smtClean="0"/>
+              <a:rPr lang="fr-FR" dirty="false" err="true" smtClean="false"/>
               <a:t>consectetur</a:t>
             </a:r>
             <a:r>
-              <a:rPr lang="fr-FR" dirty="0" smtClean="0"/>
-              <a:t> </a:t>
-            </a:r>
-            <a:r>
-              <a:rPr lang="fr-FR" dirty="0" err="1" smtClean="0"/>
+              <a:rPr lang="fr-FR" dirty="false" smtClean="false"/>
+              <a:t> </a:t>
+            </a:r>
+            <a:r>
+              <a:rPr lang="fr-FR" dirty="false" err="true" smtClean="false"/>
               <a:t>luctus</a:t>
             </a:r>
             <a:r>
-              <a:rPr lang="fr-FR" dirty="0" smtClean="0"/>
-              <a:t> </a:t>
-            </a:r>
-            <a:r>
-              <a:rPr lang="fr-FR" dirty="0" err="1" smtClean="0"/>
+              <a:rPr lang="fr-FR" dirty="false" smtClean="false"/>
+              <a:t> </a:t>
+            </a:r>
+            <a:r>
+              <a:rPr lang="fr-FR" dirty="false" err="true" smtClean="false"/>
               <a:t>lectus</a:t>
             </a:r>
             <a:r>
-              <a:rPr lang="fr-FR" dirty="0" smtClean="0"/>
-              <a:t> </a:t>
-            </a:r>
-            <a:r>
-              <a:rPr lang="fr-FR" dirty="0" err="1" smtClean="0"/>
+              <a:rPr lang="fr-FR" dirty="false" smtClean="false"/>
+              <a:t> </a:t>
+            </a:r>
+            <a:r>
+              <a:rPr lang="fr-FR" dirty="false" err="true" smtClean="false"/>
               <a:t>eget</a:t>
             </a:r>
             <a:r>
-              <a:rPr lang="fr-FR" dirty="0" smtClean="0"/>
-              <a:t> </a:t>
-            </a:r>
-            <a:r>
-              <a:rPr lang="fr-FR" dirty="0" err="1" smtClean="0"/>
+              <a:rPr lang="fr-FR" dirty="false" smtClean="false"/>
+              <a:t> </a:t>
+            </a:r>
+            <a:r>
+              <a:rPr lang="fr-FR" dirty="false" err="true" smtClean="false"/>
               <a:t>congue</a:t>
             </a:r>
             <a:r>
-              <a:rPr lang="fr-FR" dirty="0" smtClean="0"/>
+              <a:rPr lang="fr-FR" dirty="false" smtClean="false"/>
               <a:t>. Sed </a:t>
             </a:r>
             <a:r>
-              <a:rPr lang="fr-FR" dirty="0" err="1" smtClean="0"/>
+              <a:rPr lang="fr-FR" dirty="false" err="true" smtClean="false"/>
               <a:t>fringilla</a:t>
             </a:r>
             <a:r>
-              <a:rPr lang="fr-FR" dirty="0" smtClean="0"/>
+              <a:rPr lang="fr-FR" dirty="false" smtClean="false"/>
               <a:t> non ex </a:t>
             </a:r>
             <a:r>
-              <a:rPr lang="fr-FR" dirty="0" err="1" smtClean="0"/>
+              <a:rPr lang="fr-FR" dirty="false" err="true" smtClean="false"/>
               <a:t>sollicitudin</a:t>
             </a:r>
             <a:r>
-              <a:rPr lang="fr-FR" dirty="0" smtClean="0"/>
-              <a:t> </a:t>
-            </a:r>
-            <a:r>
-              <a:rPr lang="fr-FR" dirty="0" err="1" smtClean="0"/>
+              <a:rPr lang="fr-FR" dirty="false" smtClean="false"/>
+              <a:t> </a:t>
+            </a:r>
+            <a:r>
+              <a:rPr lang="fr-FR" dirty="false" err="true" smtClean="false"/>
               <a:t>ultricies</a:t>
             </a:r>
             <a:r>
-              <a:rPr lang="fr-FR" dirty="0" smtClean="0"/>
+              <a:rPr lang="fr-FR" dirty="false" smtClean="false"/>
               <a:t>. </a:t>
             </a:r>
             <a:r>
-              <a:rPr lang="fr-FR" dirty="0" err="1" smtClean="0"/>
+              <a:rPr lang="fr-FR" dirty="false" err="true" smtClean="false"/>
               <a:t>Integer</a:t>
             </a:r>
             <a:r>
-              <a:rPr lang="fr-FR" dirty="0" smtClean="0"/>
-              <a:t> </a:t>
-            </a:r>
-            <a:r>
-              <a:rPr lang="fr-FR" dirty="0" err="1" smtClean="0"/>
+              <a:rPr lang="fr-FR" dirty="false" smtClean="false"/>
+              <a:t> </a:t>
+            </a:r>
+            <a:r>
+              <a:rPr lang="fr-FR" dirty="false" err="true" smtClean="false"/>
               <a:t>ligula</a:t>
             </a:r>
             <a:r>
-              <a:rPr lang="fr-FR" dirty="0" smtClean="0"/>
-              <a:t> </a:t>
-            </a:r>
-            <a:r>
-              <a:rPr lang="fr-FR" dirty="0" err="1" smtClean="0"/>
+              <a:rPr lang="fr-FR" dirty="false" smtClean="false"/>
+              <a:t> </a:t>
+            </a:r>
+            <a:r>
+              <a:rPr lang="fr-FR" dirty="false" err="true" smtClean="false"/>
               <a:t>quam</a:t>
             </a:r>
             <a:r>
-              <a:rPr lang="fr-FR" dirty="0" smtClean="0"/>
+              <a:rPr lang="fr-FR" dirty="false" smtClean="false"/>
               <a:t>, </a:t>
             </a:r>
             <a:r>
-              <a:rPr lang="fr-FR" dirty="0" err="1" smtClean="0"/>
+              <a:rPr lang="fr-FR" dirty="false" err="true" smtClean="false"/>
               <a:t>sodales</a:t>
             </a:r>
             <a:r>
-              <a:rPr lang="fr-FR" dirty="0" smtClean="0"/>
+              <a:rPr lang="fr-FR" dirty="false" smtClean="false"/>
               <a:t> nec </a:t>
             </a:r>
             <a:r>
-              <a:rPr lang="fr-FR" dirty="0" err="1" smtClean="0"/>
+              <a:rPr lang="fr-FR" dirty="false" err="true" smtClean="false"/>
               <a:t>nulla</a:t>
             </a:r>
             <a:r>
-              <a:rPr lang="fr-FR" dirty="0" smtClean="0"/>
+              <a:rPr lang="fr-FR" dirty="false" smtClean="false"/>
               <a:t> at, </a:t>
             </a:r>
             <a:r>
-              <a:rPr lang="fr-FR" dirty="0" err="1" smtClean="0"/>
+              <a:rPr lang="fr-FR" dirty="false" err="true" smtClean="false"/>
               <a:t>rutrum</a:t>
             </a:r>
             <a:r>
-              <a:rPr lang="fr-FR" dirty="0" smtClean="0"/>
-              <a:t> </a:t>
-            </a:r>
-            <a:r>
-              <a:rPr lang="fr-FR" dirty="0" err="1" smtClean="0"/>
+              <a:rPr lang="fr-FR" dirty="false" smtClean="false"/>
+              <a:t> </a:t>
+            </a:r>
+            <a:r>
+              <a:rPr lang="fr-FR" dirty="false" err="true" smtClean="false"/>
               <a:t>suscipit</a:t>
             </a:r>
             <a:r>
-              <a:rPr lang="fr-FR" dirty="0" smtClean="0"/>
-              <a:t> </a:t>
-            </a:r>
-            <a:r>
-              <a:rPr lang="fr-FR" dirty="0" err="1" smtClean="0"/>
+              <a:rPr lang="fr-FR" dirty="false" smtClean="false"/>
+              <a:t> </a:t>
+            </a:r>
+            <a:r>
+              <a:rPr lang="fr-FR" dirty="false" err="true" smtClean="false"/>
               <a:t>nisl</a:t>
             </a:r>
             <a:r>
-              <a:rPr lang="fr-FR" dirty="0" smtClean="0"/>
+              <a:rPr lang="fr-FR" dirty="false" smtClean="false"/>
               <a:t>. </a:t>
             </a:r>
             <a:r>
-              <a:rPr lang="fr-FR" dirty="0" err="1" smtClean="0"/>
+              <a:rPr lang="fr-FR" dirty="false" err="true" smtClean="false"/>
               <a:t>Cras</a:t>
             </a:r>
             <a:r>
-              <a:rPr lang="fr-FR" dirty="0" smtClean="0"/>
-              <a:t> </a:t>
-            </a:r>
-            <a:r>
-              <a:rPr lang="fr-FR" dirty="0" err="1" smtClean="0"/>
+              <a:rPr lang="fr-FR" dirty="false" smtClean="false"/>
+              <a:t> </a:t>
+            </a:r>
+            <a:r>
+              <a:rPr lang="fr-FR" dirty="false" err="true" smtClean="false"/>
               <a:t>ullamcorper</a:t>
             </a:r>
             <a:r>
-              <a:rPr lang="fr-FR" dirty="0" smtClean="0"/>
+              <a:rPr lang="fr-FR" dirty="false" smtClean="false"/>
               <a:t> magna </a:t>
             </a:r>
             <a:r>
-              <a:rPr lang="fr-FR" dirty="0" err="1" smtClean="0"/>
+              <a:rPr lang="fr-FR" dirty="false" err="true" smtClean="false"/>
               <a:t>eros</a:t>
             </a:r>
             <a:r>
-              <a:rPr lang="fr-FR" dirty="0" smtClean="0"/>
+              <a:rPr lang="fr-FR" dirty="false" smtClean="false"/>
               <a:t>, </a:t>
             </a:r>
             <a:r>
-              <a:rPr lang="fr-FR" dirty="0" err="1" smtClean="0"/>
+              <a:rPr lang="fr-FR" dirty="false" err="true" smtClean="false"/>
               <a:t>eget</a:t>
             </a:r>
             <a:r>
-              <a:rPr lang="fr-FR" dirty="0" smtClean="0"/>
-              <a:t> </a:t>
-            </a:r>
-            <a:r>
-              <a:rPr lang="fr-FR" dirty="0" err="1" smtClean="0"/>
+              <a:rPr lang="fr-FR" dirty="false" smtClean="false"/>
+              <a:t> </a:t>
+            </a:r>
+            <a:r>
+              <a:rPr lang="fr-FR" dirty="false" err="true" smtClean="false"/>
               <a:t>aliquet</a:t>
             </a:r>
             <a:r>
-              <a:rPr lang="fr-FR" dirty="0" smtClean="0"/>
-              <a:t> </a:t>
-            </a:r>
-            <a:r>
-              <a:rPr lang="fr-FR" dirty="0" err="1" smtClean="0"/>
+              <a:rPr lang="fr-FR" dirty="false" smtClean="false"/>
+              <a:t> </a:t>
+            </a:r>
+            <a:r>
+              <a:rPr lang="fr-FR" dirty="false" err="true" smtClean="false"/>
               <a:t>odio</a:t>
             </a:r>
             <a:r>
-              <a:rPr lang="fr-FR" dirty="0" smtClean="0"/>
-              <a:t> </a:t>
-            </a:r>
-            <a:r>
-              <a:rPr lang="fr-FR" dirty="0" err="1" smtClean="0"/>
+              <a:rPr lang="fr-FR" dirty="false" smtClean="false"/>
+              <a:t> </a:t>
+            </a:r>
+            <a:r>
+              <a:rPr lang="fr-FR" dirty="false" err="true" smtClean="false"/>
               <a:t>consequat</a:t>
             </a:r>
             <a:r>
-              <a:rPr lang="fr-FR" dirty="0" smtClean="0"/>
-              <a:t> </a:t>
-            </a:r>
-            <a:r>
-              <a:rPr lang="fr-FR" dirty="0" err="1" smtClean="0"/>
+              <a:rPr lang="fr-FR" dirty="false" smtClean="false"/>
+              <a:t> </a:t>
+            </a:r>
+            <a:r>
+              <a:rPr lang="fr-FR" dirty="false" err="true" smtClean="false"/>
               <a:t>rhoncus</a:t>
             </a:r>
             <a:r>
-              <a:rPr lang="fr-FR" dirty="0" smtClean="0"/>
+              <a:rPr lang="fr-FR" dirty="false" smtClean="false"/>
               <a:t>. </a:t>
             </a:r>
             <a:r>
-              <a:rPr lang="fr-FR" dirty="0" err="1" smtClean="0"/>
+              <a:rPr lang="fr-FR" dirty="false" err="true" smtClean="false"/>
               <a:t>Proin</a:t>
             </a:r>
             <a:r>
-              <a:rPr lang="fr-FR" dirty="0" smtClean="0"/>
+              <a:rPr lang="fr-FR" dirty="false" smtClean="false"/>
               <a:t> at </a:t>
             </a:r>
             <a:r>
-              <a:rPr lang="fr-FR" dirty="0" err="1" smtClean="0"/>
+              <a:rPr lang="fr-FR" dirty="false" err="true" smtClean="false"/>
               <a:t>nisl</a:t>
             </a:r>
             <a:r>
-              <a:rPr lang="fr-FR" dirty="0" smtClean="0"/>
+              <a:rPr lang="fr-FR" dirty="false" smtClean="false"/>
               <a:t> mollis, </a:t>
             </a:r>
             <a:r>
-              <a:rPr lang="fr-FR" dirty="0" err="1" smtClean="0"/>
+              <a:rPr lang="fr-FR" dirty="false" err="true" smtClean="false"/>
               <a:t>congue</a:t>
             </a:r>
             <a:r>
-              <a:rPr lang="fr-FR" dirty="0" smtClean="0"/>
-              <a:t> </a:t>
-            </a:r>
-            <a:r>
-              <a:rPr lang="fr-FR" dirty="0" err="1" smtClean="0"/>
+              <a:rPr lang="fr-FR" dirty="false" smtClean="false"/>
+              <a:t> </a:t>
+            </a:r>
+            <a:r>
+              <a:rPr lang="fr-FR" dirty="false" err="true" smtClean="false"/>
               <a:t>quam</a:t>
             </a:r>
             <a:r>
-              <a:rPr lang="fr-FR" dirty="0" smtClean="0"/>
+              <a:rPr lang="fr-FR" dirty="false" smtClean="false"/>
               <a:t> id, </a:t>
             </a:r>
             <a:r>
-              <a:rPr lang="fr-FR" dirty="0" err="1" smtClean="0"/>
+              <a:rPr lang="fr-FR" dirty="false" err="true" smtClean="false"/>
               <a:t>malesuada</a:t>
             </a:r>
             <a:r>
-              <a:rPr lang="fr-FR" dirty="0" smtClean="0"/>
-              <a:t> </a:t>
-            </a:r>
-            <a:r>
-              <a:rPr lang="fr-FR" dirty="0" err="1" smtClean="0"/>
+              <a:rPr lang="fr-FR" dirty="false" smtClean="false"/>
+              <a:t> </a:t>
+            </a:r>
+            <a:r>
+              <a:rPr lang="fr-FR" dirty="false" err="true" smtClean="false"/>
               <a:t>felis</a:t>
             </a:r>
             <a:r>
-              <a:rPr lang="fr-FR" dirty="0" smtClean="0"/>
+              <a:rPr lang="fr-FR" dirty="false" smtClean="false"/>
               <a:t>. Suspendisse </a:t>
             </a:r>
             <a:r>
-              <a:rPr lang="fr-FR" dirty="0" err="1" smtClean="0"/>
+              <a:rPr lang="fr-FR" dirty="false" err="true" smtClean="false"/>
               <a:t>rutrum</a:t>
             </a:r>
             <a:r>
-              <a:rPr lang="fr-FR" dirty="0" smtClean="0"/>
-              <a:t> </a:t>
-            </a:r>
-            <a:r>
-              <a:rPr lang="fr-FR" dirty="0" err="1" smtClean="0"/>
+              <a:rPr lang="fr-FR" dirty="false" smtClean="false"/>
+              <a:t> </a:t>
+            </a:r>
+            <a:r>
+              <a:rPr lang="fr-FR" dirty="false" err="true" smtClean="false"/>
               <a:t>finibus</a:t>
             </a:r>
             <a:r>
-              <a:rPr lang="fr-FR" dirty="0" smtClean="0"/>
-              <a:t> </a:t>
-            </a:r>
-            <a:r>
-              <a:rPr lang="fr-FR" dirty="0" err="1" smtClean="0"/>
+              <a:rPr lang="fr-FR" dirty="false" smtClean="false"/>
+              <a:t> </a:t>
+            </a:r>
+            <a:r>
+              <a:rPr lang="fr-FR" dirty="false" err="true" smtClean="false"/>
               <a:t>velit</a:t>
             </a:r>
             <a:r>
-              <a:rPr lang="fr-FR" dirty="0" smtClean="0"/>
+              <a:rPr lang="fr-FR" dirty="false" smtClean="false"/>
               <a:t>, </a:t>
             </a:r>
             <a:r>
-              <a:rPr lang="fr-FR" dirty="0" err="1" smtClean="0"/>
+              <a:rPr lang="fr-FR" dirty="false" err="true" smtClean="false"/>
               <a:t>quis</a:t>
             </a:r>
             <a:r>
-              <a:rPr lang="fr-FR" dirty="0" smtClean="0"/>
-              <a:t> </a:t>
-            </a:r>
-            <a:r>
-              <a:rPr lang="fr-FR" dirty="0" err="1" smtClean="0"/>
+              <a:rPr lang="fr-FR" dirty="false" smtClean="false"/>
+              <a:t> </a:t>
+            </a:r>
+            <a:r>
+              <a:rPr lang="fr-FR" dirty="false" err="true" smtClean="false"/>
               <a:t>aliquet</a:t>
             </a:r>
             <a:r>
-              <a:rPr lang="fr-FR" dirty="0" smtClean="0"/>
-              <a:t> </a:t>
-            </a:r>
-            <a:r>
-              <a:rPr lang="fr-FR" dirty="0" err="1" smtClean="0"/>
+              <a:rPr lang="fr-FR" dirty="false" smtClean="false"/>
+              <a:t> </a:t>
+            </a:r>
+            <a:r>
+              <a:rPr lang="fr-FR" dirty="false" err="true" smtClean="false"/>
               <a:t>augue</a:t>
             </a:r>
             <a:r>
-              <a:rPr lang="fr-FR" dirty="0" smtClean="0"/>
-              <a:t> </a:t>
-            </a:r>
-            <a:r>
-              <a:rPr lang="fr-FR" dirty="0" err="1" smtClean="0"/>
+              <a:rPr lang="fr-FR" dirty="false" smtClean="false"/>
+              <a:t> </a:t>
+            </a:r>
+            <a:r>
+              <a:rPr lang="fr-FR" dirty="false" err="true" smtClean="false"/>
               <a:t>rhoncus</a:t>
             </a:r>
             <a:r>
-              <a:rPr lang="fr-FR" dirty="0" smtClean="0"/>
+              <a:rPr lang="fr-FR" dirty="false" smtClean="false"/>
               <a:t> ut</a:t>
             </a:r>
-            <a:endParaRPr lang="fr-FR" dirty="0"/>
+            <a:endParaRPr lang="fr-FR" dirty="false"/>
           </a:p>
         </p:txBody>
       </p:sp>

</xml_diff>

<commit_message>
FIX : Exist properly if source file is missing FIX : Run even if the number of slides between source and target is different
</commit_message>
<xml_diff>
--- a/sample-docs/pptx-copy.pptx
+++ b/sample-docs/pptx-copy.pptx
@@ -5,11 +5,12 @@
     <p:sldMasterId id="2147483648" r:id="rId1"/>
   </p:sldMasterIdLst>
   <p:notesMasterIdLst>
-    <p:notesMasterId r:id="rId4"/>
+    <p:notesMasterId r:id="rId5"/>
   </p:notesMasterIdLst>
   <p:sldIdLst>
     <p:sldId id="256" r:id="rId2"/>
     <p:sldId id="257" r:id="rId3"/>
+    <p:sldId id="258" r:id="rId4"/>
   </p:sldIdLst>
   <p:sldSz cx="12192000" cy="6858000"/>
   <p:notesSz cx="6858000" cy="9144000"/>
@@ -108,6 +109,11 @@
       </a:defRPr>
     </a:lvl9pPr>
   </p:defaultTextStyle>
+  <p:extLst>
+    <p:ext uri="{EFAFB233-063F-42B5-8137-9DF3F51BA10A}">
+      <p15:sldGuideLst xmlns:p15="http://schemas.microsoft.com/office/powerpoint/2012/main"/>
+    </p:ext>
+  </p:extLst>
 </p:presentation>
 </file>
 
@@ -193,7 +199,7 @@
           <a:p>
             <a:fld id="{B951EE5B-9127-4DDF-9595-419D96CE1F49}" type="datetimeFigureOut">
               <a:rPr lang="fr-FR" smtClean="0"/>
-              <a:t>14/02/2017</a:t>
+              <a:t>16/08/2017</a:t>
             </a:fld>
             <a:endParaRPr lang="fr-FR"/>
           </a:p>
@@ -462,7 +468,7 @@
 </file>
 
 <file path=ppt/notesSlides/notesSlide1.xml><?xml version="1.0" encoding="utf-8"?>
-<p:notes xmlns:p="http://schemas.openxmlformats.org/presentationml/2006/main" xmlns:r="http://schemas.openxmlformats.org/officeDocument/2006/relationships" xmlns:a="http://schemas.openxmlformats.org/drawingml/2006/main" xmlns:mc="http://schemas.openxmlformats.org/markup-compatibility/2006" xmlns:c="http://schemas.openxmlformats.org/drawingml/2006/chart" xmlns:ns6="http://schemas.openxmlformats.org/drawingml/2006/chartDrawing" xmlns:dgm="http://schemas.openxmlformats.org/drawingml/2006/diagram" xmlns:pic="http://schemas.openxmlformats.org/drawingml/2006/picture" xmlns:wp="http://schemas.openxmlformats.org/drawingml/2006/wordprocessingDrawing" xmlns:wp14="http://schemas.microsoft.com/office/word/2010/wordprocessingDrawing" xmlns:xdr="http://schemas.openxmlformats.org/drawingml/2006/spreadsheetDrawing" xmlns:ns12="http://schemas.openxmlformats.org/drawingml/2006/compatibility" xmlns:ns13="http://schemas.openxmlformats.org/drawingml/2006/lockedCanvas">
+<p:notes xmlns:a="http://schemas.openxmlformats.org/drawingml/2006/main" xmlns:r="http://schemas.openxmlformats.org/officeDocument/2006/relationships" xmlns:p="http://schemas.openxmlformats.org/presentationml/2006/main">
   <p:cSld>
     <p:spTree>
       <p:nvGrpSpPr>
@@ -482,7 +488,7 @@
         <p:nvSpPr>
           <p:cNvPr id="2" name="Espace réservé de l'image des diapositives 1"/>
           <p:cNvSpPr>
-            <a:spLocks noGrp="true" noRot="true" noChangeAspect="true"/>
+            <a:spLocks noGrp="1" noRot="1" noChangeAspect="1"/>
           </p:cNvSpPr>
           <p:nvPr>
             <p:ph type="sldImg"/>
@@ -494,7 +500,7 @@
         <p:nvSpPr>
           <p:cNvPr id="3" name="Espace réservé des commentaires 2"/>
           <p:cNvSpPr>
-            <a:spLocks noGrp="true"/>
+            <a:spLocks noGrp="1"/>
           </p:cNvSpPr>
           <p:nvPr>
             <p:ph type="body" idx="1"/>
@@ -520,9 +526,7 @@
             </a:r>
           </a:p>
           <a:p>
-            <a:r>
-              <a:t/>
-            </a:r>
+            <a:endParaRPr/>
           </a:p>
           <a:p>
             <a:r>
@@ -545,14 +549,10 @@
             </a:r>
           </a:p>
           <a:p>
-            <a:r>
-              <a:t/>
-            </a:r>
-          </a:p>
-          <a:p>
-            <a:r>
-              <a:t/>
-            </a:r>
+            <a:endParaRPr/>
+          </a:p>
+          <a:p>
+            <a:endParaRPr/>
           </a:p>
         </p:txBody>
       </p:sp>
@@ -560,7 +560,7 @@
         <p:nvSpPr>
           <p:cNvPr id="4" name="Espace réservé du numéro de diapositive 3"/>
           <p:cNvSpPr>
-            <a:spLocks noGrp="true"/>
+            <a:spLocks noGrp="1"/>
           </p:cNvSpPr>
           <p:nvPr>
             <p:ph type="sldNum" sz="quarter" idx="10"/>
@@ -589,9 +589,6 @@
             <a:endParaRPr lang="fr-FR"/>
           </a:p>
           <a:p>
-            <a:r>
-              <a:t/>
-            </a:r>
             <a:endParaRPr lang="fr-FR"/>
           </a:p>
           <a:p>
@@ -619,15 +616,9 @@
             <a:endParaRPr lang="fr-FR"/>
           </a:p>
           <a:p>
-            <a:r>
-              <a:t/>
-            </a:r>
-            <a:endParaRPr lang="fr-FR"/>
-          </a:p>
-          <a:p>
-            <a:r>
-              <a:t/>
-            </a:r>
+            <a:endParaRPr lang="fr-FR"/>
+          </a:p>
+          <a:p>
             <a:endParaRPr lang="fr-FR"/>
           </a:p>
         </p:txBody>
@@ -646,7 +637,7 @@
 </file>
 
 <file path=ppt/notesSlides/notesSlide2.xml><?xml version="1.0" encoding="utf-8"?>
-<p:notes xmlns:p="http://schemas.openxmlformats.org/presentationml/2006/main" xmlns:r="http://schemas.openxmlformats.org/officeDocument/2006/relationships" xmlns:a="http://schemas.openxmlformats.org/drawingml/2006/main" xmlns:mc="http://schemas.openxmlformats.org/markup-compatibility/2006" xmlns:c="http://schemas.openxmlformats.org/drawingml/2006/chart" xmlns:ns6="http://schemas.openxmlformats.org/drawingml/2006/chartDrawing" xmlns:dgm="http://schemas.openxmlformats.org/drawingml/2006/diagram" xmlns:pic="http://schemas.openxmlformats.org/drawingml/2006/picture" xmlns:wp="http://schemas.openxmlformats.org/drawingml/2006/wordprocessingDrawing" xmlns:wp14="http://schemas.microsoft.com/office/word/2010/wordprocessingDrawing" xmlns:xdr="http://schemas.openxmlformats.org/drawingml/2006/spreadsheetDrawing" xmlns:ns12="http://schemas.openxmlformats.org/drawingml/2006/compatibility" xmlns:ns13="http://schemas.openxmlformats.org/drawingml/2006/lockedCanvas">
+<p:notes xmlns:a="http://schemas.openxmlformats.org/drawingml/2006/main" xmlns:r="http://schemas.openxmlformats.org/officeDocument/2006/relationships" xmlns:p="http://schemas.openxmlformats.org/presentationml/2006/main">
   <p:cSld>
     <p:spTree>
       <p:nvGrpSpPr>
@@ -666,7 +657,7 @@
         <p:nvSpPr>
           <p:cNvPr id="2" name="Espace réservé de l'image des diapositives 1"/>
           <p:cNvSpPr>
-            <a:spLocks noGrp="true" noRot="true" noChangeAspect="true"/>
+            <a:spLocks noGrp="1" noRot="1" noChangeAspect="1"/>
           </p:cNvSpPr>
           <p:nvPr>
             <p:ph type="sldImg"/>
@@ -678,7 +669,7 @@
         <p:nvSpPr>
           <p:cNvPr id="3" name="Espace réservé des commentaires 2"/>
           <p:cNvSpPr>
-            <a:spLocks noGrp="true"/>
+            <a:spLocks noGrp="1"/>
           </p:cNvSpPr>
           <p:nvPr>
             <p:ph type="body" idx="1"/>
@@ -704,9 +695,7 @@
             </a:r>
           </a:p>
           <a:p>
-            <a:r>
-              <a:t/>
-            </a:r>
+            <a:endParaRPr/>
           </a:p>
           <a:p>
             <a:r>
@@ -729,14 +718,10 @@
             </a:r>
           </a:p>
           <a:p>
-            <a:r>
-              <a:t/>
-            </a:r>
-          </a:p>
-          <a:p>
-            <a:r>
-              <a:t/>
-            </a:r>
+            <a:endParaRPr/>
+          </a:p>
+          <a:p>
+            <a:endParaRPr/>
           </a:p>
         </p:txBody>
       </p:sp>
@@ -744,7 +729,7 @@
         <p:nvSpPr>
           <p:cNvPr id="4" name="Espace réservé du numéro de diapositive 3"/>
           <p:cNvSpPr>
-            <a:spLocks noGrp="true"/>
+            <a:spLocks noGrp="1"/>
           </p:cNvSpPr>
           <p:nvPr>
             <p:ph type="sldNum" sz="quarter" idx="10"/>
@@ -773,9 +758,6 @@
             <a:endParaRPr lang="fr-FR"/>
           </a:p>
           <a:p>
-            <a:r>
-              <a:t/>
-            </a:r>
             <a:endParaRPr lang="fr-FR"/>
           </a:p>
           <a:p>
@@ -803,15 +785,9 @@
             <a:endParaRPr lang="fr-FR"/>
           </a:p>
           <a:p>
-            <a:r>
-              <a:t/>
-            </a:r>
-            <a:endParaRPr lang="fr-FR"/>
-          </a:p>
-          <a:p>
-            <a:r>
-              <a:t/>
-            </a:r>
+            <a:endParaRPr lang="fr-FR"/>
+          </a:p>
+          <a:p>
             <a:endParaRPr lang="fr-FR"/>
           </a:p>
         </p:txBody>
@@ -830,7 +806,7 @@
 </file>
 
 <file path=ppt/slideLayouts/slideLayout1.xml><?xml version="1.0" encoding="utf-8"?>
-<p:sldLayout xmlns:v="urn:schemas-microsoft-com:vml" xmlns:a="http://schemas.openxmlformats.org/drawingml/2006/main" xmlns:c="http://schemas.openxmlformats.org/drawingml/2006/chart" xmlns:xdr="http://schemas.openxmlformats.org/drawingml/2006/spreadsheetDrawing" xmlns:dgm="http://schemas.openxmlformats.org/drawingml/2006/diagram" xmlns:pic="http://schemas.openxmlformats.org/drawingml/2006/picture" xmlns:wp14="http://schemas.microsoft.com/office/word/2010/wordprocessingDrawing" xmlns:p="http://schemas.openxmlformats.org/presentationml/2006/main" xmlns:ns6="http://schemas.openxmlformats.org/drawingml/2006/chartDrawing" xmlns:r="http://schemas.openxmlformats.org/officeDocument/2006/relationships" xmlns:ns13="http://schemas.openxmlformats.org/drawingml/2006/lockedCanvas" xmlns:ns12="http://schemas.openxmlformats.org/drawingml/2006/compatibility" xmlns:mc="http://schemas.openxmlformats.org/markup-compatibility/2006" xmlns:wp="http://schemas.openxmlformats.org/drawingml/2006/wordprocessingDrawing" type="title" preserve="true">
+<p:sldLayout xmlns:a="http://schemas.openxmlformats.org/drawingml/2006/main" xmlns:r="http://schemas.openxmlformats.org/officeDocument/2006/relationships" xmlns:p="http://schemas.openxmlformats.org/presentationml/2006/main" type="title" preserve="1">
   <p:cSld name="Diapositive de titre">
     <p:spTree>
       <p:nvGrpSpPr>
@@ -850,7 +826,7 @@
         <p:nvSpPr>
           <p:cNvPr id="2" name="Titre 1"/>
           <p:cNvSpPr>
-            <a:spLocks noGrp="true"/>
+            <a:spLocks noGrp="1"/>
           </p:cNvSpPr>
           <p:nvPr>
             <p:ph type="ctrTitle"/>
@@ -871,7 +847,7 @@
           </a:lstStyle>
           <a:p>
             <a:r>
-              <a:rPr lang="fr-FR" smtClean="false"/>
+              <a:rPr lang="fr-FR" smtClean="0"/>
               <a:t>Modifiez le style du titre</a:t>
             </a:r>
             <a:endParaRPr lang="fr-FR"/>
@@ -882,7 +858,7 @@
         <p:nvSpPr>
           <p:cNvPr id="3" name="Sous-titre 2"/>
           <p:cNvSpPr>
-            <a:spLocks noGrp="true"/>
+            <a:spLocks noGrp="1"/>
           </p:cNvSpPr>
           <p:nvPr>
             <p:ph type="subTitle" idx="1"/>
@@ -936,7 +912,7 @@
           </a:lstStyle>
           <a:p>
             <a:r>
-              <a:rPr lang="fr-FR" smtClean="false"/>
+              <a:rPr lang="fr-FR" smtClean="0"/>
               <a:t>Modifiez le style des sous-titres du masque</a:t>
             </a:r>
             <a:endParaRPr lang="fr-FR"/>
@@ -947,7 +923,7 @@
         <p:nvSpPr>
           <p:cNvPr id="4" name="Espace réservé de la date 3"/>
           <p:cNvSpPr>
-            <a:spLocks noGrp="true"/>
+            <a:spLocks noGrp="1"/>
           </p:cNvSpPr>
           <p:nvPr>
             <p:ph type="dt" sz="half" idx="10"/>
@@ -959,8 +935,8 @@
           <a:lstStyle/>
           <a:p>
             <a:fld id="{E7E4853E-ECDD-443A-840C-1FE284273B35}" type="datetimeFigureOut">
-              <a:rPr lang="fr-FR" smtClean="false"/>
-              <a:t>14/02/2017</a:t>
+              <a:rPr lang="fr-FR" smtClean="0"/>
+              <a:t>16/08/2017</a:t>
             </a:fld>
             <a:endParaRPr lang="fr-FR"/>
           </a:p>
@@ -970,7 +946,7 @@
         <p:nvSpPr>
           <p:cNvPr id="5" name="Espace réservé du pied de page 4"/>
           <p:cNvSpPr>
-            <a:spLocks noGrp="true"/>
+            <a:spLocks noGrp="1"/>
           </p:cNvSpPr>
           <p:nvPr>
             <p:ph type="ftr" sz="quarter" idx="11"/>
@@ -989,7 +965,7 @@
         <p:nvSpPr>
           <p:cNvPr id="6" name="Espace réservé du numéro de diapositive 5"/>
           <p:cNvSpPr>
-            <a:spLocks noGrp="true"/>
+            <a:spLocks noGrp="1"/>
           </p:cNvSpPr>
           <p:nvPr>
             <p:ph type="sldNum" sz="quarter" idx="12"/>
@@ -1001,7 +977,7 @@
           <a:lstStyle/>
           <a:p>
             <a:fld id="{E3811F5C-F6AB-470B-8321-08F27CD4598A}" type="slidenum">
-              <a:rPr lang="fr-FR" smtClean="false"/>
+              <a:rPr lang="fr-FR" smtClean="0"/>
               <a:t>‹N°›</a:t>
             </a:fld>
             <a:endParaRPr lang="fr-FR"/>
@@ -1130,7 +1106,7 @@
           <a:p>
             <a:fld id="{E7E4853E-ECDD-443A-840C-1FE284273B35}" type="datetimeFigureOut">
               <a:rPr lang="fr-FR" smtClean="0"/>
-              <a:t>14/02/2017</a:t>
+              <a:t>16/08/2017</a:t>
             </a:fld>
             <a:endParaRPr lang="fr-FR"/>
           </a:p>
@@ -1310,7 +1286,7 @@
           <a:p>
             <a:fld id="{E7E4853E-ECDD-443A-840C-1FE284273B35}" type="datetimeFigureOut">
               <a:rPr lang="fr-FR" smtClean="0"/>
-              <a:t>14/02/2017</a:t>
+              <a:t>16/08/2017</a:t>
             </a:fld>
             <a:endParaRPr lang="fr-FR"/>
           </a:p>
@@ -1372,7 +1348,7 @@
 </file>
 
 <file path=ppt/slideLayouts/slideLayout2.xml><?xml version="1.0" encoding="utf-8"?>
-<p:sldLayout xmlns:v="urn:schemas-microsoft-com:vml" xmlns:a="http://schemas.openxmlformats.org/drawingml/2006/main" xmlns:c="http://schemas.openxmlformats.org/drawingml/2006/chart" xmlns:xdr="http://schemas.openxmlformats.org/drawingml/2006/spreadsheetDrawing" xmlns:dgm="http://schemas.openxmlformats.org/drawingml/2006/diagram" xmlns:pic="http://schemas.openxmlformats.org/drawingml/2006/picture" xmlns:wp14="http://schemas.microsoft.com/office/word/2010/wordprocessingDrawing" xmlns:p="http://schemas.openxmlformats.org/presentationml/2006/main" xmlns:ns6="http://schemas.openxmlformats.org/drawingml/2006/chartDrawing" xmlns:r="http://schemas.openxmlformats.org/officeDocument/2006/relationships" xmlns:ns13="http://schemas.openxmlformats.org/drawingml/2006/lockedCanvas" xmlns:ns12="http://schemas.openxmlformats.org/drawingml/2006/compatibility" xmlns:mc="http://schemas.openxmlformats.org/markup-compatibility/2006" xmlns:wp="http://schemas.openxmlformats.org/drawingml/2006/wordprocessingDrawing" type="obj" preserve="true">
+<p:sldLayout xmlns:a="http://schemas.openxmlformats.org/drawingml/2006/main" xmlns:r="http://schemas.openxmlformats.org/officeDocument/2006/relationships" xmlns:p="http://schemas.openxmlformats.org/presentationml/2006/main" type="obj" preserve="1">
   <p:cSld name="Titre et contenu">
     <p:spTree>
       <p:nvGrpSpPr>
@@ -1392,7 +1368,7 @@
         <p:nvSpPr>
           <p:cNvPr id="2" name="Titre 1"/>
           <p:cNvSpPr>
-            <a:spLocks noGrp="true"/>
+            <a:spLocks noGrp="1"/>
           </p:cNvSpPr>
           <p:nvPr>
             <p:ph type="title"/>
@@ -1404,7 +1380,7 @@
           <a:lstStyle/>
           <a:p>
             <a:r>
-              <a:rPr lang="fr-FR" smtClean="false"/>
+              <a:rPr lang="fr-FR" smtClean="0"/>
               <a:t>Modifiez le style du titre</a:t>
             </a:r>
             <a:endParaRPr lang="fr-FR"/>
@@ -1415,7 +1391,7 @@
         <p:nvSpPr>
           <p:cNvPr id="3" name="Espace réservé du contenu 2"/>
           <p:cNvSpPr>
-            <a:spLocks noGrp="true"/>
+            <a:spLocks noGrp="1"/>
           </p:cNvSpPr>
           <p:nvPr>
             <p:ph idx="1"/>
@@ -1428,35 +1404,35 @@
           <a:p>
             <a:pPr lvl="0"/>
             <a:r>
-              <a:rPr lang="fr-FR" smtClean="false"/>
+              <a:rPr lang="fr-FR" smtClean="0"/>
               <a:t>Modifiez les styles du texte du masque</a:t>
             </a:r>
           </a:p>
           <a:p>
             <a:pPr lvl="1"/>
             <a:r>
-              <a:rPr lang="fr-FR" smtClean="false"/>
+              <a:rPr lang="fr-FR" smtClean="0"/>
               <a:t>Deuxième niveau</a:t>
             </a:r>
           </a:p>
           <a:p>
             <a:pPr lvl="2"/>
             <a:r>
-              <a:rPr lang="fr-FR" smtClean="false"/>
+              <a:rPr lang="fr-FR" smtClean="0"/>
               <a:t>Troisième niveau</a:t>
             </a:r>
           </a:p>
           <a:p>
             <a:pPr lvl="3"/>
             <a:r>
-              <a:rPr lang="fr-FR" smtClean="false"/>
+              <a:rPr lang="fr-FR" smtClean="0"/>
               <a:t>Quatrième niveau</a:t>
             </a:r>
           </a:p>
           <a:p>
             <a:pPr lvl="4"/>
             <a:r>
-              <a:rPr lang="fr-FR" smtClean="false"/>
+              <a:rPr lang="fr-FR" smtClean="0"/>
               <a:t>Cinquième niveau</a:t>
             </a:r>
             <a:endParaRPr lang="fr-FR"/>
@@ -1467,7 +1443,7 @@
         <p:nvSpPr>
           <p:cNvPr id="4" name="Espace réservé de la date 3"/>
           <p:cNvSpPr>
-            <a:spLocks noGrp="true"/>
+            <a:spLocks noGrp="1"/>
           </p:cNvSpPr>
           <p:nvPr>
             <p:ph type="dt" sz="half" idx="10"/>
@@ -1479,8 +1455,8 @@
           <a:lstStyle/>
           <a:p>
             <a:fld id="{E7E4853E-ECDD-443A-840C-1FE284273B35}" type="datetimeFigureOut">
-              <a:rPr lang="fr-FR" smtClean="false"/>
-              <a:t>14/02/2017</a:t>
+              <a:rPr lang="fr-FR" smtClean="0"/>
+              <a:t>16/08/2017</a:t>
             </a:fld>
             <a:endParaRPr lang="fr-FR"/>
           </a:p>
@@ -1490,7 +1466,7 @@
         <p:nvSpPr>
           <p:cNvPr id="5" name="Espace réservé du pied de page 4"/>
           <p:cNvSpPr>
-            <a:spLocks noGrp="true"/>
+            <a:spLocks noGrp="1"/>
           </p:cNvSpPr>
           <p:nvPr>
             <p:ph type="ftr" sz="quarter" idx="11"/>
@@ -1509,7 +1485,7 @@
         <p:nvSpPr>
           <p:cNvPr id="6" name="Espace réservé du numéro de diapositive 5"/>
           <p:cNvSpPr>
-            <a:spLocks noGrp="true"/>
+            <a:spLocks noGrp="1"/>
           </p:cNvSpPr>
           <p:nvPr>
             <p:ph type="sldNum" sz="quarter" idx="12"/>
@@ -1521,7 +1497,7 @@
           <a:lstStyle/>
           <a:p>
             <a:fld id="{E3811F5C-F6AB-470B-8321-08F27CD4598A}" type="slidenum">
-              <a:rPr lang="fr-FR" smtClean="false"/>
+              <a:rPr lang="fr-FR" smtClean="0"/>
               <a:t>‹N°›</a:t>
             </a:fld>
             <a:endParaRPr lang="fr-FR"/>
@@ -1726,7 +1702,7 @@
           <a:p>
             <a:fld id="{E7E4853E-ECDD-443A-840C-1FE284273B35}" type="datetimeFigureOut">
               <a:rPr lang="fr-FR" smtClean="0"/>
-              <a:t>14/02/2017</a:t>
+              <a:t>16/08/2017</a:t>
             </a:fld>
             <a:endParaRPr lang="fr-FR"/>
           </a:p>
@@ -1958,7 +1934,7 @@
           <a:p>
             <a:fld id="{E7E4853E-ECDD-443A-840C-1FE284273B35}" type="datetimeFigureOut">
               <a:rPr lang="fr-FR" smtClean="0"/>
-              <a:t>14/02/2017</a:t>
+              <a:t>16/08/2017</a:t>
             </a:fld>
             <a:endParaRPr lang="fr-FR"/>
           </a:p>
@@ -2325,7 +2301,7 @@
           <a:p>
             <a:fld id="{E7E4853E-ECDD-443A-840C-1FE284273B35}" type="datetimeFigureOut">
               <a:rPr lang="fr-FR" smtClean="0"/>
-              <a:t>14/02/2017</a:t>
+              <a:t>16/08/2017</a:t>
             </a:fld>
             <a:endParaRPr lang="fr-FR"/>
           </a:p>
@@ -2443,7 +2419,7 @@
           <a:p>
             <a:fld id="{E7E4853E-ECDD-443A-840C-1FE284273B35}" type="datetimeFigureOut">
               <a:rPr lang="fr-FR" smtClean="0"/>
-              <a:t>14/02/2017</a:t>
+              <a:t>16/08/2017</a:t>
             </a:fld>
             <a:endParaRPr lang="fr-FR"/>
           </a:p>
@@ -2538,7 +2514,7 @@
           <a:p>
             <a:fld id="{E7E4853E-ECDD-443A-840C-1FE284273B35}" type="datetimeFigureOut">
               <a:rPr lang="fr-FR" smtClean="0"/>
-              <a:t>14/02/2017</a:t>
+              <a:t>16/08/2017</a:t>
             </a:fld>
             <a:endParaRPr lang="fr-FR"/>
           </a:p>
@@ -2815,7 +2791,7 @@
           <a:p>
             <a:fld id="{E7E4853E-ECDD-443A-840C-1FE284273B35}" type="datetimeFigureOut">
               <a:rPr lang="fr-FR" smtClean="0"/>
-              <a:t>14/02/2017</a:t>
+              <a:t>16/08/2017</a:t>
             </a:fld>
             <a:endParaRPr lang="fr-FR"/>
           </a:p>
@@ -3068,7 +3044,7 @@
           <a:p>
             <a:fld id="{E7E4853E-ECDD-443A-840C-1FE284273B35}" type="datetimeFigureOut">
               <a:rPr lang="fr-FR" smtClean="0"/>
-              <a:t>14/02/2017</a:t>
+              <a:t>16/08/2017</a:t>
             </a:fld>
             <a:endParaRPr lang="fr-FR"/>
           </a:p>
@@ -3130,7 +3106,7 @@
 </file>
 
 <file path=ppt/slideMasters/slideMaster1.xml><?xml version="1.0" encoding="utf-8"?>
-<p:sldMaster xmlns:v="urn:schemas-microsoft-com:vml" xmlns:a="http://schemas.openxmlformats.org/drawingml/2006/main" xmlns:c="http://schemas.openxmlformats.org/drawingml/2006/chart" xmlns:xdr="http://schemas.openxmlformats.org/drawingml/2006/spreadsheetDrawing" xmlns:dgm="http://schemas.openxmlformats.org/drawingml/2006/diagram" xmlns:pic="http://schemas.openxmlformats.org/drawingml/2006/picture" xmlns:wp14="http://schemas.microsoft.com/office/word/2010/wordprocessingDrawing" xmlns:p="http://schemas.openxmlformats.org/presentationml/2006/main" xmlns:ns6="http://schemas.openxmlformats.org/drawingml/2006/chartDrawing" xmlns:r="http://schemas.openxmlformats.org/officeDocument/2006/relationships" xmlns:ns13="http://schemas.openxmlformats.org/drawingml/2006/lockedCanvas" xmlns:ns12="http://schemas.openxmlformats.org/drawingml/2006/compatibility" xmlns:mc="http://schemas.openxmlformats.org/markup-compatibility/2006" xmlns:wp="http://schemas.openxmlformats.org/drawingml/2006/wordprocessingDrawing">
+<p:sldMaster xmlns:a="http://schemas.openxmlformats.org/drawingml/2006/main" xmlns:r="http://schemas.openxmlformats.org/officeDocument/2006/relationships" xmlns:p="http://schemas.openxmlformats.org/presentationml/2006/main">
   <p:cSld>
     <p:bg>
       <p:bgRef idx="1001">
@@ -3155,7 +3131,7 @@
         <p:nvSpPr>
           <p:cNvPr id="2" name="Espace réservé du titre 1"/>
           <p:cNvSpPr>
-            <a:spLocks noGrp="true"/>
+            <a:spLocks noGrp="1"/>
           </p:cNvSpPr>
           <p:nvPr>
             <p:ph type="title"/>
@@ -3171,13 +3147,13 @@
           </a:prstGeom>
         </p:spPr>
         <p:txBody>
-          <a:bodyPr vert="horz" lIns="91440" tIns="45720" rIns="91440" bIns="45720" rtlCol="false" anchor="ctr">
+          <a:bodyPr vert="horz" lIns="91440" tIns="45720" rIns="91440" bIns="45720" rtlCol="0" anchor="ctr">
             <a:normAutofit/>
           </a:bodyPr>
           <a:lstStyle/>
           <a:p>
             <a:r>
-              <a:rPr lang="fr-FR" smtClean="false"/>
+              <a:rPr lang="fr-FR" smtClean="0"/>
               <a:t>Modifiez le style du titre</a:t>
             </a:r>
             <a:endParaRPr lang="fr-FR"/>
@@ -3188,7 +3164,7 @@
         <p:nvSpPr>
           <p:cNvPr id="3" name="Espace réservé du texte 2"/>
           <p:cNvSpPr>
-            <a:spLocks noGrp="true"/>
+            <a:spLocks noGrp="1"/>
           </p:cNvSpPr>
           <p:nvPr>
             <p:ph type="body" idx="1"/>
@@ -3204,42 +3180,42 @@
           </a:prstGeom>
         </p:spPr>
         <p:txBody>
-          <a:bodyPr vert="horz" lIns="91440" tIns="45720" rIns="91440" bIns="45720" rtlCol="false">
+          <a:bodyPr vert="horz" lIns="91440" tIns="45720" rIns="91440" bIns="45720" rtlCol="0">
             <a:normAutofit/>
           </a:bodyPr>
           <a:lstStyle/>
           <a:p>
             <a:pPr lvl="0"/>
             <a:r>
-              <a:rPr lang="fr-FR" smtClean="false"/>
+              <a:rPr lang="fr-FR" smtClean="0"/>
               <a:t>Modifiez les styles du texte du masque</a:t>
             </a:r>
           </a:p>
           <a:p>
             <a:pPr lvl="1"/>
             <a:r>
-              <a:rPr lang="fr-FR" smtClean="false"/>
+              <a:rPr lang="fr-FR" smtClean="0"/>
               <a:t>Deuxième niveau</a:t>
             </a:r>
           </a:p>
           <a:p>
             <a:pPr lvl="2"/>
             <a:r>
-              <a:rPr lang="fr-FR" smtClean="false"/>
+              <a:rPr lang="fr-FR" smtClean="0"/>
               <a:t>Troisième niveau</a:t>
             </a:r>
           </a:p>
           <a:p>
             <a:pPr lvl="3"/>
             <a:r>
-              <a:rPr lang="fr-FR" smtClean="false"/>
+              <a:rPr lang="fr-FR" smtClean="0"/>
               <a:t>Quatrième niveau</a:t>
             </a:r>
           </a:p>
           <a:p>
             <a:pPr lvl="4"/>
             <a:r>
-              <a:rPr lang="fr-FR" smtClean="false"/>
+              <a:rPr lang="fr-FR" smtClean="0"/>
               <a:t>Cinquième niveau</a:t>
             </a:r>
             <a:endParaRPr lang="fr-FR"/>
@@ -3250,7 +3226,7 @@
         <p:nvSpPr>
           <p:cNvPr id="4" name="Espace réservé de la date 3"/>
           <p:cNvSpPr>
-            <a:spLocks noGrp="true"/>
+            <a:spLocks noGrp="1"/>
           </p:cNvSpPr>
           <p:nvPr>
             <p:ph type="dt" sz="half" idx="2"/>
@@ -3266,7 +3242,7 @@
           </a:prstGeom>
         </p:spPr>
         <p:txBody>
-          <a:bodyPr vert="horz" lIns="91440" tIns="45720" rIns="91440" bIns="45720" rtlCol="false" anchor="ctr"/>
+          <a:bodyPr vert="horz" lIns="91440" tIns="45720" rIns="91440" bIns="45720" rtlCol="0" anchor="ctr"/>
           <a:lstStyle>
             <a:lvl1pPr algn="l">
               <a:defRPr sz="1200">
@@ -3280,8 +3256,8 @@
           </a:lstStyle>
           <a:p>
             <a:fld id="{E7E4853E-ECDD-443A-840C-1FE284273B35}" type="datetimeFigureOut">
-              <a:rPr lang="fr-FR" smtClean="false"/>
-              <a:t>14/02/2017</a:t>
+              <a:rPr lang="fr-FR" smtClean="0"/>
+              <a:t>16/08/2017</a:t>
             </a:fld>
             <a:endParaRPr lang="fr-FR"/>
           </a:p>
@@ -3291,7 +3267,7 @@
         <p:nvSpPr>
           <p:cNvPr id="5" name="Espace réservé du pied de page 4"/>
           <p:cNvSpPr>
-            <a:spLocks noGrp="true"/>
+            <a:spLocks noGrp="1"/>
           </p:cNvSpPr>
           <p:nvPr>
             <p:ph type="ftr" sz="quarter" idx="3"/>
@@ -3307,7 +3283,7 @@
           </a:prstGeom>
         </p:spPr>
         <p:txBody>
-          <a:bodyPr vert="horz" lIns="91440" tIns="45720" rIns="91440" bIns="45720" rtlCol="false" anchor="ctr"/>
+          <a:bodyPr vert="horz" lIns="91440" tIns="45720" rIns="91440" bIns="45720" rtlCol="0" anchor="ctr"/>
           <a:lstStyle>
             <a:lvl1pPr algn="ctr">
               <a:defRPr sz="1200">
@@ -3328,7 +3304,7 @@
         <p:nvSpPr>
           <p:cNvPr id="6" name="Espace réservé du numéro de diapositive 5"/>
           <p:cNvSpPr>
-            <a:spLocks noGrp="true"/>
+            <a:spLocks noGrp="1"/>
           </p:cNvSpPr>
           <p:nvPr>
             <p:ph type="sldNum" sz="quarter" idx="4"/>
@@ -3344,7 +3320,7 @@
           </a:prstGeom>
         </p:spPr>
         <p:txBody>
-          <a:bodyPr vert="horz" lIns="91440" tIns="45720" rIns="91440" bIns="45720" rtlCol="false" anchor="ctr"/>
+          <a:bodyPr vert="horz" lIns="91440" tIns="45720" rIns="91440" bIns="45720" rtlCol="0" anchor="ctr"/>
           <a:lstStyle>
             <a:lvl1pPr algn="r">
               <a:defRPr sz="1200">
@@ -3358,7 +3334,7 @@
           </a:lstStyle>
           <a:p>
             <a:fld id="{E3811F5C-F6AB-470B-8321-08F27CD4598A}" type="slidenum">
-              <a:rPr lang="fr-FR" smtClean="false"/>
+              <a:rPr lang="fr-FR" smtClean="0"/>
               <a:t>‹N°›</a:t>
             </a:fld>
             <a:endParaRPr lang="fr-FR"/>
@@ -3388,7 +3364,7 @@
   </p:sldLayoutIdLst>
   <p:txStyles>
     <p:titleStyle>
-      <a:lvl1pPr algn="l" defTabSz="914400" rtl="false" eaLnBrk="true" latinLnBrk="false" hangingPunct="true">
+      <a:lvl1pPr algn="l" defTabSz="914400" rtl="0" eaLnBrk="1" latinLnBrk="0" hangingPunct="1">
         <a:lnSpc>
           <a:spcPct val="90000"/>
         </a:lnSpc>
@@ -3407,7 +3383,7 @@
       </a:lvl1pPr>
     </p:titleStyle>
     <p:bodyStyle>
-      <a:lvl1pPr marL="228600" indent="-228600" algn="l" defTabSz="914400" rtl="false" eaLnBrk="true" latinLnBrk="false" hangingPunct="true">
+      <a:lvl1pPr marL="228600" indent="-228600" algn="l" defTabSz="914400" rtl="0" eaLnBrk="1" latinLnBrk="0" hangingPunct="1">
         <a:lnSpc>
           <a:spcPct val="90000"/>
         </a:lnSpc>
@@ -3425,7 +3401,7 @@
           <a:cs typeface="+mn-cs"/>
         </a:defRPr>
       </a:lvl1pPr>
-      <a:lvl2pPr marL="685800" indent="-228600" algn="l" defTabSz="914400" rtl="false" eaLnBrk="true" latinLnBrk="false" hangingPunct="true">
+      <a:lvl2pPr marL="685800" indent="-228600" algn="l" defTabSz="914400" rtl="0" eaLnBrk="1" latinLnBrk="0" hangingPunct="1">
         <a:lnSpc>
           <a:spcPct val="90000"/>
         </a:lnSpc>
@@ -3443,7 +3419,7 @@
           <a:cs typeface="+mn-cs"/>
         </a:defRPr>
       </a:lvl2pPr>
-      <a:lvl3pPr marL="1143000" indent="-228600" algn="l" defTabSz="914400" rtl="false" eaLnBrk="true" latinLnBrk="false" hangingPunct="true">
+      <a:lvl3pPr marL="1143000" indent="-228600" algn="l" defTabSz="914400" rtl="0" eaLnBrk="1" latinLnBrk="0" hangingPunct="1">
         <a:lnSpc>
           <a:spcPct val="90000"/>
         </a:lnSpc>
@@ -3461,7 +3437,7 @@
           <a:cs typeface="+mn-cs"/>
         </a:defRPr>
       </a:lvl3pPr>
-      <a:lvl4pPr marL="1600200" indent="-228600" algn="l" defTabSz="914400" rtl="false" eaLnBrk="true" latinLnBrk="false" hangingPunct="true">
+      <a:lvl4pPr marL="1600200" indent="-228600" algn="l" defTabSz="914400" rtl="0" eaLnBrk="1" latinLnBrk="0" hangingPunct="1">
         <a:lnSpc>
           <a:spcPct val="90000"/>
         </a:lnSpc>
@@ -3479,7 +3455,7 @@
           <a:cs typeface="+mn-cs"/>
         </a:defRPr>
       </a:lvl4pPr>
-      <a:lvl5pPr marL="2057400" indent="-228600" algn="l" defTabSz="914400" rtl="false" eaLnBrk="true" latinLnBrk="false" hangingPunct="true">
+      <a:lvl5pPr marL="2057400" indent="-228600" algn="l" defTabSz="914400" rtl="0" eaLnBrk="1" latinLnBrk="0" hangingPunct="1">
         <a:lnSpc>
           <a:spcPct val="90000"/>
         </a:lnSpc>
@@ -3497,7 +3473,7 @@
           <a:cs typeface="+mn-cs"/>
         </a:defRPr>
       </a:lvl5pPr>
-      <a:lvl6pPr marL="2514600" indent="-228600" algn="l" defTabSz="914400" rtl="false" eaLnBrk="true" latinLnBrk="false" hangingPunct="true">
+      <a:lvl6pPr marL="2514600" indent="-228600" algn="l" defTabSz="914400" rtl="0" eaLnBrk="1" latinLnBrk="0" hangingPunct="1">
         <a:lnSpc>
           <a:spcPct val="90000"/>
         </a:lnSpc>
@@ -3515,7 +3491,7 @@
           <a:cs typeface="+mn-cs"/>
         </a:defRPr>
       </a:lvl6pPr>
-      <a:lvl7pPr marL="2971800" indent="-228600" algn="l" defTabSz="914400" rtl="false" eaLnBrk="true" latinLnBrk="false" hangingPunct="true">
+      <a:lvl7pPr marL="2971800" indent="-228600" algn="l" defTabSz="914400" rtl="0" eaLnBrk="1" latinLnBrk="0" hangingPunct="1">
         <a:lnSpc>
           <a:spcPct val="90000"/>
         </a:lnSpc>
@@ -3533,7 +3509,7 @@
           <a:cs typeface="+mn-cs"/>
         </a:defRPr>
       </a:lvl7pPr>
-      <a:lvl8pPr marL="3429000" indent="-228600" algn="l" defTabSz="914400" rtl="false" eaLnBrk="true" latinLnBrk="false" hangingPunct="true">
+      <a:lvl8pPr marL="3429000" indent="-228600" algn="l" defTabSz="914400" rtl="0" eaLnBrk="1" latinLnBrk="0" hangingPunct="1">
         <a:lnSpc>
           <a:spcPct val="90000"/>
         </a:lnSpc>
@@ -3551,7 +3527,7 @@
           <a:cs typeface="+mn-cs"/>
         </a:defRPr>
       </a:lvl8pPr>
-      <a:lvl9pPr marL="3886200" indent="-228600" algn="l" defTabSz="914400" rtl="false" eaLnBrk="true" latinLnBrk="false" hangingPunct="true">
+      <a:lvl9pPr marL="3886200" indent="-228600" algn="l" defTabSz="914400" rtl="0" eaLnBrk="1" latinLnBrk="0" hangingPunct="1">
         <a:lnSpc>
           <a:spcPct val="90000"/>
         </a:lnSpc>
@@ -3574,7 +3550,7 @@
       <a:defPPr>
         <a:defRPr lang="fr-FR"/>
       </a:defPPr>
-      <a:lvl1pPr marL="0" algn="l" defTabSz="914400" rtl="false" eaLnBrk="true" latinLnBrk="false" hangingPunct="true">
+      <a:lvl1pPr marL="0" algn="l" defTabSz="914400" rtl="0" eaLnBrk="1" latinLnBrk="0" hangingPunct="1">
         <a:defRPr sz="1800" kern="1200">
           <a:solidFill>
             <a:schemeClr val="tx1"/>
@@ -3584,7 +3560,7 @@
           <a:cs typeface="+mn-cs"/>
         </a:defRPr>
       </a:lvl1pPr>
-      <a:lvl2pPr marL="457200" algn="l" defTabSz="914400" rtl="false" eaLnBrk="true" latinLnBrk="false" hangingPunct="true">
+      <a:lvl2pPr marL="457200" algn="l" defTabSz="914400" rtl="0" eaLnBrk="1" latinLnBrk="0" hangingPunct="1">
         <a:defRPr sz="1800" kern="1200">
           <a:solidFill>
             <a:schemeClr val="tx1"/>
@@ -3594,7 +3570,7 @@
           <a:cs typeface="+mn-cs"/>
         </a:defRPr>
       </a:lvl2pPr>
-      <a:lvl3pPr marL="914400" algn="l" defTabSz="914400" rtl="false" eaLnBrk="true" latinLnBrk="false" hangingPunct="true">
+      <a:lvl3pPr marL="914400" algn="l" defTabSz="914400" rtl="0" eaLnBrk="1" latinLnBrk="0" hangingPunct="1">
         <a:defRPr sz="1800" kern="1200">
           <a:solidFill>
             <a:schemeClr val="tx1"/>
@@ -3604,7 +3580,7 @@
           <a:cs typeface="+mn-cs"/>
         </a:defRPr>
       </a:lvl3pPr>
-      <a:lvl4pPr marL="1371600" algn="l" defTabSz="914400" rtl="false" eaLnBrk="true" latinLnBrk="false" hangingPunct="true">
+      <a:lvl4pPr marL="1371600" algn="l" defTabSz="914400" rtl="0" eaLnBrk="1" latinLnBrk="0" hangingPunct="1">
         <a:defRPr sz="1800" kern="1200">
           <a:solidFill>
             <a:schemeClr val="tx1"/>
@@ -3614,7 +3590,7 @@
           <a:cs typeface="+mn-cs"/>
         </a:defRPr>
       </a:lvl4pPr>
-      <a:lvl5pPr marL="1828800" algn="l" defTabSz="914400" rtl="false" eaLnBrk="true" latinLnBrk="false" hangingPunct="true">
+      <a:lvl5pPr marL="1828800" algn="l" defTabSz="914400" rtl="0" eaLnBrk="1" latinLnBrk="0" hangingPunct="1">
         <a:defRPr sz="1800" kern="1200">
           <a:solidFill>
             <a:schemeClr val="tx1"/>
@@ -3624,7 +3600,7 @@
           <a:cs typeface="+mn-cs"/>
         </a:defRPr>
       </a:lvl5pPr>
-      <a:lvl6pPr marL="2286000" algn="l" defTabSz="914400" rtl="false" eaLnBrk="true" latinLnBrk="false" hangingPunct="true">
+      <a:lvl6pPr marL="2286000" algn="l" defTabSz="914400" rtl="0" eaLnBrk="1" latinLnBrk="0" hangingPunct="1">
         <a:defRPr sz="1800" kern="1200">
           <a:solidFill>
             <a:schemeClr val="tx1"/>
@@ -3634,7 +3610,7 @@
           <a:cs typeface="+mn-cs"/>
         </a:defRPr>
       </a:lvl6pPr>
-      <a:lvl7pPr marL="2743200" algn="l" defTabSz="914400" rtl="false" eaLnBrk="true" latinLnBrk="false" hangingPunct="true">
+      <a:lvl7pPr marL="2743200" algn="l" defTabSz="914400" rtl="0" eaLnBrk="1" latinLnBrk="0" hangingPunct="1">
         <a:defRPr sz="1800" kern="1200">
           <a:solidFill>
             <a:schemeClr val="tx1"/>
@@ -3644,7 +3620,7 @@
           <a:cs typeface="+mn-cs"/>
         </a:defRPr>
       </a:lvl7pPr>
-      <a:lvl8pPr marL="3200400" algn="l" defTabSz="914400" rtl="false" eaLnBrk="true" latinLnBrk="false" hangingPunct="true">
+      <a:lvl8pPr marL="3200400" algn="l" defTabSz="914400" rtl="0" eaLnBrk="1" latinLnBrk="0" hangingPunct="1">
         <a:defRPr sz="1800" kern="1200">
           <a:solidFill>
             <a:schemeClr val="tx1"/>
@@ -3654,7 +3630,7 @@
           <a:cs typeface="+mn-cs"/>
         </a:defRPr>
       </a:lvl8pPr>
-      <a:lvl9pPr marL="3657600" algn="l" defTabSz="914400" rtl="false" eaLnBrk="true" latinLnBrk="false" hangingPunct="true">
+      <a:lvl9pPr marL="3657600" algn="l" defTabSz="914400" rtl="0" eaLnBrk="1" latinLnBrk="0" hangingPunct="1">
         <a:defRPr sz="1800" kern="1200">
           <a:solidFill>
             <a:schemeClr val="tx1"/>
@@ -3670,7 +3646,7 @@
 </file>
 
 <file path=ppt/slides/slide1.xml><?xml version="1.0" encoding="utf-8"?>
-<p:sld xmlns:p="http://schemas.openxmlformats.org/presentationml/2006/main" xmlns:r="http://schemas.openxmlformats.org/officeDocument/2006/relationships" xmlns:a="http://schemas.openxmlformats.org/drawingml/2006/main" xmlns:mc="http://schemas.openxmlformats.org/markup-compatibility/2006" xmlns:c="http://schemas.openxmlformats.org/drawingml/2006/chart" xmlns:ns6="http://schemas.openxmlformats.org/drawingml/2006/chartDrawing" xmlns:dgm="http://schemas.openxmlformats.org/drawingml/2006/diagram" xmlns:pic="http://schemas.openxmlformats.org/drawingml/2006/picture" xmlns:wp="http://schemas.openxmlformats.org/drawingml/2006/wordprocessingDrawing" xmlns:wp14="http://schemas.microsoft.com/office/word/2010/wordprocessingDrawing" xmlns:xdr="http://schemas.openxmlformats.org/drawingml/2006/spreadsheetDrawing" xmlns:ns12="http://schemas.openxmlformats.org/drawingml/2006/compatibility" xmlns:ns13="http://schemas.openxmlformats.org/drawingml/2006/lockedCanvas" xmlns:v="urn:schemas-microsoft-com:vml">
+<p:sld xmlns:a="http://schemas.openxmlformats.org/drawingml/2006/main" xmlns:r="http://schemas.openxmlformats.org/officeDocument/2006/relationships" xmlns:p="http://schemas.openxmlformats.org/presentationml/2006/main">
   <p:cSld>
     <p:spTree>
       <p:nvGrpSpPr>
@@ -3690,7 +3666,7 @@
         <p:nvSpPr>
           <p:cNvPr id="2" name="Titre 1"/>
           <p:cNvSpPr>
-            <a:spLocks noGrp="true"/>
+            <a:spLocks noGrp="1"/>
           </p:cNvSpPr>
           <p:nvPr>
             <p:ph type="ctrTitle"/>
@@ -3702,14 +3678,14 @@
           <a:lstStyle/>
           <a:p>
             <a:r>
-              <a:rPr lang="fr-FR" dirty="false" err="true" smtClean="false"/>
+              <a:rPr lang="fr-FR" dirty="0" err="1" smtClean="0"/>
               <a:t>Title</a:t>
             </a:r>
             <a:r>
-              <a:rPr lang="fr-FR" dirty="false" smtClean="false"/>
+              <a:rPr lang="fr-FR" dirty="0" smtClean="0"/>
               <a:t> 1</a:t>
             </a:r>
-            <a:endParaRPr lang="fr-FR" dirty="false"/>
+            <a:endParaRPr lang="fr-FR" dirty="0"/>
           </a:p>
         </p:txBody>
       </p:sp>
@@ -3717,7 +3693,7 @@
         <p:nvSpPr>
           <p:cNvPr id="3" name="Sous-titre 2"/>
           <p:cNvSpPr>
-            <a:spLocks noGrp="true"/>
+            <a:spLocks noGrp="1"/>
           </p:cNvSpPr>
           <p:nvPr>
             <p:ph type="subTitle" idx="1"/>
@@ -3729,14 +3705,14 @@
           <a:lstStyle/>
           <a:p>
             <a:r>
-              <a:rPr lang="fr-FR" dirty="false" err="true" smtClean="false"/>
+              <a:rPr lang="fr-FR" dirty="0" err="1" smtClean="0"/>
               <a:t>Sub-title</a:t>
             </a:r>
             <a:r>
-              <a:rPr lang="fr-FR" dirty="false" smtClean="false"/>
+              <a:rPr lang="fr-FR" dirty="0" smtClean="0"/>
               <a:t> 1</a:t>
             </a:r>
-            <a:endParaRPr lang="fr-FR" dirty="false"/>
+            <a:endParaRPr lang="fr-FR" dirty="0"/>
           </a:p>
         </p:txBody>
       </p:sp>
@@ -3754,7 +3730,7 @@
 </file>
 
 <file path=ppt/slides/slide2.xml><?xml version="1.0" encoding="utf-8"?>
-<p:sld xmlns:p="http://schemas.openxmlformats.org/presentationml/2006/main" xmlns:r="http://schemas.openxmlformats.org/officeDocument/2006/relationships" xmlns:a="http://schemas.openxmlformats.org/drawingml/2006/main" xmlns:mc="http://schemas.openxmlformats.org/markup-compatibility/2006" xmlns:c="http://schemas.openxmlformats.org/drawingml/2006/chart" xmlns:ns6="http://schemas.openxmlformats.org/drawingml/2006/chartDrawing" xmlns:dgm="http://schemas.openxmlformats.org/drawingml/2006/diagram" xmlns:pic="http://schemas.openxmlformats.org/drawingml/2006/picture" xmlns:wp="http://schemas.openxmlformats.org/drawingml/2006/wordprocessingDrawing" xmlns:wp14="http://schemas.microsoft.com/office/word/2010/wordprocessingDrawing" xmlns:xdr="http://schemas.openxmlformats.org/drawingml/2006/spreadsheetDrawing" xmlns:ns12="http://schemas.openxmlformats.org/drawingml/2006/compatibility" xmlns:ns13="http://schemas.openxmlformats.org/drawingml/2006/lockedCanvas" xmlns:v="urn:schemas-microsoft-com:vml">
+<p:sld xmlns:a="http://schemas.openxmlformats.org/drawingml/2006/main" xmlns:r="http://schemas.openxmlformats.org/officeDocument/2006/relationships" xmlns:p="http://schemas.openxmlformats.org/presentationml/2006/main">
   <p:cSld>
     <p:spTree>
       <p:nvGrpSpPr>
@@ -3774,7 +3750,7 @@
         <p:nvSpPr>
           <p:cNvPr id="2" name="Titre 1"/>
           <p:cNvSpPr>
-            <a:spLocks noGrp="true"/>
+            <a:spLocks noGrp="1"/>
           </p:cNvSpPr>
           <p:nvPr>
             <p:ph type="title"/>
@@ -3786,14 +3762,14 @@
           <a:lstStyle/>
           <a:p>
             <a:r>
-              <a:rPr lang="fr-FR" dirty="false" err="true" smtClean="false"/>
+              <a:rPr lang="fr-FR" dirty="0" err="1" smtClean="0"/>
               <a:t>Title</a:t>
             </a:r>
             <a:r>
-              <a:rPr lang="fr-FR" dirty="false" smtClean="false"/>
+              <a:rPr lang="fr-FR" dirty="0" smtClean="0"/>
               <a:t> 2</a:t>
             </a:r>
-            <a:endParaRPr lang="fr-FR" dirty="false"/>
+            <a:endParaRPr lang="fr-FR" dirty="0"/>
           </a:p>
         </p:txBody>
       </p:sp>
@@ -3801,7 +3777,7 @@
         <p:nvSpPr>
           <p:cNvPr id="3" name="Espace réservé du contenu 2"/>
           <p:cNvSpPr>
-            <a:spLocks noGrp="true"/>
+            <a:spLocks noGrp="1"/>
           </p:cNvSpPr>
           <p:nvPr>
             <p:ph idx="1"/>
@@ -3815,1112 +3791,1112 @@
           <a:lstStyle/>
           <a:p>
             <a:r>
-              <a:rPr lang="fr-FR" dirty="false" err="true" smtClean="false"/>
+              <a:rPr lang="fr-FR" dirty="0" err="1" smtClean="0"/>
               <a:t>Lorem</a:t>
             </a:r>
             <a:r>
-              <a:rPr lang="fr-FR" dirty="false" smtClean="false"/>
-              <a:t> </a:t>
-            </a:r>
-            <a:r>
-              <a:rPr lang="fr-FR" dirty="false" err="true" smtClean="false"/>
+              <a:rPr lang="fr-FR" dirty="0" smtClean="0"/>
+              <a:t> </a:t>
+            </a:r>
+            <a:r>
+              <a:rPr lang="fr-FR" dirty="0" err="1" smtClean="0"/>
               <a:t>ipsum</a:t>
             </a:r>
             <a:r>
-              <a:rPr lang="fr-FR" dirty="false" smtClean="false"/>
-              <a:t> </a:t>
-            </a:r>
-            <a:r>
-              <a:rPr lang="fr-FR" dirty="false" err="true" smtClean="false"/>
+              <a:rPr lang="fr-FR" dirty="0" smtClean="0"/>
+              <a:t> </a:t>
+            </a:r>
+            <a:r>
+              <a:rPr lang="fr-FR" dirty="0" err="1" smtClean="0"/>
               <a:t>dolor</a:t>
             </a:r>
             <a:r>
-              <a:rPr lang="fr-FR" dirty="false" smtClean="false"/>
-              <a:t> </a:t>
-            </a:r>
-            <a:r>
-              <a:rPr lang="fr-FR" dirty="false" err="true" smtClean="false"/>
+              <a:rPr lang="fr-FR" dirty="0" smtClean="0"/>
+              <a:t> </a:t>
+            </a:r>
+            <a:r>
+              <a:rPr lang="fr-FR" dirty="0" err="1" smtClean="0"/>
               <a:t>sit</a:t>
             </a:r>
             <a:r>
-              <a:rPr lang="fr-FR" dirty="false" smtClean="false"/>
-              <a:t> </a:t>
-            </a:r>
-            <a:r>
-              <a:rPr lang="fr-FR" dirty="false" err="true" smtClean="false"/>
+              <a:rPr lang="fr-FR" dirty="0" smtClean="0"/>
+              <a:t> </a:t>
+            </a:r>
+            <a:r>
+              <a:rPr lang="fr-FR" dirty="0" err="1" smtClean="0"/>
               <a:t>amet</a:t>
             </a:r>
             <a:r>
-              <a:rPr lang="fr-FR" dirty="false" smtClean="false"/>
+              <a:rPr lang="fr-FR" dirty="0" smtClean="0"/>
               <a:t>, </a:t>
             </a:r>
             <a:r>
-              <a:rPr lang="fr-FR" dirty="false" err="true" smtClean="false"/>
+              <a:rPr lang="fr-FR" dirty="0" err="1" smtClean="0"/>
               <a:t>consectetur</a:t>
             </a:r>
             <a:r>
-              <a:rPr lang="fr-FR" dirty="false" smtClean="false"/>
-              <a:t> </a:t>
-            </a:r>
-            <a:r>
-              <a:rPr lang="fr-FR" dirty="false" err="true" smtClean="false"/>
+              <a:rPr lang="fr-FR" dirty="0" smtClean="0"/>
+              <a:t> </a:t>
+            </a:r>
+            <a:r>
+              <a:rPr lang="fr-FR" dirty="0" err="1" smtClean="0"/>
               <a:t>adipiscing</a:t>
             </a:r>
             <a:r>
-              <a:rPr lang="fr-FR" dirty="false" smtClean="false"/>
-              <a:t> </a:t>
-            </a:r>
-            <a:r>
-              <a:rPr lang="fr-FR" dirty="false" err="true" smtClean="false"/>
+              <a:rPr lang="fr-FR" dirty="0" smtClean="0"/>
+              <a:t> </a:t>
+            </a:r>
+            <a:r>
+              <a:rPr lang="fr-FR" dirty="0" err="1" smtClean="0"/>
               <a:t>elit</a:t>
             </a:r>
             <a:r>
-              <a:rPr lang="fr-FR" dirty="false" smtClean="false"/>
+              <a:rPr lang="fr-FR" dirty="0" smtClean="0"/>
               <a:t>. Nunc </a:t>
             </a:r>
             <a:r>
-              <a:rPr lang="fr-FR" dirty="false" err="true" smtClean="false"/>
+              <a:rPr lang="fr-FR" dirty="0" err="1" smtClean="0"/>
               <a:t>sed</a:t>
             </a:r>
             <a:r>
-              <a:rPr lang="fr-FR" dirty="false" smtClean="false"/>
+              <a:rPr lang="fr-FR" dirty="0" smtClean="0"/>
               <a:t> est </a:t>
             </a:r>
             <a:r>
-              <a:rPr lang="fr-FR" dirty="false" err="true" smtClean="false"/>
+              <a:rPr lang="fr-FR" dirty="0" err="1" smtClean="0"/>
               <a:t>orci</a:t>
             </a:r>
             <a:r>
-              <a:rPr lang="fr-FR" dirty="false" smtClean="false"/>
+              <a:rPr lang="fr-FR" dirty="0" smtClean="0"/>
               <a:t>. </a:t>
             </a:r>
             <a:r>
-              <a:rPr lang="fr-FR" dirty="false" err="true" smtClean="false"/>
+              <a:rPr lang="fr-FR" dirty="0" err="1" smtClean="0"/>
               <a:t>Vivamus</a:t>
             </a:r>
             <a:r>
-              <a:rPr lang="fr-FR" dirty="false" smtClean="false"/>
-              <a:t> </a:t>
-            </a:r>
-            <a:r>
-              <a:rPr lang="fr-FR" dirty="false" err="true" smtClean="false"/>
+              <a:rPr lang="fr-FR" dirty="0" smtClean="0"/>
+              <a:t> </a:t>
+            </a:r>
+            <a:r>
+              <a:rPr lang="fr-FR" dirty="0" err="1" smtClean="0"/>
               <a:t>neque</a:t>
             </a:r>
             <a:r>
-              <a:rPr lang="fr-FR" dirty="false" smtClean="false"/>
-              <a:t> </a:t>
-            </a:r>
-            <a:r>
-              <a:rPr lang="fr-FR" dirty="false" err="true" smtClean="false"/>
+              <a:rPr lang="fr-FR" dirty="0" smtClean="0"/>
+              <a:t> </a:t>
+            </a:r>
+            <a:r>
+              <a:rPr lang="fr-FR" dirty="0" err="1" smtClean="0"/>
               <a:t>tellus</a:t>
             </a:r>
             <a:r>
-              <a:rPr lang="fr-FR" dirty="false" smtClean="false"/>
+              <a:rPr lang="fr-FR" dirty="0" smtClean="0"/>
               <a:t>, </a:t>
             </a:r>
             <a:r>
-              <a:rPr lang="fr-FR" dirty="false" err="true" smtClean="false"/>
+              <a:rPr lang="fr-FR" dirty="0" err="1" smtClean="0"/>
               <a:t>commodo</a:t>
             </a:r>
             <a:r>
-              <a:rPr lang="fr-FR" dirty="false" smtClean="false"/>
-              <a:t> </a:t>
-            </a:r>
-            <a:r>
-              <a:rPr lang="fr-FR" dirty="false" err="true" smtClean="false"/>
+              <a:rPr lang="fr-FR" dirty="0" smtClean="0"/>
+              <a:t> </a:t>
+            </a:r>
+            <a:r>
+              <a:rPr lang="fr-FR" dirty="0" err="1" smtClean="0"/>
               <a:t>sed</a:t>
             </a:r>
             <a:r>
-              <a:rPr lang="fr-FR" dirty="false" smtClean="false"/>
-              <a:t> </a:t>
-            </a:r>
-            <a:r>
-              <a:rPr lang="fr-FR" dirty="false" err="true" smtClean="false"/>
+              <a:rPr lang="fr-FR" dirty="0" smtClean="0"/>
+              <a:t> </a:t>
+            </a:r>
+            <a:r>
+              <a:rPr lang="fr-FR" dirty="0" err="1" smtClean="0"/>
               <a:t>auctor</a:t>
             </a:r>
             <a:r>
-              <a:rPr lang="fr-FR" dirty="false" smtClean="false"/>
+              <a:rPr lang="fr-FR" dirty="0" smtClean="0"/>
               <a:t> non, semper </a:t>
             </a:r>
             <a:r>
-              <a:rPr lang="fr-FR" dirty="false" err="true" smtClean="false"/>
+              <a:rPr lang="fr-FR" dirty="0" err="1" smtClean="0"/>
               <a:t>vel</a:t>
             </a:r>
             <a:r>
-              <a:rPr lang="fr-FR" dirty="false" smtClean="false"/>
+              <a:rPr lang="fr-FR" dirty="0" smtClean="0"/>
               <a:t> massa. </a:t>
             </a:r>
             <a:r>
-              <a:rPr lang="fr-FR" dirty="false" err="true" smtClean="false"/>
+              <a:rPr lang="fr-FR" dirty="0" err="1" smtClean="0"/>
               <a:t>Morbi</a:t>
             </a:r>
             <a:r>
-              <a:rPr lang="fr-FR" dirty="false" smtClean="false"/>
+              <a:rPr lang="fr-FR" dirty="0" smtClean="0"/>
               <a:t> et </a:t>
             </a:r>
             <a:r>
-              <a:rPr lang="fr-FR" dirty="false" err="true" smtClean="false"/>
+              <a:rPr lang="fr-FR" dirty="0" err="1" smtClean="0"/>
               <a:t>scelerisque</a:t>
             </a:r>
             <a:r>
-              <a:rPr lang="fr-FR" dirty="false" smtClean="false"/>
-              <a:t> </a:t>
-            </a:r>
-            <a:r>
-              <a:rPr lang="fr-FR" dirty="false" err="true" smtClean="false"/>
+              <a:rPr lang="fr-FR" dirty="0" smtClean="0"/>
+              <a:t> </a:t>
+            </a:r>
+            <a:r>
+              <a:rPr lang="fr-FR" dirty="0" err="1" smtClean="0"/>
               <a:t>mauris</a:t>
             </a:r>
             <a:r>
-              <a:rPr lang="fr-FR" dirty="false" smtClean="false"/>
+              <a:rPr lang="fr-FR" dirty="0" smtClean="0"/>
               <a:t>. </a:t>
             </a:r>
             <a:r>
-              <a:rPr lang="fr-FR" dirty="false" err="true" smtClean="false"/>
+              <a:rPr lang="fr-FR" dirty="0" err="1" smtClean="0"/>
               <a:t>Nulla</a:t>
             </a:r>
             <a:r>
-              <a:rPr lang="fr-FR" dirty="false" smtClean="false"/>
-              <a:t> </a:t>
-            </a:r>
-            <a:r>
-              <a:rPr lang="fr-FR" dirty="false" err="true" smtClean="false"/>
+              <a:rPr lang="fr-FR" dirty="0" smtClean="0"/>
+              <a:t> </a:t>
+            </a:r>
+            <a:r>
+              <a:rPr lang="fr-FR" dirty="0" err="1" smtClean="0"/>
               <a:t>odio</a:t>
             </a:r>
             <a:r>
-              <a:rPr lang="fr-FR" dirty="false" smtClean="false"/>
-              <a:t> </a:t>
-            </a:r>
-            <a:r>
-              <a:rPr lang="fr-FR" dirty="false" err="true" smtClean="false"/>
+              <a:rPr lang="fr-FR" dirty="0" smtClean="0"/>
+              <a:t> </a:t>
+            </a:r>
+            <a:r>
+              <a:rPr lang="fr-FR" dirty="0" err="1" smtClean="0"/>
               <a:t>nisi</a:t>
             </a:r>
             <a:r>
-              <a:rPr lang="fr-FR" dirty="false" smtClean="false"/>
+              <a:rPr lang="fr-FR" dirty="0" smtClean="0"/>
               <a:t>, </a:t>
             </a:r>
             <a:r>
-              <a:rPr lang="fr-FR" dirty="false" err="true" smtClean="false"/>
+              <a:rPr lang="fr-FR" dirty="0" err="1" smtClean="0"/>
               <a:t>dapibus</a:t>
             </a:r>
             <a:r>
-              <a:rPr lang="fr-FR" dirty="false" smtClean="false"/>
-              <a:t> </a:t>
-            </a:r>
-            <a:r>
-              <a:rPr lang="fr-FR" dirty="false" err="true" smtClean="false"/>
+              <a:rPr lang="fr-FR" dirty="0" smtClean="0"/>
+              <a:t> </a:t>
+            </a:r>
+            <a:r>
+              <a:rPr lang="fr-FR" dirty="0" err="1" smtClean="0"/>
               <a:t>sed</a:t>
             </a:r>
             <a:r>
-              <a:rPr lang="fr-FR" dirty="false" smtClean="false"/>
-              <a:t> </a:t>
-            </a:r>
-            <a:r>
-              <a:rPr lang="fr-FR" dirty="false" err="true" smtClean="false"/>
+              <a:rPr lang="fr-FR" dirty="0" smtClean="0"/>
+              <a:t> </a:t>
+            </a:r>
+            <a:r>
+              <a:rPr lang="fr-FR" dirty="0" err="1" smtClean="0"/>
               <a:t>felis</a:t>
             </a:r>
             <a:r>
-              <a:rPr lang="fr-FR" dirty="false" smtClean="false"/>
+              <a:rPr lang="fr-FR" dirty="0" smtClean="0"/>
               <a:t> ut, </a:t>
             </a:r>
             <a:r>
-              <a:rPr lang="fr-FR" dirty="false" err="true" smtClean="false"/>
+              <a:rPr lang="fr-FR" dirty="0" err="1" smtClean="0"/>
               <a:t>fermentum</a:t>
             </a:r>
             <a:r>
-              <a:rPr lang="fr-FR" dirty="false" smtClean="false"/>
-              <a:t> </a:t>
-            </a:r>
-            <a:r>
-              <a:rPr lang="fr-FR" dirty="false" err="true" smtClean="false"/>
+              <a:rPr lang="fr-FR" dirty="0" smtClean="0"/>
+              <a:t> </a:t>
+            </a:r>
+            <a:r>
+              <a:rPr lang="fr-FR" dirty="0" err="1" smtClean="0"/>
               <a:t>commodo</a:t>
             </a:r>
             <a:r>
-              <a:rPr lang="fr-FR" dirty="false" smtClean="false"/>
+              <a:rPr lang="fr-FR" dirty="0" smtClean="0"/>
               <a:t> massa. </a:t>
             </a:r>
             <a:r>
-              <a:rPr lang="fr-FR" dirty="false" err="true" smtClean="false"/>
+              <a:rPr lang="fr-FR" dirty="0" err="1" smtClean="0"/>
               <a:t>Praesent</a:t>
             </a:r>
             <a:r>
-              <a:rPr lang="fr-FR" dirty="false" smtClean="false"/>
-              <a:t> </a:t>
-            </a:r>
-            <a:r>
-              <a:rPr lang="fr-FR" dirty="false" err="true" smtClean="false"/>
+              <a:rPr lang="fr-FR" dirty="0" smtClean="0"/>
+              <a:t> </a:t>
+            </a:r>
+            <a:r>
+              <a:rPr lang="fr-FR" dirty="0" err="1" smtClean="0"/>
               <a:t>lorem</a:t>
             </a:r>
             <a:r>
-              <a:rPr lang="fr-FR" dirty="false" smtClean="false"/>
-              <a:t> </a:t>
-            </a:r>
-            <a:r>
-              <a:rPr lang="fr-FR" dirty="false" err="true" smtClean="false"/>
+              <a:rPr lang="fr-FR" dirty="0" smtClean="0"/>
+              <a:t> </a:t>
+            </a:r>
+            <a:r>
+              <a:rPr lang="fr-FR" dirty="0" err="1" smtClean="0"/>
               <a:t>ligula</a:t>
             </a:r>
             <a:r>
-              <a:rPr lang="fr-FR" dirty="false" smtClean="false"/>
+              <a:rPr lang="fr-FR" dirty="0" smtClean="0"/>
               <a:t>, </a:t>
             </a:r>
             <a:r>
-              <a:rPr lang="fr-FR" dirty="false" err="true" smtClean="false"/>
+              <a:rPr lang="fr-FR" dirty="0" err="1" smtClean="0"/>
               <a:t>lobortis</a:t>
             </a:r>
             <a:r>
-              <a:rPr lang="fr-FR" dirty="false" smtClean="false"/>
-              <a:t> </a:t>
-            </a:r>
-            <a:r>
-              <a:rPr lang="fr-FR" dirty="false" err="true" smtClean="false"/>
+              <a:rPr lang="fr-FR" dirty="0" smtClean="0"/>
+              <a:t> </a:t>
+            </a:r>
+            <a:r>
+              <a:rPr lang="fr-FR" dirty="0" err="1" smtClean="0"/>
               <a:t>vel</a:t>
             </a:r>
             <a:r>
-              <a:rPr lang="fr-FR" dirty="false" smtClean="false"/>
-              <a:t> </a:t>
-            </a:r>
-            <a:r>
-              <a:rPr lang="fr-FR" dirty="false" err="true" smtClean="false"/>
+              <a:rPr lang="fr-FR" dirty="0" smtClean="0"/>
+              <a:t> </a:t>
+            </a:r>
+            <a:r>
+              <a:rPr lang="fr-FR" dirty="0" err="1" smtClean="0"/>
               <a:t>nisi</a:t>
             </a:r>
             <a:r>
-              <a:rPr lang="fr-FR" dirty="false" smtClean="false"/>
+              <a:rPr lang="fr-FR" dirty="0" smtClean="0"/>
               <a:t> id, </a:t>
             </a:r>
             <a:r>
-              <a:rPr lang="fr-FR" dirty="false" err="true" smtClean="false"/>
+              <a:rPr lang="fr-FR" dirty="0" err="1" smtClean="0"/>
               <a:t>laoreet</a:t>
             </a:r>
             <a:r>
-              <a:rPr lang="fr-FR" dirty="false" smtClean="false"/>
-              <a:t> </a:t>
-            </a:r>
-            <a:r>
-              <a:rPr lang="fr-FR" dirty="false" err="true" smtClean="false"/>
+              <a:rPr lang="fr-FR" dirty="0" smtClean="0"/>
+              <a:t> </a:t>
+            </a:r>
+            <a:r>
+              <a:rPr lang="fr-FR" dirty="0" err="1" smtClean="0"/>
               <a:t>mattis</a:t>
             </a:r>
             <a:r>
-              <a:rPr lang="fr-FR" dirty="false" smtClean="false"/>
-              <a:t> </a:t>
-            </a:r>
-            <a:r>
-              <a:rPr lang="fr-FR" dirty="false" err="true" smtClean="false"/>
+              <a:rPr lang="fr-FR" dirty="0" smtClean="0"/>
+              <a:t> </a:t>
+            </a:r>
+            <a:r>
+              <a:rPr lang="fr-FR" dirty="0" err="1" smtClean="0"/>
               <a:t>nibh</a:t>
             </a:r>
             <a:r>
-              <a:rPr lang="fr-FR" dirty="false" smtClean="false"/>
+              <a:rPr lang="fr-FR" dirty="0" smtClean="0"/>
               <a:t>. Suspendisse </a:t>
             </a:r>
             <a:r>
-              <a:rPr lang="fr-FR" dirty="false" err="true" smtClean="false"/>
+              <a:rPr lang="fr-FR" dirty="0" err="1" smtClean="0"/>
               <a:t>auctor</a:t>
             </a:r>
             <a:r>
-              <a:rPr lang="fr-FR" dirty="false" smtClean="false"/>
-              <a:t> </a:t>
-            </a:r>
-            <a:r>
-              <a:rPr lang="fr-FR" dirty="false" err="true" smtClean="false"/>
+              <a:rPr lang="fr-FR" dirty="0" smtClean="0"/>
+              <a:t> </a:t>
+            </a:r>
+            <a:r>
+              <a:rPr lang="fr-FR" dirty="0" err="1" smtClean="0"/>
               <a:t>quam</a:t>
             </a:r>
             <a:r>
-              <a:rPr lang="fr-FR" dirty="false" smtClean="false"/>
-              <a:t> </a:t>
-            </a:r>
-            <a:r>
-              <a:rPr lang="fr-FR" dirty="false" err="true" smtClean="false"/>
+              <a:rPr lang="fr-FR" dirty="0" smtClean="0"/>
+              <a:t> </a:t>
+            </a:r>
+            <a:r>
+              <a:rPr lang="fr-FR" dirty="0" err="1" smtClean="0"/>
               <a:t>quis</a:t>
             </a:r>
             <a:r>
-              <a:rPr lang="fr-FR" dirty="false" smtClean="false"/>
+              <a:rPr lang="fr-FR" dirty="0" smtClean="0"/>
               <a:t> diam </a:t>
             </a:r>
             <a:r>
-              <a:rPr lang="fr-FR" dirty="false" err="true" smtClean="false"/>
+              <a:rPr lang="fr-FR" dirty="0" err="1" smtClean="0"/>
               <a:t>sodales</a:t>
             </a:r>
             <a:r>
-              <a:rPr lang="fr-FR" dirty="false" smtClean="false"/>
+              <a:rPr lang="fr-FR" dirty="0" smtClean="0"/>
               <a:t>, in porta </a:t>
             </a:r>
             <a:r>
-              <a:rPr lang="fr-FR" dirty="false" err="true" smtClean="false"/>
+              <a:rPr lang="fr-FR" dirty="0" err="1" smtClean="0"/>
               <a:t>turpis</a:t>
             </a:r>
             <a:r>
-              <a:rPr lang="fr-FR" dirty="false" smtClean="false"/>
+              <a:rPr lang="fr-FR" dirty="0" smtClean="0"/>
               <a:t> tristique. </a:t>
             </a:r>
             <a:r>
-              <a:rPr lang="fr-FR" dirty="false" err="true" smtClean="false"/>
+              <a:rPr lang="fr-FR" dirty="0" err="1" smtClean="0"/>
               <a:t>Proin</a:t>
             </a:r>
             <a:r>
-              <a:rPr lang="fr-FR" dirty="false" smtClean="false"/>
-              <a:t> </a:t>
-            </a:r>
-            <a:r>
-              <a:rPr lang="fr-FR" dirty="false" err="true" smtClean="false"/>
+              <a:rPr lang="fr-FR" dirty="0" smtClean="0"/>
+              <a:t> </a:t>
+            </a:r>
+            <a:r>
+              <a:rPr lang="fr-FR" dirty="0" err="1" smtClean="0"/>
               <a:t>consequat</a:t>
             </a:r>
             <a:r>
-              <a:rPr lang="fr-FR" dirty="false" smtClean="false"/>
-              <a:t> </a:t>
-            </a:r>
-            <a:r>
-              <a:rPr lang="fr-FR" dirty="false" err="true" smtClean="false"/>
+              <a:rPr lang="fr-FR" dirty="0" smtClean="0"/>
+              <a:t> </a:t>
+            </a:r>
+            <a:r>
+              <a:rPr lang="fr-FR" dirty="0" err="1" smtClean="0"/>
               <a:t>luctus</a:t>
             </a:r>
             <a:r>
-              <a:rPr lang="fr-FR" dirty="false" smtClean="false"/>
-              <a:t> </a:t>
-            </a:r>
-            <a:r>
-              <a:rPr lang="fr-FR" dirty="false" err="true" smtClean="false"/>
+              <a:rPr lang="fr-FR" dirty="0" smtClean="0"/>
+              <a:t> </a:t>
+            </a:r>
+            <a:r>
+              <a:rPr lang="fr-FR" dirty="0" err="1" smtClean="0"/>
               <a:t>aliquet</a:t>
             </a:r>
             <a:r>
-              <a:rPr lang="fr-FR" dirty="false" smtClean="false"/>
+              <a:rPr lang="fr-FR" dirty="0" smtClean="0"/>
               <a:t>. </a:t>
             </a:r>
             <a:r>
-              <a:rPr lang="fr-FR" dirty="false" err="true" smtClean="false"/>
+              <a:rPr lang="fr-FR" dirty="0" err="1" smtClean="0"/>
               <a:t>Proin</a:t>
             </a:r>
             <a:r>
-              <a:rPr lang="fr-FR" dirty="false" smtClean="false"/>
+              <a:rPr lang="fr-FR" dirty="0" smtClean="0"/>
               <a:t> bibendum </a:t>
             </a:r>
             <a:r>
-              <a:rPr lang="fr-FR" dirty="false" err="true" smtClean="false"/>
+              <a:rPr lang="fr-FR" dirty="0" err="1" smtClean="0"/>
               <a:t>tortor</a:t>
             </a:r>
             <a:r>
-              <a:rPr lang="fr-FR" dirty="false" smtClean="false"/>
-              <a:t> </a:t>
-            </a:r>
-            <a:r>
-              <a:rPr lang="fr-FR" dirty="false" err="true" smtClean="false"/>
+              <a:rPr lang="fr-FR" dirty="0" smtClean="0"/>
+              <a:t> </a:t>
+            </a:r>
+            <a:r>
+              <a:rPr lang="fr-FR" dirty="0" err="1" smtClean="0"/>
               <a:t>lectus</a:t>
             </a:r>
             <a:r>
-              <a:rPr lang="fr-FR" dirty="false" smtClean="false"/>
+              <a:rPr lang="fr-FR" dirty="0" smtClean="0"/>
               <a:t>, </a:t>
             </a:r>
             <a:r>
-              <a:rPr lang="fr-FR" dirty="false" err="true" smtClean="false"/>
+              <a:rPr lang="fr-FR" dirty="0" err="1" smtClean="0"/>
               <a:t>sagittis</a:t>
             </a:r>
             <a:r>
-              <a:rPr lang="fr-FR" dirty="false" smtClean="false"/>
-              <a:t> </a:t>
-            </a:r>
-            <a:r>
-              <a:rPr lang="fr-FR" dirty="false" err="true" smtClean="false"/>
+              <a:rPr lang="fr-FR" dirty="0" smtClean="0"/>
+              <a:t> </a:t>
+            </a:r>
+            <a:r>
+              <a:rPr lang="fr-FR" dirty="0" err="1" smtClean="0"/>
               <a:t>suscipit</a:t>
             </a:r>
             <a:r>
-              <a:rPr lang="fr-FR" dirty="false" smtClean="false"/>
+              <a:rPr lang="fr-FR" dirty="0" smtClean="0"/>
               <a:t> ante </a:t>
             </a:r>
             <a:r>
-              <a:rPr lang="fr-FR" dirty="false" err="true" smtClean="false"/>
+              <a:rPr lang="fr-FR" dirty="0" err="1" smtClean="0"/>
               <a:t>scelerisque</a:t>
             </a:r>
             <a:r>
-              <a:rPr lang="fr-FR" dirty="false" smtClean="false"/>
-              <a:t> </a:t>
-            </a:r>
-            <a:r>
-              <a:rPr lang="fr-FR" dirty="false" err="true" smtClean="false"/>
+              <a:rPr lang="fr-FR" dirty="0" smtClean="0"/>
+              <a:t> </a:t>
+            </a:r>
+            <a:r>
+              <a:rPr lang="fr-FR" dirty="0" err="1" smtClean="0"/>
               <a:t>sit</a:t>
             </a:r>
             <a:r>
-              <a:rPr lang="fr-FR" dirty="false" smtClean="false"/>
-              <a:t> </a:t>
-            </a:r>
-            <a:r>
-              <a:rPr lang="fr-FR" dirty="false" err="true" smtClean="false"/>
+              <a:rPr lang="fr-FR" dirty="0" smtClean="0"/>
+              <a:t> </a:t>
+            </a:r>
+            <a:r>
+              <a:rPr lang="fr-FR" dirty="0" err="1" smtClean="0"/>
               <a:t>amet</a:t>
             </a:r>
             <a:r>
-              <a:rPr lang="fr-FR" dirty="false" smtClean="false"/>
+              <a:rPr lang="fr-FR" dirty="0" smtClean="0"/>
               <a:t>. </a:t>
             </a:r>
             <a:r>
-              <a:rPr lang="fr-FR" dirty="false" err="true" smtClean="false"/>
+              <a:rPr lang="fr-FR" dirty="0" err="1" smtClean="0"/>
               <a:t>Integer</a:t>
             </a:r>
             <a:r>
-              <a:rPr lang="fr-FR" dirty="false" smtClean="false"/>
-              <a:t> </a:t>
-            </a:r>
-            <a:r>
-              <a:rPr lang="fr-FR" dirty="false" err="true" smtClean="false"/>
+              <a:rPr lang="fr-FR" dirty="0" smtClean="0"/>
+              <a:t> </a:t>
+            </a:r>
+            <a:r>
+              <a:rPr lang="fr-FR" dirty="0" err="1" smtClean="0"/>
               <a:t>sed</a:t>
             </a:r>
             <a:r>
-              <a:rPr lang="fr-FR" dirty="false" smtClean="false"/>
+              <a:rPr lang="fr-FR" dirty="0" smtClean="0"/>
               <a:t> cursus </a:t>
             </a:r>
             <a:r>
-              <a:rPr lang="fr-FR" dirty="false" err="true" smtClean="false"/>
+              <a:rPr lang="fr-FR" dirty="0" err="1" smtClean="0"/>
               <a:t>metus</a:t>
             </a:r>
             <a:r>
-              <a:rPr lang="fr-FR" dirty="false" smtClean="false"/>
+              <a:rPr lang="fr-FR" dirty="0" smtClean="0"/>
               <a:t>. Ut id </a:t>
             </a:r>
             <a:r>
-              <a:rPr lang="fr-FR" dirty="false" err="true" smtClean="false"/>
+              <a:rPr lang="fr-FR" dirty="0" err="1" smtClean="0"/>
               <a:t>dapibus</a:t>
             </a:r>
             <a:r>
-              <a:rPr lang="fr-FR" dirty="false" smtClean="false"/>
-              <a:t> </a:t>
-            </a:r>
-            <a:r>
-              <a:rPr lang="fr-FR" dirty="false" err="true" smtClean="false"/>
+              <a:rPr lang="fr-FR" dirty="0" smtClean="0"/>
+              <a:t> </a:t>
+            </a:r>
+            <a:r>
+              <a:rPr lang="fr-FR" dirty="0" err="1" smtClean="0"/>
               <a:t>mauris</a:t>
             </a:r>
             <a:r>
-              <a:rPr lang="fr-FR" dirty="false" smtClean="false"/>
+              <a:rPr lang="fr-FR" dirty="0" smtClean="0"/>
               <a:t>. Nunc in </a:t>
             </a:r>
             <a:r>
-              <a:rPr lang="fr-FR" dirty="false" err="true" smtClean="false"/>
+              <a:rPr lang="fr-FR" dirty="0" err="1" smtClean="0"/>
               <a:t>risus</a:t>
             </a:r>
             <a:r>
-              <a:rPr lang="fr-FR" dirty="false" smtClean="false"/>
-              <a:t> </a:t>
-            </a:r>
-            <a:r>
-              <a:rPr lang="fr-FR" dirty="false" err="true" smtClean="false"/>
+              <a:rPr lang="fr-FR" dirty="0" smtClean="0"/>
+              <a:t> </a:t>
+            </a:r>
+            <a:r>
+              <a:rPr lang="fr-FR" dirty="0" err="1" smtClean="0"/>
               <a:t>leo</a:t>
             </a:r>
             <a:r>
-              <a:rPr lang="fr-FR" dirty="false" smtClean="false"/>
+              <a:rPr lang="fr-FR" dirty="0" smtClean="0"/>
               <a:t>. </a:t>
             </a:r>
             <a:r>
-              <a:rPr lang="fr-FR" dirty="false" err="true" smtClean="false"/>
+              <a:rPr lang="fr-FR" dirty="0" err="1" smtClean="0"/>
               <a:t>Mauris</a:t>
             </a:r>
             <a:r>
-              <a:rPr lang="fr-FR" dirty="false" smtClean="false"/>
+              <a:rPr lang="fr-FR" dirty="0" smtClean="0"/>
               <a:t> eu </a:t>
             </a:r>
             <a:r>
-              <a:rPr lang="fr-FR" dirty="false" err="true" smtClean="false"/>
+              <a:rPr lang="fr-FR" dirty="0" err="1" smtClean="0"/>
               <a:t>dictum</a:t>
             </a:r>
             <a:r>
-              <a:rPr lang="fr-FR" dirty="false" smtClean="false"/>
+              <a:rPr lang="fr-FR" dirty="0" smtClean="0"/>
               <a:t> nunc, </a:t>
             </a:r>
             <a:r>
-              <a:rPr lang="fr-FR" dirty="false" err="true" smtClean="false"/>
+              <a:rPr lang="fr-FR" dirty="0" err="1" smtClean="0"/>
               <a:t>posuere</a:t>
             </a:r>
             <a:r>
-              <a:rPr lang="fr-FR" dirty="false" smtClean="false"/>
-              <a:t> </a:t>
-            </a:r>
-            <a:r>
-              <a:rPr lang="fr-FR" dirty="false" err="true" smtClean="false"/>
+              <a:rPr lang="fr-FR" dirty="0" smtClean="0"/>
+              <a:t> </a:t>
+            </a:r>
+            <a:r>
+              <a:rPr lang="fr-FR" dirty="0" err="1" smtClean="0"/>
               <a:t>volutpat</a:t>
             </a:r>
             <a:r>
-              <a:rPr lang="fr-FR" dirty="false" smtClean="false"/>
-              <a:t> </a:t>
-            </a:r>
-            <a:r>
-              <a:rPr lang="fr-FR" dirty="false" err="true" smtClean="false"/>
+              <a:rPr lang="fr-FR" dirty="0" smtClean="0"/>
+              <a:t> </a:t>
+            </a:r>
+            <a:r>
+              <a:rPr lang="fr-FR" dirty="0" err="1" smtClean="0"/>
               <a:t>urna</a:t>
             </a:r>
             <a:r>
-              <a:rPr lang="fr-FR" dirty="false" smtClean="false"/>
+              <a:rPr lang="fr-FR" dirty="0" smtClean="0"/>
               <a:t>. </a:t>
             </a:r>
             <a:r>
-              <a:rPr lang="fr-FR" dirty="false" err="true" smtClean="false"/>
+              <a:rPr lang="fr-FR" dirty="0" err="1" smtClean="0"/>
               <a:t>Pellentesque</a:t>
             </a:r>
             <a:r>
-              <a:rPr lang="fr-FR" dirty="false" smtClean="false"/>
+              <a:rPr lang="fr-FR" dirty="0" smtClean="0"/>
               <a:t> at </a:t>
             </a:r>
             <a:r>
-              <a:rPr lang="fr-FR" dirty="false" err="true" smtClean="false"/>
+              <a:rPr lang="fr-FR" dirty="0" err="1" smtClean="0"/>
               <a:t>nisl</a:t>
             </a:r>
             <a:r>
-              <a:rPr lang="fr-FR" dirty="false" smtClean="false"/>
-              <a:t> </a:t>
-            </a:r>
-            <a:r>
-              <a:rPr lang="fr-FR" dirty="false" err="true" smtClean="false"/>
+              <a:rPr lang="fr-FR" dirty="0" smtClean="0"/>
+              <a:t> </a:t>
+            </a:r>
+            <a:r>
+              <a:rPr lang="fr-FR" dirty="0" err="1" smtClean="0"/>
               <a:t>sodales</a:t>
             </a:r>
             <a:r>
-              <a:rPr lang="fr-FR" dirty="false" smtClean="false"/>
+              <a:rPr lang="fr-FR" dirty="0" smtClean="0"/>
               <a:t>, </a:t>
             </a:r>
             <a:r>
-              <a:rPr lang="fr-FR" dirty="false" err="true" smtClean="false"/>
+              <a:rPr lang="fr-FR" dirty="0" err="1" smtClean="0"/>
               <a:t>tempus</a:t>
             </a:r>
             <a:r>
-              <a:rPr lang="fr-FR" dirty="false" smtClean="false"/>
-              <a:t> </a:t>
-            </a:r>
-            <a:r>
-              <a:rPr lang="fr-FR" dirty="false" err="true" smtClean="false"/>
+              <a:rPr lang="fr-FR" dirty="0" smtClean="0"/>
+              <a:t> </a:t>
+            </a:r>
+            <a:r>
+              <a:rPr lang="fr-FR" dirty="0" err="1" smtClean="0"/>
               <a:t>lacus</a:t>
             </a:r>
             <a:r>
-              <a:rPr lang="fr-FR" dirty="false" smtClean="false"/>
-              <a:t> </a:t>
-            </a:r>
-            <a:r>
-              <a:rPr lang="fr-FR" dirty="false" err="true" smtClean="false"/>
+              <a:rPr lang="fr-FR" dirty="0" smtClean="0"/>
+              <a:t> </a:t>
+            </a:r>
+            <a:r>
+              <a:rPr lang="fr-FR" dirty="0" err="1" smtClean="0"/>
               <a:t>ac</a:t>
             </a:r>
             <a:r>
-              <a:rPr lang="fr-FR" dirty="false" smtClean="false"/>
+              <a:rPr lang="fr-FR" dirty="0" smtClean="0"/>
               <a:t>, </a:t>
             </a:r>
             <a:r>
-              <a:rPr lang="fr-FR" dirty="false" err="true" smtClean="false"/>
+              <a:rPr lang="fr-FR" dirty="0" err="1" smtClean="0"/>
               <a:t>consectetur</a:t>
             </a:r>
             <a:r>
-              <a:rPr lang="fr-FR" dirty="false" smtClean="false"/>
-              <a:t> </a:t>
-            </a:r>
-            <a:r>
-              <a:rPr lang="fr-FR" dirty="false" err="true" smtClean="false"/>
+              <a:rPr lang="fr-FR" dirty="0" smtClean="0"/>
+              <a:t> </a:t>
+            </a:r>
+            <a:r>
+              <a:rPr lang="fr-FR" dirty="0" err="1" smtClean="0"/>
               <a:t>nibh</a:t>
             </a:r>
             <a:r>
-              <a:rPr lang="fr-FR" dirty="false" smtClean="false"/>
+              <a:rPr lang="fr-FR" dirty="0" smtClean="0"/>
               <a:t>.</a:t>
             </a:r>
           </a:p>
           <a:p>
             <a:r>
-              <a:rPr lang="fr-FR" dirty="false" err="true" smtClean="false"/>
+              <a:rPr lang="fr-FR" dirty="0" err="1" smtClean="0"/>
               <a:t>Aenean</a:t>
             </a:r>
             <a:r>
-              <a:rPr lang="fr-FR" dirty="false" smtClean="false"/>
-              <a:t> </a:t>
-            </a:r>
-            <a:r>
-              <a:rPr lang="fr-FR" dirty="false" err="true" smtClean="false"/>
+              <a:rPr lang="fr-FR" dirty="0" smtClean="0"/>
+              <a:t> </a:t>
+            </a:r>
+            <a:r>
+              <a:rPr lang="fr-FR" dirty="0" err="1" smtClean="0"/>
               <a:t>convallis</a:t>
             </a:r>
             <a:r>
-              <a:rPr lang="fr-FR" dirty="false" smtClean="false"/>
-              <a:t> </a:t>
-            </a:r>
-            <a:r>
-              <a:rPr lang="fr-FR" dirty="false" err="true" smtClean="false"/>
+              <a:rPr lang="fr-FR" dirty="0" smtClean="0"/>
+              <a:t> </a:t>
+            </a:r>
+            <a:r>
+              <a:rPr lang="fr-FR" dirty="0" err="1" smtClean="0"/>
               <a:t>lacus</a:t>
             </a:r>
             <a:r>
-              <a:rPr lang="fr-FR" dirty="false" smtClean="false"/>
+              <a:rPr lang="fr-FR" dirty="0" smtClean="0"/>
               <a:t> at </a:t>
             </a:r>
             <a:r>
-              <a:rPr lang="fr-FR" dirty="false" err="true" smtClean="false"/>
+              <a:rPr lang="fr-FR" dirty="0" err="1" smtClean="0"/>
               <a:t>velit</a:t>
             </a:r>
             <a:r>
-              <a:rPr lang="fr-FR" dirty="false" smtClean="false"/>
-              <a:t> </a:t>
-            </a:r>
-            <a:r>
-              <a:rPr lang="fr-FR" dirty="false" err="true" smtClean="false"/>
+              <a:rPr lang="fr-FR" dirty="0" smtClean="0"/>
+              <a:t> </a:t>
+            </a:r>
+            <a:r>
+              <a:rPr lang="fr-FR" dirty="0" err="1" smtClean="0"/>
               <a:t>rhoncus</a:t>
             </a:r>
             <a:r>
-              <a:rPr lang="fr-FR" dirty="false" smtClean="false"/>
+              <a:rPr lang="fr-FR" dirty="0" smtClean="0"/>
               <a:t>, non </a:t>
             </a:r>
             <a:r>
-              <a:rPr lang="fr-FR" dirty="false" err="true" smtClean="false"/>
+              <a:rPr lang="fr-FR" dirty="0" err="1" smtClean="0"/>
               <a:t>rhoncus</a:t>
             </a:r>
             <a:r>
-              <a:rPr lang="fr-FR" dirty="false" smtClean="false"/>
-              <a:t> </a:t>
-            </a:r>
-            <a:r>
-              <a:rPr lang="fr-FR" dirty="false" err="true" smtClean="false"/>
+              <a:rPr lang="fr-FR" dirty="0" smtClean="0"/>
+              <a:t> </a:t>
+            </a:r>
+            <a:r>
+              <a:rPr lang="fr-FR" dirty="0" err="1" smtClean="0"/>
               <a:t>metus</a:t>
             </a:r>
             <a:r>
-              <a:rPr lang="fr-FR" dirty="false" smtClean="false"/>
-              <a:t> </a:t>
-            </a:r>
-            <a:r>
-              <a:rPr lang="fr-FR" dirty="false" err="true" smtClean="false"/>
+              <a:rPr lang="fr-FR" dirty="0" smtClean="0"/>
+              <a:t> </a:t>
+            </a:r>
+            <a:r>
+              <a:rPr lang="fr-FR" dirty="0" err="1" smtClean="0"/>
               <a:t>finibus</a:t>
             </a:r>
             <a:r>
-              <a:rPr lang="fr-FR" dirty="false" smtClean="false"/>
+              <a:rPr lang="fr-FR" dirty="0" smtClean="0"/>
               <a:t>. Sed est magna, </a:t>
             </a:r>
             <a:r>
-              <a:rPr lang="fr-FR" dirty="false" err="true" smtClean="false"/>
+              <a:rPr lang="fr-FR" dirty="0" err="1" smtClean="0"/>
               <a:t>porttitor</a:t>
             </a:r>
             <a:r>
-              <a:rPr lang="fr-FR" dirty="false" smtClean="false"/>
-              <a:t> </a:t>
-            </a:r>
-            <a:r>
-              <a:rPr lang="fr-FR" dirty="false" err="true" smtClean="false"/>
+              <a:rPr lang="fr-FR" dirty="0" smtClean="0"/>
+              <a:t> </a:t>
+            </a:r>
+            <a:r>
+              <a:rPr lang="fr-FR" dirty="0" err="1" smtClean="0"/>
               <a:t>quis</a:t>
             </a:r>
             <a:r>
-              <a:rPr lang="fr-FR" dirty="false" smtClean="false"/>
-              <a:t> </a:t>
-            </a:r>
-            <a:r>
-              <a:rPr lang="fr-FR" dirty="false" err="true" smtClean="false"/>
+              <a:rPr lang="fr-FR" dirty="0" smtClean="0"/>
+              <a:t> </a:t>
+            </a:r>
+            <a:r>
+              <a:rPr lang="fr-FR" dirty="0" err="1" smtClean="0"/>
               <a:t>condimentum</a:t>
             </a:r>
             <a:r>
-              <a:rPr lang="fr-FR" dirty="false" smtClean="false"/>
-              <a:t> </a:t>
-            </a:r>
-            <a:r>
-              <a:rPr lang="fr-FR" dirty="false" err="true" smtClean="false"/>
+              <a:rPr lang="fr-FR" dirty="0" smtClean="0"/>
+              <a:t> </a:t>
+            </a:r>
+            <a:r>
+              <a:rPr lang="fr-FR" dirty="0" err="1" smtClean="0"/>
               <a:t>quis</a:t>
             </a:r>
             <a:r>
-              <a:rPr lang="fr-FR" dirty="false" smtClean="false"/>
+              <a:rPr lang="fr-FR" dirty="0" smtClean="0"/>
               <a:t>, </a:t>
             </a:r>
             <a:r>
-              <a:rPr lang="fr-FR" dirty="false" err="true" smtClean="false"/>
+              <a:rPr lang="fr-FR" dirty="0" err="1" smtClean="0"/>
               <a:t>luctus</a:t>
             </a:r>
             <a:r>
-              <a:rPr lang="fr-FR" dirty="false" smtClean="false"/>
-              <a:t> </a:t>
-            </a:r>
-            <a:r>
-              <a:rPr lang="fr-FR" dirty="false" err="true" smtClean="false"/>
+              <a:rPr lang="fr-FR" dirty="0" smtClean="0"/>
+              <a:t> </a:t>
+            </a:r>
+            <a:r>
+              <a:rPr lang="fr-FR" dirty="0" err="1" smtClean="0"/>
               <a:t>sed</a:t>
             </a:r>
             <a:r>
-              <a:rPr lang="fr-FR" dirty="false" smtClean="false"/>
+              <a:rPr lang="fr-FR" dirty="0" smtClean="0"/>
               <a:t> mi. </a:t>
             </a:r>
             <a:r>
-              <a:rPr lang="fr-FR" dirty="false" err="true" smtClean="false"/>
+              <a:rPr lang="fr-FR" dirty="0" err="1" smtClean="0"/>
               <a:t>Nulla</a:t>
             </a:r>
             <a:r>
-              <a:rPr lang="fr-FR" dirty="false" smtClean="false"/>
+              <a:rPr lang="fr-FR" dirty="0" smtClean="0"/>
               <a:t> eu </a:t>
             </a:r>
             <a:r>
-              <a:rPr lang="fr-FR" dirty="false" err="true" smtClean="false"/>
+              <a:rPr lang="fr-FR" dirty="0" err="1" smtClean="0"/>
               <a:t>ullamcorper</a:t>
             </a:r>
             <a:r>
-              <a:rPr lang="fr-FR" dirty="false" smtClean="false"/>
+              <a:rPr lang="fr-FR" dirty="0" smtClean="0"/>
               <a:t> mi. Suspendisse </a:t>
             </a:r>
             <a:r>
-              <a:rPr lang="fr-FR" dirty="false" err="true" smtClean="false"/>
+              <a:rPr lang="fr-FR" dirty="0" err="1" smtClean="0"/>
               <a:t>sagittis</a:t>
             </a:r>
             <a:r>
-              <a:rPr lang="fr-FR" dirty="false" smtClean="false"/>
+              <a:rPr lang="fr-FR" dirty="0" smtClean="0"/>
               <a:t>, </a:t>
             </a:r>
             <a:r>
-              <a:rPr lang="fr-FR" dirty="false" err="true" smtClean="false"/>
+              <a:rPr lang="fr-FR" dirty="0" err="1" smtClean="0"/>
               <a:t>quam</a:t>
             </a:r>
             <a:r>
-              <a:rPr lang="fr-FR" dirty="false" smtClean="false"/>
+              <a:rPr lang="fr-FR" dirty="0" smtClean="0"/>
               <a:t> id </a:t>
             </a:r>
             <a:r>
-              <a:rPr lang="fr-FR" dirty="false" err="true" smtClean="false"/>
+              <a:rPr lang="fr-FR" dirty="0" err="1" smtClean="0"/>
               <a:t>elementum</a:t>
             </a:r>
             <a:r>
-              <a:rPr lang="fr-FR" dirty="false" smtClean="false"/>
-              <a:t> </a:t>
-            </a:r>
-            <a:r>
-              <a:rPr lang="fr-FR" dirty="false" err="true" smtClean="false"/>
+              <a:rPr lang="fr-FR" dirty="0" smtClean="0"/>
+              <a:t> </a:t>
+            </a:r>
+            <a:r>
+              <a:rPr lang="fr-FR" dirty="0" err="1" smtClean="0"/>
               <a:t>feugiat</a:t>
             </a:r>
             <a:r>
-              <a:rPr lang="fr-FR" dirty="false" smtClean="false"/>
+              <a:rPr lang="fr-FR" dirty="0" smtClean="0"/>
               <a:t>, diam </a:t>
             </a:r>
             <a:r>
-              <a:rPr lang="fr-FR" dirty="false" err="true" smtClean="false"/>
+              <a:rPr lang="fr-FR" dirty="0" err="1" smtClean="0"/>
               <a:t>arcu</a:t>
             </a:r>
             <a:r>
-              <a:rPr lang="fr-FR" dirty="false" smtClean="false"/>
-              <a:t> </a:t>
-            </a:r>
-            <a:r>
-              <a:rPr lang="fr-FR" dirty="false" err="true" smtClean="false"/>
+              <a:rPr lang="fr-FR" dirty="0" smtClean="0"/>
+              <a:t> </a:t>
+            </a:r>
+            <a:r>
+              <a:rPr lang="fr-FR" dirty="0" err="1" smtClean="0"/>
               <a:t>fringilla</a:t>
             </a:r>
             <a:r>
-              <a:rPr lang="fr-FR" dirty="false" smtClean="false"/>
-              <a:t> </a:t>
-            </a:r>
-            <a:r>
-              <a:rPr lang="fr-FR" dirty="false" err="true" smtClean="false"/>
+              <a:rPr lang="fr-FR" dirty="0" smtClean="0"/>
+              <a:t> </a:t>
+            </a:r>
+            <a:r>
+              <a:rPr lang="fr-FR" dirty="0" err="1" smtClean="0"/>
               <a:t>dui</a:t>
             </a:r>
             <a:r>
-              <a:rPr lang="fr-FR" dirty="false" smtClean="false"/>
+              <a:rPr lang="fr-FR" dirty="0" smtClean="0"/>
               <a:t>, eu </a:t>
             </a:r>
             <a:r>
-              <a:rPr lang="fr-FR" dirty="false" err="true" smtClean="false"/>
+              <a:rPr lang="fr-FR" dirty="0" err="1" smtClean="0"/>
               <a:t>finibus</a:t>
             </a:r>
             <a:r>
-              <a:rPr lang="fr-FR" dirty="false" smtClean="false"/>
-              <a:t> </a:t>
-            </a:r>
-            <a:r>
-              <a:rPr lang="fr-FR" dirty="false" err="true" smtClean="false"/>
+              <a:rPr lang="fr-FR" dirty="0" smtClean="0"/>
+              <a:t> </a:t>
+            </a:r>
+            <a:r>
+              <a:rPr lang="fr-FR" dirty="0" err="1" smtClean="0"/>
               <a:t>dolor</a:t>
             </a:r>
             <a:r>
-              <a:rPr lang="fr-FR" dirty="false" smtClean="false"/>
-              <a:t> </a:t>
-            </a:r>
-            <a:r>
-              <a:rPr lang="fr-FR" dirty="false" err="true" smtClean="false"/>
+              <a:rPr lang="fr-FR" dirty="0" smtClean="0"/>
+              <a:t> </a:t>
+            </a:r>
+            <a:r>
+              <a:rPr lang="fr-FR" dirty="0" err="1" smtClean="0"/>
               <a:t>tellus</a:t>
             </a:r>
             <a:r>
-              <a:rPr lang="fr-FR" dirty="false" smtClean="false"/>
+              <a:rPr lang="fr-FR" dirty="0" smtClean="0"/>
               <a:t> in </a:t>
             </a:r>
             <a:r>
-              <a:rPr lang="fr-FR" dirty="false" err="true" smtClean="false"/>
+              <a:rPr lang="fr-FR" dirty="0" err="1" smtClean="0"/>
               <a:t>augue</a:t>
             </a:r>
             <a:r>
-              <a:rPr lang="fr-FR" dirty="false" smtClean="false"/>
+              <a:rPr lang="fr-FR" dirty="0" smtClean="0"/>
               <a:t>. Nam </a:t>
             </a:r>
             <a:r>
-              <a:rPr lang="fr-FR" dirty="false" err="true" smtClean="false"/>
+              <a:rPr lang="fr-FR" dirty="0" err="1" smtClean="0"/>
               <a:t>consectetur</a:t>
             </a:r>
             <a:r>
-              <a:rPr lang="fr-FR" dirty="false" smtClean="false"/>
-              <a:t> </a:t>
-            </a:r>
-            <a:r>
-              <a:rPr lang="fr-FR" dirty="false" err="true" smtClean="false"/>
+              <a:rPr lang="fr-FR" dirty="0" smtClean="0"/>
+              <a:t> </a:t>
+            </a:r>
+            <a:r>
+              <a:rPr lang="fr-FR" dirty="0" err="1" smtClean="0"/>
               <a:t>luctus</a:t>
             </a:r>
             <a:r>
-              <a:rPr lang="fr-FR" dirty="false" smtClean="false"/>
-              <a:t> </a:t>
-            </a:r>
-            <a:r>
-              <a:rPr lang="fr-FR" dirty="false" err="true" smtClean="false"/>
+              <a:rPr lang="fr-FR" dirty="0" smtClean="0"/>
+              <a:t> </a:t>
+            </a:r>
+            <a:r>
+              <a:rPr lang="fr-FR" dirty="0" err="1" smtClean="0"/>
               <a:t>lectus</a:t>
             </a:r>
             <a:r>
-              <a:rPr lang="fr-FR" dirty="false" smtClean="false"/>
-              <a:t> </a:t>
-            </a:r>
-            <a:r>
-              <a:rPr lang="fr-FR" dirty="false" err="true" smtClean="false"/>
+              <a:rPr lang="fr-FR" dirty="0" smtClean="0"/>
+              <a:t> </a:t>
+            </a:r>
+            <a:r>
+              <a:rPr lang="fr-FR" dirty="0" err="1" smtClean="0"/>
               <a:t>eget</a:t>
             </a:r>
             <a:r>
-              <a:rPr lang="fr-FR" dirty="false" smtClean="false"/>
-              <a:t> </a:t>
-            </a:r>
-            <a:r>
-              <a:rPr lang="fr-FR" dirty="false" err="true" smtClean="false"/>
+              <a:rPr lang="fr-FR" dirty="0" smtClean="0"/>
+              <a:t> </a:t>
+            </a:r>
+            <a:r>
+              <a:rPr lang="fr-FR" dirty="0" err="1" smtClean="0"/>
               <a:t>congue</a:t>
             </a:r>
             <a:r>
-              <a:rPr lang="fr-FR" dirty="false" smtClean="false"/>
+              <a:rPr lang="fr-FR" dirty="0" smtClean="0"/>
               <a:t>. Sed </a:t>
             </a:r>
             <a:r>
-              <a:rPr lang="fr-FR" dirty="false" err="true" smtClean="false"/>
+              <a:rPr lang="fr-FR" dirty="0" err="1" smtClean="0"/>
               <a:t>fringilla</a:t>
             </a:r>
             <a:r>
-              <a:rPr lang="fr-FR" dirty="false" smtClean="false"/>
+              <a:rPr lang="fr-FR" dirty="0" smtClean="0"/>
               <a:t> non ex </a:t>
             </a:r>
             <a:r>
-              <a:rPr lang="fr-FR" dirty="false" err="true" smtClean="false"/>
+              <a:rPr lang="fr-FR" dirty="0" err="1" smtClean="0"/>
               <a:t>sollicitudin</a:t>
             </a:r>
             <a:r>
-              <a:rPr lang="fr-FR" dirty="false" smtClean="false"/>
-              <a:t> </a:t>
-            </a:r>
-            <a:r>
-              <a:rPr lang="fr-FR" dirty="false" err="true" smtClean="false"/>
+              <a:rPr lang="fr-FR" dirty="0" smtClean="0"/>
+              <a:t> </a:t>
+            </a:r>
+            <a:r>
+              <a:rPr lang="fr-FR" dirty="0" err="1" smtClean="0"/>
               <a:t>ultricies</a:t>
             </a:r>
             <a:r>
-              <a:rPr lang="fr-FR" dirty="false" smtClean="false"/>
+              <a:rPr lang="fr-FR" dirty="0" smtClean="0"/>
               <a:t>. </a:t>
             </a:r>
             <a:r>
-              <a:rPr lang="fr-FR" dirty="false" err="true" smtClean="false"/>
+              <a:rPr lang="fr-FR" dirty="0" err="1" smtClean="0"/>
               <a:t>Integer</a:t>
             </a:r>
             <a:r>
-              <a:rPr lang="fr-FR" dirty="false" smtClean="false"/>
-              <a:t> </a:t>
-            </a:r>
-            <a:r>
-              <a:rPr lang="fr-FR" dirty="false" err="true" smtClean="false"/>
+              <a:rPr lang="fr-FR" dirty="0" smtClean="0"/>
+              <a:t> </a:t>
+            </a:r>
+            <a:r>
+              <a:rPr lang="fr-FR" dirty="0" err="1" smtClean="0"/>
               <a:t>ligula</a:t>
             </a:r>
             <a:r>
-              <a:rPr lang="fr-FR" dirty="false" smtClean="false"/>
-              <a:t> </a:t>
-            </a:r>
-            <a:r>
-              <a:rPr lang="fr-FR" dirty="false" err="true" smtClean="false"/>
+              <a:rPr lang="fr-FR" dirty="0" smtClean="0"/>
+              <a:t> </a:t>
+            </a:r>
+            <a:r>
+              <a:rPr lang="fr-FR" dirty="0" err="1" smtClean="0"/>
               <a:t>quam</a:t>
             </a:r>
             <a:r>
-              <a:rPr lang="fr-FR" dirty="false" smtClean="false"/>
+              <a:rPr lang="fr-FR" dirty="0" smtClean="0"/>
               <a:t>, </a:t>
             </a:r>
             <a:r>
-              <a:rPr lang="fr-FR" dirty="false" err="true" smtClean="false"/>
+              <a:rPr lang="fr-FR" dirty="0" err="1" smtClean="0"/>
               <a:t>sodales</a:t>
             </a:r>
             <a:r>
-              <a:rPr lang="fr-FR" dirty="false" smtClean="false"/>
+              <a:rPr lang="fr-FR" dirty="0" smtClean="0"/>
               <a:t> nec </a:t>
             </a:r>
             <a:r>
-              <a:rPr lang="fr-FR" dirty="false" err="true" smtClean="false"/>
+              <a:rPr lang="fr-FR" dirty="0" err="1" smtClean="0"/>
               <a:t>nulla</a:t>
             </a:r>
             <a:r>
-              <a:rPr lang="fr-FR" dirty="false" smtClean="false"/>
+              <a:rPr lang="fr-FR" dirty="0" smtClean="0"/>
               <a:t> at, </a:t>
             </a:r>
             <a:r>
-              <a:rPr lang="fr-FR" dirty="false" err="true" smtClean="false"/>
+              <a:rPr lang="fr-FR" dirty="0" err="1" smtClean="0"/>
               <a:t>rutrum</a:t>
             </a:r>
             <a:r>
-              <a:rPr lang="fr-FR" dirty="false" smtClean="false"/>
-              <a:t> </a:t>
-            </a:r>
-            <a:r>
-              <a:rPr lang="fr-FR" dirty="false" err="true" smtClean="false"/>
+              <a:rPr lang="fr-FR" dirty="0" smtClean="0"/>
+              <a:t> </a:t>
+            </a:r>
+            <a:r>
+              <a:rPr lang="fr-FR" dirty="0" err="1" smtClean="0"/>
               <a:t>suscipit</a:t>
             </a:r>
             <a:r>
-              <a:rPr lang="fr-FR" dirty="false" smtClean="false"/>
-              <a:t> </a:t>
-            </a:r>
-            <a:r>
-              <a:rPr lang="fr-FR" dirty="false" err="true" smtClean="false"/>
+              <a:rPr lang="fr-FR" dirty="0" smtClean="0"/>
+              <a:t> </a:t>
+            </a:r>
+            <a:r>
+              <a:rPr lang="fr-FR" dirty="0" err="1" smtClean="0"/>
               <a:t>nisl</a:t>
             </a:r>
             <a:r>
-              <a:rPr lang="fr-FR" dirty="false" smtClean="false"/>
+              <a:rPr lang="fr-FR" dirty="0" smtClean="0"/>
               <a:t>. </a:t>
             </a:r>
             <a:r>
-              <a:rPr lang="fr-FR" dirty="false" err="true" smtClean="false"/>
+              <a:rPr lang="fr-FR" dirty="0" err="1" smtClean="0"/>
               <a:t>Cras</a:t>
             </a:r>
             <a:r>
-              <a:rPr lang="fr-FR" dirty="false" smtClean="false"/>
-              <a:t> </a:t>
-            </a:r>
-            <a:r>
-              <a:rPr lang="fr-FR" dirty="false" err="true" smtClean="false"/>
+              <a:rPr lang="fr-FR" dirty="0" smtClean="0"/>
+              <a:t> </a:t>
+            </a:r>
+            <a:r>
+              <a:rPr lang="fr-FR" dirty="0" err="1" smtClean="0"/>
               <a:t>ullamcorper</a:t>
             </a:r>
             <a:r>
-              <a:rPr lang="fr-FR" dirty="false" smtClean="false"/>
+              <a:rPr lang="fr-FR" dirty="0" smtClean="0"/>
               <a:t> magna </a:t>
             </a:r>
             <a:r>
-              <a:rPr lang="fr-FR" dirty="false" err="true" smtClean="false"/>
+              <a:rPr lang="fr-FR" dirty="0" err="1" smtClean="0"/>
               <a:t>eros</a:t>
             </a:r>
             <a:r>
-              <a:rPr lang="fr-FR" dirty="false" smtClean="false"/>
+              <a:rPr lang="fr-FR" dirty="0" smtClean="0"/>
               <a:t>, </a:t>
             </a:r>
             <a:r>
-              <a:rPr lang="fr-FR" dirty="false" err="true" smtClean="false"/>
+              <a:rPr lang="fr-FR" dirty="0" err="1" smtClean="0"/>
               <a:t>eget</a:t>
             </a:r>
             <a:r>
-              <a:rPr lang="fr-FR" dirty="false" smtClean="false"/>
-              <a:t> </a:t>
-            </a:r>
-            <a:r>
-              <a:rPr lang="fr-FR" dirty="false" err="true" smtClean="false"/>
+              <a:rPr lang="fr-FR" dirty="0" smtClean="0"/>
+              <a:t> </a:t>
+            </a:r>
+            <a:r>
+              <a:rPr lang="fr-FR" dirty="0" err="1" smtClean="0"/>
               <a:t>aliquet</a:t>
             </a:r>
             <a:r>
-              <a:rPr lang="fr-FR" dirty="false" smtClean="false"/>
-              <a:t> </a:t>
-            </a:r>
-            <a:r>
-              <a:rPr lang="fr-FR" dirty="false" err="true" smtClean="false"/>
+              <a:rPr lang="fr-FR" dirty="0" smtClean="0"/>
+              <a:t> </a:t>
+            </a:r>
+            <a:r>
+              <a:rPr lang="fr-FR" dirty="0" err="1" smtClean="0"/>
               <a:t>odio</a:t>
             </a:r>
             <a:r>
-              <a:rPr lang="fr-FR" dirty="false" smtClean="false"/>
-              <a:t> </a:t>
-            </a:r>
-            <a:r>
-              <a:rPr lang="fr-FR" dirty="false" err="true" smtClean="false"/>
+              <a:rPr lang="fr-FR" dirty="0" smtClean="0"/>
+              <a:t> </a:t>
+            </a:r>
+            <a:r>
+              <a:rPr lang="fr-FR" dirty="0" err="1" smtClean="0"/>
               <a:t>consequat</a:t>
             </a:r>
             <a:r>
-              <a:rPr lang="fr-FR" dirty="false" smtClean="false"/>
-              <a:t> </a:t>
-            </a:r>
-            <a:r>
-              <a:rPr lang="fr-FR" dirty="false" err="true" smtClean="false"/>
+              <a:rPr lang="fr-FR" dirty="0" smtClean="0"/>
+              <a:t> </a:t>
+            </a:r>
+            <a:r>
+              <a:rPr lang="fr-FR" dirty="0" err="1" smtClean="0"/>
               <a:t>rhoncus</a:t>
             </a:r>
             <a:r>
-              <a:rPr lang="fr-FR" dirty="false" smtClean="false"/>
+              <a:rPr lang="fr-FR" dirty="0" smtClean="0"/>
               <a:t>. </a:t>
             </a:r>
             <a:r>
-              <a:rPr lang="fr-FR" dirty="false" err="true" smtClean="false"/>
+              <a:rPr lang="fr-FR" dirty="0" err="1" smtClean="0"/>
               <a:t>Proin</a:t>
             </a:r>
             <a:r>
-              <a:rPr lang="fr-FR" dirty="false" smtClean="false"/>
+              <a:rPr lang="fr-FR" dirty="0" smtClean="0"/>
               <a:t> at </a:t>
             </a:r>
             <a:r>
-              <a:rPr lang="fr-FR" dirty="false" err="true" smtClean="false"/>
+              <a:rPr lang="fr-FR" dirty="0" err="1" smtClean="0"/>
               <a:t>nisl</a:t>
             </a:r>
             <a:r>
-              <a:rPr lang="fr-FR" dirty="false" smtClean="false"/>
+              <a:rPr lang="fr-FR" dirty="0" smtClean="0"/>
               <a:t> mollis, </a:t>
             </a:r>
             <a:r>
-              <a:rPr lang="fr-FR" dirty="false" err="true" smtClean="false"/>
+              <a:rPr lang="fr-FR" dirty="0" err="1" smtClean="0"/>
               <a:t>congue</a:t>
             </a:r>
             <a:r>
-              <a:rPr lang="fr-FR" dirty="false" smtClean="false"/>
-              <a:t> </a:t>
-            </a:r>
-            <a:r>
-              <a:rPr lang="fr-FR" dirty="false" err="true" smtClean="false"/>
+              <a:rPr lang="fr-FR" dirty="0" smtClean="0"/>
+              <a:t> </a:t>
+            </a:r>
+            <a:r>
+              <a:rPr lang="fr-FR" dirty="0" err="1" smtClean="0"/>
               <a:t>quam</a:t>
             </a:r>
             <a:r>
-              <a:rPr lang="fr-FR" dirty="false" smtClean="false"/>
+              <a:rPr lang="fr-FR" dirty="0" smtClean="0"/>
               <a:t> id, </a:t>
             </a:r>
             <a:r>
-              <a:rPr lang="fr-FR" dirty="false" err="true" smtClean="false"/>
+              <a:rPr lang="fr-FR" dirty="0" err="1" smtClean="0"/>
               <a:t>malesuada</a:t>
             </a:r>
             <a:r>
-              <a:rPr lang="fr-FR" dirty="false" smtClean="false"/>
-              <a:t> </a:t>
-            </a:r>
-            <a:r>
-              <a:rPr lang="fr-FR" dirty="false" err="true" smtClean="false"/>
+              <a:rPr lang="fr-FR" dirty="0" smtClean="0"/>
+              <a:t> </a:t>
+            </a:r>
+            <a:r>
+              <a:rPr lang="fr-FR" dirty="0" err="1" smtClean="0"/>
               <a:t>felis</a:t>
             </a:r>
             <a:r>
-              <a:rPr lang="fr-FR" dirty="false" smtClean="false"/>
+              <a:rPr lang="fr-FR" dirty="0" smtClean="0"/>
               <a:t>. Suspendisse </a:t>
             </a:r>
             <a:r>
-              <a:rPr lang="fr-FR" dirty="false" err="true" smtClean="false"/>
+              <a:rPr lang="fr-FR" dirty="0" err="1" smtClean="0"/>
               <a:t>rutrum</a:t>
             </a:r>
             <a:r>
-              <a:rPr lang="fr-FR" dirty="false" smtClean="false"/>
-              <a:t> </a:t>
-            </a:r>
-            <a:r>
-              <a:rPr lang="fr-FR" dirty="false" err="true" smtClean="false"/>
+              <a:rPr lang="fr-FR" dirty="0" smtClean="0"/>
+              <a:t> </a:t>
+            </a:r>
+            <a:r>
+              <a:rPr lang="fr-FR" dirty="0" err="1" smtClean="0"/>
               <a:t>finibus</a:t>
             </a:r>
             <a:r>
-              <a:rPr lang="fr-FR" dirty="false" smtClean="false"/>
-              <a:t> </a:t>
-            </a:r>
-            <a:r>
-              <a:rPr lang="fr-FR" dirty="false" err="true" smtClean="false"/>
+              <a:rPr lang="fr-FR" dirty="0" smtClean="0"/>
+              <a:t> </a:t>
+            </a:r>
+            <a:r>
+              <a:rPr lang="fr-FR" dirty="0" err="1" smtClean="0"/>
               <a:t>velit</a:t>
             </a:r>
             <a:r>
-              <a:rPr lang="fr-FR" dirty="false" smtClean="false"/>
+              <a:rPr lang="fr-FR" dirty="0" smtClean="0"/>
               <a:t>, </a:t>
             </a:r>
             <a:r>
-              <a:rPr lang="fr-FR" dirty="false" err="true" smtClean="false"/>
+              <a:rPr lang="fr-FR" dirty="0" err="1" smtClean="0"/>
               <a:t>quis</a:t>
             </a:r>
             <a:r>
-              <a:rPr lang="fr-FR" dirty="false" smtClean="false"/>
-              <a:t> </a:t>
-            </a:r>
-            <a:r>
-              <a:rPr lang="fr-FR" dirty="false" err="true" smtClean="false"/>
+              <a:rPr lang="fr-FR" dirty="0" smtClean="0"/>
+              <a:t> </a:t>
+            </a:r>
+            <a:r>
+              <a:rPr lang="fr-FR" dirty="0" err="1" smtClean="0"/>
               <a:t>aliquet</a:t>
             </a:r>
             <a:r>
-              <a:rPr lang="fr-FR" dirty="false" smtClean="false"/>
-              <a:t> </a:t>
-            </a:r>
-            <a:r>
-              <a:rPr lang="fr-FR" dirty="false" err="true" smtClean="false"/>
+              <a:rPr lang="fr-FR" dirty="0" smtClean="0"/>
+              <a:t> </a:t>
+            </a:r>
+            <a:r>
+              <a:rPr lang="fr-FR" dirty="0" err="1" smtClean="0"/>
               <a:t>augue</a:t>
             </a:r>
             <a:r>
-              <a:rPr lang="fr-FR" dirty="false" smtClean="false"/>
-              <a:t> </a:t>
-            </a:r>
-            <a:r>
-              <a:rPr lang="fr-FR" dirty="false" err="true" smtClean="false"/>
+              <a:rPr lang="fr-FR" dirty="0" smtClean="0"/>
+              <a:t> </a:t>
+            </a:r>
+            <a:r>
+              <a:rPr lang="fr-FR" dirty="0" err="1" smtClean="0"/>
               <a:t>rhoncus</a:t>
             </a:r>
             <a:r>
-              <a:rPr lang="fr-FR" dirty="false" smtClean="false"/>
+              <a:rPr lang="fr-FR" dirty="0" smtClean="0"/>
               <a:t> ut</a:t>
             </a:r>
-            <a:endParaRPr lang="fr-FR" dirty="false"/>
+            <a:endParaRPr lang="fr-FR" dirty="0"/>
           </a:p>
         </p:txBody>
       </p:sp>
@@ -4928,6 +4904,75 @@
     <p:extLst>
       <p:ext uri="{BB962C8B-B14F-4D97-AF65-F5344CB8AC3E}">
         <p14:creationId xmlns:p14="http://schemas.microsoft.com/office/powerpoint/2010/main" val="4140002940"/>
+      </p:ext>
+    </p:extLst>
+  </p:cSld>
+  <p:clrMapOvr>
+    <a:masterClrMapping/>
+  </p:clrMapOvr>
+</p:sld>
+</file>
+
+<file path=ppt/slides/slide3.xml><?xml version="1.0" encoding="utf-8"?>
+<p:sld xmlns:a="http://schemas.openxmlformats.org/drawingml/2006/main" xmlns:r="http://schemas.openxmlformats.org/officeDocument/2006/relationships" xmlns:p="http://schemas.openxmlformats.org/presentationml/2006/main">
+  <p:cSld>
+    <p:spTree>
+      <p:nvGrpSpPr>
+        <p:cNvPr id="1" name=""/>
+        <p:cNvGrpSpPr/>
+        <p:nvPr/>
+      </p:nvGrpSpPr>
+      <p:grpSpPr>
+        <a:xfrm>
+          <a:off x="0" y="0"/>
+          <a:ext cx="0" cy="0"/>
+          <a:chOff x="0" y="0"/>
+          <a:chExt cx="0" cy="0"/>
+        </a:xfrm>
+      </p:grpSpPr>
+      <p:sp>
+        <p:nvSpPr>
+          <p:cNvPr id="2" name="Titre 1"/>
+          <p:cNvSpPr>
+            <a:spLocks noGrp="1"/>
+          </p:cNvSpPr>
+          <p:nvPr>
+            <p:ph type="title"/>
+          </p:nvPr>
+        </p:nvSpPr>
+        <p:spPr/>
+        <p:txBody>
+          <a:bodyPr/>
+          <a:lstStyle/>
+          <a:p>
+            <a:r>
+              <a:rPr lang="fr-FR" dirty="0" err="1" smtClean="0"/>
+              <a:t>Blank</a:t>
+            </a:r>
+            <a:r>
+              <a:rPr lang="fr-FR" dirty="0" smtClean="0"/>
+              <a:t> slide to </a:t>
+            </a:r>
+            <a:r>
+              <a:rPr lang="fr-FR" dirty="0" err="1" smtClean="0"/>
+              <a:t>be</a:t>
+            </a:r>
+            <a:r>
+              <a:rPr lang="fr-FR" dirty="0" smtClean="0"/>
+              <a:t> </a:t>
+            </a:r>
+            <a:r>
+              <a:rPr lang="fr-FR" smtClean="0"/>
+              <a:t>ignored</a:t>
+            </a:r>
+            <a:endParaRPr lang="fr-FR"/>
+          </a:p>
+        </p:txBody>
+      </p:sp>
+    </p:spTree>
+    <p:extLst>
+      <p:ext uri="{BB962C8B-B14F-4D97-AF65-F5344CB8AC3E}">
+        <p14:creationId xmlns:p14="http://schemas.microsoft.com/office/powerpoint/2010/main" val="870935157"/>
       </p:ext>
     </p:extLst>
   </p:cSld>

</xml_diff>